<commit_message>
Move test in categorytest.txt into ShapesLab.pptx
</commit_message>
<xml_diff>
--- a/doc/test/ShapesLab/ShapesLab.pptx
+++ b/doc/test/ShapesLab/ShapesLab.pptx
@@ -233,7 +233,7 @@
           <a:p>
             <a:fld id="{26004F41-C1A1-4B0D-9EEE-5E3F0E5BC108}" type="datetimeFigureOut">
               <a:rPr lang="en-SG" smtClean="0"/>
-              <a:t>21/6/2015</a:t>
+              <a:t>5/7/2017</a:t>
             </a:fld>
             <a:endParaRPr lang="en-SG"/>
           </a:p>
@@ -545,6 +545,269 @@
           <a:bodyPr/>
           <a:lstStyle/>
           <a:p>
+            <a:r>
+              <a:rPr lang="en-US" dirty="0" smtClean="0"/>
+              <a:t>Do the following from 3 environments:</a:t>
+            </a:r>
+          </a:p>
+          <a:p>
+            <a:r>
+              <a:rPr lang="en-US" dirty="0" smtClean="0"/>
+              <a:t>1. Entirely new environment</a:t>
+            </a:r>
+          </a:p>
+          <a:p>
+            <a:r>
+              <a:rPr lang="en-US" dirty="0" smtClean="0"/>
+              <a:t>2. Contains old shape info</a:t>
+            </a:r>
+          </a:p>
+          <a:p>
+            <a:endParaRPr lang="en-US" dirty="0" smtClean="0"/>
+          </a:p>
+          <a:p>
+            <a:r>
+              <a:rPr lang="en-US" dirty="0" smtClean="0"/>
+              <a:t>1. Add Category</a:t>
+            </a:r>
+          </a:p>
+          <a:p>
+            <a:r>
+              <a:rPr lang="en-US" dirty="0" smtClean="0"/>
+              <a:t>	1.1 Add category then add a new shape inside, check the default name, close and open to check</a:t>
+            </a:r>
+          </a:p>
+          <a:p>
+            <a:r>
+              <a:rPr lang="en-US" dirty="0" smtClean="0"/>
+              <a:t>	1.2 Add category then add a new shape inside, check the default name, set the category as default, close and open to check</a:t>
+            </a:r>
+          </a:p>
+          <a:p>
+            <a:r>
+              <a:rPr lang="en-US" dirty="0" smtClean="0"/>
+              <a:t>2. Rename Category</a:t>
+            </a:r>
+          </a:p>
+          <a:p>
+            <a:r>
+              <a:rPr lang="en-US" dirty="0" smtClean="0"/>
+              <a:t>	2.1 Rename to a valid name</a:t>
+            </a:r>
+          </a:p>
+          <a:p>
+            <a:r>
+              <a:rPr lang="en-US" dirty="0" smtClean="0"/>
+              <a:t>	2.2 Rename to an </a:t>
+            </a:r>
+            <a:r>
+              <a:rPr lang="en-US" dirty="0" err="1" smtClean="0"/>
+              <a:t>invaid</a:t>
+            </a:r>
+            <a:r>
+              <a:rPr lang="en-US" dirty="0" smtClean="0"/>
+              <a:t> name</a:t>
+            </a:r>
+          </a:p>
+          <a:p>
+            <a:r>
+              <a:rPr lang="en-US" dirty="0" smtClean="0"/>
+              <a:t>3. Import Category</a:t>
+            </a:r>
+          </a:p>
+          <a:p>
+            <a:r>
+              <a:rPr lang="en-US" dirty="0" smtClean="0"/>
+              <a:t>	3.1 Import single category with </a:t>
+            </a:r>
+            <a:r>
+              <a:rPr lang="en-US" dirty="0" err="1" smtClean="0"/>
+              <a:t>namebox</a:t>
+            </a:r>
+            <a:r>
+              <a:rPr lang="en-US" dirty="0" smtClean="0"/>
+              <a:t>, no conflict name</a:t>
+            </a:r>
+          </a:p>
+          <a:p>
+            <a:r>
+              <a:rPr lang="en-US" dirty="0" smtClean="0"/>
+              <a:t>	3.2 Import multiple categories with </a:t>
+            </a:r>
+            <a:r>
+              <a:rPr lang="en-US" dirty="0" err="1" smtClean="0"/>
+              <a:t>nameboxes</a:t>
+            </a:r>
+            <a:r>
+              <a:rPr lang="en-US" dirty="0" smtClean="0"/>
+              <a:t>, no </a:t>
+            </a:r>
+            <a:r>
+              <a:rPr lang="en-US" dirty="0" err="1" smtClean="0"/>
+              <a:t>confilct</a:t>
+            </a:r>
+            <a:r>
+              <a:rPr lang="en-US" dirty="0" smtClean="0"/>
+              <a:t> name</a:t>
+            </a:r>
+          </a:p>
+          <a:p>
+            <a:r>
+              <a:rPr lang="en-US" dirty="0" smtClean="0"/>
+              <a:t>	3.3 Import single category with </a:t>
+            </a:r>
+            <a:r>
+              <a:rPr lang="en-US" dirty="0" err="1" smtClean="0"/>
+              <a:t>namebox</a:t>
+            </a:r>
+            <a:r>
+              <a:rPr lang="en-US" dirty="0" smtClean="0"/>
+              <a:t>, conflict with one existed name</a:t>
+            </a:r>
+          </a:p>
+          <a:p>
+            <a:r>
+              <a:rPr lang="en-US" dirty="0" smtClean="0"/>
+              <a:t>	3.4 Import multiple categories with </a:t>
+            </a:r>
+            <a:r>
+              <a:rPr lang="en-US" dirty="0" err="1" smtClean="0"/>
+              <a:t>nameboxes</a:t>
+            </a:r>
+            <a:r>
+              <a:rPr lang="en-US" dirty="0" smtClean="0"/>
+              <a:t>, some of the boxes conflict with existed name</a:t>
+            </a:r>
+          </a:p>
+          <a:p>
+            <a:r>
+              <a:rPr lang="en-US" dirty="0" smtClean="0"/>
+              <a:t>	3.5 Import single category without </a:t>
+            </a:r>
+            <a:r>
+              <a:rPr lang="en-US" dirty="0" err="1" smtClean="0"/>
+              <a:t>namebox</a:t>
+            </a:r>
+            <a:endParaRPr lang="en-US" dirty="0" smtClean="0"/>
+          </a:p>
+          <a:p>
+            <a:r>
+              <a:rPr lang="en-US" dirty="0" smtClean="0"/>
+              <a:t>	3.6 Import single category without </a:t>
+            </a:r>
+            <a:r>
+              <a:rPr lang="en-US" dirty="0" err="1" smtClean="0"/>
+              <a:t>namebox</a:t>
+            </a:r>
+            <a:r>
+              <a:rPr lang="en-US" dirty="0" smtClean="0"/>
+              <a:t>, conflict with exist name</a:t>
+            </a:r>
+          </a:p>
+          <a:p>
+            <a:r>
+              <a:rPr lang="en-US" dirty="0" smtClean="0"/>
+              <a:t>	3.7 Import multiple categories without </a:t>
+            </a:r>
+            <a:r>
+              <a:rPr lang="en-US" dirty="0" err="1" smtClean="0"/>
+              <a:t>namebox</a:t>
+            </a:r>
+            <a:endParaRPr lang="en-US" dirty="0" smtClean="0"/>
+          </a:p>
+          <a:p>
+            <a:r>
+              <a:rPr lang="en-US" dirty="0" smtClean="0"/>
+              <a:t>4. </a:t>
+            </a:r>
+            <a:r>
+              <a:rPr lang="en-US" smtClean="0"/>
+              <a:t>Migrate Category</a:t>
+            </a:r>
+            <a:endParaRPr lang="en-US"/>
+          </a:p>
+        </p:txBody>
+      </p:sp>
+      <p:sp>
+        <p:nvSpPr>
+          <p:cNvPr id="4" name="Slide Number Placeholder 3"/>
+          <p:cNvSpPr>
+            <a:spLocks noGrp="1"/>
+          </p:cNvSpPr>
+          <p:nvPr>
+            <p:ph type="sldNum" sz="quarter" idx="10"/>
+          </p:nvPr>
+        </p:nvSpPr>
+        <p:spPr/>
+        <p:txBody>
+          <a:bodyPr/>
+          <a:lstStyle/>
+          <a:p>
+            <a:fld id="{E96FB07A-B1AD-4238-A6C9-967239C45D18}" type="slidenum">
+              <a:rPr lang="en-SG" smtClean="0"/>
+              <a:t>2</a:t>
+            </a:fld>
+            <a:endParaRPr lang="en-SG"/>
+          </a:p>
+        </p:txBody>
+      </p:sp>
+    </p:spTree>
+    <p:extLst>
+      <p:ext uri="{BB962C8B-B14F-4D97-AF65-F5344CB8AC3E}">
+        <p14:creationId xmlns:p14="http://schemas.microsoft.com/office/powerpoint/2010/main" val="2907083583"/>
+      </p:ext>
+    </p:extLst>
+  </p:cSld>
+  <p:clrMapOvr>
+    <a:masterClrMapping/>
+  </p:clrMapOvr>
+</p:notes>
+</file>
+
+<file path=ppt/notesSlides/notesSlide2.xml><?xml version="1.0" encoding="utf-8"?>
+<p:notes xmlns:a="http://schemas.openxmlformats.org/drawingml/2006/main" xmlns:r="http://schemas.openxmlformats.org/officeDocument/2006/relationships" xmlns:p="http://schemas.openxmlformats.org/presentationml/2006/main">
+  <p:cSld>
+    <p:spTree>
+      <p:nvGrpSpPr>
+        <p:cNvPr id="1" name=""/>
+        <p:cNvGrpSpPr/>
+        <p:nvPr/>
+      </p:nvGrpSpPr>
+      <p:grpSpPr>
+        <a:xfrm>
+          <a:off x="0" y="0"/>
+          <a:ext cx="0" cy="0"/>
+          <a:chOff x="0" y="0"/>
+          <a:chExt cx="0" cy="0"/>
+        </a:xfrm>
+      </p:grpSpPr>
+      <p:sp>
+        <p:nvSpPr>
+          <p:cNvPr id="2" name="Slide Image Placeholder 1"/>
+          <p:cNvSpPr>
+            <a:spLocks noGrp="1" noRot="1" noChangeAspect="1"/>
+          </p:cNvSpPr>
+          <p:nvPr>
+            <p:ph type="sldImg"/>
+          </p:nvPr>
+        </p:nvSpPr>
+        <p:spPr/>
+      </p:sp>
+      <p:sp>
+        <p:nvSpPr>
+          <p:cNvPr id="3" name="Notes Placeholder 2"/>
+          <p:cNvSpPr>
+            <a:spLocks noGrp="1"/>
+          </p:cNvSpPr>
+          <p:nvPr>
+            <p:ph type="body" idx="1"/>
+          </p:nvPr>
+        </p:nvSpPr>
+        <p:spPr/>
+        <p:txBody>
+          <a:bodyPr/>
+          <a:lstStyle/>
+          <a:p>
             <a:endParaRPr lang="zh-CN" altLang="en-US" dirty="0"/>
           </a:p>
         </p:txBody>
@@ -585,7 +848,7 @@
 </p:notes>
 </file>
 
-<file path=ppt/notesSlides/notesSlide2.xml><?xml version="1.0" encoding="utf-8"?>
+<file path=ppt/notesSlides/notesSlide3.xml><?xml version="1.0" encoding="utf-8"?>
 <p:notes xmlns:a="http://schemas.openxmlformats.org/drawingml/2006/main" xmlns:r="http://schemas.openxmlformats.org/officeDocument/2006/relationships" xmlns:p="http://schemas.openxmlformats.org/presentationml/2006/main">
   <p:cSld>
     <p:spTree>
@@ -854,7 +1117,7 @@
           <a:p>
             <a:fld id="{699DC775-C286-4358-8C92-D7E584E969B3}" type="datetimeFigureOut">
               <a:rPr lang="en-US" smtClean="0"/>
-              <a:t>6/21/2015</a:t>
+              <a:t>7/5/2017</a:t>
             </a:fld>
             <a:endParaRPr lang="en-US"/>
           </a:p>
@@ -1024,7 +1287,7 @@
           <a:p>
             <a:fld id="{699DC775-C286-4358-8C92-D7E584E969B3}" type="datetimeFigureOut">
               <a:rPr lang="en-US" smtClean="0"/>
-              <a:t>6/21/2015</a:t>
+              <a:t>7/5/2017</a:t>
             </a:fld>
             <a:endParaRPr lang="en-US"/>
           </a:p>
@@ -1204,7 +1467,7 @@
           <a:p>
             <a:fld id="{699DC775-C286-4358-8C92-D7E584E969B3}" type="datetimeFigureOut">
               <a:rPr lang="en-US" smtClean="0"/>
-              <a:t>6/21/2015</a:t>
+              <a:t>7/5/2017</a:t>
             </a:fld>
             <a:endParaRPr lang="en-US"/>
           </a:p>
@@ -1446,7 +1709,7 @@
           <a:p>
             <a:fld id="{699DC775-C286-4358-8C92-D7E584E969B3}" type="datetimeFigureOut">
               <a:rPr lang="en-US" smtClean="0"/>
-              <a:t>6/21/2015</a:t>
+              <a:t>7/5/2017</a:t>
             </a:fld>
             <a:endParaRPr lang="en-US"/>
           </a:p>
@@ -1616,7 +1879,7 @@
           <a:p>
             <a:fld id="{699DC775-C286-4358-8C92-D7E584E969B3}" type="datetimeFigureOut">
               <a:rPr lang="en-US" smtClean="0"/>
-              <a:t>6/21/2015</a:t>
+              <a:t>7/5/2017</a:t>
             </a:fld>
             <a:endParaRPr lang="en-US"/>
           </a:p>
@@ -1862,7 +2125,7 @@
           <a:p>
             <a:fld id="{699DC775-C286-4358-8C92-D7E584E969B3}" type="datetimeFigureOut">
               <a:rPr lang="en-US" smtClean="0"/>
-              <a:t>6/21/2015</a:t>
+              <a:t>7/5/2017</a:t>
             </a:fld>
             <a:endParaRPr lang="en-US"/>
           </a:p>
@@ -2150,7 +2413,7 @@
           <a:p>
             <a:fld id="{699DC775-C286-4358-8C92-D7E584E969B3}" type="datetimeFigureOut">
               <a:rPr lang="en-US" smtClean="0"/>
-              <a:t>6/21/2015</a:t>
+              <a:t>7/5/2017</a:t>
             </a:fld>
             <a:endParaRPr lang="en-US"/>
           </a:p>
@@ -2572,7 +2835,7 @@
           <a:p>
             <a:fld id="{699DC775-C286-4358-8C92-D7E584E969B3}" type="datetimeFigureOut">
               <a:rPr lang="en-US" smtClean="0"/>
-              <a:t>6/21/2015</a:t>
+              <a:t>7/5/2017</a:t>
             </a:fld>
             <a:endParaRPr lang="en-US"/>
           </a:p>
@@ -2690,7 +2953,7 @@
           <a:p>
             <a:fld id="{699DC775-C286-4358-8C92-D7E584E969B3}" type="datetimeFigureOut">
               <a:rPr lang="en-US" smtClean="0"/>
-              <a:t>6/21/2015</a:t>
+              <a:t>7/5/2017</a:t>
             </a:fld>
             <a:endParaRPr lang="en-US"/>
           </a:p>
@@ -2785,7 +3048,7 @@
           <a:p>
             <a:fld id="{699DC775-C286-4358-8C92-D7E584E969B3}" type="datetimeFigureOut">
               <a:rPr lang="en-US" smtClean="0"/>
-              <a:t>6/21/2015</a:t>
+              <a:t>7/5/2017</a:t>
             </a:fld>
             <a:endParaRPr lang="en-US"/>
           </a:p>
@@ -3062,7 +3325,7 @@
           <a:p>
             <a:fld id="{699DC775-C286-4358-8C92-D7E584E969B3}" type="datetimeFigureOut">
               <a:rPr lang="en-US" smtClean="0"/>
-              <a:t>6/21/2015</a:t>
+              <a:t>7/5/2017</a:t>
             </a:fld>
             <a:endParaRPr lang="en-US"/>
           </a:p>
@@ -3232,7 +3495,7 @@
           <a:p>
             <a:fld id="{699DC775-C286-4358-8C92-D7E584E969B3}" type="datetimeFigureOut">
               <a:rPr lang="en-US" smtClean="0"/>
-              <a:t>6/21/2015</a:t>
+              <a:t>7/5/2017</a:t>
             </a:fld>
             <a:endParaRPr lang="en-US"/>
           </a:p>
@@ -3485,7 +3748,7 @@
           <a:p>
             <a:fld id="{699DC775-C286-4358-8C92-D7E584E969B3}" type="datetimeFigureOut">
               <a:rPr lang="en-US" smtClean="0"/>
-              <a:t>6/21/2015</a:t>
+              <a:t>7/5/2017</a:t>
             </a:fld>
             <a:endParaRPr lang="en-US"/>
           </a:p>
@@ -3655,7 +3918,7 @@
           <a:p>
             <a:fld id="{699DC775-C286-4358-8C92-D7E584E969B3}" type="datetimeFigureOut">
               <a:rPr lang="en-US" smtClean="0"/>
-              <a:t>6/21/2015</a:t>
+              <a:t>7/5/2017</a:t>
             </a:fld>
             <a:endParaRPr lang="en-US"/>
           </a:p>
@@ -3835,7 +4098,7 @@
           <a:p>
             <a:fld id="{699DC775-C286-4358-8C92-D7E584E969B3}" type="datetimeFigureOut">
               <a:rPr lang="en-US" smtClean="0"/>
-              <a:t>6/21/2015</a:t>
+              <a:t>7/5/2017</a:t>
             </a:fld>
             <a:endParaRPr lang="en-US"/>
           </a:p>
@@ -4085,7 +4348,7 @@
           <a:p>
             <a:fld id="{699DC775-C286-4358-8C92-D7E584E969B3}" type="datetimeFigureOut">
               <a:rPr lang="en-US" smtClean="0"/>
-              <a:t>6/21/2015</a:t>
+              <a:t>7/5/2017</a:t>
             </a:fld>
             <a:endParaRPr lang="en-US"/>
           </a:p>
@@ -4263,7 +4526,7 @@
           <a:p>
             <a:fld id="{699DC775-C286-4358-8C92-D7E584E969B3}" type="datetimeFigureOut">
               <a:rPr lang="en-US" smtClean="0"/>
-              <a:t>6/21/2015</a:t>
+              <a:t>7/5/2017</a:t>
             </a:fld>
             <a:endParaRPr lang="en-US"/>
           </a:p>
@@ -4517,7 +4780,7 @@
           <a:p>
             <a:fld id="{699DC775-C286-4358-8C92-D7E584E969B3}" type="datetimeFigureOut">
               <a:rPr lang="en-US" smtClean="0"/>
-              <a:t>6/21/2015</a:t>
+              <a:t>7/5/2017</a:t>
             </a:fld>
             <a:endParaRPr lang="en-US"/>
           </a:p>
@@ -4813,7 +5076,7 @@
           <a:p>
             <a:fld id="{699DC775-C286-4358-8C92-D7E584E969B3}" type="datetimeFigureOut">
               <a:rPr lang="en-US" smtClean="0"/>
-              <a:t>6/21/2015</a:t>
+              <a:t>7/5/2017</a:t>
             </a:fld>
             <a:endParaRPr lang="en-US"/>
           </a:p>
@@ -5243,7 +5506,7 @@
           <a:p>
             <a:fld id="{699DC775-C286-4358-8C92-D7E584E969B3}" type="datetimeFigureOut">
               <a:rPr lang="en-US" smtClean="0"/>
-              <a:t>6/21/2015</a:t>
+              <a:t>7/5/2017</a:t>
             </a:fld>
             <a:endParaRPr lang="en-US"/>
           </a:p>
@@ -5369,7 +5632,7 @@
           <a:p>
             <a:fld id="{699DC775-C286-4358-8C92-D7E584E969B3}" type="datetimeFigureOut">
               <a:rPr lang="en-US" smtClean="0"/>
-              <a:t>6/21/2015</a:t>
+              <a:t>7/5/2017</a:t>
             </a:fld>
             <a:endParaRPr lang="en-US"/>
           </a:p>
@@ -5472,7 +5735,7 @@
           <a:p>
             <a:fld id="{699DC775-C286-4358-8C92-D7E584E969B3}" type="datetimeFigureOut">
               <a:rPr lang="en-US" smtClean="0"/>
-              <a:t>6/21/2015</a:t>
+              <a:t>7/5/2017</a:t>
             </a:fld>
             <a:endParaRPr lang="en-US"/>
           </a:p>
@@ -5718,7 +5981,7 @@
           <a:p>
             <a:fld id="{699DC775-C286-4358-8C92-D7E584E969B3}" type="datetimeFigureOut">
               <a:rPr lang="en-US" smtClean="0"/>
-              <a:t>6/21/2015</a:t>
+              <a:t>7/5/2017</a:t>
             </a:fld>
             <a:endParaRPr lang="en-US"/>
           </a:p>
@@ -6003,7 +6266,7 @@
           <a:p>
             <a:fld id="{699DC775-C286-4358-8C92-D7E584E969B3}" type="datetimeFigureOut">
               <a:rPr lang="en-US" smtClean="0"/>
-              <a:t>6/21/2015</a:t>
+              <a:t>7/5/2017</a:t>
             </a:fld>
             <a:endParaRPr lang="en-US"/>
           </a:p>
@@ -6264,7 +6527,7 @@
           <a:p>
             <a:fld id="{699DC775-C286-4358-8C92-D7E584E969B3}" type="datetimeFigureOut">
               <a:rPr lang="en-US" smtClean="0"/>
-              <a:t>6/21/2015</a:t>
+              <a:t>7/5/2017</a:t>
             </a:fld>
             <a:endParaRPr lang="en-US"/>
           </a:p>
@@ -6442,7 +6705,7 @@
           <a:p>
             <a:fld id="{699DC775-C286-4358-8C92-D7E584E969B3}" type="datetimeFigureOut">
               <a:rPr lang="en-US" smtClean="0"/>
-              <a:t>6/21/2015</a:t>
+              <a:t>7/5/2017</a:t>
             </a:fld>
             <a:endParaRPr lang="en-US"/>
           </a:p>
@@ -6630,7 +6893,7 @@
           <a:p>
             <a:fld id="{699DC775-C286-4358-8C92-D7E584E969B3}" type="datetimeFigureOut">
               <a:rPr lang="en-US" smtClean="0"/>
-              <a:t>6/21/2015</a:t>
+              <a:t>7/5/2017</a:t>
             </a:fld>
             <a:endParaRPr lang="en-US"/>
           </a:p>
@@ -6918,7 +7181,7 @@
           <a:p>
             <a:fld id="{699DC775-C286-4358-8C92-D7E584E969B3}" type="datetimeFigureOut">
               <a:rPr lang="en-US" smtClean="0"/>
-              <a:t>6/21/2015</a:t>
+              <a:t>7/5/2017</a:t>
             </a:fld>
             <a:endParaRPr lang="en-US"/>
           </a:p>
@@ -7340,7 +7603,7 @@
           <a:p>
             <a:fld id="{699DC775-C286-4358-8C92-D7E584E969B3}" type="datetimeFigureOut">
               <a:rPr lang="en-US" smtClean="0"/>
-              <a:t>6/21/2015</a:t>
+              <a:t>7/5/2017</a:t>
             </a:fld>
             <a:endParaRPr lang="en-US"/>
           </a:p>
@@ -7458,7 +7721,7 @@
           <a:p>
             <a:fld id="{699DC775-C286-4358-8C92-D7E584E969B3}" type="datetimeFigureOut">
               <a:rPr lang="en-US" smtClean="0"/>
-              <a:t>6/21/2015</a:t>
+              <a:t>7/5/2017</a:t>
             </a:fld>
             <a:endParaRPr lang="en-US"/>
           </a:p>
@@ -7553,7 +7816,7 @@
           <a:p>
             <a:fld id="{699DC775-C286-4358-8C92-D7E584E969B3}" type="datetimeFigureOut">
               <a:rPr lang="en-US" smtClean="0"/>
-              <a:t>6/21/2015</a:t>
+              <a:t>7/5/2017</a:t>
             </a:fld>
             <a:endParaRPr lang="en-US"/>
           </a:p>
@@ -7830,7 +8093,7 @@
           <a:p>
             <a:fld id="{699DC775-C286-4358-8C92-D7E584E969B3}" type="datetimeFigureOut">
               <a:rPr lang="en-US" smtClean="0"/>
-              <a:t>6/21/2015</a:t>
+              <a:t>7/5/2017</a:t>
             </a:fld>
             <a:endParaRPr lang="en-US"/>
           </a:p>
@@ -8083,7 +8346,7 @@
           <a:p>
             <a:fld id="{699DC775-C286-4358-8C92-D7E584E969B3}" type="datetimeFigureOut">
               <a:rPr lang="en-US" smtClean="0"/>
-              <a:t>6/21/2015</a:t>
+              <a:t>7/5/2017</a:t>
             </a:fld>
             <a:endParaRPr lang="en-US"/>
           </a:p>
@@ -8296,7 +8559,7 @@
           <a:p>
             <a:fld id="{699DC775-C286-4358-8C92-D7E584E969B3}" type="datetimeFigureOut">
               <a:rPr lang="en-US" smtClean="0"/>
-              <a:t>6/21/2015</a:t>
+              <a:t>7/5/2017</a:t>
             </a:fld>
             <a:endParaRPr lang="en-US"/>
           </a:p>
@@ -8811,7 +9074,7 @@
           <a:p>
             <a:fld id="{699DC775-C286-4358-8C92-D7E584E969B3}" type="datetimeFigureOut">
               <a:rPr lang="en-US" smtClean="0"/>
-              <a:t>6/21/2015</a:t>
+              <a:t>7/5/2017</a:t>
             </a:fld>
             <a:endParaRPr lang="en-US"/>
           </a:p>
@@ -9324,7 +9587,7 @@
           <a:p>
             <a:fld id="{699DC775-C286-4358-8C92-D7E584E969B3}" type="datetimeFigureOut">
               <a:rPr lang="en-US" smtClean="0"/>
-              <a:t>6/21/2015</a:t>
+              <a:t>7/5/2017</a:t>
             </a:fld>
             <a:endParaRPr lang="en-US"/>
           </a:p>

</xml_diff>

<commit_message>
Add test for clicking AddShapeButton
</commit_message>
<xml_diff>
--- a/doc/test/ShapesLab/ShapesLab.pptx
+++ b/doc/test/ShapesLab/ShapesLab.pptx
@@ -7,7 +7,7 @@
     <p:sldMasterId id="2147483672" r:id="rId3"/>
   </p:sldMasterIdLst>
   <p:notesMasterIdLst>
-    <p:notesMasterId r:id="rId10"/>
+    <p:notesMasterId r:id="rId13"/>
   </p:notesMasterIdLst>
   <p:sldIdLst>
     <p:sldId id="287" r:id="rId4"/>
@@ -15,7 +15,10 @@
     <p:sldId id="297" r:id="rId6"/>
     <p:sldId id="299" r:id="rId7"/>
     <p:sldId id="298" r:id="rId8"/>
-    <p:sldId id="274" r:id="rId9"/>
+    <p:sldId id="300" r:id="rId9"/>
+    <p:sldId id="301" r:id="rId10"/>
+    <p:sldId id="302" r:id="rId11"/>
+    <p:sldId id="274" r:id="rId12"/>
   </p:sldIdLst>
   <p:sldSz cx="9144000" cy="6858000" type="screen4x3"/>
   <p:notesSz cx="6858000" cy="9144000"/>
@@ -128,6 +131,9 @@
             <p14:sldId id="297"/>
             <p14:sldId id="299"/>
             <p14:sldId id="298"/>
+            <p14:sldId id="300"/>
+            <p14:sldId id="301"/>
+            <p14:sldId id="302"/>
             <p14:sldId id="274"/>
           </p14:sldIdLst>
         </p14:section>
@@ -233,7 +239,7 @@
           <a:p>
             <a:fld id="{26004F41-C1A1-4B0D-9EEE-5E3F0E5BC108}" type="datetimeFigureOut">
               <a:rPr lang="en-SG" smtClean="0"/>
-              <a:t>5/7/2017</a:t>
+              <a:t>5/2/2018</a:t>
             </a:fld>
             <a:endParaRPr lang="en-SG"/>
           </a:p>
@@ -936,6 +942,178 @@
 </p:notes>
 </file>
 
+<file path=ppt/notesSlides/notesSlide4.xml><?xml version="1.0" encoding="utf-8"?>
+<p:notes xmlns:a="http://schemas.openxmlformats.org/drawingml/2006/main" xmlns:r="http://schemas.openxmlformats.org/officeDocument/2006/relationships" xmlns:p="http://schemas.openxmlformats.org/presentationml/2006/main">
+  <p:cSld>
+    <p:spTree>
+      <p:nvGrpSpPr>
+        <p:cNvPr id="1" name=""/>
+        <p:cNvGrpSpPr/>
+        <p:nvPr/>
+      </p:nvGrpSpPr>
+      <p:grpSpPr>
+        <a:xfrm>
+          <a:off x="0" y="0"/>
+          <a:ext cx="0" cy="0"/>
+          <a:chOff x="0" y="0"/>
+          <a:chExt cx="0" cy="0"/>
+        </a:xfrm>
+      </p:grpSpPr>
+      <p:sp>
+        <p:nvSpPr>
+          <p:cNvPr id="2" name="Slide Image Placeholder 1"/>
+          <p:cNvSpPr>
+            <a:spLocks noGrp="1" noRot="1" noChangeAspect="1"/>
+          </p:cNvSpPr>
+          <p:nvPr>
+            <p:ph type="sldImg"/>
+          </p:nvPr>
+        </p:nvSpPr>
+        <p:spPr/>
+      </p:sp>
+      <p:sp>
+        <p:nvSpPr>
+          <p:cNvPr id="3" name="Notes Placeholder 2"/>
+          <p:cNvSpPr>
+            <a:spLocks noGrp="1"/>
+          </p:cNvSpPr>
+          <p:nvPr>
+            <p:ph type="body" idx="1"/>
+          </p:nvPr>
+        </p:nvSpPr>
+        <p:spPr/>
+        <p:txBody>
+          <a:bodyPr/>
+          <a:lstStyle/>
+          <a:p>
+            <a:endParaRPr lang="zh-CN" altLang="en-US" dirty="0"/>
+          </a:p>
+        </p:txBody>
+      </p:sp>
+      <p:sp>
+        <p:nvSpPr>
+          <p:cNvPr id="4" name="Slide Number Placeholder 3"/>
+          <p:cNvSpPr>
+            <a:spLocks noGrp="1"/>
+          </p:cNvSpPr>
+          <p:nvPr>
+            <p:ph type="sldNum" sz="quarter" idx="10"/>
+          </p:nvPr>
+        </p:nvSpPr>
+        <p:spPr/>
+        <p:txBody>
+          <a:bodyPr/>
+          <a:lstStyle/>
+          <a:p>
+            <a:fld id="{E96FB07A-B1AD-4238-A6C9-967239C45D18}" type="slidenum">
+              <a:rPr lang="en-SG" smtClean="0"/>
+              <a:t>6</a:t>
+            </a:fld>
+            <a:endParaRPr lang="en-SG"/>
+          </a:p>
+        </p:txBody>
+      </p:sp>
+    </p:spTree>
+    <p:extLst>
+      <p:ext uri="{BB962C8B-B14F-4D97-AF65-F5344CB8AC3E}">
+        <p14:creationId xmlns:p14="http://schemas.microsoft.com/office/powerpoint/2010/main" val="4140924876"/>
+      </p:ext>
+    </p:extLst>
+  </p:cSld>
+  <p:clrMapOvr>
+    <a:masterClrMapping/>
+  </p:clrMapOvr>
+</p:notes>
+</file>
+
+<file path=ppt/notesSlides/notesSlide5.xml><?xml version="1.0" encoding="utf-8"?>
+<p:notes xmlns:a="http://schemas.openxmlformats.org/drawingml/2006/main" xmlns:r="http://schemas.openxmlformats.org/officeDocument/2006/relationships" xmlns:p="http://schemas.openxmlformats.org/presentationml/2006/main">
+  <p:cSld>
+    <p:spTree>
+      <p:nvGrpSpPr>
+        <p:cNvPr id="1" name=""/>
+        <p:cNvGrpSpPr/>
+        <p:nvPr/>
+      </p:nvGrpSpPr>
+      <p:grpSpPr>
+        <a:xfrm>
+          <a:off x="0" y="0"/>
+          <a:ext cx="0" cy="0"/>
+          <a:chOff x="0" y="0"/>
+          <a:chExt cx="0" cy="0"/>
+        </a:xfrm>
+      </p:grpSpPr>
+      <p:sp>
+        <p:nvSpPr>
+          <p:cNvPr id="2" name="Slide Image Placeholder 1"/>
+          <p:cNvSpPr>
+            <a:spLocks noGrp="1" noRot="1" noChangeAspect="1"/>
+          </p:cNvSpPr>
+          <p:nvPr>
+            <p:ph type="sldImg"/>
+          </p:nvPr>
+        </p:nvSpPr>
+        <p:spPr/>
+      </p:sp>
+      <p:sp>
+        <p:nvSpPr>
+          <p:cNvPr id="3" name="Notes Placeholder 2"/>
+          <p:cNvSpPr>
+            <a:spLocks noGrp="1"/>
+          </p:cNvSpPr>
+          <p:nvPr>
+            <p:ph type="body" idx="1"/>
+          </p:nvPr>
+        </p:nvSpPr>
+        <p:spPr/>
+        <p:txBody>
+          <a:bodyPr/>
+          <a:lstStyle/>
+          <a:p>
+            <a:r>
+              <a:rPr lang="en-US" altLang="zh-CN" dirty="0" smtClean="0"/>
+              <a:t>Expected</a:t>
+            </a:r>
+            <a:endParaRPr lang="zh-CN" altLang="en-US" dirty="0"/>
+          </a:p>
+        </p:txBody>
+      </p:sp>
+      <p:sp>
+        <p:nvSpPr>
+          <p:cNvPr id="4" name="Slide Number Placeholder 3"/>
+          <p:cNvSpPr>
+            <a:spLocks noGrp="1"/>
+          </p:cNvSpPr>
+          <p:nvPr>
+            <p:ph type="sldNum" sz="quarter" idx="10"/>
+          </p:nvPr>
+        </p:nvSpPr>
+        <p:spPr/>
+        <p:txBody>
+          <a:bodyPr/>
+          <a:lstStyle/>
+          <a:p>
+            <a:fld id="{E96FB07A-B1AD-4238-A6C9-967239C45D18}" type="slidenum">
+              <a:rPr lang="en-SG" smtClean="0"/>
+              <a:t>8</a:t>
+            </a:fld>
+            <a:endParaRPr lang="en-SG"/>
+          </a:p>
+        </p:txBody>
+      </p:sp>
+    </p:spTree>
+    <p:extLst>
+      <p:ext uri="{BB962C8B-B14F-4D97-AF65-F5344CB8AC3E}">
+        <p14:creationId xmlns:p14="http://schemas.microsoft.com/office/powerpoint/2010/main" val="3330350760"/>
+      </p:ext>
+    </p:extLst>
+  </p:cSld>
+  <p:clrMapOvr>
+    <a:masterClrMapping/>
+  </p:clrMapOvr>
+</p:notes>
+</file>
+
 <file path=ppt/slideLayouts/slideLayout1.xml><?xml version="1.0" encoding="utf-8"?>
 <p:sldLayout xmlns:a="http://schemas.openxmlformats.org/drawingml/2006/main" xmlns:r="http://schemas.openxmlformats.org/officeDocument/2006/relationships" xmlns:p="http://schemas.openxmlformats.org/presentationml/2006/main" type="title" preserve="1">
   <p:cSld name="Title Slide">
@@ -1117,7 +1295,7 @@
           <a:p>
             <a:fld id="{699DC775-C286-4358-8C92-D7E584E969B3}" type="datetimeFigureOut">
               <a:rPr lang="en-US" smtClean="0"/>
-              <a:t>7/5/2017</a:t>
+              <a:t>2/5/2018</a:t>
             </a:fld>
             <a:endParaRPr lang="en-US"/>
           </a:p>
@@ -1287,7 +1465,7 @@
           <a:p>
             <a:fld id="{699DC775-C286-4358-8C92-D7E584E969B3}" type="datetimeFigureOut">
               <a:rPr lang="en-US" smtClean="0"/>
-              <a:t>7/5/2017</a:t>
+              <a:t>2/5/2018</a:t>
             </a:fld>
             <a:endParaRPr lang="en-US"/>
           </a:p>
@@ -1467,7 +1645,7 @@
           <a:p>
             <a:fld id="{699DC775-C286-4358-8C92-D7E584E969B3}" type="datetimeFigureOut">
               <a:rPr lang="en-US" smtClean="0"/>
-              <a:t>7/5/2017</a:t>
+              <a:t>2/5/2018</a:t>
             </a:fld>
             <a:endParaRPr lang="en-US"/>
           </a:p>
@@ -1709,7 +1887,7 @@
           <a:p>
             <a:fld id="{699DC775-C286-4358-8C92-D7E584E969B3}" type="datetimeFigureOut">
               <a:rPr lang="en-US" smtClean="0"/>
-              <a:t>7/5/2017</a:t>
+              <a:t>2/5/2018</a:t>
             </a:fld>
             <a:endParaRPr lang="en-US"/>
           </a:p>
@@ -1879,7 +2057,7 @@
           <a:p>
             <a:fld id="{699DC775-C286-4358-8C92-D7E584E969B3}" type="datetimeFigureOut">
               <a:rPr lang="en-US" smtClean="0"/>
-              <a:t>7/5/2017</a:t>
+              <a:t>2/5/2018</a:t>
             </a:fld>
             <a:endParaRPr lang="en-US"/>
           </a:p>
@@ -2125,7 +2303,7 @@
           <a:p>
             <a:fld id="{699DC775-C286-4358-8C92-D7E584E969B3}" type="datetimeFigureOut">
               <a:rPr lang="en-US" smtClean="0"/>
-              <a:t>7/5/2017</a:t>
+              <a:t>2/5/2018</a:t>
             </a:fld>
             <a:endParaRPr lang="en-US"/>
           </a:p>
@@ -2413,7 +2591,7 @@
           <a:p>
             <a:fld id="{699DC775-C286-4358-8C92-D7E584E969B3}" type="datetimeFigureOut">
               <a:rPr lang="en-US" smtClean="0"/>
-              <a:t>7/5/2017</a:t>
+              <a:t>2/5/2018</a:t>
             </a:fld>
             <a:endParaRPr lang="en-US"/>
           </a:p>
@@ -2835,7 +3013,7 @@
           <a:p>
             <a:fld id="{699DC775-C286-4358-8C92-D7E584E969B3}" type="datetimeFigureOut">
               <a:rPr lang="en-US" smtClean="0"/>
-              <a:t>7/5/2017</a:t>
+              <a:t>2/5/2018</a:t>
             </a:fld>
             <a:endParaRPr lang="en-US"/>
           </a:p>
@@ -2953,7 +3131,7 @@
           <a:p>
             <a:fld id="{699DC775-C286-4358-8C92-D7E584E969B3}" type="datetimeFigureOut">
               <a:rPr lang="en-US" smtClean="0"/>
-              <a:t>7/5/2017</a:t>
+              <a:t>2/5/2018</a:t>
             </a:fld>
             <a:endParaRPr lang="en-US"/>
           </a:p>
@@ -3048,7 +3226,7 @@
           <a:p>
             <a:fld id="{699DC775-C286-4358-8C92-D7E584E969B3}" type="datetimeFigureOut">
               <a:rPr lang="en-US" smtClean="0"/>
-              <a:t>7/5/2017</a:t>
+              <a:t>2/5/2018</a:t>
             </a:fld>
             <a:endParaRPr lang="en-US"/>
           </a:p>
@@ -3325,7 +3503,7 @@
           <a:p>
             <a:fld id="{699DC775-C286-4358-8C92-D7E584E969B3}" type="datetimeFigureOut">
               <a:rPr lang="en-US" smtClean="0"/>
-              <a:t>7/5/2017</a:t>
+              <a:t>2/5/2018</a:t>
             </a:fld>
             <a:endParaRPr lang="en-US"/>
           </a:p>
@@ -3495,7 +3673,7 @@
           <a:p>
             <a:fld id="{699DC775-C286-4358-8C92-D7E584E969B3}" type="datetimeFigureOut">
               <a:rPr lang="en-US" smtClean="0"/>
-              <a:t>7/5/2017</a:t>
+              <a:t>2/5/2018</a:t>
             </a:fld>
             <a:endParaRPr lang="en-US"/>
           </a:p>
@@ -3748,7 +3926,7 @@
           <a:p>
             <a:fld id="{699DC775-C286-4358-8C92-D7E584E969B3}" type="datetimeFigureOut">
               <a:rPr lang="en-US" smtClean="0"/>
-              <a:t>7/5/2017</a:t>
+              <a:t>2/5/2018</a:t>
             </a:fld>
             <a:endParaRPr lang="en-US"/>
           </a:p>
@@ -3918,7 +4096,7 @@
           <a:p>
             <a:fld id="{699DC775-C286-4358-8C92-D7E584E969B3}" type="datetimeFigureOut">
               <a:rPr lang="en-US" smtClean="0"/>
-              <a:t>7/5/2017</a:t>
+              <a:t>2/5/2018</a:t>
             </a:fld>
             <a:endParaRPr lang="en-US"/>
           </a:p>
@@ -4098,7 +4276,7 @@
           <a:p>
             <a:fld id="{699DC775-C286-4358-8C92-D7E584E969B3}" type="datetimeFigureOut">
               <a:rPr lang="en-US" smtClean="0"/>
-              <a:t>7/5/2017</a:t>
+              <a:t>2/5/2018</a:t>
             </a:fld>
             <a:endParaRPr lang="en-US"/>
           </a:p>
@@ -4348,7 +4526,7 @@
           <a:p>
             <a:fld id="{699DC775-C286-4358-8C92-D7E584E969B3}" type="datetimeFigureOut">
               <a:rPr lang="en-US" smtClean="0"/>
-              <a:t>7/5/2017</a:t>
+              <a:t>2/5/2018</a:t>
             </a:fld>
             <a:endParaRPr lang="en-US"/>
           </a:p>
@@ -4526,7 +4704,7 @@
           <a:p>
             <a:fld id="{699DC775-C286-4358-8C92-D7E584E969B3}" type="datetimeFigureOut">
               <a:rPr lang="en-US" smtClean="0"/>
-              <a:t>7/5/2017</a:t>
+              <a:t>2/5/2018</a:t>
             </a:fld>
             <a:endParaRPr lang="en-US"/>
           </a:p>
@@ -4780,7 +4958,7 @@
           <a:p>
             <a:fld id="{699DC775-C286-4358-8C92-D7E584E969B3}" type="datetimeFigureOut">
               <a:rPr lang="en-US" smtClean="0"/>
-              <a:t>7/5/2017</a:t>
+              <a:t>2/5/2018</a:t>
             </a:fld>
             <a:endParaRPr lang="en-US"/>
           </a:p>
@@ -5076,7 +5254,7 @@
           <a:p>
             <a:fld id="{699DC775-C286-4358-8C92-D7E584E969B3}" type="datetimeFigureOut">
               <a:rPr lang="en-US" smtClean="0"/>
-              <a:t>7/5/2017</a:t>
+              <a:t>2/5/2018</a:t>
             </a:fld>
             <a:endParaRPr lang="en-US"/>
           </a:p>
@@ -5506,7 +5684,7 @@
           <a:p>
             <a:fld id="{699DC775-C286-4358-8C92-D7E584E969B3}" type="datetimeFigureOut">
               <a:rPr lang="en-US" smtClean="0"/>
-              <a:t>7/5/2017</a:t>
+              <a:t>2/5/2018</a:t>
             </a:fld>
             <a:endParaRPr lang="en-US"/>
           </a:p>
@@ -5632,7 +5810,7 @@
           <a:p>
             <a:fld id="{699DC775-C286-4358-8C92-D7E584E969B3}" type="datetimeFigureOut">
               <a:rPr lang="en-US" smtClean="0"/>
-              <a:t>7/5/2017</a:t>
+              <a:t>2/5/2018</a:t>
             </a:fld>
             <a:endParaRPr lang="en-US"/>
           </a:p>
@@ -5735,7 +5913,7 @@
           <a:p>
             <a:fld id="{699DC775-C286-4358-8C92-D7E584E969B3}" type="datetimeFigureOut">
               <a:rPr lang="en-US" smtClean="0"/>
-              <a:t>7/5/2017</a:t>
+              <a:t>2/5/2018</a:t>
             </a:fld>
             <a:endParaRPr lang="en-US"/>
           </a:p>
@@ -5981,7 +6159,7 @@
           <a:p>
             <a:fld id="{699DC775-C286-4358-8C92-D7E584E969B3}" type="datetimeFigureOut">
               <a:rPr lang="en-US" smtClean="0"/>
-              <a:t>7/5/2017</a:t>
+              <a:t>2/5/2018</a:t>
             </a:fld>
             <a:endParaRPr lang="en-US"/>
           </a:p>
@@ -6266,7 +6444,7 @@
           <a:p>
             <a:fld id="{699DC775-C286-4358-8C92-D7E584E969B3}" type="datetimeFigureOut">
               <a:rPr lang="en-US" smtClean="0"/>
-              <a:t>7/5/2017</a:t>
+              <a:t>2/5/2018</a:t>
             </a:fld>
             <a:endParaRPr lang="en-US"/>
           </a:p>
@@ -6527,7 +6705,7 @@
           <a:p>
             <a:fld id="{699DC775-C286-4358-8C92-D7E584E969B3}" type="datetimeFigureOut">
               <a:rPr lang="en-US" smtClean="0"/>
-              <a:t>7/5/2017</a:t>
+              <a:t>2/5/2018</a:t>
             </a:fld>
             <a:endParaRPr lang="en-US"/>
           </a:p>
@@ -6705,7 +6883,7 @@
           <a:p>
             <a:fld id="{699DC775-C286-4358-8C92-D7E584E969B3}" type="datetimeFigureOut">
               <a:rPr lang="en-US" smtClean="0"/>
-              <a:t>7/5/2017</a:t>
+              <a:t>2/5/2018</a:t>
             </a:fld>
             <a:endParaRPr lang="en-US"/>
           </a:p>
@@ -6893,7 +7071,7 @@
           <a:p>
             <a:fld id="{699DC775-C286-4358-8C92-D7E584E969B3}" type="datetimeFigureOut">
               <a:rPr lang="en-US" smtClean="0"/>
-              <a:t>7/5/2017</a:t>
+              <a:t>2/5/2018</a:t>
             </a:fld>
             <a:endParaRPr lang="en-US"/>
           </a:p>
@@ -7181,7 +7359,7 @@
           <a:p>
             <a:fld id="{699DC775-C286-4358-8C92-D7E584E969B3}" type="datetimeFigureOut">
               <a:rPr lang="en-US" smtClean="0"/>
-              <a:t>7/5/2017</a:t>
+              <a:t>2/5/2018</a:t>
             </a:fld>
             <a:endParaRPr lang="en-US"/>
           </a:p>
@@ -7603,7 +7781,7 @@
           <a:p>
             <a:fld id="{699DC775-C286-4358-8C92-D7E584E969B3}" type="datetimeFigureOut">
               <a:rPr lang="en-US" smtClean="0"/>
-              <a:t>7/5/2017</a:t>
+              <a:t>2/5/2018</a:t>
             </a:fld>
             <a:endParaRPr lang="en-US"/>
           </a:p>
@@ -7721,7 +7899,7 @@
           <a:p>
             <a:fld id="{699DC775-C286-4358-8C92-D7E584E969B3}" type="datetimeFigureOut">
               <a:rPr lang="en-US" smtClean="0"/>
-              <a:t>7/5/2017</a:t>
+              <a:t>2/5/2018</a:t>
             </a:fld>
             <a:endParaRPr lang="en-US"/>
           </a:p>
@@ -7816,7 +7994,7 @@
           <a:p>
             <a:fld id="{699DC775-C286-4358-8C92-D7E584E969B3}" type="datetimeFigureOut">
               <a:rPr lang="en-US" smtClean="0"/>
-              <a:t>7/5/2017</a:t>
+              <a:t>2/5/2018</a:t>
             </a:fld>
             <a:endParaRPr lang="en-US"/>
           </a:p>
@@ -8093,7 +8271,7 @@
           <a:p>
             <a:fld id="{699DC775-C286-4358-8C92-D7E584E969B3}" type="datetimeFigureOut">
               <a:rPr lang="en-US" smtClean="0"/>
-              <a:t>7/5/2017</a:t>
+              <a:t>2/5/2018</a:t>
             </a:fld>
             <a:endParaRPr lang="en-US"/>
           </a:p>
@@ -8346,7 +8524,7 @@
           <a:p>
             <a:fld id="{699DC775-C286-4358-8C92-D7E584E969B3}" type="datetimeFigureOut">
               <a:rPr lang="en-US" smtClean="0"/>
-              <a:t>7/5/2017</a:t>
+              <a:t>2/5/2018</a:t>
             </a:fld>
             <a:endParaRPr lang="en-US"/>
           </a:p>
@@ -8559,7 +8737,7 @@
           <a:p>
             <a:fld id="{699DC775-C286-4358-8C92-D7E584E969B3}" type="datetimeFigureOut">
               <a:rPr lang="en-US" smtClean="0"/>
-              <a:t>7/5/2017</a:t>
+              <a:t>2/5/2018</a:t>
             </a:fld>
             <a:endParaRPr lang="en-US"/>
           </a:p>
@@ -9074,7 +9252,7 @@
           <a:p>
             <a:fld id="{699DC775-C286-4358-8C92-D7E584E969B3}" type="datetimeFigureOut">
               <a:rPr lang="en-US" smtClean="0"/>
-              <a:t>7/5/2017</a:t>
+              <a:t>2/5/2018</a:t>
             </a:fld>
             <a:endParaRPr lang="en-US"/>
           </a:p>
@@ -9587,7 +9765,7 @@
           <a:p>
             <a:fld id="{699DC775-C286-4358-8C92-D7E584E969B3}" type="datetimeFigureOut">
               <a:rPr lang="en-US" smtClean="0"/>
-              <a:t>7/5/2017</a:t>
+              <a:t>2/5/2018</a:t>
             </a:fld>
             <a:endParaRPr lang="en-US"/>
           </a:p>
@@ -10224,7 +10402,7 @@
         <p:spPr>
           <a:xfrm>
             <a:off x="381000" y="2057400"/>
-            <a:ext cx="8229600" cy="1384995"/>
+            <a:ext cx="8229600" cy="3539430"/>
           </a:xfrm>
           <a:prstGeom prst="rect">
             <a:avLst/>
@@ -10264,6 +10442,72 @@
                 </a:solidFill>
               </a:rPr>
               <a:t>Compare slide 4 and expected slide 5</a:t>
+            </a:r>
+          </a:p>
+          <a:p>
+            <a:endParaRPr lang="en-US" altLang="zh-CN" sz="2800" dirty="0">
+              <a:solidFill>
+                <a:schemeClr val="bg1"/>
+              </a:solidFill>
+            </a:endParaRPr>
+          </a:p>
+          <a:p>
+            <a:r>
+              <a:rPr lang="en-US" altLang="zh-CN" sz="2800" dirty="0" smtClean="0">
+                <a:solidFill>
+                  <a:schemeClr val="bg1"/>
+                </a:solidFill>
+              </a:rPr>
+              <a:t>Repeat for testing </a:t>
+            </a:r>
+            <a:r>
+              <a:rPr lang="en-US" altLang="zh-CN" sz="2800" dirty="0">
+                <a:solidFill>
+                  <a:schemeClr val="bg1"/>
+                </a:solidFill>
+              </a:rPr>
+              <a:t>A</a:t>
+            </a:r>
+            <a:r>
+              <a:rPr lang="en-US" altLang="zh-CN" sz="2800" dirty="0" smtClean="0">
+                <a:solidFill>
+                  <a:schemeClr val="bg1"/>
+                </a:solidFill>
+              </a:rPr>
+              <a:t>dd </a:t>
+            </a:r>
+            <a:r>
+              <a:rPr lang="en-US" altLang="zh-CN" sz="2800" dirty="0">
+                <a:solidFill>
+                  <a:schemeClr val="bg1"/>
+                </a:solidFill>
+              </a:rPr>
+              <a:t>S</a:t>
+            </a:r>
+            <a:r>
+              <a:rPr lang="en-US" altLang="zh-CN" sz="2800" dirty="0" smtClean="0">
+                <a:solidFill>
+                  <a:schemeClr val="bg1"/>
+                </a:solidFill>
+              </a:rPr>
+              <a:t>hapes button on Shapes Lab pane from slides 6 to 8</a:t>
+            </a:r>
+          </a:p>
+          <a:p>
+            <a:endParaRPr lang="en-US" altLang="zh-CN" sz="2800" dirty="0">
+              <a:solidFill>
+                <a:schemeClr val="bg1"/>
+              </a:solidFill>
+            </a:endParaRPr>
+          </a:p>
+          <a:p>
+            <a:r>
+              <a:rPr lang="en-US" altLang="zh-CN" sz="2800" dirty="0" smtClean="0">
+                <a:solidFill>
+                  <a:schemeClr val="bg1"/>
+                </a:solidFill>
+              </a:rPr>
+              <a:t>Animations are also expected to be transferred</a:t>
             </a:r>
             <a:endParaRPr lang="zh-CN" altLang="en-US" sz="2800" dirty="0">
               <a:solidFill>
@@ -11375,6 +11619,1079 @@
 </file>
 
 <file path=ppt/slides/slide6.xml><?xml version="1.0" encoding="utf-8"?>
+<p:sld xmlns:a="http://schemas.openxmlformats.org/drawingml/2006/main" xmlns:r="http://schemas.openxmlformats.org/officeDocument/2006/relationships" xmlns:p="http://schemas.openxmlformats.org/presentationml/2006/main">
+  <p:cSld>
+    <p:bg>
+      <p:bgPr>
+        <a:solidFill>
+          <a:schemeClr val="bg1"/>
+        </a:solidFill>
+        <a:effectLst/>
+      </p:bgPr>
+    </p:bg>
+    <p:spTree>
+      <p:nvGrpSpPr>
+        <p:cNvPr id="1" name=""/>
+        <p:cNvGrpSpPr/>
+        <p:nvPr/>
+      </p:nvGrpSpPr>
+      <p:grpSpPr>
+        <a:xfrm>
+          <a:off x="0" y="0"/>
+          <a:ext cx="0" cy="0"/>
+          <a:chOff x="0" y="0"/>
+          <a:chExt cx="0" cy="0"/>
+        </a:xfrm>
+      </p:grpSpPr>
+      <p:sp>
+        <p:nvSpPr>
+          <p:cNvPr id="3" name="selectMeNow1"/>
+          <p:cNvSpPr/>
+          <p:nvPr/>
+        </p:nvSpPr>
+        <p:spPr>
+          <a:xfrm rot="1965194">
+            <a:off x="1533377" y="1406276"/>
+            <a:ext cx="3200400" cy="3792071"/>
+          </a:xfrm>
+          <a:prstGeom prst="roundRect">
+            <a:avLst/>
+          </a:prstGeom>
+          <a:solidFill>
+            <a:schemeClr val="accent2">
+              <a:lumMod val="40000"/>
+              <a:lumOff val="60000"/>
+            </a:schemeClr>
+          </a:solidFill>
+          <a:ln w="203200">
+            <a:solidFill>
+              <a:srgbClr val="92D050"/>
+            </a:solidFill>
+          </a:ln>
+          <a:effectLst>
+            <a:innerShdw blurRad="63500" dist="50800" dir="8100000">
+              <a:prstClr val="black">
+                <a:alpha val="50000"/>
+              </a:prstClr>
+            </a:innerShdw>
+          </a:effectLst>
+        </p:spPr>
+        <p:style>
+          <a:lnRef idx="2">
+            <a:schemeClr val="accent1">
+              <a:shade val="50000"/>
+            </a:schemeClr>
+          </a:lnRef>
+          <a:fillRef idx="1">
+            <a:schemeClr val="accent1"/>
+          </a:fillRef>
+          <a:effectRef idx="0">
+            <a:schemeClr val="accent1"/>
+          </a:effectRef>
+          <a:fontRef idx="minor">
+            <a:schemeClr val="lt1"/>
+          </a:fontRef>
+        </p:style>
+        <p:txBody>
+          <a:bodyPr rtlCol="0" anchor="ctr"/>
+          <a:lstStyle/>
+          <a:p>
+            <a:pPr algn="ctr"/>
+            <a:r>
+              <a:rPr lang="en-US" altLang="zh-CN" sz="6600" dirty="0" smtClean="0">
+                <a:solidFill>
+                  <a:srgbClr val="EB7561"/>
+                </a:solidFill>
+                <a:latin typeface="Times New Roman" panose="02020603050405020304" pitchFamily="18" charset="0"/>
+                <a:cs typeface="Times New Roman" panose="02020603050405020304" pitchFamily="18" charset="0"/>
+              </a:rPr>
+              <a:t>TEXT</a:t>
+            </a:r>
+            <a:endParaRPr lang="zh-CN" altLang="en-US" sz="6600" dirty="0">
+              <a:solidFill>
+                <a:srgbClr val="EB7561"/>
+              </a:solidFill>
+              <a:latin typeface="Times New Roman" panose="02020603050405020304" pitchFamily="18" charset="0"/>
+              <a:cs typeface="Times New Roman" panose="02020603050405020304" pitchFamily="18" charset="0"/>
+            </a:endParaRPr>
+          </a:p>
+        </p:txBody>
+      </p:sp>
+      <p:sp>
+        <p:nvSpPr>
+          <p:cNvPr id="5" name="selectMeNow2"/>
+          <p:cNvSpPr/>
+          <p:nvPr/>
+        </p:nvSpPr>
+        <p:spPr>
+          <a:xfrm>
+            <a:off x="5867400" y="1143000"/>
+            <a:ext cx="1828800" cy="1371600"/>
+          </a:xfrm>
+          <a:prstGeom prst="roundRect">
+            <a:avLst/>
+          </a:prstGeom>
+          <a:ln/>
+        </p:spPr>
+        <p:style>
+          <a:lnRef idx="3">
+            <a:schemeClr val="lt1"/>
+          </a:lnRef>
+          <a:fillRef idx="1">
+            <a:schemeClr val="accent6"/>
+          </a:fillRef>
+          <a:effectRef idx="1">
+            <a:schemeClr val="accent6"/>
+          </a:effectRef>
+          <a:fontRef idx="minor">
+            <a:schemeClr val="lt1"/>
+          </a:fontRef>
+        </p:style>
+        <p:txBody>
+          <a:bodyPr rtlCol="0" anchor="ctr"/>
+          <a:lstStyle/>
+          <a:p>
+            <a:pPr algn="ctr"/>
+            <a:endParaRPr lang="zh-CN" altLang="en-US"/>
+          </a:p>
+        </p:txBody>
+      </p:sp>
+      <p:sp>
+        <p:nvSpPr>
+          <p:cNvPr id="7" name="selectMeNow3"/>
+          <p:cNvSpPr/>
+          <p:nvPr/>
+        </p:nvSpPr>
+        <p:spPr>
+          <a:xfrm>
+            <a:off x="5867400" y="2667000"/>
+            <a:ext cx="1828800" cy="1371600"/>
+          </a:xfrm>
+          <a:prstGeom prst="roundRect">
+            <a:avLst/>
+          </a:prstGeom>
+          <a:ln/>
+        </p:spPr>
+        <p:style>
+          <a:lnRef idx="3">
+            <a:schemeClr val="lt1"/>
+          </a:lnRef>
+          <a:fillRef idx="1">
+            <a:schemeClr val="accent3"/>
+          </a:fillRef>
+          <a:effectRef idx="1">
+            <a:schemeClr val="accent3"/>
+          </a:effectRef>
+          <a:fontRef idx="minor">
+            <a:schemeClr val="lt1"/>
+          </a:fontRef>
+        </p:style>
+        <p:txBody>
+          <a:bodyPr rtlCol="0" anchor="ctr"/>
+          <a:lstStyle/>
+          <a:p>
+            <a:pPr algn="ctr"/>
+            <a:endParaRPr lang="zh-CN" altLang="en-US"/>
+          </a:p>
+        </p:txBody>
+      </p:sp>
+      <p:sp>
+        <p:nvSpPr>
+          <p:cNvPr id="8" name="selectMeNow4"/>
+          <p:cNvSpPr/>
+          <p:nvPr/>
+        </p:nvSpPr>
+        <p:spPr>
+          <a:xfrm>
+            <a:off x="5867400" y="4191000"/>
+            <a:ext cx="1828800" cy="1371600"/>
+          </a:xfrm>
+          <a:prstGeom prst="roundRect">
+            <a:avLst/>
+          </a:prstGeom>
+          <a:solidFill>
+            <a:schemeClr val="accent6">
+              <a:alpha val="50000"/>
+            </a:schemeClr>
+          </a:solidFill>
+          <a:ln>
+            <a:noFill/>
+          </a:ln>
+        </p:spPr>
+        <p:style>
+          <a:lnRef idx="0">
+            <a:scrgbClr r="0" g="0" b="0"/>
+          </a:lnRef>
+          <a:fillRef idx="0">
+            <a:scrgbClr r="0" g="0" b="0"/>
+          </a:fillRef>
+          <a:effectRef idx="0">
+            <a:scrgbClr r="0" g="0" b="0"/>
+          </a:effectRef>
+          <a:fontRef idx="minor">
+            <a:schemeClr val="lt1"/>
+          </a:fontRef>
+        </p:style>
+        <p:txBody>
+          <a:bodyPr rtlCol="0" anchor="ctr"/>
+          <a:lstStyle/>
+          <a:p>
+            <a:pPr algn="ctr"/>
+            <a:endParaRPr lang="zh-CN" altLang="en-US"/>
+          </a:p>
+        </p:txBody>
+      </p:sp>
+    </p:spTree>
+    <p:extLst>
+      <p:ext uri="{BB962C8B-B14F-4D97-AF65-F5344CB8AC3E}">
+        <p14:creationId xmlns:p14="http://schemas.microsoft.com/office/powerpoint/2010/main" val="1521678528"/>
+      </p:ext>
+    </p:extLst>
+  </p:cSld>
+  <p:clrMapOvr>
+    <a:masterClrMapping/>
+  </p:clrMapOvr>
+  <p:timing>
+    <p:tnLst>
+      <p:par>
+        <p:cTn id="1" dur="indefinite" restart="never" nodeType="tmRoot">
+          <p:childTnLst>
+            <p:seq concurrent="1" nextAc="seek">
+              <p:cTn id="2" dur="indefinite" nodeType="mainSeq">
+                <p:childTnLst>
+                  <p:par>
+                    <p:cTn id="3" fill="hold">
+                      <p:stCondLst>
+                        <p:cond delay="indefinite"/>
+                      </p:stCondLst>
+                      <p:childTnLst>
+                        <p:par>
+                          <p:cTn id="4" fill="hold">
+                            <p:stCondLst>
+                              <p:cond delay="0"/>
+                            </p:stCondLst>
+                            <p:childTnLst>
+                              <p:par>
+                                <p:cTn id="5" presetID="2" presetClass="entr" presetSubtype="4" fill="hold" grpId="0" nodeType="clickEffect">
+                                  <p:stCondLst>
+                                    <p:cond delay="0"/>
+                                  </p:stCondLst>
+                                  <p:childTnLst>
+                                    <p:set>
+                                      <p:cBhvr>
+                                        <p:cTn id="6" dur="1" fill="hold">
+                                          <p:stCondLst>
+                                            <p:cond delay="0"/>
+                                          </p:stCondLst>
+                                        </p:cTn>
+                                        <p:tgtEl>
+                                          <p:spTgt spid="3"/>
+                                        </p:tgtEl>
+                                        <p:attrNameLst>
+                                          <p:attrName>style.visibility</p:attrName>
+                                        </p:attrNameLst>
+                                      </p:cBhvr>
+                                      <p:to>
+                                        <p:strVal val="visible"/>
+                                      </p:to>
+                                    </p:set>
+                                    <p:anim calcmode="lin" valueType="num">
+                                      <p:cBhvr additive="base">
+                                        <p:cTn id="7" dur="500" fill="hold"/>
+                                        <p:tgtEl>
+                                          <p:spTgt spid="3"/>
+                                        </p:tgtEl>
+                                        <p:attrNameLst>
+                                          <p:attrName>ppt_x</p:attrName>
+                                        </p:attrNameLst>
+                                      </p:cBhvr>
+                                      <p:tavLst>
+                                        <p:tav tm="0">
+                                          <p:val>
+                                            <p:strVal val="#ppt_x"/>
+                                          </p:val>
+                                        </p:tav>
+                                        <p:tav tm="100000">
+                                          <p:val>
+                                            <p:strVal val="#ppt_x"/>
+                                          </p:val>
+                                        </p:tav>
+                                      </p:tavLst>
+                                    </p:anim>
+                                    <p:anim calcmode="lin" valueType="num">
+                                      <p:cBhvr additive="base">
+                                        <p:cTn id="8" dur="500" fill="hold"/>
+                                        <p:tgtEl>
+                                          <p:spTgt spid="3"/>
+                                        </p:tgtEl>
+                                        <p:attrNameLst>
+                                          <p:attrName>ppt_y</p:attrName>
+                                        </p:attrNameLst>
+                                      </p:cBhvr>
+                                      <p:tavLst>
+                                        <p:tav tm="0">
+                                          <p:val>
+                                            <p:strVal val="1+#ppt_h/2"/>
+                                          </p:val>
+                                        </p:tav>
+                                        <p:tav tm="100000">
+                                          <p:val>
+                                            <p:strVal val="#ppt_y"/>
+                                          </p:val>
+                                        </p:tav>
+                                      </p:tavLst>
+                                    </p:anim>
+                                  </p:childTnLst>
+                                </p:cTn>
+                              </p:par>
+                            </p:childTnLst>
+                          </p:cTn>
+                        </p:par>
+                      </p:childTnLst>
+                    </p:cTn>
+                  </p:par>
+                  <p:par>
+                    <p:cTn id="9" fill="hold">
+                      <p:stCondLst>
+                        <p:cond delay="indefinite"/>
+                      </p:stCondLst>
+                      <p:childTnLst>
+                        <p:par>
+                          <p:cTn id="10" fill="hold">
+                            <p:stCondLst>
+                              <p:cond delay="0"/>
+                            </p:stCondLst>
+                            <p:childTnLst>
+                              <p:par>
+                                <p:cTn id="11" presetID="1" presetClass="entr" presetSubtype="0" fill="hold" grpId="0" nodeType="clickEffect">
+                                  <p:stCondLst>
+                                    <p:cond delay="0"/>
+                                  </p:stCondLst>
+                                  <p:childTnLst>
+                                    <p:set>
+                                      <p:cBhvr>
+                                        <p:cTn id="12" dur="1" fill="hold">
+                                          <p:stCondLst>
+                                            <p:cond delay="0"/>
+                                          </p:stCondLst>
+                                        </p:cTn>
+                                        <p:tgtEl>
+                                          <p:spTgt spid="5"/>
+                                        </p:tgtEl>
+                                        <p:attrNameLst>
+                                          <p:attrName>style.visibility</p:attrName>
+                                        </p:attrNameLst>
+                                      </p:cBhvr>
+                                      <p:to>
+                                        <p:strVal val="visible"/>
+                                      </p:to>
+                                    </p:set>
+                                  </p:childTnLst>
+                                </p:cTn>
+                              </p:par>
+                            </p:childTnLst>
+                          </p:cTn>
+                        </p:par>
+                      </p:childTnLst>
+                    </p:cTn>
+                  </p:par>
+                  <p:par>
+                    <p:cTn id="13" fill="hold">
+                      <p:stCondLst>
+                        <p:cond delay="indefinite"/>
+                      </p:stCondLst>
+                      <p:childTnLst>
+                        <p:par>
+                          <p:cTn id="14" fill="hold">
+                            <p:stCondLst>
+                              <p:cond delay="0"/>
+                            </p:stCondLst>
+                            <p:childTnLst>
+                              <p:par>
+                                <p:cTn id="15" presetID="10" presetClass="entr" presetSubtype="0" fill="hold" grpId="0" nodeType="clickEffect">
+                                  <p:stCondLst>
+                                    <p:cond delay="0"/>
+                                  </p:stCondLst>
+                                  <p:childTnLst>
+                                    <p:set>
+                                      <p:cBhvr>
+                                        <p:cTn id="16" dur="1" fill="hold">
+                                          <p:stCondLst>
+                                            <p:cond delay="0"/>
+                                          </p:stCondLst>
+                                        </p:cTn>
+                                        <p:tgtEl>
+                                          <p:spTgt spid="7"/>
+                                        </p:tgtEl>
+                                        <p:attrNameLst>
+                                          <p:attrName>style.visibility</p:attrName>
+                                        </p:attrNameLst>
+                                      </p:cBhvr>
+                                      <p:to>
+                                        <p:strVal val="visible"/>
+                                      </p:to>
+                                    </p:set>
+                                    <p:animEffect transition="in" filter="fade">
+                                      <p:cBhvr>
+                                        <p:cTn id="17" dur="500"/>
+                                        <p:tgtEl>
+                                          <p:spTgt spid="7"/>
+                                        </p:tgtEl>
+                                      </p:cBhvr>
+                                    </p:animEffect>
+                                  </p:childTnLst>
+                                </p:cTn>
+                              </p:par>
+                            </p:childTnLst>
+                          </p:cTn>
+                        </p:par>
+                      </p:childTnLst>
+                    </p:cTn>
+                  </p:par>
+                  <p:par>
+                    <p:cTn id="18" fill="hold">
+                      <p:stCondLst>
+                        <p:cond delay="indefinite"/>
+                      </p:stCondLst>
+                      <p:childTnLst>
+                        <p:par>
+                          <p:cTn id="19" fill="hold">
+                            <p:stCondLst>
+                              <p:cond delay="0"/>
+                            </p:stCondLst>
+                            <p:childTnLst>
+                              <p:par>
+                                <p:cTn id="20" presetID="16" presetClass="entr" presetSubtype="21" fill="hold" grpId="0" nodeType="clickEffect">
+                                  <p:stCondLst>
+                                    <p:cond delay="0"/>
+                                  </p:stCondLst>
+                                  <p:childTnLst>
+                                    <p:set>
+                                      <p:cBhvr>
+                                        <p:cTn id="21" dur="1" fill="hold">
+                                          <p:stCondLst>
+                                            <p:cond delay="0"/>
+                                          </p:stCondLst>
+                                        </p:cTn>
+                                        <p:tgtEl>
+                                          <p:spTgt spid="8"/>
+                                        </p:tgtEl>
+                                        <p:attrNameLst>
+                                          <p:attrName>style.visibility</p:attrName>
+                                        </p:attrNameLst>
+                                      </p:cBhvr>
+                                      <p:to>
+                                        <p:strVal val="visible"/>
+                                      </p:to>
+                                    </p:set>
+                                    <p:animEffect transition="in" filter="barn(inVertical)">
+                                      <p:cBhvr>
+                                        <p:cTn id="22" dur="500"/>
+                                        <p:tgtEl>
+                                          <p:spTgt spid="8"/>
+                                        </p:tgtEl>
+                                      </p:cBhvr>
+                                    </p:animEffect>
+                                  </p:childTnLst>
+                                </p:cTn>
+                              </p:par>
+                            </p:childTnLst>
+                          </p:cTn>
+                        </p:par>
+                      </p:childTnLst>
+                    </p:cTn>
+                  </p:par>
+                </p:childTnLst>
+              </p:cTn>
+              <p:prevCondLst>
+                <p:cond evt="onPrev" delay="0">
+                  <p:tgtEl>
+                    <p:sldTgt/>
+                  </p:tgtEl>
+                </p:cond>
+              </p:prevCondLst>
+              <p:nextCondLst>
+                <p:cond evt="onNext" delay="0">
+                  <p:tgtEl>
+                    <p:sldTgt/>
+                  </p:tgtEl>
+                </p:cond>
+              </p:nextCondLst>
+            </p:seq>
+          </p:childTnLst>
+        </p:cTn>
+      </p:par>
+    </p:tnLst>
+    <p:bldLst>
+      <p:bldP spid="3" grpId="0" animBg="1"/>
+      <p:bldP spid="5" grpId="0" animBg="1"/>
+      <p:bldP spid="7" grpId="0" animBg="1"/>
+      <p:bldP spid="8" grpId="0" animBg="1"/>
+    </p:bldLst>
+  </p:timing>
+</p:sld>
+</file>
+
+<file path=ppt/slides/slide7.xml><?xml version="1.0" encoding="utf-8"?>
+<p:sld xmlns:a="http://schemas.openxmlformats.org/drawingml/2006/main" xmlns:r="http://schemas.openxmlformats.org/officeDocument/2006/relationships" xmlns:p="http://schemas.openxmlformats.org/presentationml/2006/main">
+  <p:cSld>
+    <p:bg>
+      <p:bgPr>
+        <a:solidFill>
+          <a:schemeClr val="bg1"/>
+        </a:solidFill>
+        <a:effectLst/>
+      </p:bgPr>
+    </p:bg>
+    <p:spTree>
+      <p:nvGrpSpPr>
+        <p:cNvPr id="1" name=""/>
+        <p:cNvGrpSpPr/>
+        <p:nvPr/>
+      </p:nvGrpSpPr>
+      <p:grpSpPr>
+        <a:xfrm>
+          <a:off x="0" y="0"/>
+          <a:ext cx="0" cy="0"/>
+          <a:chOff x="0" y="0"/>
+          <a:chExt cx="0" cy="0"/>
+        </a:xfrm>
+      </p:grpSpPr>
+    </p:spTree>
+    <p:extLst>
+      <p:ext uri="{BB962C8B-B14F-4D97-AF65-F5344CB8AC3E}">
+        <p14:creationId xmlns:p14="http://schemas.microsoft.com/office/powerpoint/2010/main" val="2884022466"/>
+      </p:ext>
+    </p:extLst>
+  </p:cSld>
+  <p:clrMapOvr>
+    <a:masterClrMapping/>
+  </p:clrMapOvr>
+  <p:timing>
+    <p:tnLst>
+      <p:par>
+        <p:cTn id="1" dur="indefinite" restart="never" nodeType="tmRoot"/>
+      </p:par>
+    </p:tnLst>
+  </p:timing>
+</p:sld>
+</file>
+
+<file path=ppt/slides/slide8.xml><?xml version="1.0" encoding="utf-8"?>
+<p:sld xmlns:a="http://schemas.openxmlformats.org/drawingml/2006/main" xmlns:r="http://schemas.openxmlformats.org/officeDocument/2006/relationships" xmlns:p="http://schemas.openxmlformats.org/presentationml/2006/main">
+  <p:cSld>
+    <p:bg>
+      <p:bgPr>
+        <a:solidFill>
+          <a:schemeClr val="bg1"/>
+        </a:solidFill>
+        <a:effectLst/>
+      </p:bgPr>
+    </p:bg>
+    <p:spTree>
+      <p:nvGrpSpPr>
+        <p:cNvPr id="1" name=""/>
+        <p:cNvGrpSpPr/>
+        <p:nvPr/>
+      </p:nvGrpSpPr>
+      <p:grpSpPr>
+        <a:xfrm>
+          <a:off x="0" y="0"/>
+          <a:ext cx="0" cy="0"/>
+          <a:chOff x="0" y="0"/>
+          <a:chExt cx="0" cy="0"/>
+        </a:xfrm>
+      </p:grpSpPr>
+      <p:sp>
+        <p:nvSpPr>
+          <p:cNvPr id="6" name="Group selectMeNow1 Seq_1"/>
+          <p:cNvSpPr/>
+          <p:nvPr/>
+        </p:nvSpPr>
+        <p:spPr>
+          <a:xfrm rot="1965194">
+            <a:off x="1533377" y="1406276"/>
+            <a:ext cx="3200400" cy="3792071"/>
+          </a:xfrm>
+          <a:prstGeom prst="roundRect">
+            <a:avLst/>
+          </a:prstGeom>
+          <a:solidFill>
+            <a:schemeClr val="accent2">
+              <a:lumMod val="40000"/>
+              <a:lumOff val="60000"/>
+            </a:schemeClr>
+          </a:solidFill>
+          <a:ln w="203200">
+            <a:solidFill>
+              <a:srgbClr val="92D050"/>
+            </a:solidFill>
+          </a:ln>
+          <a:effectLst>
+            <a:innerShdw blurRad="63500" dist="50800" dir="8100000">
+              <a:prstClr val="black">
+                <a:alpha val="50000"/>
+              </a:prstClr>
+            </a:innerShdw>
+          </a:effectLst>
+        </p:spPr>
+        <p:style>
+          <a:lnRef idx="2">
+            <a:schemeClr val="accent1">
+              <a:shade val="50000"/>
+            </a:schemeClr>
+          </a:lnRef>
+          <a:fillRef idx="1">
+            <a:schemeClr val="accent1"/>
+          </a:fillRef>
+          <a:effectRef idx="0">
+            <a:schemeClr val="accent1"/>
+          </a:effectRef>
+          <a:fontRef idx="minor">
+            <a:schemeClr val="lt1"/>
+          </a:fontRef>
+        </p:style>
+        <p:txBody>
+          <a:bodyPr rtlCol="0" anchor="ctr"/>
+          <a:lstStyle/>
+          <a:p>
+            <a:pPr algn="ctr"/>
+            <a:r>
+              <a:rPr lang="en-US" altLang="zh-CN" sz="6600" dirty="0" smtClean="0">
+                <a:solidFill>
+                  <a:srgbClr val="EB7561"/>
+                </a:solidFill>
+                <a:latin typeface="Times New Roman" panose="02020603050405020304" pitchFamily="18" charset="0"/>
+                <a:cs typeface="Times New Roman" panose="02020603050405020304" pitchFamily="18" charset="0"/>
+              </a:rPr>
+              <a:t>TEXT</a:t>
+            </a:r>
+            <a:endParaRPr lang="zh-CN" altLang="en-US" sz="6600" dirty="0">
+              <a:solidFill>
+                <a:srgbClr val="EB7561"/>
+              </a:solidFill>
+              <a:latin typeface="Times New Roman" panose="02020603050405020304" pitchFamily="18" charset="0"/>
+              <a:cs typeface="Times New Roman" panose="02020603050405020304" pitchFamily="18" charset="0"/>
+            </a:endParaRPr>
+          </a:p>
+        </p:txBody>
+      </p:sp>
+      <p:sp>
+        <p:nvSpPr>
+          <p:cNvPr id="9" name="Group selectMeNow1 Seq_2"/>
+          <p:cNvSpPr/>
+          <p:nvPr/>
+        </p:nvSpPr>
+        <p:spPr>
+          <a:xfrm>
+            <a:off x="5867400" y="1143000"/>
+            <a:ext cx="1828800" cy="1371600"/>
+          </a:xfrm>
+          <a:prstGeom prst="roundRect">
+            <a:avLst/>
+          </a:prstGeom>
+          <a:ln/>
+        </p:spPr>
+        <p:style>
+          <a:lnRef idx="3">
+            <a:schemeClr val="lt1"/>
+          </a:lnRef>
+          <a:fillRef idx="1">
+            <a:schemeClr val="accent6"/>
+          </a:fillRef>
+          <a:effectRef idx="1">
+            <a:schemeClr val="accent6"/>
+          </a:effectRef>
+          <a:fontRef idx="minor">
+            <a:schemeClr val="lt1"/>
+          </a:fontRef>
+        </p:style>
+        <p:txBody>
+          <a:bodyPr rtlCol="0" anchor="ctr"/>
+          <a:lstStyle/>
+          <a:p>
+            <a:pPr algn="ctr"/>
+            <a:endParaRPr lang="zh-CN" altLang="en-US"/>
+          </a:p>
+        </p:txBody>
+      </p:sp>
+      <p:sp>
+        <p:nvSpPr>
+          <p:cNvPr id="10" name="Group selectMeNow1 Seq_3"/>
+          <p:cNvSpPr/>
+          <p:nvPr/>
+        </p:nvSpPr>
+        <p:spPr>
+          <a:xfrm>
+            <a:off x="5867400" y="2667000"/>
+            <a:ext cx="1828800" cy="1371600"/>
+          </a:xfrm>
+          <a:prstGeom prst="roundRect">
+            <a:avLst/>
+          </a:prstGeom>
+          <a:ln/>
+        </p:spPr>
+        <p:style>
+          <a:lnRef idx="3">
+            <a:schemeClr val="lt1"/>
+          </a:lnRef>
+          <a:fillRef idx="1">
+            <a:schemeClr val="accent3"/>
+          </a:fillRef>
+          <a:effectRef idx="1">
+            <a:schemeClr val="accent3"/>
+          </a:effectRef>
+          <a:fontRef idx="minor">
+            <a:schemeClr val="lt1"/>
+          </a:fontRef>
+        </p:style>
+        <p:txBody>
+          <a:bodyPr rtlCol="0" anchor="ctr"/>
+          <a:lstStyle/>
+          <a:p>
+            <a:pPr algn="ctr"/>
+            <a:endParaRPr lang="zh-CN" altLang="en-US"/>
+          </a:p>
+        </p:txBody>
+      </p:sp>
+      <p:sp>
+        <p:nvSpPr>
+          <p:cNvPr id="11" name="Group selectMeNow1 Seq_4"/>
+          <p:cNvSpPr/>
+          <p:nvPr/>
+        </p:nvSpPr>
+        <p:spPr>
+          <a:xfrm>
+            <a:off x="5867400" y="4191000"/>
+            <a:ext cx="1828800" cy="1371600"/>
+          </a:xfrm>
+          <a:prstGeom prst="roundRect">
+            <a:avLst/>
+          </a:prstGeom>
+          <a:solidFill>
+            <a:schemeClr val="accent6">
+              <a:alpha val="50000"/>
+            </a:schemeClr>
+          </a:solidFill>
+          <a:ln>
+            <a:noFill/>
+          </a:ln>
+        </p:spPr>
+        <p:style>
+          <a:lnRef idx="0">
+            <a:scrgbClr r="0" g="0" b="0"/>
+          </a:lnRef>
+          <a:fillRef idx="0">
+            <a:scrgbClr r="0" g="0" b="0"/>
+          </a:fillRef>
+          <a:effectRef idx="0">
+            <a:scrgbClr r="0" g="0" b="0"/>
+          </a:effectRef>
+          <a:fontRef idx="minor">
+            <a:schemeClr val="lt1"/>
+          </a:fontRef>
+        </p:style>
+        <p:txBody>
+          <a:bodyPr rtlCol="0" anchor="ctr"/>
+          <a:lstStyle/>
+          <a:p>
+            <a:pPr algn="ctr"/>
+            <a:endParaRPr lang="zh-CN" altLang="en-US"/>
+          </a:p>
+        </p:txBody>
+      </p:sp>
+    </p:spTree>
+    <p:extLst>
+      <p:ext uri="{BB962C8B-B14F-4D97-AF65-F5344CB8AC3E}">
+        <p14:creationId xmlns:p14="http://schemas.microsoft.com/office/powerpoint/2010/main" val="2959027696"/>
+      </p:ext>
+    </p:extLst>
+  </p:cSld>
+  <p:clrMapOvr>
+    <a:masterClrMapping/>
+  </p:clrMapOvr>
+  <p:timing>
+    <p:tnLst>
+      <p:par>
+        <p:cTn id="1" dur="indefinite" restart="never" nodeType="tmRoot">
+          <p:childTnLst>
+            <p:seq concurrent="1" nextAc="seek">
+              <p:cTn id="2" dur="indefinite" nodeType="mainSeq">
+                <p:childTnLst>
+                  <p:par>
+                    <p:cTn id="3" fill="hold">
+                      <p:stCondLst>
+                        <p:cond delay="indefinite"/>
+                      </p:stCondLst>
+                      <p:childTnLst>
+                        <p:par>
+                          <p:cTn id="4" fill="hold">
+                            <p:stCondLst>
+                              <p:cond delay="0"/>
+                            </p:stCondLst>
+                            <p:childTnLst>
+                              <p:par>
+                                <p:cTn id="5" presetID="2" presetClass="entr" presetSubtype="4" fill="hold" grpId="0" nodeType="clickEffect">
+                                  <p:stCondLst>
+                                    <p:cond delay="0"/>
+                                  </p:stCondLst>
+                                  <p:childTnLst>
+                                    <p:set>
+                                      <p:cBhvr>
+                                        <p:cTn id="6" dur="1" fill="hold">
+                                          <p:stCondLst>
+                                            <p:cond delay="0"/>
+                                          </p:stCondLst>
+                                        </p:cTn>
+                                        <p:tgtEl>
+                                          <p:spTgt spid="6"/>
+                                        </p:tgtEl>
+                                        <p:attrNameLst>
+                                          <p:attrName>style.visibility</p:attrName>
+                                        </p:attrNameLst>
+                                      </p:cBhvr>
+                                      <p:to>
+                                        <p:strVal val="visible"/>
+                                      </p:to>
+                                    </p:set>
+                                    <p:anim calcmode="lin" valueType="num">
+                                      <p:cBhvr additive="base">
+                                        <p:cTn id="7" dur="500" fill="hold"/>
+                                        <p:tgtEl>
+                                          <p:spTgt spid="6"/>
+                                        </p:tgtEl>
+                                        <p:attrNameLst>
+                                          <p:attrName>ppt_x</p:attrName>
+                                        </p:attrNameLst>
+                                      </p:cBhvr>
+                                      <p:tavLst>
+                                        <p:tav tm="0">
+                                          <p:val>
+                                            <p:strVal val="#ppt_x"/>
+                                          </p:val>
+                                        </p:tav>
+                                        <p:tav tm="100000">
+                                          <p:val>
+                                            <p:strVal val="#ppt_x"/>
+                                          </p:val>
+                                        </p:tav>
+                                      </p:tavLst>
+                                    </p:anim>
+                                    <p:anim calcmode="lin" valueType="num">
+                                      <p:cBhvr additive="base">
+                                        <p:cTn id="8" dur="500" fill="hold"/>
+                                        <p:tgtEl>
+                                          <p:spTgt spid="6"/>
+                                        </p:tgtEl>
+                                        <p:attrNameLst>
+                                          <p:attrName>ppt_y</p:attrName>
+                                        </p:attrNameLst>
+                                      </p:cBhvr>
+                                      <p:tavLst>
+                                        <p:tav tm="0">
+                                          <p:val>
+                                            <p:strVal val="1+#ppt_h/2"/>
+                                          </p:val>
+                                        </p:tav>
+                                        <p:tav tm="100000">
+                                          <p:val>
+                                            <p:strVal val="#ppt_y"/>
+                                          </p:val>
+                                        </p:tav>
+                                      </p:tavLst>
+                                    </p:anim>
+                                  </p:childTnLst>
+                                </p:cTn>
+                              </p:par>
+                            </p:childTnLst>
+                          </p:cTn>
+                        </p:par>
+                      </p:childTnLst>
+                    </p:cTn>
+                  </p:par>
+                  <p:par>
+                    <p:cTn id="9" fill="hold">
+                      <p:stCondLst>
+                        <p:cond delay="indefinite"/>
+                      </p:stCondLst>
+                      <p:childTnLst>
+                        <p:par>
+                          <p:cTn id="10" fill="hold">
+                            <p:stCondLst>
+                              <p:cond delay="0"/>
+                            </p:stCondLst>
+                            <p:childTnLst>
+                              <p:par>
+                                <p:cTn id="11" presetID="1" presetClass="entr" presetSubtype="0" fill="hold" grpId="0" nodeType="clickEffect">
+                                  <p:stCondLst>
+                                    <p:cond delay="0"/>
+                                  </p:stCondLst>
+                                  <p:childTnLst>
+                                    <p:set>
+                                      <p:cBhvr>
+                                        <p:cTn id="12" dur="1" fill="hold">
+                                          <p:stCondLst>
+                                            <p:cond delay="0"/>
+                                          </p:stCondLst>
+                                        </p:cTn>
+                                        <p:tgtEl>
+                                          <p:spTgt spid="9"/>
+                                        </p:tgtEl>
+                                        <p:attrNameLst>
+                                          <p:attrName>style.visibility</p:attrName>
+                                        </p:attrNameLst>
+                                      </p:cBhvr>
+                                      <p:to>
+                                        <p:strVal val="visible"/>
+                                      </p:to>
+                                    </p:set>
+                                  </p:childTnLst>
+                                </p:cTn>
+                              </p:par>
+                            </p:childTnLst>
+                          </p:cTn>
+                        </p:par>
+                      </p:childTnLst>
+                    </p:cTn>
+                  </p:par>
+                  <p:par>
+                    <p:cTn id="13" fill="hold">
+                      <p:stCondLst>
+                        <p:cond delay="indefinite"/>
+                      </p:stCondLst>
+                      <p:childTnLst>
+                        <p:par>
+                          <p:cTn id="14" fill="hold">
+                            <p:stCondLst>
+                              <p:cond delay="0"/>
+                            </p:stCondLst>
+                            <p:childTnLst>
+                              <p:par>
+                                <p:cTn id="15" presetID="10" presetClass="entr" presetSubtype="0" fill="hold" grpId="0" nodeType="clickEffect">
+                                  <p:stCondLst>
+                                    <p:cond delay="0"/>
+                                  </p:stCondLst>
+                                  <p:childTnLst>
+                                    <p:set>
+                                      <p:cBhvr>
+                                        <p:cTn id="16" dur="1" fill="hold">
+                                          <p:stCondLst>
+                                            <p:cond delay="0"/>
+                                          </p:stCondLst>
+                                        </p:cTn>
+                                        <p:tgtEl>
+                                          <p:spTgt spid="10"/>
+                                        </p:tgtEl>
+                                        <p:attrNameLst>
+                                          <p:attrName>style.visibility</p:attrName>
+                                        </p:attrNameLst>
+                                      </p:cBhvr>
+                                      <p:to>
+                                        <p:strVal val="visible"/>
+                                      </p:to>
+                                    </p:set>
+                                    <p:animEffect transition="in" filter="fade">
+                                      <p:cBhvr>
+                                        <p:cTn id="17" dur="500"/>
+                                        <p:tgtEl>
+                                          <p:spTgt spid="10"/>
+                                        </p:tgtEl>
+                                      </p:cBhvr>
+                                    </p:animEffect>
+                                  </p:childTnLst>
+                                </p:cTn>
+                              </p:par>
+                            </p:childTnLst>
+                          </p:cTn>
+                        </p:par>
+                      </p:childTnLst>
+                    </p:cTn>
+                  </p:par>
+                  <p:par>
+                    <p:cTn id="18" fill="hold">
+                      <p:stCondLst>
+                        <p:cond delay="indefinite"/>
+                      </p:stCondLst>
+                      <p:childTnLst>
+                        <p:par>
+                          <p:cTn id="19" fill="hold">
+                            <p:stCondLst>
+                              <p:cond delay="0"/>
+                            </p:stCondLst>
+                            <p:childTnLst>
+                              <p:par>
+                                <p:cTn id="20" presetID="16" presetClass="entr" presetSubtype="21" fill="hold" grpId="0" nodeType="clickEffect">
+                                  <p:stCondLst>
+                                    <p:cond delay="0"/>
+                                  </p:stCondLst>
+                                  <p:childTnLst>
+                                    <p:set>
+                                      <p:cBhvr>
+                                        <p:cTn id="21" dur="1" fill="hold">
+                                          <p:stCondLst>
+                                            <p:cond delay="0"/>
+                                          </p:stCondLst>
+                                        </p:cTn>
+                                        <p:tgtEl>
+                                          <p:spTgt spid="11"/>
+                                        </p:tgtEl>
+                                        <p:attrNameLst>
+                                          <p:attrName>style.visibility</p:attrName>
+                                        </p:attrNameLst>
+                                      </p:cBhvr>
+                                      <p:to>
+                                        <p:strVal val="visible"/>
+                                      </p:to>
+                                    </p:set>
+                                    <p:animEffect transition="in" filter="barn(inVertical)">
+                                      <p:cBhvr>
+                                        <p:cTn id="22" dur="500"/>
+                                        <p:tgtEl>
+                                          <p:spTgt spid="11"/>
+                                        </p:tgtEl>
+                                      </p:cBhvr>
+                                    </p:animEffect>
+                                  </p:childTnLst>
+                                </p:cTn>
+                              </p:par>
+                            </p:childTnLst>
+                          </p:cTn>
+                        </p:par>
+                      </p:childTnLst>
+                    </p:cTn>
+                  </p:par>
+                </p:childTnLst>
+              </p:cTn>
+              <p:prevCondLst>
+                <p:cond evt="onPrev" delay="0">
+                  <p:tgtEl>
+                    <p:sldTgt/>
+                  </p:tgtEl>
+                </p:cond>
+              </p:prevCondLst>
+              <p:nextCondLst>
+                <p:cond evt="onNext" delay="0">
+                  <p:tgtEl>
+                    <p:sldTgt/>
+                  </p:tgtEl>
+                </p:cond>
+              </p:nextCondLst>
+            </p:seq>
+          </p:childTnLst>
+        </p:cTn>
+      </p:par>
+    </p:tnLst>
+    <p:bldLst>
+      <p:bldP spid="6" grpId="0" animBg="1"/>
+      <p:bldP spid="9" grpId="0" animBg="1"/>
+      <p:bldP spid="10" grpId="0" animBg="1"/>
+      <p:bldP spid="11" grpId="0" animBg="1"/>
+    </p:bldLst>
+  </p:timing>
+</p:sld>
+</file>
+
+<file path=ppt/slides/slide9.xml><?xml version="1.0" encoding="utf-8"?>
 <p:sld xmlns:a="http://schemas.openxmlformats.org/drawingml/2006/main" xmlns:r="http://schemas.openxmlformats.org/officeDocument/2006/relationships" xmlns:p="http://schemas.openxmlformats.org/presentationml/2006/main" show="0">
   <p:cSld name="PPAck201403240026082737">
     <p:spTree>

</xml_diff>

<commit_message>
#1498 Add a "Add" button for ShapesLab (#1566)
* Add "Add shape" button to ShapesLab pane

* Refactor code in AddShapeActionHandler to code in CustomShapePane

* Add functionality for ShapesLab Add shape button

* Refactor SyncLab to use ShapeUtil

* Change appearance of add shape button slightly

* Don't allow ShapesLab to work with placeholders because of the issue with ConvertToPicture
Some Refactoring

* Add test for clicking AddShapeButton

* Rename "AddCustomShapeToPane" to "AddShapeFromSelection" function

* Remove unnecessary comment at test

* Undo refactoring of syncpane

* Add Tool Tip to add shape lab button

* Refactor ShapesLabTest

* Remove comment about flakiness
</commit_message>
<xml_diff>
--- a/doc/test/ShapesLab/ShapesLab.pptx
+++ b/doc/test/ShapesLab/ShapesLab.pptx
@@ -7,7 +7,7 @@
     <p:sldMasterId id="2147483672" r:id="rId3"/>
   </p:sldMasterIdLst>
   <p:notesMasterIdLst>
-    <p:notesMasterId r:id="rId10"/>
+    <p:notesMasterId r:id="rId13"/>
   </p:notesMasterIdLst>
   <p:sldIdLst>
     <p:sldId id="287" r:id="rId4"/>
@@ -15,7 +15,10 @@
     <p:sldId id="297" r:id="rId6"/>
     <p:sldId id="299" r:id="rId7"/>
     <p:sldId id="298" r:id="rId8"/>
-    <p:sldId id="274" r:id="rId9"/>
+    <p:sldId id="300" r:id="rId9"/>
+    <p:sldId id="301" r:id="rId10"/>
+    <p:sldId id="302" r:id="rId11"/>
+    <p:sldId id="274" r:id="rId12"/>
   </p:sldIdLst>
   <p:sldSz cx="9144000" cy="6858000" type="screen4x3"/>
   <p:notesSz cx="6858000" cy="9144000"/>
@@ -128,6 +131,9 @@
             <p14:sldId id="297"/>
             <p14:sldId id="299"/>
             <p14:sldId id="298"/>
+            <p14:sldId id="300"/>
+            <p14:sldId id="301"/>
+            <p14:sldId id="302"/>
             <p14:sldId id="274"/>
           </p14:sldIdLst>
         </p14:section>
@@ -233,7 +239,7 @@
           <a:p>
             <a:fld id="{26004F41-C1A1-4B0D-9EEE-5E3F0E5BC108}" type="datetimeFigureOut">
               <a:rPr lang="en-SG" smtClean="0"/>
-              <a:t>5/7/2017</a:t>
+              <a:t>5/2/2018</a:t>
             </a:fld>
             <a:endParaRPr lang="en-SG"/>
           </a:p>
@@ -936,6 +942,178 @@
 </p:notes>
 </file>
 
+<file path=ppt/notesSlides/notesSlide4.xml><?xml version="1.0" encoding="utf-8"?>
+<p:notes xmlns:a="http://schemas.openxmlformats.org/drawingml/2006/main" xmlns:r="http://schemas.openxmlformats.org/officeDocument/2006/relationships" xmlns:p="http://schemas.openxmlformats.org/presentationml/2006/main">
+  <p:cSld>
+    <p:spTree>
+      <p:nvGrpSpPr>
+        <p:cNvPr id="1" name=""/>
+        <p:cNvGrpSpPr/>
+        <p:nvPr/>
+      </p:nvGrpSpPr>
+      <p:grpSpPr>
+        <a:xfrm>
+          <a:off x="0" y="0"/>
+          <a:ext cx="0" cy="0"/>
+          <a:chOff x="0" y="0"/>
+          <a:chExt cx="0" cy="0"/>
+        </a:xfrm>
+      </p:grpSpPr>
+      <p:sp>
+        <p:nvSpPr>
+          <p:cNvPr id="2" name="Slide Image Placeholder 1"/>
+          <p:cNvSpPr>
+            <a:spLocks noGrp="1" noRot="1" noChangeAspect="1"/>
+          </p:cNvSpPr>
+          <p:nvPr>
+            <p:ph type="sldImg"/>
+          </p:nvPr>
+        </p:nvSpPr>
+        <p:spPr/>
+      </p:sp>
+      <p:sp>
+        <p:nvSpPr>
+          <p:cNvPr id="3" name="Notes Placeholder 2"/>
+          <p:cNvSpPr>
+            <a:spLocks noGrp="1"/>
+          </p:cNvSpPr>
+          <p:nvPr>
+            <p:ph type="body" idx="1"/>
+          </p:nvPr>
+        </p:nvSpPr>
+        <p:spPr/>
+        <p:txBody>
+          <a:bodyPr/>
+          <a:lstStyle/>
+          <a:p>
+            <a:endParaRPr lang="zh-CN" altLang="en-US" dirty="0"/>
+          </a:p>
+        </p:txBody>
+      </p:sp>
+      <p:sp>
+        <p:nvSpPr>
+          <p:cNvPr id="4" name="Slide Number Placeholder 3"/>
+          <p:cNvSpPr>
+            <a:spLocks noGrp="1"/>
+          </p:cNvSpPr>
+          <p:nvPr>
+            <p:ph type="sldNum" sz="quarter" idx="10"/>
+          </p:nvPr>
+        </p:nvSpPr>
+        <p:spPr/>
+        <p:txBody>
+          <a:bodyPr/>
+          <a:lstStyle/>
+          <a:p>
+            <a:fld id="{E96FB07A-B1AD-4238-A6C9-967239C45D18}" type="slidenum">
+              <a:rPr lang="en-SG" smtClean="0"/>
+              <a:t>6</a:t>
+            </a:fld>
+            <a:endParaRPr lang="en-SG"/>
+          </a:p>
+        </p:txBody>
+      </p:sp>
+    </p:spTree>
+    <p:extLst>
+      <p:ext uri="{BB962C8B-B14F-4D97-AF65-F5344CB8AC3E}">
+        <p14:creationId xmlns:p14="http://schemas.microsoft.com/office/powerpoint/2010/main" val="4140924876"/>
+      </p:ext>
+    </p:extLst>
+  </p:cSld>
+  <p:clrMapOvr>
+    <a:masterClrMapping/>
+  </p:clrMapOvr>
+</p:notes>
+</file>
+
+<file path=ppt/notesSlides/notesSlide5.xml><?xml version="1.0" encoding="utf-8"?>
+<p:notes xmlns:a="http://schemas.openxmlformats.org/drawingml/2006/main" xmlns:r="http://schemas.openxmlformats.org/officeDocument/2006/relationships" xmlns:p="http://schemas.openxmlformats.org/presentationml/2006/main">
+  <p:cSld>
+    <p:spTree>
+      <p:nvGrpSpPr>
+        <p:cNvPr id="1" name=""/>
+        <p:cNvGrpSpPr/>
+        <p:nvPr/>
+      </p:nvGrpSpPr>
+      <p:grpSpPr>
+        <a:xfrm>
+          <a:off x="0" y="0"/>
+          <a:ext cx="0" cy="0"/>
+          <a:chOff x="0" y="0"/>
+          <a:chExt cx="0" cy="0"/>
+        </a:xfrm>
+      </p:grpSpPr>
+      <p:sp>
+        <p:nvSpPr>
+          <p:cNvPr id="2" name="Slide Image Placeholder 1"/>
+          <p:cNvSpPr>
+            <a:spLocks noGrp="1" noRot="1" noChangeAspect="1"/>
+          </p:cNvSpPr>
+          <p:nvPr>
+            <p:ph type="sldImg"/>
+          </p:nvPr>
+        </p:nvSpPr>
+        <p:spPr/>
+      </p:sp>
+      <p:sp>
+        <p:nvSpPr>
+          <p:cNvPr id="3" name="Notes Placeholder 2"/>
+          <p:cNvSpPr>
+            <a:spLocks noGrp="1"/>
+          </p:cNvSpPr>
+          <p:nvPr>
+            <p:ph type="body" idx="1"/>
+          </p:nvPr>
+        </p:nvSpPr>
+        <p:spPr/>
+        <p:txBody>
+          <a:bodyPr/>
+          <a:lstStyle/>
+          <a:p>
+            <a:r>
+              <a:rPr lang="en-US" altLang="zh-CN" dirty="0" smtClean="0"/>
+              <a:t>Expected</a:t>
+            </a:r>
+            <a:endParaRPr lang="zh-CN" altLang="en-US" dirty="0"/>
+          </a:p>
+        </p:txBody>
+      </p:sp>
+      <p:sp>
+        <p:nvSpPr>
+          <p:cNvPr id="4" name="Slide Number Placeholder 3"/>
+          <p:cNvSpPr>
+            <a:spLocks noGrp="1"/>
+          </p:cNvSpPr>
+          <p:nvPr>
+            <p:ph type="sldNum" sz="quarter" idx="10"/>
+          </p:nvPr>
+        </p:nvSpPr>
+        <p:spPr/>
+        <p:txBody>
+          <a:bodyPr/>
+          <a:lstStyle/>
+          <a:p>
+            <a:fld id="{E96FB07A-B1AD-4238-A6C9-967239C45D18}" type="slidenum">
+              <a:rPr lang="en-SG" smtClean="0"/>
+              <a:t>8</a:t>
+            </a:fld>
+            <a:endParaRPr lang="en-SG"/>
+          </a:p>
+        </p:txBody>
+      </p:sp>
+    </p:spTree>
+    <p:extLst>
+      <p:ext uri="{BB962C8B-B14F-4D97-AF65-F5344CB8AC3E}">
+        <p14:creationId xmlns:p14="http://schemas.microsoft.com/office/powerpoint/2010/main" val="3330350760"/>
+      </p:ext>
+    </p:extLst>
+  </p:cSld>
+  <p:clrMapOvr>
+    <a:masterClrMapping/>
+  </p:clrMapOvr>
+</p:notes>
+</file>
+
 <file path=ppt/slideLayouts/slideLayout1.xml><?xml version="1.0" encoding="utf-8"?>
 <p:sldLayout xmlns:a="http://schemas.openxmlformats.org/drawingml/2006/main" xmlns:r="http://schemas.openxmlformats.org/officeDocument/2006/relationships" xmlns:p="http://schemas.openxmlformats.org/presentationml/2006/main" type="title" preserve="1">
   <p:cSld name="Title Slide">
@@ -1117,7 +1295,7 @@
           <a:p>
             <a:fld id="{699DC775-C286-4358-8C92-D7E584E969B3}" type="datetimeFigureOut">
               <a:rPr lang="en-US" smtClean="0"/>
-              <a:t>7/5/2017</a:t>
+              <a:t>2/5/2018</a:t>
             </a:fld>
             <a:endParaRPr lang="en-US"/>
           </a:p>
@@ -1287,7 +1465,7 @@
           <a:p>
             <a:fld id="{699DC775-C286-4358-8C92-D7E584E969B3}" type="datetimeFigureOut">
               <a:rPr lang="en-US" smtClean="0"/>
-              <a:t>7/5/2017</a:t>
+              <a:t>2/5/2018</a:t>
             </a:fld>
             <a:endParaRPr lang="en-US"/>
           </a:p>
@@ -1467,7 +1645,7 @@
           <a:p>
             <a:fld id="{699DC775-C286-4358-8C92-D7E584E969B3}" type="datetimeFigureOut">
               <a:rPr lang="en-US" smtClean="0"/>
-              <a:t>7/5/2017</a:t>
+              <a:t>2/5/2018</a:t>
             </a:fld>
             <a:endParaRPr lang="en-US"/>
           </a:p>
@@ -1709,7 +1887,7 @@
           <a:p>
             <a:fld id="{699DC775-C286-4358-8C92-D7E584E969B3}" type="datetimeFigureOut">
               <a:rPr lang="en-US" smtClean="0"/>
-              <a:t>7/5/2017</a:t>
+              <a:t>2/5/2018</a:t>
             </a:fld>
             <a:endParaRPr lang="en-US"/>
           </a:p>
@@ -1879,7 +2057,7 @@
           <a:p>
             <a:fld id="{699DC775-C286-4358-8C92-D7E584E969B3}" type="datetimeFigureOut">
               <a:rPr lang="en-US" smtClean="0"/>
-              <a:t>7/5/2017</a:t>
+              <a:t>2/5/2018</a:t>
             </a:fld>
             <a:endParaRPr lang="en-US"/>
           </a:p>
@@ -2125,7 +2303,7 @@
           <a:p>
             <a:fld id="{699DC775-C286-4358-8C92-D7E584E969B3}" type="datetimeFigureOut">
               <a:rPr lang="en-US" smtClean="0"/>
-              <a:t>7/5/2017</a:t>
+              <a:t>2/5/2018</a:t>
             </a:fld>
             <a:endParaRPr lang="en-US"/>
           </a:p>
@@ -2413,7 +2591,7 @@
           <a:p>
             <a:fld id="{699DC775-C286-4358-8C92-D7E584E969B3}" type="datetimeFigureOut">
               <a:rPr lang="en-US" smtClean="0"/>
-              <a:t>7/5/2017</a:t>
+              <a:t>2/5/2018</a:t>
             </a:fld>
             <a:endParaRPr lang="en-US"/>
           </a:p>
@@ -2835,7 +3013,7 @@
           <a:p>
             <a:fld id="{699DC775-C286-4358-8C92-D7E584E969B3}" type="datetimeFigureOut">
               <a:rPr lang="en-US" smtClean="0"/>
-              <a:t>7/5/2017</a:t>
+              <a:t>2/5/2018</a:t>
             </a:fld>
             <a:endParaRPr lang="en-US"/>
           </a:p>
@@ -2953,7 +3131,7 @@
           <a:p>
             <a:fld id="{699DC775-C286-4358-8C92-D7E584E969B3}" type="datetimeFigureOut">
               <a:rPr lang="en-US" smtClean="0"/>
-              <a:t>7/5/2017</a:t>
+              <a:t>2/5/2018</a:t>
             </a:fld>
             <a:endParaRPr lang="en-US"/>
           </a:p>
@@ -3048,7 +3226,7 @@
           <a:p>
             <a:fld id="{699DC775-C286-4358-8C92-D7E584E969B3}" type="datetimeFigureOut">
               <a:rPr lang="en-US" smtClean="0"/>
-              <a:t>7/5/2017</a:t>
+              <a:t>2/5/2018</a:t>
             </a:fld>
             <a:endParaRPr lang="en-US"/>
           </a:p>
@@ -3325,7 +3503,7 @@
           <a:p>
             <a:fld id="{699DC775-C286-4358-8C92-D7E584E969B3}" type="datetimeFigureOut">
               <a:rPr lang="en-US" smtClean="0"/>
-              <a:t>7/5/2017</a:t>
+              <a:t>2/5/2018</a:t>
             </a:fld>
             <a:endParaRPr lang="en-US"/>
           </a:p>
@@ -3495,7 +3673,7 @@
           <a:p>
             <a:fld id="{699DC775-C286-4358-8C92-D7E584E969B3}" type="datetimeFigureOut">
               <a:rPr lang="en-US" smtClean="0"/>
-              <a:t>7/5/2017</a:t>
+              <a:t>2/5/2018</a:t>
             </a:fld>
             <a:endParaRPr lang="en-US"/>
           </a:p>
@@ -3748,7 +3926,7 @@
           <a:p>
             <a:fld id="{699DC775-C286-4358-8C92-D7E584E969B3}" type="datetimeFigureOut">
               <a:rPr lang="en-US" smtClean="0"/>
-              <a:t>7/5/2017</a:t>
+              <a:t>2/5/2018</a:t>
             </a:fld>
             <a:endParaRPr lang="en-US"/>
           </a:p>
@@ -3918,7 +4096,7 @@
           <a:p>
             <a:fld id="{699DC775-C286-4358-8C92-D7E584E969B3}" type="datetimeFigureOut">
               <a:rPr lang="en-US" smtClean="0"/>
-              <a:t>7/5/2017</a:t>
+              <a:t>2/5/2018</a:t>
             </a:fld>
             <a:endParaRPr lang="en-US"/>
           </a:p>
@@ -4098,7 +4276,7 @@
           <a:p>
             <a:fld id="{699DC775-C286-4358-8C92-D7E584E969B3}" type="datetimeFigureOut">
               <a:rPr lang="en-US" smtClean="0"/>
-              <a:t>7/5/2017</a:t>
+              <a:t>2/5/2018</a:t>
             </a:fld>
             <a:endParaRPr lang="en-US"/>
           </a:p>
@@ -4348,7 +4526,7 @@
           <a:p>
             <a:fld id="{699DC775-C286-4358-8C92-D7E584E969B3}" type="datetimeFigureOut">
               <a:rPr lang="en-US" smtClean="0"/>
-              <a:t>7/5/2017</a:t>
+              <a:t>2/5/2018</a:t>
             </a:fld>
             <a:endParaRPr lang="en-US"/>
           </a:p>
@@ -4526,7 +4704,7 @@
           <a:p>
             <a:fld id="{699DC775-C286-4358-8C92-D7E584E969B3}" type="datetimeFigureOut">
               <a:rPr lang="en-US" smtClean="0"/>
-              <a:t>7/5/2017</a:t>
+              <a:t>2/5/2018</a:t>
             </a:fld>
             <a:endParaRPr lang="en-US"/>
           </a:p>
@@ -4780,7 +4958,7 @@
           <a:p>
             <a:fld id="{699DC775-C286-4358-8C92-D7E584E969B3}" type="datetimeFigureOut">
               <a:rPr lang="en-US" smtClean="0"/>
-              <a:t>7/5/2017</a:t>
+              <a:t>2/5/2018</a:t>
             </a:fld>
             <a:endParaRPr lang="en-US"/>
           </a:p>
@@ -5076,7 +5254,7 @@
           <a:p>
             <a:fld id="{699DC775-C286-4358-8C92-D7E584E969B3}" type="datetimeFigureOut">
               <a:rPr lang="en-US" smtClean="0"/>
-              <a:t>7/5/2017</a:t>
+              <a:t>2/5/2018</a:t>
             </a:fld>
             <a:endParaRPr lang="en-US"/>
           </a:p>
@@ -5506,7 +5684,7 @@
           <a:p>
             <a:fld id="{699DC775-C286-4358-8C92-D7E584E969B3}" type="datetimeFigureOut">
               <a:rPr lang="en-US" smtClean="0"/>
-              <a:t>7/5/2017</a:t>
+              <a:t>2/5/2018</a:t>
             </a:fld>
             <a:endParaRPr lang="en-US"/>
           </a:p>
@@ -5632,7 +5810,7 @@
           <a:p>
             <a:fld id="{699DC775-C286-4358-8C92-D7E584E969B3}" type="datetimeFigureOut">
               <a:rPr lang="en-US" smtClean="0"/>
-              <a:t>7/5/2017</a:t>
+              <a:t>2/5/2018</a:t>
             </a:fld>
             <a:endParaRPr lang="en-US"/>
           </a:p>
@@ -5735,7 +5913,7 @@
           <a:p>
             <a:fld id="{699DC775-C286-4358-8C92-D7E584E969B3}" type="datetimeFigureOut">
               <a:rPr lang="en-US" smtClean="0"/>
-              <a:t>7/5/2017</a:t>
+              <a:t>2/5/2018</a:t>
             </a:fld>
             <a:endParaRPr lang="en-US"/>
           </a:p>
@@ -5981,7 +6159,7 @@
           <a:p>
             <a:fld id="{699DC775-C286-4358-8C92-D7E584E969B3}" type="datetimeFigureOut">
               <a:rPr lang="en-US" smtClean="0"/>
-              <a:t>7/5/2017</a:t>
+              <a:t>2/5/2018</a:t>
             </a:fld>
             <a:endParaRPr lang="en-US"/>
           </a:p>
@@ -6266,7 +6444,7 @@
           <a:p>
             <a:fld id="{699DC775-C286-4358-8C92-D7E584E969B3}" type="datetimeFigureOut">
               <a:rPr lang="en-US" smtClean="0"/>
-              <a:t>7/5/2017</a:t>
+              <a:t>2/5/2018</a:t>
             </a:fld>
             <a:endParaRPr lang="en-US"/>
           </a:p>
@@ -6527,7 +6705,7 @@
           <a:p>
             <a:fld id="{699DC775-C286-4358-8C92-D7E584E969B3}" type="datetimeFigureOut">
               <a:rPr lang="en-US" smtClean="0"/>
-              <a:t>7/5/2017</a:t>
+              <a:t>2/5/2018</a:t>
             </a:fld>
             <a:endParaRPr lang="en-US"/>
           </a:p>
@@ -6705,7 +6883,7 @@
           <a:p>
             <a:fld id="{699DC775-C286-4358-8C92-D7E584E969B3}" type="datetimeFigureOut">
               <a:rPr lang="en-US" smtClean="0"/>
-              <a:t>7/5/2017</a:t>
+              <a:t>2/5/2018</a:t>
             </a:fld>
             <a:endParaRPr lang="en-US"/>
           </a:p>
@@ -6893,7 +7071,7 @@
           <a:p>
             <a:fld id="{699DC775-C286-4358-8C92-D7E584E969B3}" type="datetimeFigureOut">
               <a:rPr lang="en-US" smtClean="0"/>
-              <a:t>7/5/2017</a:t>
+              <a:t>2/5/2018</a:t>
             </a:fld>
             <a:endParaRPr lang="en-US"/>
           </a:p>
@@ -7181,7 +7359,7 @@
           <a:p>
             <a:fld id="{699DC775-C286-4358-8C92-D7E584E969B3}" type="datetimeFigureOut">
               <a:rPr lang="en-US" smtClean="0"/>
-              <a:t>7/5/2017</a:t>
+              <a:t>2/5/2018</a:t>
             </a:fld>
             <a:endParaRPr lang="en-US"/>
           </a:p>
@@ -7603,7 +7781,7 @@
           <a:p>
             <a:fld id="{699DC775-C286-4358-8C92-D7E584E969B3}" type="datetimeFigureOut">
               <a:rPr lang="en-US" smtClean="0"/>
-              <a:t>7/5/2017</a:t>
+              <a:t>2/5/2018</a:t>
             </a:fld>
             <a:endParaRPr lang="en-US"/>
           </a:p>
@@ -7721,7 +7899,7 @@
           <a:p>
             <a:fld id="{699DC775-C286-4358-8C92-D7E584E969B3}" type="datetimeFigureOut">
               <a:rPr lang="en-US" smtClean="0"/>
-              <a:t>7/5/2017</a:t>
+              <a:t>2/5/2018</a:t>
             </a:fld>
             <a:endParaRPr lang="en-US"/>
           </a:p>
@@ -7816,7 +7994,7 @@
           <a:p>
             <a:fld id="{699DC775-C286-4358-8C92-D7E584E969B3}" type="datetimeFigureOut">
               <a:rPr lang="en-US" smtClean="0"/>
-              <a:t>7/5/2017</a:t>
+              <a:t>2/5/2018</a:t>
             </a:fld>
             <a:endParaRPr lang="en-US"/>
           </a:p>
@@ -8093,7 +8271,7 @@
           <a:p>
             <a:fld id="{699DC775-C286-4358-8C92-D7E584E969B3}" type="datetimeFigureOut">
               <a:rPr lang="en-US" smtClean="0"/>
-              <a:t>7/5/2017</a:t>
+              <a:t>2/5/2018</a:t>
             </a:fld>
             <a:endParaRPr lang="en-US"/>
           </a:p>
@@ -8346,7 +8524,7 @@
           <a:p>
             <a:fld id="{699DC775-C286-4358-8C92-D7E584E969B3}" type="datetimeFigureOut">
               <a:rPr lang="en-US" smtClean="0"/>
-              <a:t>7/5/2017</a:t>
+              <a:t>2/5/2018</a:t>
             </a:fld>
             <a:endParaRPr lang="en-US"/>
           </a:p>
@@ -8559,7 +8737,7 @@
           <a:p>
             <a:fld id="{699DC775-C286-4358-8C92-D7E584E969B3}" type="datetimeFigureOut">
               <a:rPr lang="en-US" smtClean="0"/>
-              <a:t>7/5/2017</a:t>
+              <a:t>2/5/2018</a:t>
             </a:fld>
             <a:endParaRPr lang="en-US"/>
           </a:p>
@@ -9074,7 +9252,7 @@
           <a:p>
             <a:fld id="{699DC775-C286-4358-8C92-D7E584E969B3}" type="datetimeFigureOut">
               <a:rPr lang="en-US" smtClean="0"/>
-              <a:t>7/5/2017</a:t>
+              <a:t>2/5/2018</a:t>
             </a:fld>
             <a:endParaRPr lang="en-US"/>
           </a:p>
@@ -9587,7 +9765,7 @@
           <a:p>
             <a:fld id="{699DC775-C286-4358-8C92-D7E584E969B3}" type="datetimeFigureOut">
               <a:rPr lang="en-US" smtClean="0"/>
-              <a:t>7/5/2017</a:t>
+              <a:t>2/5/2018</a:t>
             </a:fld>
             <a:endParaRPr lang="en-US"/>
           </a:p>
@@ -10224,7 +10402,7 @@
         <p:spPr>
           <a:xfrm>
             <a:off x="381000" y="2057400"/>
-            <a:ext cx="8229600" cy="1384995"/>
+            <a:ext cx="8229600" cy="3539430"/>
           </a:xfrm>
           <a:prstGeom prst="rect">
             <a:avLst/>
@@ -10264,6 +10442,72 @@
                 </a:solidFill>
               </a:rPr>
               <a:t>Compare slide 4 and expected slide 5</a:t>
+            </a:r>
+          </a:p>
+          <a:p>
+            <a:endParaRPr lang="en-US" altLang="zh-CN" sz="2800" dirty="0">
+              <a:solidFill>
+                <a:schemeClr val="bg1"/>
+              </a:solidFill>
+            </a:endParaRPr>
+          </a:p>
+          <a:p>
+            <a:r>
+              <a:rPr lang="en-US" altLang="zh-CN" sz="2800" dirty="0" smtClean="0">
+                <a:solidFill>
+                  <a:schemeClr val="bg1"/>
+                </a:solidFill>
+              </a:rPr>
+              <a:t>Repeat for testing </a:t>
+            </a:r>
+            <a:r>
+              <a:rPr lang="en-US" altLang="zh-CN" sz="2800" dirty="0">
+                <a:solidFill>
+                  <a:schemeClr val="bg1"/>
+                </a:solidFill>
+              </a:rPr>
+              <a:t>A</a:t>
+            </a:r>
+            <a:r>
+              <a:rPr lang="en-US" altLang="zh-CN" sz="2800" dirty="0" smtClean="0">
+                <a:solidFill>
+                  <a:schemeClr val="bg1"/>
+                </a:solidFill>
+              </a:rPr>
+              <a:t>dd </a:t>
+            </a:r>
+            <a:r>
+              <a:rPr lang="en-US" altLang="zh-CN" sz="2800" dirty="0">
+                <a:solidFill>
+                  <a:schemeClr val="bg1"/>
+                </a:solidFill>
+              </a:rPr>
+              <a:t>S</a:t>
+            </a:r>
+            <a:r>
+              <a:rPr lang="en-US" altLang="zh-CN" sz="2800" dirty="0" smtClean="0">
+                <a:solidFill>
+                  <a:schemeClr val="bg1"/>
+                </a:solidFill>
+              </a:rPr>
+              <a:t>hapes button on Shapes Lab pane from slides 6 to 8</a:t>
+            </a:r>
+          </a:p>
+          <a:p>
+            <a:endParaRPr lang="en-US" altLang="zh-CN" sz="2800" dirty="0">
+              <a:solidFill>
+                <a:schemeClr val="bg1"/>
+              </a:solidFill>
+            </a:endParaRPr>
+          </a:p>
+          <a:p>
+            <a:r>
+              <a:rPr lang="en-US" altLang="zh-CN" sz="2800" dirty="0" smtClean="0">
+                <a:solidFill>
+                  <a:schemeClr val="bg1"/>
+                </a:solidFill>
+              </a:rPr>
+              <a:t>Animations are also expected to be transferred</a:t>
             </a:r>
             <a:endParaRPr lang="zh-CN" altLang="en-US" sz="2800" dirty="0">
               <a:solidFill>
@@ -11375,6 +11619,1079 @@
 </file>
 
 <file path=ppt/slides/slide6.xml><?xml version="1.0" encoding="utf-8"?>
+<p:sld xmlns:a="http://schemas.openxmlformats.org/drawingml/2006/main" xmlns:r="http://schemas.openxmlformats.org/officeDocument/2006/relationships" xmlns:p="http://schemas.openxmlformats.org/presentationml/2006/main">
+  <p:cSld>
+    <p:bg>
+      <p:bgPr>
+        <a:solidFill>
+          <a:schemeClr val="bg1"/>
+        </a:solidFill>
+        <a:effectLst/>
+      </p:bgPr>
+    </p:bg>
+    <p:spTree>
+      <p:nvGrpSpPr>
+        <p:cNvPr id="1" name=""/>
+        <p:cNvGrpSpPr/>
+        <p:nvPr/>
+      </p:nvGrpSpPr>
+      <p:grpSpPr>
+        <a:xfrm>
+          <a:off x="0" y="0"/>
+          <a:ext cx="0" cy="0"/>
+          <a:chOff x="0" y="0"/>
+          <a:chExt cx="0" cy="0"/>
+        </a:xfrm>
+      </p:grpSpPr>
+      <p:sp>
+        <p:nvSpPr>
+          <p:cNvPr id="3" name="selectMeNow1"/>
+          <p:cNvSpPr/>
+          <p:nvPr/>
+        </p:nvSpPr>
+        <p:spPr>
+          <a:xfrm rot="1965194">
+            <a:off x="1533377" y="1406276"/>
+            <a:ext cx="3200400" cy="3792071"/>
+          </a:xfrm>
+          <a:prstGeom prst="roundRect">
+            <a:avLst/>
+          </a:prstGeom>
+          <a:solidFill>
+            <a:schemeClr val="accent2">
+              <a:lumMod val="40000"/>
+              <a:lumOff val="60000"/>
+            </a:schemeClr>
+          </a:solidFill>
+          <a:ln w="203200">
+            <a:solidFill>
+              <a:srgbClr val="92D050"/>
+            </a:solidFill>
+          </a:ln>
+          <a:effectLst>
+            <a:innerShdw blurRad="63500" dist="50800" dir="8100000">
+              <a:prstClr val="black">
+                <a:alpha val="50000"/>
+              </a:prstClr>
+            </a:innerShdw>
+          </a:effectLst>
+        </p:spPr>
+        <p:style>
+          <a:lnRef idx="2">
+            <a:schemeClr val="accent1">
+              <a:shade val="50000"/>
+            </a:schemeClr>
+          </a:lnRef>
+          <a:fillRef idx="1">
+            <a:schemeClr val="accent1"/>
+          </a:fillRef>
+          <a:effectRef idx="0">
+            <a:schemeClr val="accent1"/>
+          </a:effectRef>
+          <a:fontRef idx="minor">
+            <a:schemeClr val="lt1"/>
+          </a:fontRef>
+        </p:style>
+        <p:txBody>
+          <a:bodyPr rtlCol="0" anchor="ctr"/>
+          <a:lstStyle/>
+          <a:p>
+            <a:pPr algn="ctr"/>
+            <a:r>
+              <a:rPr lang="en-US" altLang="zh-CN" sz="6600" dirty="0" smtClean="0">
+                <a:solidFill>
+                  <a:srgbClr val="EB7561"/>
+                </a:solidFill>
+                <a:latin typeface="Times New Roman" panose="02020603050405020304" pitchFamily="18" charset="0"/>
+                <a:cs typeface="Times New Roman" panose="02020603050405020304" pitchFamily="18" charset="0"/>
+              </a:rPr>
+              <a:t>TEXT</a:t>
+            </a:r>
+            <a:endParaRPr lang="zh-CN" altLang="en-US" sz="6600" dirty="0">
+              <a:solidFill>
+                <a:srgbClr val="EB7561"/>
+              </a:solidFill>
+              <a:latin typeface="Times New Roman" panose="02020603050405020304" pitchFamily="18" charset="0"/>
+              <a:cs typeface="Times New Roman" panose="02020603050405020304" pitchFamily="18" charset="0"/>
+            </a:endParaRPr>
+          </a:p>
+        </p:txBody>
+      </p:sp>
+      <p:sp>
+        <p:nvSpPr>
+          <p:cNvPr id="5" name="selectMeNow2"/>
+          <p:cNvSpPr/>
+          <p:nvPr/>
+        </p:nvSpPr>
+        <p:spPr>
+          <a:xfrm>
+            <a:off x="5867400" y="1143000"/>
+            <a:ext cx="1828800" cy="1371600"/>
+          </a:xfrm>
+          <a:prstGeom prst="roundRect">
+            <a:avLst/>
+          </a:prstGeom>
+          <a:ln/>
+        </p:spPr>
+        <p:style>
+          <a:lnRef idx="3">
+            <a:schemeClr val="lt1"/>
+          </a:lnRef>
+          <a:fillRef idx="1">
+            <a:schemeClr val="accent6"/>
+          </a:fillRef>
+          <a:effectRef idx="1">
+            <a:schemeClr val="accent6"/>
+          </a:effectRef>
+          <a:fontRef idx="minor">
+            <a:schemeClr val="lt1"/>
+          </a:fontRef>
+        </p:style>
+        <p:txBody>
+          <a:bodyPr rtlCol="0" anchor="ctr"/>
+          <a:lstStyle/>
+          <a:p>
+            <a:pPr algn="ctr"/>
+            <a:endParaRPr lang="zh-CN" altLang="en-US"/>
+          </a:p>
+        </p:txBody>
+      </p:sp>
+      <p:sp>
+        <p:nvSpPr>
+          <p:cNvPr id="7" name="selectMeNow3"/>
+          <p:cNvSpPr/>
+          <p:nvPr/>
+        </p:nvSpPr>
+        <p:spPr>
+          <a:xfrm>
+            <a:off x="5867400" y="2667000"/>
+            <a:ext cx="1828800" cy="1371600"/>
+          </a:xfrm>
+          <a:prstGeom prst="roundRect">
+            <a:avLst/>
+          </a:prstGeom>
+          <a:ln/>
+        </p:spPr>
+        <p:style>
+          <a:lnRef idx="3">
+            <a:schemeClr val="lt1"/>
+          </a:lnRef>
+          <a:fillRef idx="1">
+            <a:schemeClr val="accent3"/>
+          </a:fillRef>
+          <a:effectRef idx="1">
+            <a:schemeClr val="accent3"/>
+          </a:effectRef>
+          <a:fontRef idx="minor">
+            <a:schemeClr val="lt1"/>
+          </a:fontRef>
+        </p:style>
+        <p:txBody>
+          <a:bodyPr rtlCol="0" anchor="ctr"/>
+          <a:lstStyle/>
+          <a:p>
+            <a:pPr algn="ctr"/>
+            <a:endParaRPr lang="zh-CN" altLang="en-US"/>
+          </a:p>
+        </p:txBody>
+      </p:sp>
+      <p:sp>
+        <p:nvSpPr>
+          <p:cNvPr id="8" name="selectMeNow4"/>
+          <p:cNvSpPr/>
+          <p:nvPr/>
+        </p:nvSpPr>
+        <p:spPr>
+          <a:xfrm>
+            <a:off x="5867400" y="4191000"/>
+            <a:ext cx="1828800" cy="1371600"/>
+          </a:xfrm>
+          <a:prstGeom prst="roundRect">
+            <a:avLst/>
+          </a:prstGeom>
+          <a:solidFill>
+            <a:schemeClr val="accent6">
+              <a:alpha val="50000"/>
+            </a:schemeClr>
+          </a:solidFill>
+          <a:ln>
+            <a:noFill/>
+          </a:ln>
+        </p:spPr>
+        <p:style>
+          <a:lnRef idx="0">
+            <a:scrgbClr r="0" g="0" b="0"/>
+          </a:lnRef>
+          <a:fillRef idx="0">
+            <a:scrgbClr r="0" g="0" b="0"/>
+          </a:fillRef>
+          <a:effectRef idx="0">
+            <a:scrgbClr r="0" g="0" b="0"/>
+          </a:effectRef>
+          <a:fontRef idx="minor">
+            <a:schemeClr val="lt1"/>
+          </a:fontRef>
+        </p:style>
+        <p:txBody>
+          <a:bodyPr rtlCol="0" anchor="ctr"/>
+          <a:lstStyle/>
+          <a:p>
+            <a:pPr algn="ctr"/>
+            <a:endParaRPr lang="zh-CN" altLang="en-US"/>
+          </a:p>
+        </p:txBody>
+      </p:sp>
+    </p:spTree>
+    <p:extLst>
+      <p:ext uri="{BB962C8B-B14F-4D97-AF65-F5344CB8AC3E}">
+        <p14:creationId xmlns:p14="http://schemas.microsoft.com/office/powerpoint/2010/main" val="1521678528"/>
+      </p:ext>
+    </p:extLst>
+  </p:cSld>
+  <p:clrMapOvr>
+    <a:masterClrMapping/>
+  </p:clrMapOvr>
+  <p:timing>
+    <p:tnLst>
+      <p:par>
+        <p:cTn id="1" dur="indefinite" restart="never" nodeType="tmRoot">
+          <p:childTnLst>
+            <p:seq concurrent="1" nextAc="seek">
+              <p:cTn id="2" dur="indefinite" nodeType="mainSeq">
+                <p:childTnLst>
+                  <p:par>
+                    <p:cTn id="3" fill="hold">
+                      <p:stCondLst>
+                        <p:cond delay="indefinite"/>
+                      </p:stCondLst>
+                      <p:childTnLst>
+                        <p:par>
+                          <p:cTn id="4" fill="hold">
+                            <p:stCondLst>
+                              <p:cond delay="0"/>
+                            </p:stCondLst>
+                            <p:childTnLst>
+                              <p:par>
+                                <p:cTn id="5" presetID="2" presetClass="entr" presetSubtype="4" fill="hold" grpId="0" nodeType="clickEffect">
+                                  <p:stCondLst>
+                                    <p:cond delay="0"/>
+                                  </p:stCondLst>
+                                  <p:childTnLst>
+                                    <p:set>
+                                      <p:cBhvr>
+                                        <p:cTn id="6" dur="1" fill="hold">
+                                          <p:stCondLst>
+                                            <p:cond delay="0"/>
+                                          </p:stCondLst>
+                                        </p:cTn>
+                                        <p:tgtEl>
+                                          <p:spTgt spid="3"/>
+                                        </p:tgtEl>
+                                        <p:attrNameLst>
+                                          <p:attrName>style.visibility</p:attrName>
+                                        </p:attrNameLst>
+                                      </p:cBhvr>
+                                      <p:to>
+                                        <p:strVal val="visible"/>
+                                      </p:to>
+                                    </p:set>
+                                    <p:anim calcmode="lin" valueType="num">
+                                      <p:cBhvr additive="base">
+                                        <p:cTn id="7" dur="500" fill="hold"/>
+                                        <p:tgtEl>
+                                          <p:spTgt spid="3"/>
+                                        </p:tgtEl>
+                                        <p:attrNameLst>
+                                          <p:attrName>ppt_x</p:attrName>
+                                        </p:attrNameLst>
+                                      </p:cBhvr>
+                                      <p:tavLst>
+                                        <p:tav tm="0">
+                                          <p:val>
+                                            <p:strVal val="#ppt_x"/>
+                                          </p:val>
+                                        </p:tav>
+                                        <p:tav tm="100000">
+                                          <p:val>
+                                            <p:strVal val="#ppt_x"/>
+                                          </p:val>
+                                        </p:tav>
+                                      </p:tavLst>
+                                    </p:anim>
+                                    <p:anim calcmode="lin" valueType="num">
+                                      <p:cBhvr additive="base">
+                                        <p:cTn id="8" dur="500" fill="hold"/>
+                                        <p:tgtEl>
+                                          <p:spTgt spid="3"/>
+                                        </p:tgtEl>
+                                        <p:attrNameLst>
+                                          <p:attrName>ppt_y</p:attrName>
+                                        </p:attrNameLst>
+                                      </p:cBhvr>
+                                      <p:tavLst>
+                                        <p:tav tm="0">
+                                          <p:val>
+                                            <p:strVal val="1+#ppt_h/2"/>
+                                          </p:val>
+                                        </p:tav>
+                                        <p:tav tm="100000">
+                                          <p:val>
+                                            <p:strVal val="#ppt_y"/>
+                                          </p:val>
+                                        </p:tav>
+                                      </p:tavLst>
+                                    </p:anim>
+                                  </p:childTnLst>
+                                </p:cTn>
+                              </p:par>
+                            </p:childTnLst>
+                          </p:cTn>
+                        </p:par>
+                      </p:childTnLst>
+                    </p:cTn>
+                  </p:par>
+                  <p:par>
+                    <p:cTn id="9" fill="hold">
+                      <p:stCondLst>
+                        <p:cond delay="indefinite"/>
+                      </p:stCondLst>
+                      <p:childTnLst>
+                        <p:par>
+                          <p:cTn id="10" fill="hold">
+                            <p:stCondLst>
+                              <p:cond delay="0"/>
+                            </p:stCondLst>
+                            <p:childTnLst>
+                              <p:par>
+                                <p:cTn id="11" presetID="1" presetClass="entr" presetSubtype="0" fill="hold" grpId="0" nodeType="clickEffect">
+                                  <p:stCondLst>
+                                    <p:cond delay="0"/>
+                                  </p:stCondLst>
+                                  <p:childTnLst>
+                                    <p:set>
+                                      <p:cBhvr>
+                                        <p:cTn id="12" dur="1" fill="hold">
+                                          <p:stCondLst>
+                                            <p:cond delay="0"/>
+                                          </p:stCondLst>
+                                        </p:cTn>
+                                        <p:tgtEl>
+                                          <p:spTgt spid="5"/>
+                                        </p:tgtEl>
+                                        <p:attrNameLst>
+                                          <p:attrName>style.visibility</p:attrName>
+                                        </p:attrNameLst>
+                                      </p:cBhvr>
+                                      <p:to>
+                                        <p:strVal val="visible"/>
+                                      </p:to>
+                                    </p:set>
+                                  </p:childTnLst>
+                                </p:cTn>
+                              </p:par>
+                            </p:childTnLst>
+                          </p:cTn>
+                        </p:par>
+                      </p:childTnLst>
+                    </p:cTn>
+                  </p:par>
+                  <p:par>
+                    <p:cTn id="13" fill="hold">
+                      <p:stCondLst>
+                        <p:cond delay="indefinite"/>
+                      </p:stCondLst>
+                      <p:childTnLst>
+                        <p:par>
+                          <p:cTn id="14" fill="hold">
+                            <p:stCondLst>
+                              <p:cond delay="0"/>
+                            </p:stCondLst>
+                            <p:childTnLst>
+                              <p:par>
+                                <p:cTn id="15" presetID="10" presetClass="entr" presetSubtype="0" fill="hold" grpId="0" nodeType="clickEffect">
+                                  <p:stCondLst>
+                                    <p:cond delay="0"/>
+                                  </p:stCondLst>
+                                  <p:childTnLst>
+                                    <p:set>
+                                      <p:cBhvr>
+                                        <p:cTn id="16" dur="1" fill="hold">
+                                          <p:stCondLst>
+                                            <p:cond delay="0"/>
+                                          </p:stCondLst>
+                                        </p:cTn>
+                                        <p:tgtEl>
+                                          <p:spTgt spid="7"/>
+                                        </p:tgtEl>
+                                        <p:attrNameLst>
+                                          <p:attrName>style.visibility</p:attrName>
+                                        </p:attrNameLst>
+                                      </p:cBhvr>
+                                      <p:to>
+                                        <p:strVal val="visible"/>
+                                      </p:to>
+                                    </p:set>
+                                    <p:animEffect transition="in" filter="fade">
+                                      <p:cBhvr>
+                                        <p:cTn id="17" dur="500"/>
+                                        <p:tgtEl>
+                                          <p:spTgt spid="7"/>
+                                        </p:tgtEl>
+                                      </p:cBhvr>
+                                    </p:animEffect>
+                                  </p:childTnLst>
+                                </p:cTn>
+                              </p:par>
+                            </p:childTnLst>
+                          </p:cTn>
+                        </p:par>
+                      </p:childTnLst>
+                    </p:cTn>
+                  </p:par>
+                  <p:par>
+                    <p:cTn id="18" fill="hold">
+                      <p:stCondLst>
+                        <p:cond delay="indefinite"/>
+                      </p:stCondLst>
+                      <p:childTnLst>
+                        <p:par>
+                          <p:cTn id="19" fill="hold">
+                            <p:stCondLst>
+                              <p:cond delay="0"/>
+                            </p:stCondLst>
+                            <p:childTnLst>
+                              <p:par>
+                                <p:cTn id="20" presetID="16" presetClass="entr" presetSubtype="21" fill="hold" grpId="0" nodeType="clickEffect">
+                                  <p:stCondLst>
+                                    <p:cond delay="0"/>
+                                  </p:stCondLst>
+                                  <p:childTnLst>
+                                    <p:set>
+                                      <p:cBhvr>
+                                        <p:cTn id="21" dur="1" fill="hold">
+                                          <p:stCondLst>
+                                            <p:cond delay="0"/>
+                                          </p:stCondLst>
+                                        </p:cTn>
+                                        <p:tgtEl>
+                                          <p:spTgt spid="8"/>
+                                        </p:tgtEl>
+                                        <p:attrNameLst>
+                                          <p:attrName>style.visibility</p:attrName>
+                                        </p:attrNameLst>
+                                      </p:cBhvr>
+                                      <p:to>
+                                        <p:strVal val="visible"/>
+                                      </p:to>
+                                    </p:set>
+                                    <p:animEffect transition="in" filter="barn(inVertical)">
+                                      <p:cBhvr>
+                                        <p:cTn id="22" dur="500"/>
+                                        <p:tgtEl>
+                                          <p:spTgt spid="8"/>
+                                        </p:tgtEl>
+                                      </p:cBhvr>
+                                    </p:animEffect>
+                                  </p:childTnLst>
+                                </p:cTn>
+                              </p:par>
+                            </p:childTnLst>
+                          </p:cTn>
+                        </p:par>
+                      </p:childTnLst>
+                    </p:cTn>
+                  </p:par>
+                </p:childTnLst>
+              </p:cTn>
+              <p:prevCondLst>
+                <p:cond evt="onPrev" delay="0">
+                  <p:tgtEl>
+                    <p:sldTgt/>
+                  </p:tgtEl>
+                </p:cond>
+              </p:prevCondLst>
+              <p:nextCondLst>
+                <p:cond evt="onNext" delay="0">
+                  <p:tgtEl>
+                    <p:sldTgt/>
+                  </p:tgtEl>
+                </p:cond>
+              </p:nextCondLst>
+            </p:seq>
+          </p:childTnLst>
+        </p:cTn>
+      </p:par>
+    </p:tnLst>
+    <p:bldLst>
+      <p:bldP spid="3" grpId="0" animBg="1"/>
+      <p:bldP spid="5" grpId="0" animBg="1"/>
+      <p:bldP spid="7" grpId="0" animBg="1"/>
+      <p:bldP spid="8" grpId="0" animBg="1"/>
+    </p:bldLst>
+  </p:timing>
+</p:sld>
+</file>
+
+<file path=ppt/slides/slide7.xml><?xml version="1.0" encoding="utf-8"?>
+<p:sld xmlns:a="http://schemas.openxmlformats.org/drawingml/2006/main" xmlns:r="http://schemas.openxmlformats.org/officeDocument/2006/relationships" xmlns:p="http://schemas.openxmlformats.org/presentationml/2006/main">
+  <p:cSld>
+    <p:bg>
+      <p:bgPr>
+        <a:solidFill>
+          <a:schemeClr val="bg1"/>
+        </a:solidFill>
+        <a:effectLst/>
+      </p:bgPr>
+    </p:bg>
+    <p:spTree>
+      <p:nvGrpSpPr>
+        <p:cNvPr id="1" name=""/>
+        <p:cNvGrpSpPr/>
+        <p:nvPr/>
+      </p:nvGrpSpPr>
+      <p:grpSpPr>
+        <a:xfrm>
+          <a:off x="0" y="0"/>
+          <a:ext cx="0" cy="0"/>
+          <a:chOff x="0" y="0"/>
+          <a:chExt cx="0" cy="0"/>
+        </a:xfrm>
+      </p:grpSpPr>
+    </p:spTree>
+    <p:extLst>
+      <p:ext uri="{BB962C8B-B14F-4D97-AF65-F5344CB8AC3E}">
+        <p14:creationId xmlns:p14="http://schemas.microsoft.com/office/powerpoint/2010/main" val="2884022466"/>
+      </p:ext>
+    </p:extLst>
+  </p:cSld>
+  <p:clrMapOvr>
+    <a:masterClrMapping/>
+  </p:clrMapOvr>
+  <p:timing>
+    <p:tnLst>
+      <p:par>
+        <p:cTn id="1" dur="indefinite" restart="never" nodeType="tmRoot"/>
+      </p:par>
+    </p:tnLst>
+  </p:timing>
+</p:sld>
+</file>
+
+<file path=ppt/slides/slide8.xml><?xml version="1.0" encoding="utf-8"?>
+<p:sld xmlns:a="http://schemas.openxmlformats.org/drawingml/2006/main" xmlns:r="http://schemas.openxmlformats.org/officeDocument/2006/relationships" xmlns:p="http://schemas.openxmlformats.org/presentationml/2006/main">
+  <p:cSld>
+    <p:bg>
+      <p:bgPr>
+        <a:solidFill>
+          <a:schemeClr val="bg1"/>
+        </a:solidFill>
+        <a:effectLst/>
+      </p:bgPr>
+    </p:bg>
+    <p:spTree>
+      <p:nvGrpSpPr>
+        <p:cNvPr id="1" name=""/>
+        <p:cNvGrpSpPr/>
+        <p:nvPr/>
+      </p:nvGrpSpPr>
+      <p:grpSpPr>
+        <a:xfrm>
+          <a:off x="0" y="0"/>
+          <a:ext cx="0" cy="0"/>
+          <a:chOff x="0" y="0"/>
+          <a:chExt cx="0" cy="0"/>
+        </a:xfrm>
+      </p:grpSpPr>
+      <p:sp>
+        <p:nvSpPr>
+          <p:cNvPr id="6" name="Group selectMeNow1 Seq_1"/>
+          <p:cNvSpPr/>
+          <p:nvPr/>
+        </p:nvSpPr>
+        <p:spPr>
+          <a:xfrm rot="1965194">
+            <a:off x="1533377" y="1406276"/>
+            <a:ext cx="3200400" cy="3792071"/>
+          </a:xfrm>
+          <a:prstGeom prst="roundRect">
+            <a:avLst/>
+          </a:prstGeom>
+          <a:solidFill>
+            <a:schemeClr val="accent2">
+              <a:lumMod val="40000"/>
+              <a:lumOff val="60000"/>
+            </a:schemeClr>
+          </a:solidFill>
+          <a:ln w="203200">
+            <a:solidFill>
+              <a:srgbClr val="92D050"/>
+            </a:solidFill>
+          </a:ln>
+          <a:effectLst>
+            <a:innerShdw blurRad="63500" dist="50800" dir="8100000">
+              <a:prstClr val="black">
+                <a:alpha val="50000"/>
+              </a:prstClr>
+            </a:innerShdw>
+          </a:effectLst>
+        </p:spPr>
+        <p:style>
+          <a:lnRef idx="2">
+            <a:schemeClr val="accent1">
+              <a:shade val="50000"/>
+            </a:schemeClr>
+          </a:lnRef>
+          <a:fillRef idx="1">
+            <a:schemeClr val="accent1"/>
+          </a:fillRef>
+          <a:effectRef idx="0">
+            <a:schemeClr val="accent1"/>
+          </a:effectRef>
+          <a:fontRef idx="minor">
+            <a:schemeClr val="lt1"/>
+          </a:fontRef>
+        </p:style>
+        <p:txBody>
+          <a:bodyPr rtlCol="0" anchor="ctr"/>
+          <a:lstStyle/>
+          <a:p>
+            <a:pPr algn="ctr"/>
+            <a:r>
+              <a:rPr lang="en-US" altLang="zh-CN" sz="6600" dirty="0" smtClean="0">
+                <a:solidFill>
+                  <a:srgbClr val="EB7561"/>
+                </a:solidFill>
+                <a:latin typeface="Times New Roman" panose="02020603050405020304" pitchFamily="18" charset="0"/>
+                <a:cs typeface="Times New Roman" panose="02020603050405020304" pitchFamily="18" charset="0"/>
+              </a:rPr>
+              <a:t>TEXT</a:t>
+            </a:r>
+            <a:endParaRPr lang="zh-CN" altLang="en-US" sz="6600" dirty="0">
+              <a:solidFill>
+                <a:srgbClr val="EB7561"/>
+              </a:solidFill>
+              <a:latin typeface="Times New Roman" panose="02020603050405020304" pitchFamily="18" charset="0"/>
+              <a:cs typeface="Times New Roman" panose="02020603050405020304" pitchFamily="18" charset="0"/>
+            </a:endParaRPr>
+          </a:p>
+        </p:txBody>
+      </p:sp>
+      <p:sp>
+        <p:nvSpPr>
+          <p:cNvPr id="9" name="Group selectMeNow1 Seq_2"/>
+          <p:cNvSpPr/>
+          <p:nvPr/>
+        </p:nvSpPr>
+        <p:spPr>
+          <a:xfrm>
+            <a:off x="5867400" y="1143000"/>
+            <a:ext cx="1828800" cy="1371600"/>
+          </a:xfrm>
+          <a:prstGeom prst="roundRect">
+            <a:avLst/>
+          </a:prstGeom>
+          <a:ln/>
+        </p:spPr>
+        <p:style>
+          <a:lnRef idx="3">
+            <a:schemeClr val="lt1"/>
+          </a:lnRef>
+          <a:fillRef idx="1">
+            <a:schemeClr val="accent6"/>
+          </a:fillRef>
+          <a:effectRef idx="1">
+            <a:schemeClr val="accent6"/>
+          </a:effectRef>
+          <a:fontRef idx="minor">
+            <a:schemeClr val="lt1"/>
+          </a:fontRef>
+        </p:style>
+        <p:txBody>
+          <a:bodyPr rtlCol="0" anchor="ctr"/>
+          <a:lstStyle/>
+          <a:p>
+            <a:pPr algn="ctr"/>
+            <a:endParaRPr lang="zh-CN" altLang="en-US"/>
+          </a:p>
+        </p:txBody>
+      </p:sp>
+      <p:sp>
+        <p:nvSpPr>
+          <p:cNvPr id="10" name="Group selectMeNow1 Seq_3"/>
+          <p:cNvSpPr/>
+          <p:nvPr/>
+        </p:nvSpPr>
+        <p:spPr>
+          <a:xfrm>
+            <a:off x="5867400" y="2667000"/>
+            <a:ext cx="1828800" cy="1371600"/>
+          </a:xfrm>
+          <a:prstGeom prst="roundRect">
+            <a:avLst/>
+          </a:prstGeom>
+          <a:ln/>
+        </p:spPr>
+        <p:style>
+          <a:lnRef idx="3">
+            <a:schemeClr val="lt1"/>
+          </a:lnRef>
+          <a:fillRef idx="1">
+            <a:schemeClr val="accent3"/>
+          </a:fillRef>
+          <a:effectRef idx="1">
+            <a:schemeClr val="accent3"/>
+          </a:effectRef>
+          <a:fontRef idx="minor">
+            <a:schemeClr val="lt1"/>
+          </a:fontRef>
+        </p:style>
+        <p:txBody>
+          <a:bodyPr rtlCol="0" anchor="ctr"/>
+          <a:lstStyle/>
+          <a:p>
+            <a:pPr algn="ctr"/>
+            <a:endParaRPr lang="zh-CN" altLang="en-US"/>
+          </a:p>
+        </p:txBody>
+      </p:sp>
+      <p:sp>
+        <p:nvSpPr>
+          <p:cNvPr id="11" name="Group selectMeNow1 Seq_4"/>
+          <p:cNvSpPr/>
+          <p:nvPr/>
+        </p:nvSpPr>
+        <p:spPr>
+          <a:xfrm>
+            <a:off x="5867400" y="4191000"/>
+            <a:ext cx="1828800" cy="1371600"/>
+          </a:xfrm>
+          <a:prstGeom prst="roundRect">
+            <a:avLst/>
+          </a:prstGeom>
+          <a:solidFill>
+            <a:schemeClr val="accent6">
+              <a:alpha val="50000"/>
+            </a:schemeClr>
+          </a:solidFill>
+          <a:ln>
+            <a:noFill/>
+          </a:ln>
+        </p:spPr>
+        <p:style>
+          <a:lnRef idx="0">
+            <a:scrgbClr r="0" g="0" b="0"/>
+          </a:lnRef>
+          <a:fillRef idx="0">
+            <a:scrgbClr r="0" g="0" b="0"/>
+          </a:fillRef>
+          <a:effectRef idx="0">
+            <a:scrgbClr r="0" g="0" b="0"/>
+          </a:effectRef>
+          <a:fontRef idx="minor">
+            <a:schemeClr val="lt1"/>
+          </a:fontRef>
+        </p:style>
+        <p:txBody>
+          <a:bodyPr rtlCol="0" anchor="ctr"/>
+          <a:lstStyle/>
+          <a:p>
+            <a:pPr algn="ctr"/>
+            <a:endParaRPr lang="zh-CN" altLang="en-US"/>
+          </a:p>
+        </p:txBody>
+      </p:sp>
+    </p:spTree>
+    <p:extLst>
+      <p:ext uri="{BB962C8B-B14F-4D97-AF65-F5344CB8AC3E}">
+        <p14:creationId xmlns:p14="http://schemas.microsoft.com/office/powerpoint/2010/main" val="2959027696"/>
+      </p:ext>
+    </p:extLst>
+  </p:cSld>
+  <p:clrMapOvr>
+    <a:masterClrMapping/>
+  </p:clrMapOvr>
+  <p:timing>
+    <p:tnLst>
+      <p:par>
+        <p:cTn id="1" dur="indefinite" restart="never" nodeType="tmRoot">
+          <p:childTnLst>
+            <p:seq concurrent="1" nextAc="seek">
+              <p:cTn id="2" dur="indefinite" nodeType="mainSeq">
+                <p:childTnLst>
+                  <p:par>
+                    <p:cTn id="3" fill="hold">
+                      <p:stCondLst>
+                        <p:cond delay="indefinite"/>
+                      </p:stCondLst>
+                      <p:childTnLst>
+                        <p:par>
+                          <p:cTn id="4" fill="hold">
+                            <p:stCondLst>
+                              <p:cond delay="0"/>
+                            </p:stCondLst>
+                            <p:childTnLst>
+                              <p:par>
+                                <p:cTn id="5" presetID="2" presetClass="entr" presetSubtype="4" fill="hold" grpId="0" nodeType="clickEffect">
+                                  <p:stCondLst>
+                                    <p:cond delay="0"/>
+                                  </p:stCondLst>
+                                  <p:childTnLst>
+                                    <p:set>
+                                      <p:cBhvr>
+                                        <p:cTn id="6" dur="1" fill="hold">
+                                          <p:stCondLst>
+                                            <p:cond delay="0"/>
+                                          </p:stCondLst>
+                                        </p:cTn>
+                                        <p:tgtEl>
+                                          <p:spTgt spid="6"/>
+                                        </p:tgtEl>
+                                        <p:attrNameLst>
+                                          <p:attrName>style.visibility</p:attrName>
+                                        </p:attrNameLst>
+                                      </p:cBhvr>
+                                      <p:to>
+                                        <p:strVal val="visible"/>
+                                      </p:to>
+                                    </p:set>
+                                    <p:anim calcmode="lin" valueType="num">
+                                      <p:cBhvr additive="base">
+                                        <p:cTn id="7" dur="500" fill="hold"/>
+                                        <p:tgtEl>
+                                          <p:spTgt spid="6"/>
+                                        </p:tgtEl>
+                                        <p:attrNameLst>
+                                          <p:attrName>ppt_x</p:attrName>
+                                        </p:attrNameLst>
+                                      </p:cBhvr>
+                                      <p:tavLst>
+                                        <p:tav tm="0">
+                                          <p:val>
+                                            <p:strVal val="#ppt_x"/>
+                                          </p:val>
+                                        </p:tav>
+                                        <p:tav tm="100000">
+                                          <p:val>
+                                            <p:strVal val="#ppt_x"/>
+                                          </p:val>
+                                        </p:tav>
+                                      </p:tavLst>
+                                    </p:anim>
+                                    <p:anim calcmode="lin" valueType="num">
+                                      <p:cBhvr additive="base">
+                                        <p:cTn id="8" dur="500" fill="hold"/>
+                                        <p:tgtEl>
+                                          <p:spTgt spid="6"/>
+                                        </p:tgtEl>
+                                        <p:attrNameLst>
+                                          <p:attrName>ppt_y</p:attrName>
+                                        </p:attrNameLst>
+                                      </p:cBhvr>
+                                      <p:tavLst>
+                                        <p:tav tm="0">
+                                          <p:val>
+                                            <p:strVal val="1+#ppt_h/2"/>
+                                          </p:val>
+                                        </p:tav>
+                                        <p:tav tm="100000">
+                                          <p:val>
+                                            <p:strVal val="#ppt_y"/>
+                                          </p:val>
+                                        </p:tav>
+                                      </p:tavLst>
+                                    </p:anim>
+                                  </p:childTnLst>
+                                </p:cTn>
+                              </p:par>
+                            </p:childTnLst>
+                          </p:cTn>
+                        </p:par>
+                      </p:childTnLst>
+                    </p:cTn>
+                  </p:par>
+                  <p:par>
+                    <p:cTn id="9" fill="hold">
+                      <p:stCondLst>
+                        <p:cond delay="indefinite"/>
+                      </p:stCondLst>
+                      <p:childTnLst>
+                        <p:par>
+                          <p:cTn id="10" fill="hold">
+                            <p:stCondLst>
+                              <p:cond delay="0"/>
+                            </p:stCondLst>
+                            <p:childTnLst>
+                              <p:par>
+                                <p:cTn id="11" presetID="1" presetClass="entr" presetSubtype="0" fill="hold" grpId="0" nodeType="clickEffect">
+                                  <p:stCondLst>
+                                    <p:cond delay="0"/>
+                                  </p:stCondLst>
+                                  <p:childTnLst>
+                                    <p:set>
+                                      <p:cBhvr>
+                                        <p:cTn id="12" dur="1" fill="hold">
+                                          <p:stCondLst>
+                                            <p:cond delay="0"/>
+                                          </p:stCondLst>
+                                        </p:cTn>
+                                        <p:tgtEl>
+                                          <p:spTgt spid="9"/>
+                                        </p:tgtEl>
+                                        <p:attrNameLst>
+                                          <p:attrName>style.visibility</p:attrName>
+                                        </p:attrNameLst>
+                                      </p:cBhvr>
+                                      <p:to>
+                                        <p:strVal val="visible"/>
+                                      </p:to>
+                                    </p:set>
+                                  </p:childTnLst>
+                                </p:cTn>
+                              </p:par>
+                            </p:childTnLst>
+                          </p:cTn>
+                        </p:par>
+                      </p:childTnLst>
+                    </p:cTn>
+                  </p:par>
+                  <p:par>
+                    <p:cTn id="13" fill="hold">
+                      <p:stCondLst>
+                        <p:cond delay="indefinite"/>
+                      </p:stCondLst>
+                      <p:childTnLst>
+                        <p:par>
+                          <p:cTn id="14" fill="hold">
+                            <p:stCondLst>
+                              <p:cond delay="0"/>
+                            </p:stCondLst>
+                            <p:childTnLst>
+                              <p:par>
+                                <p:cTn id="15" presetID="10" presetClass="entr" presetSubtype="0" fill="hold" grpId="0" nodeType="clickEffect">
+                                  <p:stCondLst>
+                                    <p:cond delay="0"/>
+                                  </p:stCondLst>
+                                  <p:childTnLst>
+                                    <p:set>
+                                      <p:cBhvr>
+                                        <p:cTn id="16" dur="1" fill="hold">
+                                          <p:stCondLst>
+                                            <p:cond delay="0"/>
+                                          </p:stCondLst>
+                                        </p:cTn>
+                                        <p:tgtEl>
+                                          <p:spTgt spid="10"/>
+                                        </p:tgtEl>
+                                        <p:attrNameLst>
+                                          <p:attrName>style.visibility</p:attrName>
+                                        </p:attrNameLst>
+                                      </p:cBhvr>
+                                      <p:to>
+                                        <p:strVal val="visible"/>
+                                      </p:to>
+                                    </p:set>
+                                    <p:animEffect transition="in" filter="fade">
+                                      <p:cBhvr>
+                                        <p:cTn id="17" dur="500"/>
+                                        <p:tgtEl>
+                                          <p:spTgt spid="10"/>
+                                        </p:tgtEl>
+                                      </p:cBhvr>
+                                    </p:animEffect>
+                                  </p:childTnLst>
+                                </p:cTn>
+                              </p:par>
+                            </p:childTnLst>
+                          </p:cTn>
+                        </p:par>
+                      </p:childTnLst>
+                    </p:cTn>
+                  </p:par>
+                  <p:par>
+                    <p:cTn id="18" fill="hold">
+                      <p:stCondLst>
+                        <p:cond delay="indefinite"/>
+                      </p:stCondLst>
+                      <p:childTnLst>
+                        <p:par>
+                          <p:cTn id="19" fill="hold">
+                            <p:stCondLst>
+                              <p:cond delay="0"/>
+                            </p:stCondLst>
+                            <p:childTnLst>
+                              <p:par>
+                                <p:cTn id="20" presetID="16" presetClass="entr" presetSubtype="21" fill="hold" grpId="0" nodeType="clickEffect">
+                                  <p:stCondLst>
+                                    <p:cond delay="0"/>
+                                  </p:stCondLst>
+                                  <p:childTnLst>
+                                    <p:set>
+                                      <p:cBhvr>
+                                        <p:cTn id="21" dur="1" fill="hold">
+                                          <p:stCondLst>
+                                            <p:cond delay="0"/>
+                                          </p:stCondLst>
+                                        </p:cTn>
+                                        <p:tgtEl>
+                                          <p:spTgt spid="11"/>
+                                        </p:tgtEl>
+                                        <p:attrNameLst>
+                                          <p:attrName>style.visibility</p:attrName>
+                                        </p:attrNameLst>
+                                      </p:cBhvr>
+                                      <p:to>
+                                        <p:strVal val="visible"/>
+                                      </p:to>
+                                    </p:set>
+                                    <p:animEffect transition="in" filter="barn(inVertical)">
+                                      <p:cBhvr>
+                                        <p:cTn id="22" dur="500"/>
+                                        <p:tgtEl>
+                                          <p:spTgt spid="11"/>
+                                        </p:tgtEl>
+                                      </p:cBhvr>
+                                    </p:animEffect>
+                                  </p:childTnLst>
+                                </p:cTn>
+                              </p:par>
+                            </p:childTnLst>
+                          </p:cTn>
+                        </p:par>
+                      </p:childTnLst>
+                    </p:cTn>
+                  </p:par>
+                </p:childTnLst>
+              </p:cTn>
+              <p:prevCondLst>
+                <p:cond evt="onPrev" delay="0">
+                  <p:tgtEl>
+                    <p:sldTgt/>
+                  </p:tgtEl>
+                </p:cond>
+              </p:prevCondLst>
+              <p:nextCondLst>
+                <p:cond evt="onNext" delay="0">
+                  <p:tgtEl>
+                    <p:sldTgt/>
+                  </p:tgtEl>
+                </p:cond>
+              </p:nextCondLst>
+            </p:seq>
+          </p:childTnLst>
+        </p:cTn>
+      </p:par>
+    </p:tnLst>
+    <p:bldLst>
+      <p:bldP spid="6" grpId="0" animBg="1"/>
+      <p:bldP spid="9" grpId="0" animBg="1"/>
+      <p:bldP spid="10" grpId="0" animBg="1"/>
+      <p:bldP spid="11" grpId="0" animBg="1"/>
+    </p:bldLst>
+  </p:timing>
+</p:sld>
+</file>
+
+<file path=ppt/slides/slide9.xml><?xml version="1.0" encoding="utf-8"?>
 <p:sld xmlns:a="http://schemas.openxmlformats.org/drawingml/2006/main" xmlns:r="http://schemas.openxmlformats.org/officeDocument/2006/relationships" xmlns:p="http://schemas.openxmlformats.org/presentationml/2006/main" show="0">
   <p:cSld name="PPAck201403240026082737">
     <p:spTree>

</xml_diff>

<commit_message>
Add tests for clipboard restoration of shapes lab
</commit_message>
<xml_diff>
--- a/doc/test/ShapesLab/ShapesLab.pptx
+++ b/doc/test/ShapesLab/ShapesLab.pptx
@@ -7,7 +7,7 @@
     <p:sldMasterId id="2147483672" r:id="rId3"/>
   </p:sldMasterIdLst>
   <p:notesMasterIdLst>
-    <p:notesMasterId r:id="rId13"/>
+    <p:notesMasterId r:id="rId20"/>
   </p:notesMasterIdLst>
   <p:sldIdLst>
     <p:sldId id="287" r:id="rId4"/>
@@ -18,7 +18,14 @@
     <p:sldId id="300" r:id="rId9"/>
     <p:sldId id="301" r:id="rId10"/>
     <p:sldId id="302" r:id="rId11"/>
-    <p:sldId id="274" r:id="rId12"/>
+    <p:sldId id="303" r:id="rId12"/>
+    <p:sldId id="304" r:id="rId13"/>
+    <p:sldId id="305" r:id="rId14"/>
+    <p:sldId id="306" r:id="rId15"/>
+    <p:sldId id="307" r:id="rId16"/>
+    <p:sldId id="308" r:id="rId17"/>
+    <p:sldId id="309" r:id="rId18"/>
+    <p:sldId id="274" r:id="rId19"/>
   </p:sldIdLst>
   <p:sldSz cx="9144000" cy="6858000" type="screen4x3"/>
   <p:notesSz cx="6858000" cy="9144000"/>
@@ -134,6 +141,13 @@
             <p14:sldId id="300"/>
             <p14:sldId id="301"/>
             <p14:sldId id="302"/>
+            <p14:sldId id="303"/>
+            <p14:sldId id="304"/>
+            <p14:sldId id="305"/>
+            <p14:sldId id="306"/>
+            <p14:sldId id="307"/>
+            <p14:sldId id="308"/>
+            <p14:sldId id="309"/>
             <p14:sldId id="274"/>
           </p14:sldIdLst>
         </p14:section>
@@ -239,7 +253,7 @@
           <a:p>
             <a:fld id="{26004F41-C1A1-4B0D-9EEE-5E3F0E5BC108}" type="datetimeFigureOut">
               <a:rPr lang="en-SG" smtClean="0"/>
-              <a:t>5/2/2018</a:t>
+              <a:t>10/4/2018</a:t>
             </a:fld>
             <a:endParaRPr lang="en-SG"/>
           </a:p>
@@ -770,6 +784,94 @@
 </p:notes>
 </file>
 
+<file path=ppt/notesSlides/notesSlide10.xml><?xml version="1.0" encoding="utf-8"?>
+<p:notes xmlns:a="http://schemas.openxmlformats.org/drawingml/2006/main" xmlns:r="http://schemas.openxmlformats.org/officeDocument/2006/relationships" xmlns:p="http://schemas.openxmlformats.org/presentationml/2006/main">
+  <p:cSld>
+    <p:spTree>
+      <p:nvGrpSpPr>
+        <p:cNvPr id="1" name=""/>
+        <p:cNvGrpSpPr/>
+        <p:nvPr/>
+      </p:nvGrpSpPr>
+      <p:grpSpPr>
+        <a:xfrm>
+          <a:off x="0" y="0"/>
+          <a:ext cx="0" cy="0"/>
+          <a:chOff x="0" y="0"/>
+          <a:chExt cx="0" cy="0"/>
+        </a:xfrm>
+      </p:grpSpPr>
+      <p:sp>
+        <p:nvSpPr>
+          <p:cNvPr id="2" name="Slide Image Placeholder 1"/>
+          <p:cNvSpPr>
+            <a:spLocks noGrp="1" noRot="1" noChangeAspect="1"/>
+          </p:cNvSpPr>
+          <p:nvPr>
+            <p:ph type="sldImg"/>
+          </p:nvPr>
+        </p:nvSpPr>
+        <p:spPr/>
+      </p:sp>
+      <p:sp>
+        <p:nvSpPr>
+          <p:cNvPr id="3" name="Notes Placeholder 2"/>
+          <p:cNvSpPr>
+            <a:spLocks noGrp="1"/>
+          </p:cNvSpPr>
+          <p:nvPr>
+            <p:ph type="body" idx="1"/>
+          </p:nvPr>
+        </p:nvSpPr>
+        <p:spPr/>
+        <p:txBody>
+          <a:bodyPr/>
+          <a:lstStyle/>
+          <a:p>
+            <a:r>
+              <a:rPr lang="en-US" altLang="zh-CN" dirty="0" smtClean="0"/>
+              <a:t>Expected</a:t>
+            </a:r>
+            <a:endParaRPr lang="zh-CN" altLang="en-US" dirty="0"/>
+          </a:p>
+        </p:txBody>
+      </p:sp>
+      <p:sp>
+        <p:nvSpPr>
+          <p:cNvPr id="4" name="Slide Number Placeholder 3"/>
+          <p:cNvSpPr>
+            <a:spLocks noGrp="1"/>
+          </p:cNvSpPr>
+          <p:nvPr>
+            <p:ph type="sldNum" sz="quarter" idx="10"/>
+          </p:nvPr>
+        </p:nvSpPr>
+        <p:spPr/>
+        <p:txBody>
+          <a:bodyPr/>
+          <a:lstStyle/>
+          <a:p>
+            <a:fld id="{E96FB07A-B1AD-4238-A6C9-967239C45D18}" type="slidenum">
+              <a:rPr lang="en-SG" smtClean="0"/>
+              <a:t>15</a:t>
+            </a:fld>
+            <a:endParaRPr lang="en-SG"/>
+          </a:p>
+        </p:txBody>
+      </p:sp>
+    </p:spTree>
+    <p:extLst>
+      <p:ext uri="{BB962C8B-B14F-4D97-AF65-F5344CB8AC3E}">
+        <p14:creationId xmlns:p14="http://schemas.microsoft.com/office/powerpoint/2010/main" val="1489869118"/>
+      </p:ext>
+    </p:extLst>
+  </p:cSld>
+  <p:clrMapOvr>
+    <a:masterClrMapping/>
+  </p:clrMapOvr>
+</p:notes>
+</file>
+
 <file path=ppt/notesSlides/notesSlide2.xml><?xml version="1.0" encoding="utf-8"?>
 <p:notes xmlns:a="http://schemas.openxmlformats.org/drawingml/2006/main" xmlns:r="http://schemas.openxmlformats.org/officeDocument/2006/relationships" xmlns:p="http://schemas.openxmlformats.org/presentationml/2006/main">
   <p:cSld>
@@ -1114,6 +1216,525 @@
 </p:notes>
 </file>
 
+<file path=ppt/notesSlides/notesSlide6.xml><?xml version="1.0" encoding="utf-8"?>
+<p:notes xmlns:a="http://schemas.openxmlformats.org/drawingml/2006/main" xmlns:r="http://schemas.openxmlformats.org/officeDocument/2006/relationships" xmlns:p="http://schemas.openxmlformats.org/presentationml/2006/main">
+  <p:cSld>
+    <p:spTree>
+      <p:nvGrpSpPr>
+        <p:cNvPr id="1" name=""/>
+        <p:cNvGrpSpPr/>
+        <p:nvPr/>
+      </p:nvGrpSpPr>
+      <p:grpSpPr>
+        <a:xfrm>
+          <a:off x="0" y="0"/>
+          <a:ext cx="0" cy="0"/>
+          <a:chOff x="0" y="0"/>
+          <a:chExt cx="0" cy="0"/>
+        </a:xfrm>
+      </p:grpSpPr>
+      <p:sp>
+        <p:nvSpPr>
+          <p:cNvPr id="2" name="Slide Image Placeholder 1"/>
+          <p:cNvSpPr>
+            <a:spLocks noGrp="1" noRot="1" noChangeAspect="1"/>
+          </p:cNvSpPr>
+          <p:nvPr>
+            <p:ph type="sldImg"/>
+          </p:nvPr>
+        </p:nvSpPr>
+        <p:spPr/>
+      </p:sp>
+      <p:sp>
+        <p:nvSpPr>
+          <p:cNvPr id="3" name="Notes Placeholder 2"/>
+          <p:cNvSpPr>
+            <a:spLocks noGrp="1"/>
+          </p:cNvSpPr>
+          <p:nvPr>
+            <p:ph type="body" idx="1"/>
+          </p:nvPr>
+        </p:nvSpPr>
+        <p:spPr/>
+        <p:txBody>
+          <a:bodyPr/>
+          <a:lstStyle/>
+          <a:p>
+            <a:r>
+              <a:rPr lang="en-US" dirty="0" smtClean="0"/>
+              <a:t>Do the following from 3 environments:</a:t>
+            </a:r>
+          </a:p>
+          <a:p>
+            <a:r>
+              <a:rPr lang="en-US" dirty="0" smtClean="0"/>
+              <a:t>1. Entirely new environment</a:t>
+            </a:r>
+          </a:p>
+          <a:p>
+            <a:r>
+              <a:rPr lang="en-US" dirty="0" smtClean="0"/>
+              <a:t>2. Contains old shape info</a:t>
+            </a:r>
+          </a:p>
+          <a:p>
+            <a:endParaRPr lang="en-US" dirty="0" smtClean="0"/>
+          </a:p>
+          <a:p>
+            <a:r>
+              <a:rPr lang="en-US" dirty="0" smtClean="0"/>
+              <a:t>1. Add Category</a:t>
+            </a:r>
+          </a:p>
+          <a:p>
+            <a:r>
+              <a:rPr lang="en-US" dirty="0" smtClean="0"/>
+              <a:t>	1.1 Add category then add a new shape inside, check the default name, close and open to check</a:t>
+            </a:r>
+          </a:p>
+          <a:p>
+            <a:r>
+              <a:rPr lang="en-US" dirty="0" smtClean="0"/>
+              <a:t>	1.2 Add category then add a new shape inside, check the default name, set the category as default, close and open to check</a:t>
+            </a:r>
+          </a:p>
+          <a:p>
+            <a:r>
+              <a:rPr lang="en-US" dirty="0" smtClean="0"/>
+              <a:t>2. Rename Category</a:t>
+            </a:r>
+          </a:p>
+          <a:p>
+            <a:r>
+              <a:rPr lang="en-US" dirty="0" smtClean="0"/>
+              <a:t>	2.1 Rename to a valid name</a:t>
+            </a:r>
+          </a:p>
+          <a:p>
+            <a:r>
+              <a:rPr lang="en-US" dirty="0" smtClean="0"/>
+              <a:t>	2.2 Rename to an </a:t>
+            </a:r>
+            <a:r>
+              <a:rPr lang="en-US" dirty="0" err="1" smtClean="0"/>
+              <a:t>invaid</a:t>
+            </a:r>
+            <a:r>
+              <a:rPr lang="en-US" dirty="0" smtClean="0"/>
+              <a:t> name</a:t>
+            </a:r>
+          </a:p>
+          <a:p>
+            <a:r>
+              <a:rPr lang="en-US" dirty="0" smtClean="0"/>
+              <a:t>3. Import Category</a:t>
+            </a:r>
+          </a:p>
+          <a:p>
+            <a:r>
+              <a:rPr lang="en-US" dirty="0" smtClean="0"/>
+              <a:t>	3.1 Import single category with </a:t>
+            </a:r>
+            <a:r>
+              <a:rPr lang="en-US" dirty="0" err="1" smtClean="0"/>
+              <a:t>namebox</a:t>
+            </a:r>
+            <a:r>
+              <a:rPr lang="en-US" dirty="0" smtClean="0"/>
+              <a:t>, no conflict name</a:t>
+            </a:r>
+          </a:p>
+          <a:p>
+            <a:r>
+              <a:rPr lang="en-US" dirty="0" smtClean="0"/>
+              <a:t>	3.2 Import multiple categories with </a:t>
+            </a:r>
+            <a:r>
+              <a:rPr lang="en-US" dirty="0" err="1" smtClean="0"/>
+              <a:t>nameboxes</a:t>
+            </a:r>
+            <a:r>
+              <a:rPr lang="en-US" dirty="0" smtClean="0"/>
+              <a:t>, no </a:t>
+            </a:r>
+            <a:r>
+              <a:rPr lang="en-US" dirty="0" err="1" smtClean="0"/>
+              <a:t>confilct</a:t>
+            </a:r>
+            <a:r>
+              <a:rPr lang="en-US" dirty="0" smtClean="0"/>
+              <a:t> name</a:t>
+            </a:r>
+          </a:p>
+          <a:p>
+            <a:r>
+              <a:rPr lang="en-US" dirty="0" smtClean="0"/>
+              <a:t>	3.3 Import single category with </a:t>
+            </a:r>
+            <a:r>
+              <a:rPr lang="en-US" dirty="0" err="1" smtClean="0"/>
+              <a:t>namebox</a:t>
+            </a:r>
+            <a:r>
+              <a:rPr lang="en-US" dirty="0" smtClean="0"/>
+              <a:t>, conflict with one existed name</a:t>
+            </a:r>
+          </a:p>
+          <a:p>
+            <a:r>
+              <a:rPr lang="en-US" dirty="0" smtClean="0"/>
+              <a:t>	3.4 Import multiple categories with </a:t>
+            </a:r>
+            <a:r>
+              <a:rPr lang="en-US" dirty="0" err="1" smtClean="0"/>
+              <a:t>nameboxes</a:t>
+            </a:r>
+            <a:r>
+              <a:rPr lang="en-US" dirty="0" smtClean="0"/>
+              <a:t>, some of the boxes conflict with existed name</a:t>
+            </a:r>
+          </a:p>
+          <a:p>
+            <a:r>
+              <a:rPr lang="en-US" dirty="0" smtClean="0"/>
+              <a:t>	3.5 Import single category without </a:t>
+            </a:r>
+            <a:r>
+              <a:rPr lang="en-US" dirty="0" err="1" smtClean="0"/>
+              <a:t>namebox</a:t>
+            </a:r>
+            <a:endParaRPr lang="en-US" dirty="0" smtClean="0"/>
+          </a:p>
+          <a:p>
+            <a:r>
+              <a:rPr lang="en-US" dirty="0" smtClean="0"/>
+              <a:t>	3.6 Import single category without </a:t>
+            </a:r>
+            <a:r>
+              <a:rPr lang="en-US" dirty="0" err="1" smtClean="0"/>
+              <a:t>namebox</a:t>
+            </a:r>
+            <a:r>
+              <a:rPr lang="en-US" dirty="0" smtClean="0"/>
+              <a:t>, conflict with exist name</a:t>
+            </a:r>
+          </a:p>
+          <a:p>
+            <a:r>
+              <a:rPr lang="en-US" dirty="0" smtClean="0"/>
+              <a:t>	3.7 Import multiple categories without </a:t>
+            </a:r>
+            <a:r>
+              <a:rPr lang="en-US" dirty="0" err="1" smtClean="0"/>
+              <a:t>namebox</a:t>
+            </a:r>
+            <a:endParaRPr lang="en-US" dirty="0" smtClean="0"/>
+          </a:p>
+          <a:p>
+            <a:r>
+              <a:rPr lang="en-US" dirty="0" smtClean="0"/>
+              <a:t>4. </a:t>
+            </a:r>
+            <a:r>
+              <a:rPr lang="en-US" smtClean="0"/>
+              <a:t>Migrate Category</a:t>
+            </a:r>
+            <a:endParaRPr lang="en-US"/>
+          </a:p>
+        </p:txBody>
+      </p:sp>
+      <p:sp>
+        <p:nvSpPr>
+          <p:cNvPr id="4" name="Slide Number Placeholder 3"/>
+          <p:cNvSpPr>
+            <a:spLocks noGrp="1"/>
+          </p:cNvSpPr>
+          <p:nvPr>
+            <p:ph type="sldNum" sz="quarter" idx="10"/>
+          </p:nvPr>
+        </p:nvSpPr>
+        <p:spPr/>
+        <p:txBody>
+          <a:bodyPr/>
+          <a:lstStyle/>
+          <a:p>
+            <a:fld id="{E96FB07A-B1AD-4238-A6C9-967239C45D18}" type="slidenum">
+              <a:rPr lang="en-SG" smtClean="0"/>
+              <a:t>9</a:t>
+            </a:fld>
+            <a:endParaRPr lang="en-SG"/>
+          </a:p>
+        </p:txBody>
+      </p:sp>
+    </p:spTree>
+    <p:extLst>
+      <p:ext uri="{BB962C8B-B14F-4D97-AF65-F5344CB8AC3E}">
+        <p14:creationId xmlns:p14="http://schemas.microsoft.com/office/powerpoint/2010/main" val="2266019478"/>
+      </p:ext>
+    </p:extLst>
+  </p:cSld>
+  <p:clrMapOvr>
+    <a:masterClrMapping/>
+  </p:clrMapOvr>
+</p:notes>
+</file>
+
+<file path=ppt/notesSlides/notesSlide7.xml><?xml version="1.0" encoding="utf-8"?>
+<p:notes xmlns:a="http://schemas.openxmlformats.org/drawingml/2006/main" xmlns:r="http://schemas.openxmlformats.org/officeDocument/2006/relationships" xmlns:p="http://schemas.openxmlformats.org/presentationml/2006/main">
+  <p:cSld>
+    <p:spTree>
+      <p:nvGrpSpPr>
+        <p:cNvPr id="1" name=""/>
+        <p:cNvGrpSpPr/>
+        <p:nvPr/>
+      </p:nvGrpSpPr>
+      <p:grpSpPr>
+        <a:xfrm>
+          <a:off x="0" y="0"/>
+          <a:ext cx="0" cy="0"/>
+          <a:chOff x="0" y="0"/>
+          <a:chExt cx="0" cy="0"/>
+        </a:xfrm>
+      </p:grpSpPr>
+      <p:sp>
+        <p:nvSpPr>
+          <p:cNvPr id="2" name="Slide Image Placeholder 1"/>
+          <p:cNvSpPr>
+            <a:spLocks noGrp="1" noRot="1" noChangeAspect="1"/>
+          </p:cNvSpPr>
+          <p:nvPr>
+            <p:ph type="sldImg"/>
+          </p:nvPr>
+        </p:nvSpPr>
+        <p:spPr/>
+      </p:sp>
+      <p:sp>
+        <p:nvSpPr>
+          <p:cNvPr id="3" name="Notes Placeholder 2"/>
+          <p:cNvSpPr>
+            <a:spLocks noGrp="1"/>
+          </p:cNvSpPr>
+          <p:nvPr>
+            <p:ph type="body" idx="1"/>
+          </p:nvPr>
+        </p:nvSpPr>
+        <p:spPr/>
+        <p:txBody>
+          <a:bodyPr/>
+          <a:lstStyle/>
+          <a:p>
+            <a:endParaRPr lang="zh-CN" altLang="en-US" dirty="0"/>
+          </a:p>
+        </p:txBody>
+      </p:sp>
+      <p:sp>
+        <p:nvSpPr>
+          <p:cNvPr id="4" name="Slide Number Placeholder 3"/>
+          <p:cNvSpPr>
+            <a:spLocks noGrp="1"/>
+          </p:cNvSpPr>
+          <p:nvPr>
+            <p:ph type="sldNum" sz="quarter" idx="10"/>
+          </p:nvPr>
+        </p:nvSpPr>
+        <p:spPr/>
+        <p:txBody>
+          <a:bodyPr/>
+          <a:lstStyle/>
+          <a:p>
+            <a:fld id="{E96FB07A-B1AD-4238-A6C9-967239C45D18}" type="slidenum">
+              <a:rPr lang="en-SG" smtClean="0"/>
+              <a:t>10</a:t>
+            </a:fld>
+            <a:endParaRPr lang="en-SG"/>
+          </a:p>
+        </p:txBody>
+      </p:sp>
+    </p:spTree>
+    <p:extLst>
+      <p:ext uri="{BB962C8B-B14F-4D97-AF65-F5344CB8AC3E}">
+        <p14:creationId xmlns:p14="http://schemas.microsoft.com/office/powerpoint/2010/main" val="2797961642"/>
+      </p:ext>
+    </p:extLst>
+  </p:cSld>
+  <p:clrMapOvr>
+    <a:masterClrMapping/>
+  </p:clrMapOvr>
+</p:notes>
+</file>
+
+<file path=ppt/notesSlides/notesSlide8.xml><?xml version="1.0" encoding="utf-8"?>
+<p:notes xmlns:a="http://schemas.openxmlformats.org/drawingml/2006/main" xmlns:r="http://schemas.openxmlformats.org/officeDocument/2006/relationships" xmlns:p="http://schemas.openxmlformats.org/presentationml/2006/main">
+  <p:cSld>
+    <p:spTree>
+      <p:nvGrpSpPr>
+        <p:cNvPr id="1" name=""/>
+        <p:cNvGrpSpPr/>
+        <p:nvPr/>
+      </p:nvGrpSpPr>
+      <p:grpSpPr>
+        <a:xfrm>
+          <a:off x="0" y="0"/>
+          <a:ext cx="0" cy="0"/>
+          <a:chOff x="0" y="0"/>
+          <a:chExt cx="0" cy="0"/>
+        </a:xfrm>
+      </p:grpSpPr>
+      <p:sp>
+        <p:nvSpPr>
+          <p:cNvPr id="2" name="Slide Image Placeholder 1"/>
+          <p:cNvSpPr>
+            <a:spLocks noGrp="1" noRot="1" noChangeAspect="1"/>
+          </p:cNvSpPr>
+          <p:nvPr>
+            <p:ph type="sldImg"/>
+          </p:nvPr>
+        </p:nvSpPr>
+        <p:spPr/>
+      </p:sp>
+      <p:sp>
+        <p:nvSpPr>
+          <p:cNvPr id="3" name="Notes Placeholder 2"/>
+          <p:cNvSpPr>
+            <a:spLocks noGrp="1"/>
+          </p:cNvSpPr>
+          <p:nvPr>
+            <p:ph type="body" idx="1"/>
+          </p:nvPr>
+        </p:nvSpPr>
+        <p:spPr/>
+        <p:txBody>
+          <a:bodyPr/>
+          <a:lstStyle/>
+          <a:p>
+            <a:r>
+              <a:rPr lang="en-US" altLang="zh-CN" dirty="0" smtClean="0"/>
+              <a:t>Expected</a:t>
+            </a:r>
+            <a:endParaRPr lang="zh-CN" altLang="en-US" dirty="0"/>
+          </a:p>
+        </p:txBody>
+      </p:sp>
+      <p:sp>
+        <p:nvSpPr>
+          <p:cNvPr id="4" name="Slide Number Placeholder 3"/>
+          <p:cNvSpPr>
+            <a:spLocks noGrp="1"/>
+          </p:cNvSpPr>
+          <p:nvPr>
+            <p:ph type="sldNum" sz="quarter" idx="10"/>
+          </p:nvPr>
+        </p:nvSpPr>
+        <p:spPr/>
+        <p:txBody>
+          <a:bodyPr/>
+          <a:lstStyle/>
+          <a:p>
+            <a:fld id="{E96FB07A-B1AD-4238-A6C9-967239C45D18}" type="slidenum">
+              <a:rPr lang="en-SG" smtClean="0"/>
+              <a:t>12</a:t>
+            </a:fld>
+            <a:endParaRPr lang="en-SG"/>
+          </a:p>
+        </p:txBody>
+      </p:sp>
+    </p:spTree>
+    <p:extLst>
+      <p:ext uri="{BB962C8B-B14F-4D97-AF65-F5344CB8AC3E}">
+        <p14:creationId xmlns:p14="http://schemas.microsoft.com/office/powerpoint/2010/main" val="555831886"/>
+      </p:ext>
+    </p:extLst>
+  </p:cSld>
+  <p:clrMapOvr>
+    <a:masterClrMapping/>
+  </p:clrMapOvr>
+</p:notes>
+</file>
+
+<file path=ppt/notesSlides/notesSlide9.xml><?xml version="1.0" encoding="utf-8"?>
+<p:notes xmlns:a="http://schemas.openxmlformats.org/drawingml/2006/main" xmlns:r="http://schemas.openxmlformats.org/officeDocument/2006/relationships" xmlns:p="http://schemas.openxmlformats.org/presentationml/2006/main">
+  <p:cSld>
+    <p:spTree>
+      <p:nvGrpSpPr>
+        <p:cNvPr id="1" name=""/>
+        <p:cNvGrpSpPr/>
+        <p:nvPr/>
+      </p:nvGrpSpPr>
+      <p:grpSpPr>
+        <a:xfrm>
+          <a:off x="0" y="0"/>
+          <a:ext cx="0" cy="0"/>
+          <a:chOff x="0" y="0"/>
+          <a:chExt cx="0" cy="0"/>
+        </a:xfrm>
+      </p:grpSpPr>
+      <p:sp>
+        <p:nvSpPr>
+          <p:cNvPr id="2" name="Slide Image Placeholder 1"/>
+          <p:cNvSpPr>
+            <a:spLocks noGrp="1" noRot="1" noChangeAspect="1"/>
+          </p:cNvSpPr>
+          <p:nvPr>
+            <p:ph type="sldImg"/>
+          </p:nvPr>
+        </p:nvSpPr>
+        <p:spPr/>
+      </p:sp>
+      <p:sp>
+        <p:nvSpPr>
+          <p:cNvPr id="3" name="Notes Placeholder 2"/>
+          <p:cNvSpPr>
+            <a:spLocks noGrp="1"/>
+          </p:cNvSpPr>
+          <p:nvPr>
+            <p:ph type="body" idx="1"/>
+          </p:nvPr>
+        </p:nvSpPr>
+        <p:spPr/>
+        <p:txBody>
+          <a:bodyPr/>
+          <a:lstStyle/>
+          <a:p>
+            <a:endParaRPr lang="zh-CN" altLang="en-US" dirty="0"/>
+          </a:p>
+        </p:txBody>
+      </p:sp>
+      <p:sp>
+        <p:nvSpPr>
+          <p:cNvPr id="4" name="Slide Number Placeholder 3"/>
+          <p:cNvSpPr>
+            <a:spLocks noGrp="1"/>
+          </p:cNvSpPr>
+          <p:nvPr>
+            <p:ph type="sldNum" sz="quarter" idx="10"/>
+          </p:nvPr>
+        </p:nvSpPr>
+        <p:spPr/>
+        <p:txBody>
+          <a:bodyPr/>
+          <a:lstStyle/>
+          <a:p>
+            <a:fld id="{E96FB07A-B1AD-4238-A6C9-967239C45D18}" type="slidenum">
+              <a:rPr lang="en-SG" smtClean="0"/>
+              <a:t>13</a:t>
+            </a:fld>
+            <a:endParaRPr lang="en-SG"/>
+          </a:p>
+        </p:txBody>
+      </p:sp>
+    </p:spTree>
+    <p:extLst>
+      <p:ext uri="{BB962C8B-B14F-4D97-AF65-F5344CB8AC3E}">
+        <p14:creationId xmlns:p14="http://schemas.microsoft.com/office/powerpoint/2010/main" val="2516482548"/>
+      </p:ext>
+    </p:extLst>
+  </p:cSld>
+  <p:clrMapOvr>
+    <a:masterClrMapping/>
+  </p:clrMapOvr>
+</p:notes>
+</file>
+
 <file path=ppt/slideLayouts/slideLayout1.xml><?xml version="1.0" encoding="utf-8"?>
 <p:sldLayout xmlns:a="http://schemas.openxmlformats.org/drawingml/2006/main" xmlns:r="http://schemas.openxmlformats.org/officeDocument/2006/relationships" xmlns:p="http://schemas.openxmlformats.org/presentationml/2006/main" type="title" preserve="1">
   <p:cSld name="Title Slide">
@@ -1295,7 +1916,7 @@
           <a:p>
             <a:fld id="{699DC775-C286-4358-8C92-D7E584E969B3}" type="datetimeFigureOut">
               <a:rPr lang="en-US" smtClean="0"/>
-              <a:t>2/5/2018</a:t>
+              <a:t>4/10/2018</a:t>
             </a:fld>
             <a:endParaRPr lang="en-US"/>
           </a:p>
@@ -1465,7 +2086,7 @@
           <a:p>
             <a:fld id="{699DC775-C286-4358-8C92-D7E584E969B3}" type="datetimeFigureOut">
               <a:rPr lang="en-US" smtClean="0"/>
-              <a:t>2/5/2018</a:t>
+              <a:t>4/10/2018</a:t>
             </a:fld>
             <a:endParaRPr lang="en-US"/>
           </a:p>
@@ -1645,7 +2266,7 @@
           <a:p>
             <a:fld id="{699DC775-C286-4358-8C92-D7E584E969B3}" type="datetimeFigureOut">
               <a:rPr lang="en-US" smtClean="0"/>
-              <a:t>2/5/2018</a:t>
+              <a:t>4/10/2018</a:t>
             </a:fld>
             <a:endParaRPr lang="en-US"/>
           </a:p>
@@ -1887,7 +2508,7 @@
           <a:p>
             <a:fld id="{699DC775-C286-4358-8C92-D7E584E969B3}" type="datetimeFigureOut">
               <a:rPr lang="en-US" smtClean="0"/>
-              <a:t>2/5/2018</a:t>
+              <a:t>4/10/2018</a:t>
             </a:fld>
             <a:endParaRPr lang="en-US"/>
           </a:p>
@@ -2057,7 +2678,7 @@
           <a:p>
             <a:fld id="{699DC775-C286-4358-8C92-D7E584E969B3}" type="datetimeFigureOut">
               <a:rPr lang="en-US" smtClean="0"/>
-              <a:t>2/5/2018</a:t>
+              <a:t>4/10/2018</a:t>
             </a:fld>
             <a:endParaRPr lang="en-US"/>
           </a:p>
@@ -2303,7 +2924,7 @@
           <a:p>
             <a:fld id="{699DC775-C286-4358-8C92-D7E584E969B3}" type="datetimeFigureOut">
               <a:rPr lang="en-US" smtClean="0"/>
-              <a:t>2/5/2018</a:t>
+              <a:t>4/10/2018</a:t>
             </a:fld>
             <a:endParaRPr lang="en-US"/>
           </a:p>
@@ -2591,7 +3212,7 @@
           <a:p>
             <a:fld id="{699DC775-C286-4358-8C92-D7E584E969B3}" type="datetimeFigureOut">
               <a:rPr lang="en-US" smtClean="0"/>
-              <a:t>2/5/2018</a:t>
+              <a:t>4/10/2018</a:t>
             </a:fld>
             <a:endParaRPr lang="en-US"/>
           </a:p>
@@ -3013,7 +3634,7 @@
           <a:p>
             <a:fld id="{699DC775-C286-4358-8C92-D7E584E969B3}" type="datetimeFigureOut">
               <a:rPr lang="en-US" smtClean="0"/>
-              <a:t>2/5/2018</a:t>
+              <a:t>4/10/2018</a:t>
             </a:fld>
             <a:endParaRPr lang="en-US"/>
           </a:p>
@@ -3131,7 +3752,7 @@
           <a:p>
             <a:fld id="{699DC775-C286-4358-8C92-D7E584E969B3}" type="datetimeFigureOut">
               <a:rPr lang="en-US" smtClean="0"/>
-              <a:t>2/5/2018</a:t>
+              <a:t>4/10/2018</a:t>
             </a:fld>
             <a:endParaRPr lang="en-US"/>
           </a:p>
@@ -3226,7 +3847,7 @@
           <a:p>
             <a:fld id="{699DC775-C286-4358-8C92-D7E584E969B3}" type="datetimeFigureOut">
               <a:rPr lang="en-US" smtClean="0"/>
-              <a:t>2/5/2018</a:t>
+              <a:t>4/10/2018</a:t>
             </a:fld>
             <a:endParaRPr lang="en-US"/>
           </a:p>
@@ -3503,7 +4124,7 @@
           <a:p>
             <a:fld id="{699DC775-C286-4358-8C92-D7E584E969B3}" type="datetimeFigureOut">
               <a:rPr lang="en-US" smtClean="0"/>
-              <a:t>2/5/2018</a:t>
+              <a:t>4/10/2018</a:t>
             </a:fld>
             <a:endParaRPr lang="en-US"/>
           </a:p>
@@ -3673,7 +4294,7 @@
           <a:p>
             <a:fld id="{699DC775-C286-4358-8C92-D7E584E969B3}" type="datetimeFigureOut">
               <a:rPr lang="en-US" smtClean="0"/>
-              <a:t>2/5/2018</a:t>
+              <a:t>4/10/2018</a:t>
             </a:fld>
             <a:endParaRPr lang="en-US"/>
           </a:p>
@@ -3926,7 +4547,7 @@
           <a:p>
             <a:fld id="{699DC775-C286-4358-8C92-D7E584E969B3}" type="datetimeFigureOut">
               <a:rPr lang="en-US" smtClean="0"/>
-              <a:t>2/5/2018</a:t>
+              <a:t>4/10/2018</a:t>
             </a:fld>
             <a:endParaRPr lang="en-US"/>
           </a:p>
@@ -4096,7 +4717,7 @@
           <a:p>
             <a:fld id="{699DC775-C286-4358-8C92-D7E584E969B3}" type="datetimeFigureOut">
               <a:rPr lang="en-US" smtClean="0"/>
-              <a:t>2/5/2018</a:t>
+              <a:t>4/10/2018</a:t>
             </a:fld>
             <a:endParaRPr lang="en-US"/>
           </a:p>
@@ -4276,7 +4897,7 @@
           <a:p>
             <a:fld id="{699DC775-C286-4358-8C92-D7E584E969B3}" type="datetimeFigureOut">
               <a:rPr lang="en-US" smtClean="0"/>
-              <a:t>2/5/2018</a:t>
+              <a:t>4/10/2018</a:t>
             </a:fld>
             <a:endParaRPr lang="en-US"/>
           </a:p>
@@ -4526,7 +5147,7 @@
           <a:p>
             <a:fld id="{699DC775-C286-4358-8C92-D7E584E969B3}" type="datetimeFigureOut">
               <a:rPr lang="en-US" smtClean="0"/>
-              <a:t>2/5/2018</a:t>
+              <a:t>4/10/2018</a:t>
             </a:fld>
             <a:endParaRPr lang="en-US"/>
           </a:p>
@@ -4704,7 +5325,7 @@
           <a:p>
             <a:fld id="{699DC775-C286-4358-8C92-D7E584E969B3}" type="datetimeFigureOut">
               <a:rPr lang="en-US" smtClean="0"/>
-              <a:t>2/5/2018</a:t>
+              <a:t>4/10/2018</a:t>
             </a:fld>
             <a:endParaRPr lang="en-US"/>
           </a:p>
@@ -4958,7 +5579,7 @@
           <a:p>
             <a:fld id="{699DC775-C286-4358-8C92-D7E584E969B3}" type="datetimeFigureOut">
               <a:rPr lang="en-US" smtClean="0"/>
-              <a:t>2/5/2018</a:t>
+              <a:t>4/10/2018</a:t>
             </a:fld>
             <a:endParaRPr lang="en-US"/>
           </a:p>
@@ -5254,7 +5875,7 @@
           <a:p>
             <a:fld id="{699DC775-C286-4358-8C92-D7E584E969B3}" type="datetimeFigureOut">
               <a:rPr lang="en-US" smtClean="0"/>
-              <a:t>2/5/2018</a:t>
+              <a:t>4/10/2018</a:t>
             </a:fld>
             <a:endParaRPr lang="en-US"/>
           </a:p>
@@ -5684,7 +6305,7 @@
           <a:p>
             <a:fld id="{699DC775-C286-4358-8C92-D7E584E969B3}" type="datetimeFigureOut">
               <a:rPr lang="en-US" smtClean="0"/>
-              <a:t>2/5/2018</a:t>
+              <a:t>4/10/2018</a:t>
             </a:fld>
             <a:endParaRPr lang="en-US"/>
           </a:p>
@@ -5810,7 +6431,7 @@
           <a:p>
             <a:fld id="{699DC775-C286-4358-8C92-D7E584E969B3}" type="datetimeFigureOut">
               <a:rPr lang="en-US" smtClean="0"/>
-              <a:t>2/5/2018</a:t>
+              <a:t>4/10/2018</a:t>
             </a:fld>
             <a:endParaRPr lang="en-US"/>
           </a:p>
@@ -5913,7 +6534,7 @@
           <a:p>
             <a:fld id="{699DC775-C286-4358-8C92-D7E584E969B3}" type="datetimeFigureOut">
               <a:rPr lang="en-US" smtClean="0"/>
-              <a:t>2/5/2018</a:t>
+              <a:t>4/10/2018</a:t>
             </a:fld>
             <a:endParaRPr lang="en-US"/>
           </a:p>
@@ -6159,7 +6780,7 @@
           <a:p>
             <a:fld id="{699DC775-C286-4358-8C92-D7E584E969B3}" type="datetimeFigureOut">
               <a:rPr lang="en-US" smtClean="0"/>
-              <a:t>2/5/2018</a:t>
+              <a:t>4/10/2018</a:t>
             </a:fld>
             <a:endParaRPr lang="en-US"/>
           </a:p>
@@ -6444,7 +7065,7 @@
           <a:p>
             <a:fld id="{699DC775-C286-4358-8C92-D7E584E969B3}" type="datetimeFigureOut">
               <a:rPr lang="en-US" smtClean="0"/>
-              <a:t>2/5/2018</a:t>
+              <a:t>4/10/2018</a:t>
             </a:fld>
             <a:endParaRPr lang="en-US"/>
           </a:p>
@@ -6705,7 +7326,7 @@
           <a:p>
             <a:fld id="{699DC775-C286-4358-8C92-D7E584E969B3}" type="datetimeFigureOut">
               <a:rPr lang="en-US" smtClean="0"/>
-              <a:t>2/5/2018</a:t>
+              <a:t>4/10/2018</a:t>
             </a:fld>
             <a:endParaRPr lang="en-US"/>
           </a:p>
@@ -6883,7 +7504,7 @@
           <a:p>
             <a:fld id="{699DC775-C286-4358-8C92-D7E584E969B3}" type="datetimeFigureOut">
               <a:rPr lang="en-US" smtClean="0"/>
-              <a:t>2/5/2018</a:t>
+              <a:t>4/10/2018</a:t>
             </a:fld>
             <a:endParaRPr lang="en-US"/>
           </a:p>
@@ -7071,7 +7692,7 @@
           <a:p>
             <a:fld id="{699DC775-C286-4358-8C92-D7E584E969B3}" type="datetimeFigureOut">
               <a:rPr lang="en-US" smtClean="0"/>
-              <a:t>2/5/2018</a:t>
+              <a:t>4/10/2018</a:t>
             </a:fld>
             <a:endParaRPr lang="en-US"/>
           </a:p>
@@ -7359,7 +7980,7 @@
           <a:p>
             <a:fld id="{699DC775-C286-4358-8C92-D7E584E969B3}" type="datetimeFigureOut">
               <a:rPr lang="en-US" smtClean="0"/>
-              <a:t>2/5/2018</a:t>
+              <a:t>4/10/2018</a:t>
             </a:fld>
             <a:endParaRPr lang="en-US"/>
           </a:p>
@@ -7781,7 +8402,7 @@
           <a:p>
             <a:fld id="{699DC775-C286-4358-8C92-D7E584E969B3}" type="datetimeFigureOut">
               <a:rPr lang="en-US" smtClean="0"/>
-              <a:t>2/5/2018</a:t>
+              <a:t>4/10/2018</a:t>
             </a:fld>
             <a:endParaRPr lang="en-US"/>
           </a:p>
@@ -7899,7 +8520,7 @@
           <a:p>
             <a:fld id="{699DC775-C286-4358-8C92-D7E584E969B3}" type="datetimeFigureOut">
               <a:rPr lang="en-US" smtClean="0"/>
-              <a:t>2/5/2018</a:t>
+              <a:t>4/10/2018</a:t>
             </a:fld>
             <a:endParaRPr lang="en-US"/>
           </a:p>
@@ -7994,7 +8615,7 @@
           <a:p>
             <a:fld id="{699DC775-C286-4358-8C92-D7E584E969B3}" type="datetimeFigureOut">
               <a:rPr lang="en-US" smtClean="0"/>
-              <a:t>2/5/2018</a:t>
+              <a:t>4/10/2018</a:t>
             </a:fld>
             <a:endParaRPr lang="en-US"/>
           </a:p>
@@ -8271,7 +8892,7 @@
           <a:p>
             <a:fld id="{699DC775-C286-4358-8C92-D7E584E969B3}" type="datetimeFigureOut">
               <a:rPr lang="en-US" smtClean="0"/>
-              <a:t>2/5/2018</a:t>
+              <a:t>4/10/2018</a:t>
             </a:fld>
             <a:endParaRPr lang="en-US"/>
           </a:p>
@@ -8524,7 +9145,7 @@
           <a:p>
             <a:fld id="{699DC775-C286-4358-8C92-D7E584E969B3}" type="datetimeFigureOut">
               <a:rPr lang="en-US" smtClean="0"/>
-              <a:t>2/5/2018</a:t>
+              <a:t>4/10/2018</a:t>
             </a:fld>
             <a:endParaRPr lang="en-US"/>
           </a:p>
@@ -8737,7 +9358,7 @@
           <a:p>
             <a:fld id="{699DC775-C286-4358-8C92-D7E584E969B3}" type="datetimeFigureOut">
               <a:rPr lang="en-US" smtClean="0"/>
-              <a:t>2/5/2018</a:t>
+              <a:t>4/10/2018</a:t>
             </a:fld>
             <a:endParaRPr lang="en-US"/>
           </a:p>
@@ -9252,7 +9873,7 @@
           <a:p>
             <a:fld id="{699DC775-C286-4358-8C92-D7E584E969B3}" type="datetimeFigureOut">
               <a:rPr lang="en-US" smtClean="0"/>
-              <a:t>2/5/2018</a:t>
+              <a:t>4/10/2018</a:t>
             </a:fld>
             <a:endParaRPr lang="en-US"/>
           </a:p>
@@ -9765,7 +10386,7 @@
           <a:p>
             <a:fld id="{699DC775-C286-4358-8C92-D7E584E969B3}" type="datetimeFigureOut">
               <a:rPr lang="en-US" smtClean="0"/>
-              <a:t>2/5/2018</a:t>
+              <a:t>4/10/2018</a:t>
             </a:fld>
             <a:endParaRPr lang="en-US"/>
           </a:p>
@@ -10327,6 +10948,2505 @@
 </p:sld>
 </file>
 
+<file path=ppt/slides/slide10.xml><?xml version="1.0" encoding="utf-8"?>
+<p:sld xmlns:a="http://schemas.openxmlformats.org/drawingml/2006/main" xmlns:r="http://schemas.openxmlformats.org/officeDocument/2006/relationships" xmlns:p="http://schemas.openxmlformats.org/presentationml/2006/main">
+  <p:cSld>
+    <p:spTree>
+      <p:nvGrpSpPr>
+        <p:cNvPr id="1" name=""/>
+        <p:cNvGrpSpPr/>
+        <p:nvPr/>
+      </p:nvGrpSpPr>
+      <p:grpSpPr>
+        <a:xfrm>
+          <a:off x="0" y="0"/>
+          <a:ext cx="0" cy="0"/>
+          <a:chOff x="0" y="0"/>
+          <a:chExt cx="0" cy="0"/>
+        </a:xfrm>
+      </p:grpSpPr>
+      <p:sp>
+        <p:nvSpPr>
+          <p:cNvPr id="3" name="selectMe1"/>
+          <p:cNvSpPr/>
+          <p:nvPr/>
+        </p:nvSpPr>
+        <p:spPr>
+          <a:xfrm>
+            <a:off x="1524000" y="990600"/>
+            <a:ext cx="2743200" cy="4572000"/>
+          </a:xfrm>
+          <a:prstGeom prst="roundRect">
+            <a:avLst/>
+          </a:prstGeom>
+          <a:solidFill>
+            <a:srgbClr val="0A275A"/>
+          </a:solidFill>
+          <a:ln w="203200">
+            <a:solidFill>
+              <a:srgbClr val="61EB75"/>
+            </a:solidFill>
+          </a:ln>
+        </p:spPr>
+        <p:style>
+          <a:lnRef idx="2">
+            <a:schemeClr val="accent1">
+              <a:shade val="50000"/>
+            </a:schemeClr>
+          </a:lnRef>
+          <a:fillRef idx="1">
+            <a:schemeClr val="accent1"/>
+          </a:fillRef>
+          <a:effectRef idx="0">
+            <a:schemeClr val="accent1"/>
+          </a:effectRef>
+          <a:fontRef idx="minor">
+            <a:schemeClr val="lt1"/>
+          </a:fontRef>
+        </p:style>
+        <p:txBody>
+          <a:bodyPr rtlCol="0" anchor="ctr"/>
+          <a:lstStyle/>
+          <a:p>
+            <a:pPr algn="ctr"/>
+            <a:r>
+              <a:rPr lang="en-US" altLang="zh-CN" sz="6600" dirty="0" smtClean="0">
+                <a:solidFill>
+                  <a:srgbClr val="EB7561"/>
+                </a:solidFill>
+                <a:latin typeface="Times New Roman" panose="02020603050405020304" pitchFamily="18" charset="0"/>
+                <a:cs typeface="Times New Roman" panose="02020603050405020304" pitchFamily="18" charset="0"/>
+              </a:rPr>
+              <a:t>TEXT</a:t>
+            </a:r>
+            <a:endParaRPr lang="zh-CN" altLang="en-US" sz="6600" dirty="0">
+              <a:solidFill>
+                <a:srgbClr val="EB7561"/>
+              </a:solidFill>
+              <a:latin typeface="Times New Roman" panose="02020603050405020304" pitchFamily="18" charset="0"/>
+              <a:cs typeface="Times New Roman" panose="02020603050405020304" pitchFamily="18" charset="0"/>
+            </a:endParaRPr>
+          </a:p>
+        </p:txBody>
+      </p:sp>
+      <p:sp>
+        <p:nvSpPr>
+          <p:cNvPr id="5" name="selectMe2"/>
+          <p:cNvSpPr/>
+          <p:nvPr/>
+        </p:nvSpPr>
+        <p:spPr>
+          <a:xfrm>
+            <a:off x="5867400" y="1219200"/>
+            <a:ext cx="1828800" cy="1295400"/>
+          </a:xfrm>
+          <a:prstGeom prst="roundRect">
+            <a:avLst/>
+          </a:prstGeom>
+          <a:solidFill>
+            <a:srgbClr val="EB7662"/>
+          </a:solidFill>
+          <a:ln>
+            <a:noFill/>
+          </a:ln>
+        </p:spPr>
+        <p:style>
+          <a:lnRef idx="2">
+            <a:schemeClr val="accent1">
+              <a:shade val="50000"/>
+            </a:schemeClr>
+          </a:lnRef>
+          <a:fillRef idx="1">
+            <a:schemeClr val="accent1"/>
+          </a:fillRef>
+          <a:effectRef idx="0">
+            <a:schemeClr val="accent1"/>
+          </a:effectRef>
+          <a:fontRef idx="minor">
+            <a:schemeClr val="lt1"/>
+          </a:fontRef>
+        </p:style>
+        <p:txBody>
+          <a:bodyPr rtlCol="0" anchor="ctr"/>
+          <a:lstStyle/>
+          <a:p>
+            <a:pPr algn="ctr"/>
+            <a:endParaRPr lang="zh-CN" altLang="en-US"/>
+          </a:p>
+        </p:txBody>
+      </p:sp>
+      <p:sp>
+        <p:nvSpPr>
+          <p:cNvPr id="7" name="selectMe3"/>
+          <p:cNvSpPr/>
+          <p:nvPr/>
+        </p:nvSpPr>
+        <p:spPr>
+          <a:xfrm>
+            <a:off x="5867400" y="2743200"/>
+            <a:ext cx="1828800" cy="1295400"/>
+          </a:xfrm>
+          <a:prstGeom prst="roundRect">
+            <a:avLst/>
+          </a:prstGeom>
+          <a:solidFill>
+            <a:srgbClr val="62EB76"/>
+          </a:solidFill>
+          <a:ln>
+            <a:noFill/>
+          </a:ln>
+        </p:spPr>
+        <p:style>
+          <a:lnRef idx="2">
+            <a:schemeClr val="accent1">
+              <a:shade val="50000"/>
+            </a:schemeClr>
+          </a:lnRef>
+          <a:fillRef idx="1">
+            <a:schemeClr val="accent1"/>
+          </a:fillRef>
+          <a:effectRef idx="0">
+            <a:schemeClr val="accent1"/>
+          </a:effectRef>
+          <a:fontRef idx="minor">
+            <a:schemeClr val="lt1"/>
+          </a:fontRef>
+        </p:style>
+        <p:txBody>
+          <a:bodyPr rtlCol="0" anchor="ctr"/>
+          <a:lstStyle/>
+          <a:p>
+            <a:pPr algn="ctr"/>
+            <a:endParaRPr lang="zh-CN" altLang="en-US"/>
+          </a:p>
+        </p:txBody>
+      </p:sp>
+      <p:sp>
+        <p:nvSpPr>
+          <p:cNvPr id="8" name="selectMe4"/>
+          <p:cNvSpPr/>
+          <p:nvPr/>
+        </p:nvSpPr>
+        <p:spPr>
+          <a:xfrm>
+            <a:off x="5867400" y="4267200"/>
+            <a:ext cx="1828800" cy="1295400"/>
+          </a:xfrm>
+          <a:prstGeom prst="roundRect">
+            <a:avLst/>
+          </a:prstGeom>
+          <a:solidFill>
+            <a:srgbClr val="6294EB"/>
+          </a:solidFill>
+          <a:ln>
+            <a:noFill/>
+          </a:ln>
+        </p:spPr>
+        <p:style>
+          <a:lnRef idx="2">
+            <a:schemeClr val="accent1">
+              <a:shade val="50000"/>
+            </a:schemeClr>
+          </a:lnRef>
+          <a:fillRef idx="1">
+            <a:schemeClr val="accent1"/>
+          </a:fillRef>
+          <a:effectRef idx="0">
+            <a:schemeClr val="accent1"/>
+          </a:effectRef>
+          <a:fontRef idx="minor">
+            <a:schemeClr val="lt1"/>
+          </a:fontRef>
+        </p:style>
+        <p:txBody>
+          <a:bodyPr rtlCol="0" anchor="ctr"/>
+          <a:lstStyle/>
+          <a:p>
+            <a:pPr algn="ctr"/>
+            <a:endParaRPr lang="zh-CN" altLang="en-US"/>
+          </a:p>
+        </p:txBody>
+      </p:sp>
+      <p:sp>
+        <p:nvSpPr>
+          <p:cNvPr id="2" name="copyMe"/>
+          <p:cNvSpPr/>
+          <p:nvPr/>
+        </p:nvSpPr>
+        <p:spPr>
+          <a:xfrm>
+            <a:off x="3276600" y="1333500"/>
+            <a:ext cx="3505200" cy="4343400"/>
+          </a:xfrm>
+          <a:prstGeom prst="parallelogram">
+            <a:avLst/>
+          </a:prstGeom>
+        </p:spPr>
+        <p:style>
+          <a:lnRef idx="2">
+            <a:schemeClr val="accent1">
+              <a:shade val="50000"/>
+            </a:schemeClr>
+          </a:lnRef>
+          <a:fillRef idx="1">
+            <a:schemeClr val="accent1"/>
+          </a:fillRef>
+          <a:effectRef idx="0">
+            <a:schemeClr val="accent1"/>
+          </a:effectRef>
+          <a:fontRef idx="minor">
+            <a:schemeClr val="lt1"/>
+          </a:fontRef>
+        </p:style>
+        <p:txBody>
+          <a:bodyPr rtlCol="0" anchor="ctr"/>
+          <a:lstStyle/>
+          <a:p>
+            <a:pPr algn="ctr"/>
+            <a:endParaRPr lang="en-SG"/>
+          </a:p>
+        </p:txBody>
+      </p:sp>
+    </p:spTree>
+    <p:extLst>
+      <p:ext uri="{BB962C8B-B14F-4D97-AF65-F5344CB8AC3E}">
+        <p14:creationId xmlns:p14="http://schemas.microsoft.com/office/powerpoint/2010/main" val="575176415"/>
+      </p:ext>
+    </p:extLst>
+  </p:cSld>
+  <p:clrMapOvr>
+    <a:masterClrMapping/>
+  </p:clrMapOvr>
+  <p:timing>
+    <p:tnLst>
+      <p:par>
+        <p:cTn id="1" dur="indefinite" restart="never" nodeType="tmRoot">
+          <p:childTnLst>
+            <p:seq concurrent="1" nextAc="seek">
+              <p:cTn id="2" dur="indefinite" nodeType="mainSeq">
+                <p:childTnLst>
+                  <p:par>
+                    <p:cTn id="3" fill="hold">
+                      <p:stCondLst>
+                        <p:cond delay="indefinite"/>
+                      </p:stCondLst>
+                      <p:childTnLst>
+                        <p:par>
+                          <p:cTn id="4" fill="hold">
+                            <p:stCondLst>
+                              <p:cond delay="0"/>
+                            </p:stCondLst>
+                            <p:childTnLst>
+                              <p:par>
+                                <p:cTn id="5" presetID="2" presetClass="entr" presetSubtype="4" fill="hold" grpId="0" nodeType="clickEffect">
+                                  <p:stCondLst>
+                                    <p:cond delay="0"/>
+                                  </p:stCondLst>
+                                  <p:childTnLst>
+                                    <p:set>
+                                      <p:cBhvr>
+                                        <p:cTn id="6" dur="1" fill="hold">
+                                          <p:stCondLst>
+                                            <p:cond delay="0"/>
+                                          </p:stCondLst>
+                                        </p:cTn>
+                                        <p:tgtEl>
+                                          <p:spTgt spid="3"/>
+                                        </p:tgtEl>
+                                        <p:attrNameLst>
+                                          <p:attrName>style.visibility</p:attrName>
+                                        </p:attrNameLst>
+                                      </p:cBhvr>
+                                      <p:to>
+                                        <p:strVal val="visible"/>
+                                      </p:to>
+                                    </p:set>
+                                    <p:anim calcmode="lin" valueType="num">
+                                      <p:cBhvr additive="base">
+                                        <p:cTn id="7" dur="500" fill="hold"/>
+                                        <p:tgtEl>
+                                          <p:spTgt spid="3"/>
+                                        </p:tgtEl>
+                                        <p:attrNameLst>
+                                          <p:attrName>ppt_x</p:attrName>
+                                        </p:attrNameLst>
+                                      </p:cBhvr>
+                                      <p:tavLst>
+                                        <p:tav tm="0">
+                                          <p:val>
+                                            <p:strVal val="#ppt_x"/>
+                                          </p:val>
+                                        </p:tav>
+                                        <p:tav tm="100000">
+                                          <p:val>
+                                            <p:strVal val="#ppt_x"/>
+                                          </p:val>
+                                        </p:tav>
+                                      </p:tavLst>
+                                    </p:anim>
+                                    <p:anim calcmode="lin" valueType="num">
+                                      <p:cBhvr additive="base">
+                                        <p:cTn id="8" dur="500" fill="hold"/>
+                                        <p:tgtEl>
+                                          <p:spTgt spid="3"/>
+                                        </p:tgtEl>
+                                        <p:attrNameLst>
+                                          <p:attrName>ppt_y</p:attrName>
+                                        </p:attrNameLst>
+                                      </p:cBhvr>
+                                      <p:tavLst>
+                                        <p:tav tm="0">
+                                          <p:val>
+                                            <p:strVal val="1+#ppt_h/2"/>
+                                          </p:val>
+                                        </p:tav>
+                                        <p:tav tm="100000">
+                                          <p:val>
+                                            <p:strVal val="#ppt_y"/>
+                                          </p:val>
+                                        </p:tav>
+                                      </p:tavLst>
+                                    </p:anim>
+                                  </p:childTnLst>
+                                </p:cTn>
+                              </p:par>
+                            </p:childTnLst>
+                          </p:cTn>
+                        </p:par>
+                      </p:childTnLst>
+                    </p:cTn>
+                  </p:par>
+                  <p:par>
+                    <p:cTn id="9" fill="hold">
+                      <p:stCondLst>
+                        <p:cond delay="indefinite"/>
+                      </p:stCondLst>
+                      <p:childTnLst>
+                        <p:par>
+                          <p:cTn id="10" fill="hold">
+                            <p:stCondLst>
+                              <p:cond delay="0"/>
+                            </p:stCondLst>
+                            <p:childTnLst>
+                              <p:par>
+                                <p:cTn id="11" presetID="1" presetClass="entr" presetSubtype="0" fill="hold" grpId="0" nodeType="clickEffect">
+                                  <p:stCondLst>
+                                    <p:cond delay="0"/>
+                                  </p:stCondLst>
+                                  <p:childTnLst>
+                                    <p:set>
+                                      <p:cBhvr>
+                                        <p:cTn id="12" dur="1" fill="hold">
+                                          <p:stCondLst>
+                                            <p:cond delay="0"/>
+                                          </p:stCondLst>
+                                        </p:cTn>
+                                        <p:tgtEl>
+                                          <p:spTgt spid="5"/>
+                                        </p:tgtEl>
+                                        <p:attrNameLst>
+                                          <p:attrName>style.visibility</p:attrName>
+                                        </p:attrNameLst>
+                                      </p:cBhvr>
+                                      <p:to>
+                                        <p:strVal val="visible"/>
+                                      </p:to>
+                                    </p:set>
+                                  </p:childTnLst>
+                                </p:cTn>
+                              </p:par>
+                            </p:childTnLst>
+                          </p:cTn>
+                        </p:par>
+                      </p:childTnLst>
+                    </p:cTn>
+                  </p:par>
+                  <p:par>
+                    <p:cTn id="13" fill="hold">
+                      <p:stCondLst>
+                        <p:cond delay="indefinite"/>
+                      </p:stCondLst>
+                      <p:childTnLst>
+                        <p:par>
+                          <p:cTn id="14" fill="hold">
+                            <p:stCondLst>
+                              <p:cond delay="0"/>
+                            </p:stCondLst>
+                            <p:childTnLst>
+                              <p:par>
+                                <p:cTn id="15" presetID="10" presetClass="entr" presetSubtype="0" fill="hold" grpId="0" nodeType="clickEffect">
+                                  <p:stCondLst>
+                                    <p:cond delay="0"/>
+                                  </p:stCondLst>
+                                  <p:childTnLst>
+                                    <p:set>
+                                      <p:cBhvr>
+                                        <p:cTn id="16" dur="1" fill="hold">
+                                          <p:stCondLst>
+                                            <p:cond delay="0"/>
+                                          </p:stCondLst>
+                                        </p:cTn>
+                                        <p:tgtEl>
+                                          <p:spTgt spid="7"/>
+                                        </p:tgtEl>
+                                        <p:attrNameLst>
+                                          <p:attrName>style.visibility</p:attrName>
+                                        </p:attrNameLst>
+                                      </p:cBhvr>
+                                      <p:to>
+                                        <p:strVal val="visible"/>
+                                      </p:to>
+                                    </p:set>
+                                    <p:animEffect transition="in" filter="fade">
+                                      <p:cBhvr>
+                                        <p:cTn id="17" dur="500"/>
+                                        <p:tgtEl>
+                                          <p:spTgt spid="7"/>
+                                        </p:tgtEl>
+                                      </p:cBhvr>
+                                    </p:animEffect>
+                                  </p:childTnLst>
+                                </p:cTn>
+                              </p:par>
+                            </p:childTnLst>
+                          </p:cTn>
+                        </p:par>
+                      </p:childTnLst>
+                    </p:cTn>
+                  </p:par>
+                  <p:par>
+                    <p:cTn id="18" fill="hold">
+                      <p:stCondLst>
+                        <p:cond delay="indefinite"/>
+                      </p:stCondLst>
+                      <p:childTnLst>
+                        <p:par>
+                          <p:cTn id="19" fill="hold">
+                            <p:stCondLst>
+                              <p:cond delay="0"/>
+                            </p:stCondLst>
+                            <p:childTnLst>
+                              <p:par>
+                                <p:cTn id="20" presetID="16" presetClass="entr" presetSubtype="21" fill="hold" grpId="0" nodeType="clickEffect">
+                                  <p:stCondLst>
+                                    <p:cond delay="0"/>
+                                  </p:stCondLst>
+                                  <p:childTnLst>
+                                    <p:set>
+                                      <p:cBhvr>
+                                        <p:cTn id="21" dur="1" fill="hold">
+                                          <p:stCondLst>
+                                            <p:cond delay="0"/>
+                                          </p:stCondLst>
+                                        </p:cTn>
+                                        <p:tgtEl>
+                                          <p:spTgt spid="8"/>
+                                        </p:tgtEl>
+                                        <p:attrNameLst>
+                                          <p:attrName>style.visibility</p:attrName>
+                                        </p:attrNameLst>
+                                      </p:cBhvr>
+                                      <p:to>
+                                        <p:strVal val="visible"/>
+                                      </p:to>
+                                    </p:set>
+                                    <p:animEffect transition="in" filter="barn(inVertical)">
+                                      <p:cBhvr>
+                                        <p:cTn id="22" dur="500"/>
+                                        <p:tgtEl>
+                                          <p:spTgt spid="8"/>
+                                        </p:tgtEl>
+                                      </p:cBhvr>
+                                    </p:animEffect>
+                                  </p:childTnLst>
+                                </p:cTn>
+                              </p:par>
+                            </p:childTnLst>
+                          </p:cTn>
+                        </p:par>
+                      </p:childTnLst>
+                    </p:cTn>
+                  </p:par>
+                </p:childTnLst>
+              </p:cTn>
+              <p:prevCondLst>
+                <p:cond evt="onPrev" delay="0">
+                  <p:tgtEl>
+                    <p:sldTgt/>
+                  </p:tgtEl>
+                </p:cond>
+              </p:prevCondLst>
+              <p:nextCondLst>
+                <p:cond evt="onNext" delay="0">
+                  <p:tgtEl>
+                    <p:sldTgt/>
+                  </p:tgtEl>
+                </p:cond>
+              </p:nextCondLst>
+            </p:seq>
+          </p:childTnLst>
+        </p:cTn>
+      </p:par>
+    </p:tnLst>
+    <p:bldLst>
+      <p:bldP spid="3" grpId="0" animBg="1"/>
+      <p:bldP spid="5" grpId="0" animBg="1"/>
+      <p:bldP spid="7" grpId="0" animBg="1"/>
+      <p:bldP spid="8" grpId="0" animBg="1"/>
+    </p:bldLst>
+  </p:timing>
+</p:sld>
+</file>
+
+<file path=ppt/slides/slide11.xml><?xml version="1.0" encoding="utf-8"?>
+<p:sld xmlns:a="http://schemas.openxmlformats.org/drawingml/2006/main" xmlns:r="http://schemas.openxmlformats.org/officeDocument/2006/relationships" xmlns:p="http://schemas.openxmlformats.org/presentationml/2006/main">
+  <p:cSld>
+    <p:spTree>
+      <p:nvGrpSpPr>
+        <p:cNvPr id="1" name=""/>
+        <p:cNvGrpSpPr/>
+        <p:nvPr/>
+      </p:nvGrpSpPr>
+      <p:grpSpPr>
+        <a:xfrm>
+          <a:off x="0" y="0"/>
+          <a:ext cx="0" cy="0"/>
+          <a:chOff x="0" y="0"/>
+          <a:chExt cx="0" cy="0"/>
+        </a:xfrm>
+      </p:grpSpPr>
+    </p:spTree>
+    <p:extLst>
+      <p:ext uri="{BB962C8B-B14F-4D97-AF65-F5344CB8AC3E}">
+        <p14:creationId xmlns:p14="http://schemas.microsoft.com/office/powerpoint/2010/main" val="4228155245"/>
+      </p:ext>
+    </p:extLst>
+  </p:cSld>
+  <p:clrMapOvr>
+    <a:masterClrMapping/>
+  </p:clrMapOvr>
+  <p:timing>
+    <p:tnLst>
+      <p:par>
+        <p:cTn id="1" dur="indefinite" restart="never" nodeType="tmRoot"/>
+      </p:par>
+    </p:tnLst>
+  </p:timing>
+</p:sld>
+</file>
+
+<file path=ppt/slides/slide12.xml><?xml version="1.0" encoding="utf-8"?>
+<p:sld xmlns:a="http://schemas.openxmlformats.org/drawingml/2006/main" xmlns:r="http://schemas.openxmlformats.org/officeDocument/2006/relationships" xmlns:p="http://schemas.openxmlformats.org/presentationml/2006/main">
+  <p:cSld>
+    <p:spTree>
+      <p:nvGrpSpPr>
+        <p:cNvPr id="1" name=""/>
+        <p:cNvGrpSpPr/>
+        <p:nvPr/>
+      </p:nvGrpSpPr>
+      <p:grpSpPr>
+        <a:xfrm>
+          <a:off x="0" y="0"/>
+          <a:ext cx="0" cy="0"/>
+          <a:chOff x="0" y="0"/>
+          <a:chExt cx="0" cy="0"/>
+        </a:xfrm>
+      </p:grpSpPr>
+      <p:sp>
+        <p:nvSpPr>
+          <p:cNvPr id="3" name="selectMe"/>
+          <p:cNvSpPr/>
+          <p:nvPr/>
+        </p:nvSpPr>
+        <p:spPr>
+          <a:xfrm>
+            <a:off x="1524000" y="990600"/>
+            <a:ext cx="2743200" cy="4572000"/>
+          </a:xfrm>
+          <a:prstGeom prst="roundRect">
+            <a:avLst/>
+          </a:prstGeom>
+          <a:solidFill>
+            <a:srgbClr val="0A275A"/>
+          </a:solidFill>
+          <a:ln w="203200">
+            <a:solidFill>
+              <a:srgbClr val="61EB75"/>
+            </a:solidFill>
+          </a:ln>
+        </p:spPr>
+        <p:style>
+          <a:lnRef idx="2">
+            <a:schemeClr val="accent1">
+              <a:shade val="50000"/>
+            </a:schemeClr>
+          </a:lnRef>
+          <a:fillRef idx="1">
+            <a:schemeClr val="accent1"/>
+          </a:fillRef>
+          <a:effectRef idx="0">
+            <a:schemeClr val="accent1"/>
+          </a:effectRef>
+          <a:fontRef idx="minor">
+            <a:schemeClr val="lt1"/>
+          </a:fontRef>
+        </p:style>
+        <p:txBody>
+          <a:bodyPr rtlCol="0" anchor="ctr"/>
+          <a:lstStyle/>
+          <a:p>
+            <a:pPr algn="ctr"/>
+            <a:r>
+              <a:rPr lang="en-US" altLang="zh-CN" sz="6600" dirty="0" smtClean="0">
+                <a:solidFill>
+                  <a:srgbClr val="EB7561"/>
+                </a:solidFill>
+                <a:latin typeface="Times New Roman" panose="02020603050405020304" pitchFamily="18" charset="0"/>
+                <a:cs typeface="Times New Roman" panose="02020603050405020304" pitchFamily="18" charset="0"/>
+              </a:rPr>
+              <a:t>TEXT</a:t>
+            </a:r>
+            <a:endParaRPr lang="zh-CN" altLang="en-US" sz="6600" dirty="0">
+              <a:solidFill>
+                <a:srgbClr val="EB7561"/>
+              </a:solidFill>
+              <a:latin typeface="Times New Roman" panose="02020603050405020304" pitchFamily="18" charset="0"/>
+              <a:cs typeface="Times New Roman" panose="02020603050405020304" pitchFamily="18" charset="0"/>
+            </a:endParaRPr>
+          </a:p>
+        </p:txBody>
+      </p:sp>
+      <p:sp>
+        <p:nvSpPr>
+          <p:cNvPr id="5" name="Rounded Rectangle 4"/>
+          <p:cNvSpPr/>
+          <p:nvPr/>
+        </p:nvSpPr>
+        <p:spPr>
+          <a:xfrm>
+            <a:off x="5867400" y="1219200"/>
+            <a:ext cx="1828800" cy="1295400"/>
+          </a:xfrm>
+          <a:prstGeom prst="roundRect">
+            <a:avLst/>
+          </a:prstGeom>
+          <a:solidFill>
+            <a:srgbClr val="EB7662"/>
+          </a:solidFill>
+          <a:ln>
+            <a:noFill/>
+          </a:ln>
+        </p:spPr>
+        <p:style>
+          <a:lnRef idx="2">
+            <a:schemeClr val="accent1">
+              <a:shade val="50000"/>
+            </a:schemeClr>
+          </a:lnRef>
+          <a:fillRef idx="1">
+            <a:schemeClr val="accent1"/>
+          </a:fillRef>
+          <a:effectRef idx="0">
+            <a:schemeClr val="accent1"/>
+          </a:effectRef>
+          <a:fontRef idx="minor">
+            <a:schemeClr val="lt1"/>
+          </a:fontRef>
+        </p:style>
+        <p:txBody>
+          <a:bodyPr rtlCol="0" anchor="ctr"/>
+          <a:lstStyle/>
+          <a:p>
+            <a:pPr algn="ctr"/>
+            <a:endParaRPr lang="zh-CN" altLang="en-US"/>
+          </a:p>
+        </p:txBody>
+      </p:sp>
+      <p:sp>
+        <p:nvSpPr>
+          <p:cNvPr id="7" name="Rounded Rectangle 6"/>
+          <p:cNvSpPr/>
+          <p:nvPr/>
+        </p:nvSpPr>
+        <p:spPr>
+          <a:xfrm>
+            <a:off x="5867400" y="2743200"/>
+            <a:ext cx="1828800" cy="1295400"/>
+          </a:xfrm>
+          <a:prstGeom prst="roundRect">
+            <a:avLst/>
+          </a:prstGeom>
+          <a:solidFill>
+            <a:srgbClr val="62EB76"/>
+          </a:solidFill>
+          <a:ln>
+            <a:noFill/>
+          </a:ln>
+        </p:spPr>
+        <p:style>
+          <a:lnRef idx="2">
+            <a:schemeClr val="accent1">
+              <a:shade val="50000"/>
+            </a:schemeClr>
+          </a:lnRef>
+          <a:fillRef idx="1">
+            <a:schemeClr val="accent1"/>
+          </a:fillRef>
+          <a:effectRef idx="0">
+            <a:schemeClr val="accent1"/>
+          </a:effectRef>
+          <a:fontRef idx="minor">
+            <a:schemeClr val="lt1"/>
+          </a:fontRef>
+        </p:style>
+        <p:txBody>
+          <a:bodyPr rtlCol="0" anchor="ctr"/>
+          <a:lstStyle/>
+          <a:p>
+            <a:pPr algn="ctr"/>
+            <a:endParaRPr lang="zh-CN" altLang="en-US"/>
+          </a:p>
+        </p:txBody>
+      </p:sp>
+      <p:sp>
+        <p:nvSpPr>
+          <p:cNvPr id="8" name="Rounded Rectangle 7"/>
+          <p:cNvSpPr/>
+          <p:nvPr/>
+        </p:nvSpPr>
+        <p:spPr>
+          <a:xfrm>
+            <a:off x="5867400" y="4267200"/>
+            <a:ext cx="1828800" cy="1295400"/>
+          </a:xfrm>
+          <a:prstGeom prst="roundRect">
+            <a:avLst/>
+          </a:prstGeom>
+          <a:solidFill>
+            <a:srgbClr val="6294EB"/>
+          </a:solidFill>
+          <a:ln>
+            <a:noFill/>
+          </a:ln>
+        </p:spPr>
+        <p:style>
+          <a:lnRef idx="2">
+            <a:schemeClr val="accent1">
+              <a:shade val="50000"/>
+            </a:schemeClr>
+          </a:lnRef>
+          <a:fillRef idx="1">
+            <a:schemeClr val="accent1"/>
+          </a:fillRef>
+          <a:effectRef idx="0">
+            <a:schemeClr val="accent1"/>
+          </a:effectRef>
+          <a:fontRef idx="minor">
+            <a:schemeClr val="lt1"/>
+          </a:fontRef>
+        </p:style>
+        <p:txBody>
+          <a:bodyPr rtlCol="0" anchor="ctr"/>
+          <a:lstStyle/>
+          <a:p>
+            <a:pPr algn="ctr"/>
+            <a:endParaRPr lang="zh-CN" altLang="en-US"/>
+          </a:p>
+        </p:txBody>
+      </p:sp>
+      <p:sp>
+        <p:nvSpPr>
+          <p:cNvPr id="10" name="copyMe"/>
+          <p:cNvSpPr/>
+          <p:nvPr/>
+        </p:nvSpPr>
+        <p:spPr>
+          <a:xfrm>
+            <a:off x="3276600" y="1333500"/>
+            <a:ext cx="3505200" cy="4343400"/>
+          </a:xfrm>
+          <a:prstGeom prst="parallelogram">
+            <a:avLst/>
+          </a:prstGeom>
+        </p:spPr>
+        <p:style>
+          <a:lnRef idx="2">
+            <a:schemeClr val="accent1">
+              <a:shade val="50000"/>
+            </a:schemeClr>
+          </a:lnRef>
+          <a:fillRef idx="1">
+            <a:schemeClr val="accent1"/>
+          </a:fillRef>
+          <a:effectRef idx="0">
+            <a:schemeClr val="accent1"/>
+          </a:effectRef>
+          <a:fontRef idx="minor">
+            <a:schemeClr val="lt1"/>
+          </a:fontRef>
+        </p:style>
+        <p:txBody>
+          <a:bodyPr rtlCol="0" anchor="ctr"/>
+          <a:lstStyle/>
+          <a:p>
+            <a:pPr algn="ctr"/>
+            <a:endParaRPr lang="en-SG"/>
+          </a:p>
+        </p:txBody>
+      </p:sp>
+      <p:sp>
+        <p:nvSpPr>
+          <p:cNvPr id="6" name="compareMe"/>
+          <p:cNvSpPr/>
+          <p:nvPr/>
+        </p:nvSpPr>
+        <p:spPr>
+          <a:xfrm>
+            <a:off x="5638800" y="228600"/>
+            <a:ext cx="3505200" cy="4343400"/>
+          </a:xfrm>
+          <a:prstGeom prst="parallelogram">
+            <a:avLst/>
+          </a:prstGeom>
+        </p:spPr>
+        <p:style>
+          <a:lnRef idx="2">
+            <a:schemeClr val="accent1">
+              <a:shade val="50000"/>
+            </a:schemeClr>
+          </a:lnRef>
+          <a:fillRef idx="1">
+            <a:schemeClr val="accent1"/>
+          </a:fillRef>
+          <a:effectRef idx="0">
+            <a:schemeClr val="accent1"/>
+          </a:effectRef>
+          <a:fontRef idx="minor">
+            <a:schemeClr val="lt1"/>
+          </a:fontRef>
+        </p:style>
+        <p:txBody>
+          <a:bodyPr rtlCol="0" anchor="ctr"/>
+          <a:lstStyle/>
+          <a:p>
+            <a:pPr algn="ctr"/>
+            <a:endParaRPr lang="en-SG"/>
+          </a:p>
+        </p:txBody>
+      </p:sp>
+      <p:sp>
+        <p:nvSpPr>
+          <p:cNvPr id="9" name="Expected"/>
+          <p:cNvSpPr txBox="1"/>
+          <p:nvPr/>
+        </p:nvSpPr>
+        <p:spPr>
+          <a:xfrm>
+            <a:off x="3769556" y="6095135"/>
+            <a:ext cx="1528688" cy="369332"/>
+          </a:xfrm>
+          <a:prstGeom prst="rect">
+            <a:avLst/>
+          </a:prstGeom>
+          <a:noFill/>
+        </p:spPr>
+        <p:txBody>
+          <a:bodyPr wrap="none" rtlCol="0">
+            <a:spAutoFit/>
+          </a:bodyPr>
+          <a:lstStyle/>
+          <a:p>
+            <a:r>
+              <a:rPr lang="en-SG" dirty="0" smtClean="0"/>
+              <a:t>Expected slide</a:t>
+            </a:r>
+            <a:endParaRPr lang="en-SG" dirty="0"/>
+          </a:p>
+        </p:txBody>
+      </p:sp>
+    </p:spTree>
+    <p:extLst>
+      <p:ext uri="{BB962C8B-B14F-4D97-AF65-F5344CB8AC3E}">
+        <p14:creationId xmlns:p14="http://schemas.microsoft.com/office/powerpoint/2010/main" val="2562146180"/>
+      </p:ext>
+    </p:extLst>
+  </p:cSld>
+  <p:clrMapOvr>
+    <a:masterClrMapping/>
+  </p:clrMapOvr>
+  <p:timing>
+    <p:tnLst>
+      <p:par>
+        <p:cTn id="1" dur="indefinite" restart="never" nodeType="tmRoot">
+          <p:childTnLst>
+            <p:seq concurrent="1" nextAc="seek">
+              <p:cTn id="2" dur="indefinite" nodeType="mainSeq">
+                <p:childTnLst>
+                  <p:par>
+                    <p:cTn id="3" fill="hold">
+                      <p:stCondLst>
+                        <p:cond delay="indefinite"/>
+                      </p:stCondLst>
+                      <p:childTnLst>
+                        <p:par>
+                          <p:cTn id="4" fill="hold">
+                            <p:stCondLst>
+                              <p:cond delay="0"/>
+                            </p:stCondLst>
+                            <p:childTnLst>
+                              <p:par>
+                                <p:cTn id="5" presetID="2" presetClass="entr" presetSubtype="4" fill="hold" grpId="0" nodeType="clickEffect">
+                                  <p:stCondLst>
+                                    <p:cond delay="0"/>
+                                  </p:stCondLst>
+                                  <p:childTnLst>
+                                    <p:set>
+                                      <p:cBhvr>
+                                        <p:cTn id="6" dur="1" fill="hold">
+                                          <p:stCondLst>
+                                            <p:cond delay="0"/>
+                                          </p:stCondLst>
+                                        </p:cTn>
+                                        <p:tgtEl>
+                                          <p:spTgt spid="3"/>
+                                        </p:tgtEl>
+                                        <p:attrNameLst>
+                                          <p:attrName>style.visibility</p:attrName>
+                                        </p:attrNameLst>
+                                      </p:cBhvr>
+                                      <p:to>
+                                        <p:strVal val="visible"/>
+                                      </p:to>
+                                    </p:set>
+                                    <p:anim calcmode="lin" valueType="num">
+                                      <p:cBhvr additive="base">
+                                        <p:cTn id="7" dur="500" fill="hold"/>
+                                        <p:tgtEl>
+                                          <p:spTgt spid="3"/>
+                                        </p:tgtEl>
+                                        <p:attrNameLst>
+                                          <p:attrName>ppt_x</p:attrName>
+                                        </p:attrNameLst>
+                                      </p:cBhvr>
+                                      <p:tavLst>
+                                        <p:tav tm="0">
+                                          <p:val>
+                                            <p:strVal val="#ppt_x"/>
+                                          </p:val>
+                                        </p:tav>
+                                        <p:tav tm="100000">
+                                          <p:val>
+                                            <p:strVal val="#ppt_x"/>
+                                          </p:val>
+                                        </p:tav>
+                                      </p:tavLst>
+                                    </p:anim>
+                                    <p:anim calcmode="lin" valueType="num">
+                                      <p:cBhvr additive="base">
+                                        <p:cTn id="8" dur="500" fill="hold"/>
+                                        <p:tgtEl>
+                                          <p:spTgt spid="3"/>
+                                        </p:tgtEl>
+                                        <p:attrNameLst>
+                                          <p:attrName>ppt_y</p:attrName>
+                                        </p:attrNameLst>
+                                      </p:cBhvr>
+                                      <p:tavLst>
+                                        <p:tav tm="0">
+                                          <p:val>
+                                            <p:strVal val="1+#ppt_h/2"/>
+                                          </p:val>
+                                        </p:tav>
+                                        <p:tav tm="100000">
+                                          <p:val>
+                                            <p:strVal val="#ppt_y"/>
+                                          </p:val>
+                                        </p:tav>
+                                      </p:tavLst>
+                                    </p:anim>
+                                  </p:childTnLst>
+                                </p:cTn>
+                              </p:par>
+                            </p:childTnLst>
+                          </p:cTn>
+                        </p:par>
+                      </p:childTnLst>
+                    </p:cTn>
+                  </p:par>
+                  <p:par>
+                    <p:cTn id="9" fill="hold">
+                      <p:stCondLst>
+                        <p:cond delay="indefinite"/>
+                      </p:stCondLst>
+                      <p:childTnLst>
+                        <p:par>
+                          <p:cTn id="10" fill="hold">
+                            <p:stCondLst>
+                              <p:cond delay="0"/>
+                            </p:stCondLst>
+                            <p:childTnLst>
+                              <p:par>
+                                <p:cTn id="11" presetID="1" presetClass="entr" presetSubtype="0" fill="hold" grpId="0" nodeType="clickEffect">
+                                  <p:stCondLst>
+                                    <p:cond delay="0"/>
+                                  </p:stCondLst>
+                                  <p:childTnLst>
+                                    <p:set>
+                                      <p:cBhvr>
+                                        <p:cTn id="12" dur="1" fill="hold">
+                                          <p:stCondLst>
+                                            <p:cond delay="0"/>
+                                          </p:stCondLst>
+                                        </p:cTn>
+                                        <p:tgtEl>
+                                          <p:spTgt spid="5"/>
+                                        </p:tgtEl>
+                                        <p:attrNameLst>
+                                          <p:attrName>style.visibility</p:attrName>
+                                        </p:attrNameLst>
+                                      </p:cBhvr>
+                                      <p:to>
+                                        <p:strVal val="visible"/>
+                                      </p:to>
+                                    </p:set>
+                                  </p:childTnLst>
+                                </p:cTn>
+                              </p:par>
+                            </p:childTnLst>
+                          </p:cTn>
+                        </p:par>
+                      </p:childTnLst>
+                    </p:cTn>
+                  </p:par>
+                  <p:par>
+                    <p:cTn id="13" fill="hold">
+                      <p:stCondLst>
+                        <p:cond delay="indefinite"/>
+                      </p:stCondLst>
+                      <p:childTnLst>
+                        <p:par>
+                          <p:cTn id="14" fill="hold">
+                            <p:stCondLst>
+                              <p:cond delay="0"/>
+                            </p:stCondLst>
+                            <p:childTnLst>
+                              <p:par>
+                                <p:cTn id="15" presetID="10" presetClass="entr" presetSubtype="0" fill="hold" grpId="0" nodeType="clickEffect">
+                                  <p:stCondLst>
+                                    <p:cond delay="0"/>
+                                  </p:stCondLst>
+                                  <p:childTnLst>
+                                    <p:set>
+                                      <p:cBhvr>
+                                        <p:cTn id="16" dur="1" fill="hold">
+                                          <p:stCondLst>
+                                            <p:cond delay="0"/>
+                                          </p:stCondLst>
+                                        </p:cTn>
+                                        <p:tgtEl>
+                                          <p:spTgt spid="7"/>
+                                        </p:tgtEl>
+                                        <p:attrNameLst>
+                                          <p:attrName>style.visibility</p:attrName>
+                                        </p:attrNameLst>
+                                      </p:cBhvr>
+                                      <p:to>
+                                        <p:strVal val="visible"/>
+                                      </p:to>
+                                    </p:set>
+                                    <p:animEffect transition="in" filter="fade">
+                                      <p:cBhvr>
+                                        <p:cTn id="17" dur="500"/>
+                                        <p:tgtEl>
+                                          <p:spTgt spid="7"/>
+                                        </p:tgtEl>
+                                      </p:cBhvr>
+                                    </p:animEffect>
+                                  </p:childTnLst>
+                                </p:cTn>
+                              </p:par>
+                            </p:childTnLst>
+                          </p:cTn>
+                        </p:par>
+                      </p:childTnLst>
+                    </p:cTn>
+                  </p:par>
+                  <p:par>
+                    <p:cTn id="18" fill="hold">
+                      <p:stCondLst>
+                        <p:cond delay="indefinite"/>
+                      </p:stCondLst>
+                      <p:childTnLst>
+                        <p:par>
+                          <p:cTn id="19" fill="hold">
+                            <p:stCondLst>
+                              <p:cond delay="0"/>
+                            </p:stCondLst>
+                            <p:childTnLst>
+                              <p:par>
+                                <p:cTn id="20" presetID="16" presetClass="entr" presetSubtype="21" fill="hold" grpId="0" nodeType="clickEffect">
+                                  <p:stCondLst>
+                                    <p:cond delay="0"/>
+                                  </p:stCondLst>
+                                  <p:childTnLst>
+                                    <p:set>
+                                      <p:cBhvr>
+                                        <p:cTn id="21" dur="1" fill="hold">
+                                          <p:stCondLst>
+                                            <p:cond delay="0"/>
+                                          </p:stCondLst>
+                                        </p:cTn>
+                                        <p:tgtEl>
+                                          <p:spTgt spid="8"/>
+                                        </p:tgtEl>
+                                        <p:attrNameLst>
+                                          <p:attrName>style.visibility</p:attrName>
+                                        </p:attrNameLst>
+                                      </p:cBhvr>
+                                      <p:to>
+                                        <p:strVal val="visible"/>
+                                      </p:to>
+                                    </p:set>
+                                    <p:animEffect transition="in" filter="barn(inVertical)">
+                                      <p:cBhvr>
+                                        <p:cTn id="22" dur="500"/>
+                                        <p:tgtEl>
+                                          <p:spTgt spid="8"/>
+                                        </p:tgtEl>
+                                      </p:cBhvr>
+                                    </p:animEffect>
+                                  </p:childTnLst>
+                                </p:cTn>
+                              </p:par>
+                            </p:childTnLst>
+                          </p:cTn>
+                        </p:par>
+                      </p:childTnLst>
+                    </p:cTn>
+                  </p:par>
+                </p:childTnLst>
+              </p:cTn>
+              <p:prevCondLst>
+                <p:cond evt="onPrev" delay="0">
+                  <p:tgtEl>
+                    <p:sldTgt/>
+                  </p:tgtEl>
+                </p:cond>
+              </p:prevCondLst>
+              <p:nextCondLst>
+                <p:cond evt="onNext" delay="0">
+                  <p:tgtEl>
+                    <p:sldTgt/>
+                  </p:tgtEl>
+                </p:cond>
+              </p:nextCondLst>
+            </p:seq>
+          </p:childTnLst>
+        </p:cTn>
+      </p:par>
+    </p:tnLst>
+    <p:bldLst>
+      <p:bldP spid="3" grpId="0" animBg="1"/>
+      <p:bldP spid="5" grpId="0" animBg="1"/>
+      <p:bldP spid="7" grpId="0" animBg="1"/>
+      <p:bldP spid="8" grpId="0" animBg="1"/>
+    </p:bldLst>
+  </p:timing>
+</p:sld>
+</file>
+
+<file path=ppt/slides/slide13.xml><?xml version="1.0" encoding="utf-8"?>
+<p:sld xmlns:a="http://schemas.openxmlformats.org/drawingml/2006/main" xmlns:r="http://schemas.openxmlformats.org/officeDocument/2006/relationships" xmlns:p="http://schemas.openxmlformats.org/presentationml/2006/main">
+  <p:cSld>
+    <p:spTree>
+      <p:nvGrpSpPr>
+        <p:cNvPr id="1" name=""/>
+        <p:cNvGrpSpPr/>
+        <p:nvPr/>
+      </p:nvGrpSpPr>
+      <p:grpSpPr>
+        <a:xfrm>
+          <a:off x="0" y="0"/>
+          <a:ext cx="0" cy="0"/>
+          <a:chOff x="0" y="0"/>
+          <a:chExt cx="0" cy="0"/>
+        </a:xfrm>
+      </p:grpSpPr>
+      <p:sp>
+        <p:nvSpPr>
+          <p:cNvPr id="3" name="selectMeNow1"/>
+          <p:cNvSpPr/>
+          <p:nvPr/>
+        </p:nvSpPr>
+        <p:spPr>
+          <a:xfrm rot="1965194">
+            <a:off x="1533377" y="1406276"/>
+            <a:ext cx="3200400" cy="3792071"/>
+          </a:xfrm>
+          <a:prstGeom prst="roundRect">
+            <a:avLst/>
+          </a:prstGeom>
+          <a:solidFill>
+            <a:schemeClr val="accent2">
+              <a:lumMod val="40000"/>
+              <a:lumOff val="60000"/>
+            </a:schemeClr>
+          </a:solidFill>
+          <a:ln w="203200">
+            <a:solidFill>
+              <a:srgbClr val="92D050"/>
+            </a:solidFill>
+          </a:ln>
+          <a:effectLst>
+            <a:innerShdw blurRad="63500" dist="50800" dir="8100000">
+              <a:prstClr val="black">
+                <a:alpha val="50000"/>
+              </a:prstClr>
+            </a:innerShdw>
+          </a:effectLst>
+        </p:spPr>
+        <p:style>
+          <a:lnRef idx="2">
+            <a:schemeClr val="accent1">
+              <a:shade val="50000"/>
+            </a:schemeClr>
+          </a:lnRef>
+          <a:fillRef idx="1">
+            <a:schemeClr val="accent1"/>
+          </a:fillRef>
+          <a:effectRef idx="0">
+            <a:schemeClr val="accent1"/>
+          </a:effectRef>
+          <a:fontRef idx="minor">
+            <a:schemeClr val="lt1"/>
+          </a:fontRef>
+        </p:style>
+        <p:txBody>
+          <a:bodyPr rtlCol="0" anchor="ctr"/>
+          <a:lstStyle/>
+          <a:p>
+            <a:pPr algn="ctr"/>
+            <a:r>
+              <a:rPr lang="en-US" altLang="zh-CN" sz="6600" dirty="0" smtClean="0">
+                <a:solidFill>
+                  <a:srgbClr val="EB7561"/>
+                </a:solidFill>
+                <a:latin typeface="Times New Roman" panose="02020603050405020304" pitchFamily="18" charset="0"/>
+                <a:cs typeface="Times New Roman" panose="02020603050405020304" pitchFamily="18" charset="0"/>
+              </a:rPr>
+              <a:t>TEXT</a:t>
+            </a:r>
+            <a:endParaRPr lang="zh-CN" altLang="en-US" sz="6600" dirty="0">
+              <a:solidFill>
+                <a:srgbClr val="EB7561"/>
+              </a:solidFill>
+              <a:latin typeface="Times New Roman" panose="02020603050405020304" pitchFamily="18" charset="0"/>
+              <a:cs typeface="Times New Roman" panose="02020603050405020304" pitchFamily="18" charset="0"/>
+            </a:endParaRPr>
+          </a:p>
+        </p:txBody>
+      </p:sp>
+      <p:sp>
+        <p:nvSpPr>
+          <p:cNvPr id="5" name="selectMeNow2"/>
+          <p:cNvSpPr/>
+          <p:nvPr/>
+        </p:nvSpPr>
+        <p:spPr>
+          <a:xfrm>
+            <a:off x="5867400" y="1143000"/>
+            <a:ext cx="1828800" cy="1371600"/>
+          </a:xfrm>
+          <a:prstGeom prst="roundRect">
+            <a:avLst/>
+          </a:prstGeom>
+          <a:ln/>
+        </p:spPr>
+        <p:style>
+          <a:lnRef idx="3">
+            <a:schemeClr val="lt1"/>
+          </a:lnRef>
+          <a:fillRef idx="1">
+            <a:schemeClr val="accent6"/>
+          </a:fillRef>
+          <a:effectRef idx="1">
+            <a:schemeClr val="accent6"/>
+          </a:effectRef>
+          <a:fontRef idx="minor">
+            <a:schemeClr val="lt1"/>
+          </a:fontRef>
+        </p:style>
+        <p:txBody>
+          <a:bodyPr rtlCol="0" anchor="ctr"/>
+          <a:lstStyle/>
+          <a:p>
+            <a:pPr algn="ctr"/>
+            <a:endParaRPr lang="zh-CN" altLang="en-US"/>
+          </a:p>
+        </p:txBody>
+      </p:sp>
+      <p:sp>
+        <p:nvSpPr>
+          <p:cNvPr id="7" name="selectMeNow3"/>
+          <p:cNvSpPr/>
+          <p:nvPr/>
+        </p:nvSpPr>
+        <p:spPr>
+          <a:xfrm>
+            <a:off x="5867400" y="2667000"/>
+            <a:ext cx="1828800" cy="1371600"/>
+          </a:xfrm>
+          <a:prstGeom prst="roundRect">
+            <a:avLst/>
+          </a:prstGeom>
+          <a:ln/>
+        </p:spPr>
+        <p:style>
+          <a:lnRef idx="3">
+            <a:schemeClr val="lt1"/>
+          </a:lnRef>
+          <a:fillRef idx="1">
+            <a:schemeClr val="accent3"/>
+          </a:fillRef>
+          <a:effectRef idx="1">
+            <a:schemeClr val="accent3"/>
+          </a:effectRef>
+          <a:fontRef idx="minor">
+            <a:schemeClr val="lt1"/>
+          </a:fontRef>
+        </p:style>
+        <p:txBody>
+          <a:bodyPr rtlCol="0" anchor="ctr"/>
+          <a:lstStyle/>
+          <a:p>
+            <a:pPr algn="ctr"/>
+            <a:endParaRPr lang="zh-CN" altLang="en-US"/>
+          </a:p>
+        </p:txBody>
+      </p:sp>
+      <p:sp>
+        <p:nvSpPr>
+          <p:cNvPr id="8" name="selectMeNow4"/>
+          <p:cNvSpPr/>
+          <p:nvPr/>
+        </p:nvSpPr>
+        <p:spPr>
+          <a:xfrm>
+            <a:off x="5867400" y="4191000"/>
+            <a:ext cx="1828800" cy="1371600"/>
+          </a:xfrm>
+          <a:prstGeom prst="roundRect">
+            <a:avLst/>
+          </a:prstGeom>
+          <a:solidFill>
+            <a:schemeClr val="accent6">
+              <a:alpha val="50000"/>
+            </a:schemeClr>
+          </a:solidFill>
+          <a:ln>
+            <a:noFill/>
+          </a:ln>
+        </p:spPr>
+        <p:style>
+          <a:lnRef idx="0">
+            <a:scrgbClr r="0" g="0" b="0"/>
+          </a:lnRef>
+          <a:fillRef idx="0">
+            <a:scrgbClr r="0" g="0" b="0"/>
+          </a:fillRef>
+          <a:effectRef idx="0">
+            <a:scrgbClr r="0" g="0" b="0"/>
+          </a:effectRef>
+          <a:fontRef idx="minor">
+            <a:schemeClr val="lt1"/>
+          </a:fontRef>
+        </p:style>
+        <p:txBody>
+          <a:bodyPr rtlCol="0" anchor="ctr"/>
+          <a:lstStyle/>
+          <a:p>
+            <a:pPr algn="ctr"/>
+            <a:endParaRPr lang="zh-CN" altLang="en-US"/>
+          </a:p>
+        </p:txBody>
+      </p:sp>
+      <p:sp>
+        <p:nvSpPr>
+          <p:cNvPr id="2" name="copyMe"/>
+          <p:cNvSpPr/>
+          <p:nvPr/>
+        </p:nvSpPr>
+        <p:spPr>
+          <a:xfrm>
+            <a:off x="2438400" y="1206811"/>
+            <a:ext cx="4191000" cy="4191000"/>
+          </a:xfrm>
+          <a:prstGeom prst="heptagon">
+            <a:avLst/>
+          </a:prstGeom>
+        </p:spPr>
+        <p:style>
+          <a:lnRef idx="2">
+            <a:schemeClr val="accent1">
+              <a:shade val="50000"/>
+            </a:schemeClr>
+          </a:lnRef>
+          <a:fillRef idx="1">
+            <a:schemeClr val="accent1"/>
+          </a:fillRef>
+          <a:effectRef idx="0">
+            <a:schemeClr val="accent1"/>
+          </a:effectRef>
+          <a:fontRef idx="minor">
+            <a:schemeClr val="lt1"/>
+          </a:fontRef>
+        </p:style>
+        <p:txBody>
+          <a:bodyPr rtlCol="0" anchor="ctr"/>
+          <a:lstStyle/>
+          <a:p>
+            <a:pPr algn="ctr"/>
+            <a:endParaRPr lang="en-SG"/>
+          </a:p>
+        </p:txBody>
+      </p:sp>
+    </p:spTree>
+    <p:extLst>
+      <p:ext uri="{BB962C8B-B14F-4D97-AF65-F5344CB8AC3E}">
+        <p14:creationId xmlns:p14="http://schemas.microsoft.com/office/powerpoint/2010/main" val="2188512437"/>
+      </p:ext>
+    </p:extLst>
+  </p:cSld>
+  <p:clrMapOvr>
+    <a:masterClrMapping/>
+  </p:clrMapOvr>
+  <p:timing>
+    <p:tnLst>
+      <p:par>
+        <p:cTn id="1" dur="indefinite" restart="never" nodeType="tmRoot">
+          <p:childTnLst>
+            <p:seq concurrent="1" nextAc="seek">
+              <p:cTn id="2" dur="indefinite" nodeType="mainSeq">
+                <p:childTnLst>
+                  <p:par>
+                    <p:cTn id="3" fill="hold">
+                      <p:stCondLst>
+                        <p:cond delay="indefinite"/>
+                      </p:stCondLst>
+                      <p:childTnLst>
+                        <p:par>
+                          <p:cTn id="4" fill="hold">
+                            <p:stCondLst>
+                              <p:cond delay="0"/>
+                            </p:stCondLst>
+                            <p:childTnLst>
+                              <p:par>
+                                <p:cTn id="5" presetID="2" presetClass="entr" presetSubtype="4" fill="hold" grpId="0" nodeType="clickEffect">
+                                  <p:stCondLst>
+                                    <p:cond delay="0"/>
+                                  </p:stCondLst>
+                                  <p:childTnLst>
+                                    <p:set>
+                                      <p:cBhvr>
+                                        <p:cTn id="6" dur="1" fill="hold">
+                                          <p:stCondLst>
+                                            <p:cond delay="0"/>
+                                          </p:stCondLst>
+                                        </p:cTn>
+                                        <p:tgtEl>
+                                          <p:spTgt spid="3"/>
+                                        </p:tgtEl>
+                                        <p:attrNameLst>
+                                          <p:attrName>style.visibility</p:attrName>
+                                        </p:attrNameLst>
+                                      </p:cBhvr>
+                                      <p:to>
+                                        <p:strVal val="visible"/>
+                                      </p:to>
+                                    </p:set>
+                                    <p:anim calcmode="lin" valueType="num">
+                                      <p:cBhvr additive="base">
+                                        <p:cTn id="7" dur="500" fill="hold"/>
+                                        <p:tgtEl>
+                                          <p:spTgt spid="3"/>
+                                        </p:tgtEl>
+                                        <p:attrNameLst>
+                                          <p:attrName>ppt_x</p:attrName>
+                                        </p:attrNameLst>
+                                      </p:cBhvr>
+                                      <p:tavLst>
+                                        <p:tav tm="0">
+                                          <p:val>
+                                            <p:strVal val="#ppt_x"/>
+                                          </p:val>
+                                        </p:tav>
+                                        <p:tav tm="100000">
+                                          <p:val>
+                                            <p:strVal val="#ppt_x"/>
+                                          </p:val>
+                                        </p:tav>
+                                      </p:tavLst>
+                                    </p:anim>
+                                    <p:anim calcmode="lin" valueType="num">
+                                      <p:cBhvr additive="base">
+                                        <p:cTn id="8" dur="500" fill="hold"/>
+                                        <p:tgtEl>
+                                          <p:spTgt spid="3"/>
+                                        </p:tgtEl>
+                                        <p:attrNameLst>
+                                          <p:attrName>ppt_y</p:attrName>
+                                        </p:attrNameLst>
+                                      </p:cBhvr>
+                                      <p:tavLst>
+                                        <p:tav tm="0">
+                                          <p:val>
+                                            <p:strVal val="1+#ppt_h/2"/>
+                                          </p:val>
+                                        </p:tav>
+                                        <p:tav tm="100000">
+                                          <p:val>
+                                            <p:strVal val="#ppt_y"/>
+                                          </p:val>
+                                        </p:tav>
+                                      </p:tavLst>
+                                    </p:anim>
+                                  </p:childTnLst>
+                                </p:cTn>
+                              </p:par>
+                            </p:childTnLst>
+                          </p:cTn>
+                        </p:par>
+                      </p:childTnLst>
+                    </p:cTn>
+                  </p:par>
+                  <p:par>
+                    <p:cTn id="9" fill="hold">
+                      <p:stCondLst>
+                        <p:cond delay="indefinite"/>
+                      </p:stCondLst>
+                      <p:childTnLst>
+                        <p:par>
+                          <p:cTn id="10" fill="hold">
+                            <p:stCondLst>
+                              <p:cond delay="0"/>
+                            </p:stCondLst>
+                            <p:childTnLst>
+                              <p:par>
+                                <p:cTn id="11" presetID="1" presetClass="entr" presetSubtype="0" fill="hold" grpId="0" nodeType="clickEffect">
+                                  <p:stCondLst>
+                                    <p:cond delay="0"/>
+                                  </p:stCondLst>
+                                  <p:childTnLst>
+                                    <p:set>
+                                      <p:cBhvr>
+                                        <p:cTn id="12" dur="1" fill="hold">
+                                          <p:stCondLst>
+                                            <p:cond delay="0"/>
+                                          </p:stCondLst>
+                                        </p:cTn>
+                                        <p:tgtEl>
+                                          <p:spTgt spid="5"/>
+                                        </p:tgtEl>
+                                        <p:attrNameLst>
+                                          <p:attrName>style.visibility</p:attrName>
+                                        </p:attrNameLst>
+                                      </p:cBhvr>
+                                      <p:to>
+                                        <p:strVal val="visible"/>
+                                      </p:to>
+                                    </p:set>
+                                  </p:childTnLst>
+                                </p:cTn>
+                              </p:par>
+                            </p:childTnLst>
+                          </p:cTn>
+                        </p:par>
+                      </p:childTnLst>
+                    </p:cTn>
+                  </p:par>
+                  <p:par>
+                    <p:cTn id="13" fill="hold">
+                      <p:stCondLst>
+                        <p:cond delay="indefinite"/>
+                      </p:stCondLst>
+                      <p:childTnLst>
+                        <p:par>
+                          <p:cTn id="14" fill="hold">
+                            <p:stCondLst>
+                              <p:cond delay="0"/>
+                            </p:stCondLst>
+                            <p:childTnLst>
+                              <p:par>
+                                <p:cTn id="15" presetID="10" presetClass="entr" presetSubtype="0" fill="hold" grpId="0" nodeType="clickEffect">
+                                  <p:stCondLst>
+                                    <p:cond delay="0"/>
+                                  </p:stCondLst>
+                                  <p:childTnLst>
+                                    <p:set>
+                                      <p:cBhvr>
+                                        <p:cTn id="16" dur="1" fill="hold">
+                                          <p:stCondLst>
+                                            <p:cond delay="0"/>
+                                          </p:stCondLst>
+                                        </p:cTn>
+                                        <p:tgtEl>
+                                          <p:spTgt spid="7"/>
+                                        </p:tgtEl>
+                                        <p:attrNameLst>
+                                          <p:attrName>style.visibility</p:attrName>
+                                        </p:attrNameLst>
+                                      </p:cBhvr>
+                                      <p:to>
+                                        <p:strVal val="visible"/>
+                                      </p:to>
+                                    </p:set>
+                                    <p:animEffect transition="in" filter="fade">
+                                      <p:cBhvr>
+                                        <p:cTn id="17" dur="500"/>
+                                        <p:tgtEl>
+                                          <p:spTgt spid="7"/>
+                                        </p:tgtEl>
+                                      </p:cBhvr>
+                                    </p:animEffect>
+                                  </p:childTnLst>
+                                </p:cTn>
+                              </p:par>
+                            </p:childTnLst>
+                          </p:cTn>
+                        </p:par>
+                      </p:childTnLst>
+                    </p:cTn>
+                  </p:par>
+                  <p:par>
+                    <p:cTn id="18" fill="hold">
+                      <p:stCondLst>
+                        <p:cond delay="indefinite"/>
+                      </p:stCondLst>
+                      <p:childTnLst>
+                        <p:par>
+                          <p:cTn id="19" fill="hold">
+                            <p:stCondLst>
+                              <p:cond delay="0"/>
+                            </p:stCondLst>
+                            <p:childTnLst>
+                              <p:par>
+                                <p:cTn id="20" presetID="16" presetClass="entr" presetSubtype="21" fill="hold" grpId="0" nodeType="clickEffect">
+                                  <p:stCondLst>
+                                    <p:cond delay="0"/>
+                                  </p:stCondLst>
+                                  <p:childTnLst>
+                                    <p:set>
+                                      <p:cBhvr>
+                                        <p:cTn id="21" dur="1" fill="hold">
+                                          <p:stCondLst>
+                                            <p:cond delay="0"/>
+                                          </p:stCondLst>
+                                        </p:cTn>
+                                        <p:tgtEl>
+                                          <p:spTgt spid="8"/>
+                                        </p:tgtEl>
+                                        <p:attrNameLst>
+                                          <p:attrName>style.visibility</p:attrName>
+                                        </p:attrNameLst>
+                                      </p:cBhvr>
+                                      <p:to>
+                                        <p:strVal val="visible"/>
+                                      </p:to>
+                                    </p:set>
+                                    <p:animEffect transition="in" filter="barn(inVertical)">
+                                      <p:cBhvr>
+                                        <p:cTn id="22" dur="500"/>
+                                        <p:tgtEl>
+                                          <p:spTgt spid="8"/>
+                                        </p:tgtEl>
+                                      </p:cBhvr>
+                                    </p:animEffect>
+                                  </p:childTnLst>
+                                </p:cTn>
+                              </p:par>
+                            </p:childTnLst>
+                          </p:cTn>
+                        </p:par>
+                      </p:childTnLst>
+                    </p:cTn>
+                  </p:par>
+                </p:childTnLst>
+              </p:cTn>
+              <p:prevCondLst>
+                <p:cond evt="onPrev" delay="0">
+                  <p:tgtEl>
+                    <p:sldTgt/>
+                  </p:tgtEl>
+                </p:cond>
+              </p:prevCondLst>
+              <p:nextCondLst>
+                <p:cond evt="onNext" delay="0">
+                  <p:tgtEl>
+                    <p:sldTgt/>
+                  </p:tgtEl>
+                </p:cond>
+              </p:nextCondLst>
+            </p:seq>
+          </p:childTnLst>
+        </p:cTn>
+      </p:par>
+    </p:tnLst>
+    <p:bldLst>
+      <p:bldP spid="3" grpId="0" animBg="1"/>
+      <p:bldP spid="5" grpId="0" animBg="1"/>
+      <p:bldP spid="7" grpId="0" animBg="1"/>
+      <p:bldP spid="8" grpId="0" animBg="1"/>
+    </p:bldLst>
+  </p:timing>
+</p:sld>
+</file>
+
+<file path=ppt/slides/slide14.xml><?xml version="1.0" encoding="utf-8"?>
+<p:sld xmlns:a="http://schemas.openxmlformats.org/drawingml/2006/main" xmlns:r="http://schemas.openxmlformats.org/officeDocument/2006/relationships" xmlns:p="http://schemas.openxmlformats.org/presentationml/2006/main">
+  <p:cSld>
+    <p:spTree>
+      <p:nvGrpSpPr>
+        <p:cNvPr id="1" name=""/>
+        <p:cNvGrpSpPr/>
+        <p:nvPr/>
+      </p:nvGrpSpPr>
+      <p:grpSpPr>
+        <a:xfrm>
+          <a:off x="0" y="0"/>
+          <a:ext cx="0" cy="0"/>
+          <a:chOff x="0" y="0"/>
+          <a:chExt cx="0" cy="0"/>
+        </a:xfrm>
+      </p:grpSpPr>
+    </p:spTree>
+    <p:extLst>
+      <p:ext uri="{BB962C8B-B14F-4D97-AF65-F5344CB8AC3E}">
+        <p14:creationId xmlns:p14="http://schemas.microsoft.com/office/powerpoint/2010/main" val="1779079148"/>
+      </p:ext>
+    </p:extLst>
+  </p:cSld>
+  <p:clrMapOvr>
+    <a:masterClrMapping/>
+  </p:clrMapOvr>
+  <p:timing>
+    <p:tnLst>
+      <p:par>
+        <p:cTn id="1" dur="indefinite" restart="never" nodeType="tmRoot"/>
+      </p:par>
+    </p:tnLst>
+  </p:timing>
+</p:sld>
+</file>
+
+<file path=ppt/slides/slide15.xml><?xml version="1.0" encoding="utf-8"?>
+<p:sld xmlns:a="http://schemas.openxmlformats.org/drawingml/2006/main" xmlns:r="http://schemas.openxmlformats.org/officeDocument/2006/relationships" xmlns:p="http://schemas.openxmlformats.org/presentationml/2006/main">
+  <p:cSld>
+    <p:spTree>
+      <p:nvGrpSpPr>
+        <p:cNvPr id="1" name=""/>
+        <p:cNvGrpSpPr/>
+        <p:nvPr/>
+      </p:nvGrpSpPr>
+      <p:grpSpPr>
+        <a:xfrm>
+          <a:off x="0" y="0"/>
+          <a:ext cx="0" cy="0"/>
+          <a:chOff x="0" y="0"/>
+          <a:chExt cx="0" cy="0"/>
+        </a:xfrm>
+      </p:grpSpPr>
+      <p:sp>
+        <p:nvSpPr>
+          <p:cNvPr id="6" name="Group selectMeNow1 Seq_1"/>
+          <p:cNvSpPr/>
+          <p:nvPr/>
+        </p:nvSpPr>
+        <p:spPr>
+          <a:xfrm rot="1965194">
+            <a:off x="1533377" y="1406276"/>
+            <a:ext cx="3200400" cy="3792071"/>
+          </a:xfrm>
+          <a:prstGeom prst="roundRect">
+            <a:avLst/>
+          </a:prstGeom>
+          <a:solidFill>
+            <a:schemeClr val="accent2">
+              <a:lumMod val="40000"/>
+              <a:lumOff val="60000"/>
+            </a:schemeClr>
+          </a:solidFill>
+          <a:ln w="203200">
+            <a:solidFill>
+              <a:srgbClr val="92D050"/>
+            </a:solidFill>
+          </a:ln>
+          <a:effectLst>
+            <a:innerShdw blurRad="63500" dist="50800" dir="8100000">
+              <a:prstClr val="black">
+                <a:alpha val="50000"/>
+              </a:prstClr>
+            </a:innerShdw>
+          </a:effectLst>
+        </p:spPr>
+        <p:style>
+          <a:lnRef idx="2">
+            <a:schemeClr val="accent1">
+              <a:shade val="50000"/>
+            </a:schemeClr>
+          </a:lnRef>
+          <a:fillRef idx="1">
+            <a:schemeClr val="accent1"/>
+          </a:fillRef>
+          <a:effectRef idx="0">
+            <a:schemeClr val="accent1"/>
+          </a:effectRef>
+          <a:fontRef idx="minor">
+            <a:schemeClr val="lt1"/>
+          </a:fontRef>
+        </p:style>
+        <p:txBody>
+          <a:bodyPr rtlCol="0" anchor="ctr"/>
+          <a:lstStyle/>
+          <a:p>
+            <a:pPr algn="ctr"/>
+            <a:r>
+              <a:rPr lang="en-US" altLang="zh-CN" sz="6600" dirty="0" smtClean="0">
+                <a:solidFill>
+                  <a:srgbClr val="EB7561"/>
+                </a:solidFill>
+                <a:latin typeface="Times New Roman" panose="02020603050405020304" pitchFamily="18" charset="0"/>
+                <a:cs typeface="Times New Roman" panose="02020603050405020304" pitchFamily="18" charset="0"/>
+              </a:rPr>
+              <a:t>TEXT</a:t>
+            </a:r>
+            <a:endParaRPr lang="zh-CN" altLang="en-US" sz="6600" dirty="0">
+              <a:solidFill>
+                <a:srgbClr val="EB7561"/>
+              </a:solidFill>
+              <a:latin typeface="Times New Roman" panose="02020603050405020304" pitchFamily="18" charset="0"/>
+              <a:cs typeface="Times New Roman" panose="02020603050405020304" pitchFamily="18" charset="0"/>
+            </a:endParaRPr>
+          </a:p>
+        </p:txBody>
+      </p:sp>
+      <p:sp>
+        <p:nvSpPr>
+          <p:cNvPr id="9" name="Group selectMeNow1 Seq_2"/>
+          <p:cNvSpPr/>
+          <p:nvPr/>
+        </p:nvSpPr>
+        <p:spPr>
+          <a:xfrm>
+            <a:off x="5867400" y="1143000"/>
+            <a:ext cx="1828800" cy="1371600"/>
+          </a:xfrm>
+          <a:prstGeom prst="roundRect">
+            <a:avLst/>
+          </a:prstGeom>
+          <a:ln/>
+        </p:spPr>
+        <p:style>
+          <a:lnRef idx="3">
+            <a:schemeClr val="lt1"/>
+          </a:lnRef>
+          <a:fillRef idx="1">
+            <a:schemeClr val="accent6"/>
+          </a:fillRef>
+          <a:effectRef idx="1">
+            <a:schemeClr val="accent6"/>
+          </a:effectRef>
+          <a:fontRef idx="minor">
+            <a:schemeClr val="lt1"/>
+          </a:fontRef>
+        </p:style>
+        <p:txBody>
+          <a:bodyPr rtlCol="0" anchor="ctr"/>
+          <a:lstStyle/>
+          <a:p>
+            <a:pPr algn="ctr"/>
+            <a:endParaRPr lang="zh-CN" altLang="en-US"/>
+          </a:p>
+        </p:txBody>
+      </p:sp>
+      <p:sp>
+        <p:nvSpPr>
+          <p:cNvPr id="10" name="Group selectMeNow1 Seq_3"/>
+          <p:cNvSpPr/>
+          <p:nvPr/>
+        </p:nvSpPr>
+        <p:spPr>
+          <a:xfrm>
+            <a:off x="5867400" y="2667000"/>
+            <a:ext cx="1828800" cy="1371600"/>
+          </a:xfrm>
+          <a:prstGeom prst="roundRect">
+            <a:avLst/>
+          </a:prstGeom>
+          <a:ln/>
+        </p:spPr>
+        <p:style>
+          <a:lnRef idx="3">
+            <a:schemeClr val="lt1"/>
+          </a:lnRef>
+          <a:fillRef idx="1">
+            <a:schemeClr val="accent3"/>
+          </a:fillRef>
+          <a:effectRef idx="1">
+            <a:schemeClr val="accent3"/>
+          </a:effectRef>
+          <a:fontRef idx="minor">
+            <a:schemeClr val="lt1"/>
+          </a:fontRef>
+        </p:style>
+        <p:txBody>
+          <a:bodyPr rtlCol="0" anchor="ctr"/>
+          <a:lstStyle/>
+          <a:p>
+            <a:pPr algn="ctr"/>
+            <a:endParaRPr lang="zh-CN" altLang="en-US"/>
+          </a:p>
+        </p:txBody>
+      </p:sp>
+      <p:sp>
+        <p:nvSpPr>
+          <p:cNvPr id="11" name="Group selectMeNow1 Seq_4"/>
+          <p:cNvSpPr/>
+          <p:nvPr/>
+        </p:nvSpPr>
+        <p:spPr>
+          <a:xfrm>
+            <a:off x="5867400" y="4191000"/>
+            <a:ext cx="1828800" cy="1371600"/>
+          </a:xfrm>
+          <a:prstGeom prst="roundRect">
+            <a:avLst/>
+          </a:prstGeom>
+          <a:solidFill>
+            <a:schemeClr val="accent6">
+              <a:alpha val="50000"/>
+            </a:schemeClr>
+          </a:solidFill>
+          <a:ln>
+            <a:noFill/>
+          </a:ln>
+        </p:spPr>
+        <p:style>
+          <a:lnRef idx="0">
+            <a:scrgbClr r="0" g="0" b="0"/>
+          </a:lnRef>
+          <a:fillRef idx="0">
+            <a:scrgbClr r="0" g="0" b="0"/>
+          </a:fillRef>
+          <a:effectRef idx="0">
+            <a:scrgbClr r="0" g="0" b="0"/>
+          </a:effectRef>
+          <a:fontRef idx="minor">
+            <a:schemeClr val="lt1"/>
+          </a:fontRef>
+        </p:style>
+        <p:txBody>
+          <a:bodyPr rtlCol="0" anchor="ctr"/>
+          <a:lstStyle/>
+          <a:p>
+            <a:pPr algn="ctr"/>
+            <a:endParaRPr lang="zh-CN" altLang="en-US"/>
+          </a:p>
+        </p:txBody>
+      </p:sp>
+      <p:sp>
+        <p:nvSpPr>
+          <p:cNvPr id="7" name="copyMe"/>
+          <p:cNvSpPr/>
+          <p:nvPr/>
+        </p:nvSpPr>
+        <p:spPr>
+          <a:xfrm>
+            <a:off x="2438400" y="1206811"/>
+            <a:ext cx="4191000" cy="4191000"/>
+          </a:xfrm>
+          <a:prstGeom prst="heptagon">
+            <a:avLst/>
+          </a:prstGeom>
+        </p:spPr>
+        <p:style>
+          <a:lnRef idx="2">
+            <a:schemeClr val="accent1">
+              <a:shade val="50000"/>
+            </a:schemeClr>
+          </a:lnRef>
+          <a:fillRef idx="1">
+            <a:schemeClr val="accent1"/>
+          </a:fillRef>
+          <a:effectRef idx="0">
+            <a:schemeClr val="accent1"/>
+          </a:effectRef>
+          <a:fontRef idx="minor">
+            <a:schemeClr val="lt1"/>
+          </a:fontRef>
+        </p:style>
+        <p:txBody>
+          <a:bodyPr rtlCol="0" anchor="ctr"/>
+          <a:lstStyle/>
+          <a:p>
+            <a:pPr algn="ctr"/>
+            <a:endParaRPr lang="en-SG"/>
+          </a:p>
+        </p:txBody>
+      </p:sp>
+      <p:sp>
+        <p:nvSpPr>
+          <p:cNvPr id="2" name="Expected"/>
+          <p:cNvSpPr txBox="1"/>
+          <p:nvPr/>
+        </p:nvSpPr>
+        <p:spPr>
+          <a:xfrm>
+            <a:off x="3769556" y="6095135"/>
+            <a:ext cx="1528688" cy="369332"/>
+          </a:xfrm>
+          <a:prstGeom prst="rect">
+            <a:avLst/>
+          </a:prstGeom>
+          <a:noFill/>
+        </p:spPr>
+        <p:txBody>
+          <a:bodyPr wrap="none" rtlCol="0">
+            <a:spAutoFit/>
+          </a:bodyPr>
+          <a:lstStyle/>
+          <a:p>
+            <a:r>
+              <a:rPr lang="en-SG" dirty="0" smtClean="0"/>
+              <a:t>Expected slide</a:t>
+            </a:r>
+            <a:endParaRPr lang="en-SG" dirty="0"/>
+          </a:p>
+        </p:txBody>
+      </p:sp>
+      <p:sp>
+        <p:nvSpPr>
+          <p:cNvPr id="8" name="compareMe"/>
+          <p:cNvSpPr/>
+          <p:nvPr/>
+        </p:nvSpPr>
+        <p:spPr>
+          <a:xfrm>
+            <a:off x="4927600" y="509488"/>
+            <a:ext cx="4191000" cy="4191000"/>
+          </a:xfrm>
+          <a:prstGeom prst="heptagon">
+            <a:avLst/>
+          </a:prstGeom>
+        </p:spPr>
+        <p:style>
+          <a:lnRef idx="2">
+            <a:schemeClr val="accent1">
+              <a:shade val="50000"/>
+            </a:schemeClr>
+          </a:lnRef>
+          <a:fillRef idx="1">
+            <a:schemeClr val="accent1"/>
+          </a:fillRef>
+          <a:effectRef idx="0">
+            <a:schemeClr val="accent1"/>
+          </a:effectRef>
+          <a:fontRef idx="minor">
+            <a:schemeClr val="lt1"/>
+          </a:fontRef>
+        </p:style>
+        <p:txBody>
+          <a:bodyPr rtlCol="0" anchor="ctr"/>
+          <a:lstStyle/>
+          <a:p>
+            <a:pPr algn="ctr"/>
+            <a:endParaRPr lang="en-SG"/>
+          </a:p>
+        </p:txBody>
+      </p:sp>
+    </p:spTree>
+    <p:extLst>
+      <p:ext uri="{BB962C8B-B14F-4D97-AF65-F5344CB8AC3E}">
+        <p14:creationId xmlns:p14="http://schemas.microsoft.com/office/powerpoint/2010/main" val="3922223169"/>
+      </p:ext>
+    </p:extLst>
+  </p:cSld>
+  <p:clrMapOvr>
+    <a:masterClrMapping/>
+  </p:clrMapOvr>
+  <p:timing>
+    <p:tnLst>
+      <p:par>
+        <p:cTn id="1" dur="indefinite" restart="never" nodeType="tmRoot">
+          <p:childTnLst>
+            <p:seq concurrent="1" nextAc="seek">
+              <p:cTn id="2" dur="indefinite" nodeType="mainSeq">
+                <p:childTnLst>
+                  <p:par>
+                    <p:cTn id="3" fill="hold">
+                      <p:stCondLst>
+                        <p:cond delay="indefinite"/>
+                      </p:stCondLst>
+                      <p:childTnLst>
+                        <p:par>
+                          <p:cTn id="4" fill="hold">
+                            <p:stCondLst>
+                              <p:cond delay="0"/>
+                            </p:stCondLst>
+                            <p:childTnLst>
+                              <p:par>
+                                <p:cTn id="5" presetID="2" presetClass="entr" presetSubtype="4" fill="hold" grpId="0" nodeType="clickEffect">
+                                  <p:stCondLst>
+                                    <p:cond delay="0"/>
+                                  </p:stCondLst>
+                                  <p:childTnLst>
+                                    <p:set>
+                                      <p:cBhvr>
+                                        <p:cTn id="6" dur="1" fill="hold">
+                                          <p:stCondLst>
+                                            <p:cond delay="0"/>
+                                          </p:stCondLst>
+                                        </p:cTn>
+                                        <p:tgtEl>
+                                          <p:spTgt spid="6"/>
+                                        </p:tgtEl>
+                                        <p:attrNameLst>
+                                          <p:attrName>style.visibility</p:attrName>
+                                        </p:attrNameLst>
+                                      </p:cBhvr>
+                                      <p:to>
+                                        <p:strVal val="visible"/>
+                                      </p:to>
+                                    </p:set>
+                                    <p:anim calcmode="lin" valueType="num">
+                                      <p:cBhvr additive="base">
+                                        <p:cTn id="7" dur="500" fill="hold"/>
+                                        <p:tgtEl>
+                                          <p:spTgt spid="6"/>
+                                        </p:tgtEl>
+                                        <p:attrNameLst>
+                                          <p:attrName>ppt_x</p:attrName>
+                                        </p:attrNameLst>
+                                      </p:cBhvr>
+                                      <p:tavLst>
+                                        <p:tav tm="0">
+                                          <p:val>
+                                            <p:strVal val="#ppt_x"/>
+                                          </p:val>
+                                        </p:tav>
+                                        <p:tav tm="100000">
+                                          <p:val>
+                                            <p:strVal val="#ppt_x"/>
+                                          </p:val>
+                                        </p:tav>
+                                      </p:tavLst>
+                                    </p:anim>
+                                    <p:anim calcmode="lin" valueType="num">
+                                      <p:cBhvr additive="base">
+                                        <p:cTn id="8" dur="500" fill="hold"/>
+                                        <p:tgtEl>
+                                          <p:spTgt spid="6"/>
+                                        </p:tgtEl>
+                                        <p:attrNameLst>
+                                          <p:attrName>ppt_y</p:attrName>
+                                        </p:attrNameLst>
+                                      </p:cBhvr>
+                                      <p:tavLst>
+                                        <p:tav tm="0">
+                                          <p:val>
+                                            <p:strVal val="1+#ppt_h/2"/>
+                                          </p:val>
+                                        </p:tav>
+                                        <p:tav tm="100000">
+                                          <p:val>
+                                            <p:strVal val="#ppt_y"/>
+                                          </p:val>
+                                        </p:tav>
+                                      </p:tavLst>
+                                    </p:anim>
+                                  </p:childTnLst>
+                                </p:cTn>
+                              </p:par>
+                            </p:childTnLst>
+                          </p:cTn>
+                        </p:par>
+                      </p:childTnLst>
+                    </p:cTn>
+                  </p:par>
+                  <p:par>
+                    <p:cTn id="9" fill="hold">
+                      <p:stCondLst>
+                        <p:cond delay="indefinite"/>
+                      </p:stCondLst>
+                      <p:childTnLst>
+                        <p:par>
+                          <p:cTn id="10" fill="hold">
+                            <p:stCondLst>
+                              <p:cond delay="0"/>
+                            </p:stCondLst>
+                            <p:childTnLst>
+                              <p:par>
+                                <p:cTn id="11" presetID="1" presetClass="entr" presetSubtype="0" fill="hold" grpId="0" nodeType="clickEffect">
+                                  <p:stCondLst>
+                                    <p:cond delay="0"/>
+                                  </p:stCondLst>
+                                  <p:childTnLst>
+                                    <p:set>
+                                      <p:cBhvr>
+                                        <p:cTn id="12" dur="1" fill="hold">
+                                          <p:stCondLst>
+                                            <p:cond delay="0"/>
+                                          </p:stCondLst>
+                                        </p:cTn>
+                                        <p:tgtEl>
+                                          <p:spTgt spid="9"/>
+                                        </p:tgtEl>
+                                        <p:attrNameLst>
+                                          <p:attrName>style.visibility</p:attrName>
+                                        </p:attrNameLst>
+                                      </p:cBhvr>
+                                      <p:to>
+                                        <p:strVal val="visible"/>
+                                      </p:to>
+                                    </p:set>
+                                  </p:childTnLst>
+                                </p:cTn>
+                              </p:par>
+                            </p:childTnLst>
+                          </p:cTn>
+                        </p:par>
+                      </p:childTnLst>
+                    </p:cTn>
+                  </p:par>
+                  <p:par>
+                    <p:cTn id="13" fill="hold">
+                      <p:stCondLst>
+                        <p:cond delay="indefinite"/>
+                      </p:stCondLst>
+                      <p:childTnLst>
+                        <p:par>
+                          <p:cTn id="14" fill="hold">
+                            <p:stCondLst>
+                              <p:cond delay="0"/>
+                            </p:stCondLst>
+                            <p:childTnLst>
+                              <p:par>
+                                <p:cTn id="15" presetID="10" presetClass="entr" presetSubtype="0" fill="hold" grpId="0" nodeType="clickEffect">
+                                  <p:stCondLst>
+                                    <p:cond delay="0"/>
+                                  </p:stCondLst>
+                                  <p:childTnLst>
+                                    <p:set>
+                                      <p:cBhvr>
+                                        <p:cTn id="16" dur="1" fill="hold">
+                                          <p:stCondLst>
+                                            <p:cond delay="0"/>
+                                          </p:stCondLst>
+                                        </p:cTn>
+                                        <p:tgtEl>
+                                          <p:spTgt spid="10"/>
+                                        </p:tgtEl>
+                                        <p:attrNameLst>
+                                          <p:attrName>style.visibility</p:attrName>
+                                        </p:attrNameLst>
+                                      </p:cBhvr>
+                                      <p:to>
+                                        <p:strVal val="visible"/>
+                                      </p:to>
+                                    </p:set>
+                                    <p:animEffect transition="in" filter="fade">
+                                      <p:cBhvr>
+                                        <p:cTn id="17" dur="500"/>
+                                        <p:tgtEl>
+                                          <p:spTgt spid="10"/>
+                                        </p:tgtEl>
+                                      </p:cBhvr>
+                                    </p:animEffect>
+                                  </p:childTnLst>
+                                </p:cTn>
+                              </p:par>
+                            </p:childTnLst>
+                          </p:cTn>
+                        </p:par>
+                      </p:childTnLst>
+                    </p:cTn>
+                  </p:par>
+                  <p:par>
+                    <p:cTn id="18" fill="hold">
+                      <p:stCondLst>
+                        <p:cond delay="indefinite"/>
+                      </p:stCondLst>
+                      <p:childTnLst>
+                        <p:par>
+                          <p:cTn id="19" fill="hold">
+                            <p:stCondLst>
+                              <p:cond delay="0"/>
+                            </p:stCondLst>
+                            <p:childTnLst>
+                              <p:par>
+                                <p:cTn id="20" presetID="16" presetClass="entr" presetSubtype="21" fill="hold" grpId="0" nodeType="clickEffect">
+                                  <p:stCondLst>
+                                    <p:cond delay="0"/>
+                                  </p:stCondLst>
+                                  <p:childTnLst>
+                                    <p:set>
+                                      <p:cBhvr>
+                                        <p:cTn id="21" dur="1" fill="hold">
+                                          <p:stCondLst>
+                                            <p:cond delay="0"/>
+                                          </p:stCondLst>
+                                        </p:cTn>
+                                        <p:tgtEl>
+                                          <p:spTgt spid="11"/>
+                                        </p:tgtEl>
+                                        <p:attrNameLst>
+                                          <p:attrName>style.visibility</p:attrName>
+                                        </p:attrNameLst>
+                                      </p:cBhvr>
+                                      <p:to>
+                                        <p:strVal val="visible"/>
+                                      </p:to>
+                                    </p:set>
+                                    <p:animEffect transition="in" filter="barn(inVertical)">
+                                      <p:cBhvr>
+                                        <p:cTn id="22" dur="500"/>
+                                        <p:tgtEl>
+                                          <p:spTgt spid="11"/>
+                                        </p:tgtEl>
+                                      </p:cBhvr>
+                                    </p:animEffect>
+                                  </p:childTnLst>
+                                </p:cTn>
+                              </p:par>
+                            </p:childTnLst>
+                          </p:cTn>
+                        </p:par>
+                      </p:childTnLst>
+                    </p:cTn>
+                  </p:par>
+                </p:childTnLst>
+              </p:cTn>
+              <p:prevCondLst>
+                <p:cond evt="onPrev" delay="0">
+                  <p:tgtEl>
+                    <p:sldTgt/>
+                  </p:tgtEl>
+                </p:cond>
+              </p:prevCondLst>
+              <p:nextCondLst>
+                <p:cond evt="onNext" delay="0">
+                  <p:tgtEl>
+                    <p:sldTgt/>
+                  </p:tgtEl>
+                </p:cond>
+              </p:nextCondLst>
+            </p:seq>
+          </p:childTnLst>
+        </p:cTn>
+      </p:par>
+    </p:tnLst>
+    <p:bldLst>
+      <p:bldP spid="6" grpId="0" animBg="1"/>
+      <p:bldP spid="9" grpId="0" animBg="1"/>
+      <p:bldP spid="10" grpId="0" animBg="1"/>
+      <p:bldP spid="11" grpId="0" animBg="1"/>
+    </p:bldLst>
+  </p:timing>
+</p:sld>
+</file>
+
+<file path=ppt/slides/slide16.xml><?xml version="1.0" encoding="utf-8"?>
+<p:sld xmlns:a="http://schemas.openxmlformats.org/drawingml/2006/main" xmlns:r="http://schemas.openxmlformats.org/officeDocument/2006/relationships" xmlns:p="http://schemas.openxmlformats.org/presentationml/2006/main" show="0">
+  <p:cSld name="PPAck201403240026082737">
+    <p:spTree>
+      <p:nvGrpSpPr>
+        <p:cNvPr id="1" name=""/>
+        <p:cNvGrpSpPr/>
+        <p:nvPr/>
+      </p:nvGrpSpPr>
+      <p:grpSpPr>
+        <a:xfrm>
+          <a:off x="0" y="0"/>
+          <a:ext cx="0" cy="0"/>
+          <a:chOff x="0" y="0"/>
+          <a:chExt cx="0" cy="0"/>
+        </a:xfrm>
+      </p:grpSpPr>
+      <p:sp>
+        <p:nvSpPr>
+          <p:cNvPr id="2" name="标题 1"/>
+          <p:cNvSpPr>
+            <a:spLocks noGrp="1"/>
+          </p:cNvSpPr>
+          <p:nvPr>
+            <p:ph type="title"/>
+          </p:nvPr>
+        </p:nvSpPr>
+        <p:spPr/>
+        <p:txBody>
+          <a:bodyPr/>
+          <a:lstStyle/>
+          <a:p>
+            <a:endParaRPr lang="en-SG"/>
+          </a:p>
+        </p:txBody>
+      </p:sp>
+      <p:pic>
+        <p:nvPicPr>
+          <p:cNvPr id="4" name="内容占位符 3"/>
+          <p:cNvPicPr>
+            <a:picLocks noGrp="1"/>
+          </p:cNvPicPr>
+          <p:nvPr>
+            <p:ph idx="1"/>
+          </p:nvPr>
+        </p:nvPicPr>
+        <p:blipFill>
+          <a:blip r:embed="rId2">
+            <a:extLst>
+              <a:ext uri="{28A0092B-C50C-407E-A947-70E740481C1C}">
+                <a14:useLocalDpi xmlns:a14="http://schemas.microsoft.com/office/drawing/2010/main" val="0"/>
+              </a:ext>
+            </a:extLst>
+          </a:blip>
+          <a:stretch>
+            <a:fillRect/>
+          </a:stretch>
+        </p:blipFill>
+        <p:spPr>
+          <a:xfrm>
+            <a:off x="1074665" y="1600200"/>
+            <a:ext cx="6994670" cy="4525963"/>
+          </a:xfrm>
+        </p:spPr>
+      </p:pic>
+    </p:spTree>
+    <p:extLst>
+      <p:ext uri="{BB962C8B-B14F-4D97-AF65-F5344CB8AC3E}">
+        <p14:creationId xmlns:p14="http://schemas.microsoft.com/office/powerpoint/2010/main" val="2306293579"/>
+      </p:ext>
+    </p:extLst>
+  </p:cSld>
+  <p:clrMapOvr>
+    <a:masterClrMapping/>
+  </p:clrMapOvr>
+  <mc:AlternateContent xmlns:mc="http://schemas.openxmlformats.org/markup-compatibility/2006" xmlns:p14="http://schemas.microsoft.com/office/powerpoint/2010/main">
+    <mc:Choice Requires="p14">
+      <p:transition spd="slow" p14:dur="2000"/>
+    </mc:Choice>
+    <mc:Fallback xmlns="">
+      <p:transition spd="slow"/>
+    </mc:Fallback>
+  </mc:AlternateContent>
+  <p:timing>
+    <p:tnLst>
+      <p:par>
+        <p:cTn id="1" dur="indefinite" restart="never" nodeType="tmRoot"/>
+      </p:par>
+    </p:tnLst>
+  </p:timing>
+</p:sld>
+</file>
+
 <file path=ppt/slides/slide2.xml><?xml version="1.0" encoding="utf-8"?>
 <p:sld xmlns:a="http://schemas.openxmlformats.org/drawingml/2006/main" xmlns:r="http://schemas.openxmlformats.org/officeDocument/2006/relationships" xmlns:p="http://schemas.openxmlformats.org/presentationml/2006/main">
   <p:cSld>
@@ -10564,7 +13684,53 @@
       </p:grpSpPr>
       <p:sp>
         <p:nvSpPr>
-          <p:cNvPr id="3" name="selectMe1"/>
+          <p:cNvPr id="5" name="selectMe1"/>
+          <p:cNvSpPr/>
+          <p:nvPr/>
+        </p:nvSpPr>
+        <p:spPr>
+          <a:xfrm>
+            <a:off x="5867400" y="1219200"/>
+            <a:ext cx="1828800" cy="1295400"/>
+          </a:xfrm>
+          <a:prstGeom prst="roundRect">
+            <a:avLst/>
+          </a:prstGeom>
+          <a:solidFill>
+            <a:srgbClr val="EB7662"/>
+          </a:solidFill>
+          <a:ln>
+            <a:noFill/>
+          </a:ln>
+        </p:spPr>
+        <p:style>
+          <a:lnRef idx="2">
+            <a:schemeClr val="accent1">
+              <a:shade val="50000"/>
+            </a:schemeClr>
+          </a:lnRef>
+          <a:fillRef idx="1">
+            <a:schemeClr val="accent1"/>
+          </a:fillRef>
+          <a:effectRef idx="0">
+            <a:schemeClr val="accent1"/>
+          </a:effectRef>
+          <a:fontRef idx="minor">
+            <a:schemeClr val="lt1"/>
+          </a:fontRef>
+        </p:style>
+        <p:txBody>
+          <a:bodyPr rtlCol="0" anchor="ctr"/>
+          <a:lstStyle/>
+          <a:p>
+            <a:pPr algn="ctr"/>
+            <a:endParaRPr lang="zh-CN" altLang="en-US"/>
+          </a:p>
+        </p:txBody>
+      </p:sp>
+      <p:sp>
+        <p:nvSpPr>
+          <p:cNvPr id="3" name="selectMe2"/>
           <p:cNvSpPr/>
           <p:nvPr/>
         </p:nvSpPr>
@@ -10623,52 +13789,6 @@
               <a:latin typeface="Times New Roman" panose="02020603050405020304" pitchFamily="18" charset="0"/>
               <a:cs typeface="Times New Roman" panose="02020603050405020304" pitchFamily="18" charset="0"/>
             </a:endParaRPr>
-          </a:p>
-        </p:txBody>
-      </p:sp>
-      <p:sp>
-        <p:nvSpPr>
-          <p:cNvPr id="5" name="selectMe2"/>
-          <p:cNvSpPr/>
-          <p:nvPr/>
-        </p:nvSpPr>
-        <p:spPr>
-          <a:xfrm>
-            <a:off x="5867400" y="1219200"/>
-            <a:ext cx="1828800" cy="1295400"/>
-          </a:xfrm>
-          <a:prstGeom prst="roundRect">
-            <a:avLst/>
-          </a:prstGeom>
-          <a:solidFill>
-            <a:srgbClr val="EB7662"/>
-          </a:solidFill>
-          <a:ln>
-            <a:noFill/>
-          </a:ln>
-        </p:spPr>
-        <p:style>
-          <a:lnRef idx="2">
-            <a:schemeClr val="accent1">
-              <a:shade val="50000"/>
-            </a:schemeClr>
-          </a:lnRef>
-          <a:fillRef idx="1">
-            <a:schemeClr val="accent1"/>
-          </a:fillRef>
-          <a:effectRef idx="0">
-            <a:schemeClr val="accent1"/>
-          </a:effectRef>
-          <a:fontRef idx="minor">
-            <a:schemeClr val="lt1"/>
-          </a:fontRef>
-        </p:style>
-        <p:txBody>
-          <a:bodyPr rtlCol="0" anchor="ctr"/>
-          <a:lstStyle/>
-          <a:p>
-            <a:pPr algn="ctr"/>
-            <a:endParaRPr lang="zh-CN" altLang="en-US"/>
           </a:p>
         </p:txBody>
       </p:sp>
@@ -11046,8 +14166,8 @@
       </p:par>
     </p:tnLst>
     <p:bldLst>
+      <p:bldP spid="5" grpId="0" animBg="1"/>
       <p:bldP spid="3" grpId="0" animBg="1"/>
-      <p:bldP spid="5" grpId="0" animBg="1"/>
       <p:bldP spid="7" grpId="0" animBg="1"/>
       <p:bldP spid="8" grpId="0" animBg="1"/>
     </p:bldLst>
@@ -12692,8 +15812,8 @@
 </file>
 
 <file path=ppt/slides/slide9.xml><?xml version="1.0" encoding="utf-8"?>
-<p:sld xmlns:a="http://schemas.openxmlformats.org/drawingml/2006/main" xmlns:r="http://schemas.openxmlformats.org/officeDocument/2006/relationships" xmlns:p="http://schemas.openxmlformats.org/presentationml/2006/main" show="0">
-  <p:cSld name="PPAck201403240026082737">
+<p:sld xmlns:a="http://schemas.openxmlformats.org/drawingml/2006/main" xmlns:r="http://schemas.openxmlformats.org/officeDocument/2006/relationships" xmlns:p="http://schemas.openxmlformats.org/presentationml/2006/main">
+  <p:cSld>
     <p:spTree>
       <p:nvGrpSpPr>
         <p:cNvPr id="1" name=""/>
@@ -12710,7 +15830,7 @@
       </p:grpSpPr>
       <p:sp>
         <p:nvSpPr>
-          <p:cNvPr id="2" name="标题 1"/>
+          <p:cNvPr id="2" name="Title 1"/>
           <p:cNvSpPr>
             <a:spLocks noGrp="1"/>
           </p:cNvSpPr>
@@ -12718,62 +15838,169 @@
             <p:ph type="title"/>
           </p:nvPr>
         </p:nvSpPr>
-        <p:spPr/>
-        <p:txBody>
-          <a:bodyPr/>
-          <a:lstStyle/>
-          <a:p>
-            <a:endParaRPr lang="en-SG"/>
-          </a:p>
-        </p:txBody>
-      </p:sp>
-      <p:pic>
-        <p:nvPicPr>
-          <p:cNvPr id="4" name="内容占位符 3"/>
-          <p:cNvPicPr>
-            <a:picLocks noGrp="1"/>
-          </p:cNvPicPr>
-          <p:nvPr>
-            <p:ph idx="1"/>
-          </p:nvPr>
-        </p:nvPicPr>
-        <p:blipFill>
-          <a:blip r:embed="rId2">
-            <a:extLst>
-              <a:ext uri="{28A0092B-C50C-407E-A947-70E740481C1C}">
-                <a14:useLocalDpi xmlns:a14="http://schemas.microsoft.com/office/drawing/2010/main" val="0"/>
-              </a:ext>
-            </a:extLst>
-          </a:blip>
-          <a:stretch>
-            <a:fillRect/>
-          </a:stretch>
-        </p:blipFill>
         <p:spPr>
           <a:xfrm>
-            <a:off x="1074665" y="1600200"/>
-            <a:ext cx="6994670" cy="4525963"/>
+            <a:off x="381000" y="609600"/>
+            <a:ext cx="8229600" cy="1143000"/>
           </a:xfrm>
         </p:spPr>
-      </p:pic>
+        <p:txBody>
+          <a:bodyPr>
+            <a:noAutofit/>
+          </a:bodyPr>
+          <a:lstStyle/>
+          <a:p>
+            <a:pPr algn="l"/>
+            <a:r>
+              <a:rPr lang="en-US" sz="7200" dirty="0" err="1" smtClean="0">
+                <a:solidFill>
+                  <a:schemeClr val="bg1"/>
+                </a:solidFill>
+              </a:rPr>
+              <a:t>IsClipboardRestored</a:t>
+            </a:r>
+            <a:endParaRPr lang="en-SG" sz="7200" dirty="0">
+              <a:solidFill>
+                <a:schemeClr val="bg1"/>
+              </a:solidFill>
+            </a:endParaRPr>
+          </a:p>
+        </p:txBody>
+      </p:sp>
+      <p:sp>
+        <p:nvSpPr>
+          <p:cNvPr id="3" name="TextBox 2"/>
+          <p:cNvSpPr txBox="1"/>
+          <p:nvPr/>
+        </p:nvSpPr>
+        <p:spPr>
+          <a:xfrm>
+            <a:off x="381000" y="2057400"/>
+            <a:ext cx="8229600" cy="3539430"/>
+          </a:xfrm>
+          <a:prstGeom prst="rect">
+            <a:avLst/>
+          </a:prstGeom>
+          <a:noFill/>
+        </p:spPr>
+        <p:txBody>
+          <a:bodyPr wrap="square" rtlCol="0">
+            <a:spAutoFit/>
+          </a:bodyPr>
+          <a:lstStyle/>
+          <a:p>
+            <a:r>
+              <a:rPr lang="en-US" altLang="zh-CN" sz="2800" dirty="0" smtClean="0">
+                <a:solidFill>
+                  <a:schemeClr val="bg1"/>
+                </a:solidFill>
+              </a:rPr>
+              <a:t>Add those shapes in slide 3 to Shapes Lab;</a:t>
+            </a:r>
+          </a:p>
+          <a:p>
+            <a:r>
+              <a:rPr lang="en-US" altLang="zh-CN" sz="2800" dirty="0" smtClean="0">
+                <a:solidFill>
+                  <a:schemeClr val="bg1"/>
+                </a:solidFill>
+              </a:rPr>
+              <a:t>Add added shapes in Shapes Lab to slide 4;</a:t>
+            </a:r>
+          </a:p>
+          <a:p>
+            <a:r>
+              <a:rPr lang="en-US" altLang="zh-CN" sz="2800" dirty="0" smtClean="0">
+                <a:solidFill>
+                  <a:schemeClr val="bg1"/>
+                </a:solidFill>
+              </a:rPr>
+              <a:t>Compare slide 4 and expected slide 5</a:t>
+            </a:r>
+          </a:p>
+          <a:p>
+            <a:endParaRPr lang="en-US" altLang="zh-CN" sz="2800" dirty="0">
+              <a:solidFill>
+                <a:schemeClr val="bg1"/>
+              </a:solidFill>
+            </a:endParaRPr>
+          </a:p>
+          <a:p>
+            <a:r>
+              <a:rPr lang="en-US" altLang="zh-CN" sz="2800" dirty="0" smtClean="0">
+                <a:solidFill>
+                  <a:schemeClr val="bg1"/>
+                </a:solidFill>
+              </a:rPr>
+              <a:t>Repeat for testing </a:t>
+            </a:r>
+            <a:r>
+              <a:rPr lang="en-US" altLang="zh-CN" sz="2800" dirty="0">
+                <a:solidFill>
+                  <a:schemeClr val="bg1"/>
+                </a:solidFill>
+              </a:rPr>
+              <a:t>A</a:t>
+            </a:r>
+            <a:r>
+              <a:rPr lang="en-US" altLang="zh-CN" sz="2800" dirty="0" smtClean="0">
+                <a:solidFill>
+                  <a:schemeClr val="bg1"/>
+                </a:solidFill>
+              </a:rPr>
+              <a:t>dd </a:t>
+            </a:r>
+            <a:r>
+              <a:rPr lang="en-US" altLang="zh-CN" sz="2800" dirty="0">
+                <a:solidFill>
+                  <a:schemeClr val="bg1"/>
+                </a:solidFill>
+              </a:rPr>
+              <a:t>S</a:t>
+            </a:r>
+            <a:r>
+              <a:rPr lang="en-US" altLang="zh-CN" sz="2800" dirty="0" smtClean="0">
+                <a:solidFill>
+                  <a:schemeClr val="bg1"/>
+                </a:solidFill>
+              </a:rPr>
+              <a:t>hapes button on Shapes Lab pane from slides 6 to 8</a:t>
+            </a:r>
+          </a:p>
+          <a:p>
+            <a:endParaRPr lang="en-US" altLang="zh-CN" sz="2800" dirty="0">
+              <a:solidFill>
+                <a:schemeClr val="bg1"/>
+              </a:solidFill>
+            </a:endParaRPr>
+          </a:p>
+          <a:p>
+            <a:r>
+              <a:rPr lang="en-US" altLang="zh-CN" sz="2800" dirty="0" smtClean="0">
+                <a:solidFill>
+                  <a:schemeClr val="bg1"/>
+                </a:solidFill>
+              </a:rPr>
+              <a:t>Animations are also expected to be transferred</a:t>
+            </a:r>
+            <a:endParaRPr lang="zh-CN" altLang="en-US" sz="2800" dirty="0">
+              <a:solidFill>
+                <a:schemeClr val="bg1"/>
+              </a:solidFill>
+            </a:endParaRPr>
+          </a:p>
+        </p:txBody>
+      </p:sp>
     </p:spTree>
     <p:extLst>
       <p:ext uri="{BB962C8B-B14F-4D97-AF65-F5344CB8AC3E}">
-        <p14:creationId xmlns:p14="http://schemas.microsoft.com/office/powerpoint/2010/main" val="2306293579"/>
+        <p14:creationId xmlns:p14="http://schemas.microsoft.com/office/powerpoint/2010/main" val="3646993363"/>
       </p:ext>
     </p:extLst>
   </p:cSld>
   <p:clrMapOvr>
     <a:masterClrMapping/>
   </p:clrMapOvr>
-  <mc:AlternateContent xmlns:mc="http://schemas.openxmlformats.org/markup-compatibility/2006" xmlns:p14="http://schemas.microsoft.com/office/powerpoint/2010/main">
-    <mc:Choice Requires="p14">
-      <p:transition spd="slow" p14:dur="2000"/>
-    </mc:Choice>
-    <mc:Fallback xmlns="">
-      <p:transition spd="slow"/>
-    </mc:Fallback>
-  </mc:AlternateContent>
   <p:timing>
     <p:tnLst>
       <p:par>

</xml_diff>

<commit_message>
#1439 Shape Lab will not affect clipboard (#1636)
* Shapes lab will not affect clipboard when shape is added or when shapes are imported into shapes lab presentation

* Undo changes to spaces

* Remove shapeRange unused parameter

* Add tests for clipboard restoration of shapes lab

* Add const int ClipboardRestoreSuccess
Fix typo
</commit_message>
<xml_diff>
--- a/doc/test/ShapesLab/ShapesLab.pptx
+++ b/doc/test/ShapesLab/ShapesLab.pptx
@@ -7,7 +7,7 @@
     <p:sldMasterId id="2147483672" r:id="rId3"/>
   </p:sldMasterIdLst>
   <p:notesMasterIdLst>
-    <p:notesMasterId r:id="rId13"/>
+    <p:notesMasterId r:id="rId20"/>
   </p:notesMasterIdLst>
   <p:sldIdLst>
     <p:sldId id="287" r:id="rId4"/>
@@ -18,7 +18,14 @@
     <p:sldId id="300" r:id="rId9"/>
     <p:sldId id="301" r:id="rId10"/>
     <p:sldId id="302" r:id="rId11"/>
-    <p:sldId id="274" r:id="rId12"/>
+    <p:sldId id="303" r:id="rId12"/>
+    <p:sldId id="304" r:id="rId13"/>
+    <p:sldId id="305" r:id="rId14"/>
+    <p:sldId id="306" r:id="rId15"/>
+    <p:sldId id="307" r:id="rId16"/>
+    <p:sldId id="308" r:id="rId17"/>
+    <p:sldId id="309" r:id="rId18"/>
+    <p:sldId id="274" r:id="rId19"/>
   </p:sldIdLst>
   <p:sldSz cx="9144000" cy="6858000" type="screen4x3"/>
   <p:notesSz cx="6858000" cy="9144000"/>
@@ -134,6 +141,13 @@
             <p14:sldId id="300"/>
             <p14:sldId id="301"/>
             <p14:sldId id="302"/>
+            <p14:sldId id="303"/>
+            <p14:sldId id="304"/>
+            <p14:sldId id="305"/>
+            <p14:sldId id="306"/>
+            <p14:sldId id="307"/>
+            <p14:sldId id="308"/>
+            <p14:sldId id="309"/>
             <p14:sldId id="274"/>
           </p14:sldIdLst>
         </p14:section>
@@ -239,7 +253,7 @@
           <a:p>
             <a:fld id="{26004F41-C1A1-4B0D-9EEE-5E3F0E5BC108}" type="datetimeFigureOut">
               <a:rPr lang="en-SG" smtClean="0"/>
-              <a:t>5/2/2018</a:t>
+              <a:t>10/4/2018</a:t>
             </a:fld>
             <a:endParaRPr lang="en-SG"/>
           </a:p>
@@ -770,6 +784,94 @@
 </p:notes>
 </file>
 
+<file path=ppt/notesSlides/notesSlide10.xml><?xml version="1.0" encoding="utf-8"?>
+<p:notes xmlns:a="http://schemas.openxmlformats.org/drawingml/2006/main" xmlns:r="http://schemas.openxmlformats.org/officeDocument/2006/relationships" xmlns:p="http://schemas.openxmlformats.org/presentationml/2006/main">
+  <p:cSld>
+    <p:spTree>
+      <p:nvGrpSpPr>
+        <p:cNvPr id="1" name=""/>
+        <p:cNvGrpSpPr/>
+        <p:nvPr/>
+      </p:nvGrpSpPr>
+      <p:grpSpPr>
+        <a:xfrm>
+          <a:off x="0" y="0"/>
+          <a:ext cx="0" cy="0"/>
+          <a:chOff x="0" y="0"/>
+          <a:chExt cx="0" cy="0"/>
+        </a:xfrm>
+      </p:grpSpPr>
+      <p:sp>
+        <p:nvSpPr>
+          <p:cNvPr id="2" name="Slide Image Placeholder 1"/>
+          <p:cNvSpPr>
+            <a:spLocks noGrp="1" noRot="1" noChangeAspect="1"/>
+          </p:cNvSpPr>
+          <p:nvPr>
+            <p:ph type="sldImg"/>
+          </p:nvPr>
+        </p:nvSpPr>
+        <p:spPr/>
+      </p:sp>
+      <p:sp>
+        <p:nvSpPr>
+          <p:cNvPr id="3" name="Notes Placeholder 2"/>
+          <p:cNvSpPr>
+            <a:spLocks noGrp="1"/>
+          </p:cNvSpPr>
+          <p:nvPr>
+            <p:ph type="body" idx="1"/>
+          </p:nvPr>
+        </p:nvSpPr>
+        <p:spPr/>
+        <p:txBody>
+          <a:bodyPr/>
+          <a:lstStyle/>
+          <a:p>
+            <a:r>
+              <a:rPr lang="en-US" altLang="zh-CN" dirty="0" smtClean="0"/>
+              <a:t>Expected</a:t>
+            </a:r>
+            <a:endParaRPr lang="zh-CN" altLang="en-US" dirty="0"/>
+          </a:p>
+        </p:txBody>
+      </p:sp>
+      <p:sp>
+        <p:nvSpPr>
+          <p:cNvPr id="4" name="Slide Number Placeholder 3"/>
+          <p:cNvSpPr>
+            <a:spLocks noGrp="1"/>
+          </p:cNvSpPr>
+          <p:nvPr>
+            <p:ph type="sldNum" sz="quarter" idx="10"/>
+          </p:nvPr>
+        </p:nvSpPr>
+        <p:spPr/>
+        <p:txBody>
+          <a:bodyPr/>
+          <a:lstStyle/>
+          <a:p>
+            <a:fld id="{E96FB07A-B1AD-4238-A6C9-967239C45D18}" type="slidenum">
+              <a:rPr lang="en-SG" smtClean="0"/>
+              <a:t>15</a:t>
+            </a:fld>
+            <a:endParaRPr lang="en-SG"/>
+          </a:p>
+        </p:txBody>
+      </p:sp>
+    </p:spTree>
+    <p:extLst>
+      <p:ext uri="{BB962C8B-B14F-4D97-AF65-F5344CB8AC3E}">
+        <p14:creationId xmlns:p14="http://schemas.microsoft.com/office/powerpoint/2010/main" val="1489869118"/>
+      </p:ext>
+    </p:extLst>
+  </p:cSld>
+  <p:clrMapOvr>
+    <a:masterClrMapping/>
+  </p:clrMapOvr>
+</p:notes>
+</file>
+
 <file path=ppt/notesSlides/notesSlide2.xml><?xml version="1.0" encoding="utf-8"?>
 <p:notes xmlns:a="http://schemas.openxmlformats.org/drawingml/2006/main" xmlns:r="http://schemas.openxmlformats.org/officeDocument/2006/relationships" xmlns:p="http://schemas.openxmlformats.org/presentationml/2006/main">
   <p:cSld>
@@ -1114,6 +1216,525 @@
 </p:notes>
 </file>
 
+<file path=ppt/notesSlides/notesSlide6.xml><?xml version="1.0" encoding="utf-8"?>
+<p:notes xmlns:a="http://schemas.openxmlformats.org/drawingml/2006/main" xmlns:r="http://schemas.openxmlformats.org/officeDocument/2006/relationships" xmlns:p="http://schemas.openxmlformats.org/presentationml/2006/main">
+  <p:cSld>
+    <p:spTree>
+      <p:nvGrpSpPr>
+        <p:cNvPr id="1" name=""/>
+        <p:cNvGrpSpPr/>
+        <p:nvPr/>
+      </p:nvGrpSpPr>
+      <p:grpSpPr>
+        <a:xfrm>
+          <a:off x="0" y="0"/>
+          <a:ext cx="0" cy="0"/>
+          <a:chOff x="0" y="0"/>
+          <a:chExt cx="0" cy="0"/>
+        </a:xfrm>
+      </p:grpSpPr>
+      <p:sp>
+        <p:nvSpPr>
+          <p:cNvPr id="2" name="Slide Image Placeholder 1"/>
+          <p:cNvSpPr>
+            <a:spLocks noGrp="1" noRot="1" noChangeAspect="1"/>
+          </p:cNvSpPr>
+          <p:nvPr>
+            <p:ph type="sldImg"/>
+          </p:nvPr>
+        </p:nvSpPr>
+        <p:spPr/>
+      </p:sp>
+      <p:sp>
+        <p:nvSpPr>
+          <p:cNvPr id="3" name="Notes Placeholder 2"/>
+          <p:cNvSpPr>
+            <a:spLocks noGrp="1"/>
+          </p:cNvSpPr>
+          <p:nvPr>
+            <p:ph type="body" idx="1"/>
+          </p:nvPr>
+        </p:nvSpPr>
+        <p:spPr/>
+        <p:txBody>
+          <a:bodyPr/>
+          <a:lstStyle/>
+          <a:p>
+            <a:r>
+              <a:rPr lang="en-US" dirty="0" smtClean="0"/>
+              <a:t>Do the following from 3 environments:</a:t>
+            </a:r>
+          </a:p>
+          <a:p>
+            <a:r>
+              <a:rPr lang="en-US" dirty="0" smtClean="0"/>
+              <a:t>1. Entirely new environment</a:t>
+            </a:r>
+          </a:p>
+          <a:p>
+            <a:r>
+              <a:rPr lang="en-US" dirty="0" smtClean="0"/>
+              <a:t>2. Contains old shape info</a:t>
+            </a:r>
+          </a:p>
+          <a:p>
+            <a:endParaRPr lang="en-US" dirty="0" smtClean="0"/>
+          </a:p>
+          <a:p>
+            <a:r>
+              <a:rPr lang="en-US" dirty="0" smtClean="0"/>
+              <a:t>1. Add Category</a:t>
+            </a:r>
+          </a:p>
+          <a:p>
+            <a:r>
+              <a:rPr lang="en-US" dirty="0" smtClean="0"/>
+              <a:t>	1.1 Add category then add a new shape inside, check the default name, close and open to check</a:t>
+            </a:r>
+          </a:p>
+          <a:p>
+            <a:r>
+              <a:rPr lang="en-US" dirty="0" smtClean="0"/>
+              <a:t>	1.2 Add category then add a new shape inside, check the default name, set the category as default, close and open to check</a:t>
+            </a:r>
+          </a:p>
+          <a:p>
+            <a:r>
+              <a:rPr lang="en-US" dirty="0" smtClean="0"/>
+              <a:t>2. Rename Category</a:t>
+            </a:r>
+          </a:p>
+          <a:p>
+            <a:r>
+              <a:rPr lang="en-US" dirty="0" smtClean="0"/>
+              <a:t>	2.1 Rename to a valid name</a:t>
+            </a:r>
+          </a:p>
+          <a:p>
+            <a:r>
+              <a:rPr lang="en-US" dirty="0" smtClean="0"/>
+              <a:t>	2.2 Rename to an </a:t>
+            </a:r>
+            <a:r>
+              <a:rPr lang="en-US" dirty="0" err="1" smtClean="0"/>
+              <a:t>invaid</a:t>
+            </a:r>
+            <a:r>
+              <a:rPr lang="en-US" dirty="0" smtClean="0"/>
+              <a:t> name</a:t>
+            </a:r>
+          </a:p>
+          <a:p>
+            <a:r>
+              <a:rPr lang="en-US" dirty="0" smtClean="0"/>
+              <a:t>3. Import Category</a:t>
+            </a:r>
+          </a:p>
+          <a:p>
+            <a:r>
+              <a:rPr lang="en-US" dirty="0" smtClean="0"/>
+              <a:t>	3.1 Import single category with </a:t>
+            </a:r>
+            <a:r>
+              <a:rPr lang="en-US" dirty="0" err="1" smtClean="0"/>
+              <a:t>namebox</a:t>
+            </a:r>
+            <a:r>
+              <a:rPr lang="en-US" dirty="0" smtClean="0"/>
+              <a:t>, no conflict name</a:t>
+            </a:r>
+          </a:p>
+          <a:p>
+            <a:r>
+              <a:rPr lang="en-US" dirty="0" smtClean="0"/>
+              <a:t>	3.2 Import multiple categories with </a:t>
+            </a:r>
+            <a:r>
+              <a:rPr lang="en-US" dirty="0" err="1" smtClean="0"/>
+              <a:t>nameboxes</a:t>
+            </a:r>
+            <a:r>
+              <a:rPr lang="en-US" dirty="0" smtClean="0"/>
+              <a:t>, no </a:t>
+            </a:r>
+            <a:r>
+              <a:rPr lang="en-US" dirty="0" err="1" smtClean="0"/>
+              <a:t>confilct</a:t>
+            </a:r>
+            <a:r>
+              <a:rPr lang="en-US" dirty="0" smtClean="0"/>
+              <a:t> name</a:t>
+            </a:r>
+          </a:p>
+          <a:p>
+            <a:r>
+              <a:rPr lang="en-US" dirty="0" smtClean="0"/>
+              <a:t>	3.3 Import single category with </a:t>
+            </a:r>
+            <a:r>
+              <a:rPr lang="en-US" dirty="0" err="1" smtClean="0"/>
+              <a:t>namebox</a:t>
+            </a:r>
+            <a:r>
+              <a:rPr lang="en-US" dirty="0" smtClean="0"/>
+              <a:t>, conflict with one existed name</a:t>
+            </a:r>
+          </a:p>
+          <a:p>
+            <a:r>
+              <a:rPr lang="en-US" dirty="0" smtClean="0"/>
+              <a:t>	3.4 Import multiple categories with </a:t>
+            </a:r>
+            <a:r>
+              <a:rPr lang="en-US" dirty="0" err="1" smtClean="0"/>
+              <a:t>nameboxes</a:t>
+            </a:r>
+            <a:r>
+              <a:rPr lang="en-US" dirty="0" smtClean="0"/>
+              <a:t>, some of the boxes conflict with existed name</a:t>
+            </a:r>
+          </a:p>
+          <a:p>
+            <a:r>
+              <a:rPr lang="en-US" dirty="0" smtClean="0"/>
+              <a:t>	3.5 Import single category without </a:t>
+            </a:r>
+            <a:r>
+              <a:rPr lang="en-US" dirty="0" err="1" smtClean="0"/>
+              <a:t>namebox</a:t>
+            </a:r>
+            <a:endParaRPr lang="en-US" dirty="0" smtClean="0"/>
+          </a:p>
+          <a:p>
+            <a:r>
+              <a:rPr lang="en-US" dirty="0" smtClean="0"/>
+              <a:t>	3.6 Import single category without </a:t>
+            </a:r>
+            <a:r>
+              <a:rPr lang="en-US" dirty="0" err="1" smtClean="0"/>
+              <a:t>namebox</a:t>
+            </a:r>
+            <a:r>
+              <a:rPr lang="en-US" dirty="0" smtClean="0"/>
+              <a:t>, conflict with exist name</a:t>
+            </a:r>
+          </a:p>
+          <a:p>
+            <a:r>
+              <a:rPr lang="en-US" dirty="0" smtClean="0"/>
+              <a:t>	3.7 Import multiple categories without </a:t>
+            </a:r>
+            <a:r>
+              <a:rPr lang="en-US" dirty="0" err="1" smtClean="0"/>
+              <a:t>namebox</a:t>
+            </a:r>
+            <a:endParaRPr lang="en-US" dirty="0" smtClean="0"/>
+          </a:p>
+          <a:p>
+            <a:r>
+              <a:rPr lang="en-US" dirty="0" smtClean="0"/>
+              <a:t>4. </a:t>
+            </a:r>
+            <a:r>
+              <a:rPr lang="en-US" smtClean="0"/>
+              <a:t>Migrate Category</a:t>
+            </a:r>
+            <a:endParaRPr lang="en-US"/>
+          </a:p>
+        </p:txBody>
+      </p:sp>
+      <p:sp>
+        <p:nvSpPr>
+          <p:cNvPr id="4" name="Slide Number Placeholder 3"/>
+          <p:cNvSpPr>
+            <a:spLocks noGrp="1"/>
+          </p:cNvSpPr>
+          <p:nvPr>
+            <p:ph type="sldNum" sz="quarter" idx="10"/>
+          </p:nvPr>
+        </p:nvSpPr>
+        <p:spPr/>
+        <p:txBody>
+          <a:bodyPr/>
+          <a:lstStyle/>
+          <a:p>
+            <a:fld id="{E96FB07A-B1AD-4238-A6C9-967239C45D18}" type="slidenum">
+              <a:rPr lang="en-SG" smtClean="0"/>
+              <a:t>9</a:t>
+            </a:fld>
+            <a:endParaRPr lang="en-SG"/>
+          </a:p>
+        </p:txBody>
+      </p:sp>
+    </p:spTree>
+    <p:extLst>
+      <p:ext uri="{BB962C8B-B14F-4D97-AF65-F5344CB8AC3E}">
+        <p14:creationId xmlns:p14="http://schemas.microsoft.com/office/powerpoint/2010/main" val="2266019478"/>
+      </p:ext>
+    </p:extLst>
+  </p:cSld>
+  <p:clrMapOvr>
+    <a:masterClrMapping/>
+  </p:clrMapOvr>
+</p:notes>
+</file>
+
+<file path=ppt/notesSlides/notesSlide7.xml><?xml version="1.0" encoding="utf-8"?>
+<p:notes xmlns:a="http://schemas.openxmlformats.org/drawingml/2006/main" xmlns:r="http://schemas.openxmlformats.org/officeDocument/2006/relationships" xmlns:p="http://schemas.openxmlformats.org/presentationml/2006/main">
+  <p:cSld>
+    <p:spTree>
+      <p:nvGrpSpPr>
+        <p:cNvPr id="1" name=""/>
+        <p:cNvGrpSpPr/>
+        <p:nvPr/>
+      </p:nvGrpSpPr>
+      <p:grpSpPr>
+        <a:xfrm>
+          <a:off x="0" y="0"/>
+          <a:ext cx="0" cy="0"/>
+          <a:chOff x="0" y="0"/>
+          <a:chExt cx="0" cy="0"/>
+        </a:xfrm>
+      </p:grpSpPr>
+      <p:sp>
+        <p:nvSpPr>
+          <p:cNvPr id="2" name="Slide Image Placeholder 1"/>
+          <p:cNvSpPr>
+            <a:spLocks noGrp="1" noRot="1" noChangeAspect="1"/>
+          </p:cNvSpPr>
+          <p:nvPr>
+            <p:ph type="sldImg"/>
+          </p:nvPr>
+        </p:nvSpPr>
+        <p:spPr/>
+      </p:sp>
+      <p:sp>
+        <p:nvSpPr>
+          <p:cNvPr id="3" name="Notes Placeholder 2"/>
+          <p:cNvSpPr>
+            <a:spLocks noGrp="1"/>
+          </p:cNvSpPr>
+          <p:nvPr>
+            <p:ph type="body" idx="1"/>
+          </p:nvPr>
+        </p:nvSpPr>
+        <p:spPr/>
+        <p:txBody>
+          <a:bodyPr/>
+          <a:lstStyle/>
+          <a:p>
+            <a:endParaRPr lang="zh-CN" altLang="en-US" dirty="0"/>
+          </a:p>
+        </p:txBody>
+      </p:sp>
+      <p:sp>
+        <p:nvSpPr>
+          <p:cNvPr id="4" name="Slide Number Placeholder 3"/>
+          <p:cNvSpPr>
+            <a:spLocks noGrp="1"/>
+          </p:cNvSpPr>
+          <p:nvPr>
+            <p:ph type="sldNum" sz="quarter" idx="10"/>
+          </p:nvPr>
+        </p:nvSpPr>
+        <p:spPr/>
+        <p:txBody>
+          <a:bodyPr/>
+          <a:lstStyle/>
+          <a:p>
+            <a:fld id="{E96FB07A-B1AD-4238-A6C9-967239C45D18}" type="slidenum">
+              <a:rPr lang="en-SG" smtClean="0"/>
+              <a:t>10</a:t>
+            </a:fld>
+            <a:endParaRPr lang="en-SG"/>
+          </a:p>
+        </p:txBody>
+      </p:sp>
+    </p:spTree>
+    <p:extLst>
+      <p:ext uri="{BB962C8B-B14F-4D97-AF65-F5344CB8AC3E}">
+        <p14:creationId xmlns:p14="http://schemas.microsoft.com/office/powerpoint/2010/main" val="2797961642"/>
+      </p:ext>
+    </p:extLst>
+  </p:cSld>
+  <p:clrMapOvr>
+    <a:masterClrMapping/>
+  </p:clrMapOvr>
+</p:notes>
+</file>
+
+<file path=ppt/notesSlides/notesSlide8.xml><?xml version="1.0" encoding="utf-8"?>
+<p:notes xmlns:a="http://schemas.openxmlformats.org/drawingml/2006/main" xmlns:r="http://schemas.openxmlformats.org/officeDocument/2006/relationships" xmlns:p="http://schemas.openxmlformats.org/presentationml/2006/main">
+  <p:cSld>
+    <p:spTree>
+      <p:nvGrpSpPr>
+        <p:cNvPr id="1" name=""/>
+        <p:cNvGrpSpPr/>
+        <p:nvPr/>
+      </p:nvGrpSpPr>
+      <p:grpSpPr>
+        <a:xfrm>
+          <a:off x="0" y="0"/>
+          <a:ext cx="0" cy="0"/>
+          <a:chOff x="0" y="0"/>
+          <a:chExt cx="0" cy="0"/>
+        </a:xfrm>
+      </p:grpSpPr>
+      <p:sp>
+        <p:nvSpPr>
+          <p:cNvPr id="2" name="Slide Image Placeholder 1"/>
+          <p:cNvSpPr>
+            <a:spLocks noGrp="1" noRot="1" noChangeAspect="1"/>
+          </p:cNvSpPr>
+          <p:nvPr>
+            <p:ph type="sldImg"/>
+          </p:nvPr>
+        </p:nvSpPr>
+        <p:spPr/>
+      </p:sp>
+      <p:sp>
+        <p:nvSpPr>
+          <p:cNvPr id="3" name="Notes Placeholder 2"/>
+          <p:cNvSpPr>
+            <a:spLocks noGrp="1"/>
+          </p:cNvSpPr>
+          <p:nvPr>
+            <p:ph type="body" idx="1"/>
+          </p:nvPr>
+        </p:nvSpPr>
+        <p:spPr/>
+        <p:txBody>
+          <a:bodyPr/>
+          <a:lstStyle/>
+          <a:p>
+            <a:r>
+              <a:rPr lang="en-US" altLang="zh-CN" dirty="0" smtClean="0"/>
+              <a:t>Expected</a:t>
+            </a:r>
+            <a:endParaRPr lang="zh-CN" altLang="en-US" dirty="0"/>
+          </a:p>
+        </p:txBody>
+      </p:sp>
+      <p:sp>
+        <p:nvSpPr>
+          <p:cNvPr id="4" name="Slide Number Placeholder 3"/>
+          <p:cNvSpPr>
+            <a:spLocks noGrp="1"/>
+          </p:cNvSpPr>
+          <p:nvPr>
+            <p:ph type="sldNum" sz="quarter" idx="10"/>
+          </p:nvPr>
+        </p:nvSpPr>
+        <p:spPr/>
+        <p:txBody>
+          <a:bodyPr/>
+          <a:lstStyle/>
+          <a:p>
+            <a:fld id="{E96FB07A-B1AD-4238-A6C9-967239C45D18}" type="slidenum">
+              <a:rPr lang="en-SG" smtClean="0"/>
+              <a:t>12</a:t>
+            </a:fld>
+            <a:endParaRPr lang="en-SG"/>
+          </a:p>
+        </p:txBody>
+      </p:sp>
+    </p:spTree>
+    <p:extLst>
+      <p:ext uri="{BB962C8B-B14F-4D97-AF65-F5344CB8AC3E}">
+        <p14:creationId xmlns:p14="http://schemas.microsoft.com/office/powerpoint/2010/main" val="555831886"/>
+      </p:ext>
+    </p:extLst>
+  </p:cSld>
+  <p:clrMapOvr>
+    <a:masterClrMapping/>
+  </p:clrMapOvr>
+</p:notes>
+</file>
+
+<file path=ppt/notesSlides/notesSlide9.xml><?xml version="1.0" encoding="utf-8"?>
+<p:notes xmlns:a="http://schemas.openxmlformats.org/drawingml/2006/main" xmlns:r="http://schemas.openxmlformats.org/officeDocument/2006/relationships" xmlns:p="http://schemas.openxmlformats.org/presentationml/2006/main">
+  <p:cSld>
+    <p:spTree>
+      <p:nvGrpSpPr>
+        <p:cNvPr id="1" name=""/>
+        <p:cNvGrpSpPr/>
+        <p:nvPr/>
+      </p:nvGrpSpPr>
+      <p:grpSpPr>
+        <a:xfrm>
+          <a:off x="0" y="0"/>
+          <a:ext cx="0" cy="0"/>
+          <a:chOff x="0" y="0"/>
+          <a:chExt cx="0" cy="0"/>
+        </a:xfrm>
+      </p:grpSpPr>
+      <p:sp>
+        <p:nvSpPr>
+          <p:cNvPr id="2" name="Slide Image Placeholder 1"/>
+          <p:cNvSpPr>
+            <a:spLocks noGrp="1" noRot="1" noChangeAspect="1"/>
+          </p:cNvSpPr>
+          <p:nvPr>
+            <p:ph type="sldImg"/>
+          </p:nvPr>
+        </p:nvSpPr>
+        <p:spPr/>
+      </p:sp>
+      <p:sp>
+        <p:nvSpPr>
+          <p:cNvPr id="3" name="Notes Placeholder 2"/>
+          <p:cNvSpPr>
+            <a:spLocks noGrp="1"/>
+          </p:cNvSpPr>
+          <p:nvPr>
+            <p:ph type="body" idx="1"/>
+          </p:nvPr>
+        </p:nvSpPr>
+        <p:spPr/>
+        <p:txBody>
+          <a:bodyPr/>
+          <a:lstStyle/>
+          <a:p>
+            <a:endParaRPr lang="zh-CN" altLang="en-US" dirty="0"/>
+          </a:p>
+        </p:txBody>
+      </p:sp>
+      <p:sp>
+        <p:nvSpPr>
+          <p:cNvPr id="4" name="Slide Number Placeholder 3"/>
+          <p:cNvSpPr>
+            <a:spLocks noGrp="1"/>
+          </p:cNvSpPr>
+          <p:nvPr>
+            <p:ph type="sldNum" sz="quarter" idx="10"/>
+          </p:nvPr>
+        </p:nvSpPr>
+        <p:spPr/>
+        <p:txBody>
+          <a:bodyPr/>
+          <a:lstStyle/>
+          <a:p>
+            <a:fld id="{E96FB07A-B1AD-4238-A6C9-967239C45D18}" type="slidenum">
+              <a:rPr lang="en-SG" smtClean="0"/>
+              <a:t>13</a:t>
+            </a:fld>
+            <a:endParaRPr lang="en-SG"/>
+          </a:p>
+        </p:txBody>
+      </p:sp>
+    </p:spTree>
+    <p:extLst>
+      <p:ext uri="{BB962C8B-B14F-4D97-AF65-F5344CB8AC3E}">
+        <p14:creationId xmlns:p14="http://schemas.microsoft.com/office/powerpoint/2010/main" val="2516482548"/>
+      </p:ext>
+    </p:extLst>
+  </p:cSld>
+  <p:clrMapOvr>
+    <a:masterClrMapping/>
+  </p:clrMapOvr>
+</p:notes>
+</file>
+
 <file path=ppt/slideLayouts/slideLayout1.xml><?xml version="1.0" encoding="utf-8"?>
 <p:sldLayout xmlns:a="http://schemas.openxmlformats.org/drawingml/2006/main" xmlns:r="http://schemas.openxmlformats.org/officeDocument/2006/relationships" xmlns:p="http://schemas.openxmlformats.org/presentationml/2006/main" type="title" preserve="1">
   <p:cSld name="Title Slide">
@@ -1295,7 +1916,7 @@
           <a:p>
             <a:fld id="{699DC775-C286-4358-8C92-D7E584E969B3}" type="datetimeFigureOut">
               <a:rPr lang="en-US" smtClean="0"/>
-              <a:t>2/5/2018</a:t>
+              <a:t>4/10/2018</a:t>
             </a:fld>
             <a:endParaRPr lang="en-US"/>
           </a:p>
@@ -1465,7 +2086,7 @@
           <a:p>
             <a:fld id="{699DC775-C286-4358-8C92-D7E584E969B3}" type="datetimeFigureOut">
               <a:rPr lang="en-US" smtClean="0"/>
-              <a:t>2/5/2018</a:t>
+              <a:t>4/10/2018</a:t>
             </a:fld>
             <a:endParaRPr lang="en-US"/>
           </a:p>
@@ -1645,7 +2266,7 @@
           <a:p>
             <a:fld id="{699DC775-C286-4358-8C92-D7E584E969B3}" type="datetimeFigureOut">
               <a:rPr lang="en-US" smtClean="0"/>
-              <a:t>2/5/2018</a:t>
+              <a:t>4/10/2018</a:t>
             </a:fld>
             <a:endParaRPr lang="en-US"/>
           </a:p>
@@ -1887,7 +2508,7 @@
           <a:p>
             <a:fld id="{699DC775-C286-4358-8C92-D7E584E969B3}" type="datetimeFigureOut">
               <a:rPr lang="en-US" smtClean="0"/>
-              <a:t>2/5/2018</a:t>
+              <a:t>4/10/2018</a:t>
             </a:fld>
             <a:endParaRPr lang="en-US"/>
           </a:p>
@@ -2057,7 +2678,7 @@
           <a:p>
             <a:fld id="{699DC775-C286-4358-8C92-D7E584E969B3}" type="datetimeFigureOut">
               <a:rPr lang="en-US" smtClean="0"/>
-              <a:t>2/5/2018</a:t>
+              <a:t>4/10/2018</a:t>
             </a:fld>
             <a:endParaRPr lang="en-US"/>
           </a:p>
@@ -2303,7 +2924,7 @@
           <a:p>
             <a:fld id="{699DC775-C286-4358-8C92-D7E584E969B3}" type="datetimeFigureOut">
               <a:rPr lang="en-US" smtClean="0"/>
-              <a:t>2/5/2018</a:t>
+              <a:t>4/10/2018</a:t>
             </a:fld>
             <a:endParaRPr lang="en-US"/>
           </a:p>
@@ -2591,7 +3212,7 @@
           <a:p>
             <a:fld id="{699DC775-C286-4358-8C92-D7E584E969B3}" type="datetimeFigureOut">
               <a:rPr lang="en-US" smtClean="0"/>
-              <a:t>2/5/2018</a:t>
+              <a:t>4/10/2018</a:t>
             </a:fld>
             <a:endParaRPr lang="en-US"/>
           </a:p>
@@ -3013,7 +3634,7 @@
           <a:p>
             <a:fld id="{699DC775-C286-4358-8C92-D7E584E969B3}" type="datetimeFigureOut">
               <a:rPr lang="en-US" smtClean="0"/>
-              <a:t>2/5/2018</a:t>
+              <a:t>4/10/2018</a:t>
             </a:fld>
             <a:endParaRPr lang="en-US"/>
           </a:p>
@@ -3131,7 +3752,7 @@
           <a:p>
             <a:fld id="{699DC775-C286-4358-8C92-D7E584E969B3}" type="datetimeFigureOut">
               <a:rPr lang="en-US" smtClean="0"/>
-              <a:t>2/5/2018</a:t>
+              <a:t>4/10/2018</a:t>
             </a:fld>
             <a:endParaRPr lang="en-US"/>
           </a:p>
@@ -3226,7 +3847,7 @@
           <a:p>
             <a:fld id="{699DC775-C286-4358-8C92-D7E584E969B3}" type="datetimeFigureOut">
               <a:rPr lang="en-US" smtClean="0"/>
-              <a:t>2/5/2018</a:t>
+              <a:t>4/10/2018</a:t>
             </a:fld>
             <a:endParaRPr lang="en-US"/>
           </a:p>
@@ -3503,7 +4124,7 @@
           <a:p>
             <a:fld id="{699DC775-C286-4358-8C92-D7E584E969B3}" type="datetimeFigureOut">
               <a:rPr lang="en-US" smtClean="0"/>
-              <a:t>2/5/2018</a:t>
+              <a:t>4/10/2018</a:t>
             </a:fld>
             <a:endParaRPr lang="en-US"/>
           </a:p>
@@ -3673,7 +4294,7 @@
           <a:p>
             <a:fld id="{699DC775-C286-4358-8C92-D7E584E969B3}" type="datetimeFigureOut">
               <a:rPr lang="en-US" smtClean="0"/>
-              <a:t>2/5/2018</a:t>
+              <a:t>4/10/2018</a:t>
             </a:fld>
             <a:endParaRPr lang="en-US"/>
           </a:p>
@@ -3926,7 +4547,7 @@
           <a:p>
             <a:fld id="{699DC775-C286-4358-8C92-D7E584E969B3}" type="datetimeFigureOut">
               <a:rPr lang="en-US" smtClean="0"/>
-              <a:t>2/5/2018</a:t>
+              <a:t>4/10/2018</a:t>
             </a:fld>
             <a:endParaRPr lang="en-US"/>
           </a:p>
@@ -4096,7 +4717,7 @@
           <a:p>
             <a:fld id="{699DC775-C286-4358-8C92-D7E584E969B3}" type="datetimeFigureOut">
               <a:rPr lang="en-US" smtClean="0"/>
-              <a:t>2/5/2018</a:t>
+              <a:t>4/10/2018</a:t>
             </a:fld>
             <a:endParaRPr lang="en-US"/>
           </a:p>
@@ -4276,7 +4897,7 @@
           <a:p>
             <a:fld id="{699DC775-C286-4358-8C92-D7E584E969B3}" type="datetimeFigureOut">
               <a:rPr lang="en-US" smtClean="0"/>
-              <a:t>2/5/2018</a:t>
+              <a:t>4/10/2018</a:t>
             </a:fld>
             <a:endParaRPr lang="en-US"/>
           </a:p>
@@ -4526,7 +5147,7 @@
           <a:p>
             <a:fld id="{699DC775-C286-4358-8C92-D7E584E969B3}" type="datetimeFigureOut">
               <a:rPr lang="en-US" smtClean="0"/>
-              <a:t>2/5/2018</a:t>
+              <a:t>4/10/2018</a:t>
             </a:fld>
             <a:endParaRPr lang="en-US"/>
           </a:p>
@@ -4704,7 +5325,7 @@
           <a:p>
             <a:fld id="{699DC775-C286-4358-8C92-D7E584E969B3}" type="datetimeFigureOut">
               <a:rPr lang="en-US" smtClean="0"/>
-              <a:t>2/5/2018</a:t>
+              <a:t>4/10/2018</a:t>
             </a:fld>
             <a:endParaRPr lang="en-US"/>
           </a:p>
@@ -4958,7 +5579,7 @@
           <a:p>
             <a:fld id="{699DC775-C286-4358-8C92-D7E584E969B3}" type="datetimeFigureOut">
               <a:rPr lang="en-US" smtClean="0"/>
-              <a:t>2/5/2018</a:t>
+              <a:t>4/10/2018</a:t>
             </a:fld>
             <a:endParaRPr lang="en-US"/>
           </a:p>
@@ -5254,7 +5875,7 @@
           <a:p>
             <a:fld id="{699DC775-C286-4358-8C92-D7E584E969B3}" type="datetimeFigureOut">
               <a:rPr lang="en-US" smtClean="0"/>
-              <a:t>2/5/2018</a:t>
+              <a:t>4/10/2018</a:t>
             </a:fld>
             <a:endParaRPr lang="en-US"/>
           </a:p>
@@ -5684,7 +6305,7 @@
           <a:p>
             <a:fld id="{699DC775-C286-4358-8C92-D7E584E969B3}" type="datetimeFigureOut">
               <a:rPr lang="en-US" smtClean="0"/>
-              <a:t>2/5/2018</a:t>
+              <a:t>4/10/2018</a:t>
             </a:fld>
             <a:endParaRPr lang="en-US"/>
           </a:p>
@@ -5810,7 +6431,7 @@
           <a:p>
             <a:fld id="{699DC775-C286-4358-8C92-D7E584E969B3}" type="datetimeFigureOut">
               <a:rPr lang="en-US" smtClean="0"/>
-              <a:t>2/5/2018</a:t>
+              <a:t>4/10/2018</a:t>
             </a:fld>
             <a:endParaRPr lang="en-US"/>
           </a:p>
@@ -5913,7 +6534,7 @@
           <a:p>
             <a:fld id="{699DC775-C286-4358-8C92-D7E584E969B3}" type="datetimeFigureOut">
               <a:rPr lang="en-US" smtClean="0"/>
-              <a:t>2/5/2018</a:t>
+              <a:t>4/10/2018</a:t>
             </a:fld>
             <a:endParaRPr lang="en-US"/>
           </a:p>
@@ -6159,7 +6780,7 @@
           <a:p>
             <a:fld id="{699DC775-C286-4358-8C92-D7E584E969B3}" type="datetimeFigureOut">
               <a:rPr lang="en-US" smtClean="0"/>
-              <a:t>2/5/2018</a:t>
+              <a:t>4/10/2018</a:t>
             </a:fld>
             <a:endParaRPr lang="en-US"/>
           </a:p>
@@ -6444,7 +7065,7 @@
           <a:p>
             <a:fld id="{699DC775-C286-4358-8C92-D7E584E969B3}" type="datetimeFigureOut">
               <a:rPr lang="en-US" smtClean="0"/>
-              <a:t>2/5/2018</a:t>
+              <a:t>4/10/2018</a:t>
             </a:fld>
             <a:endParaRPr lang="en-US"/>
           </a:p>
@@ -6705,7 +7326,7 @@
           <a:p>
             <a:fld id="{699DC775-C286-4358-8C92-D7E584E969B3}" type="datetimeFigureOut">
               <a:rPr lang="en-US" smtClean="0"/>
-              <a:t>2/5/2018</a:t>
+              <a:t>4/10/2018</a:t>
             </a:fld>
             <a:endParaRPr lang="en-US"/>
           </a:p>
@@ -6883,7 +7504,7 @@
           <a:p>
             <a:fld id="{699DC775-C286-4358-8C92-D7E584E969B3}" type="datetimeFigureOut">
               <a:rPr lang="en-US" smtClean="0"/>
-              <a:t>2/5/2018</a:t>
+              <a:t>4/10/2018</a:t>
             </a:fld>
             <a:endParaRPr lang="en-US"/>
           </a:p>
@@ -7071,7 +7692,7 @@
           <a:p>
             <a:fld id="{699DC775-C286-4358-8C92-D7E584E969B3}" type="datetimeFigureOut">
               <a:rPr lang="en-US" smtClean="0"/>
-              <a:t>2/5/2018</a:t>
+              <a:t>4/10/2018</a:t>
             </a:fld>
             <a:endParaRPr lang="en-US"/>
           </a:p>
@@ -7359,7 +7980,7 @@
           <a:p>
             <a:fld id="{699DC775-C286-4358-8C92-D7E584E969B3}" type="datetimeFigureOut">
               <a:rPr lang="en-US" smtClean="0"/>
-              <a:t>2/5/2018</a:t>
+              <a:t>4/10/2018</a:t>
             </a:fld>
             <a:endParaRPr lang="en-US"/>
           </a:p>
@@ -7781,7 +8402,7 @@
           <a:p>
             <a:fld id="{699DC775-C286-4358-8C92-D7E584E969B3}" type="datetimeFigureOut">
               <a:rPr lang="en-US" smtClean="0"/>
-              <a:t>2/5/2018</a:t>
+              <a:t>4/10/2018</a:t>
             </a:fld>
             <a:endParaRPr lang="en-US"/>
           </a:p>
@@ -7899,7 +8520,7 @@
           <a:p>
             <a:fld id="{699DC775-C286-4358-8C92-D7E584E969B3}" type="datetimeFigureOut">
               <a:rPr lang="en-US" smtClean="0"/>
-              <a:t>2/5/2018</a:t>
+              <a:t>4/10/2018</a:t>
             </a:fld>
             <a:endParaRPr lang="en-US"/>
           </a:p>
@@ -7994,7 +8615,7 @@
           <a:p>
             <a:fld id="{699DC775-C286-4358-8C92-D7E584E969B3}" type="datetimeFigureOut">
               <a:rPr lang="en-US" smtClean="0"/>
-              <a:t>2/5/2018</a:t>
+              <a:t>4/10/2018</a:t>
             </a:fld>
             <a:endParaRPr lang="en-US"/>
           </a:p>
@@ -8271,7 +8892,7 @@
           <a:p>
             <a:fld id="{699DC775-C286-4358-8C92-D7E584E969B3}" type="datetimeFigureOut">
               <a:rPr lang="en-US" smtClean="0"/>
-              <a:t>2/5/2018</a:t>
+              <a:t>4/10/2018</a:t>
             </a:fld>
             <a:endParaRPr lang="en-US"/>
           </a:p>
@@ -8524,7 +9145,7 @@
           <a:p>
             <a:fld id="{699DC775-C286-4358-8C92-D7E584E969B3}" type="datetimeFigureOut">
               <a:rPr lang="en-US" smtClean="0"/>
-              <a:t>2/5/2018</a:t>
+              <a:t>4/10/2018</a:t>
             </a:fld>
             <a:endParaRPr lang="en-US"/>
           </a:p>
@@ -8737,7 +9358,7 @@
           <a:p>
             <a:fld id="{699DC775-C286-4358-8C92-D7E584E969B3}" type="datetimeFigureOut">
               <a:rPr lang="en-US" smtClean="0"/>
-              <a:t>2/5/2018</a:t>
+              <a:t>4/10/2018</a:t>
             </a:fld>
             <a:endParaRPr lang="en-US"/>
           </a:p>
@@ -9252,7 +9873,7 @@
           <a:p>
             <a:fld id="{699DC775-C286-4358-8C92-D7E584E969B3}" type="datetimeFigureOut">
               <a:rPr lang="en-US" smtClean="0"/>
-              <a:t>2/5/2018</a:t>
+              <a:t>4/10/2018</a:t>
             </a:fld>
             <a:endParaRPr lang="en-US"/>
           </a:p>
@@ -9765,7 +10386,7 @@
           <a:p>
             <a:fld id="{699DC775-C286-4358-8C92-D7E584E969B3}" type="datetimeFigureOut">
               <a:rPr lang="en-US" smtClean="0"/>
-              <a:t>2/5/2018</a:t>
+              <a:t>4/10/2018</a:t>
             </a:fld>
             <a:endParaRPr lang="en-US"/>
           </a:p>
@@ -10327,6 +10948,2505 @@
 </p:sld>
 </file>
 
+<file path=ppt/slides/slide10.xml><?xml version="1.0" encoding="utf-8"?>
+<p:sld xmlns:a="http://schemas.openxmlformats.org/drawingml/2006/main" xmlns:r="http://schemas.openxmlformats.org/officeDocument/2006/relationships" xmlns:p="http://schemas.openxmlformats.org/presentationml/2006/main">
+  <p:cSld>
+    <p:spTree>
+      <p:nvGrpSpPr>
+        <p:cNvPr id="1" name=""/>
+        <p:cNvGrpSpPr/>
+        <p:nvPr/>
+      </p:nvGrpSpPr>
+      <p:grpSpPr>
+        <a:xfrm>
+          <a:off x="0" y="0"/>
+          <a:ext cx="0" cy="0"/>
+          <a:chOff x="0" y="0"/>
+          <a:chExt cx="0" cy="0"/>
+        </a:xfrm>
+      </p:grpSpPr>
+      <p:sp>
+        <p:nvSpPr>
+          <p:cNvPr id="3" name="selectMe1"/>
+          <p:cNvSpPr/>
+          <p:nvPr/>
+        </p:nvSpPr>
+        <p:spPr>
+          <a:xfrm>
+            <a:off x="1524000" y="990600"/>
+            <a:ext cx="2743200" cy="4572000"/>
+          </a:xfrm>
+          <a:prstGeom prst="roundRect">
+            <a:avLst/>
+          </a:prstGeom>
+          <a:solidFill>
+            <a:srgbClr val="0A275A"/>
+          </a:solidFill>
+          <a:ln w="203200">
+            <a:solidFill>
+              <a:srgbClr val="61EB75"/>
+            </a:solidFill>
+          </a:ln>
+        </p:spPr>
+        <p:style>
+          <a:lnRef idx="2">
+            <a:schemeClr val="accent1">
+              <a:shade val="50000"/>
+            </a:schemeClr>
+          </a:lnRef>
+          <a:fillRef idx="1">
+            <a:schemeClr val="accent1"/>
+          </a:fillRef>
+          <a:effectRef idx="0">
+            <a:schemeClr val="accent1"/>
+          </a:effectRef>
+          <a:fontRef idx="minor">
+            <a:schemeClr val="lt1"/>
+          </a:fontRef>
+        </p:style>
+        <p:txBody>
+          <a:bodyPr rtlCol="0" anchor="ctr"/>
+          <a:lstStyle/>
+          <a:p>
+            <a:pPr algn="ctr"/>
+            <a:r>
+              <a:rPr lang="en-US" altLang="zh-CN" sz="6600" dirty="0" smtClean="0">
+                <a:solidFill>
+                  <a:srgbClr val="EB7561"/>
+                </a:solidFill>
+                <a:latin typeface="Times New Roman" panose="02020603050405020304" pitchFamily="18" charset="0"/>
+                <a:cs typeface="Times New Roman" panose="02020603050405020304" pitchFamily="18" charset="0"/>
+              </a:rPr>
+              <a:t>TEXT</a:t>
+            </a:r>
+            <a:endParaRPr lang="zh-CN" altLang="en-US" sz="6600" dirty="0">
+              <a:solidFill>
+                <a:srgbClr val="EB7561"/>
+              </a:solidFill>
+              <a:latin typeface="Times New Roman" panose="02020603050405020304" pitchFamily="18" charset="0"/>
+              <a:cs typeface="Times New Roman" panose="02020603050405020304" pitchFamily="18" charset="0"/>
+            </a:endParaRPr>
+          </a:p>
+        </p:txBody>
+      </p:sp>
+      <p:sp>
+        <p:nvSpPr>
+          <p:cNvPr id="5" name="selectMe2"/>
+          <p:cNvSpPr/>
+          <p:nvPr/>
+        </p:nvSpPr>
+        <p:spPr>
+          <a:xfrm>
+            <a:off x="5867400" y="1219200"/>
+            <a:ext cx="1828800" cy="1295400"/>
+          </a:xfrm>
+          <a:prstGeom prst="roundRect">
+            <a:avLst/>
+          </a:prstGeom>
+          <a:solidFill>
+            <a:srgbClr val="EB7662"/>
+          </a:solidFill>
+          <a:ln>
+            <a:noFill/>
+          </a:ln>
+        </p:spPr>
+        <p:style>
+          <a:lnRef idx="2">
+            <a:schemeClr val="accent1">
+              <a:shade val="50000"/>
+            </a:schemeClr>
+          </a:lnRef>
+          <a:fillRef idx="1">
+            <a:schemeClr val="accent1"/>
+          </a:fillRef>
+          <a:effectRef idx="0">
+            <a:schemeClr val="accent1"/>
+          </a:effectRef>
+          <a:fontRef idx="minor">
+            <a:schemeClr val="lt1"/>
+          </a:fontRef>
+        </p:style>
+        <p:txBody>
+          <a:bodyPr rtlCol="0" anchor="ctr"/>
+          <a:lstStyle/>
+          <a:p>
+            <a:pPr algn="ctr"/>
+            <a:endParaRPr lang="zh-CN" altLang="en-US"/>
+          </a:p>
+        </p:txBody>
+      </p:sp>
+      <p:sp>
+        <p:nvSpPr>
+          <p:cNvPr id="7" name="selectMe3"/>
+          <p:cNvSpPr/>
+          <p:nvPr/>
+        </p:nvSpPr>
+        <p:spPr>
+          <a:xfrm>
+            <a:off x="5867400" y="2743200"/>
+            <a:ext cx="1828800" cy="1295400"/>
+          </a:xfrm>
+          <a:prstGeom prst="roundRect">
+            <a:avLst/>
+          </a:prstGeom>
+          <a:solidFill>
+            <a:srgbClr val="62EB76"/>
+          </a:solidFill>
+          <a:ln>
+            <a:noFill/>
+          </a:ln>
+        </p:spPr>
+        <p:style>
+          <a:lnRef idx="2">
+            <a:schemeClr val="accent1">
+              <a:shade val="50000"/>
+            </a:schemeClr>
+          </a:lnRef>
+          <a:fillRef idx="1">
+            <a:schemeClr val="accent1"/>
+          </a:fillRef>
+          <a:effectRef idx="0">
+            <a:schemeClr val="accent1"/>
+          </a:effectRef>
+          <a:fontRef idx="minor">
+            <a:schemeClr val="lt1"/>
+          </a:fontRef>
+        </p:style>
+        <p:txBody>
+          <a:bodyPr rtlCol="0" anchor="ctr"/>
+          <a:lstStyle/>
+          <a:p>
+            <a:pPr algn="ctr"/>
+            <a:endParaRPr lang="zh-CN" altLang="en-US"/>
+          </a:p>
+        </p:txBody>
+      </p:sp>
+      <p:sp>
+        <p:nvSpPr>
+          <p:cNvPr id="8" name="selectMe4"/>
+          <p:cNvSpPr/>
+          <p:nvPr/>
+        </p:nvSpPr>
+        <p:spPr>
+          <a:xfrm>
+            <a:off x="5867400" y="4267200"/>
+            <a:ext cx="1828800" cy="1295400"/>
+          </a:xfrm>
+          <a:prstGeom prst="roundRect">
+            <a:avLst/>
+          </a:prstGeom>
+          <a:solidFill>
+            <a:srgbClr val="6294EB"/>
+          </a:solidFill>
+          <a:ln>
+            <a:noFill/>
+          </a:ln>
+        </p:spPr>
+        <p:style>
+          <a:lnRef idx="2">
+            <a:schemeClr val="accent1">
+              <a:shade val="50000"/>
+            </a:schemeClr>
+          </a:lnRef>
+          <a:fillRef idx="1">
+            <a:schemeClr val="accent1"/>
+          </a:fillRef>
+          <a:effectRef idx="0">
+            <a:schemeClr val="accent1"/>
+          </a:effectRef>
+          <a:fontRef idx="minor">
+            <a:schemeClr val="lt1"/>
+          </a:fontRef>
+        </p:style>
+        <p:txBody>
+          <a:bodyPr rtlCol="0" anchor="ctr"/>
+          <a:lstStyle/>
+          <a:p>
+            <a:pPr algn="ctr"/>
+            <a:endParaRPr lang="zh-CN" altLang="en-US"/>
+          </a:p>
+        </p:txBody>
+      </p:sp>
+      <p:sp>
+        <p:nvSpPr>
+          <p:cNvPr id="2" name="copyMe"/>
+          <p:cNvSpPr/>
+          <p:nvPr/>
+        </p:nvSpPr>
+        <p:spPr>
+          <a:xfrm>
+            <a:off x="3276600" y="1333500"/>
+            <a:ext cx="3505200" cy="4343400"/>
+          </a:xfrm>
+          <a:prstGeom prst="parallelogram">
+            <a:avLst/>
+          </a:prstGeom>
+        </p:spPr>
+        <p:style>
+          <a:lnRef idx="2">
+            <a:schemeClr val="accent1">
+              <a:shade val="50000"/>
+            </a:schemeClr>
+          </a:lnRef>
+          <a:fillRef idx="1">
+            <a:schemeClr val="accent1"/>
+          </a:fillRef>
+          <a:effectRef idx="0">
+            <a:schemeClr val="accent1"/>
+          </a:effectRef>
+          <a:fontRef idx="minor">
+            <a:schemeClr val="lt1"/>
+          </a:fontRef>
+        </p:style>
+        <p:txBody>
+          <a:bodyPr rtlCol="0" anchor="ctr"/>
+          <a:lstStyle/>
+          <a:p>
+            <a:pPr algn="ctr"/>
+            <a:endParaRPr lang="en-SG"/>
+          </a:p>
+        </p:txBody>
+      </p:sp>
+    </p:spTree>
+    <p:extLst>
+      <p:ext uri="{BB962C8B-B14F-4D97-AF65-F5344CB8AC3E}">
+        <p14:creationId xmlns:p14="http://schemas.microsoft.com/office/powerpoint/2010/main" val="575176415"/>
+      </p:ext>
+    </p:extLst>
+  </p:cSld>
+  <p:clrMapOvr>
+    <a:masterClrMapping/>
+  </p:clrMapOvr>
+  <p:timing>
+    <p:tnLst>
+      <p:par>
+        <p:cTn id="1" dur="indefinite" restart="never" nodeType="tmRoot">
+          <p:childTnLst>
+            <p:seq concurrent="1" nextAc="seek">
+              <p:cTn id="2" dur="indefinite" nodeType="mainSeq">
+                <p:childTnLst>
+                  <p:par>
+                    <p:cTn id="3" fill="hold">
+                      <p:stCondLst>
+                        <p:cond delay="indefinite"/>
+                      </p:stCondLst>
+                      <p:childTnLst>
+                        <p:par>
+                          <p:cTn id="4" fill="hold">
+                            <p:stCondLst>
+                              <p:cond delay="0"/>
+                            </p:stCondLst>
+                            <p:childTnLst>
+                              <p:par>
+                                <p:cTn id="5" presetID="2" presetClass="entr" presetSubtype="4" fill="hold" grpId="0" nodeType="clickEffect">
+                                  <p:stCondLst>
+                                    <p:cond delay="0"/>
+                                  </p:stCondLst>
+                                  <p:childTnLst>
+                                    <p:set>
+                                      <p:cBhvr>
+                                        <p:cTn id="6" dur="1" fill="hold">
+                                          <p:stCondLst>
+                                            <p:cond delay="0"/>
+                                          </p:stCondLst>
+                                        </p:cTn>
+                                        <p:tgtEl>
+                                          <p:spTgt spid="3"/>
+                                        </p:tgtEl>
+                                        <p:attrNameLst>
+                                          <p:attrName>style.visibility</p:attrName>
+                                        </p:attrNameLst>
+                                      </p:cBhvr>
+                                      <p:to>
+                                        <p:strVal val="visible"/>
+                                      </p:to>
+                                    </p:set>
+                                    <p:anim calcmode="lin" valueType="num">
+                                      <p:cBhvr additive="base">
+                                        <p:cTn id="7" dur="500" fill="hold"/>
+                                        <p:tgtEl>
+                                          <p:spTgt spid="3"/>
+                                        </p:tgtEl>
+                                        <p:attrNameLst>
+                                          <p:attrName>ppt_x</p:attrName>
+                                        </p:attrNameLst>
+                                      </p:cBhvr>
+                                      <p:tavLst>
+                                        <p:tav tm="0">
+                                          <p:val>
+                                            <p:strVal val="#ppt_x"/>
+                                          </p:val>
+                                        </p:tav>
+                                        <p:tav tm="100000">
+                                          <p:val>
+                                            <p:strVal val="#ppt_x"/>
+                                          </p:val>
+                                        </p:tav>
+                                      </p:tavLst>
+                                    </p:anim>
+                                    <p:anim calcmode="lin" valueType="num">
+                                      <p:cBhvr additive="base">
+                                        <p:cTn id="8" dur="500" fill="hold"/>
+                                        <p:tgtEl>
+                                          <p:spTgt spid="3"/>
+                                        </p:tgtEl>
+                                        <p:attrNameLst>
+                                          <p:attrName>ppt_y</p:attrName>
+                                        </p:attrNameLst>
+                                      </p:cBhvr>
+                                      <p:tavLst>
+                                        <p:tav tm="0">
+                                          <p:val>
+                                            <p:strVal val="1+#ppt_h/2"/>
+                                          </p:val>
+                                        </p:tav>
+                                        <p:tav tm="100000">
+                                          <p:val>
+                                            <p:strVal val="#ppt_y"/>
+                                          </p:val>
+                                        </p:tav>
+                                      </p:tavLst>
+                                    </p:anim>
+                                  </p:childTnLst>
+                                </p:cTn>
+                              </p:par>
+                            </p:childTnLst>
+                          </p:cTn>
+                        </p:par>
+                      </p:childTnLst>
+                    </p:cTn>
+                  </p:par>
+                  <p:par>
+                    <p:cTn id="9" fill="hold">
+                      <p:stCondLst>
+                        <p:cond delay="indefinite"/>
+                      </p:stCondLst>
+                      <p:childTnLst>
+                        <p:par>
+                          <p:cTn id="10" fill="hold">
+                            <p:stCondLst>
+                              <p:cond delay="0"/>
+                            </p:stCondLst>
+                            <p:childTnLst>
+                              <p:par>
+                                <p:cTn id="11" presetID="1" presetClass="entr" presetSubtype="0" fill="hold" grpId="0" nodeType="clickEffect">
+                                  <p:stCondLst>
+                                    <p:cond delay="0"/>
+                                  </p:stCondLst>
+                                  <p:childTnLst>
+                                    <p:set>
+                                      <p:cBhvr>
+                                        <p:cTn id="12" dur="1" fill="hold">
+                                          <p:stCondLst>
+                                            <p:cond delay="0"/>
+                                          </p:stCondLst>
+                                        </p:cTn>
+                                        <p:tgtEl>
+                                          <p:spTgt spid="5"/>
+                                        </p:tgtEl>
+                                        <p:attrNameLst>
+                                          <p:attrName>style.visibility</p:attrName>
+                                        </p:attrNameLst>
+                                      </p:cBhvr>
+                                      <p:to>
+                                        <p:strVal val="visible"/>
+                                      </p:to>
+                                    </p:set>
+                                  </p:childTnLst>
+                                </p:cTn>
+                              </p:par>
+                            </p:childTnLst>
+                          </p:cTn>
+                        </p:par>
+                      </p:childTnLst>
+                    </p:cTn>
+                  </p:par>
+                  <p:par>
+                    <p:cTn id="13" fill="hold">
+                      <p:stCondLst>
+                        <p:cond delay="indefinite"/>
+                      </p:stCondLst>
+                      <p:childTnLst>
+                        <p:par>
+                          <p:cTn id="14" fill="hold">
+                            <p:stCondLst>
+                              <p:cond delay="0"/>
+                            </p:stCondLst>
+                            <p:childTnLst>
+                              <p:par>
+                                <p:cTn id="15" presetID="10" presetClass="entr" presetSubtype="0" fill="hold" grpId="0" nodeType="clickEffect">
+                                  <p:stCondLst>
+                                    <p:cond delay="0"/>
+                                  </p:stCondLst>
+                                  <p:childTnLst>
+                                    <p:set>
+                                      <p:cBhvr>
+                                        <p:cTn id="16" dur="1" fill="hold">
+                                          <p:stCondLst>
+                                            <p:cond delay="0"/>
+                                          </p:stCondLst>
+                                        </p:cTn>
+                                        <p:tgtEl>
+                                          <p:spTgt spid="7"/>
+                                        </p:tgtEl>
+                                        <p:attrNameLst>
+                                          <p:attrName>style.visibility</p:attrName>
+                                        </p:attrNameLst>
+                                      </p:cBhvr>
+                                      <p:to>
+                                        <p:strVal val="visible"/>
+                                      </p:to>
+                                    </p:set>
+                                    <p:animEffect transition="in" filter="fade">
+                                      <p:cBhvr>
+                                        <p:cTn id="17" dur="500"/>
+                                        <p:tgtEl>
+                                          <p:spTgt spid="7"/>
+                                        </p:tgtEl>
+                                      </p:cBhvr>
+                                    </p:animEffect>
+                                  </p:childTnLst>
+                                </p:cTn>
+                              </p:par>
+                            </p:childTnLst>
+                          </p:cTn>
+                        </p:par>
+                      </p:childTnLst>
+                    </p:cTn>
+                  </p:par>
+                  <p:par>
+                    <p:cTn id="18" fill="hold">
+                      <p:stCondLst>
+                        <p:cond delay="indefinite"/>
+                      </p:stCondLst>
+                      <p:childTnLst>
+                        <p:par>
+                          <p:cTn id="19" fill="hold">
+                            <p:stCondLst>
+                              <p:cond delay="0"/>
+                            </p:stCondLst>
+                            <p:childTnLst>
+                              <p:par>
+                                <p:cTn id="20" presetID="16" presetClass="entr" presetSubtype="21" fill="hold" grpId="0" nodeType="clickEffect">
+                                  <p:stCondLst>
+                                    <p:cond delay="0"/>
+                                  </p:stCondLst>
+                                  <p:childTnLst>
+                                    <p:set>
+                                      <p:cBhvr>
+                                        <p:cTn id="21" dur="1" fill="hold">
+                                          <p:stCondLst>
+                                            <p:cond delay="0"/>
+                                          </p:stCondLst>
+                                        </p:cTn>
+                                        <p:tgtEl>
+                                          <p:spTgt spid="8"/>
+                                        </p:tgtEl>
+                                        <p:attrNameLst>
+                                          <p:attrName>style.visibility</p:attrName>
+                                        </p:attrNameLst>
+                                      </p:cBhvr>
+                                      <p:to>
+                                        <p:strVal val="visible"/>
+                                      </p:to>
+                                    </p:set>
+                                    <p:animEffect transition="in" filter="barn(inVertical)">
+                                      <p:cBhvr>
+                                        <p:cTn id="22" dur="500"/>
+                                        <p:tgtEl>
+                                          <p:spTgt spid="8"/>
+                                        </p:tgtEl>
+                                      </p:cBhvr>
+                                    </p:animEffect>
+                                  </p:childTnLst>
+                                </p:cTn>
+                              </p:par>
+                            </p:childTnLst>
+                          </p:cTn>
+                        </p:par>
+                      </p:childTnLst>
+                    </p:cTn>
+                  </p:par>
+                </p:childTnLst>
+              </p:cTn>
+              <p:prevCondLst>
+                <p:cond evt="onPrev" delay="0">
+                  <p:tgtEl>
+                    <p:sldTgt/>
+                  </p:tgtEl>
+                </p:cond>
+              </p:prevCondLst>
+              <p:nextCondLst>
+                <p:cond evt="onNext" delay="0">
+                  <p:tgtEl>
+                    <p:sldTgt/>
+                  </p:tgtEl>
+                </p:cond>
+              </p:nextCondLst>
+            </p:seq>
+          </p:childTnLst>
+        </p:cTn>
+      </p:par>
+    </p:tnLst>
+    <p:bldLst>
+      <p:bldP spid="3" grpId="0" animBg="1"/>
+      <p:bldP spid="5" grpId="0" animBg="1"/>
+      <p:bldP spid="7" grpId="0" animBg="1"/>
+      <p:bldP spid="8" grpId="0" animBg="1"/>
+    </p:bldLst>
+  </p:timing>
+</p:sld>
+</file>
+
+<file path=ppt/slides/slide11.xml><?xml version="1.0" encoding="utf-8"?>
+<p:sld xmlns:a="http://schemas.openxmlformats.org/drawingml/2006/main" xmlns:r="http://schemas.openxmlformats.org/officeDocument/2006/relationships" xmlns:p="http://schemas.openxmlformats.org/presentationml/2006/main">
+  <p:cSld>
+    <p:spTree>
+      <p:nvGrpSpPr>
+        <p:cNvPr id="1" name=""/>
+        <p:cNvGrpSpPr/>
+        <p:nvPr/>
+      </p:nvGrpSpPr>
+      <p:grpSpPr>
+        <a:xfrm>
+          <a:off x="0" y="0"/>
+          <a:ext cx="0" cy="0"/>
+          <a:chOff x="0" y="0"/>
+          <a:chExt cx="0" cy="0"/>
+        </a:xfrm>
+      </p:grpSpPr>
+    </p:spTree>
+    <p:extLst>
+      <p:ext uri="{BB962C8B-B14F-4D97-AF65-F5344CB8AC3E}">
+        <p14:creationId xmlns:p14="http://schemas.microsoft.com/office/powerpoint/2010/main" val="4228155245"/>
+      </p:ext>
+    </p:extLst>
+  </p:cSld>
+  <p:clrMapOvr>
+    <a:masterClrMapping/>
+  </p:clrMapOvr>
+  <p:timing>
+    <p:tnLst>
+      <p:par>
+        <p:cTn id="1" dur="indefinite" restart="never" nodeType="tmRoot"/>
+      </p:par>
+    </p:tnLst>
+  </p:timing>
+</p:sld>
+</file>
+
+<file path=ppt/slides/slide12.xml><?xml version="1.0" encoding="utf-8"?>
+<p:sld xmlns:a="http://schemas.openxmlformats.org/drawingml/2006/main" xmlns:r="http://schemas.openxmlformats.org/officeDocument/2006/relationships" xmlns:p="http://schemas.openxmlformats.org/presentationml/2006/main">
+  <p:cSld>
+    <p:spTree>
+      <p:nvGrpSpPr>
+        <p:cNvPr id="1" name=""/>
+        <p:cNvGrpSpPr/>
+        <p:nvPr/>
+      </p:nvGrpSpPr>
+      <p:grpSpPr>
+        <a:xfrm>
+          <a:off x="0" y="0"/>
+          <a:ext cx="0" cy="0"/>
+          <a:chOff x="0" y="0"/>
+          <a:chExt cx="0" cy="0"/>
+        </a:xfrm>
+      </p:grpSpPr>
+      <p:sp>
+        <p:nvSpPr>
+          <p:cNvPr id="3" name="selectMe"/>
+          <p:cNvSpPr/>
+          <p:nvPr/>
+        </p:nvSpPr>
+        <p:spPr>
+          <a:xfrm>
+            <a:off x="1524000" y="990600"/>
+            <a:ext cx="2743200" cy="4572000"/>
+          </a:xfrm>
+          <a:prstGeom prst="roundRect">
+            <a:avLst/>
+          </a:prstGeom>
+          <a:solidFill>
+            <a:srgbClr val="0A275A"/>
+          </a:solidFill>
+          <a:ln w="203200">
+            <a:solidFill>
+              <a:srgbClr val="61EB75"/>
+            </a:solidFill>
+          </a:ln>
+        </p:spPr>
+        <p:style>
+          <a:lnRef idx="2">
+            <a:schemeClr val="accent1">
+              <a:shade val="50000"/>
+            </a:schemeClr>
+          </a:lnRef>
+          <a:fillRef idx="1">
+            <a:schemeClr val="accent1"/>
+          </a:fillRef>
+          <a:effectRef idx="0">
+            <a:schemeClr val="accent1"/>
+          </a:effectRef>
+          <a:fontRef idx="minor">
+            <a:schemeClr val="lt1"/>
+          </a:fontRef>
+        </p:style>
+        <p:txBody>
+          <a:bodyPr rtlCol="0" anchor="ctr"/>
+          <a:lstStyle/>
+          <a:p>
+            <a:pPr algn="ctr"/>
+            <a:r>
+              <a:rPr lang="en-US" altLang="zh-CN" sz="6600" dirty="0" smtClean="0">
+                <a:solidFill>
+                  <a:srgbClr val="EB7561"/>
+                </a:solidFill>
+                <a:latin typeface="Times New Roman" panose="02020603050405020304" pitchFamily="18" charset="0"/>
+                <a:cs typeface="Times New Roman" panose="02020603050405020304" pitchFamily="18" charset="0"/>
+              </a:rPr>
+              <a:t>TEXT</a:t>
+            </a:r>
+            <a:endParaRPr lang="zh-CN" altLang="en-US" sz="6600" dirty="0">
+              <a:solidFill>
+                <a:srgbClr val="EB7561"/>
+              </a:solidFill>
+              <a:latin typeface="Times New Roman" panose="02020603050405020304" pitchFamily="18" charset="0"/>
+              <a:cs typeface="Times New Roman" panose="02020603050405020304" pitchFamily="18" charset="0"/>
+            </a:endParaRPr>
+          </a:p>
+        </p:txBody>
+      </p:sp>
+      <p:sp>
+        <p:nvSpPr>
+          <p:cNvPr id="5" name="Rounded Rectangle 4"/>
+          <p:cNvSpPr/>
+          <p:nvPr/>
+        </p:nvSpPr>
+        <p:spPr>
+          <a:xfrm>
+            <a:off x="5867400" y="1219200"/>
+            <a:ext cx="1828800" cy="1295400"/>
+          </a:xfrm>
+          <a:prstGeom prst="roundRect">
+            <a:avLst/>
+          </a:prstGeom>
+          <a:solidFill>
+            <a:srgbClr val="EB7662"/>
+          </a:solidFill>
+          <a:ln>
+            <a:noFill/>
+          </a:ln>
+        </p:spPr>
+        <p:style>
+          <a:lnRef idx="2">
+            <a:schemeClr val="accent1">
+              <a:shade val="50000"/>
+            </a:schemeClr>
+          </a:lnRef>
+          <a:fillRef idx="1">
+            <a:schemeClr val="accent1"/>
+          </a:fillRef>
+          <a:effectRef idx="0">
+            <a:schemeClr val="accent1"/>
+          </a:effectRef>
+          <a:fontRef idx="minor">
+            <a:schemeClr val="lt1"/>
+          </a:fontRef>
+        </p:style>
+        <p:txBody>
+          <a:bodyPr rtlCol="0" anchor="ctr"/>
+          <a:lstStyle/>
+          <a:p>
+            <a:pPr algn="ctr"/>
+            <a:endParaRPr lang="zh-CN" altLang="en-US"/>
+          </a:p>
+        </p:txBody>
+      </p:sp>
+      <p:sp>
+        <p:nvSpPr>
+          <p:cNvPr id="7" name="Rounded Rectangle 6"/>
+          <p:cNvSpPr/>
+          <p:nvPr/>
+        </p:nvSpPr>
+        <p:spPr>
+          <a:xfrm>
+            <a:off x="5867400" y="2743200"/>
+            <a:ext cx="1828800" cy="1295400"/>
+          </a:xfrm>
+          <a:prstGeom prst="roundRect">
+            <a:avLst/>
+          </a:prstGeom>
+          <a:solidFill>
+            <a:srgbClr val="62EB76"/>
+          </a:solidFill>
+          <a:ln>
+            <a:noFill/>
+          </a:ln>
+        </p:spPr>
+        <p:style>
+          <a:lnRef idx="2">
+            <a:schemeClr val="accent1">
+              <a:shade val="50000"/>
+            </a:schemeClr>
+          </a:lnRef>
+          <a:fillRef idx="1">
+            <a:schemeClr val="accent1"/>
+          </a:fillRef>
+          <a:effectRef idx="0">
+            <a:schemeClr val="accent1"/>
+          </a:effectRef>
+          <a:fontRef idx="minor">
+            <a:schemeClr val="lt1"/>
+          </a:fontRef>
+        </p:style>
+        <p:txBody>
+          <a:bodyPr rtlCol="0" anchor="ctr"/>
+          <a:lstStyle/>
+          <a:p>
+            <a:pPr algn="ctr"/>
+            <a:endParaRPr lang="zh-CN" altLang="en-US"/>
+          </a:p>
+        </p:txBody>
+      </p:sp>
+      <p:sp>
+        <p:nvSpPr>
+          <p:cNvPr id="8" name="Rounded Rectangle 7"/>
+          <p:cNvSpPr/>
+          <p:nvPr/>
+        </p:nvSpPr>
+        <p:spPr>
+          <a:xfrm>
+            <a:off x="5867400" y="4267200"/>
+            <a:ext cx="1828800" cy="1295400"/>
+          </a:xfrm>
+          <a:prstGeom prst="roundRect">
+            <a:avLst/>
+          </a:prstGeom>
+          <a:solidFill>
+            <a:srgbClr val="6294EB"/>
+          </a:solidFill>
+          <a:ln>
+            <a:noFill/>
+          </a:ln>
+        </p:spPr>
+        <p:style>
+          <a:lnRef idx="2">
+            <a:schemeClr val="accent1">
+              <a:shade val="50000"/>
+            </a:schemeClr>
+          </a:lnRef>
+          <a:fillRef idx="1">
+            <a:schemeClr val="accent1"/>
+          </a:fillRef>
+          <a:effectRef idx="0">
+            <a:schemeClr val="accent1"/>
+          </a:effectRef>
+          <a:fontRef idx="minor">
+            <a:schemeClr val="lt1"/>
+          </a:fontRef>
+        </p:style>
+        <p:txBody>
+          <a:bodyPr rtlCol="0" anchor="ctr"/>
+          <a:lstStyle/>
+          <a:p>
+            <a:pPr algn="ctr"/>
+            <a:endParaRPr lang="zh-CN" altLang="en-US"/>
+          </a:p>
+        </p:txBody>
+      </p:sp>
+      <p:sp>
+        <p:nvSpPr>
+          <p:cNvPr id="10" name="copyMe"/>
+          <p:cNvSpPr/>
+          <p:nvPr/>
+        </p:nvSpPr>
+        <p:spPr>
+          <a:xfrm>
+            <a:off x="3276600" y="1333500"/>
+            <a:ext cx="3505200" cy="4343400"/>
+          </a:xfrm>
+          <a:prstGeom prst="parallelogram">
+            <a:avLst/>
+          </a:prstGeom>
+        </p:spPr>
+        <p:style>
+          <a:lnRef idx="2">
+            <a:schemeClr val="accent1">
+              <a:shade val="50000"/>
+            </a:schemeClr>
+          </a:lnRef>
+          <a:fillRef idx="1">
+            <a:schemeClr val="accent1"/>
+          </a:fillRef>
+          <a:effectRef idx="0">
+            <a:schemeClr val="accent1"/>
+          </a:effectRef>
+          <a:fontRef idx="minor">
+            <a:schemeClr val="lt1"/>
+          </a:fontRef>
+        </p:style>
+        <p:txBody>
+          <a:bodyPr rtlCol="0" anchor="ctr"/>
+          <a:lstStyle/>
+          <a:p>
+            <a:pPr algn="ctr"/>
+            <a:endParaRPr lang="en-SG"/>
+          </a:p>
+        </p:txBody>
+      </p:sp>
+      <p:sp>
+        <p:nvSpPr>
+          <p:cNvPr id="6" name="compareMe"/>
+          <p:cNvSpPr/>
+          <p:nvPr/>
+        </p:nvSpPr>
+        <p:spPr>
+          <a:xfrm>
+            <a:off x="5638800" y="228600"/>
+            <a:ext cx="3505200" cy="4343400"/>
+          </a:xfrm>
+          <a:prstGeom prst="parallelogram">
+            <a:avLst/>
+          </a:prstGeom>
+        </p:spPr>
+        <p:style>
+          <a:lnRef idx="2">
+            <a:schemeClr val="accent1">
+              <a:shade val="50000"/>
+            </a:schemeClr>
+          </a:lnRef>
+          <a:fillRef idx="1">
+            <a:schemeClr val="accent1"/>
+          </a:fillRef>
+          <a:effectRef idx="0">
+            <a:schemeClr val="accent1"/>
+          </a:effectRef>
+          <a:fontRef idx="minor">
+            <a:schemeClr val="lt1"/>
+          </a:fontRef>
+        </p:style>
+        <p:txBody>
+          <a:bodyPr rtlCol="0" anchor="ctr"/>
+          <a:lstStyle/>
+          <a:p>
+            <a:pPr algn="ctr"/>
+            <a:endParaRPr lang="en-SG"/>
+          </a:p>
+        </p:txBody>
+      </p:sp>
+      <p:sp>
+        <p:nvSpPr>
+          <p:cNvPr id="9" name="Expected"/>
+          <p:cNvSpPr txBox="1"/>
+          <p:nvPr/>
+        </p:nvSpPr>
+        <p:spPr>
+          <a:xfrm>
+            <a:off x="3769556" y="6095135"/>
+            <a:ext cx="1528688" cy="369332"/>
+          </a:xfrm>
+          <a:prstGeom prst="rect">
+            <a:avLst/>
+          </a:prstGeom>
+          <a:noFill/>
+        </p:spPr>
+        <p:txBody>
+          <a:bodyPr wrap="none" rtlCol="0">
+            <a:spAutoFit/>
+          </a:bodyPr>
+          <a:lstStyle/>
+          <a:p>
+            <a:r>
+              <a:rPr lang="en-SG" dirty="0" smtClean="0"/>
+              <a:t>Expected slide</a:t>
+            </a:r>
+            <a:endParaRPr lang="en-SG" dirty="0"/>
+          </a:p>
+        </p:txBody>
+      </p:sp>
+    </p:spTree>
+    <p:extLst>
+      <p:ext uri="{BB962C8B-B14F-4D97-AF65-F5344CB8AC3E}">
+        <p14:creationId xmlns:p14="http://schemas.microsoft.com/office/powerpoint/2010/main" val="2562146180"/>
+      </p:ext>
+    </p:extLst>
+  </p:cSld>
+  <p:clrMapOvr>
+    <a:masterClrMapping/>
+  </p:clrMapOvr>
+  <p:timing>
+    <p:tnLst>
+      <p:par>
+        <p:cTn id="1" dur="indefinite" restart="never" nodeType="tmRoot">
+          <p:childTnLst>
+            <p:seq concurrent="1" nextAc="seek">
+              <p:cTn id="2" dur="indefinite" nodeType="mainSeq">
+                <p:childTnLst>
+                  <p:par>
+                    <p:cTn id="3" fill="hold">
+                      <p:stCondLst>
+                        <p:cond delay="indefinite"/>
+                      </p:stCondLst>
+                      <p:childTnLst>
+                        <p:par>
+                          <p:cTn id="4" fill="hold">
+                            <p:stCondLst>
+                              <p:cond delay="0"/>
+                            </p:stCondLst>
+                            <p:childTnLst>
+                              <p:par>
+                                <p:cTn id="5" presetID="2" presetClass="entr" presetSubtype="4" fill="hold" grpId="0" nodeType="clickEffect">
+                                  <p:stCondLst>
+                                    <p:cond delay="0"/>
+                                  </p:stCondLst>
+                                  <p:childTnLst>
+                                    <p:set>
+                                      <p:cBhvr>
+                                        <p:cTn id="6" dur="1" fill="hold">
+                                          <p:stCondLst>
+                                            <p:cond delay="0"/>
+                                          </p:stCondLst>
+                                        </p:cTn>
+                                        <p:tgtEl>
+                                          <p:spTgt spid="3"/>
+                                        </p:tgtEl>
+                                        <p:attrNameLst>
+                                          <p:attrName>style.visibility</p:attrName>
+                                        </p:attrNameLst>
+                                      </p:cBhvr>
+                                      <p:to>
+                                        <p:strVal val="visible"/>
+                                      </p:to>
+                                    </p:set>
+                                    <p:anim calcmode="lin" valueType="num">
+                                      <p:cBhvr additive="base">
+                                        <p:cTn id="7" dur="500" fill="hold"/>
+                                        <p:tgtEl>
+                                          <p:spTgt spid="3"/>
+                                        </p:tgtEl>
+                                        <p:attrNameLst>
+                                          <p:attrName>ppt_x</p:attrName>
+                                        </p:attrNameLst>
+                                      </p:cBhvr>
+                                      <p:tavLst>
+                                        <p:tav tm="0">
+                                          <p:val>
+                                            <p:strVal val="#ppt_x"/>
+                                          </p:val>
+                                        </p:tav>
+                                        <p:tav tm="100000">
+                                          <p:val>
+                                            <p:strVal val="#ppt_x"/>
+                                          </p:val>
+                                        </p:tav>
+                                      </p:tavLst>
+                                    </p:anim>
+                                    <p:anim calcmode="lin" valueType="num">
+                                      <p:cBhvr additive="base">
+                                        <p:cTn id="8" dur="500" fill="hold"/>
+                                        <p:tgtEl>
+                                          <p:spTgt spid="3"/>
+                                        </p:tgtEl>
+                                        <p:attrNameLst>
+                                          <p:attrName>ppt_y</p:attrName>
+                                        </p:attrNameLst>
+                                      </p:cBhvr>
+                                      <p:tavLst>
+                                        <p:tav tm="0">
+                                          <p:val>
+                                            <p:strVal val="1+#ppt_h/2"/>
+                                          </p:val>
+                                        </p:tav>
+                                        <p:tav tm="100000">
+                                          <p:val>
+                                            <p:strVal val="#ppt_y"/>
+                                          </p:val>
+                                        </p:tav>
+                                      </p:tavLst>
+                                    </p:anim>
+                                  </p:childTnLst>
+                                </p:cTn>
+                              </p:par>
+                            </p:childTnLst>
+                          </p:cTn>
+                        </p:par>
+                      </p:childTnLst>
+                    </p:cTn>
+                  </p:par>
+                  <p:par>
+                    <p:cTn id="9" fill="hold">
+                      <p:stCondLst>
+                        <p:cond delay="indefinite"/>
+                      </p:stCondLst>
+                      <p:childTnLst>
+                        <p:par>
+                          <p:cTn id="10" fill="hold">
+                            <p:stCondLst>
+                              <p:cond delay="0"/>
+                            </p:stCondLst>
+                            <p:childTnLst>
+                              <p:par>
+                                <p:cTn id="11" presetID="1" presetClass="entr" presetSubtype="0" fill="hold" grpId="0" nodeType="clickEffect">
+                                  <p:stCondLst>
+                                    <p:cond delay="0"/>
+                                  </p:stCondLst>
+                                  <p:childTnLst>
+                                    <p:set>
+                                      <p:cBhvr>
+                                        <p:cTn id="12" dur="1" fill="hold">
+                                          <p:stCondLst>
+                                            <p:cond delay="0"/>
+                                          </p:stCondLst>
+                                        </p:cTn>
+                                        <p:tgtEl>
+                                          <p:spTgt spid="5"/>
+                                        </p:tgtEl>
+                                        <p:attrNameLst>
+                                          <p:attrName>style.visibility</p:attrName>
+                                        </p:attrNameLst>
+                                      </p:cBhvr>
+                                      <p:to>
+                                        <p:strVal val="visible"/>
+                                      </p:to>
+                                    </p:set>
+                                  </p:childTnLst>
+                                </p:cTn>
+                              </p:par>
+                            </p:childTnLst>
+                          </p:cTn>
+                        </p:par>
+                      </p:childTnLst>
+                    </p:cTn>
+                  </p:par>
+                  <p:par>
+                    <p:cTn id="13" fill="hold">
+                      <p:stCondLst>
+                        <p:cond delay="indefinite"/>
+                      </p:stCondLst>
+                      <p:childTnLst>
+                        <p:par>
+                          <p:cTn id="14" fill="hold">
+                            <p:stCondLst>
+                              <p:cond delay="0"/>
+                            </p:stCondLst>
+                            <p:childTnLst>
+                              <p:par>
+                                <p:cTn id="15" presetID="10" presetClass="entr" presetSubtype="0" fill="hold" grpId="0" nodeType="clickEffect">
+                                  <p:stCondLst>
+                                    <p:cond delay="0"/>
+                                  </p:stCondLst>
+                                  <p:childTnLst>
+                                    <p:set>
+                                      <p:cBhvr>
+                                        <p:cTn id="16" dur="1" fill="hold">
+                                          <p:stCondLst>
+                                            <p:cond delay="0"/>
+                                          </p:stCondLst>
+                                        </p:cTn>
+                                        <p:tgtEl>
+                                          <p:spTgt spid="7"/>
+                                        </p:tgtEl>
+                                        <p:attrNameLst>
+                                          <p:attrName>style.visibility</p:attrName>
+                                        </p:attrNameLst>
+                                      </p:cBhvr>
+                                      <p:to>
+                                        <p:strVal val="visible"/>
+                                      </p:to>
+                                    </p:set>
+                                    <p:animEffect transition="in" filter="fade">
+                                      <p:cBhvr>
+                                        <p:cTn id="17" dur="500"/>
+                                        <p:tgtEl>
+                                          <p:spTgt spid="7"/>
+                                        </p:tgtEl>
+                                      </p:cBhvr>
+                                    </p:animEffect>
+                                  </p:childTnLst>
+                                </p:cTn>
+                              </p:par>
+                            </p:childTnLst>
+                          </p:cTn>
+                        </p:par>
+                      </p:childTnLst>
+                    </p:cTn>
+                  </p:par>
+                  <p:par>
+                    <p:cTn id="18" fill="hold">
+                      <p:stCondLst>
+                        <p:cond delay="indefinite"/>
+                      </p:stCondLst>
+                      <p:childTnLst>
+                        <p:par>
+                          <p:cTn id="19" fill="hold">
+                            <p:stCondLst>
+                              <p:cond delay="0"/>
+                            </p:stCondLst>
+                            <p:childTnLst>
+                              <p:par>
+                                <p:cTn id="20" presetID="16" presetClass="entr" presetSubtype="21" fill="hold" grpId="0" nodeType="clickEffect">
+                                  <p:stCondLst>
+                                    <p:cond delay="0"/>
+                                  </p:stCondLst>
+                                  <p:childTnLst>
+                                    <p:set>
+                                      <p:cBhvr>
+                                        <p:cTn id="21" dur="1" fill="hold">
+                                          <p:stCondLst>
+                                            <p:cond delay="0"/>
+                                          </p:stCondLst>
+                                        </p:cTn>
+                                        <p:tgtEl>
+                                          <p:spTgt spid="8"/>
+                                        </p:tgtEl>
+                                        <p:attrNameLst>
+                                          <p:attrName>style.visibility</p:attrName>
+                                        </p:attrNameLst>
+                                      </p:cBhvr>
+                                      <p:to>
+                                        <p:strVal val="visible"/>
+                                      </p:to>
+                                    </p:set>
+                                    <p:animEffect transition="in" filter="barn(inVertical)">
+                                      <p:cBhvr>
+                                        <p:cTn id="22" dur="500"/>
+                                        <p:tgtEl>
+                                          <p:spTgt spid="8"/>
+                                        </p:tgtEl>
+                                      </p:cBhvr>
+                                    </p:animEffect>
+                                  </p:childTnLst>
+                                </p:cTn>
+                              </p:par>
+                            </p:childTnLst>
+                          </p:cTn>
+                        </p:par>
+                      </p:childTnLst>
+                    </p:cTn>
+                  </p:par>
+                </p:childTnLst>
+              </p:cTn>
+              <p:prevCondLst>
+                <p:cond evt="onPrev" delay="0">
+                  <p:tgtEl>
+                    <p:sldTgt/>
+                  </p:tgtEl>
+                </p:cond>
+              </p:prevCondLst>
+              <p:nextCondLst>
+                <p:cond evt="onNext" delay="0">
+                  <p:tgtEl>
+                    <p:sldTgt/>
+                  </p:tgtEl>
+                </p:cond>
+              </p:nextCondLst>
+            </p:seq>
+          </p:childTnLst>
+        </p:cTn>
+      </p:par>
+    </p:tnLst>
+    <p:bldLst>
+      <p:bldP spid="3" grpId="0" animBg="1"/>
+      <p:bldP spid="5" grpId="0" animBg="1"/>
+      <p:bldP spid="7" grpId="0" animBg="1"/>
+      <p:bldP spid="8" grpId="0" animBg="1"/>
+    </p:bldLst>
+  </p:timing>
+</p:sld>
+</file>
+
+<file path=ppt/slides/slide13.xml><?xml version="1.0" encoding="utf-8"?>
+<p:sld xmlns:a="http://schemas.openxmlformats.org/drawingml/2006/main" xmlns:r="http://schemas.openxmlformats.org/officeDocument/2006/relationships" xmlns:p="http://schemas.openxmlformats.org/presentationml/2006/main">
+  <p:cSld>
+    <p:spTree>
+      <p:nvGrpSpPr>
+        <p:cNvPr id="1" name=""/>
+        <p:cNvGrpSpPr/>
+        <p:nvPr/>
+      </p:nvGrpSpPr>
+      <p:grpSpPr>
+        <a:xfrm>
+          <a:off x="0" y="0"/>
+          <a:ext cx="0" cy="0"/>
+          <a:chOff x="0" y="0"/>
+          <a:chExt cx="0" cy="0"/>
+        </a:xfrm>
+      </p:grpSpPr>
+      <p:sp>
+        <p:nvSpPr>
+          <p:cNvPr id="3" name="selectMeNow1"/>
+          <p:cNvSpPr/>
+          <p:nvPr/>
+        </p:nvSpPr>
+        <p:spPr>
+          <a:xfrm rot="1965194">
+            <a:off x="1533377" y="1406276"/>
+            <a:ext cx="3200400" cy="3792071"/>
+          </a:xfrm>
+          <a:prstGeom prst="roundRect">
+            <a:avLst/>
+          </a:prstGeom>
+          <a:solidFill>
+            <a:schemeClr val="accent2">
+              <a:lumMod val="40000"/>
+              <a:lumOff val="60000"/>
+            </a:schemeClr>
+          </a:solidFill>
+          <a:ln w="203200">
+            <a:solidFill>
+              <a:srgbClr val="92D050"/>
+            </a:solidFill>
+          </a:ln>
+          <a:effectLst>
+            <a:innerShdw blurRad="63500" dist="50800" dir="8100000">
+              <a:prstClr val="black">
+                <a:alpha val="50000"/>
+              </a:prstClr>
+            </a:innerShdw>
+          </a:effectLst>
+        </p:spPr>
+        <p:style>
+          <a:lnRef idx="2">
+            <a:schemeClr val="accent1">
+              <a:shade val="50000"/>
+            </a:schemeClr>
+          </a:lnRef>
+          <a:fillRef idx="1">
+            <a:schemeClr val="accent1"/>
+          </a:fillRef>
+          <a:effectRef idx="0">
+            <a:schemeClr val="accent1"/>
+          </a:effectRef>
+          <a:fontRef idx="minor">
+            <a:schemeClr val="lt1"/>
+          </a:fontRef>
+        </p:style>
+        <p:txBody>
+          <a:bodyPr rtlCol="0" anchor="ctr"/>
+          <a:lstStyle/>
+          <a:p>
+            <a:pPr algn="ctr"/>
+            <a:r>
+              <a:rPr lang="en-US" altLang="zh-CN" sz="6600" dirty="0" smtClean="0">
+                <a:solidFill>
+                  <a:srgbClr val="EB7561"/>
+                </a:solidFill>
+                <a:latin typeface="Times New Roman" panose="02020603050405020304" pitchFamily="18" charset="0"/>
+                <a:cs typeface="Times New Roman" panose="02020603050405020304" pitchFamily="18" charset="0"/>
+              </a:rPr>
+              <a:t>TEXT</a:t>
+            </a:r>
+            <a:endParaRPr lang="zh-CN" altLang="en-US" sz="6600" dirty="0">
+              <a:solidFill>
+                <a:srgbClr val="EB7561"/>
+              </a:solidFill>
+              <a:latin typeface="Times New Roman" panose="02020603050405020304" pitchFamily="18" charset="0"/>
+              <a:cs typeface="Times New Roman" panose="02020603050405020304" pitchFamily="18" charset="0"/>
+            </a:endParaRPr>
+          </a:p>
+        </p:txBody>
+      </p:sp>
+      <p:sp>
+        <p:nvSpPr>
+          <p:cNvPr id="5" name="selectMeNow2"/>
+          <p:cNvSpPr/>
+          <p:nvPr/>
+        </p:nvSpPr>
+        <p:spPr>
+          <a:xfrm>
+            <a:off x="5867400" y="1143000"/>
+            <a:ext cx="1828800" cy="1371600"/>
+          </a:xfrm>
+          <a:prstGeom prst="roundRect">
+            <a:avLst/>
+          </a:prstGeom>
+          <a:ln/>
+        </p:spPr>
+        <p:style>
+          <a:lnRef idx="3">
+            <a:schemeClr val="lt1"/>
+          </a:lnRef>
+          <a:fillRef idx="1">
+            <a:schemeClr val="accent6"/>
+          </a:fillRef>
+          <a:effectRef idx="1">
+            <a:schemeClr val="accent6"/>
+          </a:effectRef>
+          <a:fontRef idx="minor">
+            <a:schemeClr val="lt1"/>
+          </a:fontRef>
+        </p:style>
+        <p:txBody>
+          <a:bodyPr rtlCol="0" anchor="ctr"/>
+          <a:lstStyle/>
+          <a:p>
+            <a:pPr algn="ctr"/>
+            <a:endParaRPr lang="zh-CN" altLang="en-US"/>
+          </a:p>
+        </p:txBody>
+      </p:sp>
+      <p:sp>
+        <p:nvSpPr>
+          <p:cNvPr id="7" name="selectMeNow3"/>
+          <p:cNvSpPr/>
+          <p:nvPr/>
+        </p:nvSpPr>
+        <p:spPr>
+          <a:xfrm>
+            <a:off x="5867400" y="2667000"/>
+            <a:ext cx="1828800" cy="1371600"/>
+          </a:xfrm>
+          <a:prstGeom prst="roundRect">
+            <a:avLst/>
+          </a:prstGeom>
+          <a:ln/>
+        </p:spPr>
+        <p:style>
+          <a:lnRef idx="3">
+            <a:schemeClr val="lt1"/>
+          </a:lnRef>
+          <a:fillRef idx="1">
+            <a:schemeClr val="accent3"/>
+          </a:fillRef>
+          <a:effectRef idx="1">
+            <a:schemeClr val="accent3"/>
+          </a:effectRef>
+          <a:fontRef idx="minor">
+            <a:schemeClr val="lt1"/>
+          </a:fontRef>
+        </p:style>
+        <p:txBody>
+          <a:bodyPr rtlCol="0" anchor="ctr"/>
+          <a:lstStyle/>
+          <a:p>
+            <a:pPr algn="ctr"/>
+            <a:endParaRPr lang="zh-CN" altLang="en-US"/>
+          </a:p>
+        </p:txBody>
+      </p:sp>
+      <p:sp>
+        <p:nvSpPr>
+          <p:cNvPr id="8" name="selectMeNow4"/>
+          <p:cNvSpPr/>
+          <p:nvPr/>
+        </p:nvSpPr>
+        <p:spPr>
+          <a:xfrm>
+            <a:off x="5867400" y="4191000"/>
+            <a:ext cx="1828800" cy="1371600"/>
+          </a:xfrm>
+          <a:prstGeom prst="roundRect">
+            <a:avLst/>
+          </a:prstGeom>
+          <a:solidFill>
+            <a:schemeClr val="accent6">
+              <a:alpha val="50000"/>
+            </a:schemeClr>
+          </a:solidFill>
+          <a:ln>
+            <a:noFill/>
+          </a:ln>
+        </p:spPr>
+        <p:style>
+          <a:lnRef idx="0">
+            <a:scrgbClr r="0" g="0" b="0"/>
+          </a:lnRef>
+          <a:fillRef idx="0">
+            <a:scrgbClr r="0" g="0" b="0"/>
+          </a:fillRef>
+          <a:effectRef idx="0">
+            <a:scrgbClr r="0" g="0" b="0"/>
+          </a:effectRef>
+          <a:fontRef idx="minor">
+            <a:schemeClr val="lt1"/>
+          </a:fontRef>
+        </p:style>
+        <p:txBody>
+          <a:bodyPr rtlCol="0" anchor="ctr"/>
+          <a:lstStyle/>
+          <a:p>
+            <a:pPr algn="ctr"/>
+            <a:endParaRPr lang="zh-CN" altLang="en-US"/>
+          </a:p>
+        </p:txBody>
+      </p:sp>
+      <p:sp>
+        <p:nvSpPr>
+          <p:cNvPr id="2" name="copyMe"/>
+          <p:cNvSpPr/>
+          <p:nvPr/>
+        </p:nvSpPr>
+        <p:spPr>
+          <a:xfrm>
+            <a:off x="2438400" y="1206811"/>
+            <a:ext cx="4191000" cy="4191000"/>
+          </a:xfrm>
+          <a:prstGeom prst="heptagon">
+            <a:avLst/>
+          </a:prstGeom>
+        </p:spPr>
+        <p:style>
+          <a:lnRef idx="2">
+            <a:schemeClr val="accent1">
+              <a:shade val="50000"/>
+            </a:schemeClr>
+          </a:lnRef>
+          <a:fillRef idx="1">
+            <a:schemeClr val="accent1"/>
+          </a:fillRef>
+          <a:effectRef idx="0">
+            <a:schemeClr val="accent1"/>
+          </a:effectRef>
+          <a:fontRef idx="minor">
+            <a:schemeClr val="lt1"/>
+          </a:fontRef>
+        </p:style>
+        <p:txBody>
+          <a:bodyPr rtlCol="0" anchor="ctr"/>
+          <a:lstStyle/>
+          <a:p>
+            <a:pPr algn="ctr"/>
+            <a:endParaRPr lang="en-SG"/>
+          </a:p>
+        </p:txBody>
+      </p:sp>
+    </p:spTree>
+    <p:extLst>
+      <p:ext uri="{BB962C8B-B14F-4D97-AF65-F5344CB8AC3E}">
+        <p14:creationId xmlns:p14="http://schemas.microsoft.com/office/powerpoint/2010/main" val="2188512437"/>
+      </p:ext>
+    </p:extLst>
+  </p:cSld>
+  <p:clrMapOvr>
+    <a:masterClrMapping/>
+  </p:clrMapOvr>
+  <p:timing>
+    <p:tnLst>
+      <p:par>
+        <p:cTn id="1" dur="indefinite" restart="never" nodeType="tmRoot">
+          <p:childTnLst>
+            <p:seq concurrent="1" nextAc="seek">
+              <p:cTn id="2" dur="indefinite" nodeType="mainSeq">
+                <p:childTnLst>
+                  <p:par>
+                    <p:cTn id="3" fill="hold">
+                      <p:stCondLst>
+                        <p:cond delay="indefinite"/>
+                      </p:stCondLst>
+                      <p:childTnLst>
+                        <p:par>
+                          <p:cTn id="4" fill="hold">
+                            <p:stCondLst>
+                              <p:cond delay="0"/>
+                            </p:stCondLst>
+                            <p:childTnLst>
+                              <p:par>
+                                <p:cTn id="5" presetID="2" presetClass="entr" presetSubtype="4" fill="hold" grpId="0" nodeType="clickEffect">
+                                  <p:stCondLst>
+                                    <p:cond delay="0"/>
+                                  </p:stCondLst>
+                                  <p:childTnLst>
+                                    <p:set>
+                                      <p:cBhvr>
+                                        <p:cTn id="6" dur="1" fill="hold">
+                                          <p:stCondLst>
+                                            <p:cond delay="0"/>
+                                          </p:stCondLst>
+                                        </p:cTn>
+                                        <p:tgtEl>
+                                          <p:spTgt spid="3"/>
+                                        </p:tgtEl>
+                                        <p:attrNameLst>
+                                          <p:attrName>style.visibility</p:attrName>
+                                        </p:attrNameLst>
+                                      </p:cBhvr>
+                                      <p:to>
+                                        <p:strVal val="visible"/>
+                                      </p:to>
+                                    </p:set>
+                                    <p:anim calcmode="lin" valueType="num">
+                                      <p:cBhvr additive="base">
+                                        <p:cTn id="7" dur="500" fill="hold"/>
+                                        <p:tgtEl>
+                                          <p:spTgt spid="3"/>
+                                        </p:tgtEl>
+                                        <p:attrNameLst>
+                                          <p:attrName>ppt_x</p:attrName>
+                                        </p:attrNameLst>
+                                      </p:cBhvr>
+                                      <p:tavLst>
+                                        <p:tav tm="0">
+                                          <p:val>
+                                            <p:strVal val="#ppt_x"/>
+                                          </p:val>
+                                        </p:tav>
+                                        <p:tav tm="100000">
+                                          <p:val>
+                                            <p:strVal val="#ppt_x"/>
+                                          </p:val>
+                                        </p:tav>
+                                      </p:tavLst>
+                                    </p:anim>
+                                    <p:anim calcmode="lin" valueType="num">
+                                      <p:cBhvr additive="base">
+                                        <p:cTn id="8" dur="500" fill="hold"/>
+                                        <p:tgtEl>
+                                          <p:spTgt spid="3"/>
+                                        </p:tgtEl>
+                                        <p:attrNameLst>
+                                          <p:attrName>ppt_y</p:attrName>
+                                        </p:attrNameLst>
+                                      </p:cBhvr>
+                                      <p:tavLst>
+                                        <p:tav tm="0">
+                                          <p:val>
+                                            <p:strVal val="1+#ppt_h/2"/>
+                                          </p:val>
+                                        </p:tav>
+                                        <p:tav tm="100000">
+                                          <p:val>
+                                            <p:strVal val="#ppt_y"/>
+                                          </p:val>
+                                        </p:tav>
+                                      </p:tavLst>
+                                    </p:anim>
+                                  </p:childTnLst>
+                                </p:cTn>
+                              </p:par>
+                            </p:childTnLst>
+                          </p:cTn>
+                        </p:par>
+                      </p:childTnLst>
+                    </p:cTn>
+                  </p:par>
+                  <p:par>
+                    <p:cTn id="9" fill="hold">
+                      <p:stCondLst>
+                        <p:cond delay="indefinite"/>
+                      </p:stCondLst>
+                      <p:childTnLst>
+                        <p:par>
+                          <p:cTn id="10" fill="hold">
+                            <p:stCondLst>
+                              <p:cond delay="0"/>
+                            </p:stCondLst>
+                            <p:childTnLst>
+                              <p:par>
+                                <p:cTn id="11" presetID="1" presetClass="entr" presetSubtype="0" fill="hold" grpId="0" nodeType="clickEffect">
+                                  <p:stCondLst>
+                                    <p:cond delay="0"/>
+                                  </p:stCondLst>
+                                  <p:childTnLst>
+                                    <p:set>
+                                      <p:cBhvr>
+                                        <p:cTn id="12" dur="1" fill="hold">
+                                          <p:stCondLst>
+                                            <p:cond delay="0"/>
+                                          </p:stCondLst>
+                                        </p:cTn>
+                                        <p:tgtEl>
+                                          <p:spTgt spid="5"/>
+                                        </p:tgtEl>
+                                        <p:attrNameLst>
+                                          <p:attrName>style.visibility</p:attrName>
+                                        </p:attrNameLst>
+                                      </p:cBhvr>
+                                      <p:to>
+                                        <p:strVal val="visible"/>
+                                      </p:to>
+                                    </p:set>
+                                  </p:childTnLst>
+                                </p:cTn>
+                              </p:par>
+                            </p:childTnLst>
+                          </p:cTn>
+                        </p:par>
+                      </p:childTnLst>
+                    </p:cTn>
+                  </p:par>
+                  <p:par>
+                    <p:cTn id="13" fill="hold">
+                      <p:stCondLst>
+                        <p:cond delay="indefinite"/>
+                      </p:stCondLst>
+                      <p:childTnLst>
+                        <p:par>
+                          <p:cTn id="14" fill="hold">
+                            <p:stCondLst>
+                              <p:cond delay="0"/>
+                            </p:stCondLst>
+                            <p:childTnLst>
+                              <p:par>
+                                <p:cTn id="15" presetID="10" presetClass="entr" presetSubtype="0" fill="hold" grpId="0" nodeType="clickEffect">
+                                  <p:stCondLst>
+                                    <p:cond delay="0"/>
+                                  </p:stCondLst>
+                                  <p:childTnLst>
+                                    <p:set>
+                                      <p:cBhvr>
+                                        <p:cTn id="16" dur="1" fill="hold">
+                                          <p:stCondLst>
+                                            <p:cond delay="0"/>
+                                          </p:stCondLst>
+                                        </p:cTn>
+                                        <p:tgtEl>
+                                          <p:spTgt spid="7"/>
+                                        </p:tgtEl>
+                                        <p:attrNameLst>
+                                          <p:attrName>style.visibility</p:attrName>
+                                        </p:attrNameLst>
+                                      </p:cBhvr>
+                                      <p:to>
+                                        <p:strVal val="visible"/>
+                                      </p:to>
+                                    </p:set>
+                                    <p:animEffect transition="in" filter="fade">
+                                      <p:cBhvr>
+                                        <p:cTn id="17" dur="500"/>
+                                        <p:tgtEl>
+                                          <p:spTgt spid="7"/>
+                                        </p:tgtEl>
+                                      </p:cBhvr>
+                                    </p:animEffect>
+                                  </p:childTnLst>
+                                </p:cTn>
+                              </p:par>
+                            </p:childTnLst>
+                          </p:cTn>
+                        </p:par>
+                      </p:childTnLst>
+                    </p:cTn>
+                  </p:par>
+                  <p:par>
+                    <p:cTn id="18" fill="hold">
+                      <p:stCondLst>
+                        <p:cond delay="indefinite"/>
+                      </p:stCondLst>
+                      <p:childTnLst>
+                        <p:par>
+                          <p:cTn id="19" fill="hold">
+                            <p:stCondLst>
+                              <p:cond delay="0"/>
+                            </p:stCondLst>
+                            <p:childTnLst>
+                              <p:par>
+                                <p:cTn id="20" presetID="16" presetClass="entr" presetSubtype="21" fill="hold" grpId="0" nodeType="clickEffect">
+                                  <p:stCondLst>
+                                    <p:cond delay="0"/>
+                                  </p:stCondLst>
+                                  <p:childTnLst>
+                                    <p:set>
+                                      <p:cBhvr>
+                                        <p:cTn id="21" dur="1" fill="hold">
+                                          <p:stCondLst>
+                                            <p:cond delay="0"/>
+                                          </p:stCondLst>
+                                        </p:cTn>
+                                        <p:tgtEl>
+                                          <p:spTgt spid="8"/>
+                                        </p:tgtEl>
+                                        <p:attrNameLst>
+                                          <p:attrName>style.visibility</p:attrName>
+                                        </p:attrNameLst>
+                                      </p:cBhvr>
+                                      <p:to>
+                                        <p:strVal val="visible"/>
+                                      </p:to>
+                                    </p:set>
+                                    <p:animEffect transition="in" filter="barn(inVertical)">
+                                      <p:cBhvr>
+                                        <p:cTn id="22" dur="500"/>
+                                        <p:tgtEl>
+                                          <p:spTgt spid="8"/>
+                                        </p:tgtEl>
+                                      </p:cBhvr>
+                                    </p:animEffect>
+                                  </p:childTnLst>
+                                </p:cTn>
+                              </p:par>
+                            </p:childTnLst>
+                          </p:cTn>
+                        </p:par>
+                      </p:childTnLst>
+                    </p:cTn>
+                  </p:par>
+                </p:childTnLst>
+              </p:cTn>
+              <p:prevCondLst>
+                <p:cond evt="onPrev" delay="0">
+                  <p:tgtEl>
+                    <p:sldTgt/>
+                  </p:tgtEl>
+                </p:cond>
+              </p:prevCondLst>
+              <p:nextCondLst>
+                <p:cond evt="onNext" delay="0">
+                  <p:tgtEl>
+                    <p:sldTgt/>
+                  </p:tgtEl>
+                </p:cond>
+              </p:nextCondLst>
+            </p:seq>
+          </p:childTnLst>
+        </p:cTn>
+      </p:par>
+    </p:tnLst>
+    <p:bldLst>
+      <p:bldP spid="3" grpId="0" animBg="1"/>
+      <p:bldP spid="5" grpId="0" animBg="1"/>
+      <p:bldP spid="7" grpId="0" animBg="1"/>
+      <p:bldP spid="8" grpId="0" animBg="1"/>
+    </p:bldLst>
+  </p:timing>
+</p:sld>
+</file>
+
+<file path=ppt/slides/slide14.xml><?xml version="1.0" encoding="utf-8"?>
+<p:sld xmlns:a="http://schemas.openxmlformats.org/drawingml/2006/main" xmlns:r="http://schemas.openxmlformats.org/officeDocument/2006/relationships" xmlns:p="http://schemas.openxmlformats.org/presentationml/2006/main">
+  <p:cSld>
+    <p:spTree>
+      <p:nvGrpSpPr>
+        <p:cNvPr id="1" name=""/>
+        <p:cNvGrpSpPr/>
+        <p:nvPr/>
+      </p:nvGrpSpPr>
+      <p:grpSpPr>
+        <a:xfrm>
+          <a:off x="0" y="0"/>
+          <a:ext cx="0" cy="0"/>
+          <a:chOff x="0" y="0"/>
+          <a:chExt cx="0" cy="0"/>
+        </a:xfrm>
+      </p:grpSpPr>
+    </p:spTree>
+    <p:extLst>
+      <p:ext uri="{BB962C8B-B14F-4D97-AF65-F5344CB8AC3E}">
+        <p14:creationId xmlns:p14="http://schemas.microsoft.com/office/powerpoint/2010/main" val="1779079148"/>
+      </p:ext>
+    </p:extLst>
+  </p:cSld>
+  <p:clrMapOvr>
+    <a:masterClrMapping/>
+  </p:clrMapOvr>
+  <p:timing>
+    <p:tnLst>
+      <p:par>
+        <p:cTn id="1" dur="indefinite" restart="never" nodeType="tmRoot"/>
+      </p:par>
+    </p:tnLst>
+  </p:timing>
+</p:sld>
+</file>
+
+<file path=ppt/slides/slide15.xml><?xml version="1.0" encoding="utf-8"?>
+<p:sld xmlns:a="http://schemas.openxmlformats.org/drawingml/2006/main" xmlns:r="http://schemas.openxmlformats.org/officeDocument/2006/relationships" xmlns:p="http://schemas.openxmlformats.org/presentationml/2006/main">
+  <p:cSld>
+    <p:spTree>
+      <p:nvGrpSpPr>
+        <p:cNvPr id="1" name=""/>
+        <p:cNvGrpSpPr/>
+        <p:nvPr/>
+      </p:nvGrpSpPr>
+      <p:grpSpPr>
+        <a:xfrm>
+          <a:off x="0" y="0"/>
+          <a:ext cx="0" cy="0"/>
+          <a:chOff x="0" y="0"/>
+          <a:chExt cx="0" cy="0"/>
+        </a:xfrm>
+      </p:grpSpPr>
+      <p:sp>
+        <p:nvSpPr>
+          <p:cNvPr id="6" name="Group selectMeNow1 Seq_1"/>
+          <p:cNvSpPr/>
+          <p:nvPr/>
+        </p:nvSpPr>
+        <p:spPr>
+          <a:xfrm rot="1965194">
+            <a:off x="1533377" y="1406276"/>
+            <a:ext cx="3200400" cy="3792071"/>
+          </a:xfrm>
+          <a:prstGeom prst="roundRect">
+            <a:avLst/>
+          </a:prstGeom>
+          <a:solidFill>
+            <a:schemeClr val="accent2">
+              <a:lumMod val="40000"/>
+              <a:lumOff val="60000"/>
+            </a:schemeClr>
+          </a:solidFill>
+          <a:ln w="203200">
+            <a:solidFill>
+              <a:srgbClr val="92D050"/>
+            </a:solidFill>
+          </a:ln>
+          <a:effectLst>
+            <a:innerShdw blurRad="63500" dist="50800" dir="8100000">
+              <a:prstClr val="black">
+                <a:alpha val="50000"/>
+              </a:prstClr>
+            </a:innerShdw>
+          </a:effectLst>
+        </p:spPr>
+        <p:style>
+          <a:lnRef idx="2">
+            <a:schemeClr val="accent1">
+              <a:shade val="50000"/>
+            </a:schemeClr>
+          </a:lnRef>
+          <a:fillRef idx="1">
+            <a:schemeClr val="accent1"/>
+          </a:fillRef>
+          <a:effectRef idx="0">
+            <a:schemeClr val="accent1"/>
+          </a:effectRef>
+          <a:fontRef idx="minor">
+            <a:schemeClr val="lt1"/>
+          </a:fontRef>
+        </p:style>
+        <p:txBody>
+          <a:bodyPr rtlCol="0" anchor="ctr"/>
+          <a:lstStyle/>
+          <a:p>
+            <a:pPr algn="ctr"/>
+            <a:r>
+              <a:rPr lang="en-US" altLang="zh-CN" sz="6600" dirty="0" smtClean="0">
+                <a:solidFill>
+                  <a:srgbClr val="EB7561"/>
+                </a:solidFill>
+                <a:latin typeface="Times New Roman" panose="02020603050405020304" pitchFamily="18" charset="0"/>
+                <a:cs typeface="Times New Roman" panose="02020603050405020304" pitchFamily="18" charset="0"/>
+              </a:rPr>
+              <a:t>TEXT</a:t>
+            </a:r>
+            <a:endParaRPr lang="zh-CN" altLang="en-US" sz="6600" dirty="0">
+              <a:solidFill>
+                <a:srgbClr val="EB7561"/>
+              </a:solidFill>
+              <a:latin typeface="Times New Roman" panose="02020603050405020304" pitchFamily="18" charset="0"/>
+              <a:cs typeface="Times New Roman" panose="02020603050405020304" pitchFamily="18" charset="0"/>
+            </a:endParaRPr>
+          </a:p>
+        </p:txBody>
+      </p:sp>
+      <p:sp>
+        <p:nvSpPr>
+          <p:cNvPr id="9" name="Group selectMeNow1 Seq_2"/>
+          <p:cNvSpPr/>
+          <p:nvPr/>
+        </p:nvSpPr>
+        <p:spPr>
+          <a:xfrm>
+            <a:off x="5867400" y="1143000"/>
+            <a:ext cx="1828800" cy="1371600"/>
+          </a:xfrm>
+          <a:prstGeom prst="roundRect">
+            <a:avLst/>
+          </a:prstGeom>
+          <a:ln/>
+        </p:spPr>
+        <p:style>
+          <a:lnRef idx="3">
+            <a:schemeClr val="lt1"/>
+          </a:lnRef>
+          <a:fillRef idx="1">
+            <a:schemeClr val="accent6"/>
+          </a:fillRef>
+          <a:effectRef idx="1">
+            <a:schemeClr val="accent6"/>
+          </a:effectRef>
+          <a:fontRef idx="minor">
+            <a:schemeClr val="lt1"/>
+          </a:fontRef>
+        </p:style>
+        <p:txBody>
+          <a:bodyPr rtlCol="0" anchor="ctr"/>
+          <a:lstStyle/>
+          <a:p>
+            <a:pPr algn="ctr"/>
+            <a:endParaRPr lang="zh-CN" altLang="en-US"/>
+          </a:p>
+        </p:txBody>
+      </p:sp>
+      <p:sp>
+        <p:nvSpPr>
+          <p:cNvPr id="10" name="Group selectMeNow1 Seq_3"/>
+          <p:cNvSpPr/>
+          <p:nvPr/>
+        </p:nvSpPr>
+        <p:spPr>
+          <a:xfrm>
+            <a:off x="5867400" y="2667000"/>
+            <a:ext cx="1828800" cy="1371600"/>
+          </a:xfrm>
+          <a:prstGeom prst="roundRect">
+            <a:avLst/>
+          </a:prstGeom>
+          <a:ln/>
+        </p:spPr>
+        <p:style>
+          <a:lnRef idx="3">
+            <a:schemeClr val="lt1"/>
+          </a:lnRef>
+          <a:fillRef idx="1">
+            <a:schemeClr val="accent3"/>
+          </a:fillRef>
+          <a:effectRef idx="1">
+            <a:schemeClr val="accent3"/>
+          </a:effectRef>
+          <a:fontRef idx="minor">
+            <a:schemeClr val="lt1"/>
+          </a:fontRef>
+        </p:style>
+        <p:txBody>
+          <a:bodyPr rtlCol="0" anchor="ctr"/>
+          <a:lstStyle/>
+          <a:p>
+            <a:pPr algn="ctr"/>
+            <a:endParaRPr lang="zh-CN" altLang="en-US"/>
+          </a:p>
+        </p:txBody>
+      </p:sp>
+      <p:sp>
+        <p:nvSpPr>
+          <p:cNvPr id="11" name="Group selectMeNow1 Seq_4"/>
+          <p:cNvSpPr/>
+          <p:nvPr/>
+        </p:nvSpPr>
+        <p:spPr>
+          <a:xfrm>
+            <a:off x="5867400" y="4191000"/>
+            <a:ext cx="1828800" cy="1371600"/>
+          </a:xfrm>
+          <a:prstGeom prst="roundRect">
+            <a:avLst/>
+          </a:prstGeom>
+          <a:solidFill>
+            <a:schemeClr val="accent6">
+              <a:alpha val="50000"/>
+            </a:schemeClr>
+          </a:solidFill>
+          <a:ln>
+            <a:noFill/>
+          </a:ln>
+        </p:spPr>
+        <p:style>
+          <a:lnRef idx="0">
+            <a:scrgbClr r="0" g="0" b="0"/>
+          </a:lnRef>
+          <a:fillRef idx="0">
+            <a:scrgbClr r="0" g="0" b="0"/>
+          </a:fillRef>
+          <a:effectRef idx="0">
+            <a:scrgbClr r="0" g="0" b="0"/>
+          </a:effectRef>
+          <a:fontRef idx="minor">
+            <a:schemeClr val="lt1"/>
+          </a:fontRef>
+        </p:style>
+        <p:txBody>
+          <a:bodyPr rtlCol="0" anchor="ctr"/>
+          <a:lstStyle/>
+          <a:p>
+            <a:pPr algn="ctr"/>
+            <a:endParaRPr lang="zh-CN" altLang="en-US"/>
+          </a:p>
+        </p:txBody>
+      </p:sp>
+      <p:sp>
+        <p:nvSpPr>
+          <p:cNvPr id="7" name="copyMe"/>
+          <p:cNvSpPr/>
+          <p:nvPr/>
+        </p:nvSpPr>
+        <p:spPr>
+          <a:xfrm>
+            <a:off x="2438400" y="1206811"/>
+            <a:ext cx="4191000" cy="4191000"/>
+          </a:xfrm>
+          <a:prstGeom prst="heptagon">
+            <a:avLst/>
+          </a:prstGeom>
+        </p:spPr>
+        <p:style>
+          <a:lnRef idx="2">
+            <a:schemeClr val="accent1">
+              <a:shade val="50000"/>
+            </a:schemeClr>
+          </a:lnRef>
+          <a:fillRef idx="1">
+            <a:schemeClr val="accent1"/>
+          </a:fillRef>
+          <a:effectRef idx="0">
+            <a:schemeClr val="accent1"/>
+          </a:effectRef>
+          <a:fontRef idx="minor">
+            <a:schemeClr val="lt1"/>
+          </a:fontRef>
+        </p:style>
+        <p:txBody>
+          <a:bodyPr rtlCol="0" anchor="ctr"/>
+          <a:lstStyle/>
+          <a:p>
+            <a:pPr algn="ctr"/>
+            <a:endParaRPr lang="en-SG"/>
+          </a:p>
+        </p:txBody>
+      </p:sp>
+      <p:sp>
+        <p:nvSpPr>
+          <p:cNvPr id="2" name="Expected"/>
+          <p:cNvSpPr txBox="1"/>
+          <p:nvPr/>
+        </p:nvSpPr>
+        <p:spPr>
+          <a:xfrm>
+            <a:off x="3769556" y="6095135"/>
+            <a:ext cx="1528688" cy="369332"/>
+          </a:xfrm>
+          <a:prstGeom prst="rect">
+            <a:avLst/>
+          </a:prstGeom>
+          <a:noFill/>
+        </p:spPr>
+        <p:txBody>
+          <a:bodyPr wrap="none" rtlCol="0">
+            <a:spAutoFit/>
+          </a:bodyPr>
+          <a:lstStyle/>
+          <a:p>
+            <a:r>
+              <a:rPr lang="en-SG" dirty="0" smtClean="0"/>
+              <a:t>Expected slide</a:t>
+            </a:r>
+            <a:endParaRPr lang="en-SG" dirty="0"/>
+          </a:p>
+        </p:txBody>
+      </p:sp>
+      <p:sp>
+        <p:nvSpPr>
+          <p:cNvPr id="8" name="compareMe"/>
+          <p:cNvSpPr/>
+          <p:nvPr/>
+        </p:nvSpPr>
+        <p:spPr>
+          <a:xfrm>
+            <a:off x="4927600" y="509488"/>
+            <a:ext cx="4191000" cy="4191000"/>
+          </a:xfrm>
+          <a:prstGeom prst="heptagon">
+            <a:avLst/>
+          </a:prstGeom>
+        </p:spPr>
+        <p:style>
+          <a:lnRef idx="2">
+            <a:schemeClr val="accent1">
+              <a:shade val="50000"/>
+            </a:schemeClr>
+          </a:lnRef>
+          <a:fillRef idx="1">
+            <a:schemeClr val="accent1"/>
+          </a:fillRef>
+          <a:effectRef idx="0">
+            <a:schemeClr val="accent1"/>
+          </a:effectRef>
+          <a:fontRef idx="minor">
+            <a:schemeClr val="lt1"/>
+          </a:fontRef>
+        </p:style>
+        <p:txBody>
+          <a:bodyPr rtlCol="0" anchor="ctr"/>
+          <a:lstStyle/>
+          <a:p>
+            <a:pPr algn="ctr"/>
+            <a:endParaRPr lang="en-SG"/>
+          </a:p>
+        </p:txBody>
+      </p:sp>
+    </p:spTree>
+    <p:extLst>
+      <p:ext uri="{BB962C8B-B14F-4D97-AF65-F5344CB8AC3E}">
+        <p14:creationId xmlns:p14="http://schemas.microsoft.com/office/powerpoint/2010/main" val="3922223169"/>
+      </p:ext>
+    </p:extLst>
+  </p:cSld>
+  <p:clrMapOvr>
+    <a:masterClrMapping/>
+  </p:clrMapOvr>
+  <p:timing>
+    <p:tnLst>
+      <p:par>
+        <p:cTn id="1" dur="indefinite" restart="never" nodeType="tmRoot">
+          <p:childTnLst>
+            <p:seq concurrent="1" nextAc="seek">
+              <p:cTn id="2" dur="indefinite" nodeType="mainSeq">
+                <p:childTnLst>
+                  <p:par>
+                    <p:cTn id="3" fill="hold">
+                      <p:stCondLst>
+                        <p:cond delay="indefinite"/>
+                      </p:stCondLst>
+                      <p:childTnLst>
+                        <p:par>
+                          <p:cTn id="4" fill="hold">
+                            <p:stCondLst>
+                              <p:cond delay="0"/>
+                            </p:stCondLst>
+                            <p:childTnLst>
+                              <p:par>
+                                <p:cTn id="5" presetID="2" presetClass="entr" presetSubtype="4" fill="hold" grpId="0" nodeType="clickEffect">
+                                  <p:stCondLst>
+                                    <p:cond delay="0"/>
+                                  </p:stCondLst>
+                                  <p:childTnLst>
+                                    <p:set>
+                                      <p:cBhvr>
+                                        <p:cTn id="6" dur="1" fill="hold">
+                                          <p:stCondLst>
+                                            <p:cond delay="0"/>
+                                          </p:stCondLst>
+                                        </p:cTn>
+                                        <p:tgtEl>
+                                          <p:spTgt spid="6"/>
+                                        </p:tgtEl>
+                                        <p:attrNameLst>
+                                          <p:attrName>style.visibility</p:attrName>
+                                        </p:attrNameLst>
+                                      </p:cBhvr>
+                                      <p:to>
+                                        <p:strVal val="visible"/>
+                                      </p:to>
+                                    </p:set>
+                                    <p:anim calcmode="lin" valueType="num">
+                                      <p:cBhvr additive="base">
+                                        <p:cTn id="7" dur="500" fill="hold"/>
+                                        <p:tgtEl>
+                                          <p:spTgt spid="6"/>
+                                        </p:tgtEl>
+                                        <p:attrNameLst>
+                                          <p:attrName>ppt_x</p:attrName>
+                                        </p:attrNameLst>
+                                      </p:cBhvr>
+                                      <p:tavLst>
+                                        <p:tav tm="0">
+                                          <p:val>
+                                            <p:strVal val="#ppt_x"/>
+                                          </p:val>
+                                        </p:tav>
+                                        <p:tav tm="100000">
+                                          <p:val>
+                                            <p:strVal val="#ppt_x"/>
+                                          </p:val>
+                                        </p:tav>
+                                      </p:tavLst>
+                                    </p:anim>
+                                    <p:anim calcmode="lin" valueType="num">
+                                      <p:cBhvr additive="base">
+                                        <p:cTn id="8" dur="500" fill="hold"/>
+                                        <p:tgtEl>
+                                          <p:spTgt spid="6"/>
+                                        </p:tgtEl>
+                                        <p:attrNameLst>
+                                          <p:attrName>ppt_y</p:attrName>
+                                        </p:attrNameLst>
+                                      </p:cBhvr>
+                                      <p:tavLst>
+                                        <p:tav tm="0">
+                                          <p:val>
+                                            <p:strVal val="1+#ppt_h/2"/>
+                                          </p:val>
+                                        </p:tav>
+                                        <p:tav tm="100000">
+                                          <p:val>
+                                            <p:strVal val="#ppt_y"/>
+                                          </p:val>
+                                        </p:tav>
+                                      </p:tavLst>
+                                    </p:anim>
+                                  </p:childTnLst>
+                                </p:cTn>
+                              </p:par>
+                            </p:childTnLst>
+                          </p:cTn>
+                        </p:par>
+                      </p:childTnLst>
+                    </p:cTn>
+                  </p:par>
+                  <p:par>
+                    <p:cTn id="9" fill="hold">
+                      <p:stCondLst>
+                        <p:cond delay="indefinite"/>
+                      </p:stCondLst>
+                      <p:childTnLst>
+                        <p:par>
+                          <p:cTn id="10" fill="hold">
+                            <p:stCondLst>
+                              <p:cond delay="0"/>
+                            </p:stCondLst>
+                            <p:childTnLst>
+                              <p:par>
+                                <p:cTn id="11" presetID="1" presetClass="entr" presetSubtype="0" fill="hold" grpId="0" nodeType="clickEffect">
+                                  <p:stCondLst>
+                                    <p:cond delay="0"/>
+                                  </p:stCondLst>
+                                  <p:childTnLst>
+                                    <p:set>
+                                      <p:cBhvr>
+                                        <p:cTn id="12" dur="1" fill="hold">
+                                          <p:stCondLst>
+                                            <p:cond delay="0"/>
+                                          </p:stCondLst>
+                                        </p:cTn>
+                                        <p:tgtEl>
+                                          <p:spTgt spid="9"/>
+                                        </p:tgtEl>
+                                        <p:attrNameLst>
+                                          <p:attrName>style.visibility</p:attrName>
+                                        </p:attrNameLst>
+                                      </p:cBhvr>
+                                      <p:to>
+                                        <p:strVal val="visible"/>
+                                      </p:to>
+                                    </p:set>
+                                  </p:childTnLst>
+                                </p:cTn>
+                              </p:par>
+                            </p:childTnLst>
+                          </p:cTn>
+                        </p:par>
+                      </p:childTnLst>
+                    </p:cTn>
+                  </p:par>
+                  <p:par>
+                    <p:cTn id="13" fill="hold">
+                      <p:stCondLst>
+                        <p:cond delay="indefinite"/>
+                      </p:stCondLst>
+                      <p:childTnLst>
+                        <p:par>
+                          <p:cTn id="14" fill="hold">
+                            <p:stCondLst>
+                              <p:cond delay="0"/>
+                            </p:stCondLst>
+                            <p:childTnLst>
+                              <p:par>
+                                <p:cTn id="15" presetID="10" presetClass="entr" presetSubtype="0" fill="hold" grpId="0" nodeType="clickEffect">
+                                  <p:stCondLst>
+                                    <p:cond delay="0"/>
+                                  </p:stCondLst>
+                                  <p:childTnLst>
+                                    <p:set>
+                                      <p:cBhvr>
+                                        <p:cTn id="16" dur="1" fill="hold">
+                                          <p:stCondLst>
+                                            <p:cond delay="0"/>
+                                          </p:stCondLst>
+                                        </p:cTn>
+                                        <p:tgtEl>
+                                          <p:spTgt spid="10"/>
+                                        </p:tgtEl>
+                                        <p:attrNameLst>
+                                          <p:attrName>style.visibility</p:attrName>
+                                        </p:attrNameLst>
+                                      </p:cBhvr>
+                                      <p:to>
+                                        <p:strVal val="visible"/>
+                                      </p:to>
+                                    </p:set>
+                                    <p:animEffect transition="in" filter="fade">
+                                      <p:cBhvr>
+                                        <p:cTn id="17" dur="500"/>
+                                        <p:tgtEl>
+                                          <p:spTgt spid="10"/>
+                                        </p:tgtEl>
+                                      </p:cBhvr>
+                                    </p:animEffect>
+                                  </p:childTnLst>
+                                </p:cTn>
+                              </p:par>
+                            </p:childTnLst>
+                          </p:cTn>
+                        </p:par>
+                      </p:childTnLst>
+                    </p:cTn>
+                  </p:par>
+                  <p:par>
+                    <p:cTn id="18" fill="hold">
+                      <p:stCondLst>
+                        <p:cond delay="indefinite"/>
+                      </p:stCondLst>
+                      <p:childTnLst>
+                        <p:par>
+                          <p:cTn id="19" fill="hold">
+                            <p:stCondLst>
+                              <p:cond delay="0"/>
+                            </p:stCondLst>
+                            <p:childTnLst>
+                              <p:par>
+                                <p:cTn id="20" presetID="16" presetClass="entr" presetSubtype="21" fill="hold" grpId="0" nodeType="clickEffect">
+                                  <p:stCondLst>
+                                    <p:cond delay="0"/>
+                                  </p:stCondLst>
+                                  <p:childTnLst>
+                                    <p:set>
+                                      <p:cBhvr>
+                                        <p:cTn id="21" dur="1" fill="hold">
+                                          <p:stCondLst>
+                                            <p:cond delay="0"/>
+                                          </p:stCondLst>
+                                        </p:cTn>
+                                        <p:tgtEl>
+                                          <p:spTgt spid="11"/>
+                                        </p:tgtEl>
+                                        <p:attrNameLst>
+                                          <p:attrName>style.visibility</p:attrName>
+                                        </p:attrNameLst>
+                                      </p:cBhvr>
+                                      <p:to>
+                                        <p:strVal val="visible"/>
+                                      </p:to>
+                                    </p:set>
+                                    <p:animEffect transition="in" filter="barn(inVertical)">
+                                      <p:cBhvr>
+                                        <p:cTn id="22" dur="500"/>
+                                        <p:tgtEl>
+                                          <p:spTgt spid="11"/>
+                                        </p:tgtEl>
+                                      </p:cBhvr>
+                                    </p:animEffect>
+                                  </p:childTnLst>
+                                </p:cTn>
+                              </p:par>
+                            </p:childTnLst>
+                          </p:cTn>
+                        </p:par>
+                      </p:childTnLst>
+                    </p:cTn>
+                  </p:par>
+                </p:childTnLst>
+              </p:cTn>
+              <p:prevCondLst>
+                <p:cond evt="onPrev" delay="0">
+                  <p:tgtEl>
+                    <p:sldTgt/>
+                  </p:tgtEl>
+                </p:cond>
+              </p:prevCondLst>
+              <p:nextCondLst>
+                <p:cond evt="onNext" delay="0">
+                  <p:tgtEl>
+                    <p:sldTgt/>
+                  </p:tgtEl>
+                </p:cond>
+              </p:nextCondLst>
+            </p:seq>
+          </p:childTnLst>
+        </p:cTn>
+      </p:par>
+    </p:tnLst>
+    <p:bldLst>
+      <p:bldP spid="6" grpId="0" animBg="1"/>
+      <p:bldP spid="9" grpId="0" animBg="1"/>
+      <p:bldP spid="10" grpId="0" animBg="1"/>
+      <p:bldP spid="11" grpId="0" animBg="1"/>
+    </p:bldLst>
+  </p:timing>
+</p:sld>
+</file>
+
+<file path=ppt/slides/slide16.xml><?xml version="1.0" encoding="utf-8"?>
+<p:sld xmlns:a="http://schemas.openxmlformats.org/drawingml/2006/main" xmlns:r="http://schemas.openxmlformats.org/officeDocument/2006/relationships" xmlns:p="http://schemas.openxmlformats.org/presentationml/2006/main" show="0">
+  <p:cSld name="PPAck201403240026082737">
+    <p:spTree>
+      <p:nvGrpSpPr>
+        <p:cNvPr id="1" name=""/>
+        <p:cNvGrpSpPr/>
+        <p:nvPr/>
+      </p:nvGrpSpPr>
+      <p:grpSpPr>
+        <a:xfrm>
+          <a:off x="0" y="0"/>
+          <a:ext cx="0" cy="0"/>
+          <a:chOff x="0" y="0"/>
+          <a:chExt cx="0" cy="0"/>
+        </a:xfrm>
+      </p:grpSpPr>
+      <p:sp>
+        <p:nvSpPr>
+          <p:cNvPr id="2" name="标题 1"/>
+          <p:cNvSpPr>
+            <a:spLocks noGrp="1"/>
+          </p:cNvSpPr>
+          <p:nvPr>
+            <p:ph type="title"/>
+          </p:nvPr>
+        </p:nvSpPr>
+        <p:spPr/>
+        <p:txBody>
+          <a:bodyPr/>
+          <a:lstStyle/>
+          <a:p>
+            <a:endParaRPr lang="en-SG"/>
+          </a:p>
+        </p:txBody>
+      </p:sp>
+      <p:pic>
+        <p:nvPicPr>
+          <p:cNvPr id="4" name="内容占位符 3"/>
+          <p:cNvPicPr>
+            <a:picLocks noGrp="1"/>
+          </p:cNvPicPr>
+          <p:nvPr>
+            <p:ph idx="1"/>
+          </p:nvPr>
+        </p:nvPicPr>
+        <p:blipFill>
+          <a:blip r:embed="rId2">
+            <a:extLst>
+              <a:ext uri="{28A0092B-C50C-407E-A947-70E740481C1C}">
+                <a14:useLocalDpi xmlns:a14="http://schemas.microsoft.com/office/drawing/2010/main" val="0"/>
+              </a:ext>
+            </a:extLst>
+          </a:blip>
+          <a:stretch>
+            <a:fillRect/>
+          </a:stretch>
+        </p:blipFill>
+        <p:spPr>
+          <a:xfrm>
+            <a:off x="1074665" y="1600200"/>
+            <a:ext cx="6994670" cy="4525963"/>
+          </a:xfrm>
+        </p:spPr>
+      </p:pic>
+    </p:spTree>
+    <p:extLst>
+      <p:ext uri="{BB962C8B-B14F-4D97-AF65-F5344CB8AC3E}">
+        <p14:creationId xmlns:p14="http://schemas.microsoft.com/office/powerpoint/2010/main" val="2306293579"/>
+      </p:ext>
+    </p:extLst>
+  </p:cSld>
+  <p:clrMapOvr>
+    <a:masterClrMapping/>
+  </p:clrMapOvr>
+  <mc:AlternateContent xmlns:mc="http://schemas.openxmlformats.org/markup-compatibility/2006" xmlns:p14="http://schemas.microsoft.com/office/powerpoint/2010/main">
+    <mc:Choice Requires="p14">
+      <p:transition spd="slow" p14:dur="2000"/>
+    </mc:Choice>
+    <mc:Fallback xmlns="">
+      <p:transition spd="slow"/>
+    </mc:Fallback>
+  </mc:AlternateContent>
+  <p:timing>
+    <p:tnLst>
+      <p:par>
+        <p:cTn id="1" dur="indefinite" restart="never" nodeType="tmRoot"/>
+      </p:par>
+    </p:tnLst>
+  </p:timing>
+</p:sld>
+</file>
+
 <file path=ppt/slides/slide2.xml><?xml version="1.0" encoding="utf-8"?>
 <p:sld xmlns:a="http://schemas.openxmlformats.org/drawingml/2006/main" xmlns:r="http://schemas.openxmlformats.org/officeDocument/2006/relationships" xmlns:p="http://schemas.openxmlformats.org/presentationml/2006/main">
   <p:cSld>
@@ -10564,7 +13684,53 @@
       </p:grpSpPr>
       <p:sp>
         <p:nvSpPr>
-          <p:cNvPr id="3" name="selectMe1"/>
+          <p:cNvPr id="5" name="selectMe1"/>
+          <p:cNvSpPr/>
+          <p:nvPr/>
+        </p:nvSpPr>
+        <p:spPr>
+          <a:xfrm>
+            <a:off x="5867400" y="1219200"/>
+            <a:ext cx="1828800" cy="1295400"/>
+          </a:xfrm>
+          <a:prstGeom prst="roundRect">
+            <a:avLst/>
+          </a:prstGeom>
+          <a:solidFill>
+            <a:srgbClr val="EB7662"/>
+          </a:solidFill>
+          <a:ln>
+            <a:noFill/>
+          </a:ln>
+        </p:spPr>
+        <p:style>
+          <a:lnRef idx="2">
+            <a:schemeClr val="accent1">
+              <a:shade val="50000"/>
+            </a:schemeClr>
+          </a:lnRef>
+          <a:fillRef idx="1">
+            <a:schemeClr val="accent1"/>
+          </a:fillRef>
+          <a:effectRef idx="0">
+            <a:schemeClr val="accent1"/>
+          </a:effectRef>
+          <a:fontRef idx="minor">
+            <a:schemeClr val="lt1"/>
+          </a:fontRef>
+        </p:style>
+        <p:txBody>
+          <a:bodyPr rtlCol="0" anchor="ctr"/>
+          <a:lstStyle/>
+          <a:p>
+            <a:pPr algn="ctr"/>
+            <a:endParaRPr lang="zh-CN" altLang="en-US"/>
+          </a:p>
+        </p:txBody>
+      </p:sp>
+      <p:sp>
+        <p:nvSpPr>
+          <p:cNvPr id="3" name="selectMe2"/>
           <p:cNvSpPr/>
           <p:nvPr/>
         </p:nvSpPr>
@@ -10623,52 +13789,6 @@
               <a:latin typeface="Times New Roman" panose="02020603050405020304" pitchFamily="18" charset="0"/>
               <a:cs typeface="Times New Roman" panose="02020603050405020304" pitchFamily="18" charset="0"/>
             </a:endParaRPr>
-          </a:p>
-        </p:txBody>
-      </p:sp>
-      <p:sp>
-        <p:nvSpPr>
-          <p:cNvPr id="5" name="selectMe2"/>
-          <p:cNvSpPr/>
-          <p:nvPr/>
-        </p:nvSpPr>
-        <p:spPr>
-          <a:xfrm>
-            <a:off x="5867400" y="1219200"/>
-            <a:ext cx="1828800" cy="1295400"/>
-          </a:xfrm>
-          <a:prstGeom prst="roundRect">
-            <a:avLst/>
-          </a:prstGeom>
-          <a:solidFill>
-            <a:srgbClr val="EB7662"/>
-          </a:solidFill>
-          <a:ln>
-            <a:noFill/>
-          </a:ln>
-        </p:spPr>
-        <p:style>
-          <a:lnRef idx="2">
-            <a:schemeClr val="accent1">
-              <a:shade val="50000"/>
-            </a:schemeClr>
-          </a:lnRef>
-          <a:fillRef idx="1">
-            <a:schemeClr val="accent1"/>
-          </a:fillRef>
-          <a:effectRef idx="0">
-            <a:schemeClr val="accent1"/>
-          </a:effectRef>
-          <a:fontRef idx="minor">
-            <a:schemeClr val="lt1"/>
-          </a:fontRef>
-        </p:style>
-        <p:txBody>
-          <a:bodyPr rtlCol="0" anchor="ctr"/>
-          <a:lstStyle/>
-          <a:p>
-            <a:pPr algn="ctr"/>
-            <a:endParaRPr lang="zh-CN" altLang="en-US"/>
           </a:p>
         </p:txBody>
       </p:sp>
@@ -11046,8 +14166,8 @@
       </p:par>
     </p:tnLst>
     <p:bldLst>
+      <p:bldP spid="5" grpId="0" animBg="1"/>
       <p:bldP spid="3" grpId="0" animBg="1"/>
-      <p:bldP spid="5" grpId="0" animBg="1"/>
       <p:bldP spid="7" grpId="0" animBg="1"/>
       <p:bldP spid="8" grpId="0" animBg="1"/>
     </p:bldLst>
@@ -12692,8 +15812,8 @@
 </file>
 
 <file path=ppt/slides/slide9.xml><?xml version="1.0" encoding="utf-8"?>
-<p:sld xmlns:a="http://schemas.openxmlformats.org/drawingml/2006/main" xmlns:r="http://schemas.openxmlformats.org/officeDocument/2006/relationships" xmlns:p="http://schemas.openxmlformats.org/presentationml/2006/main" show="0">
-  <p:cSld name="PPAck201403240026082737">
+<p:sld xmlns:a="http://schemas.openxmlformats.org/drawingml/2006/main" xmlns:r="http://schemas.openxmlformats.org/officeDocument/2006/relationships" xmlns:p="http://schemas.openxmlformats.org/presentationml/2006/main">
+  <p:cSld>
     <p:spTree>
       <p:nvGrpSpPr>
         <p:cNvPr id="1" name=""/>
@@ -12710,7 +15830,7 @@
       </p:grpSpPr>
       <p:sp>
         <p:nvSpPr>
-          <p:cNvPr id="2" name="标题 1"/>
+          <p:cNvPr id="2" name="Title 1"/>
           <p:cNvSpPr>
             <a:spLocks noGrp="1"/>
           </p:cNvSpPr>
@@ -12718,62 +15838,169 @@
             <p:ph type="title"/>
           </p:nvPr>
         </p:nvSpPr>
-        <p:spPr/>
-        <p:txBody>
-          <a:bodyPr/>
-          <a:lstStyle/>
-          <a:p>
-            <a:endParaRPr lang="en-SG"/>
-          </a:p>
-        </p:txBody>
-      </p:sp>
-      <p:pic>
-        <p:nvPicPr>
-          <p:cNvPr id="4" name="内容占位符 3"/>
-          <p:cNvPicPr>
-            <a:picLocks noGrp="1"/>
-          </p:cNvPicPr>
-          <p:nvPr>
-            <p:ph idx="1"/>
-          </p:nvPr>
-        </p:nvPicPr>
-        <p:blipFill>
-          <a:blip r:embed="rId2">
-            <a:extLst>
-              <a:ext uri="{28A0092B-C50C-407E-A947-70E740481C1C}">
-                <a14:useLocalDpi xmlns:a14="http://schemas.microsoft.com/office/drawing/2010/main" val="0"/>
-              </a:ext>
-            </a:extLst>
-          </a:blip>
-          <a:stretch>
-            <a:fillRect/>
-          </a:stretch>
-        </p:blipFill>
         <p:spPr>
           <a:xfrm>
-            <a:off x="1074665" y="1600200"/>
-            <a:ext cx="6994670" cy="4525963"/>
+            <a:off x="381000" y="609600"/>
+            <a:ext cx="8229600" cy="1143000"/>
           </a:xfrm>
         </p:spPr>
-      </p:pic>
+        <p:txBody>
+          <a:bodyPr>
+            <a:noAutofit/>
+          </a:bodyPr>
+          <a:lstStyle/>
+          <a:p>
+            <a:pPr algn="l"/>
+            <a:r>
+              <a:rPr lang="en-US" sz="7200" dirty="0" err="1" smtClean="0">
+                <a:solidFill>
+                  <a:schemeClr val="bg1"/>
+                </a:solidFill>
+              </a:rPr>
+              <a:t>IsClipboardRestored</a:t>
+            </a:r>
+            <a:endParaRPr lang="en-SG" sz="7200" dirty="0">
+              <a:solidFill>
+                <a:schemeClr val="bg1"/>
+              </a:solidFill>
+            </a:endParaRPr>
+          </a:p>
+        </p:txBody>
+      </p:sp>
+      <p:sp>
+        <p:nvSpPr>
+          <p:cNvPr id="3" name="TextBox 2"/>
+          <p:cNvSpPr txBox="1"/>
+          <p:nvPr/>
+        </p:nvSpPr>
+        <p:spPr>
+          <a:xfrm>
+            <a:off x="381000" y="2057400"/>
+            <a:ext cx="8229600" cy="3539430"/>
+          </a:xfrm>
+          <a:prstGeom prst="rect">
+            <a:avLst/>
+          </a:prstGeom>
+          <a:noFill/>
+        </p:spPr>
+        <p:txBody>
+          <a:bodyPr wrap="square" rtlCol="0">
+            <a:spAutoFit/>
+          </a:bodyPr>
+          <a:lstStyle/>
+          <a:p>
+            <a:r>
+              <a:rPr lang="en-US" altLang="zh-CN" sz="2800" dirty="0" smtClean="0">
+                <a:solidFill>
+                  <a:schemeClr val="bg1"/>
+                </a:solidFill>
+              </a:rPr>
+              <a:t>Add those shapes in slide 3 to Shapes Lab;</a:t>
+            </a:r>
+          </a:p>
+          <a:p>
+            <a:r>
+              <a:rPr lang="en-US" altLang="zh-CN" sz="2800" dirty="0" smtClean="0">
+                <a:solidFill>
+                  <a:schemeClr val="bg1"/>
+                </a:solidFill>
+              </a:rPr>
+              <a:t>Add added shapes in Shapes Lab to slide 4;</a:t>
+            </a:r>
+          </a:p>
+          <a:p>
+            <a:r>
+              <a:rPr lang="en-US" altLang="zh-CN" sz="2800" dirty="0" smtClean="0">
+                <a:solidFill>
+                  <a:schemeClr val="bg1"/>
+                </a:solidFill>
+              </a:rPr>
+              <a:t>Compare slide 4 and expected slide 5</a:t>
+            </a:r>
+          </a:p>
+          <a:p>
+            <a:endParaRPr lang="en-US" altLang="zh-CN" sz="2800" dirty="0">
+              <a:solidFill>
+                <a:schemeClr val="bg1"/>
+              </a:solidFill>
+            </a:endParaRPr>
+          </a:p>
+          <a:p>
+            <a:r>
+              <a:rPr lang="en-US" altLang="zh-CN" sz="2800" dirty="0" smtClean="0">
+                <a:solidFill>
+                  <a:schemeClr val="bg1"/>
+                </a:solidFill>
+              </a:rPr>
+              <a:t>Repeat for testing </a:t>
+            </a:r>
+            <a:r>
+              <a:rPr lang="en-US" altLang="zh-CN" sz="2800" dirty="0">
+                <a:solidFill>
+                  <a:schemeClr val="bg1"/>
+                </a:solidFill>
+              </a:rPr>
+              <a:t>A</a:t>
+            </a:r>
+            <a:r>
+              <a:rPr lang="en-US" altLang="zh-CN" sz="2800" dirty="0" smtClean="0">
+                <a:solidFill>
+                  <a:schemeClr val="bg1"/>
+                </a:solidFill>
+              </a:rPr>
+              <a:t>dd </a:t>
+            </a:r>
+            <a:r>
+              <a:rPr lang="en-US" altLang="zh-CN" sz="2800" dirty="0">
+                <a:solidFill>
+                  <a:schemeClr val="bg1"/>
+                </a:solidFill>
+              </a:rPr>
+              <a:t>S</a:t>
+            </a:r>
+            <a:r>
+              <a:rPr lang="en-US" altLang="zh-CN" sz="2800" dirty="0" smtClean="0">
+                <a:solidFill>
+                  <a:schemeClr val="bg1"/>
+                </a:solidFill>
+              </a:rPr>
+              <a:t>hapes button on Shapes Lab pane from slides 6 to 8</a:t>
+            </a:r>
+          </a:p>
+          <a:p>
+            <a:endParaRPr lang="en-US" altLang="zh-CN" sz="2800" dirty="0">
+              <a:solidFill>
+                <a:schemeClr val="bg1"/>
+              </a:solidFill>
+            </a:endParaRPr>
+          </a:p>
+          <a:p>
+            <a:r>
+              <a:rPr lang="en-US" altLang="zh-CN" sz="2800" dirty="0" smtClean="0">
+                <a:solidFill>
+                  <a:schemeClr val="bg1"/>
+                </a:solidFill>
+              </a:rPr>
+              <a:t>Animations are also expected to be transferred</a:t>
+            </a:r>
+            <a:endParaRPr lang="zh-CN" altLang="en-US" sz="2800" dirty="0">
+              <a:solidFill>
+                <a:schemeClr val="bg1"/>
+              </a:solidFill>
+            </a:endParaRPr>
+          </a:p>
+        </p:txBody>
+      </p:sp>
     </p:spTree>
     <p:extLst>
       <p:ext uri="{BB962C8B-B14F-4D97-AF65-F5344CB8AC3E}">
-        <p14:creationId xmlns:p14="http://schemas.microsoft.com/office/powerpoint/2010/main" val="2306293579"/>
+        <p14:creationId xmlns:p14="http://schemas.microsoft.com/office/powerpoint/2010/main" val="3646993363"/>
       </p:ext>
     </p:extLst>
   </p:cSld>
   <p:clrMapOvr>
     <a:masterClrMapping/>
   </p:clrMapOvr>
-  <mc:AlternateContent xmlns:mc="http://schemas.openxmlformats.org/markup-compatibility/2006" xmlns:p14="http://schemas.microsoft.com/office/powerpoint/2010/main">
-    <mc:Choice Requires="p14">
-      <p:transition spd="slow" p14:dur="2000"/>
-    </mc:Choice>
-    <mc:Fallback xmlns="">
-      <p:transition spd="slow"/>
-    </mc:Fallback>
-  </mc:AlternateContent>
   <p:timing>
     <p:tnLst>
       <p:par>

</xml_diff>

<commit_message>
Fix typo in ShapesLabTest. (+5 squashed commit)
Squashed commit:

[a472f391] Extract magic number for messageBox.

[cb18e633] Add description in ShapesLab FT slides.

[eca120f7] Rename constant in ShapesLab FT for consistency.

[0b52851f] Add ShapesLab FT for AddShapeFromSelection error

- Currently there is no tests for error when adding placeholders
- Tests should be added to check this error occurs correctly
- New implementation includes:
ExpectMessageBoxWillNotPopUp: MessageBoxUtil.cs
TestSavePlaceholderToShapesLabWithAddShapesButton

[2e14b0cb] Fix contradicting fail check:ConvertToPicture

- Current has contradicting checks in CustomShapePane
and ConvertToPicture
- This always results in a fail
- Current fix negated the errorneous predicate
</commit_message>
<xml_diff>
--- a/doc/test/ShapesLab/ShapesLab.pptx
+++ b/doc/test/ShapesLab/ShapesLab.pptx
@@ -7,7 +7,7 @@
     <p:sldMasterId id="2147483672" r:id="rId3"/>
   </p:sldMasterIdLst>
   <p:notesMasterIdLst>
-    <p:notesMasterId r:id="rId20"/>
+    <p:notesMasterId r:id="rId21"/>
   </p:notesMasterIdLst>
   <p:sldIdLst>
     <p:sldId id="287" r:id="rId4"/>
@@ -18,14 +18,15 @@
     <p:sldId id="300" r:id="rId9"/>
     <p:sldId id="301" r:id="rId10"/>
     <p:sldId id="302" r:id="rId11"/>
-    <p:sldId id="303" r:id="rId12"/>
-    <p:sldId id="304" r:id="rId13"/>
-    <p:sldId id="305" r:id="rId14"/>
-    <p:sldId id="306" r:id="rId15"/>
-    <p:sldId id="307" r:id="rId16"/>
-    <p:sldId id="308" r:id="rId17"/>
-    <p:sldId id="309" r:id="rId18"/>
-    <p:sldId id="274" r:id="rId19"/>
+    <p:sldId id="311" r:id="rId12"/>
+    <p:sldId id="303" r:id="rId13"/>
+    <p:sldId id="304" r:id="rId14"/>
+    <p:sldId id="305" r:id="rId15"/>
+    <p:sldId id="306" r:id="rId16"/>
+    <p:sldId id="307" r:id="rId17"/>
+    <p:sldId id="308" r:id="rId18"/>
+    <p:sldId id="309" r:id="rId19"/>
+    <p:sldId id="274" r:id="rId20"/>
   </p:sldIdLst>
   <p:sldSz cx="9144000" cy="6858000" type="screen4x3"/>
   <p:notesSz cx="6858000" cy="9144000"/>
@@ -141,6 +142,7 @@
             <p14:sldId id="300"/>
             <p14:sldId id="301"/>
             <p14:sldId id="302"/>
+            <p14:sldId id="311"/>
             <p14:sldId id="303"/>
             <p14:sldId id="304"/>
             <p14:sldId id="305"/>
@@ -253,7 +255,7 @@
           <a:p>
             <a:fld id="{26004F41-C1A1-4B0D-9EEE-5E3F0E5BC108}" type="datetimeFigureOut">
               <a:rPr lang="en-SG" smtClean="0"/>
-              <a:t>10/4/2018</a:t>
+              <a:t>27/1/2019</a:t>
             </a:fld>
             <a:endParaRPr lang="en-SG"/>
           </a:p>
@@ -317,35 +319,35 @@
           <a:p>
             <a:pPr lvl="0"/>
             <a:r>
-              <a:rPr lang="zh-CN" altLang="en-US" smtClean="0"/>
+              <a:rPr lang="zh-CN" altLang="en-US"/>
               <a:t>单击此处编辑母版文本样式</a:t>
             </a:r>
           </a:p>
           <a:p>
             <a:pPr lvl="1"/>
             <a:r>
-              <a:rPr lang="zh-CN" altLang="en-US" smtClean="0"/>
+              <a:rPr lang="zh-CN" altLang="en-US"/>
               <a:t>第二级</a:t>
             </a:r>
           </a:p>
           <a:p>
             <a:pPr lvl="2"/>
             <a:r>
-              <a:rPr lang="zh-CN" altLang="en-US" smtClean="0"/>
+              <a:rPr lang="zh-CN" altLang="en-US"/>
               <a:t>第三级</a:t>
             </a:r>
           </a:p>
           <a:p>
             <a:pPr lvl="3"/>
             <a:r>
-              <a:rPr lang="zh-CN" altLang="en-US" smtClean="0"/>
+              <a:rPr lang="zh-CN" altLang="en-US"/>
               <a:t>第四级</a:t>
             </a:r>
           </a:p>
           <a:p>
             <a:pPr lvl="4"/>
             <a:r>
-              <a:rPr lang="zh-CN" altLang="en-US" smtClean="0"/>
+              <a:rPr lang="zh-CN" altLang="en-US"/>
               <a:t>第五级</a:t>
             </a:r>
             <a:endParaRPr lang="en-SG"/>
@@ -566,185 +568,184 @@
           <a:lstStyle/>
           <a:p>
             <a:r>
-              <a:rPr lang="en-US" dirty="0" smtClean="0"/>
+              <a:rPr lang="en-US" dirty="0"/>
               <a:t>Do the following from 3 environments:</a:t>
             </a:r>
           </a:p>
           <a:p>
             <a:r>
-              <a:rPr lang="en-US" dirty="0" smtClean="0"/>
+              <a:rPr lang="en-US" dirty="0"/>
               <a:t>1. Entirely new environment</a:t>
             </a:r>
           </a:p>
           <a:p>
             <a:r>
-              <a:rPr lang="en-US" dirty="0" smtClean="0"/>
+              <a:rPr lang="en-US" dirty="0"/>
               <a:t>2. Contains old shape info</a:t>
             </a:r>
           </a:p>
           <a:p>
-            <a:endParaRPr lang="en-US" dirty="0" smtClean="0"/>
-          </a:p>
-          <a:p>
-            <a:r>
-              <a:rPr lang="en-US" dirty="0" smtClean="0"/>
+            <a:endParaRPr lang="en-US" dirty="0"/>
+          </a:p>
+          <a:p>
+            <a:r>
+              <a:rPr lang="en-US" dirty="0"/>
               <a:t>1. Add Category</a:t>
             </a:r>
           </a:p>
           <a:p>
             <a:r>
-              <a:rPr lang="en-US" dirty="0" smtClean="0"/>
+              <a:rPr lang="en-US" dirty="0"/>
               <a:t>	1.1 Add category then add a new shape inside, check the default name, close and open to check</a:t>
             </a:r>
           </a:p>
           <a:p>
             <a:r>
-              <a:rPr lang="en-US" dirty="0" smtClean="0"/>
+              <a:rPr lang="en-US" dirty="0"/>
               <a:t>	1.2 Add category then add a new shape inside, check the default name, set the category as default, close and open to check</a:t>
             </a:r>
           </a:p>
           <a:p>
             <a:r>
-              <a:rPr lang="en-US" dirty="0" smtClean="0"/>
+              <a:rPr lang="en-US" dirty="0"/>
               <a:t>2. Rename Category</a:t>
             </a:r>
           </a:p>
           <a:p>
             <a:r>
-              <a:rPr lang="en-US" dirty="0" smtClean="0"/>
+              <a:rPr lang="en-US" dirty="0"/>
               <a:t>	2.1 Rename to a valid name</a:t>
             </a:r>
           </a:p>
           <a:p>
             <a:r>
-              <a:rPr lang="en-US" dirty="0" smtClean="0"/>
+              <a:rPr lang="en-US" dirty="0"/>
               <a:t>	2.2 Rename to an </a:t>
             </a:r>
             <a:r>
-              <a:rPr lang="en-US" dirty="0" err="1" smtClean="0"/>
+              <a:rPr lang="en-US" dirty="0" err="1"/>
               <a:t>invaid</a:t>
             </a:r>
             <a:r>
-              <a:rPr lang="en-US" dirty="0" smtClean="0"/>
+              <a:rPr lang="en-US" dirty="0"/>
               <a:t> name</a:t>
             </a:r>
           </a:p>
           <a:p>
             <a:r>
-              <a:rPr lang="en-US" dirty="0" smtClean="0"/>
+              <a:rPr lang="en-US" dirty="0"/>
               <a:t>3. Import Category</a:t>
             </a:r>
           </a:p>
           <a:p>
             <a:r>
-              <a:rPr lang="en-US" dirty="0" smtClean="0"/>
+              <a:rPr lang="en-US" dirty="0"/>
               <a:t>	3.1 Import single category with </a:t>
             </a:r>
             <a:r>
-              <a:rPr lang="en-US" dirty="0" err="1" smtClean="0"/>
+              <a:rPr lang="en-US" dirty="0" err="1"/>
               <a:t>namebox</a:t>
             </a:r>
             <a:r>
-              <a:rPr lang="en-US" dirty="0" smtClean="0"/>
+              <a:rPr lang="en-US" dirty="0"/>
               <a:t>, no conflict name</a:t>
             </a:r>
           </a:p>
           <a:p>
             <a:r>
-              <a:rPr lang="en-US" dirty="0" smtClean="0"/>
+              <a:rPr lang="en-US" dirty="0"/>
               <a:t>	3.2 Import multiple categories with </a:t>
             </a:r>
             <a:r>
-              <a:rPr lang="en-US" dirty="0" err="1" smtClean="0"/>
+              <a:rPr lang="en-US" dirty="0" err="1"/>
               <a:t>nameboxes</a:t>
             </a:r>
             <a:r>
-              <a:rPr lang="en-US" dirty="0" smtClean="0"/>
+              <a:rPr lang="en-US" dirty="0"/>
               <a:t>, no </a:t>
             </a:r>
             <a:r>
-              <a:rPr lang="en-US" dirty="0" err="1" smtClean="0"/>
+              <a:rPr lang="en-US" dirty="0" err="1"/>
               <a:t>confilct</a:t>
             </a:r>
             <a:r>
-              <a:rPr lang="en-US" dirty="0" smtClean="0"/>
+              <a:rPr lang="en-US" dirty="0"/>
               <a:t> name</a:t>
             </a:r>
           </a:p>
           <a:p>
             <a:r>
-              <a:rPr lang="en-US" dirty="0" smtClean="0"/>
+              <a:rPr lang="en-US" dirty="0"/>
               <a:t>	3.3 Import single category with </a:t>
             </a:r>
             <a:r>
-              <a:rPr lang="en-US" dirty="0" err="1" smtClean="0"/>
+              <a:rPr lang="en-US" dirty="0" err="1"/>
               <a:t>namebox</a:t>
             </a:r>
             <a:r>
-              <a:rPr lang="en-US" dirty="0" smtClean="0"/>
+              <a:rPr lang="en-US" dirty="0"/>
               <a:t>, conflict with one existed name</a:t>
             </a:r>
           </a:p>
           <a:p>
             <a:r>
-              <a:rPr lang="en-US" dirty="0" smtClean="0"/>
+              <a:rPr lang="en-US" dirty="0"/>
               <a:t>	3.4 Import multiple categories with </a:t>
             </a:r>
             <a:r>
-              <a:rPr lang="en-US" dirty="0" err="1" smtClean="0"/>
+              <a:rPr lang="en-US" dirty="0" err="1"/>
               <a:t>nameboxes</a:t>
             </a:r>
             <a:r>
-              <a:rPr lang="en-US" dirty="0" smtClean="0"/>
+              <a:rPr lang="en-US" dirty="0"/>
               <a:t>, some of the boxes conflict with existed name</a:t>
             </a:r>
           </a:p>
           <a:p>
             <a:r>
-              <a:rPr lang="en-US" dirty="0" smtClean="0"/>
+              <a:rPr lang="en-US" dirty="0"/>
               <a:t>	3.5 Import single category without </a:t>
             </a:r>
             <a:r>
-              <a:rPr lang="en-US" dirty="0" err="1" smtClean="0"/>
+              <a:rPr lang="en-US" dirty="0" err="1"/>
               <a:t>namebox</a:t>
             </a:r>
-            <a:endParaRPr lang="en-US" dirty="0" smtClean="0"/>
-          </a:p>
-          <a:p>
-            <a:r>
-              <a:rPr lang="en-US" dirty="0" smtClean="0"/>
+            <a:endParaRPr lang="en-US" dirty="0"/>
+          </a:p>
+          <a:p>
+            <a:r>
+              <a:rPr lang="en-US" dirty="0"/>
               <a:t>	3.6 Import single category without </a:t>
             </a:r>
             <a:r>
-              <a:rPr lang="en-US" dirty="0" err="1" smtClean="0"/>
+              <a:rPr lang="en-US" dirty="0" err="1"/>
               <a:t>namebox</a:t>
             </a:r>
             <a:r>
-              <a:rPr lang="en-US" dirty="0" smtClean="0"/>
+              <a:rPr lang="en-US" dirty="0"/>
               <a:t>, conflict with exist name</a:t>
             </a:r>
           </a:p>
           <a:p>
             <a:r>
-              <a:rPr lang="en-US" dirty="0" smtClean="0"/>
+              <a:rPr lang="en-US" dirty="0"/>
               <a:t>	3.7 Import multiple categories without </a:t>
             </a:r>
             <a:r>
-              <a:rPr lang="en-US" dirty="0" err="1" smtClean="0"/>
+              <a:rPr lang="en-US" dirty="0" err="1"/>
               <a:t>namebox</a:t>
             </a:r>
-            <a:endParaRPr lang="en-US" dirty="0" smtClean="0"/>
-          </a:p>
-          <a:p>
-            <a:r>
-              <a:rPr lang="en-US" dirty="0" smtClean="0"/>
+            <a:endParaRPr lang="en-US" dirty="0"/>
+          </a:p>
+          <a:p>
+            <a:r>
+              <a:rPr lang="en-US" dirty="0"/>
               <a:t>4. </a:t>
             </a:r>
             <a:r>
-              <a:rPr lang="en-US" smtClean="0"/>
+              <a:rPr lang="en-US"/>
               <a:t>Migrate Category</a:t>
             </a:r>
-            <a:endParaRPr lang="en-US"/>
           </a:p>
         </p:txBody>
       </p:sp>
@@ -829,7 +830,7 @@
           <a:lstStyle/>
           <a:p>
             <a:r>
-              <a:rPr lang="en-US" altLang="zh-CN" dirty="0" smtClean="0"/>
+              <a:rPr lang="en-US" altLang="zh-CN" dirty="0"/>
               <a:t>Expected</a:t>
             </a:r>
             <a:endParaRPr lang="zh-CN" altLang="en-US" dirty="0"/>
@@ -853,7 +854,7 @@
           <a:p>
             <a:fld id="{E96FB07A-B1AD-4238-A6C9-967239C45D18}" type="slidenum">
               <a:rPr lang="en-SG" smtClean="0"/>
-              <a:t>15</a:t>
+              <a:t>16</a:t>
             </a:fld>
             <a:endParaRPr lang="en-SG"/>
           </a:p>
@@ -1001,7 +1002,7 @@
           <a:lstStyle/>
           <a:p>
             <a:r>
-              <a:rPr lang="en-US" altLang="zh-CN" dirty="0" smtClean="0"/>
+              <a:rPr lang="en-US" altLang="zh-CN" dirty="0"/>
               <a:t>Expected</a:t>
             </a:r>
             <a:endParaRPr lang="zh-CN" altLang="en-US" dirty="0"/>
@@ -1173,7 +1174,7 @@
           <a:lstStyle/>
           <a:p>
             <a:r>
-              <a:rPr lang="en-US" altLang="zh-CN" dirty="0" smtClean="0"/>
+              <a:rPr lang="en-US" altLang="zh-CN" dirty="0"/>
               <a:t>Expected</a:t>
             </a:r>
             <a:endParaRPr lang="zh-CN" altLang="en-US" dirty="0"/>
@@ -1261,185 +1262,184 @@
           <a:lstStyle/>
           <a:p>
             <a:r>
-              <a:rPr lang="en-US" dirty="0" smtClean="0"/>
+              <a:rPr lang="en-US" dirty="0"/>
               <a:t>Do the following from 3 environments:</a:t>
             </a:r>
           </a:p>
           <a:p>
             <a:r>
-              <a:rPr lang="en-US" dirty="0" smtClean="0"/>
+              <a:rPr lang="en-US" dirty="0"/>
               <a:t>1. Entirely new environment</a:t>
             </a:r>
           </a:p>
           <a:p>
             <a:r>
-              <a:rPr lang="en-US" dirty="0" smtClean="0"/>
+              <a:rPr lang="en-US" dirty="0"/>
               <a:t>2. Contains old shape info</a:t>
             </a:r>
           </a:p>
           <a:p>
-            <a:endParaRPr lang="en-US" dirty="0" smtClean="0"/>
-          </a:p>
-          <a:p>
-            <a:r>
-              <a:rPr lang="en-US" dirty="0" smtClean="0"/>
+            <a:endParaRPr lang="en-US" dirty="0"/>
+          </a:p>
+          <a:p>
+            <a:r>
+              <a:rPr lang="en-US" dirty="0"/>
               <a:t>1. Add Category</a:t>
             </a:r>
           </a:p>
           <a:p>
             <a:r>
-              <a:rPr lang="en-US" dirty="0" smtClean="0"/>
+              <a:rPr lang="en-US" dirty="0"/>
               <a:t>	1.1 Add category then add a new shape inside, check the default name, close and open to check</a:t>
             </a:r>
           </a:p>
           <a:p>
             <a:r>
-              <a:rPr lang="en-US" dirty="0" smtClean="0"/>
+              <a:rPr lang="en-US" dirty="0"/>
               <a:t>	1.2 Add category then add a new shape inside, check the default name, set the category as default, close and open to check</a:t>
             </a:r>
           </a:p>
           <a:p>
             <a:r>
-              <a:rPr lang="en-US" dirty="0" smtClean="0"/>
+              <a:rPr lang="en-US" dirty="0"/>
               <a:t>2. Rename Category</a:t>
             </a:r>
           </a:p>
           <a:p>
             <a:r>
-              <a:rPr lang="en-US" dirty="0" smtClean="0"/>
+              <a:rPr lang="en-US" dirty="0"/>
               <a:t>	2.1 Rename to a valid name</a:t>
             </a:r>
           </a:p>
           <a:p>
             <a:r>
-              <a:rPr lang="en-US" dirty="0" smtClean="0"/>
+              <a:rPr lang="en-US" dirty="0"/>
               <a:t>	2.2 Rename to an </a:t>
             </a:r>
             <a:r>
-              <a:rPr lang="en-US" dirty="0" err="1" smtClean="0"/>
+              <a:rPr lang="en-US" dirty="0" err="1"/>
               <a:t>invaid</a:t>
             </a:r>
             <a:r>
-              <a:rPr lang="en-US" dirty="0" smtClean="0"/>
+              <a:rPr lang="en-US" dirty="0"/>
               <a:t> name</a:t>
             </a:r>
           </a:p>
           <a:p>
             <a:r>
-              <a:rPr lang="en-US" dirty="0" smtClean="0"/>
+              <a:rPr lang="en-US" dirty="0"/>
               <a:t>3. Import Category</a:t>
             </a:r>
           </a:p>
           <a:p>
             <a:r>
-              <a:rPr lang="en-US" dirty="0" smtClean="0"/>
+              <a:rPr lang="en-US" dirty="0"/>
               <a:t>	3.1 Import single category with </a:t>
             </a:r>
             <a:r>
-              <a:rPr lang="en-US" dirty="0" err="1" smtClean="0"/>
+              <a:rPr lang="en-US" dirty="0" err="1"/>
               <a:t>namebox</a:t>
             </a:r>
             <a:r>
-              <a:rPr lang="en-US" dirty="0" smtClean="0"/>
+              <a:rPr lang="en-US" dirty="0"/>
               <a:t>, no conflict name</a:t>
             </a:r>
           </a:p>
           <a:p>
             <a:r>
-              <a:rPr lang="en-US" dirty="0" smtClean="0"/>
+              <a:rPr lang="en-US" dirty="0"/>
               <a:t>	3.2 Import multiple categories with </a:t>
             </a:r>
             <a:r>
-              <a:rPr lang="en-US" dirty="0" err="1" smtClean="0"/>
+              <a:rPr lang="en-US" dirty="0" err="1"/>
               <a:t>nameboxes</a:t>
             </a:r>
             <a:r>
-              <a:rPr lang="en-US" dirty="0" smtClean="0"/>
+              <a:rPr lang="en-US" dirty="0"/>
               <a:t>, no </a:t>
             </a:r>
             <a:r>
-              <a:rPr lang="en-US" dirty="0" err="1" smtClean="0"/>
+              <a:rPr lang="en-US" dirty="0" err="1"/>
               <a:t>confilct</a:t>
             </a:r>
             <a:r>
-              <a:rPr lang="en-US" dirty="0" smtClean="0"/>
+              <a:rPr lang="en-US" dirty="0"/>
               <a:t> name</a:t>
             </a:r>
           </a:p>
           <a:p>
             <a:r>
-              <a:rPr lang="en-US" dirty="0" smtClean="0"/>
+              <a:rPr lang="en-US" dirty="0"/>
               <a:t>	3.3 Import single category with </a:t>
             </a:r>
             <a:r>
-              <a:rPr lang="en-US" dirty="0" err="1" smtClean="0"/>
+              <a:rPr lang="en-US" dirty="0" err="1"/>
               <a:t>namebox</a:t>
             </a:r>
             <a:r>
-              <a:rPr lang="en-US" dirty="0" smtClean="0"/>
+              <a:rPr lang="en-US" dirty="0"/>
               <a:t>, conflict with one existed name</a:t>
             </a:r>
           </a:p>
           <a:p>
             <a:r>
-              <a:rPr lang="en-US" dirty="0" smtClean="0"/>
+              <a:rPr lang="en-US" dirty="0"/>
               <a:t>	3.4 Import multiple categories with </a:t>
             </a:r>
             <a:r>
-              <a:rPr lang="en-US" dirty="0" err="1" smtClean="0"/>
+              <a:rPr lang="en-US" dirty="0" err="1"/>
               <a:t>nameboxes</a:t>
             </a:r>
             <a:r>
-              <a:rPr lang="en-US" dirty="0" smtClean="0"/>
+              <a:rPr lang="en-US" dirty="0"/>
               <a:t>, some of the boxes conflict with existed name</a:t>
             </a:r>
           </a:p>
           <a:p>
             <a:r>
-              <a:rPr lang="en-US" dirty="0" smtClean="0"/>
+              <a:rPr lang="en-US" dirty="0"/>
               <a:t>	3.5 Import single category without </a:t>
             </a:r>
             <a:r>
-              <a:rPr lang="en-US" dirty="0" err="1" smtClean="0"/>
+              <a:rPr lang="en-US" dirty="0" err="1"/>
               <a:t>namebox</a:t>
             </a:r>
-            <a:endParaRPr lang="en-US" dirty="0" smtClean="0"/>
-          </a:p>
-          <a:p>
-            <a:r>
-              <a:rPr lang="en-US" dirty="0" smtClean="0"/>
+            <a:endParaRPr lang="en-US" dirty="0"/>
+          </a:p>
+          <a:p>
+            <a:r>
+              <a:rPr lang="en-US" dirty="0"/>
               <a:t>	3.6 Import single category without </a:t>
             </a:r>
             <a:r>
-              <a:rPr lang="en-US" dirty="0" err="1" smtClean="0"/>
+              <a:rPr lang="en-US" dirty="0" err="1"/>
               <a:t>namebox</a:t>
             </a:r>
             <a:r>
-              <a:rPr lang="en-US" dirty="0" smtClean="0"/>
+              <a:rPr lang="en-US" dirty="0"/>
               <a:t>, conflict with exist name</a:t>
             </a:r>
           </a:p>
           <a:p>
             <a:r>
-              <a:rPr lang="en-US" dirty="0" smtClean="0"/>
+              <a:rPr lang="en-US" dirty="0"/>
               <a:t>	3.7 Import multiple categories without </a:t>
             </a:r>
             <a:r>
-              <a:rPr lang="en-US" dirty="0" err="1" smtClean="0"/>
+              <a:rPr lang="en-US" dirty="0" err="1"/>
               <a:t>namebox</a:t>
             </a:r>
-            <a:endParaRPr lang="en-US" dirty="0" smtClean="0"/>
-          </a:p>
-          <a:p>
-            <a:r>
-              <a:rPr lang="en-US" dirty="0" smtClean="0"/>
+            <a:endParaRPr lang="en-US" dirty="0"/>
+          </a:p>
+          <a:p>
+            <a:r>
+              <a:rPr lang="en-US" dirty="0"/>
               <a:t>4. </a:t>
             </a:r>
             <a:r>
-              <a:rPr lang="en-US" smtClean="0"/>
+              <a:rPr lang="en-US"/>
               <a:t>Migrate Category</a:t>
             </a:r>
-            <a:endParaRPr lang="en-US"/>
           </a:p>
         </p:txBody>
       </p:sp>
@@ -1460,7 +1460,7 @@
           <a:p>
             <a:fld id="{E96FB07A-B1AD-4238-A6C9-967239C45D18}" type="slidenum">
               <a:rPr lang="en-SG" smtClean="0"/>
-              <a:t>9</a:t>
+              <a:t>10</a:t>
             </a:fld>
             <a:endParaRPr lang="en-SG"/>
           </a:p>
@@ -1544,7 +1544,7 @@
           <a:p>
             <a:fld id="{E96FB07A-B1AD-4238-A6C9-967239C45D18}" type="slidenum">
               <a:rPr lang="en-SG" smtClean="0"/>
-              <a:t>10</a:t>
+              <a:t>11</a:t>
             </a:fld>
             <a:endParaRPr lang="en-SG"/>
           </a:p>
@@ -1608,7 +1608,7 @@
           <a:lstStyle/>
           <a:p>
             <a:r>
-              <a:rPr lang="en-US" altLang="zh-CN" dirty="0" smtClean="0"/>
+              <a:rPr lang="en-US" altLang="zh-CN" dirty="0"/>
               <a:t>Expected</a:t>
             </a:r>
             <a:endParaRPr lang="zh-CN" altLang="en-US" dirty="0"/>
@@ -1632,7 +1632,7 @@
           <a:p>
             <a:fld id="{E96FB07A-B1AD-4238-A6C9-967239C45D18}" type="slidenum">
               <a:rPr lang="en-SG" smtClean="0"/>
-              <a:t>12</a:t>
+              <a:t>13</a:t>
             </a:fld>
             <a:endParaRPr lang="en-SG"/>
           </a:p>
@@ -1716,7 +1716,7 @@
           <a:p>
             <a:fld id="{E96FB07A-B1AD-4238-A6C9-967239C45D18}" type="slidenum">
               <a:rPr lang="en-SG" smtClean="0"/>
-              <a:t>13</a:t>
+              <a:t>14</a:t>
             </a:fld>
             <a:endParaRPr lang="en-SG"/>
           </a:p>
@@ -1773,10 +1773,9 @@
           <a:lstStyle/>
           <a:p>
             <a:r>
-              <a:rPr lang="en-US" smtClean="0"/>
+              <a:rPr lang="en-US"/>
               <a:t>Click to edit Master title style</a:t>
             </a:r>
-            <a:endParaRPr lang="en-US"/>
           </a:p>
         </p:txBody>
       </p:sp>
@@ -1892,10 +1891,9 @@
           </a:lstStyle>
           <a:p>
             <a:r>
-              <a:rPr lang="en-US" smtClean="0"/>
+              <a:rPr lang="en-US"/>
               <a:t>Click to edit Master subtitle style</a:t>
             </a:r>
-            <a:endParaRPr lang="en-US"/>
           </a:p>
         </p:txBody>
       </p:sp>
@@ -1916,7 +1914,7 @@
           <a:p>
             <a:fld id="{699DC775-C286-4358-8C92-D7E584E969B3}" type="datetimeFigureOut">
               <a:rPr lang="en-US" smtClean="0"/>
-              <a:t>4/10/2018</a:t>
+              <a:t>1/27/2019</a:t>
             </a:fld>
             <a:endParaRPr lang="en-US"/>
           </a:p>
@@ -2010,10 +2008,9 @@
           <a:lstStyle/>
           <a:p>
             <a:r>
-              <a:rPr lang="en-US" smtClean="0"/>
+              <a:rPr lang="en-US"/>
               <a:t>Click to edit Master title style</a:t>
             </a:r>
-            <a:endParaRPr lang="en-US"/>
           </a:p>
         </p:txBody>
       </p:sp>
@@ -2034,38 +2031,37 @@
           <a:p>
             <a:pPr lvl="0"/>
             <a:r>
-              <a:rPr lang="en-US" smtClean="0"/>
+              <a:rPr lang="en-US"/>
               <a:t>Click to edit Master text styles</a:t>
             </a:r>
           </a:p>
           <a:p>
             <a:pPr lvl="1"/>
             <a:r>
-              <a:rPr lang="en-US" smtClean="0"/>
+              <a:rPr lang="en-US"/>
               <a:t>Second level</a:t>
             </a:r>
           </a:p>
           <a:p>
             <a:pPr lvl="2"/>
             <a:r>
-              <a:rPr lang="en-US" smtClean="0"/>
+              <a:rPr lang="en-US"/>
               <a:t>Third level</a:t>
             </a:r>
           </a:p>
           <a:p>
             <a:pPr lvl="3"/>
             <a:r>
-              <a:rPr lang="en-US" smtClean="0"/>
+              <a:rPr lang="en-US"/>
               <a:t>Fourth level</a:t>
             </a:r>
           </a:p>
           <a:p>
             <a:pPr lvl="4"/>
             <a:r>
-              <a:rPr lang="en-US" smtClean="0"/>
+              <a:rPr lang="en-US"/>
               <a:t>Fifth level</a:t>
             </a:r>
-            <a:endParaRPr lang="en-US"/>
           </a:p>
         </p:txBody>
       </p:sp>
@@ -2086,7 +2082,7 @@
           <a:p>
             <a:fld id="{699DC775-C286-4358-8C92-D7E584E969B3}" type="datetimeFigureOut">
               <a:rPr lang="en-US" smtClean="0"/>
-              <a:t>4/10/2018</a:t>
+              <a:t>1/27/2019</a:t>
             </a:fld>
             <a:endParaRPr lang="en-US"/>
           </a:p>
@@ -2185,10 +2181,9 @@
           <a:lstStyle/>
           <a:p>
             <a:r>
-              <a:rPr lang="en-US" smtClean="0"/>
+              <a:rPr lang="en-US"/>
               <a:t>Click to edit Master title style</a:t>
             </a:r>
-            <a:endParaRPr lang="en-US"/>
           </a:p>
         </p:txBody>
       </p:sp>
@@ -2214,38 +2209,37 @@
           <a:p>
             <a:pPr lvl="0"/>
             <a:r>
-              <a:rPr lang="en-US" smtClean="0"/>
+              <a:rPr lang="en-US"/>
               <a:t>Click to edit Master text styles</a:t>
             </a:r>
           </a:p>
           <a:p>
             <a:pPr lvl="1"/>
             <a:r>
-              <a:rPr lang="en-US" smtClean="0"/>
+              <a:rPr lang="en-US"/>
               <a:t>Second level</a:t>
             </a:r>
           </a:p>
           <a:p>
             <a:pPr lvl="2"/>
             <a:r>
-              <a:rPr lang="en-US" smtClean="0"/>
+              <a:rPr lang="en-US"/>
               <a:t>Third level</a:t>
             </a:r>
           </a:p>
           <a:p>
             <a:pPr lvl="3"/>
             <a:r>
-              <a:rPr lang="en-US" smtClean="0"/>
+              <a:rPr lang="en-US"/>
               <a:t>Fourth level</a:t>
             </a:r>
           </a:p>
           <a:p>
             <a:pPr lvl="4"/>
             <a:r>
-              <a:rPr lang="en-US" smtClean="0"/>
+              <a:rPr lang="en-US"/>
               <a:t>Fifth level</a:t>
             </a:r>
-            <a:endParaRPr lang="en-US"/>
           </a:p>
         </p:txBody>
       </p:sp>
@@ -2266,7 +2260,7 @@
           <a:p>
             <a:fld id="{699DC775-C286-4358-8C92-D7E584E969B3}" type="datetimeFigureOut">
               <a:rPr lang="en-US" smtClean="0"/>
-              <a:t>4/10/2018</a:t>
+              <a:t>1/27/2019</a:t>
             </a:fld>
             <a:endParaRPr lang="en-US"/>
           </a:p>
@@ -2365,10 +2359,9 @@
           <a:lstStyle/>
           <a:p>
             <a:r>
-              <a:rPr lang="en-US" smtClean="0"/>
+              <a:rPr lang="en-US"/>
               <a:t>Click to edit Master title style</a:t>
             </a:r>
-            <a:endParaRPr lang="en-US"/>
           </a:p>
         </p:txBody>
       </p:sp>
@@ -2484,10 +2477,9 @@
           </a:lstStyle>
           <a:p>
             <a:r>
-              <a:rPr lang="en-US" smtClean="0"/>
+              <a:rPr lang="en-US"/>
               <a:t>Click to edit Master subtitle style</a:t>
             </a:r>
-            <a:endParaRPr lang="en-US"/>
           </a:p>
         </p:txBody>
       </p:sp>
@@ -2508,7 +2500,7 @@
           <a:p>
             <a:fld id="{699DC775-C286-4358-8C92-D7E584E969B3}" type="datetimeFigureOut">
               <a:rPr lang="en-US" smtClean="0"/>
-              <a:t>4/10/2018</a:t>
+              <a:t>1/27/2019</a:t>
             </a:fld>
             <a:endParaRPr lang="en-US"/>
           </a:p>
@@ -2602,10 +2594,9 @@
           <a:lstStyle/>
           <a:p>
             <a:r>
-              <a:rPr lang="en-US" smtClean="0"/>
+              <a:rPr lang="en-US"/>
               <a:t>Click to edit Master title style</a:t>
             </a:r>
-            <a:endParaRPr lang="en-US"/>
           </a:p>
         </p:txBody>
       </p:sp>
@@ -2626,38 +2617,37 @@
           <a:p>
             <a:pPr lvl="0"/>
             <a:r>
-              <a:rPr lang="en-US" smtClean="0"/>
+              <a:rPr lang="en-US"/>
               <a:t>Click to edit Master text styles</a:t>
             </a:r>
           </a:p>
           <a:p>
             <a:pPr lvl="1"/>
             <a:r>
-              <a:rPr lang="en-US" smtClean="0"/>
+              <a:rPr lang="en-US"/>
               <a:t>Second level</a:t>
             </a:r>
           </a:p>
           <a:p>
             <a:pPr lvl="2"/>
             <a:r>
-              <a:rPr lang="en-US" smtClean="0"/>
+              <a:rPr lang="en-US"/>
               <a:t>Third level</a:t>
             </a:r>
           </a:p>
           <a:p>
             <a:pPr lvl="3"/>
             <a:r>
-              <a:rPr lang="en-US" smtClean="0"/>
+              <a:rPr lang="en-US"/>
               <a:t>Fourth level</a:t>
             </a:r>
           </a:p>
           <a:p>
             <a:pPr lvl="4"/>
             <a:r>
-              <a:rPr lang="en-US" smtClean="0"/>
+              <a:rPr lang="en-US"/>
               <a:t>Fifth level</a:t>
             </a:r>
-            <a:endParaRPr lang="en-US"/>
           </a:p>
         </p:txBody>
       </p:sp>
@@ -2678,7 +2668,7 @@
           <a:p>
             <a:fld id="{699DC775-C286-4358-8C92-D7E584E969B3}" type="datetimeFigureOut">
               <a:rPr lang="en-US" smtClean="0"/>
-              <a:t>4/10/2018</a:t>
+              <a:t>1/27/2019</a:t>
             </a:fld>
             <a:endParaRPr lang="en-US"/>
           </a:p>
@@ -2781,10 +2771,9 @@
           </a:lstStyle>
           <a:p>
             <a:r>
-              <a:rPr lang="en-US" smtClean="0"/>
+              <a:rPr lang="en-US"/>
               <a:t>Click to edit Master title style</a:t>
             </a:r>
-            <a:endParaRPr lang="en-US"/>
           </a:p>
         </p:txBody>
       </p:sp>
@@ -2901,7 +2890,7 @@
           <a:p>
             <a:pPr lvl="0"/>
             <a:r>
-              <a:rPr lang="en-US" smtClean="0"/>
+              <a:rPr lang="en-US"/>
               <a:t>Click to edit Master text styles</a:t>
             </a:r>
           </a:p>
@@ -2924,7 +2913,7 @@
           <a:p>
             <a:fld id="{699DC775-C286-4358-8C92-D7E584E969B3}" type="datetimeFigureOut">
               <a:rPr lang="en-US" smtClean="0"/>
-              <a:t>4/10/2018</a:t>
+              <a:t>1/27/2019</a:t>
             </a:fld>
             <a:endParaRPr lang="en-US"/>
           </a:p>
@@ -3018,10 +3007,9 @@
           <a:lstStyle/>
           <a:p>
             <a:r>
-              <a:rPr lang="en-US" smtClean="0"/>
+              <a:rPr lang="en-US"/>
               <a:t>Click to edit Master title style</a:t>
             </a:r>
-            <a:endParaRPr lang="en-US"/>
           </a:p>
         </p:txBody>
       </p:sp>
@@ -3075,38 +3063,37 @@
           <a:p>
             <a:pPr lvl="0"/>
             <a:r>
-              <a:rPr lang="en-US" smtClean="0"/>
+              <a:rPr lang="en-US"/>
               <a:t>Click to edit Master text styles</a:t>
             </a:r>
           </a:p>
           <a:p>
             <a:pPr lvl="1"/>
             <a:r>
-              <a:rPr lang="en-US" smtClean="0"/>
+              <a:rPr lang="en-US"/>
               <a:t>Second level</a:t>
             </a:r>
           </a:p>
           <a:p>
             <a:pPr lvl="2"/>
             <a:r>
-              <a:rPr lang="en-US" smtClean="0"/>
+              <a:rPr lang="en-US"/>
               <a:t>Third level</a:t>
             </a:r>
           </a:p>
           <a:p>
             <a:pPr lvl="3"/>
             <a:r>
-              <a:rPr lang="en-US" smtClean="0"/>
+              <a:rPr lang="en-US"/>
               <a:t>Fourth level</a:t>
             </a:r>
           </a:p>
           <a:p>
             <a:pPr lvl="4"/>
             <a:r>
-              <a:rPr lang="en-US" smtClean="0"/>
+              <a:rPr lang="en-US"/>
               <a:t>Fifth level</a:t>
             </a:r>
-            <a:endParaRPr lang="en-US"/>
           </a:p>
         </p:txBody>
       </p:sp>
@@ -3160,38 +3147,37 @@
           <a:p>
             <a:pPr lvl="0"/>
             <a:r>
-              <a:rPr lang="en-US" smtClean="0"/>
+              <a:rPr lang="en-US"/>
               <a:t>Click to edit Master text styles</a:t>
             </a:r>
           </a:p>
           <a:p>
             <a:pPr lvl="1"/>
             <a:r>
-              <a:rPr lang="en-US" smtClean="0"/>
+              <a:rPr lang="en-US"/>
               <a:t>Second level</a:t>
             </a:r>
           </a:p>
           <a:p>
             <a:pPr lvl="2"/>
             <a:r>
-              <a:rPr lang="en-US" smtClean="0"/>
+              <a:rPr lang="en-US"/>
               <a:t>Third level</a:t>
             </a:r>
           </a:p>
           <a:p>
             <a:pPr lvl="3"/>
             <a:r>
-              <a:rPr lang="en-US" smtClean="0"/>
+              <a:rPr lang="en-US"/>
               <a:t>Fourth level</a:t>
             </a:r>
           </a:p>
           <a:p>
             <a:pPr lvl="4"/>
             <a:r>
-              <a:rPr lang="en-US" smtClean="0"/>
+              <a:rPr lang="en-US"/>
               <a:t>Fifth level</a:t>
             </a:r>
-            <a:endParaRPr lang="en-US"/>
           </a:p>
         </p:txBody>
       </p:sp>
@@ -3212,7 +3198,7 @@
           <a:p>
             <a:fld id="{699DC775-C286-4358-8C92-D7E584E969B3}" type="datetimeFigureOut">
               <a:rPr lang="en-US" smtClean="0"/>
-              <a:t>4/10/2018</a:t>
+              <a:t>1/27/2019</a:t>
             </a:fld>
             <a:endParaRPr lang="en-US"/>
           </a:p>
@@ -3310,10 +3296,9 @@
           </a:lstStyle>
           <a:p>
             <a:r>
-              <a:rPr lang="en-US" smtClean="0"/>
+              <a:rPr lang="en-US"/>
               <a:t>Click to edit Master title style</a:t>
             </a:r>
-            <a:endParaRPr lang="en-US"/>
           </a:p>
         </p:txBody>
       </p:sp>
@@ -3376,7 +3361,7 @@
           <a:p>
             <a:pPr lvl="0"/>
             <a:r>
-              <a:rPr lang="en-US" smtClean="0"/>
+              <a:rPr lang="en-US"/>
               <a:t>Click to edit Master text styles</a:t>
             </a:r>
           </a:p>
@@ -3432,38 +3417,37 @@
           <a:p>
             <a:pPr lvl="0"/>
             <a:r>
-              <a:rPr lang="en-US" smtClean="0"/>
+              <a:rPr lang="en-US"/>
               <a:t>Click to edit Master text styles</a:t>
             </a:r>
           </a:p>
           <a:p>
             <a:pPr lvl="1"/>
             <a:r>
-              <a:rPr lang="en-US" smtClean="0"/>
+              <a:rPr lang="en-US"/>
               <a:t>Second level</a:t>
             </a:r>
           </a:p>
           <a:p>
             <a:pPr lvl="2"/>
             <a:r>
-              <a:rPr lang="en-US" smtClean="0"/>
+              <a:rPr lang="en-US"/>
               <a:t>Third level</a:t>
             </a:r>
           </a:p>
           <a:p>
             <a:pPr lvl="3"/>
             <a:r>
-              <a:rPr lang="en-US" smtClean="0"/>
+              <a:rPr lang="en-US"/>
               <a:t>Fourth level</a:t>
             </a:r>
           </a:p>
           <a:p>
             <a:pPr lvl="4"/>
             <a:r>
-              <a:rPr lang="en-US" smtClean="0"/>
+              <a:rPr lang="en-US"/>
               <a:t>Fifth level</a:t>
             </a:r>
-            <a:endParaRPr lang="en-US"/>
           </a:p>
         </p:txBody>
       </p:sp>
@@ -3526,7 +3510,7 @@
           <a:p>
             <a:pPr lvl="0"/>
             <a:r>
-              <a:rPr lang="en-US" smtClean="0"/>
+              <a:rPr lang="en-US"/>
               <a:t>Click to edit Master text styles</a:t>
             </a:r>
           </a:p>
@@ -3582,38 +3566,37 @@
           <a:p>
             <a:pPr lvl="0"/>
             <a:r>
-              <a:rPr lang="en-US" smtClean="0"/>
+              <a:rPr lang="en-US"/>
               <a:t>Click to edit Master text styles</a:t>
             </a:r>
           </a:p>
           <a:p>
             <a:pPr lvl="1"/>
             <a:r>
-              <a:rPr lang="en-US" smtClean="0"/>
+              <a:rPr lang="en-US"/>
               <a:t>Second level</a:t>
             </a:r>
           </a:p>
           <a:p>
             <a:pPr lvl="2"/>
             <a:r>
-              <a:rPr lang="en-US" smtClean="0"/>
+              <a:rPr lang="en-US"/>
               <a:t>Third level</a:t>
             </a:r>
           </a:p>
           <a:p>
             <a:pPr lvl="3"/>
             <a:r>
-              <a:rPr lang="en-US" smtClean="0"/>
+              <a:rPr lang="en-US"/>
               <a:t>Fourth level</a:t>
             </a:r>
           </a:p>
           <a:p>
             <a:pPr lvl="4"/>
             <a:r>
-              <a:rPr lang="en-US" smtClean="0"/>
+              <a:rPr lang="en-US"/>
               <a:t>Fifth level</a:t>
             </a:r>
-            <a:endParaRPr lang="en-US"/>
           </a:p>
         </p:txBody>
       </p:sp>
@@ -3634,7 +3617,7 @@
           <a:p>
             <a:fld id="{699DC775-C286-4358-8C92-D7E584E969B3}" type="datetimeFigureOut">
               <a:rPr lang="en-US" smtClean="0"/>
-              <a:t>4/10/2018</a:t>
+              <a:t>1/27/2019</a:t>
             </a:fld>
             <a:endParaRPr lang="en-US"/>
           </a:p>
@@ -3728,10 +3711,9 @@
           <a:lstStyle/>
           <a:p>
             <a:r>
-              <a:rPr lang="en-US" smtClean="0"/>
+              <a:rPr lang="en-US"/>
               <a:t>Click to edit Master title style</a:t>
             </a:r>
-            <a:endParaRPr lang="en-US"/>
           </a:p>
         </p:txBody>
       </p:sp>
@@ -3752,7 +3734,7 @@
           <a:p>
             <a:fld id="{699DC775-C286-4358-8C92-D7E584E969B3}" type="datetimeFigureOut">
               <a:rPr lang="en-US" smtClean="0"/>
-              <a:t>4/10/2018</a:t>
+              <a:t>1/27/2019</a:t>
             </a:fld>
             <a:endParaRPr lang="en-US"/>
           </a:p>
@@ -3847,7 +3829,7 @@
           <a:p>
             <a:fld id="{699DC775-C286-4358-8C92-D7E584E969B3}" type="datetimeFigureOut">
               <a:rPr lang="en-US" smtClean="0"/>
-              <a:t>4/10/2018</a:t>
+              <a:t>1/27/2019</a:t>
             </a:fld>
             <a:endParaRPr lang="en-US"/>
           </a:p>
@@ -3950,10 +3932,9 @@
           </a:lstStyle>
           <a:p>
             <a:r>
-              <a:rPr lang="en-US" smtClean="0"/>
+              <a:rPr lang="en-US"/>
               <a:t>Click to edit Master title style</a:t>
             </a:r>
-            <a:endParaRPr lang="en-US"/>
           </a:p>
         </p:txBody>
       </p:sp>
@@ -4007,38 +3988,37 @@
           <a:p>
             <a:pPr lvl="0"/>
             <a:r>
-              <a:rPr lang="en-US" smtClean="0"/>
+              <a:rPr lang="en-US"/>
               <a:t>Click to edit Master text styles</a:t>
             </a:r>
           </a:p>
           <a:p>
             <a:pPr lvl="1"/>
             <a:r>
-              <a:rPr lang="en-US" smtClean="0"/>
+              <a:rPr lang="en-US"/>
               <a:t>Second level</a:t>
             </a:r>
           </a:p>
           <a:p>
             <a:pPr lvl="2"/>
             <a:r>
-              <a:rPr lang="en-US" smtClean="0"/>
+              <a:rPr lang="en-US"/>
               <a:t>Third level</a:t>
             </a:r>
           </a:p>
           <a:p>
             <a:pPr lvl="3"/>
             <a:r>
-              <a:rPr lang="en-US" smtClean="0"/>
+              <a:rPr lang="en-US"/>
               <a:t>Fourth level</a:t>
             </a:r>
           </a:p>
           <a:p>
             <a:pPr lvl="4"/>
             <a:r>
-              <a:rPr lang="en-US" smtClean="0"/>
+              <a:rPr lang="en-US"/>
               <a:t>Fifth level</a:t>
             </a:r>
-            <a:endParaRPr lang="en-US"/>
           </a:p>
         </p:txBody>
       </p:sp>
@@ -4101,7 +4081,7 @@
           <a:p>
             <a:pPr lvl="0"/>
             <a:r>
-              <a:rPr lang="en-US" smtClean="0"/>
+              <a:rPr lang="en-US"/>
               <a:t>Click to edit Master text styles</a:t>
             </a:r>
           </a:p>
@@ -4124,7 +4104,7 @@
           <a:p>
             <a:fld id="{699DC775-C286-4358-8C92-D7E584E969B3}" type="datetimeFigureOut">
               <a:rPr lang="en-US" smtClean="0"/>
-              <a:t>4/10/2018</a:t>
+              <a:t>1/27/2019</a:t>
             </a:fld>
             <a:endParaRPr lang="en-US"/>
           </a:p>
@@ -4218,10 +4198,9 @@
           <a:lstStyle/>
           <a:p>
             <a:r>
-              <a:rPr lang="en-US" smtClean="0"/>
+              <a:rPr lang="en-US"/>
               <a:t>Click to edit Master title style</a:t>
             </a:r>
-            <a:endParaRPr lang="en-US"/>
           </a:p>
         </p:txBody>
       </p:sp>
@@ -4242,38 +4221,37 @@
           <a:p>
             <a:pPr lvl="0"/>
             <a:r>
-              <a:rPr lang="en-US" smtClean="0"/>
+              <a:rPr lang="en-US"/>
               <a:t>Click to edit Master text styles</a:t>
             </a:r>
           </a:p>
           <a:p>
             <a:pPr lvl="1"/>
             <a:r>
-              <a:rPr lang="en-US" smtClean="0"/>
+              <a:rPr lang="en-US"/>
               <a:t>Second level</a:t>
             </a:r>
           </a:p>
           <a:p>
             <a:pPr lvl="2"/>
             <a:r>
-              <a:rPr lang="en-US" smtClean="0"/>
+              <a:rPr lang="en-US"/>
               <a:t>Third level</a:t>
             </a:r>
           </a:p>
           <a:p>
             <a:pPr lvl="3"/>
             <a:r>
-              <a:rPr lang="en-US" smtClean="0"/>
+              <a:rPr lang="en-US"/>
               <a:t>Fourth level</a:t>
             </a:r>
           </a:p>
           <a:p>
             <a:pPr lvl="4"/>
             <a:r>
-              <a:rPr lang="en-US" smtClean="0"/>
+              <a:rPr lang="en-US"/>
               <a:t>Fifth level</a:t>
             </a:r>
-            <a:endParaRPr lang="en-US"/>
           </a:p>
         </p:txBody>
       </p:sp>
@@ -4294,7 +4272,7 @@
           <a:p>
             <a:fld id="{699DC775-C286-4358-8C92-D7E584E969B3}" type="datetimeFigureOut">
               <a:rPr lang="en-US" smtClean="0"/>
-              <a:t>4/10/2018</a:t>
+              <a:t>1/27/2019</a:t>
             </a:fld>
             <a:endParaRPr lang="en-US"/>
           </a:p>
@@ -4397,10 +4375,9 @@
           </a:lstStyle>
           <a:p>
             <a:r>
-              <a:rPr lang="en-US" smtClean="0"/>
+              <a:rPr lang="en-US"/>
               <a:t>Click to edit Master title style</a:t>
             </a:r>
-            <a:endParaRPr lang="en-US"/>
           </a:p>
         </p:txBody>
       </p:sp>
@@ -4524,7 +4501,7 @@
           <a:p>
             <a:pPr lvl="0"/>
             <a:r>
-              <a:rPr lang="en-US" smtClean="0"/>
+              <a:rPr lang="en-US"/>
               <a:t>Click to edit Master text styles</a:t>
             </a:r>
           </a:p>
@@ -4547,7 +4524,7 @@
           <a:p>
             <a:fld id="{699DC775-C286-4358-8C92-D7E584E969B3}" type="datetimeFigureOut">
               <a:rPr lang="en-US" smtClean="0"/>
-              <a:t>4/10/2018</a:t>
+              <a:t>1/27/2019</a:t>
             </a:fld>
             <a:endParaRPr lang="en-US"/>
           </a:p>
@@ -4641,10 +4618,9 @@
           <a:lstStyle/>
           <a:p>
             <a:r>
-              <a:rPr lang="en-US" smtClean="0"/>
+              <a:rPr lang="en-US"/>
               <a:t>Click to edit Master title style</a:t>
             </a:r>
-            <a:endParaRPr lang="en-US"/>
           </a:p>
         </p:txBody>
       </p:sp>
@@ -4665,38 +4641,37 @@
           <a:p>
             <a:pPr lvl="0"/>
             <a:r>
-              <a:rPr lang="en-US" smtClean="0"/>
+              <a:rPr lang="en-US"/>
               <a:t>Click to edit Master text styles</a:t>
             </a:r>
           </a:p>
           <a:p>
             <a:pPr lvl="1"/>
             <a:r>
-              <a:rPr lang="en-US" smtClean="0"/>
+              <a:rPr lang="en-US"/>
               <a:t>Second level</a:t>
             </a:r>
           </a:p>
           <a:p>
             <a:pPr lvl="2"/>
             <a:r>
-              <a:rPr lang="en-US" smtClean="0"/>
+              <a:rPr lang="en-US"/>
               <a:t>Third level</a:t>
             </a:r>
           </a:p>
           <a:p>
             <a:pPr lvl="3"/>
             <a:r>
-              <a:rPr lang="en-US" smtClean="0"/>
+              <a:rPr lang="en-US"/>
               <a:t>Fourth level</a:t>
             </a:r>
           </a:p>
           <a:p>
             <a:pPr lvl="4"/>
             <a:r>
-              <a:rPr lang="en-US" smtClean="0"/>
+              <a:rPr lang="en-US"/>
               <a:t>Fifth level</a:t>
             </a:r>
-            <a:endParaRPr lang="en-US"/>
           </a:p>
         </p:txBody>
       </p:sp>
@@ -4717,7 +4692,7 @@
           <a:p>
             <a:fld id="{699DC775-C286-4358-8C92-D7E584E969B3}" type="datetimeFigureOut">
               <a:rPr lang="en-US" smtClean="0"/>
-              <a:t>4/10/2018</a:t>
+              <a:t>1/27/2019</a:t>
             </a:fld>
             <a:endParaRPr lang="en-US"/>
           </a:p>
@@ -4816,10 +4791,9 @@
           <a:lstStyle/>
           <a:p>
             <a:r>
-              <a:rPr lang="en-US" smtClean="0"/>
+              <a:rPr lang="en-US"/>
               <a:t>Click to edit Master title style</a:t>
             </a:r>
-            <a:endParaRPr lang="en-US"/>
           </a:p>
         </p:txBody>
       </p:sp>
@@ -4845,38 +4819,37 @@
           <a:p>
             <a:pPr lvl="0"/>
             <a:r>
-              <a:rPr lang="en-US" smtClean="0"/>
+              <a:rPr lang="en-US"/>
               <a:t>Click to edit Master text styles</a:t>
             </a:r>
           </a:p>
           <a:p>
             <a:pPr lvl="1"/>
             <a:r>
-              <a:rPr lang="en-US" smtClean="0"/>
+              <a:rPr lang="en-US"/>
               <a:t>Second level</a:t>
             </a:r>
           </a:p>
           <a:p>
             <a:pPr lvl="2"/>
             <a:r>
-              <a:rPr lang="en-US" smtClean="0"/>
+              <a:rPr lang="en-US"/>
               <a:t>Third level</a:t>
             </a:r>
           </a:p>
           <a:p>
             <a:pPr lvl="3"/>
             <a:r>
-              <a:rPr lang="en-US" smtClean="0"/>
+              <a:rPr lang="en-US"/>
               <a:t>Fourth level</a:t>
             </a:r>
           </a:p>
           <a:p>
             <a:pPr lvl="4"/>
             <a:r>
-              <a:rPr lang="en-US" smtClean="0"/>
+              <a:rPr lang="en-US"/>
               <a:t>Fifth level</a:t>
             </a:r>
-            <a:endParaRPr lang="en-US"/>
           </a:p>
         </p:txBody>
       </p:sp>
@@ -4897,7 +4870,7 @@
           <a:p>
             <a:fld id="{699DC775-C286-4358-8C92-D7E584E969B3}" type="datetimeFigureOut">
               <a:rPr lang="en-US" smtClean="0"/>
-              <a:t>4/10/2018</a:t>
+              <a:t>1/27/2019</a:t>
             </a:fld>
             <a:endParaRPr lang="en-US"/>
           </a:p>
@@ -5004,10 +4977,9 @@
           <a:lstStyle/>
           <a:p>
             <a:r>
-              <a:rPr lang="en-US" smtClean="0"/>
+              <a:rPr lang="en-US"/>
               <a:t>Click to edit Master title style</a:t>
             </a:r>
-            <a:endParaRPr lang="en-US"/>
           </a:p>
         </p:txBody>
       </p:sp>
@@ -5123,10 +5095,9 @@
           </a:lstStyle>
           <a:p>
             <a:r>
-              <a:rPr lang="en-US" smtClean="0"/>
+              <a:rPr lang="en-US"/>
               <a:t>Click to edit Master subtitle style</a:t>
             </a:r>
-            <a:endParaRPr lang="en-US"/>
           </a:p>
         </p:txBody>
       </p:sp>
@@ -5147,7 +5118,7 @@
           <a:p>
             <a:fld id="{699DC775-C286-4358-8C92-D7E584E969B3}" type="datetimeFigureOut">
               <a:rPr lang="en-US" smtClean="0"/>
-              <a:t>4/10/2018</a:t>
+              <a:t>1/27/2019</a:t>
             </a:fld>
             <a:endParaRPr lang="en-US"/>
           </a:p>
@@ -5249,10 +5220,9 @@
           <a:lstStyle/>
           <a:p>
             <a:r>
-              <a:rPr lang="en-US" smtClean="0"/>
+              <a:rPr lang="en-US"/>
               <a:t>Click to edit Master title style</a:t>
             </a:r>
-            <a:endParaRPr lang="en-US"/>
           </a:p>
         </p:txBody>
       </p:sp>
@@ -5273,38 +5243,37 @@
           <a:p>
             <a:pPr lvl="0"/>
             <a:r>
-              <a:rPr lang="en-US" smtClean="0"/>
+              <a:rPr lang="en-US"/>
               <a:t>Click to edit Master text styles</a:t>
             </a:r>
           </a:p>
           <a:p>
             <a:pPr lvl="1"/>
             <a:r>
-              <a:rPr lang="en-US" smtClean="0"/>
+              <a:rPr lang="en-US"/>
               <a:t>Second level</a:t>
             </a:r>
           </a:p>
           <a:p>
             <a:pPr lvl="2"/>
             <a:r>
-              <a:rPr lang="en-US" smtClean="0"/>
+              <a:rPr lang="en-US"/>
               <a:t>Third level</a:t>
             </a:r>
           </a:p>
           <a:p>
             <a:pPr lvl="3"/>
             <a:r>
-              <a:rPr lang="en-US" smtClean="0"/>
+              <a:rPr lang="en-US"/>
               <a:t>Fourth level</a:t>
             </a:r>
           </a:p>
           <a:p>
             <a:pPr lvl="4"/>
             <a:r>
-              <a:rPr lang="en-US" smtClean="0"/>
+              <a:rPr lang="en-US"/>
               <a:t>Fifth level</a:t>
             </a:r>
-            <a:endParaRPr lang="en-US"/>
           </a:p>
         </p:txBody>
       </p:sp>
@@ -5325,7 +5294,7 @@
           <a:p>
             <a:fld id="{699DC775-C286-4358-8C92-D7E584E969B3}" type="datetimeFigureOut">
               <a:rPr lang="en-US" smtClean="0"/>
-              <a:t>4/10/2018</a:t>
+              <a:t>1/27/2019</a:t>
             </a:fld>
             <a:endParaRPr lang="en-US"/>
           </a:p>
@@ -5436,10 +5405,9 @@
           </a:lstStyle>
           <a:p>
             <a:r>
-              <a:rPr lang="en-US" smtClean="0"/>
+              <a:rPr lang="en-US"/>
               <a:t>Click to edit Master title style</a:t>
             </a:r>
-            <a:endParaRPr lang="en-US"/>
           </a:p>
         </p:txBody>
       </p:sp>
@@ -5556,7 +5524,7 @@
           <a:p>
             <a:pPr lvl="0"/>
             <a:r>
-              <a:rPr lang="en-US" smtClean="0"/>
+              <a:rPr lang="en-US"/>
               <a:t>Click to edit Master text styles</a:t>
             </a:r>
           </a:p>
@@ -5579,7 +5547,7 @@
           <a:p>
             <a:fld id="{699DC775-C286-4358-8C92-D7E584E969B3}" type="datetimeFigureOut">
               <a:rPr lang="en-US" smtClean="0"/>
-              <a:t>4/10/2018</a:t>
+              <a:t>1/27/2019</a:t>
             </a:fld>
             <a:endParaRPr lang="en-US"/>
           </a:p>
@@ -5681,10 +5649,9 @@
           <a:lstStyle/>
           <a:p>
             <a:r>
-              <a:rPr lang="en-US" smtClean="0"/>
+              <a:rPr lang="en-US"/>
               <a:t>Click to edit Master title style</a:t>
             </a:r>
-            <a:endParaRPr lang="en-US"/>
           </a:p>
         </p:txBody>
       </p:sp>
@@ -5738,38 +5705,37 @@
           <a:p>
             <a:pPr lvl="0"/>
             <a:r>
-              <a:rPr lang="en-US" smtClean="0"/>
+              <a:rPr lang="en-US"/>
               <a:t>Click to edit Master text styles</a:t>
             </a:r>
           </a:p>
           <a:p>
             <a:pPr lvl="1"/>
             <a:r>
-              <a:rPr lang="en-US" smtClean="0"/>
+              <a:rPr lang="en-US"/>
               <a:t>Second level</a:t>
             </a:r>
           </a:p>
           <a:p>
             <a:pPr lvl="2"/>
             <a:r>
-              <a:rPr lang="en-US" smtClean="0"/>
+              <a:rPr lang="en-US"/>
               <a:t>Third level</a:t>
             </a:r>
           </a:p>
           <a:p>
             <a:pPr lvl="3"/>
             <a:r>
-              <a:rPr lang="en-US" smtClean="0"/>
+              <a:rPr lang="en-US"/>
               <a:t>Fourth level</a:t>
             </a:r>
           </a:p>
           <a:p>
             <a:pPr lvl="4"/>
             <a:r>
-              <a:rPr lang="en-US" smtClean="0"/>
+              <a:rPr lang="en-US"/>
               <a:t>Fifth level</a:t>
             </a:r>
-            <a:endParaRPr lang="en-US"/>
           </a:p>
         </p:txBody>
       </p:sp>
@@ -5823,38 +5789,37 @@
           <a:p>
             <a:pPr lvl="0"/>
             <a:r>
-              <a:rPr lang="en-US" smtClean="0"/>
+              <a:rPr lang="en-US"/>
               <a:t>Click to edit Master text styles</a:t>
             </a:r>
           </a:p>
           <a:p>
             <a:pPr lvl="1"/>
             <a:r>
-              <a:rPr lang="en-US" smtClean="0"/>
+              <a:rPr lang="en-US"/>
               <a:t>Second level</a:t>
             </a:r>
           </a:p>
           <a:p>
             <a:pPr lvl="2"/>
             <a:r>
-              <a:rPr lang="en-US" smtClean="0"/>
+              <a:rPr lang="en-US"/>
               <a:t>Third level</a:t>
             </a:r>
           </a:p>
           <a:p>
             <a:pPr lvl="3"/>
             <a:r>
-              <a:rPr lang="en-US" smtClean="0"/>
+              <a:rPr lang="en-US"/>
               <a:t>Fourth level</a:t>
             </a:r>
           </a:p>
           <a:p>
             <a:pPr lvl="4"/>
             <a:r>
-              <a:rPr lang="en-US" smtClean="0"/>
+              <a:rPr lang="en-US"/>
               <a:t>Fifth level</a:t>
             </a:r>
-            <a:endParaRPr lang="en-US"/>
           </a:p>
         </p:txBody>
       </p:sp>
@@ -5875,7 +5840,7 @@
           <a:p>
             <a:fld id="{699DC775-C286-4358-8C92-D7E584E969B3}" type="datetimeFigureOut">
               <a:rPr lang="en-US" smtClean="0"/>
-              <a:t>4/10/2018</a:t>
+              <a:t>1/27/2019</a:t>
             </a:fld>
             <a:endParaRPr lang="en-US"/>
           </a:p>
@@ -5981,10 +5946,9 @@
           </a:lstStyle>
           <a:p>
             <a:r>
-              <a:rPr lang="en-US" smtClean="0"/>
+              <a:rPr lang="en-US"/>
               <a:t>Click to edit Master title style</a:t>
             </a:r>
-            <a:endParaRPr lang="en-US"/>
           </a:p>
         </p:txBody>
       </p:sp>
@@ -6047,7 +6011,7 @@
           <a:p>
             <a:pPr lvl="0"/>
             <a:r>
-              <a:rPr lang="en-US" smtClean="0"/>
+              <a:rPr lang="en-US"/>
               <a:t>Click to edit Master text styles</a:t>
             </a:r>
           </a:p>
@@ -6103,38 +6067,37 @@
           <a:p>
             <a:pPr lvl="0"/>
             <a:r>
-              <a:rPr lang="en-US" smtClean="0"/>
+              <a:rPr lang="en-US"/>
               <a:t>Click to edit Master text styles</a:t>
             </a:r>
           </a:p>
           <a:p>
             <a:pPr lvl="1"/>
             <a:r>
-              <a:rPr lang="en-US" smtClean="0"/>
+              <a:rPr lang="en-US"/>
               <a:t>Second level</a:t>
             </a:r>
           </a:p>
           <a:p>
             <a:pPr lvl="2"/>
             <a:r>
-              <a:rPr lang="en-US" smtClean="0"/>
+              <a:rPr lang="en-US"/>
               <a:t>Third level</a:t>
             </a:r>
           </a:p>
           <a:p>
             <a:pPr lvl="3"/>
             <a:r>
-              <a:rPr lang="en-US" smtClean="0"/>
+              <a:rPr lang="en-US"/>
               <a:t>Fourth level</a:t>
             </a:r>
           </a:p>
           <a:p>
             <a:pPr lvl="4"/>
             <a:r>
-              <a:rPr lang="en-US" smtClean="0"/>
+              <a:rPr lang="en-US"/>
               <a:t>Fifth level</a:t>
             </a:r>
-            <a:endParaRPr lang="en-US"/>
           </a:p>
         </p:txBody>
       </p:sp>
@@ -6197,7 +6160,7 @@
           <a:p>
             <a:pPr lvl="0"/>
             <a:r>
-              <a:rPr lang="en-US" smtClean="0"/>
+              <a:rPr lang="en-US"/>
               <a:t>Click to edit Master text styles</a:t>
             </a:r>
           </a:p>
@@ -6253,38 +6216,37 @@
           <a:p>
             <a:pPr lvl="0"/>
             <a:r>
-              <a:rPr lang="en-US" smtClean="0"/>
+              <a:rPr lang="en-US"/>
               <a:t>Click to edit Master text styles</a:t>
             </a:r>
           </a:p>
           <a:p>
             <a:pPr lvl="1"/>
             <a:r>
-              <a:rPr lang="en-US" smtClean="0"/>
+              <a:rPr lang="en-US"/>
               <a:t>Second level</a:t>
             </a:r>
           </a:p>
           <a:p>
             <a:pPr lvl="2"/>
             <a:r>
-              <a:rPr lang="en-US" smtClean="0"/>
+              <a:rPr lang="en-US"/>
               <a:t>Third level</a:t>
             </a:r>
           </a:p>
           <a:p>
             <a:pPr lvl="3"/>
             <a:r>
-              <a:rPr lang="en-US" smtClean="0"/>
+              <a:rPr lang="en-US"/>
               <a:t>Fourth level</a:t>
             </a:r>
           </a:p>
           <a:p>
             <a:pPr lvl="4"/>
             <a:r>
-              <a:rPr lang="en-US" smtClean="0"/>
+              <a:rPr lang="en-US"/>
               <a:t>Fifth level</a:t>
             </a:r>
-            <a:endParaRPr lang="en-US"/>
           </a:p>
         </p:txBody>
       </p:sp>
@@ -6305,7 +6267,7 @@
           <a:p>
             <a:fld id="{699DC775-C286-4358-8C92-D7E584E969B3}" type="datetimeFigureOut">
               <a:rPr lang="en-US" smtClean="0"/>
-              <a:t>4/10/2018</a:t>
+              <a:t>1/27/2019</a:t>
             </a:fld>
             <a:endParaRPr lang="en-US"/>
           </a:p>
@@ -6407,10 +6369,9 @@
           <a:lstStyle/>
           <a:p>
             <a:r>
-              <a:rPr lang="en-US" smtClean="0"/>
+              <a:rPr lang="en-US"/>
               <a:t>Click to edit Master title style</a:t>
             </a:r>
-            <a:endParaRPr lang="en-US"/>
           </a:p>
         </p:txBody>
       </p:sp>
@@ -6431,7 +6392,7 @@
           <a:p>
             <a:fld id="{699DC775-C286-4358-8C92-D7E584E969B3}" type="datetimeFigureOut">
               <a:rPr lang="en-US" smtClean="0"/>
-              <a:t>4/10/2018</a:t>
+              <a:t>1/27/2019</a:t>
             </a:fld>
             <a:endParaRPr lang="en-US"/>
           </a:p>
@@ -6534,7 +6495,7 @@
           <a:p>
             <a:fld id="{699DC775-C286-4358-8C92-D7E584E969B3}" type="datetimeFigureOut">
               <a:rPr lang="en-US" smtClean="0"/>
-              <a:t>4/10/2018</a:t>
+              <a:t>1/27/2019</a:t>
             </a:fld>
             <a:endParaRPr lang="en-US"/>
           </a:p>
@@ -6637,10 +6598,9 @@
           </a:lstStyle>
           <a:p>
             <a:r>
-              <a:rPr lang="en-US" smtClean="0"/>
+              <a:rPr lang="en-US"/>
               <a:t>Click to edit Master title style</a:t>
             </a:r>
-            <a:endParaRPr lang="en-US"/>
           </a:p>
         </p:txBody>
       </p:sp>
@@ -6757,7 +6717,7 @@
           <a:p>
             <a:pPr lvl="0"/>
             <a:r>
-              <a:rPr lang="en-US" smtClean="0"/>
+              <a:rPr lang="en-US"/>
               <a:t>Click to edit Master text styles</a:t>
             </a:r>
           </a:p>
@@ -6780,7 +6740,7 @@
           <a:p>
             <a:fld id="{699DC775-C286-4358-8C92-D7E584E969B3}" type="datetimeFigureOut">
               <a:rPr lang="en-US" smtClean="0"/>
-              <a:t>4/10/2018</a:t>
+              <a:t>1/27/2019</a:t>
             </a:fld>
             <a:endParaRPr lang="en-US"/>
           </a:p>
@@ -6891,10 +6851,9 @@
           </a:lstStyle>
           <a:p>
             <a:r>
-              <a:rPr lang="en-US" smtClean="0"/>
+              <a:rPr lang="en-US"/>
               <a:t>Click to edit Master title style</a:t>
             </a:r>
-            <a:endParaRPr lang="en-US"/>
           </a:p>
         </p:txBody>
       </p:sp>
@@ -6948,38 +6907,37 @@
           <a:p>
             <a:pPr lvl="0"/>
             <a:r>
-              <a:rPr lang="en-US" smtClean="0"/>
+              <a:rPr lang="en-US"/>
               <a:t>Click to edit Master text styles</a:t>
             </a:r>
           </a:p>
           <a:p>
             <a:pPr lvl="1"/>
             <a:r>
-              <a:rPr lang="en-US" smtClean="0"/>
+              <a:rPr lang="en-US"/>
               <a:t>Second level</a:t>
             </a:r>
           </a:p>
           <a:p>
             <a:pPr lvl="2"/>
             <a:r>
-              <a:rPr lang="en-US" smtClean="0"/>
+              <a:rPr lang="en-US"/>
               <a:t>Third level</a:t>
             </a:r>
           </a:p>
           <a:p>
             <a:pPr lvl="3"/>
             <a:r>
-              <a:rPr lang="en-US" smtClean="0"/>
+              <a:rPr lang="en-US"/>
               <a:t>Fourth level</a:t>
             </a:r>
           </a:p>
           <a:p>
             <a:pPr lvl="4"/>
             <a:r>
-              <a:rPr lang="en-US" smtClean="0"/>
+              <a:rPr lang="en-US"/>
               <a:t>Fifth level</a:t>
             </a:r>
-            <a:endParaRPr lang="en-US"/>
           </a:p>
         </p:txBody>
       </p:sp>
@@ -7042,7 +7000,7 @@
           <a:p>
             <a:pPr lvl="0"/>
             <a:r>
-              <a:rPr lang="en-US" smtClean="0"/>
+              <a:rPr lang="en-US"/>
               <a:t>Click to edit Master text styles</a:t>
             </a:r>
           </a:p>
@@ -7065,7 +7023,7 @@
           <a:p>
             <a:fld id="{699DC775-C286-4358-8C92-D7E584E969B3}" type="datetimeFigureOut">
               <a:rPr lang="en-US" smtClean="0"/>
-              <a:t>4/10/2018</a:t>
+              <a:t>1/27/2019</a:t>
             </a:fld>
             <a:endParaRPr lang="en-US"/>
           </a:p>
@@ -7176,10 +7134,9 @@
           </a:lstStyle>
           <a:p>
             <a:r>
-              <a:rPr lang="en-US" smtClean="0"/>
+              <a:rPr lang="en-US"/>
               <a:t>Click to edit Master title style</a:t>
             </a:r>
-            <a:endParaRPr lang="en-US"/>
           </a:p>
         </p:txBody>
       </p:sp>
@@ -7303,7 +7260,7 @@
           <a:p>
             <a:pPr lvl="0"/>
             <a:r>
-              <a:rPr lang="en-US" smtClean="0"/>
+              <a:rPr lang="en-US"/>
               <a:t>Click to edit Master text styles</a:t>
             </a:r>
           </a:p>
@@ -7326,7 +7283,7 @@
           <a:p>
             <a:fld id="{699DC775-C286-4358-8C92-D7E584E969B3}" type="datetimeFigureOut">
               <a:rPr lang="en-US" smtClean="0"/>
-              <a:t>4/10/2018</a:t>
+              <a:t>1/27/2019</a:t>
             </a:fld>
             <a:endParaRPr lang="en-US"/>
           </a:p>
@@ -7428,10 +7385,9 @@
           <a:lstStyle/>
           <a:p>
             <a:r>
-              <a:rPr lang="en-US" smtClean="0"/>
+              <a:rPr lang="en-US"/>
               <a:t>Click to edit Master title style</a:t>
             </a:r>
-            <a:endParaRPr lang="en-US"/>
           </a:p>
         </p:txBody>
       </p:sp>
@@ -7452,38 +7408,37 @@
           <a:p>
             <a:pPr lvl="0"/>
             <a:r>
-              <a:rPr lang="en-US" smtClean="0"/>
+              <a:rPr lang="en-US"/>
               <a:t>Click to edit Master text styles</a:t>
             </a:r>
           </a:p>
           <a:p>
             <a:pPr lvl="1"/>
             <a:r>
-              <a:rPr lang="en-US" smtClean="0"/>
+              <a:rPr lang="en-US"/>
               <a:t>Second level</a:t>
             </a:r>
           </a:p>
           <a:p>
             <a:pPr lvl="2"/>
             <a:r>
-              <a:rPr lang="en-US" smtClean="0"/>
+              <a:rPr lang="en-US"/>
               <a:t>Third level</a:t>
             </a:r>
           </a:p>
           <a:p>
             <a:pPr lvl="3"/>
             <a:r>
-              <a:rPr lang="en-US" smtClean="0"/>
+              <a:rPr lang="en-US"/>
               <a:t>Fourth level</a:t>
             </a:r>
           </a:p>
           <a:p>
             <a:pPr lvl="4"/>
             <a:r>
-              <a:rPr lang="en-US" smtClean="0"/>
+              <a:rPr lang="en-US"/>
               <a:t>Fifth level</a:t>
             </a:r>
-            <a:endParaRPr lang="en-US"/>
           </a:p>
         </p:txBody>
       </p:sp>
@@ -7504,7 +7459,7 @@
           <a:p>
             <a:fld id="{699DC775-C286-4358-8C92-D7E584E969B3}" type="datetimeFigureOut">
               <a:rPr lang="en-US" smtClean="0"/>
-              <a:t>4/10/2018</a:t>
+              <a:t>1/27/2019</a:t>
             </a:fld>
             <a:endParaRPr lang="en-US"/>
           </a:p>
@@ -7611,10 +7566,9 @@
           <a:lstStyle/>
           <a:p>
             <a:r>
-              <a:rPr lang="en-US" smtClean="0"/>
+              <a:rPr lang="en-US"/>
               <a:t>Click to edit Master title style</a:t>
             </a:r>
-            <a:endParaRPr lang="en-US"/>
           </a:p>
         </p:txBody>
       </p:sp>
@@ -7640,38 +7594,37 @@
           <a:p>
             <a:pPr lvl="0"/>
             <a:r>
-              <a:rPr lang="en-US" smtClean="0"/>
+              <a:rPr lang="en-US"/>
               <a:t>Click to edit Master text styles</a:t>
             </a:r>
           </a:p>
           <a:p>
             <a:pPr lvl="1"/>
             <a:r>
-              <a:rPr lang="en-US" smtClean="0"/>
+              <a:rPr lang="en-US"/>
               <a:t>Second level</a:t>
             </a:r>
           </a:p>
           <a:p>
             <a:pPr lvl="2"/>
             <a:r>
-              <a:rPr lang="en-US" smtClean="0"/>
+              <a:rPr lang="en-US"/>
               <a:t>Third level</a:t>
             </a:r>
           </a:p>
           <a:p>
             <a:pPr lvl="3"/>
             <a:r>
-              <a:rPr lang="en-US" smtClean="0"/>
+              <a:rPr lang="en-US"/>
               <a:t>Fourth level</a:t>
             </a:r>
           </a:p>
           <a:p>
             <a:pPr lvl="4"/>
             <a:r>
-              <a:rPr lang="en-US" smtClean="0"/>
+              <a:rPr lang="en-US"/>
               <a:t>Fifth level</a:t>
             </a:r>
-            <a:endParaRPr lang="en-US"/>
           </a:p>
         </p:txBody>
       </p:sp>
@@ -7692,7 +7645,7 @@
           <a:p>
             <a:fld id="{699DC775-C286-4358-8C92-D7E584E969B3}" type="datetimeFigureOut">
               <a:rPr lang="en-US" smtClean="0"/>
-              <a:t>4/10/2018</a:t>
+              <a:t>1/27/2019</a:t>
             </a:fld>
             <a:endParaRPr lang="en-US"/>
           </a:p>
@@ -7786,10 +7739,9 @@
           <a:lstStyle/>
           <a:p>
             <a:r>
-              <a:rPr lang="en-US" smtClean="0"/>
+              <a:rPr lang="en-US"/>
               <a:t>Click to edit Master title style</a:t>
             </a:r>
-            <a:endParaRPr lang="en-US"/>
           </a:p>
         </p:txBody>
       </p:sp>
@@ -7843,38 +7795,37 @@
           <a:p>
             <a:pPr lvl="0"/>
             <a:r>
-              <a:rPr lang="en-US" smtClean="0"/>
+              <a:rPr lang="en-US"/>
               <a:t>Click to edit Master text styles</a:t>
             </a:r>
           </a:p>
           <a:p>
             <a:pPr lvl="1"/>
             <a:r>
-              <a:rPr lang="en-US" smtClean="0"/>
+              <a:rPr lang="en-US"/>
               <a:t>Second level</a:t>
             </a:r>
           </a:p>
           <a:p>
             <a:pPr lvl="2"/>
             <a:r>
-              <a:rPr lang="en-US" smtClean="0"/>
+              <a:rPr lang="en-US"/>
               <a:t>Third level</a:t>
             </a:r>
           </a:p>
           <a:p>
             <a:pPr lvl="3"/>
             <a:r>
-              <a:rPr lang="en-US" smtClean="0"/>
+              <a:rPr lang="en-US"/>
               <a:t>Fourth level</a:t>
             </a:r>
           </a:p>
           <a:p>
             <a:pPr lvl="4"/>
             <a:r>
-              <a:rPr lang="en-US" smtClean="0"/>
+              <a:rPr lang="en-US"/>
               <a:t>Fifth level</a:t>
             </a:r>
-            <a:endParaRPr lang="en-US"/>
           </a:p>
         </p:txBody>
       </p:sp>
@@ -7928,38 +7879,37 @@
           <a:p>
             <a:pPr lvl="0"/>
             <a:r>
-              <a:rPr lang="en-US" smtClean="0"/>
+              <a:rPr lang="en-US"/>
               <a:t>Click to edit Master text styles</a:t>
             </a:r>
           </a:p>
           <a:p>
             <a:pPr lvl="1"/>
             <a:r>
-              <a:rPr lang="en-US" smtClean="0"/>
+              <a:rPr lang="en-US"/>
               <a:t>Second level</a:t>
             </a:r>
           </a:p>
           <a:p>
             <a:pPr lvl="2"/>
             <a:r>
-              <a:rPr lang="en-US" smtClean="0"/>
+              <a:rPr lang="en-US"/>
               <a:t>Third level</a:t>
             </a:r>
           </a:p>
           <a:p>
             <a:pPr lvl="3"/>
             <a:r>
-              <a:rPr lang="en-US" smtClean="0"/>
+              <a:rPr lang="en-US"/>
               <a:t>Fourth level</a:t>
             </a:r>
           </a:p>
           <a:p>
             <a:pPr lvl="4"/>
             <a:r>
-              <a:rPr lang="en-US" smtClean="0"/>
+              <a:rPr lang="en-US"/>
               <a:t>Fifth level</a:t>
             </a:r>
-            <a:endParaRPr lang="en-US"/>
           </a:p>
         </p:txBody>
       </p:sp>
@@ -7980,7 +7930,7 @@
           <a:p>
             <a:fld id="{699DC775-C286-4358-8C92-D7E584E969B3}" type="datetimeFigureOut">
               <a:rPr lang="en-US" smtClean="0"/>
-              <a:t>4/10/2018</a:t>
+              <a:t>1/27/2019</a:t>
             </a:fld>
             <a:endParaRPr lang="en-US"/>
           </a:p>
@@ -8078,10 +8028,9 @@
           </a:lstStyle>
           <a:p>
             <a:r>
-              <a:rPr lang="en-US" smtClean="0"/>
+              <a:rPr lang="en-US"/>
               <a:t>Click to edit Master title style</a:t>
             </a:r>
-            <a:endParaRPr lang="en-US"/>
           </a:p>
         </p:txBody>
       </p:sp>
@@ -8144,7 +8093,7 @@
           <a:p>
             <a:pPr lvl="0"/>
             <a:r>
-              <a:rPr lang="en-US" smtClean="0"/>
+              <a:rPr lang="en-US"/>
               <a:t>Click to edit Master text styles</a:t>
             </a:r>
           </a:p>
@@ -8200,38 +8149,37 @@
           <a:p>
             <a:pPr lvl="0"/>
             <a:r>
-              <a:rPr lang="en-US" smtClean="0"/>
+              <a:rPr lang="en-US"/>
               <a:t>Click to edit Master text styles</a:t>
             </a:r>
           </a:p>
           <a:p>
             <a:pPr lvl="1"/>
             <a:r>
-              <a:rPr lang="en-US" smtClean="0"/>
+              <a:rPr lang="en-US"/>
               <a:t>Second level</a:t>
             </a:r>
           </a:p>
           <a:p>
             <a:pPr lvl="2"/>
             <a:r>
-              <a:rPr lang="en-US" smtClean="0"/>
+              <a:rPr lang="en-US"/>
               <a:t>Third level</a:t>
             </a:r>
           </a:p>
           <a:p>
             <a:pPr lvl="3"/>
             <a:r>
-              <a:rPr lang="en-US" smtClean="0"/>
+              <a:rPr lang="en-US"/>
               <a:t>Fourth level</a:t>
             </a:r>
           </a:p>
           <a:p>
             <a:pPr lvl="4"/>
             <a:r>
-              <a:rPr lang="en-US" smtClean="0"/>
+              <a:rPr lang="en-US"/>
               <a:t>Fifth level</a:t>
             </a:r>
-            <a:endParaRPr lang="en-US"/>
           </a:p>
         </p:txBody>
       </p:sp>
@@ -8294,7 +8242,7 @@
           <a:p>
             <a:pPr lvl="0"/>
             <a:r>
-              <a:rPr lang="en-US" smtClean="0"/>
+              <a:rPr lang="en-US"/>
               <a:t>Click to edit Master text styles</a:t>
             </a:r>
           </a:p>
@@ -8350,38 +8298,37 @@
           <a:p>
             <a:pPr lvl="0"/>
             <a:r>
-              <a:rPr lang="en-US" smtClean="0"/>
+              <a:rPr lang="en-US"/>
               <a:t>Click to edit Master text styles</a:t>
             </a:r>
           </a:p>
           <a:p>
             <a:pPr lvl="1"/>
             <a:r>
-              <a:rPr lang="en-US" smtClean="0"/>
+              <a:rPr lang="en-US"/>
               <a:t>Second level</a:t>
             </a:r>
           </a:p>
           <a:p>
             <a:pPr lvl="2"/>
             <a:r>
-              <a:rPr lang="en-US" smtClean="0"/>
+              <a:rPr lang="en-US"/>
               <a:t>Third level</a:t>
             </a:r>
           </a:p>
           <a:p>
             <a:pPr lvl="3"/>
             <a:r>
-              <a:rPr lang="en-US" smtClean="0"/>
+              <a:rPr lang="en-US"/>
               <a:t>Fourth level</a:t>
             </a:r>
           </a:p>
           <a:p>
             <a:pPr lvl="4"/>
             <a:r>
-              <a:rPr lang="en-US" smtClean="0"/>
+              <a:rPr lang="en-US"/>
               <a:t>Fifth level</a:t>
             </a:r>
-            <a:endParaRPr lang="en-US"/>
           </a:p>
         </p:txBody>
       </p:sp>
@@ -8402,7 +8349,7 @@
           <a:p>
             <a:fld id="{699DC775-C286-4358-8C92-D7E584E969B3}" type="datetimeFigureOut">
               <a:rPr lang="en-US" smtClean="0"/>
-              <a:t>4/10/2018</a:t>
+              <a:t>1/27/2019</a:t>
             </a:fld>
             <a:endParaRPr lang="en-US"/>
           </a:p>
@@ -8496,10 +8443,9 @@
           <a:lstStyle/>
           <a:p>
             <a:r>
-              <a:rPr lang="en-US" smtClean="0"/>
+              <a:rPr lang="en-US"/>
               <a:t>Click to edit Master title style</a:t>
             </a:r>
-            <a:endParaRPr lang="en-US"/>
           </a:p>
         </p:txBody>
       </p:sp>
@@ -8520,7 +8466,7 @@
           <a:p>
             <a:fld id="{699DC775-C286-4358-8C92-D7E584E969B3}" type="datetimeFigureOut">
               <a:rPr lang="en-US" smtClean="0"/>
-              <a:t>4/10/2018</a:t>
+              <a:t>1/27/2019</a:t>
             </a:fld>
             <a:endParaRPr lang="en-US"/>
           </a:p>
@@ -8615,7 +8561,7 @@
           <a:p>
             <a:fld id="{699DC775-C286-4358-8C92-D7E584E969B3}" type="datetimeFigureOut">
               <a:rPr lang="en-US" smtClean="0"/>
-              <a:t>4/10/2018</a:t>
+              <a:t>1/27/2019</a:t>
             </a:fld>
             <a:endParaRPr lang="en-US"/>
           </a:p>
@@ -8718,10 +8664,9 @@
           </a:lstStyle>
           <a:p>
             <a:r>
-              <a:rPr lang="en-US" smtClean="0"/>
+              <a:rPr lang="en-US"/>
               <a:t>Click to edit Master title style</a:t>
             </a:r>
-            <a:endParaRPr lang="en-US"/>
           </a:p>
         </p:txBody>
       </p:sp>
@@ -8775,38 +8720,37 @@
           <a:p>
             <a:pPr lvl="0"/>
             <a:r>
-              <a:rPr lang="en-US" smtClean="0"/>
+              <a:rPr lang="en-US"/>
               <a:t>Click to edit Master text styles</a:t>
             </a:r>
           </a:p>
           <a:p>
             <a:pPr lvl="1"/>
             <a:r>
-              <a:rPr lang="en-US" smtClean="0"/>
+              <a:rPr lang="en-US"/>
               <a:t>Second level</a:t>
             </a:r>
           </a:p>
           <a:p>
             <a:pPr lvl="2"/>
             <a:r>
-              <a:rPr lang="en-US" smtClean="0"/>
+              <a:rPr lang="en-US"/>
               <a:t>Third level</a:t>
             </a:r>
           </a:p>
           <a:p>
             <a:pPr lvl="3"/>
             <a:r>
-              <a:rPr lang="en-US" smtClean="0"/>
+              <a:rPr lang="en-US"/>
               <a:t>Fourth level</a:t>
             </a:r>
           </a:p>
           <a:p>
             <a:pPr lvl="4"/>
             <a:r>
-              <a:rPr lang="en-US" smtClean="0"/>
+              <a:rPr lang="en-US"/>
               <a:t>Fifth level</a:t>
             </a:r>
-            <a:endParaRPr lang="en-US"/>
           </a:p>
         </p:txBody>
       </p:sp>
@@ -8869,7 +8813,7 @@
           <a:p>
             <a:pPr lvl="0"/>
             <a:r>
-              <a:rPr lang="en-US" smtClean="0"/>
+              <a:rPr lang="en-US"/>
               <a:t>Click to edit Master text styles</a:t>
             </a:r>
           </a:p>
@@ -8892,7 +8836,7 @@
           <a:p>
             <a:fld id="{699DC775-C286-4358-8C92-D7E584E969B3}" type="datetimeFigureOut">
               <a:rPr lang="en-US" smtClean="0"/>
-              <a:t>4/10/2018</a:t>
+              <a:t>1/27/2019</a:t>
             </a:fld>
             <a:endParaRPr lang="en-US"/>
           </a:p>
@@ -8995,10 +8939,9 @@
           </a:lstStyle>
           <a:p>
             <a:r>
-              <a:rPr lang="en-US" smtClean="0"/>
+              <a:rPr lang="en-US"/>
               <a:t>Click to edit Master title style</a:t>
             </a:r>
-            <a:endParaRPr lang="en-US"/>
           </a:p>
         </p:txBody>
       </p:sp>
@@ -9122,7 +9065,7 @@
           <a:p>
             <a:pPr lvl="0"/>
             <a:r>
-              <a:rPr lang="en-US" smtClean="0"/>
+              <a:rPr lang="en-US"/>
               <a:t>Click to edit Master text styles</a:t>
             </a:r>
           </a:p>
@@ -9145,7 +9088,7 @@
           <a:p>
             <a:fld id="{699DC775-C286-4358-8C92-D7E584E969B3}" type="datetimeFigureOut">
               <a:rPr lang="en-US" smtClean="0"/>
-              <a:t>4/10/2018</a:t>
+              <a:t>1/27/2019</a:t>
             </a:fld>
             <a:endParaRPr lang="en-US"/>
           </a:p>
@@ -9254,10 +9197,9 @@
           <a:lstStyle/>
           <a:p>
             <a:r>
-              <a:rPr lang="en-US" smtClean="0"/>
+              <a:rPr lang="en-US"/>
               <a:t>Click to edit Master title style</a:t>
             </a:r>
-            <a:endParaRPr lang="en-US"/>
           </a:p>
         </p:txBody>
       </p:sp>
@@ -9288,38 +9230,37 @@
           <a:p>
             <a:pPr lvl="0"/>
             <a:r>
-              <a:rPr lang="en-US" smtClean="0"/>
+              <a:rPr lang="en-US"/>
               <a:t>Click to edit Master text styles</a:t>
             </a:r>
           </a:p>
           <a:p>
             <a:pPr lvl="1"/>
             <a:r>
-              <a:rPr lang="en-US" smtClean="0"/>
+              <a:rPr lang="en-US"/>
               <a:t>Second level</a:t>
             </a:r>
           </a:p>
           <a:p>
             <a:pPr lvl="2"/>
             <a:r>
-              <a:rPr lang="en-US" smtClean="0"/>
+              <a:rPr lang="en-US"/>
               <a:t>Third level</a:t>
             </a:r>
           </a:p>
           <a:p>
             <a:pPr lvl="3"/>
             <a:r>
-              <a:rPr lang="en-US" smtClean="0"/>
+              <a:rPr lang="en-US"/>
               <a:t>Fourth level</a:t>
             </a:r>
           </a:p>
           <a:p>
             <a:pPr lvl="4"/>
             <a:r>
-              <a:rPr lang="en-US" smtClean="0"/>
+              <a:rPr lang="en-US"/>
               <a:t>Fifth level</a:t>
             </a:r>
-            <a:endParaRPr lang="en-US"/>
           </a:p>
         </p:txBody>
       </p:sp>
@@ -9358,7 +9299,7 @@
           <a:p>
             <a:fld id="{699DC775-C286-4358-8C92-D7E584E969B3}" type="datetimeFigureOut">
               <a:rPr lang="en-US" smtClean="0"/>
-              <a:t>4/10/2018</a:t>
+              <a:t>1/27/2019</a:t>
             </a:fld>
             <a:endParaRPr lang="en-US"/>
           </a:p>
@@ -9769,10 +9710,9 @@
           <a:lstStyle/>
           <a:p>
             <a:r>
-              <a:rPr lang="en-US" smtClean="0"/>
+              <a:rPr lang="en-US"/>
               <a:t>Click to edit Master title style</a:t>
             </a:r>
-            <a:endParaRPr lang="en-US"/>
           </a:p>
         </p:txBody>
       </p:sp>
@@ -9803,38 +9743,37 @@
           <a:p>
             <a:pPr lvl="0"/>
             <a:r>
-              <a:rPr lang="en-US" smtClean="0"/>
+              <a:rPr lang="en-US"/>
               <a:t>Click to edit Master text styles</a:t>
             </a:r>
           </a:p>
           <a:p>
             <a:pPr lvl="1"/>
             <a:r>
-              <a:rPr lang="en-US" smtClean="0"/>
+              <a:rPr lang="en-US"/>
               <a:t>Second level</a:t>
             </a:r>
           </a:p>
           <a:p>
             <a:pPr lvl="2"/>
             <a:r>
-              <a:rPr lang="en-US" smtClean="0"/>
+              <a:rPr lang="en-US"/>
               <a:t>Third level</a:t>
             </a:r>
           </a:p>
           <a:p>
             <a:pPr lvl="3"/>
             <a:r>
-              <a:rPr lang="en-US" smtClean="0"/>
+              <a:rPr lang="en-US"/>
               <a:t>Fourth level</a:t>
             </a:r>
           </a:p>
           <a:p>
             <a:pPr lvl="4"/>
             <a:r>
-              <a:rPr lang="en-US" smtClean="0"/>
+              <a:rPr lang="en-US"/>
               <a:t>Fifth level</a:t>
             </a:r>
-            <a:endParaRPr lang="en-US"/>
           </a:p>
         </p:txBody>
       </p:sp>
@@ -9873,7 +9812,7 @@
           <a:p>
             <a:fld id="{699DC775-C286-4358-8C92-D7E584E969B3}" type="datetimeFigureOut">
               <a:rPr lang="en-US" smtClean="0"/>
-              <a:t>4/10/2018</a:t>
+              <a:t>1/27/2019</a:t>
             </a:fld>
             <a:endParaRPr lang="en-US"/>
           </a:p>
@@ -10282,10 +10221,9 @@
           <a:lstStyle/>
           <a:p>
             <a:r>
-              <a:rPr lang="en-US" dirty="0" smtClean="0"/>
+              <a:rPr lang="en-US" dirty="0"/>
               <a:t>Click to edit Master title style</a:t>
             </a:r>
-            <a:endParaRPr lang="en-US" dirty="0"/>
           </a:p>
         </p:txBody>
       </p:sp>
@@ -10316,38 +10254,37 @@
           <a:p>
             <a:pPr lvl="0"/>
             <a:r>
-              <a:rPr lang="en-US" smtClean="0"/>
+              <a:rPr lang="en-US"/>
               <a:t>Click to edit Master text styles</a:t>
             </a:r>
           </a:p>
           <a:p>
             <a:pPr lvl="1"/>
             <a:r>
-              <a:rPr lang="en-US" smtClean="0"/>
+              <a:rPr lang="en-US"/>
               <a:t>Second level</a:t>
             </a:r>
           </a:p>
           <a:p>
             <a:pPr lvl="2"/>
             <a:r>
-              <a:rPr lang="en-US" smtClean="0"/>
+              <a:rPr lang="en-US"/>
               <a:t>Third level</a:t>
             </a:r>
           </a:p>
           <a:p>
             <a:pPr lvl="3"/>
             <a:r>
-              <a:rPr lang="en-US" smtClean="0"/>
+              <a:rPr lang="en-US"/>
               <a:t>Fourth level</a:t>
             </a:r>
           </a:p>
           <a:p>
             <a:pPr lvl="4"/>
             <a:r>
-              <a:rPr lang="en-US" smtClean="0"/>
+              <a:rPr lang="en-US"/>
               <a:t>Fifth level</a:t>
             </a:r>
-            <a:endParaRPr lang="en-US"/>
           </a:p>
         </p:txBody>
       </p:sp>
@@ -10386,7 +10323,7 @@
           <a:p>
             <a:fld id="{699DC775-C286-4358-8C92-D7E584E969B3}" type="datetimeFigureOut">
               <a:rPr lang="en-US" smtClean="0"/>
-              <a:t>4/10/2018</a:t>
+              <a:t>1/27/2019</a:t>
             </a:fld>
             <a:endParaRPr lang="en-US"/>
           </a:p>
@@ -10779,7 +10716,7 @@
           <a:lstStyle/>
           <a:p>
             <a:r>
-              <a:rPr lang="en-US" sz="5400" b="1" dirty="0" err="1" smtClean="0">
+              <a:rPr lang="en-US" sz="5400" b="1" dirty="0" err="1">
                 <a:solidFill>
                   <a:schemeClr val="accent6">
                     <a:lumMod val="75000"/>
@@ -10789,7 +10726,7 @@
               <a:t>PowerPointLabs</a:t>
             </a:r>
             <a:r>
-              <a:rPr lang="en-US" sz="5400" b="1" dirty="0" smtClean="0">
+              <a:rPr lang="en-US" sz="5400" b="1" dirty="0">
                 <a:solidFill>
                   <a:schemeClr val="accent6">
                     <a:lumMod val="75000"/>
@@ -10827,7 +10764,7 @@
               <a:buNone/>
             </a:pPr>
             <a:r>
-              <a:rPr lang="en-US" b="1" dirty="0" smtClean="0">
+              <a:rPr lang="en-US" b="1" dirty="0">
                 <a:solidFill>
                   <a:srgbClr val="0070C0"/>
                 </a:solidFill>
@@ -10838,34 +10775,21 @@
           <a:p>
             <a:pPr marL="285750" indent="-285750"/>
             <a:r>
-              <a:rPr lang="en-US" b="1" dirty="0" smtClean="0">
-                <a:solidFill>
-                  <a:srgbClr val="0070C0"/>
-                </a:solidFill>
-              </a:rPr>
-              <a:t>DO </a:t>
-            </a:r>
-            <a:r>
               <a:rPr lang="en-US" b="1" dirty="0">
                 <a:solidFill>
                   <a:srgbClr val="0070C0"/>
                 </a:solidFill>
               </a:rPr>
-              <a:t>NOT SAVE </a:t>
-            </a:r>
-            <a:r>
-              <a:rPr lang="en-US" dirty="0" smtClean="0">
+              <a:t>DO NOT SAVE </a:t>
+            </a:r>
+            <a:r>
+              <a:rPr lang="en-US" dirty="0">
                 <a:solidFill>
                   <a:srgbClr val="0070C0"/>
                 </a:solidFill>
               </a:rPr>
               <a:t>these slides after testing. Keep this file in its original form.</a:t>
             </a:r>
-            <a:endParaRPr lang="en-US" dirty="0">
-              <a:solidFill>
-                <a:srgbClr val="0070C0"/>
-              </a:solidFill>
-            </a:endParaRPr>
           </a:p>
           <a:p>
             <a:pPr marL="285750" indent="-285750"/>
@@ -10875,47 +10799,7 @@
                   <a:srgbClr val="0070C0"/>
                 </a:solidFill>
               </a:rPr>
-              <a:t>If </a:t>
-            </a:r>
-            <a:r>
-              <a:rPr lang="en-US" dirty="0" smtClean="0">
-                <a:solidFill>
-                  <a:srgbClr val="0070C0"/>
-                </a:solidFill>
-              </a:rPr>
-              <a:t>your </a:t>
-            </a:r>
-            <a:r>
-              <a:rPr lang="en-US" dirty="0">
-                <a:solidFill>
-                  <a:srgbClr val="0070C0"/>
-                </a:solidFill>
-              </a:rPr>
-              <a:t>result </a:t>
-            </a:r>
-            <a:r>
-              <a:rPr lang="en-US" dirty="0" smtClean="0">
-                <a:solidFill>
-                  <a:srgbClr val="0070C0"/>
-                </a:solidFill>
-              </a:rPr>
-              <a:t>is different from the </a:t>
-            </a:r>
-            <a:r>
-              <a:rPr lang="en-US" dirty="0">
-                <a:solidFill>
-                  <a:srgbClr val="0070C0"/>
-                </a:solidFill>
-              </a:rPr>
-              <a:t>expected output, </a:t>
-            </a:r>
-            <a:r>
-              <a:rPr lang="en-US" dirty="0" smtClean="0">
-                <a:solidFill>
-                  <a:srgbClr val="0070C0"/>
-                </a:solidFill>
-              </a:rPr>
-              <a:t>please submit a bug report (attach slides/screenshots as necessary).</a:t>
+              <a:t>If your result is different from the expected output, please submit a bug report (attach slides/screenshots as necessary).</a:t>
             </a:r>
             <a:endParaRPr lang="en-SG" dirty="0">
               <a:solidFill>
@@ -10938,17 +10822,171 @@
   <p:clrMapOvr>
     <a:masterClrMapping/>
   </p:clrMapOvr>
-  <p:timing>
-    <p:tnLst>
-      <p:par>
-        <p:cTn id="1" dur="indefinite" restart="never" nodeType="tmRoot"/>
-      </p:par>
-    </p:tnLst>
-  </p:timing>
 </p:sld>
 </file>
 
 <file path=ppt/slides/slide10.xml><?xml version="1.0" encoding="utf-8"?>
+<p:sld xmlns:a="http://schemas.openxmlformats.org/drawingml/2006/main" xmlns:r="http://schemas.openxmlformats.org/officeDocument/2006/relationships" xmlns:p="http://schemas.openxmlformats.org/presentationml/2006/main">
+  <p:cSld>
+    <p:spTree>
+      <p:nvGrpSpPr>
+        <p:cNvPr id="1" name=""/>
+        <p:cNvGrpSpPr/>
+        <p:nvPr/>
+      </p:nvGrpSpPr>
+      <p:grpSpPr>
+        <a:xfrm>
+          <a:off x="0" y="0"/>
+          <a:ext cx="0" cy="0"/>
+          <a:chOff x="0" y="0"/>
+          <a:chExt cx="0" cy="0"/>
+        </a:xfrm>
+      </p:grpSpPr>
+      <p:sp>
+        <p:nvSpPr>
+          <p:cNvPr id="2" name="Title 1"/>
+          <p:cNvSpPr>
+            <a:spLocks noGrp="1"/>
+          </p:cNvSpPr>
+          <p:nvPr>
+            <p:ph type="title"/>
+          </p:nvPr>
+        </p:nvSpPr>
+        <p:spPr>
+          <a:xfrm>
+            <a:off x="381000" y="609600"/>
+            <a:ext cx="8229600" cy="1143000"/>
+          </a:xfrm>
+        </p:spPr>
+        <p:txBody>
+          <a:bodyPr>
+            <a:noAutofit/>
+          </a:bodyPr>
+          <a:lstStyle/>
+          <a:p>
+            <a:pPr algn="l"/>
+            <a:r>
+              <a:rPr lang="en-US" sz="7200" dirty="0" err="1">
+                <a:solidFill>
+                  <a:schemeClr val="bg1"/>
+                </a:solidFill>
+              </a:rPr>
+              <a:t>IsClipboardRestored</a:t>
+            </a:r>
+            <a:endParaRPr lang="en-SG" sz="7200" dirty="0">
+              <a:solidFill>
+                <a:schemeClr val="bg1"/>
+              </a:solidFill>
+            </a:endParaRPr>
+          </a:p>
+        </p:txBody>
+      </p:sp>
+      <p:sp>
+        <p:nvSpPr>
+          <p:cNvPr id="3" name="TextBox 2"/>
+          <p:cNvSpPr txBox="1"/>
+          <p:nvPr/>
+        </p:nvSpPr>
+        <p:spPr>
+          <a:xfrm>
+            <a:off x="381000" y="2057400"/>
+            <a:ext cx="8229600" cy="3539430"/>
+          </a:xfrm>
+          <a:prstGeom prst="rect">
+            <a:avLst/>
+          </a:prstGeom>
+          <a:noFill/>
+        </p:spPr>
+        <p:txBody>
+          <a:bodyPr wrap="square" rtlCol="0">
+            <a:spAutoFit/>
+          </a:bodyPr>
+          <a:lstStyle/>
+          <a:p>
+            <a:r>
+              <a:rPr lang="en-US" altLang="zh-CN" sz="2800" dirty="0">
+                <a:solidFill>
+                  <a:schemeClr val="bg1"/>
+                </a:solidFill>
+              </a:rPr>
+              <a:t>Add those shapes in slide 3 to Shapes Lab;</a:t>
+            </a:r>
+          </a:p>
+          <a:p>
+            <a:r>
+              <a:rPr lang="en-US" altLang="zh-CN" sz="2800" dirty="0">
+                <a:solidFill>
+                  <a:schemeClr val="bg1"/>
+                </a:solidFill>
+              </a:rPr>
+              <a:t>Add added shapes in Shapes Lab to slide 4;</a:t>
+            </a:r>
+          </a:p>
+          <a:p>
+            <a:r>
+              <a:rPr lang="en-US" altLang="zh-CN" sz="2800" dirty="0">
+                <a:solidFill>
+                  <a:schemeClr val="bg1"/>
+                </a:solidFill>
+              </a:rPr>
+              <a:t>Compare slide 4 and expected slide 5</a:t>
+            </a:r>
+          </a:p>
+          <a:p>
+            <a:endParaRPr lang="en-US" altLang="zh-CN" sz="2800" dirty="0">
+              <a:solidFill>
+                <a:schemeClr val="bg1"/>
+              </a:solidFill>
+            </a:endParaRPr>
+          </a:p>
+          <a:p>
+            <a:r>
+              <a:rPr lang="en-US" altLang="zh-CN" sz="2800" dirty="0">
+                <a:solidFill>
+                  <a:schemeClr val="bg1"/>
+                </a:solidFill>
+              </a:rPr>
+              <a:t>Repeat for testing Add Shapes button on Shapes Lab pane from slides 6 to 8</a:t>
+            </a:r>
+          </a:p>
+          <a:p>
+            <a:endParaRPr lang="en-US" altLang="zh-CN" sz="2800" dirty="0">
+              <a:solidFill>
+                <a:schemeClr val="bg1"/>
+              </a:solidFill>
+            </a:endParaRPr>
+          </a:p>
+          <a:p>
+            <a:r>
+              <a:rPr lang="en-US" altLang="zh-CN" sz="2800" dirty="0">
+                <a:solidFill>
+                  <a:schemeClr val="bg1"/>
+                </a:solidFill>
+              </a:rPr>
+              <a:t>Animations are also expected to be transferred</a:t>
+            </a:r>
+            <a:endParaRPr lang="zh-CN" altLang="en-US" sz="2800" dirty="0">
+              <a:solidFill>
+                <a:schemeClr val="bg1"/>
+              </a:solidFill>
+            </a:endParaRPr>
+          </a:p>
+        </p:txBody>
+      </p:sp>
+    </p:spTree>
+    <p:extLst>
+      <p:ext uri="{BB962C8B-B14F-4D97-AF65-F5344CB8AC3E}">
+        <p14:creationId xmlns:p14="http://schemas.microsoft.com/office/powerpoint/2010/main" val="3646993363"/>
+      </p:ext>
+    </p:extLst>
+  </p:cSld>
+  <p:clrMapOvr>
+    <a:masterClrMapping/>
+  </p:clrMapOvr>
+</p:sld>
+</file>
+
+<file path=ppt/slides/slide11.xml><?xml version="1.0" encoding="utf-8"?>
 <p:sld xmlns:a="http://schemas.openxmlformats.org/drawingml/2006/main" xmlns:r="http://schemas.openxmlformats.org/officeDocument/2006/relationships" xmlns:p="http://schemas.openxmlformats.org/presentationml/2006/main">
   <p:cSld>
     <p:spTree>
@@ -11010,7 +11048,7 @@
           <a:p>
             <a:pPr algn="ctr"/>
             <a:r>
-              <a:rPr lang="en-US" altLang="zh-CN" sz="6600" dirty="0" smtClean="0">
+              <a:rPr lang="en-US" altLang="zh-CN" sz="6600" dirty="0">
                 <a:solidFill>
                   <a:srgbClr val="EB7561"/>
                 </a:solidFill>
@@ -11498,7 +11536,7 @@
 </p:sld>
 </file>
 
-<file path=ppt/slides/slide11.xml><?xml version="1.0" encoding="utf-8"?>
+<file path=ppt/slides/slide12.xml><?xml version="1.0" encoding="utf-8"?>
 <p:sld xmlns:a="http://schemas.openxmlformats.org/drawingml/2006/main" xmlns:r="http://schemas.openxmlformats.org/officeDocument/2006/relationships" xmlns:p="http://schemas.openxmlformats.org/presentationml/2006/main">
   <p:cSld>
     <p:spTree>
@@ -11525,17 +11563,10 @@
   <p:clrMapOvr>
     <a:masterClrMapping/>
   </p:clrMapOvr>
-  <p:timing>
-    <p:tnLst>
-      <p:par>
-        <p:cTn id="1" dur="indefinite" restart="never" nodeType="tmRoot"/>
-      </p:par>
-    </p:tnLst>
-  </p:timing>
 </p:sld>
 </file>
 
-<file path=ppt/slides/slide12.xml><?xml version="1.0" encoding="utf-8"?>
+<file path=ppt/slides/slide13.xml><?xml version="1.0" encoding="utf-8"?>
 <p:sld xmlns:a="http://schemas.openxmlformats.org/drawingml/2006/main" xmlns:r="http://schemas.openxmlformats.org/officeDocument/2006/relationships" xmlns:p="http://schemas.openxmlformats.org/presentationml/2006/main">
   <p:cSld>
     <p:spTree>
@@ -11597,7 +11628,7 @@
           <a:p>
             <a:pPr algn="ctr"/>
             <a:r>
-              <a:rPr lang="en-US" altLang="zh-CN" sz="6600" dirty="0" smtClean="0">
+              <a:rPr lang="en-US" altLang="zh-CN" sz="6600" dirty="0">
                 <a:solidFill>
                   <a:srgbClr val="EB7561"/>
                 </a:solidFill>
@@ -11857,10 +11888,9 @@
           <a:lstStyle/>
           <a:p>
             <a:r>
-              <a:rPr lang="en-SG" dirty="0" smtClean="0"/>
+              <a:rPr lang="en-SG" dirty="0"/>
               <a:t>Expected slide</a:t>
             </a:r>
-            <a:endParaRPr lang="en-SG" dirty="0"/>
           </a:p>
         </p:txBody>
       </p:sp>
@@ -11868,552 +11898,6 @@
     <p:extLst>
       <p:ext uri="{BB962C8B-B14F-4D97-AF65-F5344CB8AC3E}">
         <p14:creationId xmlns:p14="http://schemas.microsoft.com/office/powerpoint/2010/main" val="2562146180"/>
-      </p:ext>
-    </p:extLst>
-  </p:cSld>
-  <p:clrMapOvr>
-    <a:masterClrMapping/>
-  </p:clrMapOvr>
-  <p:timing>
-    <p:tnLst>
-      <p:par>
-        <p:cTn id="1" dur="indefinite" restart="never" nodeType="tmRoot">
-          <p:childTnLst>
-            <p:seq concurrent="1" nextAc="seek">
-              <p:cTn id="2" dur="indefinite" nodeType="mainSeq">
-                <p:childTnLst>
-                  <p:par>
-                    <p:cTn id="3" fill="hold">
-                      <p:stCondLst>
-                        <p:cond delay="indefinite"/>
-                      </p:stCondLst>
-                      <p:childTnLst>
-                        <p:par>
-                          <p:cTn id="4" fill="hold">
-                            <p:stCondLst>
-                              <p:cond delay="0"/>
-                            </p:stCondLst>
-                            <p:childTnLst>
-                              <p:par>
-                                <p:cTn id="5" presetID="2" presetClass="entr" presetSubtype="4" fill="hold" grpId="0" nodeType="clickEffect">
-                                  <p:stCondLst>
-                                    <p:cond delay="0"/>
-                                  </p:stCondLst>
-                                  <p:childTnLst>
-                                    <p:set>
-                                      <p:cBhvr>
-                                        <p:cTn id="6" dur="1" fill="hold">
-                                          <p:stCondLst>
-                                            <p:cond delay="0"/>
-                                          </p:stCondLst>
-                                        </p:cTn>
-                                        <p:tgtEl>
-                                          <p:spTgt spid="3"/>
-                                        </p:tgtEl>
-                                        <p:attrNameLst>
-                                          <p:attrName>style.visibility</p:attrName>
-                                        </p:attrNameLst>
-                                      </p:cBhvr>
-                                      <p:to>
-                                        <p:strVal val="visible"/>
-                                      </p:to>
-                                    </p:set>
-                                    <p:anim calcmode="lin" valueType="num">
-                                      <p:cBhvr additive="base">
-                                        <p:cTn id="7" dur="500" fill="hold"/>
-                                        <p:tgtEl>
-                                          <p:spTgt spid="3"/>
-                                        </p:tgtEl>
-                                        <p:attrNameLst>
-                                          <p:attrName>ppt_x</p:attrName>
-                                        </p:attrNameLst>
-                                      </p:cBhvr>
-                                      <p:tavLst>
-                                        <p:tav tm="0">
-                                          <p:val>
-                                            <p:strVal val="#ppt_x"/>
-                                          </p:val>
-                                        </p:tav>
-                                        <p:tav tm="100000">
-                                          <p:val>
-                                            <p:strVal val="#ppt_x"/>
-                                          </p:val>
-                                        </p:tav>
-                                      </p:tavLst>
-                                    </p:anim>
-                                    <p:anim calcmode="lin" valueType="num">
-                                      <p:cBhvr additive="base">
-                                        <p:cTn id="8" dur="500" fill="hold"/>
-                                        <p:tgtEl>
-                                          <p:spTgt spid="3"/>
-                                        </p:tgtEl>
-                                        <p:attrNameLst>
-                                          <p:attrName>ppt_y</p:attrName>
-                                        </p:attrNameLst>
-                                      </p:cBhvr>
-                                      <p:tavLst>
-                                        <p:tav tm="0">
-                                          <p:val>
-                                            <p:strVal val="1+#ppt_h/2"/>
-                                          </p:val>
-                                        </p:tav>
-                                        <p:tav tm="100000">
-                                          <p:val>
-                                            <p:strVal val="#ppt_y"/>
-                                          </p:val>
-                                        </p:tav>
-                                      </p:tavLst>
-                                    </p:anim>
-                                  </p:childTnLst>
-                                </p:cTn>
-                              </p:par>
-                            </p:childTnLst>
-                          </p:cTn>
-                        </p:par>
-                      </p:childTnLst>
-                    </p:cTn>
-                  </p:par>
-                  <p:par>
-                    <p:cTn id="9" fill="hold">
-                      <p:stCondLst>
-                        <p:cond delay="indefinite"/>
-                      </p:stCondLst>
-                      <p:childTnLst>
-                        <p:par>
-                          <p:cTn id="10" fill="hold">
-                            <p:stCondLst>
-                              <p:cond delay="0"/>
-                            </p:stCondLst>
-                            <p:childTnLst>
-                              <p:par>
-                                <p:cTn id="11" presetID="1" presetClass="entr" presetSubtype="0" fill="hold" grpId="0" nodeType="clickEffect">
-                                  <p:stCondLst>
-                                    <p:cond delay="0"/>
-                                  </p:stCondLst>
-                                  <p:childTnLst>
-                                    <p:set>
-                                      <p:cBhvr>
-                                        <p:cTn id="12" dur="1" fill="hold">
-                                          <p:stCondLst>
-                                            <p:cond delay="0"/>
-                                          </p:stCondLst>
-                                        </p:cTn>
-                                        <p:tgtEl>
-                                          <p:spTgt spid="5"/>
-                                        </p:tgtEl>
-                                        <p:attrNameLst>
-                                          <p:attrName>style.visibility</p:attrName>
-                                        </p:attrNameLst>
-                                      </p:cBhvr>
-                                      <p:to>
-                                        <p:strVal val="visible"/>
-                                      </p:to>
-                                    </p:set>
-                                  </p:childTnLst>
-                                </p:cTn>
-                              </p:par>
-                            </p:childTnLst>
-                          </p:cTn>
-                        </p:par>
-                      </p:childTnLst>
-                    </p:cTn>
-                  </p:par>
-                  <p:par>
-                    <p:cTn id="13" fill="hold">
-                      <p:stCondLst>
-                        <p:cond delay="indefinite"/>
-                      </p:stCondLst>
-                      <p:childTnLst>
-                        <p:par>
-                          <p:cTn id="14" fill="hold">
-                            <p:stCondLst>
-                              <p:cond delay="0"/>
-                            </p:stCondLst>
-                            <p:childTnLst>
-                              <p:par>
-                                <p:cTn id="15" presetID="10" presetClass="entr" presetSubtype="0" fill="hold" grpId="0" nodeType="clickEffect">
-                                  <p:stCondLst>
-                                    <p:cond delay="0"/>
-                                  </p:stCondLst>
-                                  <p:childTnLst>
-                                    <p:set>
-                                      <p:cBhvr>
-                                        <p:cTn id="16" dur="1" fill="hold">
-                                          <p:stCondLst>
-                                            <p:cond delay="0"/>
-                                          </p:stCondLst>
-                                        </p:cTn>
-                                        <p:tgtEl>
-                                          <p:spTgt spid="7"/>
-                                        </p:tgtEl>
-                                        <p:attrNameLst>
-                                          <p:attrName>style.visibility</p:attrName>
-                                        </p:attrNameLst>
-                                      </p:cBhvr>
-                                      <p:to>
-                                        <p:strVal val="visible"/>
-                                      </p:to>
-                                    </p:set>
-                                    <p:animEffect transition="in" filter="fade">
-                                      <p:cBhvr>
-                                        <p:cTn id="17" dur="500"/>
-                                        <p:tgtEl>
-                                          <p:spTgt spid="7"/>
-                                        </p:tgtEl>
-                                      </p:cBhvr>
-                                    </p:animEffect>
-                                  </p:childTnLst>
-                                </p:cTn>
-                              </p:par>
-                            </p:childTnLst>
-                          </p:cTn>
-                        </p:par>
-                      </p:childTnLst>
-                    </p:cTn>
-                  </p:par>
-                  <p:par>
-                    <p:cTn id="18" fill="hold">
-                      <p:stCondLst>
-                        <p:cond delay="indefinite"/>
-                      </p:stCondLst>
-                      <p:childTnLst>
-                        <p:par>
-                          <p:cTn id="19" fill="hold">
-                            <p:stCondLst>
-                              <p:cond delay="0"/>
-                            </p:stCondLst>
-                            <p:childTnLst>
-                              <p:par>
-                                <p:cTn id="20" presetID="16" presetClass="entr" presetSubtype="21" fill="hold" grpId="0" nodeType="clickEffect">
-                                  <p:stCondLst>
-                                    <p:cond delay="0"/>
-                                  </p:stCondLst>
-                                  <p:childTnLst>
-                                    <p:set>
-                                      <p:cBhvr>
-                                        <p:cTn id="21" dur="1" fill="hold">
-                                          <p:stCondLst>
-                                            <p:cond delay="0"/>
-                                          </p:stCondLst>
-                                        </p:cTn>
-                                        <p:tgtEl>
-                                          <p:spTgt spid="8"/>
-                                        </p:tgtEl>
-                                        <p:attrNameLst>
-                                          <p:attrName>style.visibility</p:attrName>
-                                        </p:attrNameLst>
-                                      </p:cBhvr>
-                                      <p:to>
-                                        <p:strVal val="visible"/>
-                                      </p:to>
-                                    </p:set>
-                                    <p:animEffect transition="in" filter="barn(inVertical)">
-                                      <p:cBhvr>
-                                        <p:cTn id="22" dur="500"/>
-                                        <p:tgtEl>
-                                          <p:spTgt spid="8"/>
-                                        </p:tgtEl>
-                                      </p:cBhvr>
-                                    </p:animEffect>
-                                  </p:childTnLst>
-                                </p:cTn>
-                              </p:par>
-                            </p:childTnLst>
-                          </p:cTn>
-                        </p:par>
-                      </p:childTnLst>
-                    </p:cTn>
-                  </p:par>
-                </p:childTnLst>
-              </p:cTn>
-              <p:prevCondLst>
-                <p:cond evt="onPrev" delay="0">
-                  <p:tgtEl>
-                    <p:sldTgt/>
-                  </p:tgtEl>
-                </p:cond>
-              </p:prevCondLst>
-              <p:nextCondLst>
-                <p:cond evt="onNext" delay="0">
-                  <p:tgtEl>
-                    <p:sldTgt/>
-                  </p:tgtEl>
-                </p:cond>
-              </p:nextCondLst>
-            </p:seq>
-          </p:childTnLst>
-        </p:cTn>
-      </p:par>
-    </p:tnLst>
-    <p:bldLst>
-      <p:bldP spid="3" grpId="0" animBg="1"/>
-      <p:bldP spid="5" grpId="0" animBg="1"/>
-      <p:bldP spid="7" grpId="0" animBg="1"/>
-      <p:bldP spid="8" grpId="0" animBg="1"/>
-    </p:bldLst>
-  </p:timing>
-</p:sld>
-</file>
-
-<file path=ppt/slides/slide13.xml><?xml version="1.0" encoding="utf-8"?>
-<p:sld xmlns:a="http://schemas.openxmlformats.org/drawingml/2006/main" xmlns:r="http://schemas.openxmlformats.org/officeDocument/2006/relationships" xmlns:p="http://schemas.openxmlformats.org/presentationml/2006/main">
-  <p:cSld>
-    <p:spTree>
-      <p:nvGrpSpPr>
-        <p:cNvPr id="1" name=""/>
-        <p:cNvGrpSpPr/>
-        <p:nvPr/>
-      </p:nvGrpSpPr>
-      <p:grpSpPr>
-        <a:xfrm>
-          <a:off x="0" y="0"/>
-          <a:ext cx="0" cy="0"/>
-          <a:chOff x="0" y="0"/>
-          <a:chExt cx="0" cy="0"/>
-        </a:xfrm>
-      </p:grpSpPr>
-      <p:sp>
-        <p:nvSpPr>
-          <p:cNvPr id="3" name="selectMeNow1"/>
-          <p:cNvSpPr/>
-          <p:nvPr/>
-        </p:nvSpPr>
-        <p:spPr>
-          <a:xfrm rot="1965194">
-            <a:off x="1533377" y="1406276"/>
-            <a:ext cx="3200400" cy="3792071"/>
-          </a:xfrm>
-          <a:prstGeom prst="roundRect">
-            <a:avLst/>
-          </a:prstGeom>
-          <a:solidFill>
-            <a:schemeClr val="accent2">
-              <a:lumMod val="40000"/>
-              <a:lumOff val="60000"/>
-            </a:schemeClr>
-          </a:solidFill>
-          <a:ln w="203200">
-            <a:solidFill>
-              <a:srgbClr val="92D050"/>
-            </a:solidFill>
-          </a:ln>
-          <a:effectLst>
-            <a:innerShdw blurRad="63500" dist="50800" dir="8100000">
-              <a:prstClr val="black">
-                <a:alpha val="50000"/>
-              </a:prstClr>
-            </a:innerShdw>
-          </a:effectLst>
-        </p:spPr>
-        <p:style>
-          <a:lnRef idx="2">
-            <a:schemeClr val="accent1">
-              <a:shade val="50000"/>
-            </a:schemeClr>
-          </a:lnRef>
-          <a:fillRef idx="1">
-            <a:schemeClr val="accent1"/>
-          </a:fillRef>
-          <a:effectRef idx="0">
-            <a:schemeClr val="accent1"/>
-          </a:effectRef>
-          <a:fontRef idx="minor">
-            <a:schemeClr val="lt1"/>
-          </a:fontRef>
-        </p:style>
-        <p:txBody>
-          <a:bodyPr rtlCol="0" anchor="ctr"/>
-          <a:lstStyle/>
-          <a:p>
-            <a:pPr algn="ctr"/>
-            <a:r>
-              <a:rPr lang="en-US" altLang="zh-CN" sz="6600" dirty="0" smtClean="0">
-                <a:solidFill>
-                  <a:srgbClr val="EB7561"/>
-                </a:solidFill>
-                <a:latin typeface="Times New Roman" panose="02020603050405020304" pitchFamily="18" charset="0"/>
-                <a:cs typeface="Times New Roman" panose="02020603050405020304" pitchFamily="18" charset="0"/>
-              </a:rPr>
-              <a:t>TEXT</a:t>
-            </a:r>
-            <a:endParaRPr lang="zh-CN" altLang="en-US" sz="6600" dirty="0">
-              <a:solidFill>
-                <a:srgbClr val="EB7561"/>
-              </a:solidFill>
-              <a:latin typeface="Times New Roman" panose="02020603050405020304" pitchFamily="18" charset="0"/>
-              <a:cs typeface="Times New Roman" panose="02020603050405020304" pitchFamily="18" charset="0"/>
-            </a:endParaRPr>
-          </a:p>
-        </p:txBody>
-      </p:sp>
-      <p:sp>
-        <p:nvSpPr>
-          <p:cNvPr id="5" name="selectMeNow2"/>
-          <p:cNvSpPr/>
-          <p:nvPr/>
-        </p:nvSpPr>
-        <p:spPr>
-          <a:xfrm>
-            <a:off x="5867400" y="1143000"/>
-            <a:ext cx="1828800" cy="1371600"/>
-          </a:xfrm>
-          <a:prstGeom prst="roundRect">
-            <a:avLst/>
-          </a:prstGeom>
-          <a:ln/>
-        </p:spPr>
-        <p:style>
-          <a:lnRef idx="3">
-            <a:schemeClr val="lt1"/>
-          </a:lnRef>
-          <a:fillRef idx="1">
-            <a:schemeClr val="accent6"/>
-          </a:fillRef>
-          <a:effectRef idx="1">
-            <a:schemeClr val="accent6"/>
-          </a:effectRef>
-          <a:fontRef idx="minor">
-            <a:schemeClr val="lt1"/>
-          </a:fontRef>
-        </p:style>
-        <p:txBody>
-          <a:bodyPr rtlCol="0" anchor="ctr"/>
-          <a:lstStyle/>
-          <a:p>
-            <a:pPr algn="ctr"/>
-            <a:endParaRPr lang="zh-CN" altLang="en-US"/>
-          </a:p>
-        </p:txBody>
-      </p:sp>
-      <p:sp>
-        <p:nvSpPr>
-          <p:cNvPr id="7" name="selectMeNow3"/>
-          <p:cNvSpPr/>
-          <p:nvPr/>
-        </p:nvSpPr>
-        <p:spPr>
-          <a:xfrm>
-            <a:off x="5867400" y="2667000"/>
-            <a:ext cx="1828800" cy="1371600"/>
-          </a:xfrm>
-          <a:prstGeom prst="roundRect">
-            <a:avLst/>
-          </a:prstGeom>
-          <a:ln/>
-        </p:spPr>
-        <p:style>
-          <a:lnRef idx="3">
-            <a:schemeClr val="lt1"/>
-          </a:lnRef>
-          <a:fillRef idx="1">
-            <a:schemeClr val="accent3"/>
-          </a:fillRef>
-          <a:effectRef idx="1">
-            <a:schemeClr val="accent3"/>
-          </a:effectRef>
-          <a:fontRef idx="minor">
-            <a:schemeClr val="lt1"/>
-          </a:fontRef>
-        </p:style>
-        <p:txBody>
-          <a:bodyPr rtlCol="0" anchor="ctr"/>
-          <a:lstStyle/>
-          <a:p>
-            <a:pPr algn="ctr"/>
-            <a:endParaRPr lang="zh-CN" altLang="en-US"/>
-          </a:p>
-        </p:txBody>
-      </p:sp>
-      <p:sp>
-        <p:nvSpPr>
-          <p:cNvPr id="8" name="selectMeNow4"/>
-          <p:cNvSpPr/>
-          <p:nvPr/>
-        </p:nvSpPr>
-        <p:spPr>
-          <a:xfrm>
-            <a:off x="5867400" y="4191000"/>
-            <a:ext cx="1828800" cy="1371600"/>
-          </a:xfrm>
-          <a:prstGeom prst="roundRect">
-            <a:avLst/>
-          </a:prstGeom>
-          <a:solidFill>
-            <a:schemeClr val="accent6">
-              <a:alpha val="50000"/>
-            </a:schemeClr>
-          </a:solidFill>
-          <a:ln>
-            <a:noFill/>
-          </a:ln>
-        </p:spPr>
-        <p:style>
-          <a:lnRef idx="0">
-            <a:scrgbClr r="0" g="0" b="0"/>
-          </a:lnRef>
-          <a:fillRef idx="0">
-            <a:scrgbClr r="0" g="0" b="0"/>
-          </a:fillRef>
-          <a:effectRef idx="0">
-            <a:scrgbClr r="0" g="0" b="0"/>
-          </a:effectRef>
-          <a:fontRef idx="minor">
-            <a:schemeClr val="lt1"/>
-          </a:fontRef>
-        </p:style>
-        <p:txBody>
-          <a:bodyPr rtlCol="0" anchor="ctr"/>
-          <a:lstStyle/>
-          <a:p>
-            <a:pPr algn="ctr"/>
-            <a:endParaRPr lang="zh-CN" altLang="en-US"/>
-          </a:p>
-        </p:txBody>
-      </p:sp>
-      <p:sp>
-        <p:nvSpPr>
-          <p:cNvPr id="2" name="copyMe"/>
-          <p:cNvSpPr/>
-          <p:nvPr/>
-        </p:nvSpPr>
-        <p:spPr>
-          <a:xfrm>
-            <a:off x="2438400" y="1206811"/>
-            <a:ext cx="4191000" cy="4191000"/>
-          </a:xfrm>
-          <a:prstGeom prst="heptagon">
-            <a:avLst/>
-          </a:prstGeom>
-        </p:spPr>
-        <p:style>
-          <a:lnRef idx="2">
-            <a:schemeClr val="accent1">
-              <a:shade val="50000"/>
-            </a:schemeClr>
-          </a:lnRef>
-          <a:fillRef idx="1">
-            <a:schemeClr val="accent1"/>
-          </a:fillRef>
-          <a:effectRef idx="0">
-            <a:schemeClr val="accent1"/>
-          </a:effectRef>
-          <a:fontRef idx="minor">
-            <a:schemeClr val="lt1"/>
-          </a:fontRef>
-        </p:style>
-        <p:txBody>
-          <a:bodyPr rtlCol="0" anchor="ctr"/>
-          <a:lstStyle/>
-          <a:p>
-            <a:pPr algn="ctr"/>
-            <a:endParaRPr lang="en-SG"/>
-          </a:p>
-        </p:txBody>
-      </p:sp>
-    </p:spTree>
-    <p:extLst>
-      <p:ext uri="{BB962C8B-B14F-4D97-AF65-F5344CB8AC3E}">
-        <p14:creationId xmlns:p14="http://schemas.microsoft.com/office/powerpoint/2010/main" val="2188512437"/>
       </p:ext>
     </p:extLst>
   </p:cSld>
@@ -12718,46 +12202,9 @@
           <a:chExt cx="0" cy="0"/>
         </a:xfrm>
       </p:grpSpPr>
-    </p:spTree>
-    <p:extLst>
-      <p:ext uri="{BB962C8B-B14F-4D97-AF65-F5344CB8AC3E}">
-        <p14:creationId xmlns:p14="http://schemas.microsoft.com/office/powerpoint/2010/main" val="1779079148"/>
-      </p:ext>
-    </p:extLst>
-  </p:cSld>
-  <p:clrMapOvr>
-    <a:masterClrMapping/>
-  </p:clrMapOvr>
-  <p:timing>
-    <p:tnLst>
-      <p:par>
-        <p:cTn id="1" dur="indefinite" restart="never" nodeType="tmRoot"/>
-      </p:par>
-    </p:tnLst>
-  </p:timing>
-</p:sld>
-</file>
-
-<file path=ppt/slides/slide15.xml><?xml version="1.0" encoding="utf-8"?>
-<p:sld xmlns:a="http://schemas.openxmlformats.org/drawingml/2006/main" xmlns:r="http://schemas.openxmlformats.org/officeDocument/2006/relationships" xmlns:p="http://schemas.openxmlformats.org/presentationml/2006/main">
-  <p:cSld>
-    <p:spTree>
-      <p:nvGrpSpPr>
-        <p:cNvPr id="1" name=""/>
-        <p:cNvGrpSpPr/>
-        <p:nvPr/>
-      </p:nvGrpSpPr>
-      <p:grpSpPr>
-        <a:xfrm>
-          <a:off x="0" y="0"/>
-          <a:ext cx="0" cy="0"/>
-          <a:chOff x="0" y="0"/>
-          <a:chExt cx="0" cy="0"/>
-        </a:xfrm>
-      </p:grpSpPr>
-      <p:sp>
-        <p:nvSpPr>
-          <p:cNvPr id="6" name="Group selectMeNow1 Seq_1"/>
+      <p:sp>
+        <p:nvSpPr>
+          <p:cNvPr id="3" name="selectMeNow1"/>
           <p:cNvSpPr/>
           <p:nvPr/>
         </p:nvSpPr>
@@ -12810,7 +12257,7 @@
           <a:p>
             <a:pPr algn="ctr"/>
             <a:r>
-              <a:rPr lang="en-US" altLang="zh-CN" sz="6600" dirty="0" smtClean="0">
+              <a:rPr lang="en-US" altLang="zh-CN" sz="6600" dirty="0">
                 <a:solidFill>
                   <a:srgbClr val="EB7561"/>
                 </a:solidFill>
@@ -12831,7 +12278,7 @@
       </p:sp>
       <p:sp>
         <p:nvSpPr>
-          <p:cNvPr id="9" name="Group selectMeNow1 Seq_2"/>
+          <p:cNvPr id="5" name="selectMeNow2"/>
           <p:cNvSpPr/>
           <p:nvPr/>
         </p:nvSpPr>
@@ -12870,7 +12317,7 @@
       </p:sp>
       <p:sp>
         <p:nvSpPr>
-          <p:cNvPr id="10" name="Group selectMeNow1 Seq_3"/>
+          <p:cNvPr id="7" name="selectMeNow3"/>
           <p:cNvSpPr/>
           <p:nvPr/>
         </p:nvSpPr>
@@ -12909,7 +12356,7 @@
       </p:sp>
       <p:sp>
         <p:nvSpPr>
-          <p:cNvPr id="11" name="Group selectMeNow1 Seq_4"/>
+          <p:cNvPr id="8" name="selectMeNow4"/>
           <p:cNvSpPr/>
           <p:nvPr/>
         </p:nvSpPr>
@@ -12955,7 +12402,7 @@
       </p:sp>
       <p:sp>
         <p:nvSpPr>
-          <p:cNvPr id="7" name="copyMe"/>
+          <p:cNvPr id="2" name="copyMe"/>
           <p:cNvSpPr/>
           <p:nvPr/>
         </p:nvSpPr>
@@ -12993,6 +12440,582 @@
           </a:p>
         </p:txBody>
       </p:sp>
+    </p:spTree>
+    <p:extLst>
+      <p:ext uri="{BB962C8B-B14F-4D97-AF65-F5344CB8AC3E}">
+        <p14:creationId xmlns:p14="http://schemas.microsoft.com/office/powerpoint/2010/main" val="2188512437"/>
+      </p:ext>
+    </p:extLst>
+  </p:cSld>
+  <p:clrMapOvr>
+    <a:masterClrMapping/>
+  </p:clrMapOvr>
+  <p:timing>
+    <p:tnLst>
+      <p:par>
+        <p:cTn id="1" dur="indefinite" restart="never" nodeType="tmRoot">
+          <p:childTnLst>
+            <p:seq concurrent="1" nextAc="seek">
+              <p:cTn id="2" dur="indefinite" nodeType="mainSeq">
+                <p:childTnLst>
+                  <p:par>
+                    <p:cTn id="3" fill="hold">
+                      <p:stCondLst>
+                        <p:cond delay="indefinite"/>
+                      </p:stCondLst>
+                      <p:childTnLst>
+                        <p:par>
+                          <p:cTn id="4" fill="hold">
+                            <p:stCondLst>
+                              <p:cond delay="0"/>
+                            </p:stCondLst>
+                            <p:childTnLst>
+                              <p:par>
+                                <p:cTn id="5" presetID="2" presetClass="entr" presetSubtype="4" fill="hold" grpId="0" nodeType="clickEffect">
+                                  <p:stCondLst>
+                                    <p:cond delay="0"/>
+                                  </p:stCondLst>
+                                  <p:childTnLst>
+                                    <p:set>
+                                      <p:cBhvr>
+                                        <p:cTn id="6" dur="1" fill="hold">
+                                          <p:stCondLst>
+                                            <p:cond delay="0"/>
+                                          </p:stCondLst>
+                                        </p:cTn>
+                                        <p:tgtEl>
+                                          <p:spTgt spid="3"/>
+                                        </p:tgtEl>
+                                        <p:attrNameLst>
+                                          <p:attrName>style.visibility</p:attrName>
+                                        </p:attrNameLst>
+                                      </p:cBhvr>
+                                      <p:to>
+                                        <p:strVal val="visible"/>
+                                      </p:to>
+                                    </p:set>
+                                    <p:anim calcmode="lin" valueType="num">
+                                      <p:cBhvr additive="base">
+                                        <p:cTn id="7" dur="500" fill="hold"/>
+                                        <p:tgtEl>
+                                          <p:spTgt spid="3"/>
+                                        </p:tgtEl>
+                                        <p:attrNameLst>
+                                          <p:attrName>ppt_x</p:attrName>
+                                        </p:attrNameLst>
+                                      </p:cBhvr>
+                                      <p:tavLst>
+                                        <p:tav tm="0">
+                                          <p:val>
+                                            <p:strVal val="#ppt_x"/>
+                                          </p:val>
+                                        </p:tav>
+                                        <p:tav tm="100000">
+                                          <p:val>
+                                            <p:strVal val="#ppt_x"/>
+                                          </p:val>
+                                        </p:tav>
+                                      </p:tavLst>
+                                    </p:anim>
+                                    <p:anim calcmode="lin" valueType="num">
+                                      <p:cBhvr additive="base">
+                                        <p:cTn id="8" dur="500" fill="hold"/>
+                                        <p:tgtEl>
+                                          <p:spTgt spid="3"/>
+                                        </p:tgtEl>
+                                        <p:attrNameLst>
+                                          <p:attrName>ppt_y</p:attrName>
+                                        </p:attrNameLst>
+                                      </p:cBhvr>
+                                      <p:tavLst>
+                                        <p:tav tm="0">
+                                          <p:val>
+                                            <p:strVal val="1+#ppt_h/2"/>
+                                          </p:val>
+                                        </p:tav>
+                                        <p:tav tm="100000">
+                                          <p:val>
+                                            <p:strVal val="#ppt_y"/>
+                                          </p:val>
+                                        </p:tav>
+                                      </p:tavLst>
+                                    </p:anim>
+                                  </p:childTnLst>
+                                </p:cTn>
+                              </p:par>
+                            </p:childTnLst>
+                          </p:cTn>
+                        </p:par>
+                      </p:childTnLst>
+                    </p:cTn>
+                  </p:par>
+                  <p:par>
+                    <p:cTn id="9" fill="hold">
+                      <p:stCondLst>
+                        <p:cond delay="indefinite"/>
+                      </p:stCondLst>
+                      <p:childTnLst>
+                        <p:par>
+                          <p:cTn id="10" fill="hold">
+                            <p:stCondLst>
+                              <p:cond delay="0"/>
+                            </p:stCondLst>
+                            <p:childTnLst>
+                              <p:par>
+                                <p:cTn id="11" presetID="1" presetClass="entr" presetSubtype="0" fill="hold" grpId="0" nodeType="clickEffect">
+                                  <p:stCondLst>
+                                    <p:cond delay="0"/>
+                                  </p:stCondLst>
+                                  <p:childTnLst>
+                                    <p:set>
+                                      <p:cBhvr>
+                                        <p:cTn id="12" dur="1" fill="hold">
+                                          <p:stCondLst>
+                                            <p:cond delay="0"/>
+                                          </p:stCondLst>
+                                        </p:cTn>
+                                        <p:tgtEl>
+                                          <p:spTgt spid="5"/>
+                                        </p:tgtEl>
+                                        <p:attrNameLst>
+                                          <p:attrName>style.visibility</p:attrName>
+                                        </p:attrNameLst>
+                                      </p:cBhvr>
+                                      <p:to>
+                                        <p:strVal val="visible"/>
+                                      </p:to>
+                                    </p:set>
+                                  </p:childTnLst>
+                                </p:cTn>
+                              </p:par>
+                            </p:childTnLst>
+                          </p:cTn>
+                        </p:par>
+                      </p:childTnLst>
+                    </p:cTn>
+                  </p:par>
+                  <p:par>
+                    <p:cTn id="13" fill="hold">
+                      <p:stCondLst>
+                        <p:cond delay="indefinite"/>
+                      </p:stCondLst>
+                      <p:childTnLst>
+                        <p:par>
+                          <p:cTn id="14" fill="hold">
+                            <p:stCondLst>
+                              <p:cond delay="0"/>
+                            </p:stCondLst>
+                            <p:childTnLst>
+                              <p:par>
+                                <p:cTn id="15" presetID="10" presetClass="entr" presetSubtype="0" fill="hold" grpId="0" nodeType="clickEffect">
+                                  <p:stCondLst>
+                                    <p:cond delay="0"/>
+                                  </p:stCondLst>
+                                  <p:childTnLst>
+                                    <p:set>
+                                      <p:cBhvr>
+                                        <p:cTn id="16" dur="1" fill="hold">
+                                          <p:stCondLst>
+                                            <p:cond delay="0"/>
+                                          </p:stCondLst>
+                                        </p:cTn>
+                                        <p:tgtEl>
+                                          <p:spTgt spid="7"/>
+                                        </p:tgtEl>
+                                        <p:attrNameLst>
+                                          <p:attrName>style.visibility</p:attrName>
+                                        </p:attrNameLst>
+                                      </p:cBhvr>
+                                      <p:to>
+                                        <p:strVal val="visible"/>
+                                      </p:to>
+                                    </p:set>
+                                    <p:animEffect transition="in" filter="fade">
+                                      <p:cBhvr>
+                                        <p:cTn id="17" dur="500"/>
+                                        <p:tgtEl>
+                                          <p:spTgt spid="7"/>
+                                        </p:tgtEl>
+                                      </p:cBhvr>
+                                    </p:animEffect>
+                                  </p:childTnLst>
+                                </p:cTn>
+                              </p:par>
+                            </p:childTnLst>
+                          </p:cTn>
+                        </p:par>
+                      </p:childTnLst>
+                    </p:cTn>
+                  </p:par>
+                  <p:par>
+                    <p:cTn id="18" fill="hold">
+                      <p:stCondLst>
+                        <p:cond delay="indefinite"/>
+                      </p:stCondLst>
+                      <p:childTnLst>
+                        <p:par>
+                          <p:cTn id="19" fill="hold">
+                            <p:stCondLst>
+                              <p:cond delay="0"/>
+                            </p:stCondLst>
+                            <p:childTnLst>
+                              <p:par>
+                                <p:cTn id="20" presetID="16" presetClass="entr" presetSubtype="21" fill="hold" grpId="0" nodeType="clickEffect">
+                                  <p:stCondLst>
+                                    <p:cond delay="0"/>
+                                  </p:stCondLst>
+                                  <p:childTnLst>
+                                    <p:set>
+                                      <p:cBhvr>
+                                        <p:cTn id="21" dur="1" fill="hold">
+                                          <p:stCondLst>
+                                            <p:cond delay="0"/>
+                                          </p:stCondLst>
+                                        </p:cTn>
+                                        <p:tgtEl>
+                                          <p:spTgt spid="8"/>
+                                        </p:tgtEl>
+                                        <p:attrNameLst>
+                                          <p:attrName>style.visibility</p:attrName>
+                                        </p:attrNameLst>
+                                      </p:cBhvr>
+                                      <p:to>
+                                        <p:strVal val="visible"/>
+                                      </p:to>
+                                    </p:set>
+                                    <p:animEffect transition="in" filter="barn(inVertical)">
+                                      <p:cBhvr>
+                                        <p:cTn id="22" dur="500"/>
+                                        <p:tgtEl>
+                                          <p:spTgt spid="8"/>
+                                        </p:tgtEl>
+                                      </p:cBhvr>
+                                    </p:animEffect>
+                                  </p:childTnLst>
+                                </p:cTn>
+                              </p:par>
+                            </p:childTnLst>
+                          </p:cTn>
+                        </p:par>
+                      </p:childTnLst>
+                    </p:cTn>
+                  </p:par>
+                </p:childTnLst>
+              </p:cTn>
+              <p:prevCondLst>
+                <p:cond evt="onPrev" delay="0">
+                  <p:tgtEl>
+                    <p:sldTgt/>
+                  </p:tgtEl>
+                </p:cond>
+              </p:prevCondLst>
+              <p:nextCondLst>
+                <p:cond evt="onNext" delay="0">
+                  <p:tgtEl>
+                    <p:sldTgt/>
+                  </p:tgtEl>
+                </p:cond>
+              </p:nextCondLst>
+            </p:seq>
+          </p:childTnLst>
+        </p:cTn>
+      </p:par>
+    </p:tnLst>
+    <p:bldLst>
+      <p:bldP spid="3" grpId="0" animBg="1"/>
+      <p:bldP spid="5" grpId="0" animBg="1"/>
+      <p:bldP spid="7" grpId="0" animBg="1"/>
+      <p:bldP spid="8" grpId="0" animBg="1"/>
+    </p:bldLst>
+  </p:timing>
+</p:sld>
+</file>
+
+<file path=ppt/slides/slide15.xml><?xml version="1.0" encoding="utf-8"?>
+<p:sld xmlns:a="http://schemas.openxmlformats.org/drawingml/2006/main" xmlns:r="http://schemas.openxmlformats.org/officeDocument/2006/relationships" xmlns:p="http://schemas.openxmlformats.org/presentationml/2006/main">
+  <p:cSld>
+    <p:spTree>
+      <p:nvGrpSpPr>
+        <p:cNvPr id="1" name=""/>
+        <p:cNvGrpSpPr/>
+        <p:nvPr/>
+      </p:nvGrpSpPr>
+      <p:grpSpPr>
+        <a:xfrm>
+          <a:off x="0" y="0"/>
+          <a:ext cx="0" cy="0"/>
+          <a:chOff x="0" y="0"/>
+          <a:chExt cx="0" cy="0"/>
+        </a:xfrm>
+      </p:grpSpPr>
+    </p:spTree>
+    <p:extLst>
+      <p:ext uri="{BB962C8B-B14F-4D97-AF65-F5344CB8AC3E}">
+        <p14:creationId xmlns:p14="http://schemas.microsoft.com/office/powerpoint/2010/main" val="1779079148"/>
+      </p:ext>
+    </p:extLst>
+  </p:cSld>
+  <p:clrMapOvr>
+    <a:masterClrMapping/>
+  </p:clrMapOvr>
+</p:sld>
+</file>
+
+<file path=ppt/slides/slide16.xml><?xml version="1.0" encoding="utf-8"?>
+<p:sld xmlns:a="http://schemas.openxmlformats.org/drawingml/2006/main" xmlns:r="http://schemas.openxmlformats.org/officeDocument/2006/relationships" xmlns:p="http://schemas.openxmlformats.org/presentationml/2006/main">
+  <p:cSld>
+    <p:spTree>
+      <p:nvGrpSpPr>
+        <p:cNvPr id="1" name=""/>
+        <p:cNvGrpSpPr/>
+        <p:nvPr/>
+      </p:nvGrpSpPr>
+      <p:grpSpPr>
+        <a:xfrm>
+          <a:off x="0" y="0"/>
+          <a:ext cx="0" cy="0"/>
+          <a:chOff x="0" y="0"/>
+          <a:chExt cx="0" cy="0"/>
+        </a:xfrm>
+      </p:grpSpPr>
+      <p:sp>
+        <p:nvSpPr>
+          <p:cNvPr id="6" name="Group selectMeNow1 Seq_1"/>
+          <p:cNvSpPr/>
+          <p:nvPr/>
+        </p:nvSpPr>
+        <p:spPr>
+          <a:xfrm rot="1965194">
+            <a:off x="1533377" y="1406276"/>
+            <a:ext cx="3200400" cy="3792071"/>
+          </a:xfrm>
+          <a:prstGeom prst="roundRect">
+            <a:avLst/>
+          </a:prstGeom>
+          <a:solidFill>
+            <a:schemeClr val="accent2">
+              <a:lumMod val="40000"/>
+              <a:lumOff val="60000"/>
+            </a:schemeClr>
+          </a:solidFill>
+          <a:ln w="203200">
+            <a:solidFill>
+              <a:srgbClr val="92D050"/>
+            </a:solidFill>
+          </a:ln>
+          <a:effectLst>
+            <a:innerShdw blurRad="63500" dist="50800" dir="8100000">
+              <a:prstClr val="black">
+                <a:alpha val="50000"/>
+              </a:prstClr>
+            </a:innerShdw>
+          </a:effectLst>
+        </p:spPr>
+        <p:style>
+          <a:lnRef idx="2">
+            <a:schemeClr val="accent1">
+              <a:shade val="50000"/>
+            </a:schemeClr>
+          </a:lnRef>
+          <a:fillRef idx="1">
+            <a:schemeClr val="accent1"/>
+          </a:fillRef>
+          <a:effectRef idx="0">
+            <a:schemeClr val="accent1"/>
+          </a:effectRef>
+          <a:fontRef idx="minor">
+            <a:schemeClr val="lt1"/>
+          </a:fontRef>
+        </p:style>
+        <p:txBody>
+          <a:bodyPr rtlCol="0" anchor="ctr"/>
+          <a:lstStyle/>
+          <a:p>
+            <a:pPr algn="ctr"/>
+            <a:r>
+              <a:rPr lang="en-US" altLang="zh-CN" sz="6600" dirty="0">
+                <a:solidFill>
+                  <a:srgbClr val="EB7561"/>
+                </a:solidFill>
+                <a:latin typeface="Times New Roman" panose="02020603050405020304" pitchFamily="18" charset="0"/>
+                <a:cs typeface="Times New Roman" panose="02020603050405020304" pitchFamily="18" charset="0"/>
+              </a:rPr>
+              <a:t>TEXT</a:t>
+            </a:r>
+            <a:endParaRPr lang="zh-CN" altLang="en-US" sz="6600" dirty="0">
+              <a:solidFill>
+                <a:srgbClr val="EB7561"/>
+              </a:solidFill>
+              <a:latin typeface="Times New Roman" panose="02020603050405020304" pitchFamily="18" charset="0"/>
+              <a:cs typeface="Times New Roman" panose="02020603050405020304" pitchFamily="18" charset="0"/>
+            </a:endParaRPr>
+          </a:p>
+        </p:txBody>
+      </p:sp>
+      <p:sp>
+        <p:nvSpPr>
+          <p:cNvPr id="9" name="Group selectMeNow1 Seq_2"/>
+          <p:cNvSpPr/>
+          <p:nvPr/>
+        </p:nvSpPr>
+        <p:spPr>
+          <a:xfrm>
+            <a:off x="5867400" y="1143000"/>
+            <a:ext cx="1828800" cy="1371600"/>
+          </a:xfrm>
+          <a:prstGeom prst="roundRect">
+            <a:avLst/>
+          </a:prstGeom>
+          <a:ln/>
+        </p:spPr>
+        <p:style>
+          <a:lnRef idx="3">
+            <a:schemeClr val="lt1"/>
+          </a:lnRef>
+          <a:fillRef idx="1">
+            <a:schemeClr val="accent6"/>
+          </a:fillRef>
+          <a:effectRef idx="1">
+            <a:schemeClr val="accent6"/>
+          </a:effectRef>
+          <a:fontRef idx="minor">
+            <a:schemeClr val="lt1"/>
+          </a:fontRef>
+        </p:style>
+        <p:txBody>
+          <a:bodyPr rtlCol="0" anchor="ctr"/>
+          <a:lstStyle/>
+          <a:p>
+            <a:pPr algn="ctr"/>
+            <a:endParaRPr lang="zh-CN" altLang="en-US"/>
+          </a:p>
+        </p:txBody>
+      </p:sp>
+      <p:sp>
+        <p:nvSpPr>
+          <p:cNvPr id="10" name="Group selectMeNow1 Seq_3"/>
+          <p:cNvSpPr/>
+          <p:nvPr/>
+        </p:nvSpPr>
+        <p:spPr>
+          <a:xfrm>
+            <a:off x="5867400" y="2667000"/>
+            <a:ext cx="1828800" cy="1371600"/>
+          </a:xfrm>
+          <a:prstGeom prst="roundRect">
+            <a:avLst/>
+          </a:prstGeom>
+          <a:ln/>
+        </p:spPr>
+        <p:style>
+          <a:lnRef idx="3">
+            <a:schemeClr val="lt1"/>
+          </a:lnRef>
+          <a:fillRef idx="1">
+            <a:schemeClr val="accent3"/>
+          </a:fillRef>
+          <a:effectRef idx="1">
+            <a:schemeClr val="accent3"/>
+          </a:effectRef>
+          <a:fontRef idx="minor">
+            <a:schemeClr val="lt1"/>
+          </a:fontRef>
+        </p:style>
+        <p:txBody>
+          <a:bodyPr rtlCol="0" anchor="ctr"/>
+          <a:lstStyle/>
+          <a:p>
+            <a:pPr algn="ctr"/>
+            <a:endParaRPr lang="zh-CN" altLang="en-US"/>
+          </a:p>
+        </p:txBody>
+      </p:sp>
+      <p:sp>
+        <p:nvSpPr>
+          <p:cNvPr id="11" name="Group selectMeNow1 Seq_4"/>
+          <p:cNvSpPr/>
+          <p:nvPr/>
+        </p:nvSpPr>
+        <p:spPr>
+          <a:xfrm>
+            <a:off x="5867400" y="4191000"/>
+            <a:ext cx="1828800" cy="1371600"/>
+          </a:xfrm>
+          <a:prstGeom prst="roundRect">
+            <a:avLst/>
+          </a:prstGeom>
+          <a:solidFill>
+            <a:schemeClr val="accent6">
+              <a:alpha val="50000"/>
+            </a:schemeClr>
+          </a:solidFill>
+          <a:ln>
+            <a:noFill/>
+          </a:ln>
+        </p:spPr>
+        <p:style>
+          <a:lnRef idx="0">
+            <a:scrgbClr r="0" g="0" b="0"/>
+          </a:lnRef>
+          <a:fillRef idx="0">
+            <a:scrgbClr r="0" g="0" b="0"/>
+          </a:fillRef>
+          <a:effectRef idx="0">
+            <a:scrgbClr r="0" g="0" b="0"/>
+          </a:effectRef>
+          <a:fontRef idx="minor">
+            <a:schemeClr val="lt1"/>
+          </a:fontRef>
+        </p:style>
+        <p:txBody>
+          <a:bodyPr rtlCol="0" anchor="ctr"/>
+          <a:lstStyle/>
+          <a:p>
+            <a:pPr algn="ctr"/>
+            <a:endParaRPr lang="zh-CN" altLang="en-US"/>
+          </a:p>
+        </p:txBody>
+      </p:sp>
+      <p:sp>
+        <p:nvSpPr>
+          <p:cNvPr id="7" name="copyMe"/>
+          <p:cNvSpPr/>
+          <p:nvPr/>
+        </p:nvSpPr>
+        <p:spPr>
+          <a:xfrm>
+            <a:off x="2438400" y="1206811"/>
+            <a:ext cx="4191000" cy="4191000"/>
+          </a:xfrm>
+          <a:prstGeom prst="heptagon">
+            <a:avLst/>
+          </a:prstGeom>
+        </p:spPr>
+        <p:style>
+          <a:lnRef idx="2">
+            <a:schemeClr val="accent1">
+              <a:shade val="50000"/>
+            </a:schemeClr>
+          </a:lnRef>
+          <a:fillRef idx="1">
+            <a:schemeClr val="accent1"/>
+          </a:fillRef>
+          <a:effectRef idx="0">
+            <a:schemeClr val="accent1"/>
+          </a:effectRef>
+          <a:fontRef idx="minor">
+            <a:schemeClr val="lt1"/>
+          </a:fontRef>
+        </p:style>
+        <p:txBody>
+          <a:bodyPr rtlCol="0" anchor="ctr"/>
+          <a:lstStyle/>
+          <a:p>
+            <a:pPr algn="ctr"/>
+            <a:endParaRPr lang="en-SG"/>
+          </a:p>
+        </p:txBody>
+      </p:sp>
       <p:sp>
         <p:nvSpPr>
           <p:cNvPr id="2" name="Expected"/>
@@ -13016,10 +13039,9 @@
           <a:lstStyle/>
           <a:p>
             <a:r>
-              <a:rPr lang="en-SG" dirty="0" smtClean="0"/>
+              <a:rPr lang="en-SG" dirty="0"/>
               <a:t>Expected slide</a:t>
             </a:r>
-            <a:endParaRPr lang="en-SG" dirty="0"/>
           </a:p>
         </p:txBody>
       </p:sp>
@@ -13354,7 +13376,7 @@
 </p:sld>
 </file>
 
-<file path=ppt/slides/slide16.xml><?xml version="1.0" encoding="utf-8"?>
+<file path=ppt/slides/slide17.xml><?xml version="1.0" encoding="utf-8"?>
 <p:sld xmlns:a="http://schemas.openxmlformats.org/drawingml/2006/main" xmlns:r="http://schemas.openxmlformats.org/officeDocument/2006/relationships" xmlns:p="http://schemas.openxmlformats.org/presentationml/2006/main" show="0">
   <p:cSld name="PPAck201403240026082737">
     <p:spTree>
@@ -13429,21 +13451,6 @@
   <p:clrMapOvr>
     <a:masterClrMapping/>
   </p:clrMapOvr>
-  <mc:AlternateContent xmlns:mc="http://schemas.openxmlformats.org/markup-compatibility/2006" xmlns:p14="http://schemas.microsoft.com/office/powerpoint/2010/main">
-    <mc:Choice Requires="p14">
-      <p:transition spd="slow" p14:dur="2000"/>
-    </mc:Choice>
-    <mc:Fallback xmlns="">
-      <p:transition spd="slow"/>
-    </mc:Fallback>
-  </mc:AlternateContent>
-  <p:timing>
-    <p:tnLst>
-      <p:par>
-        <p:cTn id="1" dur="indefinite" restart="never" nodeType="tmRoot"/>
-      </p:par>
-    </p:tnLst>
-  </p:timing>
 </p:sld>
 </file>
 
@@ -13498,7 +13505,7 @@
           <a:p>
             <a:pPr algn="l"/>
             <a:r>
-              <a:rPr lang="en-US" sz="7200" dirty="0" smtClean="0">
+              <a:rPr lang="en-US" sz="7200" dirty="0">
                 <a:solidFill>
                   <a:schemeClr val="bg1"/>
                 </a:solidFill>
@@ -13521,8 +13528,8 @@
         </p:nvSpPr>
         <p:spPr>
           <a:xfrm>
-            <a:off x="381000" y="2057400"/>
-            <a:ext cx="8229600" cy="3539430"/>
+            <a:off x="381000" y="1905000"/>
+            <a:ext cx="8229600" cy="4832092"/>
           </a:xfrm>
           <a:prstGeom prst="rect">
             <a:avLst/>
@@ -13536,7 +13543,7 @@
           <a:lstStyle/>
           <a:p>
             <a:r>
-              <a:rPr lang="en-US" altLang="zh-CN" sz="2800" dirty="0" smtClean="0">
+              <a:rPr lang="en-US" altLang="zh-CN" sz="2800" dirty="0">
                 <a:solidFill>
                   <a:schemeClr val="bg1"/>
                 </a:solidFill>
@@ -13546,7 +13553,7 @@
           </a:p>
           <a:p>
             <a:r>
-              <a:rPr lang="en-US" altLang="zh-CN" sz="2800" dirty="0" smtClean="0">
+              <a:rPr lang="en-US" altLang="zh-CN" sz="2800" dirty="0">
                 <a:solidFill>
                   <a:schemeClr val="bg1"/>
                 </a:solidFill>
@@ -13556,7 +13563,7 @@
           </a:p>
           <a:p>
             <a:r>
-              <a:rPr lang="en-US" altLang="zh-CN" sz="2800" dirty="0" smtClean="0">
+              <a:rPr lang="en-US" altLang="zh-CN" sz="2800" dirty="0">
                 <a:solidFill>
                   <a:schemeClr val="bg1"/>
                 </a:solidFill>
@@ -13573,44 +13580,29 @@
           </a:p>
           <a:p>
             <a:r>
-              <a:rPr lang="en-US" altLang="zh-CN" sz="2800" dirty="0" smtClean="0">
-                <a:solidFill>
-                  <a:schemeClr val="bg1"/>
-                </a:solidFill>
-              </a:rPr>
-              <a:t>Repeat for testing </a:t>
-            </a:r>
-            <a:r>
               <a:rPr lang="en-US" altLang="zh-CN" sz="2800" dirty="0">
                 <a:solidFill>
                   <a:schemeClr val="bg1"/>
                 </a:solidFill>
               </a:rPr>
-              <a:t>A</a:t>
-            </a:r>
-            <a:r>
-              <a:rPr lang="en-US" altLang="zh-CN" sz="2800" dirty="0" smtClean="0">
-                <a:solidFill>
-                  <a:schemeClr val="bg1"/>
-                </a:solidFill>
-              </a:rPr>
-              <a:t>dd </a:t>
-            </a:r>
+              <a:t>Repeat for testing Add Shapes button on Shapes Lab pane from slides 6 to 8</a:t>
+            </a:r>
+          </a:p>
+          <a:p>
+            <a:endParaRPr lang="en-US" altLang="zh-CN" sz="2800" dirty="0">
+              <a:solidFill>
+                <a:schemeClr val="bg1"/>
+              </a:solidFill>
+            </a:endParaRPr>
+          </a:p>
+          <a:p>
             <a:r>
               <a:rPr lang="en-US" altLang="zh-CN" sz="2800" dirty="0">
                 <a:solidFill>
                   <a:schemeClr val="bg1"/>
                 </a:solidFill>
               </a:rPr>
-              <a:t>S</a:t>
-            </a:r>
-            <a:r>
-              <a:rPr lang="en-US" altLang="zh-CN" sz="2800" dirty="0" smtClean="0">
-                <a:solidFill>
-                  <a:schemeClr val="bg1"/>
-                </a:solidFill>
-              </a:rPr>
-              <a:t>hapes button on Shapes Lab pane from slides 6 to 8</a:t>
+              <a:t>Animations are also expected to be transferred</a:t>
             </a:r>
           </a:p>
           <a:p>
@@ -13622,18 +13614,13 @@
           </a:p>
           <a:p>
             <a:r>
-              <a:rPr lang="en-US" altLang="zh-CN" sz="2800" dirty="0" smtClean="0">
+              <a:rPr lang="en-US" altLang="zh-CN" sz="2800" dirty="0">
                 <a:solidFill>
                   <a:schemeClr val="bg1"/>
                 </a:solidFill>
               </a:rPr>
-              <a:t>Animations are also expected to be transferred</a:t>
-            </a:r>
-            <a:endParaRPr lang="zh-CN" altLang="en-US" sz="2800" dirty="0">
-              <a:solidFill>
-                <a:schemeClr val="bg1"/>
-              </a:solidFill>
-            </a:endParaRPr>
+              <a:t>Tests that error appear when adding placeholders on slide 9</a:t>
+            </a:r>
           </a:p>
         </p:txBody>
       </p:sp>
@@ -13647,13 +13634,6 @@
   <p:clrMapOvr>
     <a:masterClrMapping/>
   </p:clrMapOvr>
-  <p:timing>
-    <p:tnLst>
-      <p:par>
-        <p:cTn id="1" dur="indefinite" restart="never" nodeType="tmRoot"/>
-      </p:par>
-    </p:tnLst>
-  </p:timing>
 </p:sld>
 </file>
 
@@ -13773,7 +13753,7 @@
           <a:p>
             <a:pPr algn="ctr"/>
             <a:r>
-              <a:rPr lang="en-US" altLang="zh-CN" sz="6600" dirty="0" smtClean="0">
+              <a:rPr lang="en-US" altLang="zh-CN" sz="6600" dirty="0">
                 <a:solidFill>
                   <a:srgbClr val="EB7561"/>
                 </a:solidFill>
@@ -14210,13 +14190,6 @@
   <p:clrMapOvr>
     <a:masterClrMapping/>
   </p:clrMapOvr>
-  <p:timing>
-    <p:tnLst>
-      <p:par>
-        <p:cTn id="1" dur="indefinite" restart="never" nodeType="tmRoot"/>
-      </p:par>
-    </p:tnLst>
-  </p:timing>
 </p:sld>
 </file>
 
@@ -14290,7 +14263,7 @@
           <a:p>
             <a:pPr algn="ctr"/>
             <a:r>
-              <a:rPr lang="en-US" altLang="zh-CN" sz="6600" dirty="0" smtClean="0">
+              <a:rPr lang="en-US" altLang="zh-CN" sz="6600" dirty="0">
                 <a:solidFill>
                   <a:srgbClr val="EB7561"/>
                 </a:solidFill>
@@ -14818,7 +14791,7 @@
           <a:p>
             <a:pPr algn="ctr"/>
             <a:r>
-              <a:rPr lang="en-US" altLang="zh-CN" sz="6600" dirty="0" smtClean="0">
+              <a:rPr lang="en-US" altLang="zh-CN" sz="6600" dirty="0">
                 <a:solidFill>
                   <a:srgbClr val="EB7561"/>
                 </a:solidFill>
@@ -15287,13 +15260,6 @@
   <p:clrMapOvr>
     <a:masterClrMapping/>
   </p:clrMapOvr>
-  <p:timing>
-    <p:tnLst>
-      <p:par>
-        <p:cTn id="1" dur="indefinite" restart="never" nodeType="tmRoot"/>
-      </p:par>
-    </p:tnLst>
-  </p:timing>
 </p:sld>
 </file>
 
@@ -15377,7 +15343,7 @@
           <a:p>
             <a:pPr algn="ctr"/>
             <a:r>
-              <a:rPr lang="en-US" altLang="zh-CN" sz="6600" dirty="0" smtClean="0">
+              <a:rPr lang="en-US" altLang="zh-CN" sz="6600" dirty="0">
                 <a:solidFill>
                   <a:srgbClr val="EB7561"/>
                 </a:solidFill>
@@ -15814,6 +15780,14 @@
 <file path=ppt/slides/slide9.xml><?xml version="1.0" encoding="utf-8"?>
 <p:sld xmlns:a="http://schemas.openxmlformats.org/drawingml/2006/main" xmlns:r="http://schemas.openxmlformats.org/officeDocument/2006/relationships" xmlns:p="http://schemas.openxmlformats.org/presentationml/2006/main">
   <p:cSld>
+    <p:bg>
+      <p:bgPr>
+        <a:solidFill>
+          <a:schemeClr val="bg1"/>
+        </a:solidFill>
+        <a:effectLst/>
+      </p:bgPr>
+    </p:bg>
     <p:spTree>
       <p:nvGrpSpPr>
         <p:cNvPr id="1" name=""/>
@@ -15830,7 +15804,13 @@
       </p:grpSpPr>
       <p:sp>
         <p:nvSpPr>
-          <p:cNvPr id="2" name="Title 1"/>
+          <p:cNvPr id="2" name="Placeholder">
+            <a:extLst>
+              <a:ext uri="{FF2B5EF4-FFF2-40B4-BE49-F238E27FC236}">
+                <a16:creationId xmlns:a16="http://schemas.microsoft.com/office/drawing/2014/main" id="{DECD9BCB-1985-4800-9315-97DF8FF441B0}"/>
+              </a:ext>
+            </a:extLst>
+          </p:cNvPr>
           <p:cNvSpPr>
             <a:spLocks noGrp="1"/>
           </p:cNvSpPr>
@@ -15838,176 +15818,25 @@
             <p:ph type="title"/>
           </p:nvPr>
         </p:nvSpPr>
-        <p:spPr>
-          <a:xfrm>
-            <a:off x="381000" y="609600"/>
-            <a:ext cx="8229600" cy="1143000"/>
-          </a:xfrm>
-        </p:spPr>
-        <p:txBody>
-          <a:bodyPr>
-            <a:noAutofit/>
-          </a:bodyPr>
-          <a:lstStyle/>
-          <a:p>
-            <a:pPr algn="l"/>
-            <a:r>
-              <a:rPr lang="en-US" sz="7200" dirty="0" err="1" smtClean="0">
-                <a:solidFill>
-                  <a:schemeClr val="bg1"/>
-                </a:solidFill>
-              </a:rPr>
-              <a:t>IsClipboardRestored</a:t>
-            </a:r>
-            <a:endParaRPr lang="en-SG" sz="7200" dirty="0">
-              <a:solidFill>
-                <a:schemeClr val="bg1"/>
-              </a:solidFill>
-            </a:endParaRPr>
-          </a:p>
-        </p:txBody>
-      </p:sp>
-      <p:sp>
-        <p:nvSpPr>
-          <p:cNvPr id="3" name="TextBox 2"/>
-          <p:cNvSpPr txBox="1"/>
-          <p:nvPr/>
-        </p:nvSpPr>
-        <p:spPr>
-          <a:xfrm>
-            <a:off x="381000" y="2057400"/>
-            <a:ext cx="8229600" cy="3539430"/>
-          </a:xfrm>
-          <a:prstGeom prst="rect">
-            <a:avLst/>
-          </a:prstGeom>
-          <a:noFill/>
-        </p:spPr>
-        <p:txBody>
-          <a:bodyPr wrap="square" rtlCol="0">
-            <a:spAutoFit/>
-          </a:bodyPr>
-          <a:lstStyle/>
-          <a:p>
-            <a:r>
-              <a:rPr lang="en-US" altLang="zh-CN" sz="2800" dirty="0" smtClean="0">
-                <a:solidFill>
-                  <a:schemeClr val="bg1"/>
-                </a:solidFill>
-              </a:rPr>
-              <a:t>Add those shapes in slide 3 to Shapes Lab;</a:t>
-            </a:r>
-          </a:p>
-          <a:p>
-            <a:r>
-              <a:rPr lang="en-US" altLang="zh-CN" sz="2800" dirty="0" smtClean="0">
-                <a:solidFill>
-                  <a:schemeClr val="bg1"/>
-                </a:solidFill>
-              </a:rPr>
-              <a:t>Add added shapes in Shapes Lab to slide 4;</a:t>
-            </a:r>
-          </a:p>
-          <a:p>
-            <a:r>
-              <a:rPr lang="en-US" altLang="zh-CN" sz="2800" dirty="0" smtClean="0">
-                <a:solidFill>
-                  <a:schemeClr val="bg1"/>
-                </a:solidFill>
-              </a:rPr>
-              <a:t>Compare slide 4 and expected slide 5</a:t>
-            </a:r>
-          </a:p>
-          <a:p>
-            <a:endParaRPr lang="en-US" altLang="zh-CN" sz="2800" dirty="0">
-              <a:solidFill>
-                <a:schemeClr val="bg1"/>
-              </a:solidFill>
-            </a:endParaRPr>
-          </a:p>
-          <a:p>
-            <a:r>
-              <a:rPr lang="en-US" altLang="zh-CN" sz="2800" dirty="0" smtClean="0">
-                <a:solidFill>
-                  <a:schemeClr val="bg1"/>
-                </a:solidFill>
-              </a:rPr>
-              <a:t>Repeat for testing </a:t>
-            </a:r>
-            <a:r>
-              <a:rPr lang="en-US" altLang="zh-CN" sz="2800" dirty="0">
-                <a:solidFill>
-                  <a:schemeClr val="bg1"/>
-                </a:solidFill>
-              </a:rPr>
-              <a:t>A</a:t>
-            </a:r>
-            <a:r>
-              <a:rPr lang="en-US" altLang="zh-CN" sz="2800" dirty="0" smtClean="0">
-                <a:solidFill>
-                  <a:schemeClr val="bg1"/>
-                </a:solidFill>
-              </a:rPr>
-              <a:t>dd </a:t>
-            </a:r>
-            <a:r>
-              <a:rPr lang="en-US" altLang="zh-CN" sz="2800" dirty="0">
-                <a:solidFill>
-                  <a:schemeClr val="bg1"/>
-                </a:solidFill>
-              </a:rPr>
-              <a:t>S</a:t>
-            </a:r>
-            <a:r>
-              <a:rPr lang="en-US" altLang="zh-CN" sz="2800" dirty="0" smtClean="0">
-                <a:solidFill>
-                  <a:schemeClr val="bg1"/>
-                </a:solidFill>
-              </a:rPr>
-              <a:t>hapes button on Shapes Lab pane from slides 6 to 8</a:t>
-            </a:r>
-          </a:p>
-          <a:p>
-            <a:endParaRPr lang="en-US" altLang="zh-CN" sz="2800" dirty="0">
-              <a:solidFill>
-                <a:schemeClr val="bg1"/>
-              </a:solidFill>
-            </a:endParaRPr>
-          </a:p>
-          <a:p>
-            <a:r>
-              <a:rPr lang="en-US" altLang="zh-CN" sz="2800" dirty="0" smtClean="0">
-                <a:solidFill>
-                  <a:schemeClr val="bg1"/>
-                </a:solidFill>
-              </a:rPr>
-              <a:t>Animations are also expected to be transferred</a:t>
-            </a:r>
-            <a:endParaRPr lang="zh-CN" altLang="en-US" sz="2800" dirty="0">
-              <a:solidFill>
-                <a:schemeClr val="bg1"/>
-              </a:solidFill>
-            </a:endParaRPr>
+        <p:spPr/>
+        <p:txBody>
+          <a:bodyPr/>
+          <a:lstStyle/>
+          <a:p>
+            <a:endParaRPr lang="en-US" dirty="0"/>
           </a:p>
         </p:txBody>
       </p:sp>
     </p:spTree>
     <p:extLst>
       <p:ext uri="{BB962C8B-B14F-4D97-AF65-F5344CB8AC3E}">
-        <p14:creationId xmlns:p14="http://schemas.microsoft.com/office/powerpoint/2010/main" val="3646993363"/>
+        <p14:creationId xmlns:p14="http://schemas.microsoft.com/office/powerpoint/2010/main" val="606476009"/>
       </p:ext>
     </p:extLst>
   </p:cSld>
   <p:clrMapOvr>
     <a:masterClrMapping/>
   </p:clrMapOvr>
-  <p:timing>
-    <p:tnLst>
-      <p:par>
-        <p:cTn id="1" dur="indefinite" restart="never" nodeType="tmRoot"/>
-      </p:par>
-    </p:tnLst>
-  </p:timing>
 </p:sld>
 </file>
 

</xml_diff>

<commit_message>
Add ShapesLab FT for AddShapeFromSelection error
- Currently there is no tests for error when adding placeholders
- Tests should be added to check this error occurs correctly
- New implementation includes:
ExpectMessageBoxWillNotPopUp: MessageBoxUtil.cs
TestSavePlaceholderToShapesLabWithAddShapesButton
</commit_message>
<xml_diff>
--- a/doc/test/ShapesLab/ShapesLab.pptx
+++ b/doc/test/ShapesLab/ShapesLab.pptx
@@ -7,7 +7,7 @@
     <p:sldMasterId id="2147483672" r:id="rId3"/>
   </p:sldMasterIdLst>
   <p:notesMasterIdLst>
-    <p:notesMasterId r:id="rId20"/>
+    <p:notesMasterId r:id="rId21"/>
   </p:notesMasterIdLst>
   <p:sldIdLst>
     <p:sldId id="287" r:id="rId4"/>
@@ -18,14 +18,15 @@
     <p:sldId id="300" r:id="rId9"/>
     <p:sldId id="301" r:id="rId10"/>
     <p:sldId id="302" r:id="rId11"/>
-    <p:sldId id="303" r:id="rId12"/>
-    <p:sldId id="304" r:id="rId13"/>
-    <p:sldId id="305" r:id="rId14"/>
-    <p:sldId id="306" r:id="rId15"/>
-    <p:sldId id="307" r:id="rId16"/>
-    <p:sldId id="308" r:id="rId17"/>
-    <p:sldId id="309" r:id="rId18"/>
-    <p:sldId id="274" r:id="rId19"/>
+    <p:sldId id="311" r:id="rId12"/>
+    <p:sldId id="303" r:id="rId13"/>
+    <p:sldId id="304" r:id="rId14"/>
+    <p:sldId id="305" r:id="rId15"/>
+    <p:sldId id="306" r:id="rId16"/>
+    <p:sldId id="307" r:id="rId17"/>
+    <p:sldId id="308" r:id="rId18"/>
+    <p:sldId id="309" r:id="rId19"/>
+    <p:sldId id="274" r:id="rId20"/>
   </p:sldIdLst>
   <p:sldSz cx="9144000" cy="6858000" type="screen4x3"/>
   <p:notesSz cx="6858000" cy="9144000"/>
@@ -141,6 +142,7 @@
             <p14:sldId id="300"/>
             <p14:sldId id="301"/>
             <p14:sldId id="302"/>
+            <p14:sldId id="311"/>
             <p14:sldId id="303"/>
             <p14:sldId id="304"/>
             <p14:sldId id="305"/>
@@ -253,7 +255,7 @@
           <a:p>
             <a:fld id="{26004F41-C1A1-4B0D-9EEE-5E3F0E5BC108}" type="datetimeFigureOut">
               <a:rPr lang="en-SG" smtClean="0"/>
-              <a:t>10/4/2018</a:t>
+              <a:t>22/1/2019</a:t>
             </a:fld>
             <a:endParaRPr lang="en-SG"/>
           </a:p>
@@ -317,35 +319,35 @@
           <a:p>
             <a:pPr lvl="0"/>
             <a:r>
-              <a:rPr lang="zh-CN" altLang="en-US" smtClean="0"/>
+              <a:rPr lang="zh-CN" altLang="en-US"/>
               <a:t>单击此处编辑母版文本样式</a:t>
             </a:r>
           </a:p>
           <a:p>
             <a:pPr lvl="1"/>
             <a:r>
-              <a:rPr lang="zh-CN" altLang="en-US" smtClean="0"/>
+              <a:rPr lang="zh-CN" altLang="en-US"/>
               <a:t>第二级</a:t>
             </a:r>
           </a:p>
           <a:p>
             <a:pPr lvl="2"/>
             <a:r>
-              <a:rPr lang="zh-CN" altLang="en-US" smtClean="0"/>
+              <a:rPr lang="zh-CN" altLang="en-US"/>
               <a:t>第三级</a:t>
             </a:r>
           </a:p>
           <a:p>
             <a:pPr lvl="3"/>
             <a:r>
-              <a:rPr lang="zh-CN" altLang="en-US" smtClean="0"/>
+              <a:rPr lang="zh-CN" altLang="en-US"/>
               <a:t>第四级</a:t>
             </a:r>
           </a:p>
           <a:p>
             <a:pPr lvl="4"/>
             <a:r>
-              <a:rPr lang="zh-CN" altLang="en-US" smtClean="0"/>
+              <a:rPr lang="zh-CN" altLang="en-US"/>
               <a:t>第五级</a:t>
             </a:r>
             <a:endParaRPr lang="en-SG"/>
@@ -566,185 +568,184 @@
           <a:lstStyle/>
           <a:p>
             <a:r>
-              <a:rPr lang="en-US" dirty="0" smtClean="0"/>
+              <a:rPr lang="en-US" dirty="0"/>
               <a:t>Do the following from 3 environments:</a:t>
             </a:r>
           </a:p>
           <a:p>
             <a:r>
-              <a:rPr lang="en-US" dirty="0" smtClean="0"/>
+              <a:rPr lang="en-US" dirty="0"/>
               <a:t>1. Entirely new environment</a:t>
             </a:r>
           </a:p>
           <a:p>
             <a:r>
-              <a:rPr lang="en-US" dirty="0" smtClean="0"/>
+              <a:rPr lang="en-US" dirty="0"/>
               <a:t>2. Contains old shape info</a:t>
             </a:r>
           </a:p>
           <a:p>
-            <a:endParaRPr lang="en-US" dirty="0" smtClean="0"/>
-          </a:p>
-          <a:p>
-            <a:r>
-              <a:rPr lang="en-US" dirty="0" smtClean="0"/>
+            <a:endParaRPr lang="en-US" dirty="0"/>
+          </a:p>
+          <a:p>
+            <a:r>
+              <a:rPr lang="en-US" dirty="0"/>
               <a:t>1. Add Category</a:t>
             </a:r>
           </a:p>
           <a:p>
             <a:r>
-              <a:rPr lang="en-US" dirty="0" smtClean="0"/>
+              <a:rPr lang="en-US" dirty="0"/>
               <a:t>	1.1 Add category then add a new shape inside, check the default name, close and open to check</a:t>
             </a:r>
           </a:p>
           <a:p>
             <a:r>
-              <a:rPr lang="en-US" dirty="0" smtClean="0"/>
+              <a:rPr lang="en-US" dirty="0"/>
               <a:t>	1.2 Add category then add a new shape inside, check the default name, set the category as default, close and open to check</a:t>
             </a:r>
           </a:p>
           <a:p>
             <a:r>
-              <a:rPr lang="en-US" dirty="0" smtClean="0"/>
+              <a:rPr lang="en-US" dirty="0"/>
               <a:t>2. Rename Category</a:t>
             </a:r>
           </a:p>
           <a:p>
             <a:r>
-              <a:rPr lang="en-US" dirty="0" smtClean="0"/>
+              <a:rPr lang="en-US" dirty="0"/>
               <a:t>	2.1 Rename to a valid name</a:t>
             </a:r>
           </a:p>
           <a:p>
             <a:r>
-              <a:rPr lang="en-US" dirty="0" smtClean="0"/>
+              <a:rPr lang="en-US" dirty="0"/>
               <a:t>	2.2 Rename to an </a:t>
             </a:r>
             <a:r>
-              <a:rPr lang="en-US" dirty="0" err="1" smtClean="0"/>
+              <a:rPr lang="en-US" dirty="0" err="1"/>
               <a:t>invaid</a:t>
             </a:r>
             <a:r>
-              <a:rPr lang="en-US" dirty="0" smtClean="0"/>
+              <a:rPr lang="en-US" dirty="0"/>
               <a:t> name</a:t>
             </a:r>
           </a:p>
           <a:p>
             <a:r>
-              <a:rPr lang="en-US" dirty="0" smtClean="0"/>
+              <a:rPr lang="en-US" dirty="0"/>
               <a:t>3. Import Category</a:t>
             </a:r>
           </a:p>
           <a:p>
             <a:r>
-              <a:rPr lang="en-US" dirty="0" smtClean="0"/>
+              <a:rPr lang="en-US" dirty="0"/>
               <a:t>	3.1 Import single category with </a:t>
             </a:r>
             <a:r>
-              <a:rPr lang="en-US" dirty="0" err="1" smtClean="0"/>
+              <a:rPr lang="en-US" dirty="0" err="1"/>
               <a:t>namebox</a:t>
             </a:r>
             <a:r>
-              <a:rPr lang="en-US" dirty="0" smtClean="0"/>
+              <a:rPr lang="en-US" dirty="0"/>
               <a:t>, no conflict name</a:t>
             </a:r>
           </a:p>
           <a:p>
             <a:r>
-              <a:rPr lang="en-US" dirty="0" smtClean="0"/>
+              <a:rPr lang="en-US" dirty="0"/>
               <a:t>	3.2 Import multiple categories with </a:t>
             </a:r>
             <a:r>
-              <a:rPr lang="en-US" dirty="0" err="1" smtClean="0"/>
+              <a:rPr lang="en-US" dirty="0" err="1"/>
               <a:t>nameboxes</a:t>
             </a:r>
             <a:r>
-              <a:rPr lang="en-US" dirty="0" smtClean="0"/>
+              <a:rPr lang="en-US" dirty="0"/>
               <a:t>, no </a:t>
             </a:r>
             <a:r>
-              <a:rPr lang="en-US" dirty="0" err="1" smtClean="0"/>
+              <a:rPr lang="en-US" dirty="0" err="1"/>
               <a:t>confilct</a:t>
             </a:r>
             <a:r>
-              <a:rPr lang="en-US" dirty="0" smtClean="0"/>
+              <a:rPr lang="en-US" dirty="0"/>
               <a:t> name</a:t>
             </a:r>
           </a:p>
           <a:p>
             <a:r>
-              <a:rPr lang="en-US" dirty="0" smtClean="0"/>
+              <a:rPr lang="en-US" dirty="0"/>
               <a:t>	3.3 Import single category with </a:t>
             </a:r>
             <a:r>
-              <a:rPr lang="en-US" dirty="0" err="1" smtClean="0"/>
+              <a:rPr lang="en-US" dirty="0" err="1"/>
               <a:t>namebox</a:t>
             </a:r>
             <a:r>
-              <a:rPr lang="en-US" dirty="0" smtClean="0"/>
+              <a:rPr lang="en-US" dirty="0"/>
               <a:t>, conflict with one existed name</a:t>
             </a:r>
           </a:p>
           <a:p>
             <a:r>
-              <a:rPr lang="en-US" dirty="0" smtClean="0"/>
+              <a:rPr lang="en-US" dirty="0"/>
               <a:t>	3.4 Import multiple categories with </a:t>
             </a:r>
             <a:r>
-              <a:rPr lang="en-US" dirty="0" err="1" smtClean="0"/>
+              <a:rPr lang="en-US" dirty="0" err="1"/>
               <a:t>nameboxes</a:t>
             </a:r>
             <a:r>
-              <a:rPr lang="en-US" dirty="0" smtClean="0"/>
+              <a:rPr lang="en-US" dirty="0"/>
               <a:t>, some of the boxes conflict with existed name</a:t>
             </a:r>
           </a:p>
           <a:p>
             <a:r>
-              <a:rPr lang="en-US" dirty="0" smtClean="0"/>
+              <a:rPr lang="en-US" dirty="0"/>
               <a:t>	3.5 Import single category without </a:t>
             </a:r>
             <a:r>
-              <a:rPr lang="en-US" dirty="0" err="1" smtClean="0"/>
+              <a:rPr lang="en-US" dirty="0" err="1"/>
               <a:t>namebox</a:t>
             </a:r>
-            <a:endParaRPr lang="en-US" dirty="0" smtClean="0"/>
-          </a:p>
-          <a:p>
-            <a:r>
-              <a:rPr lang="en-US" dirty="0" smtClean="0"/>
+            <a:endParaRPr lang="en-US" dirty="0"/>
+          </a:p>
+          <a:p>
+            <a:r>
+              <a:rPr lang="en-US" dirty="0"/>
               <a:t>	3.6 Import single category without </a:t>
             </a:r>
             <a:r>
-              <a:rPr lang="en-US" dirty="0" err="1" smtClean="0"/>
+              <a:rPr lang="en-US" dirty="0" err="1"/>
               <a:t>namebox</a:t>
             </a:r>
             <a:r>
-              <a:rPr lang="en-US" dirty="0" smtClean="0"/>
+              <a:rPr lang="en-US" dirty="0"/>
               <a:t>, conflict with exist name</a:t>
             </a:r>
           </a:p>
           <a:p>
             <a:r>
-              <a:rPr lang="en-US" dirty="0" smtClean="0"/>
+              <a:rPr lang="en-US" dirty="0"/>
               <a:t>	3.7 Import multiple categories without </a:t>
             </a:r>
             <a:r>
-              <a:rPr lang="en-US" dirty="0" err="1" smtClean="0"/>
+              <a:rPr lang="en-US" dirty="0" err="1"/>
               <a:t>namebox</a:t>
             </a:r>
-            <a:endParaRPr lang="en-US" dirty="0" smtClean="0"/>
-          </a:p>
-          <a:p>
-            <a:r>
-              <a:rPr lang="en-US" dirty="0" smtClean="0"/>
+            <a:endParaRPr lang="en-US" dirty="0"/>
+          </a:p>
+          <a:p>
+            <a:r>
+              <a:rPr lang="en-US" dirty="0"/>
               <a:t>4. </a:t>
             </a:r>
             <a:r>
-              <a:rPr lang="en-US" smtClean="0"/>
+              <a:rPr lang="en-US"/>
               <a:t>Migrate Category</a:t>
             </a:r>
-            <a:endParaRPr lang="en-US"/>
           </a:p>
         </p:txBody>
       </p:sp>
@@ -829,7 +830,7 @@
           <a:lstStyle/>
           <a:p>
             <a:r>
-              <a:rPr lang="en-US" altLang="zh-CN" dirty="0" smtClean="0"/>
+              <a:rPr lang="en-US" altLang="zh-CN" dirty="0"/>
               <a:t>Expected</a:t>
             </a:r>
             <a:endParaRPr lang="zh-CN" altLang="en-US" dirty="0"/>
@@ -853,7 +854,7 @@
           <a:p>
             <a:fld id="{E96FB07A-B1AD-4238-A6C9-967239C45D18}" type="slidenum">
               <a:rPr lang="en-SG" smtClean="0"/>
-              <a:t>15</a:t>
+              <a:t>16</a:t>
             </a:fld>
             <a:endParaRPr lang="en-SG"/>
           </a:p>
@@ -1001,7 +1002,7 @@
           <a:lstStyle/>
           <a:p>
             <a:r>
-              <a:rPr lang="en-US" altLang="zh-CN" dirty="0" smtClean="0"/>
+              <a:rPr lang="en-US" altLang="zh-CN" dirty="0"/>
               <a:t>Expected</a:t>
             </a:r>
             <a:endParaRPr lang="zh-CN" altLang="en-US" dirty="0"/>
@@ -1173,7 +1174,7 @@
           <a:lstStyle/>
           <a:p>
             <a:r>
-              <a:rPr lang="en-US" altLang="zh-CN" dirty="0" smtClean="0"/>
+              <a:rPr lang="en-US" altLang="zh-CN" dirty="0"/>
               <a:t>Expected</a:t>
             </a:r>
             <a:endParaRPr lang="zh-CN" altLang="en-US" dirty="0"/>
@@ -1261,185 +1262,184 @@
           <a:lstStyle/>
           <a:p>
             <a:r>
-              <a:rPr lang="en-US" dirty="0" smtClean="0"/>
+              <a:rPr lang="en-US" dirty="0"/>
               <a:t>Do the following from 3 environments:</a:t>
             </a:r>
           </a:p>
           <a:p>
             <a:r>
-              <a:rPr lang="en-US" dirty="0" smtClean="0"/>
+              <a:rPr lang="en-US" dirty="0"/>
               <a:t>1. Entirely new environment</a:t>
             </a:r>
           </a:p>
           <a:p>
             <a:r>
-              <a:rPr lang="en-US" dirty="0" smtClean="0"/>
+              <a:rPr lang="en-US" dirty="0"/>
               <a:t>2. Contains old shape info</a:t>
             </a:r>
           </a:p>
           <a:p>
-            <a:endParaRPr lang="en-US" dirty="0" smtClean="0"/>
-          </a:p>
-          <a:p>
-            <a:r>
-              <a:rPr lang="en-US" dirty="0" smtClean="0"/>
+            <a:endParaRPr lang="en-US" dirty="0"/>
+          </a:p>
+          <a:p>
+            <a:r>
+              <a:rPr lang="en-US" dirty="0"/>
               <a:t>1. Add Category</a:t>
             </a:r>
           </a:p>
           <a:p>
             <a:r>
-              <a:rPr lang="en-US" dirty="0" smtClean="0"/>
+              <a:rPr lang="en-US" dirty="0"/>
               <a:t>	1.1 Add category then add a new shape inside, check the default name, close and open to check</a:t>
             </a:r>
           </a:p>
           <a:p>
             <a:r>
-              <a:rPr lang="en-US" dirty="0" smtClean="0"/>
+              <a:rPr lang="en-US" dirty="0"/>
               <a:t>	1.2 Add category then add a new shape inside, check the default name, set the category as default, close and open to check</a:t>
             </a:r>
           </a:p>
           <a:p>
             <a:r>
-              <a:rPr lang="en-US" dirty="0" smtClean="0"/>
+              <a:rPr lang="en-US" dirty="0"/>
               <a:t>2. Rename Category</a:t>
             </a:r>
           </a:p>
           <a:p>
             <a:r>
-              <a:rPr lang="en-US" dirty="0" smtClean="0"/>
+              <a:rPr lang="en-US" dirty="0"/>
               <a:t>	2.1 Rename to a valid name</a:t>
             </a:r>
           </a:p>
           <a:p>
             <a:r>
-              <a:rPr lang="en-US" dirty="0" smtClean="0"/>
+              <a:rPr lang="en-US" dirty="0"/>
               <a:t>	2.2 Rename to an </a:t>
             </a:r>
             <a:r>
-              <a:rPr lang="en-US" dirty="0" err="1" smtClean="0"/>
+              <a:rPr lang="en-US" dirty="0" err="1"/>
               <a:t>invaid</a:t>
             </a:r>
             <a:r>
-              <a:rPr lang="en-US" dirty="0" smtClean="0"/>
+              <a:rPr lang="en-US" dirty="0"/>
               <a:t> name</a:t>
             </a:r>
           </a:p>
           <a:p>
             <a:r>
-              <a:rPr lang="en-US" dirty="0" smtClean="0"/>
+              <a:rPr lang="en-US" dirty="0"/>
               <a:t>3. Import Category</a:t>
             </a:r>
           </a:p>
           <a:p>
             <a:r>
-              <a:rPr lang="en-US" dirty="0" smtClean="0"/>
+              <a:rPr lang="en-US" dirty="0"/>
               <a:t>	3.1 Import single category with </a:t>
             </a:r>
             <a:r>
-              <a:rPr lang="en-US" dirty="0" err="1" smtClean="0"/>
+              <a:rPr lang="en-US" dirty="0" err="1"/>
               <a:t>namebox</a:t>
             </a:r>
             <a:r>
-              <a:rPr lang="en-US" dirty="0" smtClean="0"/>
+              <a:rPr lang="en-US" dirty="0"/>
               <a:t>, no conflict name</a:t>
             </a:r>
           </a:p>
           <a:p>
             <a:r>
-              <a:rPr lang="en-US" dirty="0" smtClean="0"/>
+              <a:rPr lang="en-US" dirty="0"/>
               <a:t>	3.2 Import multiple categories with </a:t>
             </a:r>
             <a:r>
-              <a:rPr lang="en-US" dirty="0" err="1" smtClean="0"/>
+              <a:rPr lang="en-US" dirty="0" err="1"/>
               <a:t>nameboxes</a:t>
             </a:r>
             <a:r>
-              <a:rPr lang="en-US" dirty="0" smtClean="0"/>
+              <a:rPr lang="en-US" dirty="0"/>
               <a:t>, no </a:t>
             </a:r>
             <a:r>
-              <a:rPr lang="en-US" dirty="0" err="1" smtClean="0"/>
+              <a:rPr lang="en-US" dirty="0" err="1"/>
               <a:t>confilct</a:t>
             </a:r>
             <a:r>
-              <a:rPr lang="en-US" dirty="0" smtClean="0"/>
+              <a:rPr lang="en-US" dirty="0"/>
               <a:t> name</a:t>
             </a:r>
           </a:p>
           <a:p>
             <a:r>
-              <a:rPr lang="en-US" dirty="0" smtClean="0"/>
+              <a:rPr lang="en-US" dirty="0"/>
               <a:t>	3.3 Import single category with </a:t>
             </a:r>
             <a:r>
-              <a:rPr lang="en-US" dirty="0" err="1" smtClean="0"/>
+              <a:rPr lang="en-US" dirty="0" err="1"/>
               <a:t>namebox</a:t>
             </a:r>
             <a:r>
-              <a:rPr lang="en-US" dirty="0" smtClean="0"/>
+              <a:rPr lang="en-US" dirty="0"/>
               <a:t>, conflict with one existed name</a:t>
             </a:r>
           </a:p>
           <a:p>
             <a:r>
-              <a:rPr lang="en-US" dirty="0" smtClean="0"/>
+              <a:rPr lang="en-US" dirty="0"/>
               <a:t>	3.4 Import multiple categories with </a:t>
             </a:r>
             <a:r>
-              <a:rPr lang="en-US" dirty="0" err="1" smtClean="0"/>
+              <a:rPr lang="en-US" dirty="0" err="1"/>
               <a:t>nameboxes</a:t>
             </a:r>
             <a:r>
-              <a:rPr lang="en-US" dirty="0" smtClean="0"/>
+              <a:rPr lang="en-US" dirty="0"/>
               <a:t>, some of the boxes conflict with existed name</a:t>
             </a:r>
           </a:p>
           <a:p>
             <a:r>
-              <a:rPr lang="en-US" dirty="0" smtClean="0"/>
+              <a:rPr lang="en-US" dirty="0"/>
               <a:t>	3.5 Import single category without </a:t>
             </a:r>
             <a:r>
-              <a:rPr lang="en-US" dirty="0" err="1" smtClean="0"/>
+              <a:rPr lang="en-US" dirty="0" err="1"/>
               <a:t>namebox</a:t>
             </a:r>
-            <a:endParaRPr lang="en-US" dirty="0" smtClean="0"/>
-          </a:p>
-          <a:p>
-            <a:r>
-              <a:rPr lang="en-US" dirty="0" smtClean="0"/>
+            <a:endParaRPr lang="en-US" dirty="0"/>
+          </a:p>
+          <a:p>
+            <a:r>
+              <a:rPr lang="en-US" dirty="0"/>
               <a:t>	3.6 Import single category without </a:t>
             </a:r>
             <a:r>
-              <a:rPr lang="en-US" dirty="0" err="1" smtClean="0"/>
+              <a:rPr lang="en-US" dirty="0" err="1"/>
               <a:t>namebox</a:t>
             </a:r>
             <a:r>
-              <a:rPr lang="en-US" dirty="0" smtClean="0"/>
+              <a:rPr lang="en-US" dirty="0"/>
               <a:t>, conflict with exist name</a:t>
             </a:r>
           </a:p>
           <a:p>
             <a:r>
-              <a:rPr lang="en-US" dirty="0" smtClean="0"/>
+              <a:rPr lang="en-US" dirty="0"/>
               <a:t>	3.7 Import multiple categories without </a:t>
             </a:r>
             <a:r>
-              <a:rPr lang="en-US" dirty="0" err="1" smtClean="0"/>
+              <a:rPr lang="en-US" dirty="0" err="1"/>
               <a:t>namebox</a:t>
             </a:r>
-            <a:endParaRPr lang="en-US" dirty="0" smtClean="0"/>
-          </a:p>
-          <a:p>
-            <a:r>
-              <a:rPr lang="en-US" dirty="0" smtClean="0"/>
+            <a:endParaRPr lang="en-US" dirty="0"/>
+          </a:p>
+          <a:p>
+            <a:r>
+              <a:rPr lang="en-US" dirty="0"/>
               <a:t>4. </a:t>
             </a:r>
             <a:r>
-              <a:rPr lang="en-US" smtClean="0"/>
+              <a:rPr lang="en-US"/>
               <a:t>Migrate Category</a:t>
             </a:r>
-            <a:endParaRPr lang="en-US"/>
           </a:p>
         </p:txBody>
       </p:sp>
@@ -1460,7 +1460,7 @@
           <a:p>
             <a:fld id="{E96FB07A-B1AD-4238-A6C9-967239C45D18}" type="slidenum">
               <a:rPr lang="en-SG" smtClean="0"/>
-              <a:t>9</a:t>
+              <a:t>10</a:t>
             </a:fld>
             <a:endParaRPr lang="en-SG"/>
           </a:p>
@@ -1544,7 +1544,7 @@
           <a:p>
             <a:fld id="{E96FB07A-B1AD-4238-A6C9-967239C45D18}" type="slidenum">
               <a:rPr lang="en-SG" smtClean="0"/>
-              <a:t>10</a:t>
+              <a:t>11</a:t>
             </a:fld>
             <a:endParaRPr lang="en-SG"/>
           </a:p>
@@ -1608,7 +1608,7 @@
           <a:lstStyle/>
           <a:p>
             <a:r>
-              <a:rPr lang="en-US" altLang="zh-CN" dirty="0" smtClean="0"/>
+              <a:rPr lang="en-US" altLang="zh-CN" dirty="0"/>
               <a:t>Expected</a:t>
             </a:r>
             <a:endParaRPr lang="zh-CN" altLang="en-US" dirty="0"/>
@@ -1632,7 +1632,7 @@
           <a:p>
             <a:fld id="{E96FB07A-B1AD-4238-A6C9-967239C45D18}" type="slidenum">
               <a:rPr lang="en-SG" smtClean="0"/>
-              <a:t>12</a:t>
+              <a:t>13</a:t>
             </a:fld>
             <a:endParaRPr lang="en-SG"/>
           </a:p>
@@ -1716,7 +1716,7 @@
           <a:p>
             <a:fld id="{E96FB07A-B1AD-4238-A6C9-967239C45D18}" type="slidenum">
               <a:rPr lang="en-SG" smtClean="0"/>
-              <a:t>13</a:t>
+              <a:t>14</a:t>
             </a:fld>
             <a:endParaRPr lang="en-SG"/>
           </a:p>
@@ -1773,10 +1773,9 @@
           <a:lstStyle/>
           <a:p>
             <a:r>
-              <a:rPr lang="en-US" smtClean="0"/>
+              <a:rPr lang="en-US"/>
               <a:t>Click to edit Master title style</a:t>
             </a:r>
-            <a:endParaRPr lang="en-US"/>
           </a:p>
         </p:txBody>
       </p:sp>
@@ -1892,10 +1891,9 @@
           </a:lstStyle>
           <a:p>
             <a:r>
-              <a:rPr lang="en-US" smtClean="0"/>
+              <a:rPr lang="en-US"/>
               <a:t>Click to edit Master subtitle style</a:t>
             </a:r>
-            <a:endParaRPr lang="en-US"/>
           </a:p>
         </p:txBody>
       </p:sp>
@@ -1916,7 +1914,7 @@
           <a:p>
             <a:fld id="{699DC775-C286-4358-8C92-D7E584E969B3}" type="datetimeFigureOut">
               <a:rPr lang="en-US" smtClean="0"/>
-              <a:t>4/10/2018</a:t>
+              <a:t>1/22/2019</a:t>
             </a:fld>
             <a:endParaRPr lang="en-US"/>
           </a:p>
@@ -2010,10 +2008,9 @@
           <a:lstStyle/>
           <a:p>
             <a:r>
-              <a:rPr lang="en-US" smtClean="0"/>
+              <a:rPr lang="en-US"/>
               <a:t>Click to edit Master title style</a:t>
             </a:r>
-            <a:endParaRPr lang="en-US"/>
           </a:p>
         </p:txBody>
       </p:sp>
@@ -2034,38 +2031,37 @@
           <a:p>
             <a:pPr lvl="0"/>
             <a:r>
-              <a:rPr lang="en-US" smtClean="0"/>
+              <a:rPr lang="en-US"/>
               <a:t>Click to edit Master text styles</a:t>
             </a:r>
           </a:p>
           <a:p>
             <a:pPr lvl="1"/>
             <a:r>
-              <a:rPr lang="en-US" smtClean="0"/>
+              <a:rPr lang="en-US"/>
               <a:t>Second level</a:t>
             </a:r>
           </a:p>
           <a:p>
             <a:pPr lvl="2"/>
             <a:r>
-              <a:rPr lang="en-US" smtClean="0"/>
+              <a:rPr lang="en-US"/>
               <a:t>Third level</a:t>
             </a:r>
           </a:p>
           <a:p>
             <a:pPr lvl="3"/>
             <a:r>
-              <a:rPr lang="en-US" smtClean="0"/>
+              <a:rPr lang="en-US"/>
               <a:t>Fourth level</a:t>
             </a:r>
           </a:p>
           <a:p>
             <a:pPr lvl="4"/>
             <a:r>
-              <a:rPr lang="en-US" smtClean="0"/>
+              <a:rPr lang="en-US"/>
               <a:t>Fifth level</a:t>
             </a:r>
-            <a:endParaRPr lang="en-US"/>
           </a:p>
         </p:txBody>
       </p:sp>
@@ -2086,7 +2082,7 @@
           <a:p>
             <a:fld id="{699DC775-C286-4358-8C92-D7E584E969B3}" type="datetimeFigureOut">
               <a:rPr lang="en-US" smtClean="0"/>
-              <a:t>4/10/2018</a:t>
+              <a:t>1/22/2019</a:t>
             </a:fld>
             <a:endParaRPr lang="en-US"/>
           </a:p>
@@ -2185,10 +2181,9 @@
           <a:lstStyle/>
           <a:p>
             <a:r>
-              <a:rPr lang="en-US" smtClean="0"/>
+              <a:rPr lang="en-US"/>
               <a:t>Click to edit Master title style</a:t>
             </a:r>
-            <a:endParaRPr lang="en-US"/>
           </a:p>
         </p:txBody>
       </p:sp>
@@ -2214,38 +2209,37 @@
           <a:p>
             <a:pPr lvl="0"/>
             <a:r>
-              <a:rPr lang="en-US" smtClean="0"/>
+              <a:rPr lang="en-US"/>
               <a:t>Click to edit Master text styles</a:t>
             </a:r>
           </a:p>
           <a:p>
             <a:pPr lvl="1"/>
             <a:r>
-              <a:rPr lang="en-US" smtClean="0"/>
+              <a:rPr lang="en-US"/>
               <a:t>Second level</a:t>
             </a:r>
           </a:p>
           <a:p>
             <a:pPr lvl="2"/>
             <a:r>
-              <a:rPr lang="en-US" smtClean="0"/>
+              <a:rPr lang="en-US"/>
               <a:t>Third level</a:t>
             </a:r>
           </a:p>
           <a:p>
             <a:pPr lvl="3"/>
             <a:r>
-              <a:rPr lang="en-US" smtClean="0"/>
+              <a:rPr lang="en-US"/>
               <a:t>Fourth level</a:t>
             </a:r>
           </a:p>
           <a:p>
             <a:pPr lvl="4"/>
             <a:r>
-              <a:rPr lang="en-US" smtClean="0"/>
+              <a:rPr lang="en-US"/>
               <a:t>Fifth level</a:t>
             </a:r>
-            <a:endParaRPr lang="en-US"/>
           </a:p>
         </p:txBody>
       </p:sp>
@@ -2266,7 +2260,7 @@
           <a:p>
             <a:fld id="{699DC775-C286-4358-8C92-D7E584E969B3}" type="datetimeFigureOut">
               <a:rPr lang="en-US" smtClean="0"/>
-              <a:t>4/10/2018</a:t>
+              <a:t>1/22/2019</a:t>
             </a:fld>
             <a:endParaRPr lang="en-US"/>
           </a:p>
@@ -2365,10 +2359,9 @@
           <a:lstStyle/>
           <a:p>
             <a:r>
-              <a:rPr lang="en-US" smtClean="0"/>
+              <a:rPr lang="en-US"/>
               <a:t>Click to edit Master title style</a:t>
             </a:r>
-            <a:endParaRPr lang="en-US"/>
           </a:p>
         </p:txBody>
       </p:sp>
@@ -2484,10 +2477,9 @@
           </a:lstStyle>
           <a:p>
             <a:r>
-              <a:rPr lang="en-US" smtClean="0"/>
+              <a:rPr lang="en-US"/>
               <a:t>Click to edit Master subtitle style</a:t>
             </a:r>
-            <a:endParaRPr lang="en-US"/>
           </a:p>
         </p:txBody>
       </p:sp>
@@ -2508,7 +2500,7 @@
           <a:p>
             <a:fld id="{699DC775-C286-4358-8C92-D7E584E969B3}" type="datetimeFigureOut">
               <a:rPr lang="en-US" smtClean="0"/>
-              <a:t>4/10/2018</a:t>
+              <a:t>1/22/2019</a:t>
             </a:fld>
             <a:endParaRPr lang="en-US"/>
           </a:p>
@@ -2602,10 +2594,9 @@
           <a:lstStyle/>
           <a:p>
             <a:r>
-              <a:rPr lang="en-US" smtClean="0"/>
+              <a:rPr lang="en-US"/>
               <a:t>Click to edit Master title style</a:t>
             </a:r>
-            <a:endParaRPr lang="en-US"/>
           </a:p>
         </p:txBody>
       </p:sp>
@@ -2626,38 +2617,37 @@
           <a:p>
             <a:pPr lvl="0"/>
             <a:r>
-              <a:rPr lang="en-US" smtClean="0"/>
+              <a:rPr lang="en-US"/>
               <a:t>Click to edit Master text styles</a:t>
             </a:r>
           </a:p>
           <a:p>
             <a:pPr lvl="1"/>
             <a:r>
-              <a:rPr lang="en-US" smtClean="0"/>
+              <a:rPr lang="en-US"/>
               <a:t>Second level</a:t>
             </a:r>
           </a:p>
           <a:p>
             <a:pPr lvl="2"/>
             <a:r>
-              <a:rPr lang="en-US" smtClean="0"/>
+              <a:rPr lang="en-US"/>
               <a:t>Third level</a:t>
             </a:r>
           </a:p>
           <a:p>
             <a:pPr lvl="3"/>
             <a:r>
-              <a:rPr lang="en-US" smtClean="0"/>
+              <a:rPr lang="en-US"/>
               <a:t>Fourth level</a:t>
             </a:r>
           </a:p>
           <a:p>
             <a:pPr lvl="4"/>
             <a:r>
-              <a:rPr lang="en-US" smtClean="0"/>
+              <a:rPr lang="en-US"/>
               <a:t>Fifth level</a:t>
             </a:r>
-            <a:endParaRPr lang="en-US"/>
           </a:p>
         </p:txBody>
       </p:sp>
@@ -2678,7 +2668,7 @@
           <a:p>
             <a:fld id="{699DC775-C286-4358-8C92-D7E584E969B3}" type="datetimeFigureOut">
               <a:rPr lang="en-US" smtClean="0"/>
-              <a:t>4/10/2018</a:t>
+              <a:t>1/22/2019</a:t>
             </a:fld>
             <a:endParaRPr lang="en-US"/>
           </a:p>
@@ -2781,10 +2771,9 @@
           </a:lstStyle>
           <a:p>
             <a:r>
-              <a:rPr lang="en-US" smtClean="0"/>
+              <a:rPr lang="en-US"/>
               <a:t>Click to edit Master title style</a:t>
             </a:r>
-            <a:endParaRPr lang="en-US"/>
           </a:p>
         </p:txBody>
       </p:sp>
@@ -2901,7 +2890,7 @@
           <a:p>
             <a:pPr lvl="0"/>
             <a:r>
-              <a:rPr lang="en-US" smtClean="0"/>
+              <a:rPr lang="en-US"/>
               <a:t>Click to edit Master text styles</a:t>
             </a:r>
           </a:p>
@@ -2924,7 +2913,7 @@
           <a:p>
             <a:fld id="{699DC775-C286-4358-8C92-D7E584E969B3}" type="datetimeFigureOut">
               <a:rPr lang="en-US" smtClean="0"/>
-              <a:t>4/10/2018</a:t>
+              <a:t>1/22/2019</a:t>
             </a:fld>
             <a:endParaRPr lang="en-US"/>
           </a:p>
@@ -3018,10 +3007,9 @@
           <a:lstStyle/>
           <a:p>
             <a:r>
-              <a:rPr lang="en-US" smtClean="0"/>
+              <a:rPr lang="en-US"/>
               <a:t>Click to edit Master title style</a:t>
             </a:r>
-            <a:endParaRPr lang="en-US"/>
           </a:p>
         </p:txBody>
       </p:sp>
@@ -3075,38 +3063,37 @@
           <a:p>
             <a:pPr lvl="0"/>
             <a:r>
-              <a:rPr lang="en-US" smtClean="0"/>
+              <a:rPr lang="en-US"/>
               <a:t>Click to edit Master text styles</a:t>
             </a:r>
           </a:p>
           <a:p>
             <a:pPr lvl="1"/>
             <a:r>
-              <a:rPr lang="en-US" smtClean="0"/>
+              <a:rPr lang="en-US"/>
               <a:t>Second level</a:t>
             </a:r>
           </a:p>
           <a:p>
             <a:pPr lvl="2"/>
             <a:r>
-              <a:rPr lang="en-US" smtClean="0"/>
+              <a:rPr lang="en-US"/>
               <a:t>Third level</a:t>
             </a:r>
           </a:p>
           <a:p>
             <a:pPr lvl="3"/>
             <a:r>
-              <a:rPr lang="en-US" smtClean="0"/>
+              <a:rPr lang="en-US"/>
               <a:t>Fourth level</a:t>
             </a:r>
           </a:p>
           <a:p>
             <a:pPr lvl="4"/>
             <a:r>
-              <a:rPr lang="en-US" smtClean="0"/>
+              <a:rPr lang="en-US"/>
               <a:t>Fifth level</a:t>
             </a:r>
-            <a:endParaRPr lang="en-US"/>
           </a:p>
         </p:txBody>
       </p:sp>
@@ -3160,38 +3147,37 @@
           <a:p>
             <a:pPr lvl="0"/>
             <a:r>
-              <a:rPr lang="en-US" smtClean="0"/>
+              <a:rPr lang="en-US"/>
               <a:t>Click to edit Master text styles</a:t>
             </a:r>
           </a:p>
           <a:p>
             <a:pPr lvl="1"/>
             <a:r>
-              <a:rPr lang="en-US" smtClean="0"/>
+              <a:rPr lang="en-US"/>
               <a:t>Second level</a:t>
             </a:r>
           </a:p>
           <a:p>
             <a:pPr lvl="2"/>
             <a:r>
-              <a:rPr lang="en-US" smtClean="0"/>
+              <a:rPr lang="en-US"/>
               <a:t>Third level</a:t>
             </a:r>
           </a:p>
           <a:p>
             <a:pPr lvl="3"/>
             <a:r>
-              <a:rPr lang="en-US" smtClean="0"/>
+              <a:rPr lang="en-US"/>
               <a:t>Fourth level</a:t>
             </a:r>
           </a:p>
           <a:p>
             <a:pPr lvl="4"/>
             <a:r>
-              <a:rPr lang="en-US" smtClean="0"/>
+              <a:rPr lang="en-US"/>
               <a:t>Fifth level</a:t>
             </a:r>
-            <a:endParaRPr lang="en-US"/>
           </a:p>
         </p:txBody>
       </p:sp>
@@ -3212,7 +3198,7 @@
           <a:p>
             <a:fld id="{699DC775-C286-4358-8C92-D7E584E969B3}" type="datetimeFigureOut">
               <a:rPr lang="en-US" smtClean="0"/>
-              <a:t>4/10/2018</a:t>
+              <a:t>1/22/2019</a:t>
             </a:fld>
             <a:endParaRPr lang="en-US"/>
           </a:p>
@@ -3310,10 +3296,9 @@
           </a:lstStyle>
           <a:p>
             <a:r>
-              <a:rPr lang="en-US" smtClean="0"/>
+              <a:rPr lang="en-US"/>
               <a:t>Click to edit Master title style</a:t>
             </a:r>
-            <a:endParaRPr lang="en-US"/>
           </a:p>
         </p:txBody>
       </p:sp>
@@ -3376,7 +3361,7 @@
           <a:p>
             <a:pPr lvl="0"/>
             <a:r>
-              <a:rPr lang="en-US" smtClean="0"/>
+              <a:rPr lang="en-US"/>
               <a:t>Click to edit Master text styles</a:t>
             </a:r>
           </a:p>
@@ -3432,38 +3417,37 @@
           <a:p>
             <a:pPr lvl="0"/>
             <a:r>
-              <a:rPr lang="en-US" smtClean="0"/>
+              <a:rPr lang="en-US"/>
               <a:t>Click to edit Master text styles</a:t>
             </a:r>
           </a:p>
           <a:p>
             <a:pPr lvl="1"/>
             <a:r>
-              <a:rPr lang="en-US" smtClean="0"/>
+              <a:rPr lang="en-US"/>
               <a:t>Second level</a:t>
             </a:r>
           </a:p>
           <a:p>
             <a:pPr lvl="2"/>
             <a:r>
-              <a:rPr lang="en-US" smtClean="0"/>
+              <a:rPr lang="en-US"/>
               <a:t>Third level</a:t>
             </a:r>
           </a:p>
           <a:p>
             <a:pPr lvl="3"/>
             <a:r>
-              <a:rPr lang="en-US" smtClean="0"/>
+              <a:rPr lang="en-US"/>
               <a:t>Fourth level</a:t>
             </a:r>
           </a:p>
           <a:p>
             <a:pPr lvl="4"/>
             <a:r>
-              <a:rPr lang="en-US" smtClean="0"/>
+              <a:rPr lang="en-US"/>
               <a:t>Fifth level</a:t>
             </a:r>
-            <a:endParaRPr lang="en-US"/>
           </a:p>
         </p:txBody>
       </p:sp>
@@ -3526,7 +3510,7 @@
           <a:p>
             <a:pPr lvl="0"/>
             <a:r>
-              <a:rPr lang="en-US" smtClean="0"/>
+              <a:rPr lang="en-US"/>
               <a:t>Click to edit Master text styles</a:t>
             </a:r>
           </a:p>
@@ -3582,38 +3566,37 @@
           <a:p>
             <a:pPr lvl="0"/>
             <a:r>
-              <a:rPr lang="en-US" smtClean="0"/>
+              <a:rPr lang="en-US"/>
               <a:t>Click to edit Master text styles</a:t>
             </a:r>
           </a:p>
           <a:p>
             <a:pPr lvl="1"/>
             <a:r>
-              <a:rPr lang="en-US" smtClean="0"/>
+              <a:rPr lang="en-US"/>
               <a:t>Second level</a:t>
             </a:r>
           </a:p>
           <a:p>
             <a:pPr lvl="2"/>
             <a:r>
-              <a:rPr lang="en-US" smtClean="0"/>
+              <a:rPr lang="en-US"/>
               <a:t>Third level</a:t>
             </a:r>
           </a:p>
           <a:p>
             <a:pPr lvl="3"/>
             <a:r>
-              <a:rPr lang="en-US" smtClean="0"/>
+              <a:rPr lang="en-US"/>
               <a:t>Fourth level</a:t>
             </a:r>
           </a:p>
           <a:p>
             <a:pPr lvl="4"/>
             <a:r>
-              <a:rPr lang="en-US" smtClean="0"/>
+              <a:rPr lang="en-US"/>
               <a:t>Fifth level</a:t>
             </a:r>
-            <a:endParaRPr lang="en-US"/>
           </a:p>
         </p:txBody>
       </p:sp>
@@ -3634,7 +3617,7 @@
           <a:p>
             <a:fld id="{699DC775-C286-4358-8C92-D7E584E969B3}" type="datetimeFigureOut">
               <a:rPr lang="en-US" smtClean="0"/>
-              <a:t>4/10/2018</a:t>
+              <a:t>1/22/2019</a:t>
             </a:fld>
             <a:endParaRPr lang="en-US"/>
           </a:p>
@@ -3728,10 +3711,9 @@
           <a:lstStyle/>
           <a:p>
             <a:r>
-              <a:rPr lang="en-US" smtClean="0"/>
+              <a:rPr lang="en-US"/>
               <a:t>Click to edit Master title style</a:t>
             </a:r>
-            <a:endParaRPr lang="en-US"/>
           </a:p>
         </p:txBody>
       </p:sp>
@@ -3752,7 +3734,7 @@
           <a:p>
             <a:fld id="{699DC775-C286-4358-8C92-D7E584E969B3}" type="datetimeFigureOut">
               <a:rPr lang="en-US" smtClean="0"/>
-              <a:t>4/10/2018</a:t>
+              <a:t>1/22/2019</a:t>
             </a:fld>
             <a:endParaRPr lang="en-US"/>
           </a:p>
@@ -3847,7 +3829,7 @@
           <a:p>
             <a:fld id="{699DC775-C286-4358-8C92-D7E584E969B3}" type="datetimeFigureOut">
               <a:rPr lang="en-US" smtClean="0"/>
-              <a:t>4/10/2018</a:t>
+              <a:t>1/22/2019</a:t>
             </a:fld>
             <a:endParaRPr lang="en-US"/>
           </a:p>
@@ -3950,10 +3932,9 @@
           </a:lstStyle>
           <a:p>
             <a:r>
-              <a:rPr lang="en-US" smtClean="0"/>
+              <a:rPr lang="en-US"/>
               <a:t>Click to edit Master title style</a:t>
             </a:r>
-            <a:endParaRPr lang="en-US"/>
           </a:p>
         </p:txBody>
       </p:sp>
@@ -4007,38 +3988,37 @@
           <a:p>
             <a:pPr lvl="0"/>
             <a:r>
-              <a:rPr lang="en-US" smtClean="0"/>
+              <a:rPr lang="en-US"/>
               <a:t>Click to edit Master text styles</a:t>
             </a:r>
           </a:p>
           <a:p>
             <a:pPr lvl="1"/>
             <a:r>
-              <a:rPr lang="en-US" smtClean="0"/>
+              <a:rPr lang="en-US"/>
               <a:t>Second level</a:t>
             </a:r>
           </a:p>
           <a:p>
             <a:pPr lvl="2"/>
             <a:r>
-              <a:rPr lang="en-US" smtClean="0"/>
+              <a:rPr lang="en-US"/>
               <a:t>Third level</a:t>
             </a:r>
           </a:p>
           <a:p>
             <a:pPr lvl="3"/>
             <a:r>
-              <a:rPr lang="en-US" smtClean="0"/>
+              <a:rPr lang="en-US"/>
               <a:t>Fourth level</a:t>
             </a:r>
           </a:p>
           <a:p>
             <a:pPr lvl="4"/>
             <a:r>
-              <a:rPr lang="en-US" smtClean="0"/>
+              <a:rPr lang="en-US"/>
               <a:t>Fifth level</a:t>
             </a:r>
-            <a:endParaRPr lang="en-US"/>
           </a:p>
         </p:txBody>
       </p:sp>
@@ -4101,7 +4081,7 @@
           <a:p>
             <a:pPr lvl="0"/>
             <a:r>
-              <a:rPr lang="en-US" smtClean="0"/>
+              <a:rPr lang="en-US"/>
               <a:t>Click to edit Master text styles</a:t>
             </a:r>
           </a:p>
@@ -4124,7 +4104,7 @@
           <a:p>
             <a:fld id="{699DC775-C286-4358-8C92-D7E584E969B3}" type="datetimeFigureOut">
               <a:rPr lang="en-US" smtClean="0"/>
-              <a:t>4/10/2018</a:t>
+              <a:t>1/22/2019</a:t>
             </a:fld>
             <a:endParaRPr lang="en-US"/>
           </a:p>
@@ -4218,10 +4198,9 @@
           <a:lstStyle/>
           <a:p>
             <a:r>
-              <a:rPr lang="en-US" smtClean="0"/>
+              <a:rPr lang="en-US"/>
               <a:t>Click to edit Master title style</a:t>
             </a:r>
-            <a:endParaRPr lang="en-US"/>
           </a:p>
         </p:txBody>
       </p:sp>
@@ -4242,38 +4221,37 @@
           <a:p>
             <a:pPr lvl="0"/>
             <a:r>
-              <a:rPr lang="en-US" smtClean="0"/>
+              <a:rPr lang="en-US"/>
               <a:t>Click to edit Master text styles</a:t>
             </a:r>
           </a:p>
           <a:p>
             <a:pPr lvl="1"/>
             <a:r>
-              <a:rPr lang="en-US" smtClean="0"/>
+              <a:rPr lang="en-US"/>
               <a:t>Second level</a:t>
             </a:r>
           </a:p>
           <a:p>
             <a:pPr lvl="2"/>
             <a:r>
-              <a:rPr lang="en-US" smtClean="0"/>
+              <a:rPr lang="en-US"/>
               <a:t>Third level</a:t>
             </a:r>
           </a:p>
           <a:p>
             <a:pPr lvl="3"/>
             <a:r>
-              <a:rPr lang="en-US" smtClean="0"/>
+              <a:rPr lang="en-US"/>
               <a:t>Fourth level</a:t>
             </a:r>
           </a:p>
           <a:p>
             <a:pPr lvl="4"/>
             <a:r>
-              <a:rPr lang="en-US" smtClean="0"/>
+              <a:rPr lang="en-US"/>
               <a:t>Fifth level</a:t>
             </a:r>
-            <a:endParaRPr lang="en-US"/>
           </a:p>
         </p:txBody>
       </p:sp>
@@ -4294,7 +4272,7 @@
           <a:p>
             <a:fld id="{699DC775-C286-4358-8C92-D7E584E969B3}" type="datetimeFigureOut">
               <a:rPr lang="en-US" smtClean="0"/>
-              <a:t>4/10/2018</a:t>
+              <a:t>1/22/2019</a:t>
             </a:fld>
             <a:endParaRPr lang="en-US"/>
           </a:p>
@@ -4397,10 +4375,9 @@
           </a:lstStyle>
           <a:p>
             <a:r>
-              <a:rPr lang="en-US" smtClean="0"/>
+              <a:rPr lang="en-US"/>
               <a:t>Click to edit Master title style</a:t>
             </a:r>
-            <a:endParaRPr lang="en-US"/>
           </a:p>
         </p:txBody>
       </p:sp>
@@ -4524,7 +4501,7 @@
           <a:p>
             <a:pPr lvl="0"/>
             <a:r>
-              <a:rPr lang="en-US" smtClean="0"/>
+              <a:rPr lang="en-US"/>
               <a:t>Click to edit Master text styles</a:t>
             </a:r>
           </a:p>
@@ -4547,7 +4524,7 @@
           <a:p>
             <a:fld id="{699DC775-C286-4358-8C92-D7E584E969B3}" type="datetimeFigureOut">
               <a:rPr lang="en-US" smtClean="0"/>
-              <a:t>4/10/2018</a:t>
+              <a:t>1/22/2019</a:t>
             </a:fld>
             <a:endParaRPr lang="en-US"/>
           </a:p>
@@ -4641,10 +4618,9 @@
           <a:lstStyle/>
           <a:p>
             <a:r>
-              <a:rPr lang="en-US" smtClean="0"/>
+              <a:rPr lang="en-US"/>
               <a:t>Click to edit Master title style</a:t>
             </a:r>
-            <a:endParaRPr lang="en-US"/>
           </a:p>
         </p:txBody>
       </p:sp>
@@ -4665,38 +4641,37 @@
           <a:p>
             <a:pPr lvl="0"/>
             <a:r>
-              <a:rPr lang="en-US" smtClean="0"/>
+              <a:rPr lang="en-US"/>
               <a:t>Click to edit Master text styles</a:t>
             </a:r>
           </a:p>
           <a:p>
             <a:pPr lvl="1"/>
             <a:r>
-              <a:rPr lang="en-US" smtClean="0"/>
+              <a:rPr lang="en-US"/>
               <a:t>Second level</a:t>
             </a:r>
           </a:p>
           <a:p>
             <a:pPr lvl="2"/>
             <a:r>
-              <a:rPr lang="en-US" smtClean="0"/>
+              <a:rPr lang="en-US"/>
               <a:t>Third level</a:t>
             </a:r>
           </a:p>
           <a:p>
             <a:pPr lvl="3"/>
             <a:r>
-              <a:rPr lang="en-US" smtClean="0"/>
+              <a:rPr lang="en-US"/>
               <a:t>Fourth level</a:t>
             </a:r>
           </a:p>
           <a:p>
             <a:pPr lvl="4"/>
             <a:r>
-              <a:rPr lang="en-US" smtClean="0"/>
+              <a:rPr lang="en-US"/>
               <a:t>Fifth level</a:t>
             </a:r>
-            <a:endParaRPr lang="en-US"/>
           </a:p>
         </p:txBody>
       </p:sp>
@@ -4717,7 +4692,7 @@
           <a:p>
             <a:fld id="{699DC775-C286-4358-8C92-D7E584E969B3}" type="datetimeFigureOut">
               <a:rPr lang="en-US" smtClean="0"/>
-              <a:t>4/10/2018</a:t>
+              <a:t>1/22/2019</a:t>
             </a:fld>
             <a:endParaRPr lang="en-US"/>
           </a:p>
@@ -4816,10 +4791,9 @@
           <a:lstStyle/>
           <a:p>
             <a:r>
-              <a:rPr lang="en-US" smtClean="0"/>
+              <a:rPr lang="en-US"/>
               <a:t>Click to edit Master title style</a:t>
             </a:r>
-            <a:endParaRPr lang="en-US"/>
           </a:p>
         </p:txBody>
       </p:sp>
@@ -4845,38 +4819,37 @@
           <a:p>
             <a:pPr lvl="0"/>
             <a:r>
-              <a:rPr lang="en-US" smtClean="0"/>
+              <a:rPr lang="en-US"/>
               <a:t>Click to edit Master text styles</a:t>
             </a:r>
           </a:p>
           <a:p>
             <a:pPr lvl="1"/>
             <a:r>
-              <a:rPr lang="en-US" smtClean="0"/>
+              <a:rPr lang="en-US"/>
               <a:t>Second level</a:t>
             </a:r>
           </a:p>
           <a:p>
             <a:pPr lvl="2"/>
             <a:r>
-              <a:rPr lang="en-US" smtClean="0"/>
+              <a:rPr lang="en-US"/>
               <a:t>Third level</a:t>
             </a:r>
           </a:p>
           <a:p>
             <a:pPr lvl="3"/>
             <a:r>
-              <a:rPr lang="en-US" smtClean="0"/>
+              <a:rPr lang="en-US"/>
               <a:t>Fourth level</a:t>
             </a:r>
           </a:p>
           <a:p>
             <a:pPr lvl="4"/>
             <a:r>
-              <a:rPr lang="en-US" smtClean="0"/>
+              <a:rPr lang="en-US"/>
               <a:t>Fifth level</a:t>
             </a:r>
-            <a:endParaRPr lang="en-US"/>
           </a:p>
         </p:txBody>
       </p:sp>
@@ -4897,7 +4870,7 @@
           <a:p>
             <a:fld id="{699DC775-C286-4358-8C92-D7E584E969B3}" type="datetimeFigureOut">
               <a:rPr lang="en-US" smtClean="0"/>
-              <a:t>4/10/2018</a:t>
+              <a:t>1/22/2019</a:t>
             </a:fld>
             <a:endParaRPr lang="en-US"/>
           </a:p>
@@ -5004,10 +4977,9 @@
           <a:lstStyle/>
           <a:p>
             <a:r>
-              <a:rPr lang="en-US" smtClean="0"/>
+              <a:rPr lang="en-US"/>
               <a:t>Click to edit Master title style</a:t>
             </a:r>
-            <a:endParaRPr lang="en-US"/>
           </a:p>
         </p:txBody>
       </p:sp>
@@ -5123,10 +5095,9 @@
           </a:lstStyle>
           <a:p>
             <a:r>
-              <a:rPr lang="en-US" smtClean="0"/>
+              <a:rPr lang="en-US"/>
               <a:t>Click to edit Master subtitle style</a:t>
             </a:r>
-            <a:endParaRPr lang="en-US"/>
           </a:p>
         </p:txBody>
       </p:sp>
@@ -5147,7 +5118,7 @@
           <a:p>
             <a:fld id="{699DC775-C286-4358-8C92-D7E584E969B3}" type="datetimeFigureOut">
               <a:rPr lang="en-US" smtClean="0"/>
-              <a:t>4/10/2018</a:t>
+              <a:t>1/22/2019</a:t>
             </a:fld>
             <a:endParaRPr lang="en-US"/>
           </a:p>
@@ -5249,10 +5220,9 @@
           <a:lstStyle/>
           <a:p>
             <a:r>
-              <a:rPr lang="en-US" smtClean="0"/>
+              <a:rPr lang="en-US"/>
               <a:t>Click to edit Master title style</a:t>
             </a:r>
-            <a:endParaRPr lang="en-US"/>
           </a:p>
         </p:txBody>
       </p:sp>
@@ -5273,38 +5243,37 @@
           <a:p>
             <a:pPr lvl="0"/>
             <a:r>
-              <a:rPr lang="en-US" smtClean="0"/>
+              <a:rPr lang="en-US"/>
               <a:t>Click to edit Master text styles</a:t>
             </a:r>
           </a:p>
           <a:p>
             <a:pPr lvl="1"/>
             <a:r>
-              <a:rPr lang="en-US" smtClean="0"/>
+              <a:rPr lang="en-US"/>
               <a:t>Second level</a:t>
             </a:r>
           </a:p>
           <a:p>
             <a:pPr lvl="2"/>
             <a:r>
-              <a:rPr lang="en-US" smtClean="0"/>
+              <a:rPr lang="en-US"/>
               <a:t>Third level</a:t>
             </a:r>
           </a:p>
           <a:p>
             <a:pPr lvl="3"/>
             <a:r>
-              <a:rPr lang="en-US" smtClean="0"/>
+              <a:rPr lang="en-US"/>
               <a:t>Fourth level</a:t>
             </a:r>
           </a:p>
           <a:p>
             <a:pPr lvl="4"/>
             <a:r>
-              <a:rPr lang="en-US" smtClean="0"/>
+              <a:rPr lang="en-US"/>
               <a:t>Fifth level</a:t>
             </a:r>
-            <a:endParaRPr lang="en-US"/>
           </a:p>
         </p:txBody>
       </p:sp>
@@ -5325,7 +5294,7 @@
           <a:p>
             <a:fld id="{699DC775-C286-4358-8C92-D7E584E969B3}" type="datetimeFigureOut">
               <a:rPr lang="en-US" smtClean="0"/>
-              <a:t>4/10/2018</a:t>
+              <a:t>1/22/2019</a:t>
             </a:fld>
             <a:endParaRPr lang="en-US"/>
           </a:p>
@@ -5436,10 +5405,9 @@
           </a:lstStyle>
           <a:p>
             <a:r>
-              <a:rPr lang="en-US" smtClean="0"/>
+              <a:rPr lang="en-US"/>
               <a:t>Click to edit Master title style</a:t>
             </a:r>
-            <a:endParaRPr lang="en-US"/>
           </a:p>
         </p:txBody>
       </p:sp>
@@ -5556,7 +5524,7 @@
           <a:p>
             <a:pPr lvl="0"/>
             <a:r>
-              <a:rPr lang="en-US" smtClean="0"/>
+              <a:rPr lang="en-US"/>
               <a:t>Click to edit Master text styles</a:t>
             </a:r>
           </a:p>
@@ -5579,7 +5547,7 @@
           <a:p>
             <a:fld id="{699DC775-C286-4358-8C92-D7E584E969B3}" type="datetimeFigureOut">
               <a:rPr lang="en-US" smtClean="0"/>
-              <a:t>4/10/2018</a:t>
+              <a:t>1/22/2019</a:t>
             </a:fld>
             <a:endParaRPr lang="en-US"/>
           </a:p>
@@ -5681,10 +5649,9 @@
           <a:lstStyle/>
           <a:p>
             <a:r>
-              <a:rPr lang="en-US" smtClean="0"/>
+              <a:rPr lang="en-US"/>
               <a:t>Click to edit Master title style</a:t>
             </a:r>
-            <a:endParaRPr lang="en-US"/>
           </a:p>
         </p:txBody>
       </p:sp>
@@ -5738,38 +5705,37 @@
           <a:p>
             <a:pPr lvl="0"/>
             <a:r>
-              <a:rPr lang="en-US" smtClean="0"/>
+              <a:rPr lang="en-US"/>
               <a:t>Click to edit Master text styles</a:t>
             </a:r>
           </a:p>
           <a:p>
             <a:pPr lvl="1"/>
             <a:r>
-              <a:rPr lang="en-US" smtClean="0"/>
+              <a:rPr lang="en-US"/>
               <a:t>Second level</a:t>
             </a:r>
           </a:p>
           <a:p>
             <a:pPr lvl="2"/>
             <a:r>
-              <a:rPr lang="en-US" smtClean="0"/>
+              <a:rPr lang="en-US"/>
               <a:t>Third level</a:t>
             </a:r>
           </a:p>
           <a:p>
             <a:pPr lvl="3"/>
             <a:r>
-              <a:rPr lang="en-US" smtClean="0"/>
+              <a:rPr lang="en-US"/>
               <a:t>Fourth level</a:t>
             </a:r>
           </a:p>
           <a:p>
             <a:pPr lvl="4"/>
             <a:r>
-              <a:rPr lang="en-US" smtClean="0"/>
+              <a:rPr lang="en-US"/>
               <a:t>Fifth level</a:t>
             </a:r>
-            <a:endParaRPr lang="en-US"/>
           </a:p>
         </p:txBody>
       </p:sp>
@@ -5823,38 +5789,37 @@
           <a:p>
             <a:pPr lvl="0"/>
             <a:r>
-              <a:rPr lang="en-US" smtClean="0"/>
+              <a:rPr lang="en-US"/>
               <a:t>Click to edit Master text styles</a:t>
             </a:r>
           </a:p>
           <a:p>
             <a:pPr lvl="1"/>
             <a:r>
-              <a:rPr lang="en-US" smtClean="0"/>
+              <a:rPr lang="en-US"/>
               <a:t>Second level</a:t>
             </a:r>
           </a:p>
           <a:p>
             <a:pPr lvl="2"/>
             <a:r>
-              <a:rPr lang="en-US" smtClean="0"/>
+              <a:rPr lang="en-US"/>
               <a:t>Third level</a:t>
             </a:r>
           </a:p>
           <a:p>
             <a:pPr lvl="3"/>
             <a:r>
-              <a:rPr lang="en-US" smtClean="0"/>
+              <a:rPr lang="en-US"/>
               <a:t>Fourth level</a:t>
             </a:r>
           </a:p>
           <a:p>
             <a:pPr lvl="4"/>
             <a:r>
-              <a:rPr lang="en-US" smtClean="0"/>
+              <a:rPr lang="en-US"/>
               <a:t>Fifth level</a:t>
             </a:r>
-            <a:endParaRPr lang="en-US"/>
           </a:p>
         </p:txBody>
       </p:sp>
@@ -5875,7 +5840,7 @@
           <a:p>
             <a:fld id="{699DC775-C286-4358-8C92-D7E584E969B3}" type="datetimeFigureOut">
               <a:rPr lang="en-US" smtClean="0"/>
-              <a:t>4/10/2018</a:t>
+              <a:t>1/22/2019</a:t>
             </a:fld>
             <a:endParaRPr lang="en-US"/>
           </a:p>
@@ -5981,10 +5946,9 @@
           </a:lstStyle>
           <a:p>
             <a:r>
-              <a:rPr lang="en-US" smtClean="0"/>
+              <a:rPr lang="en-US"/>
               <a:t>Click to edit Master title style</a:t>
             </a:r>
-            <a:endParaRPr lang="en-US"/>
           </a:p>
         </p:txBody>
       </p:sp>
@@ -6047,7 +6011,7 @@
           <a:p>
             <a:pPr lvl="0"/>
             <a:r>
-              <a:rPr lang="en-US" smtClean="0"/>
+              <a:rPr lang="en-US"/>
               <a:t>Click to edit Master text styles</a:t>
             </a:r>
           </a:p>
@@ -6103,38 +6067,37 @@
           <a:p>
             <a:pPr lvl="0"/>
             <a:r>
-              <a:rPr lang="en-US" smtClean="0"/>
+              <a:rPr lang="en-US"/>
               <a:t>Click to edit Master text styles</a:t>
             </a:r>
           </a:p>
           <a:p>
             <a:pPr lvl="1"/>
             <a:r>
-              <a:rPr lang="en-US" smtClean="0"/>
+              <a:rPr lang="en-US"/>
               <a:t>Second level</a:t>
             </a:r>
           </a:p>
           <a:p>
             <a:pPr lvl="2"/>
             <a:r>
-              <a:rPr lang="en-US" smtClean="0"/>
+              <a:rPr lang="en-US"/>
               <a:t>Third level</a:t>
             </a:r>
           </a:p>
           <a:p>
             <a:pPr lvl="3"/>
             <a:r>
-              <a:rPr lang="en-US" smtClean="0"/>
+              <a:rPr lang="en-US"/>
               <a:t>Fourth level</a:t>
             </a:r>
           </a:p>
           <a:p>
             <a:pPr lvl="4"/>
             <a:r>
-              <a:rPr lang="en-US" smtClean="0"/>
+              <a:rPr lang="en-US"/>
               <a:t>Fifth level</a:t>
             </a:r>
-            <a:endParaRPr lang="en-US"/>
           </a:p>
         </p:txBody>
       </p:sp>
@@ -6197,7 +6160,7 @@
           <a:p>
             <a:pPr lvl="0"/>
             <a:r>
-              <a:rPr lang="en-US" smtClean="0"/>
+              <a:rPr lang="en-US"/>
               <a:t>Click to edit Master text styles</a:t>
             </a:r>
           </a:p>
@@ -6253,38 +6216,37 @@
           <a:p>
             <a:pPr lvl="0"/>
             <a:r>
-              <a:rPr lang="en-US" smtClean="0"/>
+              <a:rPr lang="en-US"/>
               <a:t>Click to edit Master text styles</a:t>
             </a:r>
           </a:p>
           <a:p>
             <a:pPr lvl="1"/>
             <a:r>
-              <a:rPr lang="en-US" smtClean="0"/>
+              <a:rPr lang="en-US"/>
               <a:t>Second level</a:t>
             </a:r>
           </a:p>
           <a:p>
             <a:pPr lvl="2"/>
             <a:r>
-              <a:rPr lang="en-US" smtClean="0"/>
+              <a:rPr lang="en-US"/>
               <a:t>Third level</a:t>
             </a:r>
           </a:p>
           <a:p>
             <a:pPr lvl="3"/>
             <a:r>
-              <a:rPr lang="en-US" smtClean="0"/>
+              <a:rPr lang="en-US"/>
               <a:t>Fourth level</a:t>
             </a:r>
           </a:p>
           <a:p>
             <a:pPr lvl="4"/>
             <a:r>
-              <a:rPr lang="en-US" smtClean="0"/>
+              <a:rPr lang="en-US"/>
               <a:t>Fifth level</a:t>
             </a:r>
-            <a:endParaRPr lang="en-US"/>
           </a:p>
         </p:txBody>
       </p:sp>
@@ -6305,7 +6267,7 @@
           <a:p>
             <a:fld id="{699DC775-C286-4358-8C92-D7E584E969B3}" type="datetimeFigureOut">
               <a:rPr lang="en-US" smtClean="0"/>
-              <a:t>4/10/2018</a:t>
+              <a:t>1/22/2019</a:t>
             </a:fld>
             <a:endParaRPr lang="en-US"/>
           </a:p>
@@ -6407,10 +6369,9 @@
           <a:lstStyle/>
           <a:p>
             <a:r>
-              <a:rPr lang="en-US" smtClean="0"/>
+              <a:rPr lang="en-US"/>
               <a:t>Click to edit Master title style</a:t>
             </a:r>
-            <a:endParaRPr lang="en-US"/>
           </a:p>
         </p:txBody>
       </p:sp>
@@ -6431,7 +6392,7 @@
           <a:p>
             <a:fld id="{699DC775-C286-4358-8C92-D7E584E969B3}" type="datetimeFigureOut">
               <a:rPr lang="en-US" smtClean="0"/>
-              <a:t>4/10/2018</a:t>
+              <a:t>1/22/2019</a:t>
             </a:fld>
             <a:endParaRPr lang="en-US"/>
           </a:p>
@@ -6534,7 +6495,7 @@
           <a:p>
             <a:fld id="{699DC775-C286-4358-8C92-D7E584E969B3}" type="datetimeFigureOut">
               <a:rPr lang="en-US" smtClean="0"/>
-              <a:t>4/10/2018</a:t>
+              <a:t>1/22/2019</a:t>
             </a:fld>
             <a:endParaRPr lang="en-US"/>
           </a:p>
@@ -6637,10 +6598,9 @@
           </a:lstStyle>
           <a:p>
             <a:r>
-              <a:rPr lang="en-US" smtClean="0"/>
+              <a:rPr lang="en-US"/>
               <a:t>Click to edit Master title style</a:t>
             </a:r>
-            <a:endParaRPr lang="en-US"/>
           </a:p>
         </p:txBody>
       </p:sp>
@@ -6757,7 +6717,7 @@
           <a:p>
             <a:pPr lvl="0"/>
             <a:r>
-              <a:rPr lang="en-US" smtClean="0"/>
+              <a:rPr lang="en-US"/>
               <a:t>Click to edit Master text styles</a:t>
             </a:r>
           </a:p>
@@ -6780,7 +6740,7 @@
           <a:p>
             <a:fld id="{699DC775-C286-4358-8C92-D7E584E969B3}" type="datetimeFigureOut">
               <a:rPr lang="en-US" smtClean="0"/>
-              <a:t>4/10/2018</a:t>
+              <a:t>1/22/2019</a:t>
             </a:fld>
             <a:endParaRPr lang="en-US"/>
           </a:p>
@@ -6891,10 +6851,9 @@
           </a:lstStyle>
           <a:p>
             <a:r>
-              <a:rPr lang="en-US" smtClean="0"/>
+              <a:rPr lang="en-US"/>
               <a:t>Click to edit Master title style</a:t>
             </a:r>
-            <a:endParaRPr lang="en-US"/>
           </a:p>
         </p:txBody>
       </p:sp>
@@ -6948,38 +6907,37 @@
           <a:p>
             <a:pPr lvl="0"/>
             <a:r>
-              <a:rPr lang="en-US" smtClean="0"/>
+              <a:rPr lang="en-US"/>
               <a:t>Click to edit Master text styles</a:t>
             </a:r>
           </a:p>
           <a:p>
             <a:pPr lvl="1"/>
             <a:r>
-              <a:rPr lang="en-US" smtClean="0"/>
+              <a:rPr lang="en-US"/>
               <a:t>Second level</a:t>
             </a:r>
           </a:p>
           <a:p>
             <a:pPr lvl="2"/>
             <a:r>
-              <a:rPr lang="en-US" smtClean="0"/>
+              <a:rPr lang="en-US"/>
               <a:t>Third level</a:t>
             </a:r>
           </a:p>
           <a:p>
             <a:pPr lvl="3"/>
             <a:r>
-              <a:rPr lang="en-US" smtClean="0"/>
+              <a:rPr lang="en-US"/>
               <a:t>Fourth level</a:t>
             </a:r>
           </a:p>
           <a:p>
             <a:pPr lvl="4"/>
             <a:r>
-              <a:rPr lang="en-US" smtClean="0"/>
+              <a:rPr lang="en-US"/>
               <a:t>Fifth level</a:t>
             </a:r>
-            <a:endParaRPr lang="en-US"/>
           </a:p>
         </p:txBody>
       </p:sp>
@@ -7042,7 +7000,7 @@
           <a:p>
             <a:pPr lvl="0"/>
             <a:r>
-              <a:rPr lang="en-US" smtClean="0"/>
+              <a:rPr lang="en-US"/>
               <a:t>Click to edit Master text styles</a:t>
             </a:r>
           </a:p>
@@ -7065,7 +7023,7 @@
           <a:p>
             <a:fld id="{699DC775-C286-4358-8C92-D7E584E969B3}" type="datetimeFigureOut">
               <a:rPr lang="en-US" smtClean="0"/>
-              <a:t>4/10/2018</a:t>
+              <a:t>1/22/2019</a:t>
             </a:fld>
             <a:endParaRPr lang="en-US"/>
           </a:p>
@@ -7176,10 +7134,9 @@
           </a:lstStyle>
           <a:p>
             <a:r>
-              <a:rPr lang="en-US" smtClean="0"/>
+              <a:rPr lang="en-US"/>
               <a:t>Click to edit Master title style</a:t>
             </a:r>
-            <a:endParaRPr lang="en-US"/>
           </a:p>
         </p:txBody>
       </p:sp>
@@ -7303,7 +7260,7 @@
           <a:p>
             <a:pPr lvl="0"/>
             <a:r>
-              <a:rPr lang="en-US" smtClean="0"/>
+              <a:rPr lang="en-US"/>
               <a:t>Click to edit Master text styles</a:t>
             </a:r>
           </a:p>
@@ -7326,7 +7283,7 @@
           <a:p>
             <a:fld id="{699DC775-C286-4358-8C92-D7E584E969B3}" type="datetimeFigureOut">
               <a:rPr lang="en-US" smtClean="0"/>
-              <a:t>4/10/2018</a:t>
+              <a:t>1/22/2019</a:t>
             </a:fld>
             <a:endParaRPr lang="en-US"/>
           </a:p>
@@ -7428,10 +7385,9 @@
           <a:lstStyle/>
           <a:p>
             <a:r>
-              <a:rPr lang="en-US" smtClean="0"/>
+              <a:rPr lang="en-US"/>
               <a:t>Click to edit Master title style</a:t>
             </a:r>
-            <a:endParaRPr lang="en-US"/>
           </a:p>
         </p:txBody>
       </p:sp>
@@ -7452,38 +7408,37 @@
           <a:p>
             <a:pPr lvl="0"/>
             <a:r>
-              <a:rPr lang="en-US" smtClean="0"/>
+              <a:rPr lang="en-US"/>
               <a:t>Click to edit Master text styles</a:t>
             </a:r>
           </a:p>
           <a:p>
             <a:pPr lvl="1"/>
             <a:r>
-              <a:rPr lang="en-US" smtClean="0"/>
+              <a:rPr lang="en-US"/>
               <a:t>Second level</a:t>
             </a:r>
           </a:p>
           <a:p>
             <a:pPr lvl="2"/>
             <a:r>
-              <a:rPr lang="en-US" smtClean="0"/>
+              <a:rPr lang="en-US"/>
               <a:t>Third level</a:t>
             </a:r>
           </a:p>
           <a:p>
             <a:pPr lvl="3"/>
             <a:r>
-              <a:rPr lang="en-US" smtClean="0"/>
+              <a:rPr lang="en-US"/>
               <a:t>Fourth level</a:t>
             </a:r>
           </a:p>
           <a:p>
             <a:pPr lvl="4"/>
             <a:r>
-              <a:rPr lang="en-US" smtClean="0"/>
+              <a:rPr lang="en-US"/>
               <a:t>Fifth level</a:t>
             </a:r>
-            <a:endParaRPr lang="en-US"/>
           </a:p>
         </p:txBody>
       </p:sp>
@@ -7504,7 +7459,7 @@
           <a:p>
             <a:fld id="{699DC775-C286-4358-8C92-D7E584E969B3}" type="datetimeFigureOut">
               <a:rPr lang="en-US" smtClean="0"/>
-              <a:t>4/10/2018</a:t>
+              <a:t>1/22/2019</a:t>
             </a:fld>
             <a:endParaRPr lang="en-US"/>
           </a:p>
@@ -7611,10 +7566,9 @@
           <a:lstStyle/>
           <a:p>
             <a:r>
-              <a:rPr lang="en-US" smtClean="0"/>
+              <a:rPr lang="en-US"/>
               <a:t>Click to edit Master title style</a:t>
             </a:r>
-            <a:endParaRPr lang="en-US"/>
           </a:p>
         </p:txBody>
       </p:sp>
@@ -7640,38 +7594,37 @@
           <a:p>
             <a:pPr lvl="0"/>
             <a:r>
-              <a:rPr lang="en-US" smtClean="0"/>
+              <a:rPr lang="en-US"/>
               <a:t>Click to edit Master text styles</a:t>
             </a:r>
           </a:p>
           <a:p>
             <a:pPr lvl="1"/>
             <a:r>
-              <a:rPr lang="en-US" smtClean="0"/>
+              <a:rPr lang="en-US"/>
               <a:t>Second level</a:t>
             </a:r>
           </a:p>
           <a:p>
             <a:pPr lvl="2"/>
             <a:r>
-              <a:rPr lang="en-US" smtClean="0"/>
+              <a:rPr lang="en-US"/>
               <a:t>Third level</a:t>
             </a:r>
           </a:p>
           <a:p>
             <a:pPr lvl="3"/>
             <a:r>
-              <a:rPr lang="en-US" smtClean="0"/>
+              <a:rPr lang="en-US"/>
               <a:t>Fourth level</a:t>
             </a:r>
           </a:p>
           <a:p>
             <a:pPr lvl="4"/>
             <a:r>
-              <a:rPr lang="en-US" smtClean="0"/>
+              <a:rPr lang="en-US"/>
               <a:t>Fifth level</a:t>
             </a:r>
-            <a:endParaRPr lang="en-US"/>
           </a:p>
         </p:txBody>
       </p:sp>
@@ -7692,7 +7645,7 @@
           <a:p>
             <a:fld id="{699DC775-C286-4358-8C92-D7E584E969B3}" type="datetimeFigureOut">
               <a:rPr lang="en-US" smtClean="0"/>
-              <a:t>4/10/2018</a:t>
+              <a:t>1/22/2019</a:t>
             </a:fld>
             <a:endParaRPr lang="en-US"/>
           </a:p>
@@ -7786,10 +7739,9 @@
           <a:lstStyle/>
           <a:p>
             <a:r>
-              <a:rPr lang="en-US" smtClean="0"/>
+              <a:rPr lang="en-US"/>
               <a:t>Click to edit Master title style</a:t>
             </a:r>
-            <a:endParaRPr lang="en-US"/>
           </a:p>
         </p:txBody>
       </p:sp>
@@ -7843,38 +7795,37 @@
           <a:p>
             <a:pPr lvl="0"/>
             <a:r>
-              <a:rPr lang="en-US" smtClean="0"/>
+              <a:rPr lang="en-US"/>
               <a:t>Click to edit Master text styles</a:t>
             </a:r>
           </a:p>
           <a:p>
             <a:pPr lvl="1"/>
             <a:r>
-              <a:rPr lang="en-US" smtClean="0"/>
+              <a:rPr lang="en-US"/>
               <a:t>Second level</a:t>
             </a:r>
           </a:p>
           <a:p>
             <a:pPr lvl="2"/>
             <a:r>
-              <a:rPr lang="en-US" smtClean="0"/>
+              <a:rPr lang="en-US"/>
               <a:t>Third level</a:t>
             </a:r>
           </a:p>
           <a:p>
             <a:pPr lvl="3"/>
             <a:r>
-              <a:rPr lang="en-US" smtClean="0"/>
+              <a:rPr lang="en-US"/>
               <a:t>Fourth level</a:t>
             </a:r>
           </a:p>
           <a:p>
             <a:pPr lvl="4"/>
             <a:r>
-              <a:rPr lang="en-US" smtClean="0"/>
+              <a:rPr lang="en-US"/>
               <a:t>Fifth level</a:t>
             </a:r>
-            <a:endParaRPr lang="en-US"/>
           </a:p>
         </p:txBody>
       </p:sp>
@@ -7928,38 +7879,37 @@
           <a:p>
             <a:pPr lvl="0"/>
             <a:r>
-              <a:rPr lang="en-US" smtClean="0"/>
+              <a:rPr lang="en-US"/>
               <a:t>Click to edit Master text styles</a:t>
             </a:r>
           </a:p>
           <a:p>
             <a:pPr lvl="1"/>
             <a:r>
-              <a:rPr lang="en-US" smtClean="0"/>
+              <a:rPr lang="en-US"/>
               <a:t>Second level</a:t>
             </a:r>
           </a:p>
           <a:p>
             <a:pPr lvl="2"/>
             <a:r>
-              <a:rPr lang="en-US" smtClean="0"/>
+              <a:rPr lang="en-US"/>
               <a:t>Third level</a:t>
             </a:r>
           </a:p>
           <a:p>
             <a:pPr lvl="3"/>
             <a:r>
-              <a:rPr lang="en-US" smtClean="0"/>
+              <a:rPr lang="en-US"/>
               <a:t>Fourth level</a:t>
             </a:r>
           </a:p>
           <a:p>
             <a:pPr lvl="4"/>
             <a:r>
-              <a:rPr lang="en-US" smtClean="0"/>
+              <a:rPr lang="en-US"/>
               <a:t>Fifth level</a:t>
             </a:r>
-            <a:endParaRPr lang="en-US"/>
           </a:p>
         </p:txBody>
       </p:sp>
@@ -7980,7 +7930,7 @@
           <a:p>
             <a:fld id="{699DC775-C286-4358-8C92-D7E584E969B3}" type="datetimeFigureOut">
               <a:rPr lang="en-US" smtClean="0"/>
-              <a:t>4/10/2018</a:t>
+              <a:t>1/22/2019</a:t>
             </a:fld>
             <a:endParaRPr lang="en-US"/>
           </a:p>
@@ -8078,10 +8028,9 @@
           </a:lstStyle>
           <a:p>
             <a:r>
-              <a:rPr lang="en-US" smtClean="0"/>
+              <a:rPr lang="en-US"/>
               <a:t>Click to edit Master title style</a:t>
             </a:r>
-            <a:endParaRPr lang="en-US"/>
           </a:p>
         </p:txBody>
       </p:sp>
@@ -8144,7 +8093,7 @@
           <a:p>
             <a:pPr lvl="0"/>
             <a:r>
-              <a:rPr lang="en-US" smtClean="0"/>
+              <a:rPr lang="en-US"/>
               <a:t>Click to edit Master text styles</a:t>
             </a:r>
           </a:p>
@@ -8200,38 +8149,37 @@
           <a:p>
             <a:pPr lvl="0"/>
             <a:r>
-              <a:rPr lang="en-US" smtClean="0"/>
+              <a:rPr lang="en-US"/>
               <a:t>Click to edit Master text styles</a:t>
             </a:r>
           </a:p>
           <a:p>
             <a:pPr lvl="1"/>
             <a:r>
-              <a:rPr lang="en-US" smtClean="0"/>
+              <a:rPr lang="en-US"/>
               <a:t>Second level</a:t>
             </a:r>
           </a:p>
           <a:p>
             <a:pPr lvl="2"/>
             <a:r>
-              <a:rPr lang="en-US" smtClean="0"/>
+              <a:rPr lang="en-US"/>
               <a:t>Third level</a:t>
             </a:r>
           </a:p>
           <a:p>
             <a:pPr lvl="3"/>
             <a:r>
-              <a:rPr lang="en-US" smtClean="0"/>
+              <a:rPr lang="en-US"/>
               <a:t>Fourth level</a:t>
             </a:r>
           </a:p>
           <a:p>
             <a:pPr lvl="4"/>
             <a:r>
-              <a:rPr lang="en-US" smtClean="0"/>
+              <a:rPr lang="en-US"/>
               <a:t>Fifth level</a:t>
             </a:r>
-            <a:endParaRPr lang="en-US"/>
           </a:p>
         </p:txBody>
       </p:sp>
@@ -8294,7 +8242,7 @@
           <a:p>
             <a:pPr lvl="0"/>
             <a:r>
-              <a:rPr lang="en-US" smtClean="0"/>
+              <a:rPr lang="en-US"/>
               <a:t>Click to edit Master text styles</a:t>
             </a:r>
           </a:p>
@@ -8350,38 +8298,37 @@
           <a:p>
             <a:pPr lvl="0"/>
             <a:r>
-              <a:rPr lang="en-US" smtClean="0"/>
+              <a:rPr lang="en-US"/>
               <a:t>Click to edit Master text styles</a:t>
             </a:r>
           </a:p>
           <a:p>
             <a:pPr lvl="1"/>
             <a:r>
-              <a:rPr lang="en-US" smtClean="0"/>
+              <a:rPr lang="en-US"/>
               <a:t>Second level</a:t>
             </a:r>
           </a:p>
           <a:p>
             <a:pPr lvl="2"/>
             <a:r>
-              <a:rPr lang="en-US" smtClean="0"/>
+              <a:rPr lang="en-US"/>
               <a:t>Third level</a:t>
             </a:r>
           </a:p>
           <a:p>
             <a:pPr lvl="3"/>
             <a:r>
-              <a:rPr lang="en-US" smtClean="0"/>
+              <a:rPr lang="en-US"/>
               <a:t>Fourth level</a:t>
             </a:r>
           </a:p>
           <a:p>
             <a:pPr lvl="4"/>
             <a:r>
-              <a:rPr lang="en-US" smtClean="0"/>
+              <a:rPr lang="en-US"/>
               <a:t>Fifth level</a:t>
             </a:r>
-            <a:endParaRPr lang="en-US"/>
           </a:p>
         </p:txBody>
       </p:sp>
@@ -8402,7 +8349,7 @@
           <a:p>
             <a:fld id="{699DC775-C286-4358-8C92-D7E584E969B3}" type="datetimeFigureOut">
               <a:rPr lang="en-US" smtClean="0"/>
-              <a:t>4/10/2018</a:t>
+              <a:t>1/22/2019</a:t>
             </a:fld>
             <a:endParaRPr lang="en-US"/>
           </a:p>
@@ -8496,10 +8443,9 @@
           <a:lstStyle/>
           <a:p>
             <a:r>
-              <a:rPr lang="en-US" smtClean="0"/>
+              <a:rPr lang="en-US"/>
               <a:t>Click to edit Master title style</a:t>
             </a:r>
-            <a:endParaRPr lang="en-US"/>
           </a:p>
         </p:txBody>
       </p:sp>
@@ -8520,7 +8466,7 @@
           <a:p>
             <a:fld id="{699DC775-C286-4358-8C92-D7E584E969B3}" type="datetimeFigureOut">
               <a:rPr lang="en-US" smtClean="0"/>
-              <a:t>4/10/2018</a:t>
+              <a:t>1/22/2019</a:t>
             </a:fld>
             <a:endParaRPr lang="en-US"/>
           </a:p>
@@ -8615,7 +8561,7 @@
           <a:p>
             <a:fld id="{699DC775-C286-4358-8C92-D7E584E969B3}" type="datetimeFigureOut">
               <a:rPr lang="en-US" smtClean="0"/>
-              <a:t>4/10/2018</a:t>
+              <a:t>1/22/2019</a:t>
             </a:fld>
             <a:endParaRPr lang="en-US"/>
           </a:p>
@@ -8718,10 +8664,9 @@
           </a:lstStyle>
           <a:p>
             <a:r>
-              <a:rPr lang="en-US" smtClean="0"/>
+              <a:rPr lang="en-US"/>
               <a:t>Click to edit Master title style</a:t>
             </a:r>
-            <a:endParaRPr lang="en-US"/>
           </a:p>
         </p:txBody>
       </p:sp>
@@ -8775,38 +8720,37 @@
           <a:p>
             <a:pPr lvl="0"/>
             <a:r>
-              <a:rPr lang="en-US" smtClean="0"/>
+              <a:rPr lang="en-US"/>
               <a:t>Click to edit Master text styles</a:t>
             </a:r>
           </a:p>
           <a:p>
             <a:pPr lvl="1"/>
             <a:r>
-              <a:rPr lang="en-US" smtClean="0"/>
+              <a:rPr lang="en-US"/>
               <a:t>Second level</a:t>
             </a:r>
           </a:p>
           <a:p>
             <a:pPr lvl="2"/>
             <a:r>
-              <a:rPr lang="en-US" smtClean="0"/>
+              <a:rPr lang="en-US"/>
               <a:t>Third level</a:t>
             </a:r>
           </a:p>
           <a:p>
             <a:pPr lvl="3"/>
             <a:r>
-              <a:rPr lang="en-US" smtClean="0"/>
+              <a:rPr lang="en-US"/>
               <a:t>Fourth level</a:t>
             </a:r>
           </a:p>
           <a:p>
             <a:pPr lvl="4"/>
             <a:r>
-              <a:rPr lang="en-US" smtClean="0"/>
+              <a:rPr lang="en-US"/>
               <a:t>Fifth level</a:t>
             </a:r>
-            <a:endParaRPr lang="en-US"/>
           </a:p>
         </p:txBody>
       </p:sp>
@@ -8869,7 +8813,7 @@
           <a:p>
             <a:pPr lvl="0"/>
             <a:r>
-              <a:rPr lang="en-US" smtClean="0"/>
+              <a:rPr lang="en-US"/>
               <a:t>Click to edit Master text styles</a:t>
             </a:r>
           </a:p>
@@ -8892,7 +8836,7 @@
           <a:p>
             <a:fld id="{699DC775-C286-4358-8C92-D7E584E969B3}" type="datetimeFigureOut">
               <a:rPr lang="en-US" smtClean="0"/>
-              <a:t>4/10/2018</a:t>
+              <a:t>1/22/2019</a:t>
             </a:fld>
             <a:endParaRPr lang="en-US"/>
           </a:p>
@@ -8995,10 +8939,9 @@
           </a:lstStyle>
           <a:p>
             <a:r>
-              <a:rPr lang="en-US" smtClean="0"/>
+              <a:rPr lang="en-US"/>
               <a:t>Click to edit Master title style</a:t>
             </a:r>
-            <a:endParaRPr lang="en-US"/>
           </a:p>
         </p:txBody>
       </p:sp>
@@ -9122,7 +9065,7 @@
           <a:p>
             <a:pPr lvl="0"/>
             <a:r>
-              <a:rPr lang="en-US" smtClean="0"/>
+              <a:rPr lang="en-US"/>
               <a:t>Click to edit Master text styles</a:t>
             </a:r>
           </a:p>
@@ -9145,7 +9088,7 @@
           <a:p>
             <a:fld id="{699DC775-C286-4358-8C92-D7E584E969B3}" type="datetimeFigureOut">
               <a:rPr lang="en-US" smtClean="0"/>
-              <a:t>4/10/2018</a:t>
+              <a:t>1/22/2019</a:t>
             </a:fld>
             <a:endParaRPr lang="en-US"/>
           </a:p>
@@ -9254,10 +9197,9 @@
           <a:lstStyle/>
           <a:p>
             <a:r>
-              <a:rPr lang="en-US" smtClean="0"/>
+              <a:rPr lang="en-US"/>
               <a:t>Click to edit Master title style</a:t>
             </a:r>
-            <a:endParaRPr lang="en-US"/>
           </a:p>
         </p:txBody>
       </p:sp>
@@ -9288,38 +9230,37 @@
           <a:p>
             <a:pPr lvl="0"/>
             <a:r>
-              <a:rPr lang="en-US" smtClean="0"/>
+              <a:rPr lang="en-US"/>
               <a:t>Click to edit Master text styles</a:t>
             </a:r>
           </a:p>
           <a:p>
             <a:pPr lvl="1"/>
             <a:r>
-              <a:rPr lang="en-US" smtClean="0"/>
+              <a:rPr lang="en-US"/>
               <a:t>Second level</a:t>
             </a:r>
           </a:p>
           <a:p>
             <a:pPr lvl="2"/>
             <a:r>
-              <a:rPr lang="en-US" smtClean="0"/>
+              <a:rPr lang="en-US"/>
               <a:t>Third level</a:t>
             </a:r>
           </a:p>
           <a:p>
             <a:pPr lvl="3"/>
             <a:r>
-              <a:rPr lang="en-US" smtClean="0"/>
+              <a:rPr lang="en-US"/>
               <a:t>Fourth level</a:t>
             </a:r>
           </a:p>
           <a:p>
             <a:pPr lvl="4"/>
             <a:r>
-              <a:rPr lang="en-US" smtClean="0"/>
+              <a:rPr lang="en-US"/>
               <a:t>Fifth level</a:t>
             </a:r>
-            <a:endParaRPr lang="en-US"/>
           </a:p>
         </p:txBody>
       </p:sp>
@@ -9358,7 +9299,7 @@
           <a:p>
             <a:fld id="{699DC775-C286-4358-8C92-D7E584E969B3}" type="datetimeFigureOut">
               <a:rPr lang="en-US" smtClean="0"/>
-              <a:t>4/10/2018</a:t>
+              <a:t>1/22/2019</a:t>
             </a:fld>
             <a:endParaRPr lang="en-US"/>
           </a:p>
@@ -9769,10 +9710,9 @@
           <a:lstStyle/>
           <a:p>
             <a:r>
-              <a:rPr lang="en-US" smtClean="0"/>
+              <a:rPr lang="en-US"/>
               <a:t>Click to edit Master title style</a:t>
             </a:r>
-            <a:endParaRPr lang="en-US"/>
           </a:p>
         </p:txBody>
       </p:sp>
@@ -9803,38 +9743,37 @@
           <a:p>
             <a:pPr lvl="0"/>
             <a:r>
-              <a:rPr lang="en-US" smtClean="0"/>
+              <a:rPr lang="en-US"/>
               <a:t>Click to edit Master text styles</a:t>
             </a:r>
           </a:p>
           <a:p>
             <a:pPr lvl="1"/>
             <a:r>
-              <a:rPr lang="en-US" smtClean="0"/>
+              <a:rPr lang="en-US"/>
               <a:t>Second level</a:t>
             </a:r>
           </a:p>
           <a:p>
             <a:pPr lvl="2"/>
             <a:r>
-              <a:rPr lang="en-US" smtClean="0"/>
+              <a:rPr lang="en-US"/>
               <a:t>Third level</a:t>
             </a:r>
           </a:p>
           <a:p>
             <a:pPr lvl="3"/>
             <a:r>
-              <a:rPr lang="en-US" smtClean="0"/>
+              <a:rPr lang="en-US"/>
               <a:t>Fourth level</a:t>
             </a:r>
           </a:p>
           <a:p>
             <a:pPr lvl="4"/>
             <a:r>
-              <a:rPr lang="en-US" smtClean="0"/>
+              <a:rPr lang="en-US"/>
               <a:t>Fifth level</a:t>
             </a:r>
-            <a:endParaRPr lang="en-US"/>
           </a:p>
         </p:txBody>
       </p:sp>
@@ -9873,7 +9812,7 @@
           <a:p>
             <a:fld id="{699DC775-C286-4358-8C92-D7E584E969B3}" type="datetimeFigureOut">
               <a:rPr lang="en-US" smtClean="0"/>
-              <a:t>4/10/2018</a:t>
+              <a:t>1/22/2019</a:t>
             </a:fld>
             <a:endParaRPr lang="en-US"/>
           </a:p>
@@ -10282,10 +10221,9 @@
           <a:lstStyle/>
           <a:p>
             <a:r>
-              <a:rPr lang="en-US" dirty="0" smtClean="0"/>
+              <a:rPr lang="en-US" dirty="0"/>
               <a:t>Click to edit Master title style</a:t>
             </a:r>
-            <a:endParaRPr lang="en-US" dirty="0"/>
           </a:p>
         </p:txBody>
       </p:sp>
@@ -10316,38 +10254,37 @@
           <a:p>
             <a:pPr lvl="0"/>
             <a:r>
-              <a:rPr lang="en-US" smtClean="0"/>
+              <a:rPr lang="en-US"/>
               <a:t>Click to edit Master text styles</a:t>
             </a:r>
           </a:p>
           <a:p>
             <a:pPr lvl="1"/>
             <a:r>
-              <a:rPr lang="en-US" smtClean="0"/>
+              <a:rPr lang="en-US"/>
               <a:t>Second level</a:t>
             </a:r>
           </a:p>
           <a:p>
             <a:pPr lvl="2"/>
             <a:r>
-              <a:rPr lang="en-US" smtClean="0"/>
+              <a:rPr lang="en-US"/>
               <a:t>Third level</a:t>
             </a:r>
           </a:p>
           <a:p>
             <a:pPr lvl="3"/>
             <a:r>
-              <a:rPr lang="en-US" smtClean="0"/>
+              <a:rPr lang="en-US"/>
               <a:t>Fourth level</a:t>
             </a:r>
           </a:p>
           <a:p>
             <a:pPr lvl="4"/>
             <a:r>
-              <a:rPr lang="en-US" smtClean="0"/>
+              <a:rPr lang="en-US"/>
               <a:t>Fifth level</a:t>
             </a:r>
-            <a:endParaRPr lang="en-US"/>
           </a:p>
         </p:txBody>
       </p:sp>
@@ -10386,7 +10323,7 @@
           <a:p>
             <a:fld id="{699DC775-C286-4358-8C92-D7E584E969B3}" type="datetimeFigureOut">
               <a:rPr lang="en-US" smtClean="0"/>
-              <a:t>4/10/2018</a:t>
+              <a:t>1/22/2019</a:t>
             </a:fld>
             <a:endParaRPr lang="en-US"/>
           </a:p>
@@ -10779,7 +10716,7 @@
           <a:lstStyle/>
           <a:p>
             <a:r>
-              <a:rPr lang="en-US" sz="5400" b="1" dirty="0" err="1" smtClean="0">
+              <a:rPr lang="en-US" sz="5400" b="1" dirty="0" err="1">
                 <a:solidFill>
                   <a:schemeClr val="accent6">
                     <a:lumMod val="75000"/>
@@ -10789,7 +10726,7 @@
               <a:t>PowerPointLabs</a:t>
             </a:r>
             <a:r>
-              <a:rPr lang="en-US" sz="5400" b="1" dirty="0" smtClean="0">
+              <a:rPr lang="en-US" sz="5400" b="1" dirty="0">
                 <a:solidFill>
                   <a:schemeClr val="accent6">
                     <a:lumMod val="75000"/>
@@ -10827,7 +10764,7 @@
               <a:buNone/>
             </a:pPr>
             <a:r>
-              <a:rPr lang="en-US" b="1" dirty="0" smtClean="0">
+              <a:rPr lang="en-US" b="1" dirty="0">
                 <a:solidFill>
                   <a:srgbClr val="0070C0"/>
                 </a:solidFill>
@@ -10838,34 +10775,21 @@
           <a:p>
             <a:pPr marL="285750" indent="-285750"/>
             <a:r>
-              <a:rPr lang="en-US" b="1" dirty="0" smtClean="0">
-                <a:solidFill>
-                  <a:srgbClr val="0070C0"/>
-                </a:solidFill>
-              </a:rPr>
-              <a:t>DO </a:t>
-            </a:r>
-            <a:r>
               <a:rPr lang="en-US" b="1" dirty="0">
                 <a:solidFill>
                   <a:srgbClr val="0070C0"/>
                 </a:solidFill>
               </a:rPr>
-              <a:t>NOT SAVE </a:t>
-            </a:r>
-            <a:r>
-              <a:rPr lang="en-US" dirty="0" smtClean="0">
+              <a:t>DO NOT SAVE </a:t>
+            </a:r>
+            <a:r>
+              <a:rPr lang="en-US" dirty="0">
                 <a:solidFill>
                   <a:srgbClr val="0070C0"/>
                 </a:solidFill>
               </a:rPr>
               <a:t>these slides after testing. Keep this file in its original form.</a:t>
             </a:r>
-            <a:endParaRPr lang="en-US" dirty="0">
-              <a:solidFill>
-                <a:srgbClr val="0070C0"/>
-              </a:solidFill>
-            </a:endParaRPr>
           </a:p>
           <a:p>
             <a:pPr marL="285750" indent="-285750"/>
@@ -10875,47 +10799,7 @@
                   <a:srgbClr val="0070C0"/>
                 </a:solidFill>
               </a:rPr>
-              <a:t>If </a:t>
-            </a:r>
-            <a:r>
-              <a:rPr lang="en-US" dirty="0" smtClean="0">
-                <a:solidFill>
-                  <a:srgbClr val="0070C0"/>
-                </a:solidFill>
-              </a:rPr>
-              <a:t>your </a:t>
-            </a:r>
-            <a:r>
-              <a:rPr lang="en-US" dirty="0">
-                <a:solidFill>
-                  <a:srgbClr val="0070C0"/>
-                </a:solidFill>
-              </a:rPr>
-              <a:t>result </a:t>
-            </a:r>
-            <a:r>
-              <a:rPr lang="en-US" dirty="0" smtClean="0">
-                <a:solidFill>
-                  <a:srgbClr val="0070C0"/>
-                </a:solidFill>
-              </a:rPr>
-              <a:t>is different from the </a:t>
-            </a:r>
-            <a:r>
-              <a:rPr lang="en-US" dirty="0">
-                <a:solidFill>
-                  <a:srgbClr val="0070C0"/>
-                </a:solidFill>
-              </a:rPr>
-              <a:t>expected output, </a:t>
-            </a:r>
-            <a:r>
-              <a:rPr lang="en-US" dirty="0" smtClean="0">
-                <a:solidFill>
-                  <a:srgbClr val="0070C0"/>
-                </a:solidFill>
-              </a:rPr>
-              <a:t>please submit a bug report (attach slides/screenshots as necessary).</a:t>
+              <a:t>If your result is different from the expected output, please submit a bug report (attach slides/screenshots as necessary).</a:t>
             </a:r>
             <a:endParaRPr lang="en-SG" dirty="0">
               <a:solidFill>
@@ -10938,17 +10822,171 @@
   <p:clrMapOvr>
     <a:masterClrMapping/>
   </p:clrMapOvr>
-  <p:timing>
-    <p:tnLst>
-      <p:par>
-        <p:cTn id="1" dur="indefinite" restart="never" nodeType="tmRoot"/>
-      </p:par>
-    </p:tnLst>
-  </p:timing>
 </p:sld>
 </file>
 
 <file path=ppt/slides/slide10.xml><?xml version="1.0" encoding="utf-8"?>
+<p:sld xmlns:a="http://schemas.openxmlformats.org/drawingml/2006/main" xmlns:r="http://schemas.openxmlformats.org/officeDocument/2006/relationships" xmlns:p="http://schemas.openxmlformats.org/presentationml/2006/main">
+  <p:cSld>
+    <p:spTree>
+      <p:nvGrpSpPr>
+        <p:cNvPr id="1" name=""/>
+        <p:cNvGrpSpPr/>
+        <p:nvPr/>
+      </p:nvGrpSpPr>
+      <p:grpSpPr>
+        <a:xfrm>
+          <a:off x="0" y="0"/>
+          <a:ext cx="0" cy="0"/>
+          <a:chOff x="0" y="0"/>
+          <a:chExt cx="0" cy="0"/>
+        </a:xfrm>
+      </p:grpSpPr>
+      <p:sp>
+        <p:nvSpPr>
+          <p:cNvPr id="2" name="Title 1"/>
+          <p:cNvSpPr>
+            <a:spLocks noGrp="1"/>
+          </p:cNvSpPr>
+          <p:nvPr>
+            <p:ph type="title"/>
+          </p:nvPr>
+        </p:nvSpPr>
+        <p:spPr>
+          <a:xfrm>
+            <a:off x="381000" y="609600"/>
+            <a:ext cx="8229600" cy="1143000"/>
+          </a:xfrm>
+        </p:spPr>
+        <p:txBody>
+          <a:bodyPr>
+            <a:noAutofit/>
+          </a:bodyPr>
+          <a:lstStyle/>
+          <a:p>
+            <a:pPr algn="l"/>
+            <a:r>
+              <a:rPr lang="en-US" sz="7200" dirty="0" err="1">
+                <a:solidFill>
+                  <a:schemeClr val="bg1"/>
+                </a:solidFill>
+              </a:rPr>
+              <a:t>IsClipboardRestored</a:t>
+            </a:r>
+            <a:endParaRPr lang="en-SG" sz="7200" dirty="0">
+              <a:solidFill>
+                <a:schemeClr val="bg1"/>
+              </a:solidFill>
+            </a:endParaRPr>
+          </a:p>
+        </p:txBody>
+      </p:sp>
+      <p:sp>
+        <p:nvSpPr>
+          <p:cNvPr id="3" name="TextBox 2"/>
+          <p:cNvSpPr txBox="1"/>
+          <p:nvPr/>
+        </p:nvSpPr>
+        <p:spPr>
+          <a:xfrm>
+            <a:off x="381000" y="2057400"/>
+            <a:ext cx="8229600" cy="3539430"/>
+          </a:xfrm>
+          <a:prstGeom prst="rect">
+            <a:avLst/>
+          </a:prstGeom>
+          <a:noFill/>
+        </p:spPr>
+        <p:txBody>
+          <a:bodyPr wrap="square" rtlCol="0">
+            <a:spAutoFit/>
+          </a:bodyPr>
+          <a:lstStyle/>
+          <a:p>
+            <a:r>
+              <a:rPr lang="en-US" altLang="zh-CN" sz="2800" dirty="0">
+                <a:solidFill>
+                  <a:schemeClr val="bg1"/>
+                </a:solidFill>
+              </a:rPr>
+              <a:t>Add those shapes in slide 3 to Shapes Lab;</a:t>
+            </a:r>
+          </a:p>
+          <a:p>
+            <a:r>
+              <a:rPr lang="en-US" altLang="zh-CN" sz="2800" dirty="0">
+                <a:solidFill>
+                  <a:schemeClr val="bg1"/>
+                </a:solidFill>
+              </a:rPr>
+              <a:t>Add added shapes in Shapes Lab to slide 4;</a:t>
+            </a:r>
+          </a:p>
+          <a:p>
+            <a:r>
+              <a:rPr lang="en-US" altLang="zh-CN" sz="2800" dirty="0">
+                <a:solidFill>
+                  <a:schemeClr val="bg1"/>
+                </a:solidFill>
+              </a:rPr>
+              <a:t>Compare slide 4 and expected slide 5</a:t>
+            </a:r>
+          </a:p>
+          <a:p>
+            <a:endParaRPr lang="en-US" altLang="zh-CN" sz="2800" dirty="0">
+              <a:solidFill>
+                <a:schemeClr val="bg1"/>
+              </a:solidFill>
+            </a:endParaRPr>
+          </a:p>
+          <a:p>
+            <a:r>
+              <a:rPr lang="en-US" altLang="zh-CN" sz="2800" dirty="0">
+                <a:solidFill>
+                  <a:schemeClr val="bg1"/>
+                </a:solidFill>
+              </a:rPr>
+              <a:t>Repeat for testing Add Shapes button on Shapes Lab pane from slides 6 to 8</a:t>
+            </a:r>
+          </a:p>
+          <a:p>
+            <a:endParaRPr lang="en-US" altLang="zh-CN" sz="2800" dirty="0">
+              <a:solidFill>
+                <a:schemeClr val="bg1"/>
+              </a:solidFill>
+            </a:endParaRPr>
+          </a:p>
+          <a:p>
+            <a:r>
+              <a:rPr lang="en-US" altLang="zh-CN" sz="2800" dirty="0">
+                <a:solidFill>
+                  <a:schemeClr val="bg1"/>
+                </a:solidFill>
+              </a:rPr>
+              <a:t>Animations are also expected to be transferred</a:t>
+            </a:r>
+            <a:endParaRPr lang="zh-CN" altLang="en-US" sz="2800" dirty="0">
+              <a:solidFill>
+                <a:schemeClr val="bg1"/>
+              </a:solidFill>
+            </a:endParaRPr>
+          </a:p>
+        </p:txBody>
+      </p:sp>
+    </p:spTree>
+    <p:extLst>
+      <p:ext uri="{BB962C8B-B14F-4D97-AF65-F5344CB8AC3E}">
+        <p14:creationId xmlns:p14="http://schemas.microsoft.com/office/powerpoint/2010/main" val="3646993363"/>
+      </p:ext>
+    </p:extLst>
+  </p:cSld>
+  <p:clrMapOvr>
+    <a:masterClrMapping/>
+  </p:clrMapOvr>
+</p:sld>
+</file>
+
+<file path=ppt/slides/slide11.xml><?xml version="1.0" encoding="utf-8"?>
 <p:sld xmlns:a="http://schemas.openxmlformats.org/drawingml/2006/main" xmlns:r="http://schemas.openxmlformats.org/officeDocument/2006/relationships" xmlns:p="http://schemas.openxmlformats.org/presentationml/2006/main">
   <p:cSld>
     <p:spTree>
@@ -11010,7 +11048,7 @@
           <a:p>
             <a:pPr algn="ctr"/>
             <a:r>
-              <a:rPr lang="en-US" altLang="zh-CN" sz="6600" dirty="0" smtClean="0">
+              <a:rPr lang="en-US" altLang="zh-CN" sz="6600" dirty="0">
                 <a:solidFill>
                   <a:srgbClr val="EB7561"/>
                 </a:solidFill>
@@ -11498,7 +11536,7 @@
 </p:sld>
 </file>
 
-<file path=ppt/slides/slide11.xml><?xml version="1.0" encoding="utf-8"?>
+<file path=ppt/slides/slide12.xml><?xml version="1.0" encoding="utf-8"?>
 <p:sld xmlns:a="http://schemas.openxmlformats.org/drawingml/2006/main" xmlns:r="http://schemas.openxmlformats.org/officeDocument/2006/relationships" xmlns:p="http://schemas.openxmlformats.org/presentationml/2006/main">
   <p:cSld>
     <p:spTree>
@@ -11525,17 +11563,10 @@
   <p:clrMapOvr>
     <a:masterClrMapping/>
   </p:clrMapOvr>
-  <p:timing>
-    <p:tnLst>
-      <p:par>
-        <p:cTn id="1" dur="indefinite" restart="never" nodeType="tmRoot"/>
-      </p:par>
-    </p:tnLst>
-  </p:timing>
 </p:sld>
 </file>
 
-<file path=ppt/slides/slide12.xml><?xml version="1.0" encoding="utf-8"?>
+<file path=ppt/slides/slide13.xml><?xml version="1.0" encoding="utf-8"?>
 <p:sld xmlns:a="http://schemas.openxmlformats.org/drawingml/2006/main" xmlns:r="http://schemas.openxmlformats.org/officeDocument/2006/relationships" xmlns:p="http://schemas.openxmlformats.org/presentationml/2006/main">
   <p:cSld>
     <p:spTree>
@@ -11597,7 +11628,7 @@
           <a:p>
             <a:pPr algn="ctr"/>
             <a:r>
-              <a:rPr lang="en-US" altLang="zh-CN" sz="6600" dirty="0" smtClean="0">
+              <a:rPr lang="en-US" altLang="zh-CN" sz="6600" dirty="0">
                 <a:solidFill>
                   <a:srgbClr val="EB7561"/>
                 </a:solidFill>
@@ -11857,10 +11888,9 @@
           <a:lstStyle/>
           <a:p>
             <a:r>
-              <a:rPr lang="en-SG" dirty="0" smtClean="0"/>
+              <a:rPr lang="en-SG" dirty="0"/>
               <a:t>Expected slide</a:t>
             </a:r>
-            <a:endParaRPr lang="en-SG" dirty="0"/>
           </a:p>
         </p:txBody>
       </p:sp>
@@ -11868,552 +11898,6 @@
     <p:extLst>
       <p:ext uri="{BB962C8B-B14F-4D97-AF65-F5344CB8AC3E}">
         <p14:creationId xmlns:p14="http://schemas.microsoft.com/office/powerpoint/2010/main" val="2562146180"/>
-      </p:ext>
-    </p:extLst>
-  </p:cSld>
-  <p:clrMapOvr>
-    <a:masterClrMapping/>
-  </p:clrMapOvr>
-  <p:timing>
-    <p:tnLst>
-      <p:par>
-        <p:cTn id="1" dur="indefinite" restart="never" nodeType="tmRoot">
-          <p:childTnLst>
-            <p:seq concurrent="1" nextAc="seek">
-              <p:cTn id="2" dur="indefinite" nodeType="mainSeq">
-                <p:childTnLst>
-                  <p:par>
-                    <p:cTn id="3" fill="hold">
-                      <p:stCondLst>
-                        <p:cond delay="indefinite"/>
-                      </p:stCondLst>
-                      <p:childTnLst>
-                        <p:par>
-                          <p:cTn id="4" fill="hold">
-                            <p:stCondLst>
-                              <p:cond delay="0"/>
-                            </p:stCondLst>
-                            <p:childTnLst>
-                              <p:par>
-                                <p:cTn id="5" presetID="2" presetClass="entr" presetSubtype="4" fill="hold" grpId="0" nodeType="clickEffect">
-                                  <p:stCondLst>
-                                    <p:cond delay="0"/>
-                                  </p:stCondLst>
-                                  <p:childTnLst>
-                                    <p:set>
-                                      <p:cBhvr>
-                                        <p:cTn id="6" dur="1" fill="hold">
-                                          <p:stCondLst>
-                                            <p:cond delay="0"/>
-                                          </p:stCondLst>
-                                        </p:cTn>
-                                        <p:tgtEl>
-                                          <p:spTgt spid="3"/>
-                                        </p:tgtEl>
-                                        <p:attrNameLst>
-                                          <p:attrName>style.visibility</p:attrName>
-                                        </p:attrNameLst>
-                                      </p:cBhvr>
-                                      <p:to>
-                                        <p:strVal val="visible"/>
-                                      </p:to>
-                                    </p:set>
-                                    <p:anim calcmode="lin" valueType="num">
-                                      <p:cBhvr additive="base">
-                                        <p:cTn id="7" dur="500" fill="hold"/>
-                                        <p:tgtEl>
-                                          <p:spTgt spid="3"/>
-                                        </p:tgtEl>
-                                        <p:attrNameLst>
-                                          <p:attrName>ppt_x</p:attrName>
-                                        </p:attrNameLst>
-                                      </p:cBhvr>
-                                      <p:tavLst>
-                                        <p:tav tm="0">
-                                          <p:val>
-                                            <p:strVal val="#ppt_x"/>
-                                          </p:val>
-                                        </p:tav>
-                                        <p:tav tm="100000">
-                                          <p:val>
-                                            <p:strVal val="#ppt_x"/>
-                                          </p:val>
-                                        </p:tav>
-                                      </p:tavLst>
-                                    </p:anim>
-                                    <p:anim calcmode="lin" valueType="num">
-                                      <p:cBhvr additive="base">
-                                        <p:cTn id="8" dur="500" fill="hold"/>
-                                        <p:tgtEl>
-                                          <p:spTgt spid="3"/>
-                                        </p:tgtEl>
-                                        <p:attrNameLst>
-                                          <p:attrName>ppt_y</p:attrName>
-                                        </p:attrNameLst>
-                                      </p:cBhvr>
-                                      <p:tavLst>
-                                        <p:tav tm="0">
-                                          <p:val>
-                                            <p:strVal val="1+#ppt_h/2"/>
-                                          </p:val>
-                                        </p:tav>
-                                        <p:tav tm="100000">
-                                          <p:val>
-                                            <p:strVal val="#ppt_y"/>
-                                          </p:val>
-                                        </p:tav>
-                                      </p:tavLst>
-                                    </p:anim>
-                                  </p:childTnLst>
-                                </p:cTn>
-                              </p:par>
-                            </p:childTnLst>
-                          </p:cTn>
-                        </p:par>
-                      </p:childTnLst>
-                    </p:cTn>
-                  </p:par>
-                  <p:par>
-                    <p:cTn id="9" fill="hold">
-                      <p:stCondLst>
-                        <p:cond delay="indefinite"/>
-                      </p:stCondLst>
-                      <p:childTnLst>
-                        <p:par>
-                          <p:cTn id="10" fill="hold">
-                            <p:stCondLst>
-                              <p:cond delay="0"/>
-                            </p:stCondLst>
-                            <p:childTnLst>
-                              <p:par>
-                                <p:cTn id="11" presetID="1" presetClass="entr" presetSubtype="0" fill="hold" grpId="0" nodeType="clickEffect">
-                                  <p:stCondLst>
-                                    <p:cond delay="0"/>
-                                  </p:stCondLst>
-                                  <p:childTnLst>
-                                    <p:set>
-                                      <p:cBhvr>
-                                        <p:cTn id="12" dur="1" fill="hold">
-                                          <p:stCondLst>
-                                            <p:cond delay="0"/>
-                                          </p:stCondLst>
-                                        </p:cTn>
-                                        <p:tgtEl>
-                                          <p:spTgt spid="5"/>
-                                        </p:tgtEl>
-                                        <p:attrNameLst>
-                                          <p:attrName>style.visibility</p:attrName>
-                                        </p:attrNameLst>
-                                      </p:cBhvr>
-                                      <p:to>
-                                        <p:strVal val="visible"/>
-                                      </p:to>
-                                    </p:set>
-                                  </p:childTnLst>
-                                </p:cTn>
-                              </p:par>
-                            </p:childTnLst>
-                          </p:cTn>
-                        </p:par>
-                      </p:childTnLst>
-                    </p:cTn>
-                  </p:par>
-                  <p:par>
-                    <p:cTn id="13" fill="hold">
-                      <p:stCondLst>
-                        <p:cond delay="indefinite"/>
-                      </p:stCondLst>
-                      <p:childTnLst>
-                        <p:par>
-                          <p:cTn id="14" fill="hold">
-                            <p:stCondLst>
-                              <p:cond delay="0"/>
-                            </p:stCondLst>
-                            <p:childTnLst>
-                              <p:par>
-                                <p:cTn id="15" presetID="10" presetClass="entr" presetSubtype="0" fill="hold" grpId="0" nodeType="clickEffect">
-                                  <p:stCondLst>
-                                    <p:cond delay="0"/>
-                                  </p:stCondLst>
-                                  <p:childTnLst>
-                                    <p:set>
-                                      <p:cBhvr>
-                                        <p:cTn id="16" dur="1" fill="hold">
-                                          <p:stCondLst>
-                                            <p:cond delay="0"/>
-                                          </p:stCondLst>
-                                        </p:cTn>
-                                        <p:tgtEl>
-                                          <p:spTgt spid="7"/>
-                                        </p:tgtEl>
-                                        <p:attrNameLst>
-                                          <p:attrName>style.visibility</p:attrName>
-                                        </p:attrNameLst>
-                                      </p:cBhvr>
-                                      <p:to>
-                                        <p:strVal val="visible"/>
-                                      </p:to>
-                                    </p:set>
-                                    <p:animEffect transition="in" filter="fade">
-                                      <p:cBhvr>
-                                        <p:cTn id="17" dur="500"/>
-                                        <p:tgtEl>
-                                          <p:spTgt spid="7"/>
-                                        </p:tgtEl>
-                                      </p:cBhvr>
-                                    </p:animEffect>
-                                  </p:childTnLst>
-                                </p:cTn>
-                              </p:par>
-                            </p:childTnLst>
-                          </p:cTn>
-                        </p:par>
-                      </p:childTnLst>
-                    </p:cTn>
-                  </p:par>
-                  <p:par>
-                    <p:cTn id="18" fill="hold">
-                      <p:stCondLst>
-                        <p:cond delay="indefinite"/>
-                      </p:stCondLst>
-                      <p:childTnLst>
-                        <p:par>
-                          <p:cTn id="19" fill="hold">
-                            <p:stCondLst>
-                              <p:cond delay="0"/>
-                            </p:stCondLst>
-                            <p:childTnLst>
-                              <p:par>
-                                <p:cTn id="20" presetID="16" presetClass="entr" presetSubtype="21" fill="hold" grpId="0" nodeType="clickEffect">
-                                  <p:stCondLst>
-                                    <p:cond delay="0"/>
-                                  </p:stCondLst>
-                                  <p:childTnLst>
-                                    <p:set>
-                                      <p:cBhvr>
-                                        <p:cTn id="21" dur="1" fill="hold">
-                                          <p:stCondLst>
-                                            <p:cond delay="0"/>
-                                          </p:stCondLst>
-                                        </p:cTn>
-                                        <p:tgtEl>
-                                          <p:spTgt spid="8"/>
-                                        </p:tgtEl>
-                                        <p:attrNameLst>
-                                          <p:attrName>style.visibility</p:attrName>
-                                        </p:attrNameLst>
-                                      </p:cBhvr>
-                                      <p:to>
-                                        <p:strVal val="visible"/>
-                                      </p:to>
-                                    </p:set>
-                                    <p:animEffect transition="in" filter="barn(inVertical)">
-                                      <p:cBhvr>
-                                        <p:cTn id="22" dur="500"/>
-                                        <p:tgtEl>
-                                          <p:spTgt spid="8"/>
-                                        </p:tgtEl>
-                                      </p:cBhvr>
-                                    </p:animEffect>
-                                  </p:childTnLst>
-                                </p:cTn>
-                              </p:par>
-                            </p:childTnLst>
-                          </p:cTn>
-                        </p:par>
-                      </p:childTnLst>
-                    </p:cTn>
-                  </p:par>
-                </p:childTnLst>
-              </p:cTn>
-              <p:prevCondLst>
-                <p:cond evt="onPrev" delay="0">
-                  <p:tgtEl>
-                    <p:sldTgt/>
-                  </p:tgtEl>
-                </p:cond>
-              </p:prevCondLst>
-              <p:nextCondLst>
-                <p:cond evt="onNext" delay="0">
-                  <p:tgtEl>
-                    <p:sldTgt/>
-                  </p:tgtEl>
-                </p:cond>
-              </p:nextCondLst>
-            </p:seq>
-          </p:childTnLst>
-        </p:cTn>
-      </p:par>
-    </p:tnLst>
-    <p:bldLst>
-      <p:bldP spid="3" grpId="0" animBg="1"/>
-      <p:bldP spid="5" grpId="0" animBg="1"/>
-      <p:bldP spid="7" grpId="0" animBg="1"/>
-      <p:bldP spid="8" grpId="0" animBg="1"/>
-    </p:bldLst>
-  </p:timing>
-</p:sld>
-</file>
-
-<file path=ppt/slides/slide13.xml><?xml version="1.0" encoding="utf-8"?>
-<p:sld xmlns:a="http://schemas.openxmlformats.org/drawingml/2006/main" xmlns:r="http://schemas.openxmlformats.org/officeDocument/2006/relationships" xmlns:p="http://schemas.openxmlformats.org/presentationml/2006/main">
-  <p:cSld>
-    <p:spTree>
-      <p:nvGrpSpPr>
-        <p:cNvPr id="1" name=""/>
-        <p:cNvGrpSpPr/>
-        <p:nvPr/>
-      </p:nvGrpSpPr>
-      <p:grpSpPr>
-        <a:xfrm>
-          <a:off x="0" y="0"/>
-          <a:ext cx="0" cy="0"/>
-          <a:chOff x="0" y="0"/>
-          <a:chExt cx="0" cy="0"/>
-        </a:xfrm>
-      </p:grpSpPr>
-      <p:sp>
-        <p:nvSpPr>
-          <p:cNvPr id="3" name="selectMeNow1"/>
-          <p:cNvSpPr/>
-          <p:nvPr/>
-        </p:nvSpPr>
-        <p:spPr>
-          <a:xfrm rot="1965194">
-            <a:off x="1533377" y="1406276"/>
-            <a:ext cx="3200400" cy="3792071"/>
-          </a:xfrm>
-          <a:prstGeom prst="roundRect">
-            <a:avLst/>
-          </a:prstGeom>
-          <a:solidFill>
-            <a:schemeClr val="accent2">
-              <a:lumMod val="40000"/>
-              <a:lumOff val="60000"/>
-            </a:schemeClr>
-          </a:solidFill>
-          <a:ln w="203200">
-            <a:solidFill>
-              <a:srgbClr val="92D050"/>
-            </a:solidFill>
-          </a:ln>
-          <a:effectLst>
-            <a:innerShdw blurRad="63500" dist="50800" dir="8100000">
-              <a:prstClr val="black">
-                <a:alpha val="50000"/>
-              </a:prstClr>
-            </a:innerShdw>
-          </a:effectLst>
-        </p:spPr>
-        <p:style>
-          <a:lnRef idx="2">
-            <a:schemeClr val="accent1">
-              <a:shade val="50000"/>
-            </a:schemeClr>
-          </a:lnRef>
-          <a:fillRef idx="1">
-            <a:schemeClr val="accent1"/>
-          </a:fillRef>
-          <a:effectRef idx="0">
-            <a:schemeClr val="accent1"/>
-          </a:effectRef>
-          <a:fontRef idx="minor">
-            <a:schemeClr val="lt1"/>
-          </a:fontRef>
-        </p:style>
-        <p:txBody>
-          <a:bodyPr rtlCol="0" anchor="ctr"/>
-          <a:lstStyle/>
-          <a:p>
-            <a:pPr algn="ctr"/>
-            <a:r>
-              <a:rPr lang="en-US" altLang="zh-CN" sz="6600" dirty="0" smtClean="0">
-                <a:solidFill>
-                  <a:srgbClr val="EB7561"/>
-                </a:solidFill>
-                <a:latin typeface="Times New Roman" panose="02020603050405020304" pitchFamily="18" charset="0"/>
-                <a:cs typeface="Times New Roman" panose="02020603050405020304" pitchFamily="18" charset="0"/>
-              </a:rPr>
-              <a:t>TEXT</a:t>
-            </a:r>
-            <a:endParaRPr lang="zh-CN" altLang="en-US" sz="6600" dirty="0">
-              <a:solidFill>
-                <a:srgbClr val="EB7561"/>
-              </a:solidFill>
-              <a:latin typeface="Times New Roman" panose="02020603050405020304" pitchFamily="18" charset="0"/>
-              <a:cs typeface="Times New Roman" panose="02020603050405020304" pitchFamily="18" charset="0"/>
-            </a:endParaRPr>
-          </a:p>
-        </p:txBody>
-      </p:sp>
-      <p:sp>
-        <p:nvSpPr>
-          <p:cNvPr id="5" name="selectMeNow2"/>
-          <p:cNvSpPr/>
-          <p:nvPr/>
-        </p:nvSpPr>
-        <p:spPr>
-          <a:xfrm>
-            <a:off x="5867400" y="1143000"/>
-            <a:ext cx="1828800" cy="1371600"/>
-          </a:xfrm>
-          <a:prstGeom prst="roundRect">
-            <a:avLst/>
-          </a:prstGeom>
-          <a:ln/>
-        </p:spPr>
-        <p:style>
-          <a:lnRef idx="3">
-            <a:schemeClr val="lt1"/>
-          </a:lnRef>
-          <a:fillRef idx="1">
-            <a:schemeClr val="accent6"/>
-          </a:fillRef>
-          <a:effectRef idx="1">
-            <a:schemeClr val="accent6"/>
-          </a:effectRef>
-          <a:fontRef idx="minor">
-            <a:schemeClr val="lt1"/>
-          </a:fontRef>
-        </p:style>
-        <p:txBody>
-          <a:bodyPr rtlCol="0" anchor="ctr"/>
-          <a:lstStyle/>
-          <a:p>
-            <a:pPr algn="ctr"/>
-            <a:endParaRPr lang="zh-CN" altLang="en-US"/>
-          </a:p>
-        </p:txBody>
-      </p:sp>
-      <p:sp>
-        <p:nvSpPr>
-          <p:cNvPr id="7" name="selectMeNow3"/>
-          <p:cNvSpPr/>
-          <p:nvPr/>
-        </p:nvSpPr>
-        <p:spPr>
-          <a:xfrm>
-            <a:off x="5867400" y="2667000"/>
-            <a:ext cx="1828800" cy="1371600"/>
-          </a:xfrm>
-          <a:prstGeom prst="roundRect">
-            <a:avLst/>
-          </a:prstGeom>
-          <a:ln/>
-        </p:spPr>
-        <p:style>
-          <a:lnRef idx="3">
-            <a:schemeClr val="lt1"/>
-          </a:lnRef>
-          <a:fillRef idx="1">
-            <a:schemeClr val="accent3"/>
-          </a:fillRef>
-          <a:effectRef idx="1">
-            <a:schemeClr val="accent3"/>
-          </a:effectRef>
-          <a:fontRef idx="minor">
-            <a:schemeClr val="lt1"/>
-          </a:fontRef>
-        </p:style>
-        <p:txBody>
-          <a:bodyPr rtlCol="0" anchor="ctr"/>
-          <a:lstStyle/>
-          <a:p>
-            <a:pPr algn="ctr"/>
-            <a:endParaRPr lang="zh-CN" altLang="en-US"/>
-          </a:p>
-        </p:txBody>
-      </p:sp>
-      <p:sp>
-        <p:nvSpPr>
-          <p:cNvPr id="8" name="selectMeNow4"/>
-          <p:cNvSpPr/>
-          <p:nvPr/>
-        </p:nvSpPr>
-        <p:spPr>
-          <a:xfrm>
-            <a:off x="5867400" y="4191000"/>
-            <a:ext cx="1828800" cy="1371600"/>
-          </a:xfrm>
-          <a:prstGeom prst="roundRect">
-            <a:avLst/>
-          </a:prstGeom>
-          <a:solidFill>
-            <a:schemeClr val="accent6">
-              <a:alpha val="50000"/>
-            </a:schemeClr>
-          </a:solidFill>
-          <a:ln>
-            <a:noFill/>
-          </a:ln>
-        </p:spPr>
-        <p:style>
-          <a:lnRef idx="0">
-            <a:scrgbClr r="0" g="0" b="0"/>
-          </a:lnRef>
-          <a:fillRef idx="0">
-            <a:scrgbClr r="0" g="0" b="0"/>
-          </a:fillRef>
-          <a:effectRef idx="0">
-            <a:scrgbClr r="0" g="0" b="0"/>
-          </a:effectRef>
-          <a:fontRef idx="minor">
-            <a:schemeClr val="lt1"/>
-          </a:fontRef>
-        </p:style>
-        <p:txBody>
-          <a:bodyPr rtlCol="0" anchor="ctr"/>
-          <a:lstStyle/>
-          <a:p>
-            <a:pPr algn="ctr"/>
-            <a:endParaRPr lang="zh-CN" altLang="en-US"/>
-          </a:p>
-        </p:txBody>
-      </p:sp>
-      <p:sp>
-        <p:nvSpPr>
-          <p:cNvPr id="2" name="copyMe"/>
-          <p:cNvSpPr/>
-          <p:nvPr/>
-        </p:nvSpPr>
-        <p:spPr>
-          <a:xfrm>
-            <a:off x="2438400" y="1206811"/>
-            <a:ext cx="4191000" cy="4191000"/>
-          </a:xfrm>
-          <a:prstGeom prst="heptagon">
-            <a:avLst/>
-          </a:prstGeom>
-        </p:spPr>
-        <p:style>
-          <a:lnRef idx="2">
-            <a:schemeClr val="accent1">
-              <a:shade val="50000"/>
-            </a:schemeClr>
-          </a:lnRef>
-          <a:fillRef idx="1">
-            <a:schemeClr val="accent1"/>
-          </a:fillRef>
-          <a:effectRef idx="0">
-            <a:schemeClr val="accent1"/>
-          </a:effectRef>
-          <a:fontRef idx="minor">
-            <a:schemeClr val="lt1"/>
-          </a:fontRef>
-        </p:style>
-        <p:txBody>
-          <a:bodyPr rtlCol="0" anchor="ctr"/>
-          <a:lstStyle/>
-          <a:p>
-            <a:pPr algn="ctr"/>
-            <a:endParaRPr lang="en-SG"/>
-          </a:p>
-        </p:txBody>
-      </p:sp>
-    </p:spTree>
-    <p:extLst>
-      <p:ext uri="{BB962C8B-B14F-4D97-AF65-F5344CB8AC3E}">
-        <p14:creationId xmlns:p14="http://schemas.microsoft.com/office/powerpoint/2010/main" val="2188512437"/>
       </p:ext>
     </p:extLst>
   </p:cSld>
@@ -12718,46 +12202,9 @@
           <a:chExt cx="0" cy="0"/>
         </a:xfrm>
       </p:grpSpPr>
-    </p:spTree>
-    <p:extLst>
-      <p:ext uri="{BB962C8B-B14F-4D97-AF65-F5344CB8AC3E}">
-        <p14:creationId xmlns:p14="http://schemas.microsoft.com/office/powerpoint/2010/main" val="1779079148"/>
-      </p:ext>
-    </p:extLst>
-  </p:cSld>
-  <p:clrMapOvr>
-    <a:masterClrMapping/>
-  </p:clrMapOvr>
-  <p:timing>
-    <p:tnLst>
-      <p:par>
-        <p:cTn id="1" dur="indefinite" restart="never" nodeType="tmRoot"/>
-      </p:par>
-    </p:tnLst>
-  </p:timing>
-</p:sld>
-</file>
-
-<file path=ppt/slides/slide15.xml><?xml version="1.0" encoding="utf-8"?>
-<p:sld xmlns:a="http://schemas.openxmlformats.org/drawingml/2006/main" xmlns:r="http://schemas.openxmlformats.org/officeDocument/2006/relationships" xmlns:p="http://schemas.openxmlformats.org/presentationml/2006/main">
-  <p:cSld>
-    <p:spTree>
-      <p:nvGrpSpPr>
-        <p:cNvPr id="1" name=""/>
-        <p:cNvGrpSpPr/>
-        <p:nvPr/>
-      </p:nvGrpSpPr>
-      <p:grpSpPr>
-        <a:xfrm>
-          <a:off x="0" y="0"/>
-          <a:ext cx="0" cy="0"/>
-          <a:chOff x="0" y="0"/>
-          <a:chExt cx="0" cy="0"/>
-        </a:xfrm>
-      </p:grpSpPr>
-      <p:sp>
-        <p:nvSpPr>
-          <p:cNvPr id="6" name="Group selectMeNow1 Seq_1"/>
+      <p:sp>
+        <p:nvSpPr>
+          <p:cNvPr id="3" name="selectMeNow1"/>
           <p:cNvSpPr/>
           <p:nvPr/>
         </p:nvSpPr>
@@ -12810,7 +12257,7 @@
           <a:p>
             <a:pPr algn="ctr"/>
             <a:r>
-              <a:rPr lang="en-US" altLang="zh-CN" sz="6600" dirty="0" smtClean="0">
+              <a:rPr lang="en-US" altLang="zh-CN" sz="6600" dirty="0">
                 <a:solidFill>
                   <a:srgbClr val="EB7561"/>
                 </a:solidFill>
@@ -12831,7 +12278,7 @@
       </p:sp>
       <p:sp>
         <p:nvSpPr>
-          <p:cNvPr id="9" name="Group selectMeNow1 Seq_2"/>
+          <p:cNvPr id="5" name="selectMeNow2"/>
           <p:cNvSpPr/>
           <p:nvPr/>
         </p:nvSpPr>
@@ -12870,7 +12317,7 @@
       </p:sp>
       <p:sp>
         <p:nvSpPr>
-          <p:cNvPr id="10" name="Group selectMeNow1 Seq_3"/>
+          <p:cNvPr id="7" name="selectMeNow3"/>
           <p:cNvSpPr/>
           <p:nvPr/>
         </p:nvSpPr>
@@ -12909,7 +12356,7 @@
       </p:sp>
       <p:sp>
         <p:nvSpPr>
-          <p:cNvPr id="11" name="Group selectMeNow1 Seq_4"/>
+          <p:cNvPr id="8" name="selectMeNow4"/>
           <p:cNvSpPr/>
           <p:nvPr/>
         </p:nvSpPr>
@@ -12955,7 +12402,7 @@
       </p:sp>
       <p:sp>
         <p:nvSpPr>
-          <p:cNvPr id="7" name="copyMe"/>
+          <p:cNvPr id="2" name="copyMe"/>
           <p:cNvSpPr/>
           <p:nvPr/>
         </p:nvSpPr>
@@ -12993,6 +12440,582 @@
           </a:p>
         </p:txBody>
       </p:sp>
+    </p:spTree>
+    <p:extLst>
+      <p:ext uri="{BB962C8B-B14F-4D97-AF65-F5344CB8AC3E}">
+        <p14:creationId xmlns:p14="http://schemas.microsoft.com/office/powerpoint/2010/main" val="2188512437"/>
+      </p:ext>
+    </p:extLst>
+  </p:cSld>
+  <p:clrMapOvr>
+    <a:masterClrMapping/>
+  </p:clrMapOvr>
+  <p:timing>
+    <p:tnLst>
+      <p:par>
+        <p:cTn id="1" dur="indefinite" restart="never" nodeType="tmRoot">
+          <p:childTnLst>
+            <p:seq concurrent="1" nextAc="seek">
+              <p:cTn id="2" dur="indefinite" nodeType="mainSeq">
+                <p:childTnLst>
+                  <p:par>
+                    <p:cTn id="3" fill="hold">
+                      <p:stCondLst>
+                        <p:cond delay="indefinite"/>
+                      </p:stCondLst>
+                      <p:childTnLst>
+                        <p:par>
+                          <p:cTn id="4" fill="hold">
+                            <p:stCondLst>
+                              <p:cond delay="0"/>
+                            </p:stCondLst>
+                            <p:childTnLst>
+                              <p:par>
+                                <p:cTn id="5" presetID="2" presetClass="entr" presetSubtype="4" fill="hold" grpId="0" nodeType="clickEffect">
+                                  <p:stCondLst>
+                                    <p:cond delay="0"/>
+                                  </p:stCondLst>
+                                  <p:childTnLst>
+                                    <p:set>
+                                      <p:cBhvr>
+                                        <p:cTn id="6" dur="1" fill="hold">
+                                          <p:stCondLst>
+                                            <p:cond delay="0"/>
+                                          </p:stCondLst>
+                                        </p:cTn>
+                                        <p:tgtEl>
+                                          <p:spTgt spid="3"/>
+                                        </p:tgtEl>
+                                        <p:attrNameLst>
+                                          <p:attrName>style.visibility</p:attrName>
+                                        </p:attrNameLst>
+                                      </p:cBhvr>
+                                      <p:to>
+                                        <p:strVal val="visible"/>
+                                      </p:to>
+                                    </p:set>
+                                    <p:anim calcmode="lin" valueType="num">
+                                      <p:cBhvr additive="base">
+                                        <p:cTn id="7" dur="500" fill="hold"/>
+                                        <p:tgtEl>
+                                          <p:spTgt spid="3"/>
+                                        </p:tgtEl>
+                                        <p:attrNameLst>
+                                          <p:attrName>ppt_x</p:attrName>
+                                        </p:attrNameLst>
+                                      </p:cBhvr>
+                                      <p:tavLst>
+                                        <p:tav tm="0">
+                                          <p:val>
+                                            <p:strVal val="#ppt_x"/>
+                                          </p:val>
+                                        </p:tav>
+                                        <p:tav tm="100000">
+                                          <p:val>
+                                            <p:strVal val="#ppt_x"/>
+                                          </p:val>
+                                        </p:tav>
+                                      </p:tavLst>
+                                    </p:anim>
+                                    <p:anim calcmode="lin" valueType="num">
+                                      <p:cBhvr additive="base">
+                                        <p:cTn id="8" dur="500" fill="hold"/>
+                                        <p:tgtEl>
+                                          <p:spTgt spid="3"/>
+                                        </p:tgtEl>
+                                        <p:attrNameLst>
+                                          <p:attrName>ppt_y</p:attrName>
+                                        </p:attrNameLst>
+                                      </p:cBhvr>
+                                      <p:tavLst>
+                                        <p:tav tm="0">
+                                          <p:val>
+                                            <p:strVal val="1+#ppt_h/2"/>
+                                          </p:val>
+                                        </p:tav>
+                                        <p:tav tm="100000">
+                                          <p:val>
+                                            <p:strVal val="#ppt_y"/>
+                                          </p:val>
+                                        </p:tav>
+                                      </p:tavLst>
+                                    </p:anim>
+                                  </p:childTnLst>
+                                </p:cTn>
+                              </p:par>
+                            </p:childTnLst>
+                          </p:cTn>
+                        </p:par>
+                      </p:childTnLst>
+                    </p:cTn>
+                  </p:par>
+                  <p:par>
+                    <p:cTn id="9" fill="hold">
+                      <p:stCondLst>
+                        <p:cond delay="indefinite"/>
+                      </p:stCondLst>
+                      <p:childTnLst>
+                        <p:par>
+                          <p:cTn id="10" fill="hold">
+                            <p:stCondLst>
+                              <p:cond delay="0"/>
+                            </p:stCondLst>
+                            <p:childTnLst>
+                              <p:par>
+                                <p:cTn id="11" presetID="1" presetClass="entr" presetSubtype="0" fill="hold" grpId="0" nodeType="clickEffect">
+                                  <p:stCondLst>
+                                    <p:cond delay="0"/>
+                                  </p:stCondLst>
+                                  <p:childTnLst>
+                                    <p:set>
+                                      <p:cBhvr>
+                                        <p:cTn id="12" dur="1" fill="hold">
+                                          <p:stCondLst>
+                                            <p:cond delay="0"/>
+                                          </p:stCondLst>
+                                        </p:cTn>
+                                        <p:tgtEl>
+                                          <p:spTgt spid="5"/>
+                                        </p:tgtEl>
+                                        <p:attrNameLst>
+                                          <p:attrName>style.visibility</p:attrName>
+                                        </p:attrNameLst>
+                                      </p:cBhvr>
+                                      <p:to>
+                                        <p:strVal val="visible"/>
+                                      </p:to>
+                                    </p:set>
+                                  </p:childTnLst>
+                                </p:cTn>
+                              </p:par>
+                            </p:childTnLst>
+                          </p:cTn>
+                        </p:par>
+                      </p:childTnLst>
+                    </p:cTn>
+                  </p:par>
+                  <p:par>
+                    <p:cTn id="13" fill="hold">
+                      <p:stCondLst>
+                        <p:cond delay="indefinite"/>
+                      </p:stCondLst>
+                      <p:childTnLst>
+                        <p:par>
+                          <p:cTn id="14" fill="hold">
+                            <p:stCondLst>
+                              <p:cond delay="0"/>
+                            </p:stCondLst>
+                            <p:childTnLst>
+                              <p:par>
+                                <p:cTn id="15" presetID="10" presetClass="entr" presetSubtype="0" fill="hold" grpId="0" nodeType="clickEffect">
+                                  <p:stCondLst>
+                                    <p:cond delay="0"/>
+                                  </p:stCondLst>
+                                  <p:childTnLst>
+                                    <p:set>
+                                      <p:cBhvr>
+                                        <p:cTn id="16" dur="1" fill="hold">
+                                          <p:stCondLst>
+                                            <p:cond delay="0"/>
+                                          </p:stCondLst>
+                                        </p:cTn>
+                                        <p:tgtEl>
+                                          <p:spTgt spid="7"/>
+                                        </p:tgtEl>
+                                        <p:attrNameLst>
+                                          <p:attrName>style.visibility</p:attrName>
+                                        </p:attrNameLst>
+                                      </p:cBhvr>
+                                      <p:to>
+                                        <p:strVal val="visible"/>
+                                      </p:to>
+                                    </p:set>
+                                    <p:animEffect transition="in" filter="fade">
+                                      <p:cBhvr>
+                                        <p:cTn id="17" dur="500"/>
+                                        <p:tgtEl>
+                                          <p:spTgt spid="7"/>
+                                        </p:tgtEl>
+                                      </p:cBhvr>
+                                    </p:animEffect>
+                                  </p:childTnLst>
+                                </p:cTn>
+                              </p:par>
+                            </p:childTnLst>
+                          </p:cTn>
+                        </p:par>
+                      </p:childTnLst>
+                    </p:cTn>
+                  </p:par>
+                  <p:par>
+                    <p:cTn id="18" fill="hold">
+                      <p:stCondLst>
+                        <p:cond delay="indefinite"/>
+                      </p:stCondLst>
+                      <p:childTnLst>
+                        <p:par>
+                          <p:cTn id="19" fill="hold">
+                            <p:stCondLst>
+                              <p:cond delay="0"/>
+                            </p:stCondLst>
+                            <p:childTnLst>
+                              <p:par>
+                                <p:cTn id="20" presetID="16" presetClass="entr" presetSubtype="21" fill="hold" grpId="0" nodeType="clickEffect">
+                                  <p:stCondLst>
+                                    <p:cond delay="0"/>
+                                  </p:stCondLst>
+                                  <p:childTnLst>
+                                    <p:set>
+                                      <p:cBhvr>
+                                        <p:cTn id="21" dur="1" fill="hold">
+                                          <p:stCondLst>
+                                            <p:cond delay="0"/>
+                                          </p:stCondLst>
+                                        </p:cTn>
+                                        <p:tgtEl>
+                                          <p:spTgt spid="8"/>
+                                        </p:tgtEl>
+                                        <p:attrNameLst>
+                                          <p:attrName>style.visibility</p:attrName>
+                                        </p:attrNameLst>
+                                      </p:cBhvr>
+                                      <p:to>
+                                        <p:strVal val="visible"/>
+                                      </p:to>
+                                    </p:set>
+                                    <p:animEffect transition="in" filter="barn(inVertical)">
+                                      <p:cBhvr>
+                                        <p:cTn id="22" dur="500"/>
+                                        <p:tgtEl>
+                                          <p:spTgt spid="8"/>
+                                        </p:tgtEl>
+                                      </p:cBhvr>
+                                    </p:animEffect>
+                                  </p:childTnLst>
+                                </p:cTn>
+                              </p:par>
+                            </p:childTnLst>
+                          </p:cTn>
+                        </p:par>
+                      </p:childTnLst>
+                    </p:cTn>
+                  </p:par>
+                </p:childTnLst>
+              </p:cTn>
+              <p:prevCondLst>
+                <p:cond evt="onPrev" delay="0">
+                  <p:tgtEl>
+                    <p:sldTgt/>
+                  </p:tgtEl>
+                </p:cond>
+              </p:prevCondLst>
+              <p:nextCondLst>
+                <p:cond evt="onNext" delay="0">
+                  <p:tgtEl>
+                    <p:sldTgt/>
+                  </p:tgtEl>
+                </p:cond>
+              </p:nextCondLst>
+            </p:seq>
+          </p:childTnLst>
+        </p:cTn>
+      </p:par>
+    </p:tnLst>
+    <p:bldLst>
+      <p:bldP spid="3" grpId="0" animBg="1"/>
+      <p:bldP spid="5" grpId="0" animBg="1"/>
+      <p:bldP spid="7" grpId="0" animBg="1"/>
+      <p:bldP spid="8" grpId="0" animBg="1"/>
+    </p:bldLst>
+  </p:timing>
+</p:sld>
+</file>
+
+<file path=ppt/slides/slide15.xml><?xml version="1.0" encoding="utf-8"?>
+<p:sld xmlns:a="http://schemas.openxmlformats.org/drawingml/2006/main" xmlns:r="http://schemas.openxmlformats.org/officeDocument/2006/relationships" xmlns:p="http://schemas.openxmlformats.org/presentationml/2006/main">
+  <p:cSld>
+    <p:spTree>
+      <p:nvGrpSpPr>
+        <p:cNvPr id="1" name=""/>
+        <p:cNvGrpSpPr/>
+        <p:nvPr/>
+      </p:nvGrpSpPr>
+      <p:grpSpPr>
+        <a:xfrm>
+          <a:off x="0" y="0"/>
+          <a:ext cx="0" cy="0"/>
+          <a:chOff x="0" y="0"/>
+          <a:chExt cx="0" cy="0"/>
+        </a:xfrm>
+      </p:grpSpPr>
+    </p:spTree>
+    <p:extLst>
+      <p:ext uri="{BB962C8B-B14F-4D97-AF65-F5344CB8AC3E}">
+        <p14:creationId xmlns:p14="http://schemas.microsoft.com/office/powerpoint/2010/main" val="1779079148"/>
+      </p:ext>
+    </p:extLst>
+  </p:cSld>
+  <p:clrMapOvr>
+    <a:masterClrMapping/>
+  </p:clrMapOvr>
+</p:sld>
+</file>
+
+<file path=ppt/slides/slide16.xml><?xml version="1.0" encoding="utf-8"?>
+<p:sld xmlns:a="http://schemas.openxmlformats.org/drawingml/2006/main" xmlns:r="http://schemas.openxmlformats.org/officeDocument/2006/relationships" xmlns:p="http://schemas.openxmlformats.org/presentationml/2006/main">
+  <p:cSld>
+    <p:spTree>
+      <p:nvGrpSpPr>
+        <p:cNvPr id="1" name=""/>
+        <p:cNvGrpSpPr/>
+        <p:nvPr/>
+      </p:nvGrpSpPr>
+      <p:grpSpPr>
+        <a:xfrm>
+          <a:off x="0" y="0"/>
+          <a:ext cx="0" cy="0"/>
+          <a:chOff x="0" y="0"/>
+          <a:chExt cx="0" cy="0"/>
+        </a:xfrm>
+      </p:grpSpPr>
+      <p:sp>
+        <p:nvSpPr>
+          <p:cNvPr id="6" name="Group selectMeNow1 Seq_1"/>
+          <p:cNvSpPr/>
+          <p:nvPr/>
+        </p:nvSpPr>
+        <p:spPr>
+          <a:xfrm rot="1965194">
+            <a:off x="1533377" y="1406276"/>
+            <a:ext cx="3200400" cy="3792071"/>
+          </a:xfrm>
+          <a:prstGeom prst="roundRect">
+            <a:avLst/>
+          </a:prstGeom>
+          <a:solidFill>
+            <a:schemeClr val="accent2">
+              <a:lumMod val="40000"/>
+              <a:lumOff val="60000"/>
+            </a:schemeClr>
+          </a:solidFill>
+          <a:ln w="203200">
+            <a:solidFill>
+              <a:srgbClr val="92D050"/>
+            </a:solidFill>
+          </a:ln>
+          <a:effectLst>
+            <a:innerShdw blurRad="63500" dist="50800" dir="8100000">
+              <a:prstClr val="black">
+                <a:alpha val="50000"/>
+              </a:prstClr>
+            </a:innerShdw>
+          </a:effectLst>
+        </p:spPr>
+        <p:style>
+          <a:lnRef idx="2">
+            <a:schemeClr val="accent1">
+              <a:shade val="50000"/>
+            </a:schemeClr>
+          </a:lnRef>
+          <a:fillRef idx="1">
+            <a:schemeClr val="accent1"/>
+          </a:fillRef>
+          <a:effectRef idx="0">
+            <a:schemeClr val="accent1"/>
+          </a:effectRef>
+          <a:fontRef idx="minor">
+            <a:schemeClr val="lt1"/>
+          </a:fontRef>
+        </p:style>
+        <p:txBody>
+          <a:bodyPr rtlCol="0" anchor="ctr"/>
+          <a:lstStyle/>
+          <a:p>
+            <a:pPr algn="ctr"/>
+            <a:r>
+              <a:rPr lang="en-US" altLang="zh-CN" sz="6600" dirty="0">
+                <a:solidFill>
+                  <a:srgbClr val="EB7561"/>
+                </a:solidFill>
+                <a:latin typeface="Times New Roman" panose="02020603050405020304" pitchFamily="18" charset="0"/>
+                <a:cs typeface="Times New Roman" panose="02020603050405020304" pitchFamily="18" charset="0"/>
+              </a:rPr>
+              <a:t>TEXT</a:t>
+            </a:r>
+            <a:endParaRPr lang="zh-CN" altLang="en-US" sz="6600" dirty="0">
+              <a:solidFill>
+                <a:srgbClr val="EB7561"/>
+              </a:solidFill>
+              <a:latin typeface="Times New Roman" panose="02020603050405020304" pitchFamily="18" charset="0"/>
+              <a:cs typeface="Times New Roman" panose="02020603050405020304" pitchFamily="18" charset="0"/>
+            </a:endParaRPr>
+          </a:p>
+        </p:txBody>
+      </p:sp>
+      <p:sp>
+        <p:nvSpPr>
+          <p:cNvPr id="9" name="Group selectMeNow1 Seq_2"/>
+          <p:cNvSpPr/>
+          <p:nvPr/>
+        </p:nvSpPr>
+        <p:spPr>
+          <a:xfrm>
+            <a:off x="5867400" y="1143000"/>
+            <a:ext cx="1828800" cy="1371600"/>
+          </a:xfrm>
+          <a:prstGeom prst="roundRect">
+            <a:avLst/>
+          </a:prstGeom>
+          <a:ln/>
+        </p:spPr>
+        <p:style>
+          <a:lnRef idx="3">
+            <a:schemeClr val="lt1"/>
+          </a:lnRef>
+          <a:fillRef idx="1">
+            <a:schemeClr val="accent6"/>
+          </a:fillRef>
+          <a:effectRef idx="1">
+            <a:schemeClr val="accent6"/>
+          </a:effectRef>
+          <a:fontRef idx="minor">
+            <a:schemeClr val="lt1"/>
+          </a:fontRef>
+        </p:style>
+        <p:txBody>
+          <a:bodyPr rtlCol="0" anchor="ctr"/>
+          <a:lstStyle/>
+          <a:p>
+            <a:pPr algn="ctr"/>
+            <a:endParaRPr lang="zh-CN" altLang="en-US"/>
+          </a:p>
+        </p:txBody>
+      </p:sp>
+      <p:sp>
+        <p:nvSpPr>
+          <p:cNvPr id="10" name="Group selectMeNow1 Seq_3"/>
+          <p:cNvSpPr/>
+          <p:nvPr/>
+        </p:nvSpPr>
+        <p:spPr>
+          <a:xfrm>
+            <a:off x="5867400" y="2667000"/>
+            <a:ext cx="1828800" cy="1371600"/>
+          </a:xfrm>
+          <a:prstGeom prst="roundRect">
+            <a:avLst/>
+          </a:prstGeom>
+          <a:ln/>
+        </p:spPr>
+        <p:style>
+          <a:lnRef idx="3">
+            <a:schemeClr val="lt1"/>
+          </a:lnRef>
+          <a:fillRef idx="1">
+            <a:schemeClr val="accent3"/>
+          </a:fillRef>
+          <a:effectRef idx="1">
+            <a:schemeClr val="accent3"/>
+          </a:effectRef>
+          <a:fontRef idx="minor">
+            <a:schemeClr val="lt1"/>
+          </a:fontRef>
+        </p:style>
+        <p:txBody>
+          <a:bodyPr rtlCol="0" anchor="ctr"/>
+          <a:lstStyle/>
+          <a:p>
+            <a:pPr algn="ctr"/>
+            <a:endParaRPr lang="zh-CN" altLang="en-US"/>
+          </a:p>
+        </p:txBody>
+      </p:sp>
+      <p:sp>
+        <p:nvSpPr>
+          <p:cNvPr id="11" name="Group selectMeNow1 Seq_4"/>
+          <p:cNvSpPr/>
+          <p:nvPr/>
+        </p:nvSpPr>
+        <p:spPr>
+          <a:xfrm>
+            <a:off x="5867400" y="4191000"/>
+            <a:ext cx="1828800" cy="1371600"/>
+          </a:xfrm>
+          <a:prstGeom prst="roundRect">
+            <a:avLst/>
+          </a:prstGeom>
+          <a:solidFill>
+            <a:schemeClr val="accent6">
+              <a:alpha val="50000"/>
+            </a:schemeClr>
+          </a:solidFill>
+          <a:ln>
+            <a:noFill/>
+          </a:ln>
+        </p:spPr>
+        <p:style>
+          <a:lnRef idx="0">
+            <a:scrgbClr r="0" g="0" b="0"/>
+          </a:lnRef>
+          <a:fillRef idx="0">
+            <a:scrgbClr r="0" g="0" b="0"/>
+          </a:fillRef>
+          <a:effectRef idx="0">
+            <a:scrgbClr r="0" g="0" b="0"/>
+          </a:effectRef>
+          <a:fontRef idx="minor">
+            <a:schemeClr val="lt1"/>
+          </a:fontRef>
+        </p:style>
+        <p:txBody>
+          <a:bodyPr rtlCol="0" anchor="ctr"/>
+          <a:lstStyle/>
+          <a:p>
+            <a:pPr algn="ctr"/>
+            <a:endParaRPr lang="zh-CN" altLang="en-US"/>
+          </a:p>
+        </p:txBody>
+      </p:sp>
+      <p:sp>
+        <p:nvSpPr>
+          <p:cNvPr id="7" name="copyMe"/>
+          <p:cNvSpPr/>
+          <p:nvPr/>
+        </p:nvSpPr>
+        <p:spPr>
+          <a:xfrm>
+            <a:off x="2438400" y="1206811"/>
+            <a:ext cx="4191000" cy="4191000"/>
+          </a:xfrm>
+          <a:prstGeom prst="heptagon">
+            <a:avLst/>
+          </a:prstGeom>
+        </p:spPr>
+        <p:style>
+          <a:lnRef idx="2">
+            <a:schemeClr val="accent1">
+              <a:shade val="50000"/>
+            </a:schemeClr>
+          </a:lnRef>
+          <a:fillRef idx="1">
+            <a:schemeClr val="accent1"/>
+          </a:fillRef>
+          <a:effectRef idx="0">
+            <a:schemeClr val="accent1"/>
+          </a:effectRef>
+          <a:fontRef idx="minor">
+            <a:schemeClr val="lt1"/>
+          </a:fontRef>
+        </p:style>
+        <p:txBody>
+          <a:bodyPr rtlCol="0" anchor="ctr"/>
+          <a:lstStyle/>
+          <a:p>
+            <a:pPr algn="ctr"/>
+            <a:endParaRPr lang="en-SG"/>
+          </a:p>
+        </p:txBody>
+      </p:sp>
       <p:sp>
         <p:nvSpPr>
           <p:cNvPr id="2" name="Expected"/>
@@ -13016,10 +13039,9 @@
           <a:lstStyle/>
           <a:p>
             <a:r>
-              <a:rPr lang="en-SG" dirty="0" smtClean="0"/>
+              <a:rPr lang="en-SG" dirty="0"/>
               <a:t>Expected slide</a:t>
             </a:r>
-            <a:endParaRPr lang="en-SG" dirty="0"/>
           </a:p>
         </p:txBody>
       </p:sp>
@@ -13354,7 +13376,7 @@
 </p:sld>
 </file>
 
-<file path=ppt/slides/slide16.xml><?xml version="1.0" encoding="utf-8"?>
+<file path=ppt/slides/slide17.xml><?xml version="1.0" encoding="utf-8"?>
 <p:sld xmlns:a="http://schemas.openxmlformats.org/drawingml/2006/main" xmlns:r="http://schemas.openxmlformats.org/officeDocument/2006/relationships" xmlns:p="http://schemas.openxmlformats.org/presentationml/2006/main" show="0">
   <p:cSld name="PPAck201403240026082737">
     <p:spTree>
@@ -13429,21 +13451,6 @@
   <p:clrMapOvr>
     <a:masterClrMapping/>
   </p:clrMapOvr>
-  <mc:AlternateContent xmlns:mc="http://schemas.openxmlformats.org/markup-compatibility/2006" xmlns:p14="http://schemas.microsoft.com/office/powerpoint/2010/main">
-    <mc:Choice Requires="p14">
-      <p:transition spd="slow" p14:dur="2000"/>
-    </mc:Choice>
-    <mc:Fallback xmlns="">
-      <p:transition spd="slow"/>
-    </mc:Fallback>
-  </mc:AlternateContent>
-  <p:timing>
-    <p:tnLst>
-      <p:par>
-        <p:cTn id="1" dur="indefinite" restart="never" nodeType="tmRoot"/>
-      </p:par>
-    </p:tnLst>
-  </p:timing>
 </p:sld>
 </file>
 
@@ -13498,7 +13505,7 @@
           <a:p>
             <a:pPr algn="l"/>
             <a:r>
-              <a:rPr lang="en-US" sz="7200" dirty="0" smtClean="0">
+              <a:rPr lang="en-US" sz="7200" dirty="0">
                 <a:solidFill>
                   <a:schemeClr val="bg1"/>
                 </a:solidFill>
@@ -13536,7 +13543,7 @@
           <a:lstStyle/>
           <a:p>
             <a:r>
-              <a:rPr lang="en-US" altLang="zh-CN" sz="2800" dirty="0" smtClean="0">
+              <a:rPr lang="en-US" altLang="zh-CN" sz="2800" dirty="0">
                 <a:solidFill>
                   <a:schemeClr val="bg1"/>
                 </a:solidFill>
@@ -13546,7 +13553,7 @@
           </a:p>
           <a:p>
             <a:r>
-              <a:rPr lang="en-US" altLang="zh-CN" sz="2800" dirty="0" smtClean="0">
+              <a:rPr lang="en-US" altLang="zh-CN" sz="2800" dirty="0">
                 <a:solidFill>
                   <a:schemeClr val="bg1"/>
                 </a:solidFill>
@@ -13556,7 +13563,7 @@
           </a:p>
           <a:p>
             <a:r>
-              <a:rPr lang="en-US" altLang="zh-CN" sz="2800" dirty="0" smtClean="0">
+              <a:rPr lang="en-US" altLang="zh-CN" sz="2800" dirty="0">
                 <a:solidFill>
                   <a:schemeClr val="bg1"/>
                 </a:solidFill>
@@ -13573,44 +13580,12 @@
           </a:p>
           <a:p>
             <a:r>
-              <a:rPr lang="en-US" altLang="zh-CN" sz="2800" dirty="0" smtClean="0">
-                <a:solidFill>
-                  <a:schemeClr val="bg1"/>
-                </a:solidFill>
-              </a:rPr>
-              <a:t>Repeat for testing </a:t>
-            </a:r>
-            <a:r>
               <a:rPr lang="en-US" altLang="zh-CN" sz="2800" dirty="0">
                 <a:solidFill>
                   <a:schemeClr val="bg1"/>
                 </a:solidFill>
               </a:rPr>
-              <a:t>A</a:t>
-            </a:r>
-            <a:r>
-              <a:rPr lang="en-US" altLang="zh-CN" sz="2800" dirty="0" smtClean="0">
-                <a:solidFill>
-                  <a:schemeClr val="bg1"/>
-                </a:solidFill>
-              </a:rPr>
-              <a:t>dd </a:t>
-            </a:r>
-            <a:r>
-              <a:rPr lang="en-US" altLang="zh-CN" sz="2800" dirty="0">
-                <a:solidFill>
-                  <a:schemeClr val="bg1"/>
-                </a:solidFill>
-              </a:rPr>
-              <a:t>S</a:t>
-            </a:r>
-            <a:r>
-              <a:rPr lang="en-US" altLang="zh-CN" sz="2800" dirty="0" smtClean="0">
-                <a:solidFill>
-                  <a:schemeClr val="bg1"/>
-                </a:solidFill>
-              </a:rPr>
-              <a:t>hapes button on Shapes Lab pane from slides 6 to 8</a:t>
+              <a:t>Repeat for testing Add Shapes button on Shapes Lab pane from slides 6 to 8</a:t>
             </a:r>
           </a:p>
           <a:p>
@@ -13622,7 +13597,7 @@
           </a:p>
           <a:p>
             <a:r>
-              <a:rPr lang="en-US" altLang="zh-CN" sz="2800" dirty="0" smtClean="0">
+              <a:rPr lang="en-US" altLang="zh-CN" sz="2800" dirty="0">
                 <a:solidFill>
                   <a:schemeClr val="bg1"/>
                 </a:solidFill>
@@ -13647,13 +13622,6 @@
   <p:clrMapOvr>
     <a:masterClrMapping/>
   </p:clrMapOvr>
-  <p:timing>
-    <p:tnLst>
-      <p:par>
-        <p:cTn id="1" dur="indefinite" restart="never" nodeType="tmRoot"/>
-      </p:par>
-    </p:tnLst>
-  </p:timing>
 </p:sld>
 </file>
 
@@ -13773,7 +13741,7 @@
           <a:p>
             <a:pPr algn="ctr"/>
             <a:r>
-              <a:rPr lang="en-US" altLang="zh-CN" sz="6600" dirty="0" smtClean="0">
+              <a:rPr lang="en-US" altLang="zh-CN" sz="6600" dirty="0">
                 <a:solidFill>
                   <a:srgbClr val="EB7561"/>
                 </a:solidFill>
@@ -14210,13 +14178,6 @@
   <p:clrMapOvr>
     <a:masterClrMapping/>
   </p:clrMapOvr>
-  <p:timing>
-    <p:tnLst>
-      <p:par>
-        <p:cTn id="1" dur="indefinite" restart="never" nodeType="tmRoot"/>
-      </p:par>
-    </p:tnLst>
-  </p:timing>
 </p:sld>
 </file>
 
@@ -14290,7 +14251,7 @@
           <a:p>
             <a:pPr algn="ctr"/>
             <a:r>
-              <a:rPr lang="en-US" altLang="zh-CN" sz="6600" dirty="0" smtClean="0">
+              <a:rPr lang="en-US" altLang="zh-CN" sz="6600" dirty="0">
                 <a:solidFill>
                   <a:srgbClr val="EB7561"/>
                 </a:solidFill>
@@ -14818,7 +14779,7 @@
           <a:p>
             <a:pPr algn="ctr"/>
             <a:r>
-              <a:rPr lang="en-US" altLang="zh-CN" sz="6600" dirty="0" smtClean="0">
+              <a:rPr lang="en-US" altLang="zh-CN" sz="6600" dirty="0">
                 <a:solidFill>
                   <a:srgbClr val="EB7561"/>
                 </a:solidFill>
@@ -15287,13 +15248,6 @@
   <p:clrMapOvr>
     <a:masterClrMapping/>
   </p:clrMapOvr>
-  <p:timing>
-    <p:tnLst>
-      <p:par>
-        <p:cTn id="1" dur="indefinite" restart="never" nodeType="tmRoot"/>
-      </p:par>
-    </p:tnLst>
-  </p:timing>
 </p:sld>
 </file>
 
@@ -15377,7 +15331,7 @@
           <a:p>
             <a:pPr algn="ctr"/>
             <a:r>
-              <a:rPr lang="en-US" altLang="zh-CN" sz="6600" dirty="0" smtClean="0">
+              <a:rPr lang="en-US" altLang="zh-CN" sz="6600" dirty="0">
                 <a:solidFill>
                   <a:srgbClr val="EB7561"/>
                 </a:solidFill>
@@ -15814,6 +15768,14 @@
 <file path=ppt/slides/slide9.xml><?xml version="1.0" encoding="utf-8"?>
 <p:sld xmlns:a="http://schemas.openxmlformats.org/drawingml/2006/main" xmlns:r="http://schemas.openxmlformats.org/officeDocument/2006/relationships" xmlns:p="http://schemas.openxmlformats.org/presentationml/2006/main">
   <p:cSld>
+    <p:bg>
+      <p:bgPr>
+        <a:solidFill>
+          <a:schemeClr val="bg1"/>
+        </a:solidFill>
+        <a:effectLst/>
+      </p:bgPr>
+    </p:bg>
     <p:spTree>
       <p:nvGrpSpPr>
         <p:cNvPr id="1" name=""/>
@@ -15830,184 +15792,117 @@
       </p:grpSpPr>
       <p:sp>
         <p:nvSpPr>
-          <p:cNvPr id="2" name="Title 1"/>
-          <p:cNvSpPr>
-            <a:spLocks noGrp="1"/>
-          </p:cNvSpPr>
-          <p:nvPr>
-            <p:ph type="title"/>
-          </p:nvPr>
+          <p:cNvPr id="5" name="Title 3">
+            <a:extLst>
+              <a:ext uri="{FF2B5EF4-FFF2-40B4-BE49-F238E27FC236}">
+                <a16:creationId xmlns:a16="http://schemas.microsoft.com/office/drawing/2014/main" id="{9C774B3F-C247-4CB9-AFF5-DDDFBDF5F455}"/>
+              </a:ext>
+            </a:extLst>
+          </p:cNvPr>
+          <p:cNvSpPr>
+            <a:spLocks noGrp="1"/>
+          </p:cNvSpPr>
+          <p:nvPr/>
         </p:nvSpPr>
         <p:spPr>
           <a:xfrm>
-            <a:off x="381000" y="609600"/>
-            <a:ext cx="8229600" cy="1143000"/>
-          </a:xfrm>
-        </p:spPr>
-        <p:txBody>
-          <a:bodyPr>
-            <a:noAutofit/>
-          </a:bodyPr>
-          <a:lstStyle/>
-          <a:p>
-            <a:pPr algn="l"/>
-            <a:r>
-              <a:rPr lang="en-US" sz="7200" dirty="0" err="1" smtClean="0">
-                <a:solidFill>
-                  <a:schemeClr val="bg1"/>
-                </a:solidFill>
-              </a:rPr>
-              <a:t>IsClipboardRestored</a:t>
-            </a:r>
-            <a:endParaRPr lang="en-SG" sz="7200" dirty="0">
-              <a:solidFill>
-                <a:schemeClr val="bg1"/>
-              </a:solidFill>
-            </a:endParaRPr>
-          </a:p>
-        </p:txBody>
-      </p:sp>
-      <p:sp>
-        <p:nvSpPr>
-          <p:cNvPr id="3" name="TextBox 2"/>
-          <p:cNvSpPr txBox="1"/>
-          <p:nvPr/>
-        </p:nvSpPr>
-        <p:spPr>
-          <a:xfrm>
-            <a:off x="381000" y="2057400"/>
-            <a:ext cx="8229600" cy="3539430"/>
+            <a:off x="685800" y="2693987"/>
+            <a:ext cx="7772400" cy="1470025"/>
           </a:xfrm>
           <a:prstGeom prst="rect">
             <a:avLst/>
           </a:prstGeom>
-          <a:noFill/>
         </p:spPr>
         <p:txBody>
-          <a:bodyPr wrap="square" rtlCol="0">
-            <a:spAutoFit/>
+          <a:bodyPr vert="horz" lIns="91440" tIns="45720" rIns="91440" bIns="45720" rtlCol="0" anchor="ctr">
+            <a:normAutofit/>
           </a:bodyPr>
-          <a:lstStyle/>
-          <a:p>
-            <a:r>
-              <a:rPr lang="en-US" altLang="zh-CN" sz="2800" dirty="0" smtClean="0">
+          <a:lstStyle>
+            <a:lvl1pPr algn="ctr" defTabSz="914400" rtl="0" eaLnBrk="1" latinLnBrk="0" hangingPunct="1">
+              <a:spcBef>
+                <a:spcPct val="0"/>
+              </a:spcBef>
+              <a:buNone/>
+              <a:defRPr sz="4400" kern="1200">
                 <a:solidFill>
-                  <a:schemeClr val="bg1"/>
+                  <a:schemeClr val="tx1"/>
                 </a:solidFill>
-              </a:rPr>
-              <a:t>Add those shapes in slide 3 to Shapes Lab;</a:t>
-            </a:r>
-          </a:p>
-          <a:p>
-            <a:r>
-              <a:rPr lang="en-US" altLang="zh-CN" sz="2800" dirty="0" smtClean="0">
-                <a:solidFill>
-                  <a:schemeClr val="bg1"/>
-                </a:solidFill>
-              </a:rPr>
-              <a:t>Add added shapes in Shapes Lab to slide 4;</a:t>
-            </a:r>
-          </a:p>
-          <a:p>
-            <a:r>
-              <a:rPr lang="en-US" altLang="zh-CN" sz="2800" dirty="0" smtClean="0">
-                <a:solidFill>
-                  <a:schemeClr val="bg1"/>
-                </a:solidFill>
-              </a:rPr>
-              <a:t>Compare slide 4 and expected slide 5</a:t>
-            </a:r>
-          </a:p>
-          <a:p>
-            <a:endParaRPr lang="en-US" altLang="zh-CN" sz="2800" dirty="0">
+                <a:latin typeface="+mj-lt"/>
+                <a:ea typeface="+mj-ea"/>
+                <a:cs typeface="+mj-cs"/>
+              </a:defRPr>
+            </a:lvl1pPr>
+          </a:lstStyle>
+          <a:p>
+            <a:pPr marL="0" marR="0" lvl="0" indent="0" algn="ctr" defTabSz="914400" rtl="0" eaLnBrk="1" fontAlgn="auto" latinLnBrk="0" hangingPunct="1">
+              <a:lnSpc>
+                <a:spcPct val="100000"/>
+              </a:lnSpc>
+              <a:spcBef>
+                <a:spcPct val="0"/>
+              </a:spcBef>
+              <a:spcAft>
+                <a:spcPts val="0"/>
+              </a:spcAft>
+              <a:buClrTx/>
+              <a:buSzTx/>
+              <a:buFontTx/>
+              <a:buNone/>
+              <a:tabLst/>
+              <a:defRPr/>
+            </a:pPr>
+            <a:endParaRPr kumimoji="0" lang="en-SG" sz="4400" b="0" i="0" u="none" strike="noStrike" kern="1200" cap="none" spc="0" normalizeH="0" baseline="0" noProof="0" dirty="0">
+              <a:ln>
+                <a:noFill/>
+              </a:ln>
               <a:solidFill>
-                <a:schemeClr val="bg1"/>
+                <a:srgbClr val="0070C0"/>
               </a:solidFill>
+              <a:effectLst/>
+              <a:uLnTx/>
+              <a:uFillTx/>
+              <a:latin typeface="Calibri"/>
+              <a:ea typeface="+mj-ea"/>
+              <a:cs typeface="+mj-cs"/>
             </a:endParaRPr>
           </a:p>
-          <a:p>
-            <a:r>
-              <a:rPr lang="en-US" altLang="zh-CN" sz="2800" dirty="0" smtClean="0">
-                <a:solidFill>
-                  <a:schemeClr val="bg1"/>
-                </a:solidFill>
-              </a:rPr>
-              <a:t>Repeat for testing </a:t>
-            </a:r>
-            <a:r>
-              <a:rPr lang="en-US" altLang="zh-CN" sz="2800" dirty="0">
-                <a:solidFill>
-                  <a:schemeClr val="bg1"/>
-                </a:solidFill>
-              </a:rPr>
-              <a:t>A</a:t>
-            </a:r>
-            <a:r>
-              <a:rPr lang="en-US" altLang="zh-CN" sz="2800" dirty="0" smtClean="0">
-                <a:solidFill>
-                  <a:schemeClr val="bg1"/>
-                </a:solidFill>
-              </a:rPr>
-              <a:t>dd </a:t>
-            </a:r>
-            <a:r>
-              <a:rPr lang="en-US" altLang="zh-CN" sz="2800" dirty="0">
-                <a:solidFill>
-                  <a:schemeClr val="bg1"/>
-                </a:solidFill>
-              </a:rPr>
-              <a:t>S</a:t>
-            </a:r>
-            <a:r>
-              <a:rPr lang="en-US" altLang="zh-CN" sz="2800" dirty="0" smtClean="0">
-                <a:solidFill>
-                  <a:schemeClr val="bg1"/>
-                </a:solidFill>
-              </a:rPr>
-              <a:t>hapes button on Shapes Lab pane from slides 6 to 8</a:t>
-            </a:r>
-          </a:p>
-          <a:p>
-            <a:endParaRPr lang="en-US" altLang="zh-CN" sz="2800" dirty="0">
-              <a:solidFill>
-                <a:schemeClr val="bg1"/>
-              </a:solidFill>
-            </a:endParaRPr>
-          </a:p>
-          <a:p>
-            <a:r>
-              <a:rPr lang="en-US" altLang="zh-CN" sz="2800" dirty="0" smtClean="0">
-                <a:solidFill>
-                  <a:schemeClr val="bg1"/>
-                </a:solidFill>
-              </a:rPr>
-              <a:t>Animations are also expected to be transferred</a:t>
-            </a:r>
-            <a:endParaRPr lang="zh-CN" altLang="en-US" sz="2800" dirty="0">
-              <a:solidFill>
-                <a:schemeClr val="bg1"/>
-              </a:solidFill>
-            </a:endParaRPr>
+        </p:txBody>
+      </p:sp>
+      <p:sp>
+        <p:nvSpPr>
+          <p:cNvPr id="2" name="Placeholder">
+            <a:extLst>
+              <a:ext uri="{FF2B5EF4-FFF2-40B4-BE49-F238E27FC236}">
+                <a16:creationId xmlns:a16="http://schemas.microsoft.com/office/drawing/2014/main" id="{DECD9BCB-1985-4800-9315-97DF8FF441B0}"/>
+              </a:ext>
+            </a:extLst>
+          </p:cNvPr>
+          <p:cNvSpPr>
+            <a:spLocks noGrp="1"/>
+          </p:cNvSpPr>
+          <p:nvPr>
+            <p:ph type="title"/>
+          </p:nvPr>
+        </p:nvSpPr>
+        <p:spPr/>
+        <p:txBody>
+          <a:bodyPr/>
+          <a:lstStyle/>
+          <a:p>
+            <a:endParaRPr lang="en-US" dirty="0"/>
           </a:p>
         </p:txBody>
       </p:sp>
     </p:spTree>
     <p:extLst>
       <p:ext uri="{BB962C8B-B14F-4D97-AF65-F5344CB8AC3E}">
-        <p14:creationId xmlns:p14="http://schemas.microsoft.com/office/powerpoint/2010/main" val="3646993363"/>
+        <p14:creationId xmlns:p14="http://schemas.microsoft.com/office/powerpoint/2010/main" val="606476009"/>
       </p:ext>
     </p:extLst>
   </p:cSld>
   <p:clrMapOvr>
     <a:masterClrMapping/>
   </p:clrMapOvr>
-  <p:timing>
-    <p:tnLst>
-      <p:par>
-        <p:cTn id="1" dur="indefinite" restart="never" nodeType="tmRoot"/>
-      </p:par>
-    </p:tnLst>
-  </p:timing>
 </p:sld>
 </file>
 

</xml_diff>

<commit_message>
Add description in ShapesLab FT slides.
</commit_message>
<xml_diff>
--- a/doc/test/ShapesLab/ShapesLab.pptx
+++ b/doc/test/ShapesLab/ShapesLab.pptx
@@ -255,7 +255,7 @@
           <a:p>
             <a:fld id="{26004F41-C1A1-4B0D-9EEE-5E3F0E5BC108}" type="datetimeFigureOut">
               <a:rPr lang="en-SG" smtClean="0"/>
-              <a:t>22/1/2019</a:t>
+              <a:t>27/1/2019</a:t>
             </a:fld>
             <a:endParaRPr lang="en-SG"/>
           </a:p>
@@ -1914,7 +1914,7 @@
           <a:p>
             <a:fld id="{699DC775-C286-4358-8C92-D7E584E969B3}" type="datetimeFigureOut">
               <a:rPr lang="en-US" smtClean="0"/>
-              <a:t>1/22/2019</a:t>
+              <a:t>1/27/2019</a:t>
             </a:fld>
             <a:endParaRPr lang="en-US"/>
           </a:p>
@@ -2082,7 +2082,7 @@
           <a:p>
             <a:fld id="{699DC775-C286-4358-8C92-D7E584E969B3}" type="datetimeFigureOut">
               <a:rPr lang="en-US" smtClean="0"/>
-              <a:t>1/22/2019</a:t>
+              <a:t>1/27/2019</a:t>
             </a:fld>
             <a:endParaRPr lang="en-US"/>
           </a:p>
@@ -2260,7 +2260,7 @@
           <a:p>
             <a:fld id="{699DC775-C286-4358-8C92-D7E584E969B3}" type="datetimeFigureOut">
               <a:rPr lang="en-US" smtClean="0"/>
-              <a:t>1/22/2019</a:t>
+              <a:t>1/27/2019</a:t>
             </a:fld>
             <a:endParaRPr lang="en-US"/>
           </a:p>
@@ -2500,7 +2500,7 @@
           <a:p>
             <a:fld id="{699DC775-C286-4358-8C92-D7E584E969B3}" type="datetimeFigureOut">
               <a:rPr lang="en-US" smtClean="0"/>
-              <a:t>1/22/2019</a:t>
+              <a:t>1/27/2019</a:t>
             </a:fld>
             <a:endParaRPr lang="en-US"/>
           </a:p>
@@ -2668,7 +2668,7 @@
           <a:p>
             <a:fld id="{699DC775-C286-4358-8C92-D7E584E969B3}" type="datetimeFigureOut">
               <a:rPr lang="en-US" smtClean="0"/>
-              <a:t>1/22/2019</a:t>
+              <a:t>1/27/2019</a:t>
             </a:fld>
             <a:endParaRPr lang="en-US"/>
           </a:p>
@@ -2913,7 +2913,7 @@
           <a:p>
             <a:fld id="{699DC775-C286-4358-8C92-D7E584E969B3}" type="datetimeFigureOut">
               <a:rPr lang="en-US" smtClean="0"/>
-              <a:t>1/22/2019</a:t>
+              <a:t>1/27/2019</a:t>
             </a:fld>
             <a:endParaRPr lang="en-US"/>
           </a:p>
@@ -3198,7 +3198,7 @@
           <a:p>
             <a:fld id="{699DC775-C286-4358-8C92-D7E584E969B3}" type="datetimeFigureOut">
               <a:rPr lang="en-US" smtClean="0"/>
-              <a:t>1/22/2019</a:t>
+              <a:t>1/27/2019</a:t>
             </a:fld>
             <a:endParaRPr lang="en-US"/>
           </a:p>
@@ -3617,7 +3617,7 @@
           <a:p>
             <a:fld id="{699DC775-C286-4358-8C92-D7E584E969B3}" type="datetimeFigureOut">
               <a:rPr lang="en-US" smtClean="0"/>
-              <a:t>1/22/2019</a:t>
+              <a:t>1/27/2019</a:t>
             </a:fld>
             <a:endParaRPr lang="en-US"/>
           </a:p>
@@ -3734,7 +3734,7 @@
           <a:p>
             <a:fld id="{699DC775-C286-4358-8C92-D7E584E969B3}" type="datetimeFigureOut">
               <a:rPr lang="en-US" smtClean="0"/>
-              <a:t>1/22/2019</a:t>
+              <a:t>1/27/2019</a:t>
             </a:fld>
             <a:endParaRPr lang="en-US"/>
           </a:p>
@@ -3829,7 +3829,7 @@
           <a:p>
             <a:fld id="{699DC775-C286-4358-8C92-D7E584E969B3}" type="datetimeFigureOut">
               <a:rPr lang="en-US" smtClean="0"/>
-              <a:t>1/22/2019</a:t>
+              <a:t>1/27/2019</a:t>
             </a:fld>
             <a:endParaRPr lang="en-US"/>
           </a:p>
@@ -4104,7 +4104,7 @@
           <a:p>
             <a:fld id="{699DC775-C286-4358-8C92-D7E584E969B3}" type="datetimeFigureOut">
               <a:rPr lang="en-US" smtClean="0"/>
-              <a:t>1/22/2019</a:t>
+              <a:t>1/27/2019</a:t>
             </a:fld>
             <a:endParaRPr lang="en-US"/>
           </a:p>
@@ -4272,7 +4272,7 @@
           <a:p>
             <a:fld id="{699DC775-C286-4358-8C92-D7E584E969B3}" type="datetimeFigureOut">
               <a:rPr lang="en-US" smtClean="0"/>
-              <a:t>1/22/2019</a:t>
+              <a:t>1/27/2019</a:t>
             </a:fld>
             <a:endParaRPr lang="en-US"/>
           </a:p>
@@ -4524,7 +4524,7 @@
           <a:p>
             <a:fld id="{699DC775-C286-4358-8C92-D7E584E969B3}" type="datetimeFigureOut">
               <a:rPr lang="en-US" smtClean="0"/>
-              <a:t>1/22/2019</a:t>
+              <a:t>1/27/2019</a:t>
             </a:fld>
             <a:endParaRPr lang="en-US"/>
           </a:p>
@@ -4692,7 +4692,7 @@
           <a:p>
             <a:fld id="{699DC775-C286-4358-8C92-D7E584E969B3}" type="datetimeFigureOut">
               <a:rPr lang="en-US" smtClean="0"/>
-              <a:t>1/22/2019</a:t>
+              <a:t>1/27/2019</a:t>
             </a:fld>
             <a:endParaRPr lang="en-US"/>
           </a:p>
@@ -4870,7 +4870,7 @@
           <a:p>
             <a:fld id="{699DC775-C286-4358-8C92-D7E584E969B3}" type="datetimeFigureOut">
               <a:rPr lang="en-US" smtClean="0"/>
-              <a:t>1/22/2019</a:t>
+              <a:t>1/27/2019</a:t>
             </a:fld>
             <a:endParaRPr lang="en-US"/>
           </a:p>
@@ -5118,7 +5118,7 @@
           <a:p>
             <a:fld id="{699DC775-C286-4358-8C92-D7E584E969B3}" type="datetimeFigureOut">
               <a:rPr lang="en-US" smtClean="0"/>
-              <a:t>1/22/2019</a:t>
+              <a:t>1/27/2019</a:t>
             </a:fld>
             <a:endParaRPr lang="en-US"/>
           </a:p>
@@ -5294,7 +5294,7 @@
           <a:p>
             <a:fld id="{699DC775-C286-4358-8C92-D7E584E969B3}" type="datetimeFigureOut">
               <a:rPr lang="en-US" smtClean="0"/>
-              <a:t>1/22/2019</a:t>
+              <a:t>1/27/2019</a:t>
             </a:fld>
             <a:endParaRPr lang="en-US"/>
           </a:p>
@@ -5547,7 +5547,7 @@
           <a:p>
             <a:fld id="{699DC775-C286-4358-8C92-D7E584E969B3}" type="datetimeFigureOut">
               <a:rPr lang="en-US" smtClean="0"/>
-              <a:t>1/22/2019</a:t>
+              <a:t>1/27/2019</a:t>
             </a:fld>
             <a:endParaRPr lang="en-US"/>
           </a:p>
@@ -5840,7 +5840,7 @@
           <a:p>
             <a:fld id="{699DC775-C286-4358-8C92-D7E584E969B3}" type="datetimeFigureOut">
               <a:rPr lang="en-US" smtClean="0"/>
-              <a:t>1/22/2019</a:t>
+              <a:t>1/27/2019</a:t>
             </a:fld>
             <a:endParaRPr lang="en-US"/>
           </a:p>
@@ -6267,7 +6267,7 @@
           <a:p>
             <a:fld id="{699DC775-C286-4358-8C92-D7E584E969B3}" type="datetimeFigureOut">
               <a:rPr lang="en-US" smtClean="0"/>
-              <a:t>1/22/2019</a:t>
+              <a:t>1/27/2019</a:t>
             </a:fld>
             <a:endParaRPr lang="en-US"/>
           </a:p>
@@ -6392,7 +6392,7 @@
           <a:p>
             <a:fld id="{699DC775-C286-4358-8C92-D7E584E969B3}" type="datetimeFigureOut">
               <a:rPr lang="en-US" smtClean="0"/>
-              <a:t>1/22/2019</a:t>
+              <a:t>1/27/2019</a:t>
             </a:fld>
             <a:endParaRPr lang="en-US"/>
           </a:p>
@@ -6495,7 +6495,7 @@
           <a:p>
             <a:fld id="{699DC775-C286-4358-8C92-D7E584E969B3}" type="datetimeFigureOut">
               <a:rPr lang="en-US" smtClean="0"/>
-              <a:t>1/22/2019</a:t>
+              <a:t>1/27/2019</a:t>
             </a:fld>
             <a:endParaRPr lang="en-US"/>
           </a:p>
@@ -6740,7 +6740,7 @@
           <a:p>
             <a:fld id="{699DC775-C286-4358-8C92-D7E584E969B3}" type="datetimeFigureOut">
               <a:rPr lang="en-US" smtClean="0"/>
-              <a:t>1/22/2019</a:t>
+              <a:t>1/27/2019</a:t>
             </a:fld>
             <a:endParaRPr lang="en-US"/>
           </a:p>
@@ -7023,7 +7023,7 @@
           <a:p>
             <a:fld id="{699DC775-C286-4358-8C92-D7E584E969B3}" type="datetimeFigureOut">
               <a:rPr lang="en-US" smtClean="0"/>
-              <a:t>1/22/2019</a:t>
+              <a:t>1/27/2019</a:t>
             </a:fld>
             <a:endParaRPr lang="en-US"/>
           </a:p>
@@ -7283,7 +7283,7 @@
           <a:p>
             <a:fld id="{699DC775-C286-4358-8C92-D7E584E969B3}" type="datetimeFigureOut">
               <a:rPr lang="en-US" smtClean="0"/>
-              <a:t>1/22/2019</a:t>
+              <a:t>1/27/2019</a:t>
             </a:fld>
             <a:endParaRPr lang="en-US"/>
           </a:p>
@@ -7459,7 +7459,7 @@
           <a:p>
             <a:fld id="{699DC775-C286-4358-8C92-D7E584E969B3}" type="datetimeFigureOut">
               <a:rPr lang="en-US" smtClean="0"/>
-              <a:t>1/22/2019</a:t>
+              <a:t>1/27/2019</a:t>
             </a:fld>
             <a:endParaRPr lang="en-US"/>
           </a:p>
@@ -7645,7 +7645,7 @@
           <a:p>
             <a:fld id="{699DC775-C286-4358-8C92-D7E584E969B3}" type="datetimeFigureOut">
               <a:rPr lang="en-US" smtClean="0"/>
-              <a:t>1/22/2019</a:t>
+              <a:t>1/27/2019</a:t>
             </a:fld>
             <a:endParaRPr lang="en-US"/>
           </a:p>
@@ -7930,7 +7930,7 @@
           <a:p>
             <a:fld id="{699DC775-C286-4358-8C92-D7E584E969B3}" type="datetimeFigureOut">
               <a:rPr lang="en-US" smtClean="0"/>
-              <a:t>1/22/2019</a:t>
+              <a:t>1/27/2019</a:t>
             </a:fld>
             <a:endParaRPr lang="en-US"/>
           </a:p>
@@ -8349,7 +8349,7 @@
           <a:p>
             <a:fld id="{699DC775-C286-4358-8C92-D7E584E969B3}" type="datetimeFigureOut">
               <a:rPr lang="en-US" smtClean="0"/>
-              <a:t>1/22/2019</a:t>
+              <a:t>1/27/2019</a:t>
             </a:fld>
             <a:endParaRPr lang="en-US"/>
           </a:p>
@@ -8466,7 +8466,7 @@
           <a:p>
             <a:fld id="{699DC775-C286-4358-8C92-D7E584E969B3}" type="datetimeFigureOut">
               <a:rPr lang="en-US" smtClean="0"/>
-              <a:t>1/22/2019</a:t>
+              <a:t>1/27/2019</a:t>
             </a:fld>
             <a:endParaRPr lang="en-US"/>
           </a:p>
@@ -8561,7 +8561,7 @@
           <a:p>
             <a:fld id="{699DC775-C286-4358-8C92-D7E584E969B3}" type="datetimeFigureOut">
               <a:rPr lang="en-US" smtClean="0"/>
-              <a:t>1/22/2019</a:t>
+              <a:t>1/27/2019</a:t>
             </a:fld>
             <a:endParaRPr lang="en-US"/>
           </a:p>
@@ -8836,7 +8836,7 @@
           <a:p>
             <a:fld id="{699DC775-C286-4358-8C92-D7E584E969B3}" type="datetimeFigureOut">
               <a:rPr lang="en-US" smtClean="0"/>
-              <a:t>1/22/2019</a:t>
+              <a:t>1/27/2019</a:t>
             </a:fld>
             <a:endParaRPr lang="en-US"/>
           </a:p>
@@ -9088,7 +9088,7 @@
           <a:p>
             <a:fld id="{699DC775-C286-4358-8C92-D7E584E969B3}" type="datetimeFigureOut">
               <a:rPr lang="en-US" smtClean="0"/>
-              <a:t>1/22/2019</a:t>
+              <a:t>1/27/2019</a:t>
             </a:fld>
             <a:endParaRPr lang="en-US"/>
           </a:p>
@@ -9299,7 +9299,7 @@
           <a:p>
             <a:fld id="{699DC775-C286-4358-8C92-D7E584E969B3}" type="datetimeFigureOut">
               <a:rPr lang="en-US" smtClean="0"/>
-              <a:t>1/22/2019</a:t>
+              <a:t>1/27/2019</a:t>
             </a:fld>
             <a:endParaRPr lang="en-US"/>
           </a:p>
@@ -9812,7 +9812,7 @@
           <a:p>
             <a:fld id="{699DC775-C286-4358-8C92-D7E584E969B3}" type="datetimeFigureOut">
               <a:rPr lang="en-US" smtClean="0"/>
-              <a:t>1/22/2019</a:t>
+              <a:t>1/27/2019</a:t>
             </a:fld>
             <a:endParaRPr lang="en-US"/>
           </a:p>
@@ -10323,7 +10323,7 @@
           <a:p>
             <a:fld id="{699DC775-C286-4358-8C92-D7E584E969B3}" type="datetimeFigureOut">
               <a:rPr lang="en-US" smtClean="0"/>
-              <a:t>1/22/2019</a:t>
+              <a:t>1/27/2019</a:t>
             </a:fld>
             <a:endParaRPr lang="en-US"/>
           </a:p>
@@ -13528,8 +13528,8 @@
         </p:nvSpPr>
         <p:spPr>
           <a:xfrm>
-            <a:off x="381000" y="2057400"/>
-            <a:ext cx="8229600" cy="3539430"/>
+            <a:off x="381000" y="1905000"/>
+            <a:ext cx="8229600" cy="4832092"/>
           </a:xfrm>
           <a:prstGeom prst="rect">
             <a:avLst/>
@@ -13604,11 +13604,23 @@
               </a:rPr>
               <a:t>Animations are also expected to be transferred</a:t>
             </a:r>
-            <a:endParaRPr lang="zh-CN" altLang="en-US" sz="2800" dirty="0">
+          </a:p>
+          <a:p>
+            <a:endParaRPr lang="en-US" altLang="zh-CN" sz="2800" dirty="0">
               <a:solidFill>
                 <a:schemeClr val="bg1"/>
               </a:solidFill>
             </a:endParaRPr>
+          </a:p>
+          <a:p>
+            <a:r>
+              <a:rPr lang="en-US" altLang="zh-CN" sz="2800" dirty="0">
+                <a:solidFill>
+                  <a:schemeClr val="bg1"/>
+                </a:solidFill>
+              </a:rPr>
+              <a:t>Tests that error appear when adding placeholders on slide 9</a:t>
+            </a:r>
           </a:p>
         </p:txBody>
       </p:sp>
@@ -15790,84 +15802,6 @@
           <a:chExt cx="0" cy="0"/>
         </a:xfrm>
       </p:grpSpPr>
-      <p:sp>
-        <p:nvSpPr>
-          <p:cNvPr id="5" name="Title 3">
-            <a:extLst>
-              <a:ext uri="{FF2B5EF4-FFF2-40B4-BE49-F238E27FC236}">
-                <a16:creationId xmlns:a16="http://schemas.microsoft.com/office/drawing/2014/main" id="{9C774B3F-C247-4CB9-AFF5-DDDFBDF5F455}"/>
-              </a:ext>
-            </a:extLst>
-          </p:cNvPr>
-          <p:cNvSpPr>
-            <a:spLocks noGrp="1"/>
-          </p:cNvSpPr>
-          <p:nvPr/>
-        </p:nvSpPr>
-        <p:spPr>
-          <a:xfrm>
-            <a:off x="685800" y="2693987"/>
-            <a:ext cx="7772400" cy="1470025"/>
-          </a:xfrm>
-          <a:prstGeom prst="rect">
-            <a:avLst/>
-          </a:prstGeom>
-        </p:spPr>
-        <p:txBody>
-          <a:bodyPr vert="horz" lIns="91440" tIns="45720" rIns="91440" bIns="45720" rtlCol="0" anchor="ctr">
-            <a:normAutofit/>
-          </a:bodyPr>
-          <a:lstStyle>
-            <a:lvl1pPr algn="ctr" defTabSz="914400" rtl="0" eaLnBrk="1" latinLnBrk="0" hangingPunct="1">
-              <a:spcBef>
-                <a:spcPct val="0"/>
-              </a:spcBef>
-              <a:buNone/>
-              <a:defRPr sz="4400" kern="1200">
-                <a:solidFill>
-                  <a:schemeClr val="tx1"/>
-                </a:solidFill>
-                <a:latin typeface="+mj-lt"/>
-                <a:ea typeface="+mj-ea"/>
-                <a:cs typeface="+mj-cs"/>
-              </a:defRPr>
-            </a:lvl1pPr>
-          </a:lstStyle>
-          <a:p>
-            <a:pPr marL="0" marR="0" lvl="0" indent="0" algn="ctr" defTabSz="914400" rtl="0" eaLnBrk="1" fontAlgn="auto" latinLnBrk="0" hangingPunct="1">
-              <a:lnSpc>
-                <a:spcPct val="100000"/>
-              </a:lnSpc>
-              <a:spcBef>
-                <a:spcPct val="0"/>
-              </a:spcBef>
-              <a:spcAft>
-                <a:spcPts val="0"/>
-              </a:spcAft>
-              <a:buClrTx/>
-              <a:buSzTx/>
-              <a:buFontTx/>
-              <a:buNone/>
-              <a:tabLst/>
-              <a:defRPr/>
-            </a:pPr>
-            <a:endParaRPr kumimoji="0" lang="en-SG" sz="4400" b="0" i="0" u="none" strike="noStrike" kern="1200" cap="none" spc="0" normalizeH="0" baseline="0" noProof="0" dirty="0">
-              <a:ln>
-                <a:noFill/>
-              </a:ln>
-              <a:solidFill>
-                <a:srgbClr val="0070C0"/>
-              </a:solidFill>
-              <a:effectLst/>
-              <a:uLnTx/>
-              <a:uFillTx/>
-              <a:latin typeface="Calibri"/>
-              <a:ea typeface="+mj-ea"/>
-              <a:cs typeface="+mj-cs"/>
-            </a:endParaRPr>
-          </a:p>
-        </p:txBody>
-      </p:sp>
       <p:sp>
         <p:nvSpPr>
           <p:cNvPr id="2" name="Placeholder">

</xml_diff>

<commit_message>
Add ShapesLabFT for error dialog.
</commit_message>
<xml_diff>
--- a/doc/test/ShapesLab/ShapesLab.pptx
+++ b/doc/test/ShapesLab/ShapesLab.pptx
@@ -7,7 +7,7 @@
     <p:sldMasterId id="2147483672" r:id="rId3"/>
   </p:sldMasterIdLst>
   <p:notesMasterIdLst>
-    <p:notesMasterId r:id="rId20"/>
+    <p:notesMasterId r:id="rId21"/>
   </p:notesMasterIdLst>
   <p:sldIdLst>
     <p:sldId id="287" r:id="rId4"/>
@@ -18,14 +18,15 @@
     <p:sldId id="300" r:id="rId9"/>
     <p:sldId id="301" r:id="rId10"/>
     <p:sldId id="302" r:id="rId11"/>
-    <p:sldId id="303" r:id="rId12"/>
-    <p:sldId id="304" r:id="rId13"/>
-    <p:sldId id="305" r:id="rId14"/>
-    <p:sldId id="306" r:id="rId15"/>
-    <p:sldId id="307" r:id="rId16"/>
-    <p:sldId id="308" r:id="rId17"/>
-    <p:sldId id="309" r:id="rId18"/>
-    <p:sldId id="274" r:id="rId19"/>
+    <p:sldId id="311" r:id="rId12"/>
+    <p:sldId id="303" r:id="rId13"/>
+    <p:sldId id="304" r:id="rId14"/>
+    <p:sldId id="305" r:id="rId15"/>
+    <p:sldId id="306" r:id="rId16"/>
+    <p:sldId id="307" r:id="rId17"/>
+    <p:sldId id="308" r:id="rId18"/>
+    <p:sldId id="309" r:id="rId19"/>
+    <p:sldId id="274" r:id="rId20"/>
   </p:sldIdLst>
   <p:sldSz cx="9144000" cy="6858000" type="screen4x3"/>
   <p:notesSz cx="6858000" cy="9144000"/>
@@ -141,6 +142,7 @@
             <p14:sldId id="300"/>
             <p14:sldId id="301"/>
             <p14:sldId id="302"/>
+            <p14:sldId id="311"/>
             <p14:sldId id="303"/>
             <p14:sldId id="304"/>
             <p14:sldId id="305"/>
@@ -253,7 +255,7 @@
           <a:p>
             <a:fld id="{26004F41-C1A1-4B0D-9EEE-5E3F0E5BC108}" type="datetimeFigureOut">
               <a:rPr lang="en-SG" smtClean="0"/>
-              <a:t>10/4/2018</a:t>
+              <a:t>27/1/2019</a:t>
             </a:fld>
             <a:endParaRPr lang="en-SG"/>
           </a:p>
@@ -317,35 +319,35 @@
           <a:p>
             <a:pPr lvl="0"/>
             <a:r>
-              <a:rPr lang="zh-CN" altLang="en-US" smtClean="0"/>
+              <a:rPr lang="zh-CN" altLang="en-US"/>
               <a:t>单击此处编辑母版文本样式</a:t>
             </a:r>
           </a:p>
           <a:p>
             <a:pPr lvl="1"/>
             <a:r>
-              <a:rPr lang="zh-CN" altLang="en-US" smtClean="0"/>
+              <a:rPr lang="zh-CN" altLang="en-US"/>
               <a:t>第二级</a:t>
             </a:r>
           </a:p>
           <a:p>
             <a:pPr lvl="2"/>
             <a:r>
-              <a:rPr lang="zh-CN" altLang="en-US" smtClean="0"/>
+              <a:rPr lang="zh-CN" altLang="en-US"/>
               <a:t>第三级</a:t>
             </a:r>
           </a:p>
           <a:p>
             <a:pPr lvl="3"/>
             <a:r>
-              <a:rPr lang="zh-CN" altLang="en-US" smtClean="0"/>
+              <a:rPr lang="zh-CN" altLang="en-US"/>
               <a:t>第四级</a:t>
             </a:r>
           </a:p>
           <a:p>
             <a:pPr lvl="4"/>
             <a:r>
-              <a:rPr lang="zh-CN" altLang="en-US" smtClean="0"/>
+              <a:rPr lang="zh-CN" altLang="en-US"/>
               <a:t>第五级</a:t>
             </a:r>
             <a:endParaRPr lang="en-SG"/>
@@ -566,185 +568,184 @@
           <a:lstStyle/>
           <a:p>
             <a:r>
-              <a:rPr lang="en-US" dirty="0" smtClean="0"/>
+              <a:rPr lang="en-US" dirty="0"/>
               <a:t>Do the following from 3 environments:</a:t>
             </a:r>
           </a:p>
           <a:p>
             <a:r>
-              <a:rPr lang="en-US" dirty="0" smtClean="0"/>
+              <a:rPr lang="en-US" dirty="0"/>
               <a:t>1. Entirely new environment</a:t>
             </a:r>
           </a:p>
           <a:p>
             <a:r>
-              <a:rPr lang="en-US" dirty="0" smtClean="0"/>
+              <a:rPr lang="en-US" dirty="0"/>
               <a:t>2. Contains old shape info</a:t>
             </a:r>
           </a:p>
           <a:p>
-            <a:endParaRPr lang="en-US" dirty="0" smtClean="0"/>
-          </a:p>
-          <a:p>
-            <a:r>
-              <a:rPr lang="en-US" dirty="0" smtClean="0"/>
+            <a:endParaRPr lang="en-US" dirty="0"/>
+          </a:p>
+          <a:p>
+            <a:r>
+              <a:rPr lang="en-US" dirty="0"/>
               <a:t>1. Add Category</a:t>
             </a:r>
           </a:p>
           <a:p>
             <a:r>
-              <a:rPr lang="en-US" dirty="0" smtClean="0"/>
+              <a:rPr lang="en-US" dirty="0"/>
               <a:t>	1.1 Add category then add a new shape inside, check the default name, close and open to check</a:t>
             </a:r>
           </a:p>
           <a:p>
             <a:r>
-              <a:rPr lang="en-US" dirty="0" smtClean="0"/>
+              <a:rPr lang="en-US" dirty="0"/>
               <a:t>	1.2 Add category then add a new shape inside, check the default name, set the category as default, close and open to check</a:t>
             </a:r>
           </a:p>
           <a:p>
             <a:r>
-              <a:rPr lang="en-US" dirty="0" smtClean="0"/>
+              <a:rPr lang="en-US" dirty="0"/>
               <a:t>2. Rename Category</a:t>
             </a:r>
           </a:p>
           <a:p>
             <a:r>
-              <a:rPr lang="en-US" dirty="0" smtClean="0"/>
+              <a:rPr lang="en-US" dirty="0"/>
               <a:t>	2.1 Rename to a valid name</a:t>
             </a:r>
           </a:p>
           <a:p>
             <a:r>
-              <a:rPr lang="en-US" dirty="0" smtClean="0"/>
+              <a:rPr lang="en-US" dirty="0"/>
               <a:t>	2.2 Rename to an </a:t>
             </a:r>
             <a:r>
-              <a:rPr lang="en-US" dirty="0" err="1" smtClean="0"/>
+              <a:rPr lang="en-US" dirty="0" err="1"/>
               <a:t>invaid</a:t>
             </a:r>
             <a:r>
-              <a:rPr lang="en-US" dirty="0" smtClean="0"/>
+              <a:rPr lang="en-US" dirty="0"/>
               <a:t> name</a:t>
             </a:r>
           </a:p>
           <a:p>
             <a:r>
-              <a:rPr lang="en-US" dirty="0" smtClean="0"/>
+              <a:rPr lang="en-US" dirty="0"/>
               <a:t>3. Import Category</a:t>
             </a:r>
           </a:p>
           <a:p>
             <a:r>
-              <a:rPr lang="en-US" dirty="0" smtClean="0"/>
+              <a:rPr lang="en-US" dirty="0"/>
               <a:t>	3.1 Import single category with </a:t>
             </a:r>
             <a:r>
-              <a:rPr lang="en-US" dirty="0" err="1" smtClean="0"/>
+              <a:rPr lang="en-US" dirty="0" err="1"/>
               <a:t>namebox</a:t>
             </a:r>
             <a:r>
-              <a:rPr lang="en-US" dirty="0" smtClean="0"/>
+              <a:rPr lang="en-US" dirty="0"/>
               <a:t>, no conflict name</a:t>
             </a:r>
           </a:p>
           <a:p>
             <a:r>
-              <a:rPr lang="en-US" dirty="0" smtClean="0"/>
+              <a:rPr lang="en-US" dirty="0"/>
               <a:t>	3.2 Import multiple categories with </a:t>
             </a:r>
             <a:r>
-              <a:rPr lang="en-US" dirty="0" err="1" smtClean="0"/>
+              <a:rPr lang="en-US" dirty="0" err="1"/>
               <a:t>nameboxes</a:t>
             </a:r>
             <a:r>
-              <a:rPr lang="en-US" dirty="0" smtClean="0"/>
+              <a:rPr lang="en-US" dirty="0"/>
               <a:t>, no </a:t>
             </a:r>
             <a:r>
-              <a:rPr lang="en-US" dirty="0" err="1" smtClean="0"/>
+              <a:rPr lang="en-US" dirty="0" err="1"/>
               <a:t>confilct</a:t>
             </a:r>
             <a:r>
-              <a:rPr lang="en-US" dirty="0" smtClean="0"/>
+              <a:rPr lang="en-US" dirty="0"/>
               <a:t> name</a:t>
             </a:r>
           </a:p>
           <a:p>
             <a:r>
-              <a:rPr lang="en-US" dirty="0" smtClean="0"/>
+              <a:rPr lang="en-US" dirty="0"/>
               <a:t>	3.3 Import single category with </a:t>
             </a:r>
             <a:r>
-              <a:rPr lang="en-US" dirty="0" err="1" smtClean="0"/>
+              <a:rPr lang="en-US" dirty="0" err="1"/>
               <a:t>namebox</a:t>
             </a:r>
             <a:r>
-              <a:rPr lang="en-US" dirty="0" smtClean="0"/>
+              <a:rPr lang="en-US" dirty="0"/>
               <a:t>, conflict with one existed name</a:t>
             </a:r>
           </a:p>
           <a:p>
             <a:r>
-              <a:rPr lang="en-US" dirty="0" smtClean="0"/>
+              <a:rPr lang="en-US" dirty="0"/>
               <a:t>	3.4 Import multiple categories with </a:t>
             </a:r>
             <a:r>
-              <a:rPr lang="en-US" dirty="0" err="1" smtClean="0"/>
+              <a:rPr lang="en-US" dirty="0" err="1"/>
               <a:t>nameboxes</a:t>
             </a:r>
             <a:r>
-              <a:rPr lang="en-US" dirty="0" smtClean="0"/>
+              <a:rPr lang="en-US" dirty="0"/>
               <a:t>, some of the boxes conflict with existed name</a:t>
             </a:r>
           </a:p>
           <a:p>
             <a:r>
-              <a:rPr lang="en-US" dirty="0" smtClean="0"/>
+              <a:rPr lang="en-US" dirty="0"/>
               <a:t>	3.5 Import single category without </a:t>
             </a:r>
             <a:r>
-              <a:rPr lang="en-US" dirty="0" err="1" smtClean="0"/>
+              <a:rPr lang="en-US" dirty="0" err="1"/>
               <a:t>namebox</a:t>
             </a:r>
-            <a:endParaRPr lang="en-US" dirty="0" smtClean="0"/>
-          </a:p>
-          <a:p>
-            <a:r>
-              <a:rPr lang="en-US" dirty="0" smtClean="0"/>
+            <a:endParaRPr lang="en-US" dirty="0"/>
+          </a:p>
+          <a:p>
+            <a:r>
+              <a:rPr lang="en-US" dirty="0"/>
               <a:t>	3.6 Import single category without </a:t>
             </a:r>
             <a:r>
-              <a:rPr lang="en-US" dirty="0" err="1" smtClean="0"/>
+              <a:rPr lang="en-US" dirty="0" err="1"/>
               <a:t>namebox</a:t>
             </a:r>
             <a:r>
-              <a:rPr lang="en-US" dirty="0" smtClean="0"/>
+              <a:rPr lang="en-US" dirty="0"/>
               <a:t>, conflict with exist name</a:t>
             </a:r>
           </a:p>
           <a:p>
             <a:r>
-              <a:rPr lang="en-US" dirty="0" smtClean="0"/>
+              <a:rPr lang="en-US" dirty="0"/>
               <a:t>	3.7 Import multiple categories without </a:t>
             </a:r>
             <a:r>
-              <a:rPr lang="en-US" dirty="0" err="1" smtClean="0"/>
+              <a:rPr lang="en-US" dirty="0" err="1"/>
               <a:t>namebox</a:t>
             </a:r>
-            <a:endParaRPr lang="en-US" dirty="0" smtClean="0"/>
-          </a:p>
-          <a:p>
-            <a:r>
-              <a:rPr lang="en-US" dirty="0" smtClean="0"/>
+            <a:endParaRPr lang="en-US" dirty="0"/>
+          </a:p>
+          <a:p>
+            <a:r>
+              <a:rPr lang="en-US" dirty="0"/>
               <a:t>4. </a:t>
             </a:r>
             <a:r>
-              <a:rPr lang="en-US" smtClean="0"/>
+              <a:rPr lang="en-US"/>
               <a:t>Migrate Category</a:t>
             </a:r>
-            <a:endParaRPr lang="en-US"/>
           </a:p>
         </p:txBody>
       </p:sp>
@@ -829,7 +830,7 @@
           <a:lstStyle/>
           <a:p>
             <a:r>
-              <a:rPr lang="en-US" altLang="zh-CN" dirty="0" smtClean="0"/>
+              <a:rPr lang="en-US" altLang="zh-CN" dirty="0"/>
               <a:t>Expected</a:t>
             </a:r>
             <a:endParaRPr lang="zh-CN" altLang="en-US" dirty="0"/>
@@ -853,7 +854,7 @@
           <a:p>
             <a:fld id="{E96FB07A-B1AD-4238-A6C9-967239C45D18}" type="slidenum">
               <a:rPr lang="en-SG" smtClean="0"/>
-              <a:t>15</a:t>
+              <a:t>16</a:t>
             </a:fld>
             <a:endParaRPr lang="en-SG"/>
           </a:p>
@@ -1001,7 +1002,7 @@
           <a:lstStyle/>
           <a:p>
             <a:r>
-              <a:rPr lang="en-US" altLang="zh-CN" dirty="0" smtClean="0"/>
+              <a:rPr lang="en-US" altLang="zh-CN" dirty="0"/>
               <a:t>Expected</a:t>
             </a:r>
             <a:endParaRPr lang="zh-CN" altLang="en-US" dirty="0"/>
@@ -1173,7 +1174,7 @@
           <a:lstStyle/>
           <a:p>
             <a:r>
-              <a:rPr lang="en-US" altLang="zh-CN" dirty="0" smtClean="0"/>
+              <a:rPr lang="en-US" altLang="zh-CN" dirty="0"/>
               <a:t>Expected</a:t>
             </a:r>
             <a:endParaRPr lang="zh-CN" altLang="en-US" dirty="0"/>
@@ -1261,185 +1262,184 @@
           <a:lstStyle/>
           <a:p>
             <a:r>
-              <a:rPr lang="en-US" dirty="0" smtClean="0"/>
+              <a:rPr lang="en-US" dirty="0"/>
               <a:t>Do the following from 3 environments:</a:t>
             </a:r>
           </a:p>
           <a:p>
             <a:r>
-              <a:rPr lang="en-US" dirty="0" smtClean="0"/>
+              <a:rPr lang="en-US" dirty="0"/>
               <a:t>1. Entirely new environment</a:t>
             </a:r>
           </a:p>
           <a:p>
             <a:r>
-              <a:rPr lang="en-US" dirty="0" smtClean="0"/>
+              <a:rPr lang="en-US" dirty="0"/>
               <a:t>2. Contains old shape info</a:t>
             </a:r>
           </a:p>
           <a:p>
-            <a:endParaRPr lang="en-US" dirty="0" smtClean="0"/>
-          </a:p>
-          <a:p>
-            <a:r>
-              <a:rPr lang="en-US" dirty="0" smtClean="0"/>
+            <a:endParaRPr lang="en-US" dirty="0"/>
+          </a:p>
+          <a:p>
+            <a:r>
+              <a:rPr lang="en-US" dirty="0"/>
               <a:t>1. Add Category</a:t>
             </a:r>
           </a:p>
           <a:p>
             <a:r>
-              <a:rPr lang="en-US" dirty="0" smtClean="0"/>
+              <a:rPr lang="en-US" dirty="0"/>
               <a:t>	1.1 Add category then add a new shape inside, check the default name, close and open to check</a:t>
             </a:r>
           </a:p>
           <a:p>
             <a:r>
-              <a:rPr lang="en-US" dirty="0" smtClean="0"/>
+              <a:rPr lang="en-US" dirty="0"/>
               <a:t>	1.2 Add category then add a new shape inside, check the default name, set the category as default, close and open to check</a:t>
             </a:r>
           </a:p>
           <a:p>
             <a:r>
-              <a:rPr lang="en-US" dirty="0" smtClean="0"/>
+              <a:rPr lang="en-US" dirty="0"/>
               <a:t>2. Rename Category</a:t>
             </a:r>
           </a:p>
           <a:p>
             <a:r>
-              <a:rPr lang="en-US" dirty="0" smtClean="0"/>
+              <a:rPr lang="en-US" dirty="0"/>
               <a:t>	2.1 Rename to a valid name</a:t>
             </a:r>
           </a:p>
           <a:p>
             <a:r>
-              <a:rPr lang="en-US" dirty="0" smtClean="0"/>
+              <a:rPr lang="en-US" dirty="0"/>
               <a:t>	2.2 Rename to an </a:t>
             </a:r>
             <a:r>
-              <a:rPr lang="en-US" dirty="0" err="1" smtClean="0"/>
+              <a:rPr lang="en-US" dirty="0" err="1"/>
               <a:t>invaid</a:t>
             </a:r>
             <a:r>
-              <a:rPr lang="en-US" dirty="0" smtClean="0"/>
+              <a:rPr lang="en-US" dirty="0"/>
               <a:t> name</a:t>
             </a:r>
           </a:p>
           <a:p>
             <a:r>
-              <a:rPr lang="en-US" dirty="0" smtClean="0"/>
+              <a:rPr lang="en-US" dirty="0"/>
               <a:t>3. Import Category</a:t>
             </a:r>
           </a:p>
           <a:p>
             <a:r>
-              <a:rPr lang="en-US" dirty="0" smtClean="0"/>
+              <a:rPr lang="en-US" dirty="0"/>
               <a:t>	3.1 Import single category with </a:t>
             </a:r>
             <a:r>
-              <a:rPr lang="en-US" dirty="0" err="1" smtClean="0"/>
+              <a:rPr lang="en-US" dirty="0" err="1"/>
               <a:t>namebox</a:t>
             </a:r>
             <a:r>
-              <a:rPr lang="en-US" dirty="0" smtClean="0"/>
+              <a:rPr lang="en-US" dirty="0"/>
               <a:t>, no conflict name</a:t>
             </a:r>
           </a:p>
           <a:p>
             <a:r>
-              <a:rPr lang="en-US" dirty="0" smtClean="0"/>
+              <a:rPr lang="en-US" dirty="0"/>
               <a:t>	3.2 Import multiple categories with </a:t>
             </a:r>
             <a:r>
-              <a:rPr lang="en-US" dirty="0" err="1" smtClean="0"/>
+              <a:rPr lang="en-US" dirty="0" err="1"/>
               <a:t>nameboxes</a:t>
             </a:r>
             <a:r>
-              <a:rPr lang="en-US" dirty="0" smtClean="0"/>
+              <a:rPr lang="en-US" dirty="0"/>
               <a:t>, no </a:t>
             </a:r>
             <a:r>
-              <a:rPr lang="en-US" dirty="0" err="1" smtClean="0"/>
+              <a:rPr lang="en-US" dirty="0" err="1"/>
               <a:t>confilct</a:t>
             </a:r>
             <a:r>
-              <a:rPr lang="en-US" dirty="0" smtClean="0"/>
+              <a:rPr lang="en-US" dirty="0"/>
               <a:t> name</a:t>
             </a:r>
           </a:p>
           <a:p>
             <a:r>
-              <a:rPr lang="en-US" dirty="0" smtClean="0"/>
+              <a:rPr lang="en-US" dirty="0"/>
               <a:t>	3.3 Import single category with </a:t>
             </a:r>
             <a:r>
-              <a:rPr lang="en-US" dirty="0" err="1" smtClean="0"/>
+              <a:rPr lang="en-US" dirty="0" err="1"/>
               <a:t>namebox</a:t>
             </a:r>
             <a:r>
-              <a:rPr lang="en-US" dirty="0" smtClean="0"/>
+              <a:rPr lang="en-US" dirty="0"/>
               <a:t>, conflict with one existed name</a:t>
             </a:r>
           </a:p>
           <a:p>
             <a:r>
-              <a:rPr lang="en-US" dirty="0" smtClean="0"/>
+              <a:rPr lang="en-US" dirty="0"/>
               <a:t>	3.4 Import multiple categories with </a:t>
             </a:r>
             <a:r>
-              <a:rPr lang="en-US" dirty="0" err="1" smtClean="0"/>
+              <a:rPr lang="en-US" dirty="0" err="1"/>
               <a:t>nameboxes</a:t>
             </a:r>
             <a:r>
-              <a:rPr lang="en-US" dirty="0" smtClean="0"/>
+              <a:rPr lang="en-US" dirty="0"/>
               <a:t>, some of the boxes conflict with existed name</a:t>
             </a:r>
           </a:p>
           <a:p>
             <a:r>
-              <a:rPr lang="en-US" dirty="0" smtClean="0"/>
+              <a:rPr lang="en-US" dirty="0"/>
               <a:t>	3.5 Import single category without </a:t>
             </a:r>
             <a:r>
-              <a:rPr lang="en-US" dirty="0" err="1" smtClean="0"/>
+              <a:rPr lang="en-US" dirty="0" err="1"/>
               <a:t>namebox</a:t>
             </a:r>
-            <a:endParaRPr lang="en-US" dirty="0" smtClean="0"/>
-          </a:p>
-          <a:p>
-            <a:r>
-              <a:rPr lang="en-US" dirty="0" smtClean="0"/>
+            <a:endParaRPr lang="en-US" dirty="0"/>
+          </a:p>
+          <a:p>
+            <a:r>
+              <a:rPr lang="en-US" dirty="0"/>
               <a:t>	3.6 Import single category without </a:t>
             </a:r>
             <a:r>
-              <a:rPr lang="en-US" dirty="0" err="1" smtClean="0"/>
+              <a:rPr lang="en-US" dirty="0" err="1"/>
               <a:t>namebox</a:t>
             </a:r>
             <a:r>
-              <a:rPr lang="en-US" dirty="0" smtClean="0"/>
+              <a:rPr lang="en-US" dirty="0"/>
               <a:t>, conflict with exist name</a:t>
             </a:r>
           </a:p>
           <a:p>
             <a:r>
-              <a:rPr lang="en-US" dirty="0" smtClean="0"/>
+              <a:rPr lang="en-US" dirty="0"/>
               <a:t>	3.7 Import multiple categories without </a:t>
             </a:r>
             <a:r>
-              <a:rPr lang="en-US" dirty="0" err="1" smtClean="0"/>
+              <a:rPr lang="en-US" dirty="0" err="1"/>
               <a:t>namebox</a:t>
             </a:r>
-            <a:endParaRPr lang="en-US" dirty="0" smtClean="0"/>
-          </a:p>
-          <a:p>
-            <a:r>
-              <a:rPr lang="en-US" dirty="0" smtClean="0"/>
+            <a:endParaRPr lang="en-US" dirty="0"/>
+          </a:p>
+          <a:p>
+            <a:r>
+              <a:rPr lang="en-US" dirty="0"/>
               <a:t>4. </a:t>
             </a:r>
             <a:r>
-              <a:rPr lang="en-US" smtClean="0"/>
+              <a:rPr lang="en-US"/>
               <a:t>Migrate Category</a:t>
             </a:r>
-            <a:endParaRPr lang="en-US"/>
           </a:p>
         </p:txBody>
       </p:sp>
@@ -1460,7 +1460,7 @@
           <a:p>
             <a:fld id="{E96FB07A-B1AD-4238-A6C9-967239C45D18}" type="slidenum">
               <a:rPr lang="en-SG" smtClean="0"/>
-              <a:t>9</a:t>
+              <a:t>10</a:t>
             </a:fld>
             <a:endParaRPr lang="en-SG"/>
           </a:p>
@@ -1544,7 +1544,7 @@
           <a:p>
             <a:fld id="{E96FB07A-B1AD-4238-A6C9-967239C45D18}" type="slidenum">
               <a:rPr lang="en-SG" smtClean="0"/>
-              <a:t>10</a:t>
+              <a:t>11</a:t>
             </a:fld>
             <a:endParaRPr lang="en-SG"/>
           </a:p>
@@ -1608,7 +1608,7 @@
           <a:lstStyle/>
           <a:p>
             <a:r>
-              <a:rPr lang="en-US" altLang="zh-CN" dirty="0" smtClean="0"/>
+              <a:rPr lang="en-US" altLang="zh-CN" dirty="0"/>
               <a:t>Expected</a:t>
             </a:r>
             <a:endParaRPr lang="zh-CN" altLang="en-US" dirty="0"/>
@@ -1632,7 +1632,7 @@
           <a:p>
             <a:fld id="{E96FB07A-B1AD-4238-A6C9-967239C45D18}" type="slidenum">
               <a:rPr lang="en-SG" smtClean="0"/>
-              <a:t>12</a:t>
+              <a:t>13</a:t>
             </a:fld>
             <a:endParaRPr lang="en-SG"/>
           </a:p>
@@ -1716,7 +1716,7 @@
           <a:p>
             <a:fld id="{E96FB07A-B1AD-4238-A6C9-967239C45D18}" type="slidenum">
               <a:rPr lang="en-SG" smtClean="0"/>
-              <a:t>13</a:t>
+              <a:t>14</a:t>
             </a:fld>
             <a:endParaRPr lang="en-SG"/>
           </a:p>
@@ -1773,10 +1773,9 @@
           <a:lstStyle/>
           <a:p>
             <a:r>
-              <a:rPr lang="en-US" smtClean="0"/>
+              <a:rPr lang="en-US"/>
               <a:t>Click to edit Master title style</a:t>
             </a:r>
-            <a:endParaRPr lang="en-US"/>
           </a:p>
         </p:txBody>
       </p:sp>
@@ -1892,10 +1891,9 @@
           </a:lstStyle>
           <a:p>
             <a:r>
-              <a:rPr lang="en-US" smtClean="0"/>
+              <a:rPr lang="en-US"/>
               <a:t>Click to edit Master subtitle style</a:t>
             </a:r>
-            <a:endParaRPr lang="en-US"/>
           </a:p>
         </p:txBody>
       </p:sp>
@@ -1916,7 +1914,7 @@
           <a:p>
             <a:fld id="{699DC775-C286-4358-8C92-D7E584E969B3}" type="datetimeFigureOut">
               <a:rPr lang="en-US" smtClean="0"/>
-              <a:t>4/10/2018</a:t>
+              <a:t>1/27/2019</a:t>
             </a:fld>
             <a:endParaRPr lang="en-US"/>
           </a:p>
@@ -2010,10 +2008,9 @@
           <a:lstStyle/>
           <a:p>
             <a:r>
-              <a:rPr lang="en-US" smtClean="0"/>
+              <a:rPr lang="en-US"/>
               <a:t>Click to edit Master title style</a:t>
             </a:r>
-            <a:endParaRPr lang="en-US"/>
           </a:p>
         </p:txBody>
       </p:sp>
@@ -2034,38 +2031,37 @@
           <a:p>
             <a:pPr lvl="0"/>
             <a:r>
-              <a:rPr lang="en-US" smtClean="0"/>
+              <a:rPr lang="en-US"/>
               <a:t>Click to edit Master text styles</a:t>
             </a:r>
           </a:p>
           <a:p>
             <a:pPr lvl="1"/>
             <a:r>
-              <a:rPr lang="en-US" smtClean="0"/>
+              <a:rPr lang="en-US"/>
               <a:t>Second level</a:t>
             </a:r>
           </a:p>
           <a:p>
             <a:pPr lvl="2"/>
             <a:r>
-              <a:rPr lang="en-US" smtClean="0"/>
+              <a:rPr lang="en-US"/>
               <a:t>Third level</a:t>
             </a:r>
           </a:p>
           <a:p>
             <a:pPr lvl="3"/>
             <a:r>
-              <a:rPr lang="en-US" smtClean="0"/>
+              <a:rPr lang="en-US"/>
               <a:t>Fourth level</a:t>
             </a:r>
           </a:p>
           <a:p>
             <a:pPr lvl="4"/>
             <a:r>
-              <a:rPr lang="en-US" smtClean="0"/>
+              <a:rPr lang="en-US"/>
               <a:t>Fifth level</a:t>
             </a:r>
-            <a:endParaRPr lang="en-US"/>
           </a:p>
         </p:txBody>
       </p:sp>
@@ -2086,7 +2082,7 @@
           <a:p>
             <a:fld id="{699DC775-C286-4358-8C92-D7E584E969B3}" type="datetimeFigureOut">
               <a:rPr lang="en-US" smtClean="0"/>
-              <a:t>4/10/2018</a:t>
+              <a:t>1/27/2019</a:t>
             </a:fld>
             <a:endParaRPr lang="en-US"/>
           </a:p>
@@ -2185,10 +2181,9 @@
           <a:lstStyle/>
           <a:p>
             <a:r>
-              <a:rPr lang="en-US" smtClean="0"/>
+              <a:rPr lang="en-US"/>
               <a:t>Click to edit Master title style</a:t>
             </a:r>
-            <a:endParaRPr lang="en-US"/>
           </a:p>
         </p:txBody>
       </p:sp>
@@ -2214,38 +2209,37 @@
           <a:p>
             <a:pPr lvl="0"/>
             <a:r>
-              <a:rPr lang="en-US" smtClean="0"/>
+              <a:rPr lang="en-US"/>
               <a:t>Click to edit Master text styles</a:t>
             </a:r>
           </a:p>
           <a:p>
             <a:pPr lvl="1"/>
             <a:r>
-              <a:rPr lang="en-US" smtClean="0"/>
+              <a:rPr lang="en-US"/>
               <a:t>Second level</a:t>
             </a:r>
           </a:p>
           <a:p>
             <a:pPr lvl="2"/>
             <a:r>
-              <a:rPr lang="en-US" smtClean="0"/>
+              <a:rPr lang="en-US"/>
               <a:t>Third level</a:t>
             </a:r>
           </a:p>
           <a:p>
             <a:pPr lvl="3"/>
             <a:r>
-              <a:rPr lang="en-US" smtClean="0"/>
+              <a:rPr lang="en-US"/>
               <a:t>Fourth level</a:t>
             </a:r>
           </a:p>
           <a:p>
             <a:pPr lvl="4"/>
             <a:r>
-              <a:rPr lang="en-US" smtClean="0"/>
+              <a:rPr lang="en-US"/>
               <a:t>Fifth level</a:t>
             </a:r>
-            <a:endParaRPr lang="en-US"/>
           </a:p>
         </p:txBody>
       </p:sp>
@@ -2266,7 +2260,7 @@
           <a:p>
             <a:fld id="{699DC775-C286-4358-8C92-D7E584E969B3}" type="datetimeFigureOut">
               <a:rPr lang="en-US" smtClean="0"/>
-              <a:t>4/10/2018</a:t>
+              <a:t>1/27/2019</a:t>
             </a:fld>
             <a:endParaRPr lang="en-US"/>
           </a:p>
@@ -2365,10 +2359,9 @@
           <a:lstStyle/>
           <a:p>
             <a:r>
-              <a:rPr lang="en-US" smtClean="0"/>
+              <a:rPr lang="en-US"/>
               <a:t>Click to edit Master title style</a:t>
             </a:r>
-            <a:endParaRPr lang="en-US"/>
           </a:p>
         </p:txBody>
       </p:sp>
@@ -2484,10 +2477,9 @@
           </a:lstStyle>
           <a:p>
             <a:r>
-              <a:rPr lang="en-US" smtClean="0"/>
+              <a:rPr lang="en-US"/>
               <a:t>Click to edit Master subtitle style</a:t>
             </a:r>
-            <a:endParaRPr lang="en-US"/>
           </a:p>
         </p:txBody>
       </p:sp>
@@ -2508,7 +2500,7 @@
           <a:p>
             <a:fld id="{699DC775-C286-4358-8C92-D7E584E969B3}" type="datetimeFigureOut">
               <a:rPr lang="en-US" smtClean="0"/>
-              <a:t>4/10/2018</a:t>
+              <a:t>1/27/2019</a:t>
             </a:fld>
             <a:endParaRPr lang="en-US"/>
           </a:p>
@@ -2602,10 +2594,9 @@
           <a:lstStyle/>
           <a:p>
             <a:r>
-              <a:rPr lang="en-US" smtClean="0"/>
+              <a:rPr lang="en-US"/>
               <a:t>Click to edit Master title style</a:t>
             </a:r>
-            <a:endParaRPr lang="en-US"/>
           </a:p>
         </p:txBody>
       </p:sp>
@@ -2626,38 +2617,37 @@
           <a:p>
             <a:pPr lvl="0"/>
             <a:r>
-              <a:rPr lang="en-US" smtClean="0"/>
+              <a:rPr lang="en-US"/>
               <a:t>Click to edit Master text styles</a:t>
             </a:r>
           </a:p>
           <a:p>
             <a:pPr lvl="1"/>
             <a:r>
-              <a:rPr lang="en-US" smtClean="0"/>
+              <a:rPr lang="en-US"/>
               <a:t>Second level</a:t>
             </a:r>
           </a:p>
           <a:p>
             <a:pPr lvl="2"/>
             <a:r>
-              <a:rPr lang="en-US" smtClean="0"/>
+              <a:rPr lang="en-US"/>
               <a:t>Third level</a:t>
             </a:r>
           </a:p>
           <a:p>
             <a:pPr lvl="3"/>
             <a:r>
-              <a:rPr lang="en-US" smtClean="0"/>
+              <a:rPr lang="en-US"/>
               <a:t>Fourth level</a:t>
             </a:r>
           </a:p>
           <a:p>
             <a:pPr lvl="4"/>
             <a:r>
-              <a:rPr lang="en-US" smtClean="0"/>
+              <a:rPr lang="en-US"/>
               <a:t>Fifth level</a:t>
             </a:r>
-            <a:endParaRPr lang="en-US"/>
           </a:p>
         </p:txBody>
       </p:sp>
@@ -2678,7 +2668,7 @@
           <a:p>
             <a:fld id="{699DC775-C286-4358-8C92-D7E584E969B3}" type="datetimeFigureOut">
               <a:rPr lang="en-US" smtClean="0"/>
-              <a:t>4/10/2018</a:t>
+              <a:t>1/27/2019</a:t>
             </a:fld>
             <a:endParaRPr lang="en-US"/>
           </a:p>
@@ -2781,10 +2771,9 @@
           </a:lstStyle>
           <a:p>
             <a:r>
-              <a:rPr lang="en-US" smtClean="0"/>
+              <a:rPr lang="en-US"/>
               <a:t>Click to edit Master title style</a:t>
             </a:r>
-            <a:endParaRPr lang="en-US"/>
           </a:p>
         </p:txBody>
       </p:sp>
@@ -2901,7 +2890,7 @@
           <a:p>
             <a:pPr lvl="0"/>
             <a:r>
-              <a:rPr lang="en-US" smtClean="0"/>
+              <a:rPr lang="en-US"/>
               <a:t>Click to edit Master text styles</a:t>
             </a:r>
           </a:p>
@@ -2924,7 +2913,7 @@
           <a:p>
             <a:fld id="{699DC775-C286-4358-8C92-D7E584E969B3}" type="datetimeFigureOut">
               <a:rPr lang="en-US" smtClean="0"/>
-              <a:t>4/10/2018</a:t>
+              <a:t>1/27/2019</a:t>
             </a:fld>
             <a:endParaRPr lang="en-US"/>
           </a:p>
@@ -3018,10 +3007,9 @@
           <a:lstStyle/>
           <a:p>
             <a:r>
-              <a:rPr lang="en-US" smtClean="0"/>
+              <a:rPr lang="en-US"/>
               <a:t>Click to edit Master title style</a:t>
             </a:r>
-            <a:endParaRPr lang="en-US"/>
           </a:p>
         </p:txBody>
       </p:sp>
@@ -3075,38 +3063,37 @@
           <a:p>
             <a:pPr lvl="0"/>
             <a:r>
-              <a:rPr lang="en-US" smtClean="0"/>
+              <a:rPr lang="en-US"/>
               <a:t>Click to edit Master text styles</a:t>
             </a:r>
           </a:p>
           <a:p>
             <a:pPr lvl="1"/>
             <a:r>
-              <a:rPr lang="en-US" smtClean="0"/>
+              <a:rPr lang="en-US"/>
               <a:t>Second level</a:t>
             </a:r>
           </a:p>
           <a:p>
             <a:pPr lvl="2"/>
             <a:r>
-              <a:rPr lang="en-US" smtClean="0"/>
+              <a:rPr lang="en-US"/>
               <a:t>Third level</a:t>
             </a:r>
           </a:p>
           <a:p>
             <a:pPr lvl="3"/>
             <a:r>
-              <a:rPr lang="en-US" smtClean="0"/>
+              <a:rPr lang="en-US"/>
               <a:t>Fourth level</a:t>
             </a:r>
           </a:p>
           <a:p>
             <a:pPr lvl="4"/>
             <a:r>
-              <a:rPr lang="en-US" smtClean="0"/>
+              <a:rPr lang="en-US"/>
               <a:t>Fifth level</a:t>
             </a:r>
-            <a:endParaRPr lang="en-US"/>
           </a:p>
         </p:txBody>
       </p:sp>
@@ -3160,38 +3147,37 @@
           <a:p>
             <a:pPr lvl="0"/>
             <a:r>
-              <a:rPr lang="en-US" smtClean="0"/>
+              <a:rPr lang="en-US"/>
               <a:t>Click to edit Master text styles</a:t>
             </a:r>
           </a:p>
           <a:p>
             <a:pPr lvl="1"/>
             <a:r>
-              <a:rPr lang="en-US" smtClean="0"/>
+              <a:rPr lang="en-US"/>
               <a:t>Second level</a:t>
             </a:r>
           </a:p>
           <a:p>
             <a:pPr lvl="2"/>
             <a:r>
-              <a:rPr lang="en-US" smtClean="0"/>
+              <a:rPr lang="en-US"/>
               <a:t>Third level</a:t>
             </a:r>
           </a:p>
           <a:p>
             <a:pPr lvl="3"/>
             <a:r>
-              <a:rPr lang="en-US" smtClean="0"/>
+              <a:rPr lang="en-US"/>
               <a:t>Fourth level</a:t>
             </a:r>
           </a:p>
           <a:p>
             <a:pPr lvl="4"/>
             <a:r>
-              <a:rPr lang="en-US" smtClean="0"/>
+              <a:rPr lang="en-US"/>
               <a:t>Fifth level</a:t>
             </a:r>
-            <a:endParaRPr lang="en-US"/>
           </a:p>
         </p:txBody>
       </p:sp>
@@ -3212,7 +3198,7 @@
           <a:p>
             <a:fld id="{699DC775-C286-4358-8C92-D7E584E969B3}" type="datetimeFigureOut">
               <a:rPr lang="en-US" smtClean="0"/>
-              <a:t>4/10/2018</a:t>
+              <a:t>1/27/2019</a:t>
             </a:fld>
             <a:endParaRPr lang="en-US"/>
           </a:p>
@@ -3310,10 +3296,9 @@
           </a:lstStyle>
           <a:p>
             <a:r>
-              <a:rPr lang="en-US" smtClean="0"/>
+              <a:rPr lang="en-US"/>
               <a:t>Click to edit Master title style</a:t>
             </a:r>
-            <a:endParaRPr lang="en-US"/>
           </a:p>
         </p:txBody>
       </p:sp>
@@ -3376,7 +3361,7 @@
           <a:p>
             <a:pPr lvl="0"/>
             <a:r>
-              <a:rPr lang="en-US" smtClean="0"/>
+              <a:rPr lang="en-US"/>
               <a:t>Click to edit Master text styles</a:t>
             </a:r>
           </a:p>
@@ -3432,38 +3417,37 @@
           <a:p>
             <a:pPr lvl="0"/>
             <a:r>
-              <a:rPr lang="en-US" smtClean="0"/>
+              <a:rPr lang="en-US"/>
               <a:t>Click to edit Master text styles</a:t>
             </a:r>
           </a:p>
           <a:p>
             <a:pPr lvl="1"/>
             <a:r>
-              <a:rPr lang="en-US" smtClean="0"/>
+              <a:rPr lang="en-US"/>
               <a:t>Second level</a:t>
             </a:r>
           </a:p>
           <a:p>
             <a:pPr lvl="2"/>
             <a:r>
-              <a:rPr lang="en-US" smtClean="0"/>
+              <a:rPr lang="en-US"/>
               <a:t>Third level</a:t>
             </a:r>
           </a:p>
           <a:p>
             <a:pPr lvl="3"/>
             <a:r>
-              <a:rPr lang="en-US" smtClean="0"/>
+              <a:rPr lang="en-US"/>
               <a:t>Fourth level</a:t>
             </a:r>
           </a:p>
           <a:p>
             <a:pPr lvl="4"/>
             <a:r>
-              <a:rPr lang="en-US" smtClean="0"/>
+              <a:rPr lang="en-US"/>
               <a:t>Fifth level</a:t>
             </a:r>
-            <a:endParaRPr lang="en-US"/>
           </a:p>
         </p:txBody>
       </p:sp>
@@ -3526,7 +3510,7 @@
           <a:p>
             <a:pPr lvl="0"/>
             <a:r>
-              <a:rPr lang="en-US" smtClean="0"/>
+              <a:rPr lang="en-US"/>
               <a:t>Click to edit Master text styles</a:t>
             </a:r>
           </a:p>
@@ -3582,38 +3566,37 @@
           <a:p>
             <a:pPr lvl="0"/>
             <a:r>
-              <a:rPr lang="en-US" smtClean="0"/>
+              <a:rPr lang="en-US"/>
               <a:t>Click to edit Master text styles</a:t>
             </a:r>
           </a:p>
           <a:p>
             <a:pPr lvl="1"/>
             <a:r>
-              <a:rPr lang="en-US" smtClean="0"/>
+              <a:rPr lang="en-US"/>
               <a:t>Second level</a:t>
             </a:r>
           </a:p>
           <a:p>
             <a:pPr lvl="2"/>
             <a:r>
-              <a:rPr lang="en-US" smtClean="0"/>
+              <a:rPr lang="en-US"/>
               <a:t>Third level</a:t>
             </a:r>
           </a:p>
           <a:p>
             <a:pPr lvl="3"/>
             <a:r>
-              <a:rPr lang="en-US" smtClean="0"/>
+              <a:rPr lang="en-US"/>
               <a:t>Fourth level</a:t>
             </a:r>
           </a:p>
           <a:p>
             <a:pPr lvl="4"/>
             <a:r>
-              <a:rPr lang="en-US" smtClean="0"/>
+              <a:rPr lang="en-US"/>
               <a:t>Fifth level</a:t>
             </a:r>
-            <a:endParaRPr lang="en-US"/>
           </a:p>
         </p:txBody>
       </p:sp>
@@ -3634,7 +3617,7 @@
           <a:p>
             <a:fld id="{699DC775-C286-4358-8C92-D7E584E969B3}" type="datetimeFigureOut">
               <a:rPr lang="en-US" smtClean="0"/>
-              <a:t>4/10/2018</a:t>
+              <a:t>1/27/2019</a:t>
             </a:fld>
             <a:endParaRPr lang="en-US"/>
           </a:p>
@@ -3728,10 +3711,9 @@
           <a:lstStyle/>
           <a:p>
             <a:r>
-              <a:rPr lang="en-US" smtClean="0"/>
+              <a:rPr lang="en-US"/>
               <a:t>Click to edit Master title style</a:t>
             </a:r>
-            <a:endParaRPr lang="en-US"/>
           </a:p>
         </p:txBody>
       </p:sp>
@@ -3752,7 +3734,7 @@
           <a:p>
             <a:fld id="{699DC775-C286-4358-8C92-D7E584E969B3}" type="datetimeFigureOut">
               <a:rPr lang="en-US" smtClean="0"/>
-              <a:t>4/10/2018</a:t>
+              <a:t>1/27/2019</a:t>
             </a:fld>
             <a:endParaRPr lang="en-US"/>
           </a:p>
@@ -3847,7 +3829,7 @@
           <a:p>
             <a:fld id="{699DC775-C286-4358-8C92-D7E584E969B3}" type="datetimeFigureOut">
               <a:rPr lang="en-US" smtClean="0"/>
-              <a:t>4/10/2018</a:t>
+              <a:t>1/27/2019</a:t>
             </a:fld>
             <a:endParaRPr lang="en-US"/>
           </a:p>
@@ -3950,10 +3932,9 @@
           </a:lstStyle>
           <a:p>
             <a:r>
-              <a:rPr lang="en-US" smtClean="0"/>
+              <a:rPr lang="en-US"/>
               <a:t>Click to edit Master title style</a:t>
             </a:r>
-            <a:endParaRPr lang="en-US"/>
           </a:p>
         </p:txBody>
       </p:sp>
@@ -4007,38 +3988,37 @@
           <a:p>
             <a:pPr lvl="0"/>
             <a:r>
-              <a:rPr lang="en-US" smtClean="0"/>
+              <a:rPr lang="en-US"/>
               <a:t>Click to edit Master text styles</a:t>
             </a:r>
           </a:p>
           <a:p>
             <a:pPr lvl="1"/>
             <a:r>
-              <a:rPr lang="en-US" smtClean="0"/>
+              <a:rPr lang="en-US"/>
               <a:t>Second level</a:t>
             </a:r>
           </a:p>
           <a:p>
             <a:pPr lvl="2"/>
             <a:r>
-              <a:rPr lang="en-US" smtClean="0"/>
+              <a:rPr lang="en-US"/>
               <a:t>Third level</a:t>
             </a:r>
           </a:p>
           <a:p>
             <a:pPr lvl="3"/>
             <a:r>
-              <a:rPr lang="en-US" smtClean="0"/>
+              <a:rPr lang="en-US"/>
               <a:t>Fourth level</a:t>
             </a:r>
           </a:p>
           <a:p>
             <a:pPr lvl="4"/>
             <a:r>
-              <a:rPr lang="en-US" smtClean="0"/>
+              <a:rPr lang="en-US"/>
               <a:t>Fifth level</a:t>
             </a:r>
-            <a:endParaRPr lang="en-US"/>
           </a:p>
         </p:txBody>
       </p:sp>
@@ -4101,7 +4081,7 @@
           <a:p>
             <a:pPr lvl="0"/>
             <a:r>
-              <a:rPr lang="en-US" smtClean="0"/>
+              <a:rPr lang="en-US"/>
               <a:t>Click to edit Master text styles</a:t>
             </a:r>
           </a:p>
@@ -4124,7 +4104,7 @@
           <a:p>
             <a:fld id="{699DC775-C286-4358-8C92-D7E584E969B3}" type="datetimeFigureOut">
               <a:rPr lang="en-US" smtClean="0"/>
-              <a:t>4/10/2018</a:t>
+              <a:t>1/27/2019</a:t>
             </a:fld>
             <a:endParaRPr lang="en-US"/>
           </a:p>
@@ -4218,10 +4198,9 @@
           <a:lstStyle/>
           <a:p>
             <a:r>
-              <a:rPr lang="en-US" smtClean="0"/>
+              <a:rPr lang="en-US"/>
               <a:t>Click to edit Master title style</a:t>
             </a:r>
-            <a:endParaRPr lang="en-US"/>
           </a:p>
         </p:txBody>
       </p:sp>
@@ -4242,38 +4221,37 @@
           <a:p>
             <a:pPr lvl="0"/>
             <a:r>
-              <a:rPr lang="en-US" smtClean="0"/>
+              <a:rPr lang="en-US"/>
               <a:t>Click to edit Master text styles</a:t>
             </a:r>
           </a:p>
           <a:p>
             <a:pPr lvl="1"/>
             <a:r>
-              <a:rPr lang="en-US" smtClean="0"/>
+              <a:rPr lang="en-US"/>
               <a:t>Second level</a:t>
             </a:r>
           </a:p>
           <a:p>
             <a:pPr lvl="2"/>
             <a:r>
-              <a:rPr lang="en-US" smtClean="0"/>
+              <a:rPr lang="en-US"/>
               <a:t>Third level</a:t>
             </a:r>
           </a:p>
           <a:p>
             <a:pPr lvl="3"/>
             <a:r>
-              <a:rPr lang="en-US" smtClean="0"/>
+              <a:rPr lang="en-US"/>
               <a:t>Fourth level</a:t>
             </a:r>
           </a:p>
           <a:p>
             <a:pPr lvl="4"/>
             <a:r>
-              <a:rPr lang="en-US" smtClean="0"/>
+              <a:rPr lang="en-US"/>
               <a:t>Fifth level</a:t>
             </a:r>
-            <a:endParaRPr lang="en-US"/>
           </a:p>
         </p:txBody>
       </p:sp>
@@ -4294,7 +4272,7 @@
           <a:p>
             <a:fld id="{699DC775-C286-4358-8C92-D7E584E969B3}" type="datetimeFigureOut">
               <a:rPr lang="en-US" smtClean="0"/>
-              <a:t>4/10/2018</a:t>
+              <a:t>1/27/2019</a:t>
             </a:fld>
             <a:endParaRPr lang="en-US"/>
           </a:p>
@@ -4397,10 +4375,9 @@
           </a:lstStyle>
           <a:p>
             <a:r>
-              <a:rPr lang="en-US" smtClean="0"/>
+              <a:rPr lang="en-US"/>
               <a:t>Click to edit Master title style</a:t>
             </a:r>
-            <a:endParaRPr lang="en-US"/>
           </a:p>
         </p:txBody>
       </p:sp>
@@ -4524,7 +4501,7 @@
           <a:p>
             <a:pPr lvl="0"/>
             <a:r>
-              <a:rPr lang="en-US" smtClean="0"/>
+              <a:rPr lang="en-US"/>
               <a:t>Click to edit Master text styles</a:t>
             </a:r>
           </a:p>
@@ -4547,7 +4524,7 @@
           <a:p>
             <a:fld id="{699DC775-C286-4358-8C92-D7E584E969B3}" type="datetimeFigureOut">
               <a:rPr lang="en-US" smtClean="0"/>
-              <a:t>4/10/2018</a:t>
+              <a:t>1/27/2019</a:t>
             </a:fld>
             <a:endParaRPr lang="en-US"/>
           </a:p>
@@ -4641,10 +4618,9 @@
           <a:lstStyle/>
           <a:p>
             <a:r>
-              <a:rPr lang="en-US" smtClean="0"/>
+              <a:rPr lang="en-US"/>
               <a:t>Click to edit Master title style</a:t>
             </a:r>
-            <a:endParaRPr lang="en-US"/>
           </a:p>
         </p:txBody>
       </p:sp>
@@ -4665,38 +4641,37 @@
           <a:p>
             <a:pPr lvl="0"/>
             <a:r>
-              <a:rPr lang="en-US" smtClean="0"/>
+              <a:rPr lang="en-US"/>
               <a:t>Click to edit Master text styles</a:t>
             </a:r>
           </a:p>
           <a:p>
             <a:pPr lvl="1"/>
             <a:r>
-              <a:rPr lang="en-US" smtClean="0"/>
+              <a:rPr lang="en-US"/>
               <a:t>Second level</a:t>
             </a:r>
           </a:p>
           <a:p>
             <a:pPr lvl="2"/>
             <a:r>
-              <a:rPr lang="en-US" smtClean="0"/>
+              <a:rPr lang="en-US"/>
               <a:t>Third level</a:t>
             </a:r>
           </a:p>
           <a:p>
             <a:pPr lvl="3"/>
             <a:r>
-              <a:rPr lang="en-US" smtClean="0"/>
+              <a:rPr lang="en-US"/>
               <a:t>Fourth level</a:t>
             </a:r>
           </a:p>
           <a:p>
             <a:pPr lvl="4"/>
             <a:r>
-              <a:rPr lang="en-US" smtClean="0"/>
+              <a:rPr lang="en-US"/>
               <a:t>Fifth level</a:t>
             </a:r>
-            <a:endParaRPr lang="en-US"/>
           </a:p>
         </p:txBody>
       </p:sp>
@@ -4717,7 +4692,7 @@
           <a:p>
             <a:fld id="{699DC775-C286-4358-8C92-D7E584E969B3}" type="datetimeFigureOut">
               <a:rPr lang="en-US" smtClean="0"/>
-              <a:t>4/10/2018</a:t>
+              <a:t>1/27/2019</a:t>
             </a:fld>
             <a:endParaRPr lang="en-US"/>
           </a:p>
@@ -4816,10 +4791,9 @@
           <a:lstStyle/>
           <a:p>
             <a:r>
-              <a:rPr lang="en-US" smtClean="0"/>
+              <a:rPr lang="en-US"/>
               <a:t>Click to edit Master title style</a:t>
             </a:r>
-            <a:endParaRPr lang="en-US"/>
           </a:p>
         </p:txBody>
       </p:sp>
@@ -4845,38 +4819,37 @@
           <a:p>
             <a:pPr lvl="0"/>
             <a:r>
-              <a:rPr lang="en-US" smtClean="0"/>
+              <a:rPr lang="en-US"/>
               <a:t>Click to edit Master text styles</a:t>
             </a:r>
           </a:p>
           <a:p>
             <a:pPr lvl="1"/>
             <a:r>
-              <a:rPr lang="en-US" smtClean="0"/>
+              <a:rPr lang="en-US"/>
               <a:t>Second level</a:t>
             </a:r>
           </a:p>
           <a:p>
             <a:pPr lvl="2"/>
             <a:r>
-              <a:rPr lang="en-US" smtClean="0"/>
+              <a:rPr lang="en-US"/>
               <a:t>Third level</a:t>
             </a:r>
           </a:p>
           <a:p>
             <a:pPr lvl="3"/>
             <a:r>
-              <a:rPr lang="en-US" smtClean="0"/>
+              <a:rPr lang="en-US"/>
               <a:t>Fourth level</a:t>
             </a:r>
           </a:p>
           <a:p>
             <a:pPr lvl="4"/>
             <a:r>
-              <a:rPr lang="en-US" smtClean="0"/>
+              <a:rPr lang="en-US"/>
               <a:t>Fifth level</a:t>
             </a:r>
-            <a:endParaRPr lang="en-US"/>
           </a:p>
         </p:txBody>
       </p:sp>
@@ -4897,7 +4870,7 @@
           <a:p>
             <a:fld id="{699DC775-C286-4358-8C92-D7E584E969B3}" type="datetimeFigureOut">
               <a:rPr lang="en-US" smtClean="0"/>
-              <a:t>4/10/2018</a:t>
+              <a:t>1/27/2019</a:t>
             </a:fld>
             <a:endParaRPr lang="en-US"/>
           </a:p>
@@ -5004,10 +4977,9 @@
           <a:lstStyle/>
           <a:p>
             <a:r>
-              <a:rPr lang="en-US" smtClean="0"/>
+              <a:rPr lang="en-US"/>
               <a:t>Click to edit Master title style</a:t>
             </a:r>
-            <a:endParaRPr lang="en-US"/>
           </a:p>
         </p:txBody>
       </p:sp>
@@ -5123,10 +5095,9 @@
           </a:lstStyle>
           <a:p>
             <a:r>
-              <a:rPr lang="en-US" smtClean="0"/>
+              <a:rPr lang="en-US"/>
               <a:t>Click to edit Master subtitle style</a:t>
             </a:r>
-            <a:endParaRPr lang="en-US"/>
           </a:p>
         </p:txBody>
       </p:sp>
@@ -5147,7 +5118,7 @@
           <a:p>
             <a:fld id="{699DC775-C286-4358-8C92-D7E584E969B3}" type="datetimeFigureOut">
               <a:rPr lang="en-US" smtClean="0"/>
-              <a:t>4/10/2018</a:t>
+              <a:t>1/27/2019</a:t>
             </a:fld>
             <a:endParaRPr lang="en-US"/>
           </a:p>
@@ -5249,10 +5220,9 @@
           <a:lstStyle/>
           <a:p>
             <a:r>
-              <a:rPr lang="en-US" smtClean="0"/>
+              <a:rPr lang="en-US"/>
               <a:t>Click to edit Master title style</a:t>
             </a:r>
-            <a:endParaRPr lang="en-US"/>
           </a:p>
         </p:txBody>
       </p:sp>
@@ -5273,38 +5243,37 @@
           <a:p>
             <a:pPr lvl="0"/>
             <a:r>
-              <a:rPr lang="en-US" smtClean="0"/>
+              <a:rPr lang="en-US"/>
               <a:t>Click to edit Master text styles</a:t>
             </a:r>
           </a:p>
           <a:p>
             <a:pPr lvl="1"/>
             <a:r>
-              <a:rPr lang="en-US" smtClean="0"/>
+              <a:rPr lang="en-US"/>
               <a:t>Second level</a:t>
             </a:r>
           </a:p>
           <a:p>
             <a:pPr lvl="2"/>
             <a:r>
-              <a:rPr lang="en-US" smtClean="0"/>
+              <a:rPr lang="en-US"/>
               <a:t>Third level</a:t>
             </a:r>
           </a:p>
           <a:p>
             <a:pPr lvl="3"/>
             <a:r>
-              <a:rPr lang="en-US" smtClean="0"/>
+              <a:rPr lang="en-US"/>
               <a:t>Fourth level</a:t>
             </a:r>
           </a:p>
           <a:p>
             <a:pPr lvl="4"/>
             <a:r>
-              <a:rPr lang="en-US" smtClean="0"/>
+              <a:rPr lang="en-US"/>
               <a:t>Fifth level</a:t>
             </a:r>
-            <a:endParaRPr lang="en-US"/>
           </a:p>
         </p:txBody>
       </p:sp>
@@ -5325,7 +5294,7 @@
           <a:p>
             <a:fld id="{699DC775-C286-4358-8C92-D7E584E969B3}" type="datetimeFigureOut">
               <a:rPr lang="en-US" smtClean="0"/>
-              <a:t>4/10/2018</a:t>
+              <a:t>1/27/2019</a:t>
             </a:fld>
             <a:endParaRPr lang="en-US"/>
           </a:p>
@@ -5436,10 +5405,9 @@
           </a:lstStyle>
           <a:p>
             <a:r>
-              <a:rPr lang="en-US" smtClean="0"/>
+              <a:rPr lang="en-US"/>
               <a:t>Click to edit Master title style</a:t>
             </a:r>
-            <a:endParaRPr lang="en-US"/>
           </a:p>
         </p:txBody>
       </p:sp>
@@ -5556,7 +5524,7 @@
           <a:p>
             <a:pPr lvl="0"/>
             <a:r>
-              <a:rPr lang="en-US" smtClean="0"/>
+              <a:rPr lang="en-US"/>
               <a:t>Click to edit Master text styles</a:t>
             </a:r>
           </a:p>
@@ -5579,7 +5547,7 @@
           <a:p>
             <a:fld id="{699DC775-C286-4358-8C92-D7E584E969B3}" type="datetimeFigureOut">
               <a:rPr lang="en-US" smtClean="0"/>
-              <a:t>4/10/2018</a:t>
+              <a:t>1/27/2019</a:t>
             </a:fld>
             <a:endParaRPr lang="en-US"/>
           </a:p>
@@ -5681,10 +5649,9 @@
           <a:lstStyle/>
           <a:p>
             <a:r>
-              <a:rPr lang="en-US" smtClean="0"/>
+              <a:rPr lang="en-US"/>
               <a:t>Click to edit Master title style</a:t>
             </a:r>
-            <a:endParaRPr lang="en-US"/>
           </a:p>
         </p:txBody>
       </p:sp>
@@ -5738,38 +5705,37 @@
           <a:p>
             <a:pPr lvl="0"/>
             <a:r>
-              <a:rPr lang="en-US" smtClean="0"/>
+              <a:rPr lang="en-US"/>
               <a:t>Click to edit Master text styles</a:t>
             </a:r>
           </a:p>
           <a:p>
             <a:pPr lvl="1"/>
             <a:r>
-              <a:rPr lang="en-US" smtClean="0"/>
+              <a:rPr lang="en-US"/>
               <a:t>Second level</a:t>
             </a:r>
           </a:p>
           <a:p>
             <a:pPr lvl="2"/>
             <a:r>
-              <a:rPr lang="en-US" smtClean="0"/>
+              <a:rPr lang="en-US"/>
               <a:t>Third level</a:t>
             </a:r>
           </a:p>
           <a:p>
             <a:pPr lvl="3"/>
             <a:r>
-              <a:rPr lang="en-US" smtClean="0"/>
+              <a:rPr lang="en-US"/>
               <a:t>Fourth level</a:t>
             </a:r>
           </a:p>
           <a:p>
             <a:pPr lvl="4"/>
             <a:r>
-              <a:rPr lang="en-US" smtClean="0"/>
+              <a:rPr lang="en-US"/>
               <a:t>Fifth level</a:t>
             </a:r>
-            <a:endParaRPr lang="en-US"/>
           </a:p>
         </p:txBody>
       </p:sp>
@@ -5823,38 +5789,37 @@
           <a:p>
             <a:pPr lvl="0"/>
             <a:r>
-              <a:rPr lang="en-US" smtClean="0"/>
+              <a:rPr lang="en-US"/>
               <a:t>Click to edit Master text styles</a:t>
             </a:r>
           </a:p>
           <a:p>
             <a:pPr lvl="1"/>
             <a:r>
-              <a:rPr lang="en-US" smtClean="0"/>
+              <a:rPr lang="en-US"/>
               <a:t>Second level</a:t>
             </a:r>
           </a:p>
           <a:p>
             <a:pPr lvl="2"/>
             <a:r>
-              <a:rPr lang="en-US" smtClean="0"/>
+              <a:rPr lang="en-US"/>
               <a:t>Third level</a:t>
             </a:r>
           </a:p>
           <a:p>
             <a:pPr lvl="3"/>
             <a:r>
-              <a:rPr lang="en-US" smtClean="0"/>
+              <a:rPr lang="en-US"/>
               <a:t>Fourth level</a:t>
             </a:r>
           </a:p>
           <a:p>
             <a:pPr lvl="4"/>
             <a:r>
-              <a:rPr lang="en-US" smtClean="0"/>
+              <a:rPr lang="en-US"/>
               <a:t>Fifth level</a:t>
             </a:r>
-            <a:endParaRPr lang="en-US"/>
           </a:p>
         </p:txBody>
       </p:sp>
@@ -5875,7 +5840,7 @@
           <a:p>
             <a:fld id="{699DC775-C286-4358-8C92-D7E584E969B3}" type="datetimeFigureOut">
               <a:rPr lang="en-US" smtClean="0"/>
-              <a:t>4/10/2018</a:t>
+              <a:t>1/27/2019</a:t>
             </a:fld>
             <a:endParaRPr lang="en-US"/>
           </a:p>
@@ -5981,10 +5946,9 @@
           </a:lstStyle>
           <a:p>
             <a:r>
-              <a:rPr lang="en-US" smtClean="0"/>
+              <a:rPr lang="en-US"/>
               <a:t>Click to edit Master title style</a:t>
             </a:r>
-            <a:endParaRPr lang="en-US"/>
           </a:p>
         </p:txBody>
       </p:sp>
@@ -6047,7 +6011,7 @@
           <a:p>
             <a:pPr lvl="0"/>
             <a:r>
-              <a:rPr lang="en-US" smtClean="0"/>
+              <a:rPr lang="en-US"/>
               <a:t>Click to edit Master text styles</a:t>
             </a:r>
           </a:p>
@@ -6103,38 +6067,37 @@
           <a:p>
             <a:pPr lvl="0"/>
             <a:r>
-              <a:rPr lang="en-US" smtClean="0"/>
+              <a:rPr lang="en-US"/>
               <a:t>Click to edit Master text styles</a:t>
             </a:r>
           </a:p>
           <a:p>
             <a:pPr lvl="1"/>
             <a:r>
-              <a:rPr lang="en-US" smtClean="0"/>
+              <a:rPr lang="en-US"/>
               <a:t>Second level</a:t>
             </a:r>
           </a:p>
           <a:p>
             <a:pPr lvl="2"/>
             <a:r>
-              <a:rPr lang="en-US" smtClean="0"/>
+              <a:rPr lang="en-US"/>
               <a:t>Third level</a:t>
             </a:r>
           </a:p>
           <a:p>
             <a:pPr lvl="3"/>
             <a:r>
-              <a:rPr lang="en-US" smtClean="0"/>
+              <a:rPr lang="en-US"/>
               <a:t>Fourth level</a:t>
             </a:r>
           </a:p>
           <a:p>
             <a:pPr lvl="4"/>
             <a:r>
-              <a:rPr lang="en-US" smtClean="0"/>
+              <a:rPr lang="en-US"/>
               <a:t>Fifth level</a:t>
             </a:r>
-            <a:endParaRPr lang="en-US"/>
           </a:p>
         </p:txBody>
       </p:sp>
@@ -6197,7 +6160,7 @@
           <a:p>
             <a:pPr lvl="0"/>
             <a:r>
-              <a:rPr lang="en-US" smtClean="0"/>
+              <a:rPr lang="en-US"/>
               <a:t>Click to edit Master text styles</a:t>
             </a:r>
           </a:p>
@@ -6253,38 +6216,37 @@
           <a:p>
             <a:pPr lvl="0"/>
             <a:r>
-              <a:rPr lang="en-US" smtClean="0"/>
+              <a:rPr lang="en-US"/>
               <a:t>Click to edit Master text styles</a:t>
             </a:r>
           </a:p>
           <a:p>
             <a:pPr lvl="1"/>
             <a:r>
-              <a:rPr lang="en-US" smtClean="0"/>
+              <a:rPr lang="en-US"/>
               <a:t>Second level</a:t>
             </a:r>
           </a:p>
           <a:p>
             <a:pPr lvl="2"/>
             <a:r>
-              <a:rPr lang="en-US" smtClean="0"/>
+              <a:rPr lang="en-US"/>
               <a:t>Third level</a:t>
             </a:r>
           </a:p>
           <a:p>
             <a:pPr lvl="3"/>
             <a:r>
-              <a:rPr lang="en-US" smtClean="0"/>
+              <a:rPr lang="en-US"/>
               <a:t>Fourth level</a:t>
             </a:r>
           </a:p>
           <a:p>
             <a:pPr lvl="4"/>
             <a:r>
-              <a:rPr lang="en-US" smtClean="0"/>
+              <a:rPr lang="en-US"/>
               <a:t>Fifth level</a:t>
             </a:r>
-            <a:endParaRPr lang="en-US"/>
           </a:p>
         </p:txBody>
       </p:sp>
@@ -6305,7 +6267,7 @@
           <a:p>
             <a:fld id="{699DC775-C286-4358-8C92-D7E584E969B3}" type="datetimeFigureOut">
               <a:rPr lang="en-US" smtClean="0"/>
-              <a:t>4/10/2018</a:t>
+              <a:t>1/27/2019</a:t>
             </a:fld>
             <a:endParaRPr lang="en-US"/>
           </a:p>
@@ -6407,10 +6369,9 @@
           <a:lstStyle/>
           <a:p>
             <a:r>
-              <a:rPr lang="en-US" smtClean="0"/>
+              <a:rPr lang="en-US"/>
               <a:t>Click to edit Master title style</a:t>
             </a:r>
-            <a:endParaRPr lang="en-US"/>
           </a:p>
         </p:txBody>
       </p:sp>
@@ -6431,7 +6392,7 @@
           <a:p>
             <a:fld id="{699DC775-C286-4358-8C92-D7E584E969B3}" type="datetimeFigureOut">
               <a:rPr lang="en-US" smtClean="0"/>
-              <a:t>4/10/2018</a:t>
+              <a:t>1/27/2019</a:t>
             </a:fld>
             <a:endParaRPr lang="en-US"/>
           </a:p>
@@ -6534,7 +6495,7 @@
           <a:p>
             <a:fld id="{699DC775-C286-4358-8C92-D7E584E969B3}" type="datetimeFigureOut">
               <a:rPr lang="en-US" smtClean="0"/>
-              <a:t>4/10/2018</a:t>
+              <a:t>1/27/2019</a:t>
             </a:fld>
             <a:endParaRPr lang="en-US"/>
           </a:p>
@@ -6637,10 +6598,9 @@
           </a:lstStyle>
           <a:p>
             <a:r>
-              <a:rPr lang="en-US" smtClean="0"/>
+              <a:rPr lang="en-US"/>
               <a:t>Click to edit Master title style</a:t>
             </a:r>
-            <a:endParaRPr lang="en-US"/>
           </a:p>
         </p:txBody>
       </p:sp>
@@ -6757,7 +6717,7 @@
           <a:p>
             <a:pPr lvl="0"/>
             <a:r>
-              <a:rPr lang="en-US" smtClean="0"/>
+              <a:rPr lang="en-US"/>
               <a:t>Click to edit Master text styles</a:t>
             </a:r>
           </a:p>
@@ -6780,7 +6740,7 @@
           <a:p>
             <a:fld id="{699DC775-C286-4358-8C92-D7E584E969B3}" type="datetimeFigureOut">
               <a:rPr lang="en-US" smtClean="0"/>
-              <a:t>4/10/2018</a:t>
+              <a:t>1/27/2019</a:t>
             </a:fld>
             <a:endParaRPr lang="en-US"/>
           </a:p>
@@ -6891,10 +6851,9 @@
           </a:lstStyle>
           <a:p>
             <a:r>
-              <a:rPr lang="en-US" smtClean="0"/>
+              <a:rPr lang="en-US"/>
               <a:t>Click to edit Master title style</a:t>
             </a:r>
-            <a:endParaRPr lang="en-US"/>
           </a:p>
         </p:txBody>
       </p:sp>
@@ -6948,38 +6907,37 @@
           <a:p>
             <a:pPr lvl="0"/>
             <a:r>
-              <a:rPr lang="en-US" smtClean="0"/>
+              <a:rPr lang="en-US"/>
               <a:t>Click to edit Master text styles</a:t>
             </a:r>
           </a:p>
           <a:p>
             <a:pPr lvl="1"/>
             <a:r>
-              <a:rPr lang="en-US" smtClean="0"/>
+              <a:rPr lang="en-US"/>
               <a:t>Second level</a:t>
             </a:r>
           </a:p>
           <a:p>
             <a:pPr lvl="2"/>
             <a:r>
-              <a:rPr lang="en-US" smtClean="0"/>
+              <a:rPr lang="en-US"/>
               <a:t>Third level</a:t>
             </a:r>
           </a:p>
           <a:p>
             <a:pPr lvl="3"/>
             <a:r>
-              <a:rPr lang="en-US" smtClean="0"/>
+              <a:rPr lang="en-US"/>
               <a:t>Fourth level</a:t>
             </a:r>
           </a:p>
           <a:p>
             <a:pPr lvl="4"/>
             <a:r>
-              <a:rPr lang="en-US" smtClean="0"/>
+              <a:rPr lang="en-US"/>
               <a:t>Fifth level</a:t>
             </a:r>
-            <a:endParaRPr lang="en-US"/>
           </a:p>
         </p:txBody>
       </p:sp>
@@ -7042,7 +7000,7 @@
           <a:p>
             <a:pPr lvl="0"/>
             <a:r>
-              <a:rPr lang="en-US" smtClean="0"/>
+              <a:rPr lang="en-US"/>
               <a:t>Click to edit Master text styles</a:t>
             </a:r>
           </a:p>
@@ -7065,7 +7023,7 @@
           <a:p>
             <a:fld id="{699DC775-C286-4358-8C92-D7E584E969B3}" type="datetimeFigureOut">
               <a:rPr lang="en-US" smtClean="0"/>
-              <a:t>4/10/2018</a:t>
+              <a:t>1/27/2019</a:t>
             </a:fld>
             <a:endParaRPr lang="en-US"/>
           </a:p>
@@ -7176,10 +7134,9 @@
           </a:lstStyle>
           <a:p>
             <a:r>
-              <a:rPr lang="en-US" smtClean="0"/>
+              <a:rPr lang="en-US"/>
               <a:t>Click to edit Master title style</a:t>
             </a:r>
-            <a:endParaRPr lang="en-US"/>
           </a:p>
         </p:txBody>
       </p:sp>
@@ -7303,7 +7260,7 @@
           <a:p>
             <a:pPr lvl="0"/>
             <a:r>
-              <a:rPr lang="en-US" smtClean="0"/>
+              <a:rPr lang="en-US"/>
               <a:t>Click to edit Master text styles</a:t>
             </a:r>
           </a:p>
@@ -7326,7 +7283,7 @@
           <a:p>
             <a:fld id="{699DC775-C286-4358-8C92-D7E584E969B3}" type="datetimeFigureOut">
               <a:rPr lang="en-US" smtClean="0"/>
-              <a:t>4/10/2018</a:t>
+              <a:t>1/27/2019</a:t>
             </a:fld>
             <a:endParaRPr lang="en-US"/>
           </a:p>
@@ -7428,10 +7385,9 @@
           <a:lstStyle/>
           <a:p>
             <a:r>
-              <a:rPr lang="en-US" smtClean="0"/>
+              <a:rPr lang="en-US"/>
               <a:t>Click to edit Master title style</a:t>
             </a:r>
-            <a:endParaRPr lang="en-US"/>
           </a:p>
         </p:txBody>
       </p:sp>
@@ -7452,38 +7408,37 @@
           <a:p>
             <a:pPr lvl="0"/>
             <a:r>
-              <a:rPr lang="en-US" smtClean="0"/>
+              <a:rPr lang="en-US"/>
               <a:t>Click to edit Master text styles</a:t>
             </a:r>
           </a:p>
           <a:p>
             <a:pPr lvl="1"/>
             <a:r>
-              <a:rPr lang="en-US" smtClean="0"/>
+              <a:rPr lang="en-US"/>
               <a:t>Second level</a:t>
             </a:r>
           </a:p>
           <a:p>
             <a:pPr lvl="2"/>
             <a:r>
-              <a:rPr lang="en-US" smtClean="0"/>
+              <a:rPr lang="en-US"/>
               <a:t>Third level</a:t>
             </a:r>
           </a:p>
           <a:p>
             <a:pPr lvl="3"/>
             <a:r>
-              <a:rPr lang="en-US" smtClean="0"/>
+              <a:rPr lang="en-US"/>
               <a:t>Fourth level</a:t>
             </a:r>
           </a:p>
           <a:p>
             <a:pPr lvl="4"/>
             <a:r>
-              <a:rPr lang="en-US" smtClean="0"/>
+              <a:rPr lang="en-US"/>
               <a:t>Fifth level</a:t>
             </a:r>
-            <a:endParaRPr lang="en-US"/>
           </a:p>
         </p:txBody>
       </p:sp>
@@ -7504,7 +7459,7 @@
           <a:p>
             <a:fld id="{699DC775-C286-4358-8C92-D7E584E969B3}" type="datetimeFigureOut">
               <a:rPr lang="en-US" smtClean="0"/>
-              <a:t>4/10/2018</a:t>
+              <a:t>1/27/2019</a:t>
             </a:fld>
             <a:endParaRPr lang="en-US"/>
           </a:p>
@@ -7611,10 +7566,9 @@
           <a:lstStyle/>
           <a:p>
             <a:r>
-              <a:rPr lang="en-US" smtClean="0"/>
+              <a:rPr lang="en-US"/>
               <a:t>Click to edit Master title style</a:t>
             </a:r>
-            <a:endParaRPr lang="en-US"/>
           </a:p>
         </p:txBody>
       </p:sp>
@@ -7640,38 +7594,37 @@
           <a:p>
             <a:pPr lvl="0"/>
             <a:r>
-              <a:rPr lang="en-US" smtClean="0"/>
+              <a:rPr lang="en-US"/>
               <a:t>Click to edit Master text styles</a:t>
             </a:r>
           </a:p>
           <a:p>
             <a:pPr lvl="1"/>
             <a:r>
-              <a:rPr lang="en-US" smtClean="0"/>
+              <a:rPr lang="en-US"/>
               <a:t>Second level</a:t>
             </a:r>
           </a:p>
           <a:p>
             <a:pPr lvl="2"/>
             <a:r>
-              <a:rPr lang="en-US" smtClean="0"/>
+              <a:rPr lang="en-US"/>
               <a:t>Third level</a:t>
             </a:r>
           </a:p>
           <a:p>
             <a:pPr lvl="3"/>
             <a:r>
-              <a:rPr lang="en-US" smtClean="0"/>
+              <a:rPr lang="en-US"/>
               <a:t>Fourth level</a:t>
             </a:r>
           </a:p>
           <a:p>
             <a:pPr lvl="4"/>
             <a:r>
-              <a:rPr lang="en-US" smtClean="0"/>
+              <a:rPr lang="en-US"/>
               <a:t>Fifth level</a:t>
             </a:r>
-            <a:endParaRPr lang="en-US"/>
           </a:p>
         </p:txBody>
       </p:sp>
@@ -7692,7 +7645,7 @@
           <a:p>
             <a:fld id="{699DC775-C286-4358-8C92-D7E584E969B3}" type="datetimeFigureOut">
               <a:rPr lang="en-US" smtClean="0"/>
-              <a:t>4/10/2018</a:t>
+              <a:t>1/27/2019</a:t>
             </a:fld>
             <a:endParaRPr lang="en-US"/>
           </a:p>
@@ -7786,10 +7739,9 @@
           <a:lstStyle/>
           <a:p>
             <a:r>
-              <a:rPr lang="en-US" smtClean="0"/>
+              <a:rPr lang="en-US"/>
               <a:t>Click to edit Master title style</a:t>
             </a:r>
-            <a:endParaRPr lang="en-US"/>
           </a:p>
         </p:txBody>
       </p:sp>
@@ -7843,38 +7795,37 @@
           <a:p>
             <a:pPr lvl="0"/>
             <a:r>
-              <a:rPr lang="en-US" smtClean="0"/>
+              <a:rPr lang="en-US"/>
               <a:t>Click to edit Master text styles</a:t>
             </a:r>
           </a:p>
           <a:p>
             <a:pPr lvl="1"/>
             <a:r>
-              <a:rPr lang="en-US" smtClean="0"/>
+              <a:rPr lang="en-US"/>
               <a:t>Second level</a:t>
             </a:r>
           </a:p>
           <a:p>
             <a:pPr lvl="2"/>
             <a:r>
-              <a:rPr lang="en-US" smtClean="0"/>
+              <a:rPr lang="en-US"/>
               <a:t>Third level</a:t>
             </a:r>
           </a:p>
           <a:p>
             <a:pPr lvl="3"/>
             <a:r>
-              <a:rPr lang="en-US" smtClean="0"/>
+              <a:rPr lang="en-US"/>
               <a:t>Fourth level</a:t>
             </a:r>
           </a:p>
           <a:p>
             <a:pPr lvl="4"/>
             <a:r>
-              <a:rPr lang="en-US" smtClean="0"/>
+              <a:rPr lang="en-US"/>
               <a:t>Fifth level</a:t>
             </a:r>
-            <a:endParaRPr lang="en-US"/>
           </a:p>
         </p:txBody>
       </p:sp>
@@ -7928,38 +7879,37 @@
           <a:p>
             <a:pPr lvl="0"/>
             <a:r>
-              <a:rPr lang="en-US" smtClean="0"/>
+              <a:rPr lang="en-US"/>
               <a:t>Click to edit Master text styles</a:t>
             </a:r>
           </a:p>
           <a:p>
             <a:pPr lvl="1"/>
             <a:r>
-              <a:rPr lang="en-US" smtClean="0"/>
+              <a:rPr lang="en-US"/>
               <a:t>Second level</a:t>
             </a:r>
           </a:p>
           <a:p>
             <a:pPr lvl="2"/>
             <a:r>
-              <a:rPr lang="en-US" smtClean="0"/>
+              <a:rPr lang="en-US"/>
               <a:t>Third level</a:t>
             </a:r>
           </a:p>
           <a:p>
             <a:pPr lvl="3"/>
             <a:r>
-              <a:rPr lang="en-US" smtClean="0"/>
+              <a:rPr lang="en-US"/>
               <a:t>Fourth level</a:t>
             </a:r>
           </a:p>
           <a:p>
             <a:pPr lvl="4"/>
             <a:r>
-              <a:rPr lang="en-US" smtClean="0"/>
+              <a:rPr lang="en-US"/>
               <a:t>Fifth level</a:t>
             </a:r>
-            <a:endParaRPr lang="en-US"/>
           </a:p>
         </p:txBody>
       </p:sp>
@@ -7980,7 +7930,7 @@
           <a:p>
             <a:fld id="{699DC775-C286-4358-8C92-D7E584E969B3}" type="datetimeFigureOut">
               <a:rPr lang="en-US" smtClean="0"/>
-              <a:t>4/10/2018</a:t>
+              <a:t>1/27/2019</a:t>
             </a:fld>
             <a:endParaRPr lang="en-US"/>
           </a:p>
@@ -8078,10 +8028,9 @@
           </a:lstStyle>
           <a:p>
             <a:r>
-              <a:rPr lang="en-US" smtClean="0"/>
+              <a:rPr lang="en-US"/>
               <a:t>Click to edit Master title style</a:t>
             </a:r>
-            <a:endParaRPr lang="en-US"/>
           </a:p>
         </p:txBody>
       </p:sp>
@@ -8144,7 +8093,7 @@
           <a:p>
             <a:pPr lvl="0"/>
             <a:r>
-              <a:rPr lang="en-US" smtClean="0"/>
+              <a:rPr lang="en-US"/>
               <a:t>Click to edit Master text styles</a:t>
             </a:r>
           </a:p>
@@ -8200,38 +8149,37 @@
           <a:p>
             <a:pPr lvl="0"/>
             <a:r>
-              <a:rPr lang="en-US" smtClean="0"/>
+              <a:rPr lang="en-US"/>
               <a:t>Click to edit Master text styles</a:t>
             </a:r>
           </a:p>
           <a:p>
             <a:pPr lvl="1"/>
             <a:r>
-              <a:rPr lang="en-US" smtClean="0"/>
+              <a:rPr lang="en-US"/>
               <a:t>Second level</a:t>
             </a:r>
           </a:p>
           <a:p>
             <a:pPr lvl="2"/>
             <a:r>
-              <a:rPr lang="en-US" smtClean="0"/>
+              <a:rPr lang="en-US"/>
               <a:t>Third level</a:t>
             </a:r>
           </a:p>
           <a:p>
             <a:pPr lvl="3"/>
             <a:r>
-              <a:rPr lang="en-US" smtClean="0"/>
+              <a:rPr lang="en-US"/>
               <a:t>Fourth level</a:t>
             </a:r>
           </a:p>
           <a:p>
             <a:pPr lvl="4"/>
             <a:r>
-              <a:rPr lang="en-US" smtClean="0"/>
+              <a:rPr lang="en-US"/>
               <a:t>Fifth level</a:t>
             </a:r>
-            <a:endParaRPr lang="en-US"/>
           </a:p>
         </p:txBody>
       </p:sp>
@@ -8294,7 +8242,7 @@
           <a:p>
             <a:pPr lvl="0"/>
             <a:r>
-              <a:rPr lang="en-US" smtClean="0"/>
+              <a:rPr lang="en-US"/>
               <a:t>Click to edit Master text styles</a:t>
             </a:r>
           </a:p>
@@ -8350,38 +8298,37 @@
           <a:p>
             <a:pPr lvl="0"/>
             <a:r>
-              <a:rPr lang="en-US" smtClean="0"/>
+              <a:rPr lang="en-US"/>
               <a:t>Click to edit Master text styles</a:t>
             </a:r>
           </a:p>
           <a:p>
             <a:pPr lvl="1"/>
             <a:r>
-              <a:rPr lang="en-US" smtClean="0"/>
+              <a:rPr lang="en-US"/>
               <a:t>Second level</a:t>
             </a:r>
           </a:p>
           <a:p>
             <a:pPr lvl="2"/>
             <a:r>
-              <a:rPr lang="en-US" smtClean="0"/>
+              <a:rPr lang="en-US"/>
               <a:t>Third level</a:t>
             </a:r>
           </a:p>
           <a:p>
             <a:pPr lvl="3"/>
             <a:r>
-              <a:rPr lang="en-US" smtClean="0"/>
+              <a:rPr lang="en-US"/>
               <a:t>Fourth level</a:t>
             </a:r>
           </a:p>
           <a:p>
             <a:pPr lvl="4"/>
             <a:r>
-              <a:rPr lang="en-US" smtClean="0"/>
+              <a:rPr lang="en-US"/>
               <a:t>Fifth level</a:t>
             </a:r>
-            <a:endParaRPr lang="en-US"/>
           </a:p>
         </p:txBody>
       </p:sp>
@@ -8402,7 +8349,7 @@
           <a:p>
             <a:fld id="{699DC775-C286-4358-8C92-D7E584E969B3}" type="datetimeFigureOut">
               <a:rPr lang="en-US" smtClean="0"/>
-              <a:t>4/10/2018</a:t>
+              <a:t>1/27/2019</a:t>
             </a:fld>
             <a:endParaRPr lang="en-US"/>
           </a:p>
@@ -8496,10 +8443,9 @@
           <a:lstStyle/>
           <a:p>
             <a:r>
-              <a:rPr lang="en-US" smtClean="0"/>
+              <a:rPr lang="en-US"/>
               <a:t>Click to edit Master title style</a:t>
             </a:r>
-            <a:endParaRPr lang="en-US"/>
           </a:p>
         </p:txBody>
       </p:sp>
@@ -8520,7 +8466,7 @@
           <a:p>
             <a:fld id="{699DC775-C286-4358-8C92-D7E584E969B3}" type="datetimeFigureOut">
               <a:rPr lang="en-US" smtClean="0"/>
-              <a:t>4/10/2018</a:t>
+              <a:t>1/27/2019</a:t>
             </a:fld>
             <a:endParaRPr lang="en-US"/>
           </a:p>
@@ -8615,7 +8561,7 @@
           <a:p>
             <a:fld id="{699DC775-C286-4358-8C92-D7E584E969B3}" type="datetimeFigureOut">
               <a:rPr lang="en-US" smtClean="0"/>
-              <a:t>4/10/2018</a:t>
+              <a:t>1/27/2019</a:t>
             </a:fld>
             <a:endParaRPr lang="en-US"/>
           </a:p>
@@ -8718,10 +8664,9 @@
           </a:lstStyle>
           <a:p>
             <a:r>
-              <a:rPr lang="en-US" smtClean="0"/>
+              <a:rPr lang="en-US"/>
               <a:t>Click to edit Master title style</a:t>
             </a:r>
-            <a:endParaRPr lang="en-US"/>
           </a:p>
         </p:txBody>
       </p:sp>
@@ -8775,38 +8720,37 @@
           <a:p>
             <a:pPr lvl="0"/>
             <a:r>
-              <a:rPr lang="en-US" smtClean="0"/>
+              <a:rPr lang="en-US"/>
               <a:t>Click to edit Master text styles</a:t>
             </a:r>
           </a:p>
           <a:p>
             <a:pPr lvl="1"/>
             <a:r>
-              <a:rPr lang="en-US" smtClean="0"/>
+              <a:rPr lang="en-US"/>
               <a:t>Second level</a:t>
             </a:r>
           </a:p>
           <a:p>
             <a:pPr lvl="2"/>
             <a:r>
-              <a:rPr lang="en-US" smtClean="0"/>
+              <a:rPr lang="en-US"/>
               <a:t>Third level</a:t>
             </a:r>
           </a:p>
           <a:p>
             <a:pPr lvl="3"/>
             <a:r>
-              <a:rPr lang="en-US" smtClean="0"/>
+              <a:rPr lang="en-US"/>
               <a:t>Fourth level</a:t>
             </a:r>
           </a:p>
           <a:p>
             <a:pPr lvl="4"/>
             <a:r>
-              <a:rPr lang="en-US" smtClean="0"/>
+              <a:rPr lang="en-US"/>
               <a:t>Fifth level</a:t>
             </a:r>
-            <a:endParaRPr lang="en-US"/>
           </a:p>
         </p:txBody>
       </p:sp>
@@ -8869,7 +8813,7 @@
           <a:p>
             <a:pPr lvl="0"/>
             <a:r>
-              <a:rPr lang="en-US" smtClean="0"/>
+              <a:rPr lang="en-US"/>
               <a:t>Click to edit Master text styles</a:t>
             </a:r>
           </a:p>
@@ -8892,7 +8836,7 @@
           <a:p>
             <a:fld id="{699DC775-C286-4358-8C92-D7E584E969B3}" type="datetimeFigureOut">
               <a:rPr lang="en-US" smtClean="0"/>
-              <a:t>4/10/2018</a:t>
+              <a:t>1/27/2019</a:t>
             </a:fld>
             <a:endParaRPr lang="en-US"/>
           </a:p>
@@ -8995,10 +8939,9 @@
           </a:lstStyle>
           <a:p>
             <a:r>
-              <a:rPr lang="en-US" smtClean="0"/>
+              <a:rPr lang="en-US"/>
               <a:t>Click to edit Master title style</a:t>
             </a:r>
-            <a:endParaRPr lang="en-US"/>
           </a:p>
         </p:txBody>
       </p:sp>
@@ -9122,7 +9065,7 @@
           <a:p>
             <a:pPr lvl="0"/>
             <a:r>
-              <a:rPr lang="en-US" smtClean="0"/>
+              <a:rPr lang="en-US"/>
               <a:t>Click to edit Master text styles</a:t>
             </a:r>
           </a:p>
@@ -9145,7 +9088,7 @@
           <a:p>
             <a:fld id="{699DC775-C286-4358-8C92-D7E584E969B3}" type="datetimeFigureOut">
               <a:rPr lang="en-US" smtClean="0"/>
-              <a:t>4/10/2018</a:t>
+              <a:t>1/27/2019</a:t>
             </a:fld>
             <a:endParaRPr lang="en-US"/>
           </a:p>
@@ -9254,10 +9197,9 @@
           <a:lstStyle/>
           <a:p>
             <a:r>
-              <a:rPr lang="en-US" smtClean="0"/>
+              <a:rPr lang="en-US"/>
               <a:t>Click to edit Master title style</a:t>
             </a:r>
-            <a:endParaRPr lang="en-US"/>
           </a:p>
         </p:txBody>
       </p:sp>
@@ -9288,38 +9230,37 @@
           <a:p>
             <a:pPr lvl="0"/>
             <a:r>
-              <a:rPr lang="en-US" smtClean="0"/>
+              <a:rPr lang="en-US"/>
               <a:t>Click to edit Master text styles</a:t>
             </a:r>
           </a:p>
           <a:p>
             <a:pPr lvl="1"/>
             <a:r>
-              <a:rPr lang="en-US" smtClean="0"/>
+              <a:rPr lang="en-US"/>
               <a:t>Second level</a:t>
             </a:r>
           </a:p>
           <a:p>
             <a:pPr lvl="2"/>
             <a:r>
-              <a:rPr lang="en-US" smtClean="0"/>
+              <a:rPr lang="en-US"/>
               <a:t>Third level</a:t>
             </a:r>
           </a:p>
           <a:p>
             <a:pPr lvl="3"/>
             <a:r>
-              <a:rPr lang="en-US" smtClean="0"/>
+              <a:rPr lang="en-US"/>
               <a:t>Fourth level</a:t>
             </a:r>
           </a:p>
           <a:p>
             <a:pPr lvl="4"/>
             <a:r>
-              <a:rPr lang="en-US" smtClean="0"/>
+              <a:rPr lang="en-US"/>
               <a:t>Fifth level</a:t>
             </a:r>
-            <a:endParaRPr lang="en-US"/>
           </a:p>
         </p:txBody>
       </p:sp>
@@ -9358,7 +9299,7 @@
           <a:p>
             <a:fld id="{699DC775-C286-4358-8C92-D7E584E969B3}" type="datetimeFigureOut">
               <a:rPr lang="en-US" smtClean="0"/>
-              <a:t>4/10/2018</a:t>
+              <a:t>1/27/2019</a:t>
             </a:fld>
             <a:endParaRPr lang="en-US"/>
           </a:p>
@@ -9769,10 +9710,9 @@
           <a:lstStyle/>
           <a:p>
             <a:r>
-              <a:rPr lang="en-US" smtClean="0"/>
+              <a:rPr lang="en-US"/>
               <a:t>Click to edit Master title style</a:t>
             </a:r>
-            <a:endParaRPr lang="en-US"/>
           </a:p>
         </p:txBody>
       </p:sp>
@@ -9803,38 +9743,37 @@
           <a:p>
             <a:pPr lvl="0"/>
             <a:r>
-              <a:rPr lang="en-US" smtClean="0"/>
+              <a:rPr lang="en-US"/>
               <a:t>Click to edit Master text styles</a:t>
             </a:r>
           </a:p>
           <a:p>
             <a:pPr lvl="1"/>
             <a:r>
-              <a:rPr lang="en-US" smtClean="0"/>
+              <a:rPr lang="en-US"/>
               <a:t>Second level</a:t>
             </a:r>
           </a:p>
           <a:p>
             <a:pPr lvl="2"/>
             <a:r>
-              <a:rPr lang="en-US" smtClean="0"/>
+              <a:rPr lang="en-US"/>
               <a:t>Third level</a:t>
             </a:r>
           </a:p>
           <a:p>
             <a:pPr lvl="3"/>
             <a:r>
-              <a:rPr lang="en-US" smtClean="0"/>
+              <a:rPr lang="en-US"/>
               <a:t>Fourth level</a:t>
             </a:r>
           </a:p>
           <a:p>
             <a:pPr lvl="4"/>
             <a:r>
-              <a:rPr lang="en-US" smtClean="0"/>
+              <a:rPr lang="en-US"/>
               <a:t>Fifth level</a:t>
             </a:r>
-            <a:endParaRPr lang="en-US"/>
           </a:p>
         </p:txBody>
       </p:sp>
@@ -9873,7 +9812,7 @@
           <a:p>
             <a:fld id="{699DC775-C286-4358-8C92-D7E584E969B3}" type="datetimeFigureOut">
               <a:rPr lang="en-US" smtClean="0"/>
-              <a:t>4/10/2018</a:t>
+              <a:t>1/27/2019</a:t>
             </a:fld>
             <a:endParaRPr lang="en-US"/>
           </a:p>
@@ -10282,10 +10221,9 @@
           <a:lstStyle/>
           <a:p>
             <a:r>
-              <a:rPr lang="en-US" dirty="0" smtClean="0"/>
+              <a:rPr lang="en-US" dirty="0"/>
               <a:t>Click to edit Master title style</a:t>
             </a:r>
-            <a:endParaRPr lang="en-US" dirty="0"/>
           </a:p>
         </p:txBody>
       </p:sp>
@@ -10316,38 +10254,37 @@
           <a:p>
             <a:pPr lvl="0"/>
             <a:r>
-              <a:rPr lang="en-US" smtClean="0"/>
+              <a:rPr lang="en-US"/>
               <a:t>Click to edit Master text styles</a:t>
             </a:r>
           </a:p>
           <a:p>
             <a:pPr lvl="1"/>
             <a:r>
-              <a:rPr lang="en-US" smtClean="0"/>
+              <a:rPr lang="en-US"/>
               <a:t>Second level</a:t>
             </a:r>
           </a:p>
           <a:p>
             <a:pPr lvl="2"/>
             <a:r>
-              <a:rPr lang="en-US" smtClean="0"/>
+              <a:rPr lang="en-US"/>
               <a:t>Third level</a:t>
             </a:r>
           </a:p>
           <a:p>
             <a:pPr lvl="3"/>
             <a:r>
-              <a:rPr lang="en-US" smtClean="0"/>
+              <a:rPr lang="en-US"/>
               <a:t>Fourth level</a:t>
             </a:r>
           </a:p>
           <a:p>
             <a:pPr lvl="4"/>
             <a:r>
-              <a:rPr lang="en-US" smtClean="0"/>
+              <a:rPr lang="en-US"/>
               <a:t>Fifth level</a:t>
             </a:r>
-            <a:endParaRPr lang="en-US"/>
           </a:p>
         </p:txBody>
       </p:sp>
@@ -10386,7 +10323,7 @@
           <a:p>
             <a:fld id="{699DC775-C286-4358-8C92-D7E584E969B3}" type="datetimeFigureOut">
               <a:rPr lang="en-US" smtClean="0"/>
-              <a:t>4/10/2018</a:t>
+              <a:t>1/27/2019</a:t>
             </a:fld>
             <a:endParaRPr lang="en-US"/>
           </a:p>
@@ -10779,7 +10716,7 @@
           <a:lstStyle/>
           <a:p>
             <a:r>
-              <a:rPr lang="en-US" sz="5400" b="1" dirty="0" err="1" smtClean="0">
+              <a:rPr lang="en-US" sz="5400" b="1" dirty="0" err="1">
                 <a:solidFill>
                   <a:schemeClr val="accent6">
                     <a:lumMod val="75000"/>
@@ -10789,7 +10726,7 @@
               <a:t>PowerPointLabs</a:t>
             </a:r>
             <a:r>
-              <a:rPr lang="en-US" sz="5400" b="1" dirty="0" smtClean="0">
+              <a:rPr lang="en-US" sz="5400" b="1" dirty="0">
                 <a:solidFill>
                   <a:schemeClr val="accent6">
                     <a:lumMod val="75000"/>
@@ -10827,7 +10764,7 @@
               <a:buNone/>
             </a:pPr>
             <a:r>
-              <a:rPr lang="en-US" b="1" dirty="0" smtClean="0">
+              <a:rPr lang="en-US" b="1" dirty="0">
                 <a:solidFill>
                   <a:srgbClr val="0070C0"/>
                 </a:solidFill>
@@ -10838,34 +10775,21 @@
           <a:p>
             <a:pPr marL="285750" indent="-285750"/>
             <a:r>
-              <a:rPr lang="en-US" b="1" dirty="0" smtClean="0">
-                <a:solidFill>
-                  <a:srgbClr val="0070C0"/>
-                </a:solidFill>
-              </a:rPr>
-              <a:t>DO </a:t>
-            </a:r>
-            <a:r>
               <a:rPr lang="en-US" b="1" dirty="0">
                 <a:solidFill>
                   <a:srgbClr val="0070C0"/>
                 </a:solidFill>
               </a:rPr>
-              <a:t>NOT SAVE </a:t>
-            </a:r>
-            <a:r>
-              <a:rPr lang="en-US" dirty="0" smtClean="0">
+              <a:t>DO NOT SAVE </a:t>
+            </a:r>
+            <a:r>
+              <a:rPr lang="en-US" dirty="0">
                 <a:solidFill>
                   <a:srgbClr val="0070C0"/>
                 </a:solidFill>
               </a:rPr>
               <a:t>these slides after testing. Keep this file in its original form.</a:t>
             </a:r>
-            <a:endParaRPr lang="en-US" dirty="0">
-              <a:solidFill>
-                <a:srgbClr val="0070C0"/>
-              </a:solidFill>
-            </a:endParaRPr>
           </a:p>
           <a:p>
             <a:pPr marL="285750" indent="-285750"/>
@@ -10875,47 +10799,7 @@
                   <a:srgbClr val="0070C0"/>
                 </a:solidFill>
               </a:rPr>
-              <a:t>If </a:t>
-            </a:r>
-            <a:r>
-              <a:rPr lang="en-US" dirty="0" smtClean="0">
-                <a:solidFill>
-                  <a:srgbClr val="0070C0"/>
-                </a:solidFill>
-              </a:rPr>
-              <a:t>your </a:t>
-            </a:r>
-            <a:r>
-              <a:rPr lang="en-US" dirty="0">
-                <a:solidFill>
-                  <a:srgbClr val="0070C0"/>
-                </a:solidFill>
-              </a:rPr>
-              <a:t>result </a:t>
-            </a:r>
-            <a:r>
-              <a:rPr lang="en-US" dirty="0" smtClean="0">
-                <a:solidFill>
-                  <a:srgbClr val="0070C0"/>
-                </a:solidFill>
-              </a:rPr>
-              <a:t>is different from the </a:t>
-            </a:r>
-            <a:r>
-              <a:rPr lang="en-US" dirty="0">
-                <a:solidFill>
-                  <a:srgbClr val="0070C0"/>
-                </a:solidFill>
-              </a:rPr>
-              <a:t>expected output, </a:t>
-            </a:r>
-            <a:r>
-              <a:rPr lang="en-US" dirty="0" smtClean="0">
-                <a:solidFill>
-                  <a:srgbClr val="0070C0"/>
-                </a:solidFill>
-              </a:rPr>
-              <a:t>please submit a bug report (attach slides/screenshots as necessary).</a:t>
+              <a:t>If your result is different from the expected output, please submit a bug report (attach slides/screenshots as necessary).</a:t>
             </a:r>
             <a:endParaRPr lang="en-SG" dirty="0">
               <a:solidFill>
@@ -10938,17 +10822,171 @@
   <p:clrMapOvr>
     <a:masterClrMapping/>
   </p:clrMapOvr>
-  <p:timing>
-    <p:tnLst>
-      <p:par>
-        <p:cTn id="1" dur="indefinite" restart="never" nodeType="tmRoot"/>
-      </p:par>
-    </p:tnLst>
-  </p:timing>
 </p:sld>
 </file>
 
 <file path=ppt/slides/slide10.xml><?xml version="1.0" encoding="utf-8"?>
+<p:sld xmlns:a="http://schemas.openxmlformats.org/drawingml/2006/main" xmlns:r="http://schemas.openxmlformats.org/officeDocument/2006/relationships" xmlns:p="http://schemas.openxmlformats.org/presentationml/2006/main">
+  <p:cSld>
+    <p:spTree>
+      <p:nvGrpSpPr>
+        <p:cNvPr id="1" name=""/>
+        <p:cNvGrpSpPr/>
+        <p:nvPr/>
+      </p:nvGrpSpPr>
+      <p:grpSpPr>
+        <a:xfrm>
+          <a:off x="0" y="0"/>
+          <a:ext cx="0" cy="0"/>
+          <a:chOff x="0" y="0"/>
+          <a:chExt cx="0" cy="0"/>
+        </a:xfrm>
+      </p:grpSpPr>
+      <p:sp>
+        <p:nvSpPr>
+          <p:cNvPr id="2" name="Title 1"/>
+          <p:cNvSpPr>
+            <a:spLocks noGrp="1"/>
+          </p:cNvSpPr>
+          <p:nvPr>
+            <p:ph type="title"/>
+          </p:nvPr>
+        </p:nvSpPr>
+        <p:spPr>
+          <a:xfrm>
+            <a:off x="381000" y="609600"/>
+            <a:ext cx="8229600" cy="1143000"/>
+          </a:xfrm>
+        </p:spPr>
+        <p:txBody>
+          <a:bodyPr>
+            <a:noAutofit/>
+          </a:bodyPr>
+          <a:lstStyle/>
+          <a:p>
+            <a:pPr algn="l"/>
+            <a:r>
+              <a:rPr lang="en-US" sz="7200" dirty="0" err="1">
+                <a:solidFill>
+                  <a:schemeClr val="bg1"/>
+                </a:solidFill>
+              </a:rPr>
+              <a:t>IsClipboardRestored</a:t>
+            </a:r>
+            <a:endParaRPr lang="en-SG" sz="7200" dirty="0">
+              <a:solidFill>
+                <a:schemeClr val="bg1"/>
+              </a:solidFill>
+            </a:endParaRPr>
+          </a:p>
+        </p:txBody>
+      </p:sp>
+      <p:sp>
+        <p:nvSpPr>
+          <p:cNvPr id="3" name="TextBox 2"/>
+          <p:cNvSpPr txBox="1"/>
+          <p:nvPr/>
+        </p:nvSpPr>
+        <p:spPr>
+          <a:xfrm>
+            <a:off x="381000" y="2057400"/>
+            <a:ext cx="8229600" cy="3539430"/>
+          </a:xfrm>
+          <a:prstGeom prst="rect">
+            <a:avLst/>
+          </a:prstGeom>
+          <a:noFill/>
+        </p:spPr>
+        <p:txBody>
+          <a:bodyPr wrap="square" rtlCol="0">
+            <a:spAutoFit/>
+          </a:bodyPr>
+          <a:lstStyle/>
+          <a:p>
+            <a:r>
+              <a:rPr lang="en-US" altLang="zh-CN" sz="2800" dirty="0">
+                <a:solidFill>
+                  <a:schemeClr val="bg1"/>
+                </a:solidFill>
+              </a:rPr>
+              <a:t>Add those shapes in slide 3 to Shapes Lab;</a:t>
+            </a:r>
+          </a:p>
+          <a:p>
+            <a:r>
+              <a:rPr lang="en-US" altLang="zh-CN" sz="2800" dirty="0">
+                <a:solidFill>
+                  <a:schemeClr val="bg1"/>
+                </a:solidFill>
+              </a:rPr>
+              <a:t>Add added shapes in Shapes Lab to slide 4;</a:t>
+            </a:r>
+          </a:p>
+          <a:p>
+            <a:r>
+              <a:rPr lang="en-US" altLang="zh-CN" sz="2800" dirty="0">
+                <a:solidFill>
+                  <a:schemeClr val="bg1"/>
+                </a:solidFill>
+              </a:rPr>
+              <a:t>Compare slide 4 and expected slide 5</a:t>
+            </a:r>
+          </a:p>
+          <a:p>
+            <a:endParaRPr lang="en-US" altLang="zh-CN" sz="2800" dirty="0">
+              <a:solidFill>
+                <a:schemeClr val="bg1"/>
+              </a:solidFill>
+            </a:endParaRPr>
+          </a:p>
+          <a:p>
+            <a:r>
+              <a:rPr lang="en-US" altLang="zh-CN" sz="2800" dirty="0">
+                <a:solidFill>
+                  <a:schemeClr val="bg1"/>
+                </a:solidFill>
+              </a:rPr>
+              <a:t>Repeat for testing Add Shapes button on Shapes Lab pane from slides 6 to 8</a:t>
+            </a:r>
+          </a:p>
+          <a:p>
+            <a:endParaRPr lang="en-US" altLang="zh-CN" sz="2800" dirty="0">
+              <a:solidFill>
+                <a:schemeClr val="bg1"/>
+              </a:solidFill>
+            </a:endParaRPr>
+          </a:p>
+          <a:p>
+            <a:r>
+              <a:rPr lang="en-US" altLang="zh-CN" sz="2800" dirty="0">
+                <a:solidFill>
+                  <a:schemeClr val="bg1"/>
+                </a:solidFill>
+              </a:rPr>
+              <a:t>Animations are also expected to be transferred</a:t>
+            </a:r>
+            <a:endParaRPr lang="zh-CN" altLang="en-US" sz="2800" dirty="0">
+              <a:solidFill>
+                <a:schemeClr val="bg1"/>
+              </a:solidFill>
+            </a:endParaRPr>
+          </a:p>
+        </p:txBody>
+      </p:sp>
+    </p:spTree>
+    <p:extLst>
+      <p:ext uri="{BB962C8B-B14F-4D97-AF65-F5344CB8AC3E}">
+        <p14:creationId xmlns:p14="http://schemas.microsoft.com/office/powerpoint/2010/main" val="3646993363"/>
+      </p:ext>
+    </p:extLst>
+  </p:cSld>
+  <p:clrMapOvr>
+    <a:masterClrMapping/>
+  </p:clrMapOvr>
+</p:sld>
+</file>
+
+<file path=ppt/slides/slide11.xml><?xml version="1.0" encoding="utf-8"?>
 <p:sld xmlns:a="http://schemas.openxmlformats.org/drawingml/2006/main" xmlns:r="http://schemas.openxmlformats.org/officeDocument/2006/relationships" xmlns:p="http://schemas.openxmlformats.org/presentationml/2006/main">
   <p:cSld>
     <p:spTree>
@@ -11010,7 +11048,7 @@
           <a:p>
             <a:pPr algn="ctr"/>
             <a:r>
-              <a:rPr lang="en-US" altLang="zh-CN" sz="6600" dirty="0" smtClean="0">
+              <a:rPr lang="en-US" altLang="zh-CN" sz="6600" dirty="0">
                 <a:solidFill>
                   <a:srgbClr val="EB7561"/>
                 </a:solidFill>
@@ -11498,7 +11536,7 @@
 </p:sld>
 </file>
 
-<file path=ppt/slides/slide11.xml><?xml version="1.0" encoding="utf-8"?>
+<file path=ppt/slides/slide12.xml><?xml version="1.0" encoding="utf-8"?>
 <p:sld xmlns:a="http://schemas.openxmlformats.org/drawingml/2006/main" xmlns:r="http://schemas.openxmlformats.org/officeDocument/2006/relationships" xmlns:p="http://schemas.openxmlformats.org/presentationml/2006/main">
   <p:cSld>
     <p:spTree>
@@ -11525,17 +11563,10 @@
   <p:clrMapOvr>
     <a:masterClrMapping/>
   </p:clrMapOvr>
-  <p:timing>
-    <p:tnLst>
-      <p:par>
-        <p:cTn id="1" dur="indefinite" restart="never" nodeType="tmRoot"/>
-      </p:par>
-    </p:tnLst>
-  </p:timing>
 </p:sld>
 </file>
 
-<file path=ppt/slides/slide12.xml><?xml version="1.0" encoding="utf-8"?>
+<file path=ppt/slides/slide13.xml><?xml version="1.0" encoding="utf-8"?>
 <p:sld xmlns:a="http://schemas.openxmlformats.org/drawingml/2006/main" xmlns:r="http://schemas.openxmlformats.org/officeDocument/2006/relationships" xmlns:p="http://schemas.openxmlformats.org/presentationml/2006/main">
   <p:cSld>
     <p:spTree>
@@ -11597,7 +11628,7 @@
           <a:p>
             <a:pPr algn="ctr"/>
             <a:r>
-              <a:rPr lang="en-US" altLang="zh-CN" sz="6600" dirty="0" smtClean="0">
+              <a:rPr lang="en-US" altLang="zh-CN" sz="6600" dirty="0">
                 <a:solidFill>
                   <a:srgbClr val="EB7561"/>
                 </a:solidFill>
@@ -11857,10 +11888,9 @@
           <a:lstStyle/>
           <a:p>
             <a:r>
-              <a:rPr lang="en-SG" dirty="0" smtClean="0"/>
+              <a:rPr lang="en-SG" dirty="0"/>
               <a:t>Expected slide</a:t>
             </a:r>
-            <a:endParaRPr lang="en-SG" dirty="0"/>
           </a:p>
         </p:txBody>
       </p:sp>
@@ -11868,552 +11898,6 @@
     <p:extLst>
       <p:ext uri="{BB962C8B-B14F-4D97-AF65-F5344CB8AC3E}">
         <p14:creationId xmlns:p14="http://schemas.microsoft.com/office/powerpoint/2010/main" val="2562146180"/>
-      </p:ext>
-    </p:extLst>
-  </p:cSld>
-  <p:clrMapOvr>
-    <a:masterClrMapping/>
-  </p:clrMapOvr>
-  <p:timing>
-    <p:tnLst>
-      <p:par>
-        <p:cTn id="1" dur="indefinite" restart="never" nodeType="tmRoot">
-          <p:childTnLst>
-            <p:seq concurrent="1" nextAc="seek">
-              <p:cTn id="2" dur="indefinite" nodeType="mainSeq">
-                <p:childTnLst>
-                  <p:par>
-                    <p:cTn id="3" fill="hold">
-                      <p:stCondLst>
-                        <p:cond delay="indefinite"/>
-                      </p:stCondLst>
-                      <p:childTnLst>
-                        <p:par>
-                          <p:cTn id="4" fill="hold">
-                            <p:stCondLst>
-                              <p:cond delay="0"/>
-                            </p:stCondLst>
-                            <p:childTnLst>
-                              <p:par>
-                                <p:cTn id="5" presetID="2" presetClass="entr" presetSubtype="4" fill="hold" grpId="0" nodeType="clickEffect">
-                                  <p:stCondLst>
-                                    <p:cond delay="0"/>
-                                  </p:stCondLst>
-                                  <p:childTnLst>
-                                    <p:set>
-                                      <p:cBhvr>
-                                        <p:cTn id="6" dur="1" fill="hold">
-                                          <p:stCondLst>
-                                            <p:cond delay="0"/>
-                                          </p:stCondLst>
-                                        </p:cTn>
-                                        <p:tgtEl>
-                                          <p:spTgt spid="3"/>
-                                        </p:tgtEl>
-                                        <p:attrNameLst>
-                                          <p:attrName>style.visibility</p:attrName>
-                                        </p:attrNameLst>
-                                      </p:cBhvr>
-                                      <p:to>
-                                        <p:strVal val="visible"/>
-                                      </p:to>
-                                    </p:set>
-                                    <p:anim calcmode="lin" valueType="num">
-                                      <p:cBhvr additive="base">
-                                        <p:cTn id="7" dur="500" fill="hold"/>
-                                        <p:tgtEl>
-                                          <p:spTgt spid="3"/>
-                                        </p:tgtEl>
-                                        <p:attrNameLst>
-                                          <p:attrName>ppt_x</p:attrName>
-                                        </p:attrNameLst>
-                                      </p:cBhvr>
-                                      <p:tavLst>
-                                        <p:tav tm="0">
-                                          <p:val>
-                                            <p:strVal val="#ppt_x"/>
-                                          </p:val>
-                                        </p:tav>
-                                        <p:tav tm="100000">
-                                          <p:val>
-                                            <p:strVal val="#ppt_x"/>
-                                          </p:val>
-                                        </p:tav>
-                                      </p:tavLst>
-                                    </p:anim>
-                                    <p:anim calcmode="lin" valueType="num">
-                                      <p:cBhvr additive="base">
-                                        <p:cTn id="8" dur="500" fill="hold"/>
-                                        <p:tgtEl>
-                                          <p:spTgt spid="3"/>
-                                        </p:tgtEl>
-                                        <p:attrNameLst>
-                                          <p:attrName>ppt_y</p:attrName>
-                                        </p:attrNameLst>
-                                      </p:cBhvr>
-                                      <p:tavLst>
-                                        <p:tav tm="0">
-                                          <p:val>
-                                            <p:strVal val="1+#ppt_h/2"/>
-                                          </p:val>
-                                        </p:tav>
-                                        <p:tav tm="100000">
-                                          <p:val>
-                                            <p:strVal val="#ppt_y"/>
-                                          </p:val>
-                                        </p:tav>
-                                      </p:tavLst>
-                                    </p:anim>
-                                  </p:childTnLst>
-                                </p:cTn>
-                              </p:par>
-                            </p:childTnLst>
-                          </p:cTn>
-                        </p:par>
-                      </p:childTnLst>
-                    </p:cTn>
-                  </p:par>
-                  <p:par>
-                    <p:cTn id="9" fill="hold">
-                      <p:stCondLst>
-                        <p:cond delay="indefinite"/>
-                      </p:stCondLst>
-                      <p:childTnLst>
-                        <p:par>
-                          <p:cTn id="10" fill="hold">
-                            <p:stCondLst>
-                              <p:cond delay="0"/>
-                            </p:stCondLst>
-                            <p:childTnLst>
-                              <p:par>
-                                <p:cTn id="11" presetID="1" presetClass="entr" presetSubtype="0" fill="hold" grpId="0" nodeType="clickEffect">
-                                  <p:stCondLst>
-                                    <p:cond delay="0"/>
-                                  </p:stCondLst>
-                                  <p:childTnLst>
-                                    <p:set>
-                                      <p:cBhvr>
-                                        <p:cTn id="12" dur="1" fill="hold">
-                                          <p:stCondLst>
-                                            <p:cond delay="0"/>
-                                          </p:stCondLst>
-                                        </p:cTn>
-                                        <p:tgtEl>
-                                          <p:spTgt spid="5"/>
-                                        </p:tgtEl>
-                                        <p:attrNameLst>
-                                          <p:attrName>style.visibility</p:attrName>
-                                        </p:attrNameLst>
-                                      </p:cBhvr>
-                                      <p:to>
-                                        <p:strVal val="visible"/>
-                                      </p:to>
-                                    </p:set>
-                                  </p:childTnLst>
-                                </p:cTn>
-                              </p:par>
-                            </p:childTnLst>
-                          </p:cTn>
-                        </p:par>
-                      </p:childTnLst>
-                    </p:cTn>
-                  </p:par>
-                  <p:par>
-                    <p:cTn id="13" fill="hold">
-                      <p:stCondLst>
-                        <p:cond delay="indefinite"/>
-                      </p:stCondLst>
-                      <p:childTnLst>
-                        <p:par>
-                          <p:cTn id="14" fill="hold">
-                            <p:stCondLst>
-                              <p:cond delay="0"/>
-                            </p:stCondLst>
-                            <p:childTnLst>
-                              <p:par>
-                                <p:cTn id="15" presetID="10" presetClass="entr" presetSubtype="0" fill="hold" grpId="0" nodeType="clickEffect">
-                                  <p:stCondLst>
-                                    <p:cond delay="0"/>
-                                  </p:stCondLst>
-                                  <p:childTnLst>
-                                    <p:set>
-                                      <p:cBhvr>
-                                        <p:cTn id="16" dur="1" fill="hold">
-                                          <p:stCondLst>
-                                            <p:cond delay="0"/>
-                                          </p:stCondLst>
-                                        </p:cTn>
-                                        <p:tgtEl>
-                                          <p:spTgt spid="7"/>
-                                        </p:tgtEl>
-                                        <p:attrNameLst>
-                                          <p:attrName>style.visibility</p:attrName>
-                                        </p:attrNameLst>
-                                      </p:cBhvr>
-                                      <p:to>
-                                        <p:strVal val="visible"/>
-                                      </p:to>
-                                    </p:set>
-                                    <p:animEffect transition="in" filter="fade">
-                                      <p:cBhvr>
-                                        <p:cTn id="17" dur="500"/>
-                                        <p:tgtEl>
-                                          <p:spTgt spid="7"/>
-                                        </p:tgtEl>
-                                      </p:cBhvr>
-                                    </p:animEffect>
-                                  </p:childTnLst>
-                                </p:cTn>
-                              </p:par>
-                            </p:childTnLst>
-                          </p:cTn>
-                        </p:par>
-                      </p:childTnLst>
-                    </p:cTn>
-                  </p:par>
-                  <p:par>
-                    <p:cTn id="18" fill="hold">
-                      <p:stCondLst>
-                        <p:cond delay="indefinite"/>
-                      </p:stCondLst>
-                      <p:childTnLst>
-                        <p:par>
-                          <p:cTn id="19" fill="hold">
-                            <p:stCondLst>
-                              <p:cond delay="0"/>
-                            </p:stCondLst>
-                            <p:childTnLst>
-                              <p:par>
-                                <p:cTn id="20" presetID="16" presetClass="entr" presetSubtype="21" fill="hold" grpId="0" nodeType="clickEffect">
-                                  <p:stCondLst>
-                                    <p:cond delay="0"/>
-                                  </p:stCondLst>
-                                  <p:childTnLst>
-                                    <p:set>
-                                      <p:cBhvr>
-                                        <p:cTn id="21" dur="1" fill="hold">
-                                          <p:stCondLst>
-                                            <p:cond delay="0"/>
-                                          </p:stCondLst>
-                                        </p:cTn>
-                                        <p:tgtEl>
-                                          <p:spTgt spid="8"/>
-                                        </p:tgtEl>
-                                        <p:attrNameLst>
-                                          <p:attrName>style.visibility</p:attrName>
-                                        </p:attrNameLst>
-                                      </p:cBhvr>
-                                      <p:to>
-                                        <p:strVal val="visible"/>
-                                      </p:to>
-                                    </p:set>
-                                    <p:animEffect transition="in" filter="barn(inVertical)">
-                                      <p:cBhvr>
-                                        <p:cTn id="22" dur="500"/>
-                                        <p:tgtEl>
-                                          <p:spTgt spid="8"/>
-                                        </p:tgtEl>
-                                      </p:cBhvr>
-                                    </p:animEffect>
-                                  </p:childTnLst>
-                                </p:cTn>
-                              </p:par>
-                            </p:childTnLst>
-                          </p:cTn>
-                        </p:par>
-                      </p:childTnLst>
-                    </p:cTn>
-                  </p:par>
-                </p:childTnLst>
-              </p:cTn>
-              <p:prevCondLst>
-                <p:cond evt="onPrev" delay="0">
-                  <p:tgtEl>
-                    <p:sldTgt/>
-                  </p:tgtEl>
-                </p:cond>
-              </p:prevCondLst>
-              <p:nextCondLst>
-                <p:cond evt="onNext" delay="0">
-                  <p:tgtEl>
-                    <p:sldTgt/>
-                  </p:tgtEl>
-                </p:cond>
-              </p:nextCondLst>
-            </p:seq>
-          </p:childTnLst>
-        </p:cTn>
-      </p:par>
-    </p:tnLst>
-    <p:bldLst>
-      <p:bldP spid="3" grpId="0" animBg="1"/>
-      <p:bldP spid="5" grpId="0" animBg="1"/>
-      <p:bldP spid="7" grpId="0" animBg="1"/>
-      <p:bldP spid="8" grpId="0" animBg="1"/>
-    </p:bldLst>
-  </p:timing>
-</p:sld>
-</file>
-
-<file path=ppt/slides/slide13.xml><?xml version="1.0" encoding="utf-8"?>
-<p:sld xmlns:a="http://schemas.openxmlformats.org/drawingml/2006/main" xmlns:r="http://schemas.openxmlformats.org/officeDocument/2006/relationships" xmlns:p="http://schemas.openxmlformats.org/presentationml/2006/main">
-  <p:cSld>
-    <p:spTree>
-      <p:nvGrpSpPr>
-        <p:cNvPr id="1" name=""/>
-        <p:cNvGrpSpPr/>
-        <p:nvPr/>
-      </p:nvGrpSpPr>
-      <p:grpSpPr>
-        <a:xfrm>
-          <a:off x="0" y="0"/>
-          <a:ext cx="0" cy="0"/>
-          <a:chOff x="0" y="0"/>
-          <a:chExt cx="0" cy="0"/>
-        </a:xfrm>
-      </p:grpSpPr>
-      <p:sp>
-        <p:nvSpPr>
-          <p:cNvPr id="3" name="selectMeNow1"/>
-          <p:cNvSpPr/>
-          <p:nvPr/>
-        </p:nvSpPr>
-        <p:spPr>
-          <a:xfrm rot="1965194">
-            <a:off x="1533377" y="1406276"/>
-            <a:ext cx="3200400" cy="3792071"/>
-          </a:xfrm>
-          <a:prstGeom prst="roundRect">
-            <a:avLst/>
-          </a:prstGeom>
-          <a:solidFill>
-            <a:schemeClr val="accent2">
-              <a:lumMod val="40000"/>
-              <a:lumOff val="60000"/>
-            </a:schemeClr>
-          </a:solidFill>
-          <a:ln w="203200">
-            <a:solidFill>
-              <a:srgbClr val="92D050"/>
-            </a:solidFill>
-          </a:ln>
-          <a:effectLst>
-            <a:innerShdw blurRad="63500" dist="50800" dir="8100000">
-              <a:prstClr val="black">
-                <a:alpha val="50000"/>
-              </a:prstClr>
-            </a:innerShdw>
-          </a:effectLst>
-        </p:spPr>
-        <p:style>
-          <a:lnRef idx="2">
-            <a:schemeClr val="accent1">
-              <a:shade val="50000"/>
-            </a:schemeClr>
-          </a:lnRef>
-          <a:fillRef idx="1">
-            <a:schemeClr val="accent1"/>
-          </a:fillRef>
-          <a:effectRef idx="0">
-            <a:schemeClr val="accent1"/>
-          </a:effectRef>
-          <a:fontRef idx="minor">
-            <a:schemeClr val="lt1"/>
-          </a:fontRef>
-        </p:style>
-        <p:txBody>
-          <a:bodyPr rtlCol="0" anchor="ctr"/>
-          <a:lstStyle/>
-          <a:p>
-            <a:pPr algn="ctr"/>
-            <a:r>
-              <a:rPr lang="en-US" altLang="zh-CN" sz="6600" dirty="0" smtClean="0">
-                <a:solidFill>
-                  <a:srgbClr val="EB7561"/>
-                </a:solidFill>
-                <a:latin typeface="Times New Roman" panose="02020603050405020304" pitchFamily="18" charset="0"/>
-                <a:cs typeface="Times New Roman" panose="02020603050405020304" pitchFamily="18" charset="0"/>
-              </a:rPr>
-              <a:t>TEXT</a:t>
-            </a:r>
-            <a:endParaRPr lang="zh-CN" altLang="en-US" sz="6600" dirty="0">
-              <a:solidFill>
-                <a:srgbClr val="EB7561"/>
-              </a:solidFill>
-              <a:latin typeface="Times New Roman" panose="02020603050405020304" pitchFamily="18" charset="0"/>
-              <a:cs typeface="Times New Roman" panose="02020603050405020304" pitchFamily="18" charset="0"/>
-            </a:endParaRPr>
-          </a:p>
-        </p:txBody>
-      </p:sp>
-      <p:sp>
-        <p:nvSpPr>
-          <p:cNvPr id="5" name="selectMeNow2"/>
-          <p:cNvSpPr/>
-          <p:nvPr/>
-        </p:nvSpPr>
-        <p:spPr>
-          <a:xfrm>
-            <a:off x="5867400" y="1143000"/>
-            <a:ext cx="1828800" cy="1371600"/>
-          </a:xfrm>
-          <a:prstGeom prst="roundRect">
-            <a:avLst/>
-          </a:prstGeom>
-          <a:ln/>
-        </p:spPr>
-        <p:style>
-          <a:lnRef idx="3">
-            <a:schemeClr val="lt1"/>
-          </a:lnRef>
-          <a:fillRef idx="1">
-            <a:schemeClr val="accent6"/>
-          </a:fillRef>
-          <a:effectRef idx="1">
-            <a:schemeClr val="accent6"/>
-          </a:effectRef>
-          <a:fontRef idx="minor">
-            <a:schemeClr val="lt1"/>
-          </a:fontRef>
-        </p:style>
-        <p:txBody>
-          <a:bodyPr rtlCol="0" anchor="ctr"/>
-          <a:lstStyle/>
-          <a:p>
-            <a:pPr algn="ctr"/>
-            <a:endParaRPr lang="zh-CN" altLang="en-US"/>
-          </a:p>
-        </p:txBody>
-      </p:sp>
-      <p:sp>
-        <p:nvSpPr>
-          <p:cNvPr id="7" name="selectMeNow3"/>
-          <p:cNvSpPr/>
-          <p:nvPr/>
-        </p:nvSpPr>
-        <p:spPr>
-          <a:xfrm>
-            <a:off x="5867400" y="2667000"/>
-            <a:ext cx="1828800" cy="1371600"/>
-          </a:xfrm>
-          <a:prstGeom prst="roundRect">
-            <a:avLst/>
-          </a:prstGeom>
-          <a:ln/>
-        </p:spPr>
-        <p:style>
-          <a:lnRef idx="3">
-            <a:schemeClr val="lt1"/>
-          </a:lnRef>
-          <a:fillRef idx="1">
-            <a:schemeClr val="accent3"/>
-          </a:fillRef>
-          <a:effectRef idx="1">
-            <a:schemeClr val="accent3"/>
-          </a:effectRef>
-          <a:fontRef idx="minor">
-            <a:schemeClr val="lt1"/>
-          </a:fontRef>
-        </p:style>
-        <p:txBody>
-          <a:bodyPr rtlCol="0" anchor="ctr"/>
-          <a:lstStyle/>
-          <a:p>
-            <a:pPr algn="ctr"/>
-            <a:endParaRPr lang="zh-CN" altLang="en-US"/>
-          </a:p>
-        </p:txBody>
-      </p:sp>
-      <p:sp>
-        <p:nvSpPr>
-          <p:cNvPr id="8" name="selectMeNow4"/>
-          <p:cNvSpPr/>
-          <p:nvPr/>
-        </p:nvSpPr>
-        <p:spPr>
-          <a:xfrm>
-            <a:off x="5867400" y="4191000"/>
-            <a:ext cx="1828800" cy="1371600"/>
-          </a:xfrm>
-          <a:prstGeom prst="roundRect">
-            <a:avLst/>
-          </a:prstGeom>
-          <a:solidFill>
-            <a:schemeClr val="accent6">
-              <a:alpha val="50000"/>
-            </a:schemeClr>
-          </a:solidFill>
-          <a:ln>
-            <a:noFill/>
-          </a:ln>
-        </p:spPr>
-        <p:style>
-          <a:lnRef idx="0">
-            <a:scrgbClr r="0" g="0" b="0"/>
-          </a:lnRef>
-          <a:fillRef idx="0">
-            <a:scrgbClr r="0" g="0" b="0"/>
-          </a:fillRef>
-          <a:effectRef idx="0">
-            <a:scrgbClr r="0" g="0" b="0"/>
-          </a:effectRef>
-          <a:fontRef idx="minor">
-            <a:schemeClr val="lt1"/>
-          </a:fontRef>
-        </p:style>
-        <p:txBody>
-          <a:bodyPr rtlCol="0" anchor="ctr"/>
-          <a:lstStyle/>
-          <a:p>
-            <a:pPr algn="ctr"/>
-            <a:endParaRPr lang="zh-CN" altLang="en-US"/>
-          </a:p>
-        </p:txBody>
-      </p:sp>
-      <p:sp>
-        <p:nvSpPr>
-          <p:cNvPr id="2" name="copyMe"/>
-          <p:cNvSpPr/>
-          <p:nvPr/>
-        </p:nvSpPr>
-        <p:spPr>
-          <a:xfrm>
-            <a:off x="2438400" y="1206811"/>
-            <a:ext cx="4191000" cy="4191000"/>
-          </a:xfrm>
-          <a:prstGeom prst="heptagon">
-            <a:avLst/>
-          </a:prstGeom>
-        </p:spPr>
-        <p:style>
-          <a:lnRef idx="2">
-            <a:schemeClr val="accent1">
-              <a:shade val="50000"/>
-            </a:schemeClr>
-          </a:lnRef>
-          <a:fillRef idx="1">
-            <a:schemeClr val="accent1"/>
-          </a:fillRef>
-          <a:effectRef idx="0">
-            <a:schemeClr val="accent1"/>
-          </a:effectRef>
-          <a:fontRef idx="minor">
-            <a:schemeClr val="lt1"/>
-          </a:fontRef>
-        </p:style>
-        <p:txBody>
-          <a:bodyPr rtlCol="0" anchor="ctr"/>
-          <a:lstStyle/>
-          <a:p>
-            <a:pPr algn="ctr"/>
-            <a:endParaRPr lang="en-SG"/>
-          </a:p>
-        </p:txBody>
-      </p:sp>
-    </p:spTree>
-    <p:extLst>
-      <p:ext uri="{BB962C8B-B14F-4D97-AF65-F5344CB8AC3E}">
-        <p14:creationId xmlns:p14="http://schemas.microsoft.com/office/powerpoint/2010/main" val="2188512437"/>
       </p:ext>
     </p:extLst>
   </p:cSld>
@@ -12718,46 +12202,9 @@
           <a:chExt cx="0" cy="0"/>
         </a:xfrm>
       </p:grpSpPr>
-    </p:spTree>
-    <p:extLst>
-      <p:ext uri="{BB962C8B-B14F-4D97-AF65-F5344CB8AC3E}">
-        <p14:creationId xmlns:p14="http://schemas.microsoft.com/office/powerpoint/2010/main" val="1779079148"/>
-      </p:ext>
-    </p:extLst>
-  </p:cSld>
-  <p:clrMapOvr>
-    <a:masterClrMapping/>
-  </p:clrMapOvr>
-  <p:timing>
-    <p:tnLst>
-      <p:par>
-        <p:cTn id="1" dur="indefinite" restart="never" nodeType="tmRoot"/>
-      </p:par>
-    </p:tnLst>
-  </p:timing>
-</p:sld>
-</file>
-
-<file path=ppt/slides/slide15.xml><?xml version="1.0" encoding="utf-8"?>
-<p:sld xmlns:a="http://schemas.openxmlformats.org/drawingml/2006/main" xmlns:r="http://schemas.openxmlformats.org/officeDocument/2006/relationships" xmlns:p="http://schemas.openxmlformats.org/presentationml/2006/main">
-  <p:cSld>
-    <p:spTree>
-      <p:nvGrpSpPr>
-        <p:cNvPr id="1" name=""/>
-        <p:cNvGrpSpPr/>
-        <p:nvPr/>
-      </p:nvGrpSpPr>
-      <p:grpSpPr>
-        <a:xfrm>
-          <a:off x="0" y="0"/>
-          <a:ext cx="0" cy="0"/>
-          <a:chOff x="0" y="0"/>
-          <a:chExt cx="0" cy="0"/>
-        </a:xfrm>
-      </p:grpSpPr>
-      <p:sp>
-        <p:nvSpPr>
-          <p:cNvPr id="6" name="Group selectMeNow1 Seq_1"/>
+      <p:sp>
+        <p:nvSpPr>
+          <p:cNvPr id="3" name="selectMeNow1"/>
           <p:cNvSpPr/>
           <p:nvPr/>
         </p:nvSpPr>
@@ -12810,7 +12257,7 @@
           <a:p>
             <a:pPr algn="ctr"/>
             <a:r>
-              <a:rPr lang="en-US" altLang="zh-CN" sz="6600" dirty="0" smtClean="0">
+              <a:rPr lang="en-US" altLang="zh-CN" sz="6600" dirty="0">
                 <a:solidFill>
                   <a:srgbClr val="EB7561"/>
                 </a:solidFill>
@@ -12831,7 +12278,7 @@
       </p:sp>
       <p:sp>
         <p:nvSpPr>
-          <p:cNvPr id="9" name="Group selectMeNow1 Seq_2"/>
+          <p:cNvPr id="5" name="selectMeNow2"/>
           <p:cNvSpPr/>
           <p:nvPr/>
         </p:nvSpPr>
@@ -12870,7 +12317,7 @@
       </p:sp>
       <p:sp>
         <p:nvSpPr>
-          <p:cNvPr id="10" name="Group selectMeNow1 Seq_3"/>
+          <p:cNvPr id="7" name="selectMeNow3"/>
           <p:cNvSpPr/>
           <p:nvPr/>
         </p:nvSpPr>
@@ -12909,7 +12356,7 @@
       </p:sp>
       <p:sp>
         <p:nvSpPr>
-          <p:cNvPr id="11" name="Group selectMeNow1 Seq_4"/>
+          <p:cNvPr id="8" name="selectMeNow4"/>
           <p:cNvSpPr/>
           <p:nvPr/>
         </p:nvSpPr>
@@ -12955,7 +12402,7 @@
       </p:sp>
       <p:sp>
         <p:nvSpPr>
-          <p:cNvPr id="7" name="copyMe"/>
+          <p:cNvPr id="2" name="copyMe"/>
           <p:cNvSpPr/>
           <p:nvPr/>
         </p:nvSpPr>
@@ -12993,6 +12440,582 @@
           </a:p>
         </p:txBody>
       </p:sp>
+    </p:spTree>
+    <p:extLst>
+      <p:ext uri="{BB962C8B-B14F-4D97-AF65-F5344CB8AC3E}">
+        <p14:creationId xmlns:p14="http://schemas.microsoft.com/office/powerpoint/2010/main" val="2188512437"/>
+      </p:ext>
+    </p:extLst>
+  </p:cSld>
+  <p:clrMapOvr>
+    <a:masterClrMapping/>
+  </p:clrMapOvr>
+  <p:timing>
+    <p:tnLst>
+      <p:par>
+        <p:cTn id="1" dur="indefinite" restart="never" nodeType="tmRoot">
+          <p:childTnLst>
+            <p:seq concurrent="1" nextAc="seek">
+              <p:cTn id="2" dur="indefinite" nodeType="mainSeq">
+                <p:childTnLst>
+                  <p:par>
+                    <p:cTn id="3" fill="hold">
+                      <p:stCondLst>
+                        <p:cond delay="indefinite"/>
+                      </p:stCondLst>
+                      <p:childTnLst>
+                        <p:par>
+                          <p:cTn id="4" fill="hold">
+                            <p:stCondLst>
+                              <p:cond delay="0"/>
+                            </p:stCondLst>
+                            <p:childTnLst>
+                              <p:par>
+                                <p:cTn id="5" presetID="2" presetClass="entr" presetSubtype="4" fill="hold" grpId="0" nodeType="clickEffect">
+                                  <p:stCondLst>
+                                    <p:cond delay="0"/>
+                                  </p:stCondLst>
+                                  <p:childTnLst>
+                                    <p:set>
+                                      <p:cBhvr>
+                                        <p:cTn id="6" dur="1" fill="hold">
+                                          <p:stCondLst>
+                                            <p:cond delay="0"/>
+                                          </p:stCondLst>
+                                        </p:cTn>
+                                        <p:tgtEl>
+                                          <p:spTgt spid="3"/>
+                                        </p:tgtEl>
+                                        <p:attrNameLst>
+                                          <p:attrName>style.visibility</p:attrName>
+                                        </p:attrNameLst>
+                                      </p:cBhvr>
+                                      <p:to>
+                                        <p:strVal val="visible"/>
+                                      </p:to>
+                                    </p:set>
+                                    <p:anim calcmode="lin" valueType="num">
+                                      <p:cBhvr additive="base">
+                                        <p:cTn id="7" dur="500" fill="hold"/>
+                                        <p:tgtEl>
+                                          <p:spTgt spid="3"/>
+                                        </p:tgtEl>
+                                        <p:attrNameLst>
+                                          <p:attrName>ppt_x</p:attrName>
+                                        </p:attrNameLst>
+                                      </p:cBhvr>
+                                      <p:tavLst>
+                                        <p:tav tm="0">
+                                          <p:val>
+                                            <p:strVal val="#ppt_x"/>
+                                          </p:val>
+                                        </p:tav>
+                                        <p:tav tm="100000">
+                                          <p:val>
+                                            <p:strVal val="#ppt_x"/>
+                                          </p:val>
+                                        </p:tav>
+                                      </p:tavLst>
+                                    </p:anim>
+                                    <p:anim calcmode="lin" valueType="num">
+                                      <p:cBhvr additive="base">
+                                        <p:cTn id="8" dur="500" fill="hold"/>
+                                        <p:tgtEl>
+                                          <p:spTgt spid="3"/>
+                                        </p:tgtEl>
+                                        <p:attrNameLst>
+                                          <p:attrName>ppt_y</p:attrName>
+                                        </p:attrNameLst>
+                                      </p:cBhvr>
+                                      <p:tavLst>
+                                        <p:tav tm="0">
+                                          <p:val>
+                                            <p:strVal val="1+#ppt_h/2"/>
+                                          </p:val>
+                                        </p:tav>
+                                        <p:tav tm="100000">
+                                          <p:val>
+                                            <p:strVal val="#ppt_y"/>
+                                          </p:val>
+                                        </p:tav>
+                                      </p:tavLst>
+                                    </p:anim>
+                                  </p:childTnLst>
+                                </p:cTn>
+                              </p:par>
+                            </p:childTnLst>
+                          </p:cTn>
+                        </p:par>
+                      </p:childTnLst>
+                    </p:cTn>
+                  </p:par>
+                  <p:par>
+                    <p:cTn id="9" fill="hold">
+                      <p:stCondLst>
+                        <p:cond delay="indefinite"/>
+                      </p:stCondLst>
+                      <p:childTnLst>
+                        <p:par>
+                          <p:cTn id="10" fill="hold">
+                            <p:stCondLst>
+                              <p:cond delay="0"/>
+                            </p:stCondLst>
+                            <p:childTnLst>
+                              <p:par>
+                                <p:cTn id="11" presetID="1" presetClass="entr" presetSubtype="0" fill="hold" grpId="0" nodeType="clickEffect">
+                                  <p:stCondLst>
+                                    <p:cond delay="0"/>
+                                  </p:stCondLst>
+                                  <p:childTnLst>
+                                    <p:set>
+                                      <p:cBhvr>
+                                        <p:cTn id="12" dur="1" fill="hold">
+                                          <p:stCondLst>
+                                            <p:cond delay="0"/>
+                                          </p:stCondLst>
+                                        </p:cTn>
+                                        <p:tgtEl>
+                                          <p:spTgt spid="5"/>
+                                        </p:tgtEl>
+                                        <p:attrNameLst>
+                                          <p:attrName>style.visibility</p:attrName>
+                                        </p:attrNameLst>
+                                      </p:cBhvr>
+                                      <p:to>
+                                        <p:strVal val="visible"/>
+                                      </p:to>
+                                    </p:set>
+                                  </p:childTnLst>
+                                </p:cTn>
+                              </p:par>
+                            </p:childTnLst>
+                          </p:cTn>
+                        </p:par>
+                      </p:childTnLst>
+                    </p:cTn>
+                  </p:par>
+                  <p:par>
+                    <p:cTn id="13" fill="hold">
+                      <p:stCondLst>
+                        <p:cond delay="indefinite"/>
+                      </p:stCondLst>
+                      <p:childTnLst>
+                        <p:par>
+                          <p:cTn id="14" fill="hold">
+                            <p:stCondLst>
+                              <p:cond delay="0"/>
+                            </p:stCondLst>
+                            <p:childTnLst>
+                              <p:par>
+                                <p:cTn id="15" presetID="10" presetClass="entr" presetSubtype="0" fill="hold" grpId="0" nodeType="clickEffect">
+                                  <p:stCondLst>
+                                    <p:cond delay="0"/>
+                                  </p:stCondLst>
+                                  <p:childTnLst>
+                                    <p:set>
+                                      <p:cBhvr>
+                                        <p:cTn id="16" dur="1" fill="hold">
+                                          <p:stCondLst>
+                                            <p:cond delay="0"/>
+                                          </p:stCondLst>
+                                        </p:cTn>
+                                        <p:tgtEl>
+                                          <p:spTgt spid="7"/>
+                                        </p:tgtEl>
+                                        <p:attrNameLst>
+                                          <p:attrName>style.visibility</p:attrName>
+                                        </p:attrNameLst>
+                                      </p:cBhvr>
+                                      <p:to>
+                                        <p:strVal val="visible"/>
+                                      </p:to>
+                                    </p:set>
+                                    <p:animEffect transition="in" filter="fade">
+                                      <p:cBhvr>
+                                        <p:cTn id="17" dur="500"/>
+                                        <p:tgtEl>
+                                          <p:spTgt spid="7"/>
+                                        </p:tgtEl>
+                                      </p:cBhvr>
+                                    </p:animEffect>
+                                  </p:childTnLst>
+                                </p:cTn>
+                              </p:par>
+                            </p:childTnLst>
+                          </p:cTn>
+                        </p:par>
+                      </p:childTnLst>
+                    </p:cTn>
+                  </p:par>
+                  <p:par>
+                    <p:cTn id="18" fill="hold">
+                      <p:stCondLst>
+                        <p:cond delay="indefinite"/>
+                      </p:stCondLst>
+                      <p:childTnLst>
+                        <p:par>
+                          <p:cTn id="19" fill="hold">
+                            <p:stCondLst>
+                              <p:cond delay="0"/>
+                            </p:stCondLst>
+                            <p:childTnLst>
+                              <p:par>
+                                <p:cTn id="20" presetID="16" presetClass="entr" presetSubtype="21" fill="hold" grpId="0" nodeType="clickEffect">
+                                  <p:stCondLst>
+                                    <p:cond delay="0"/>
+                                  </p:stCondLst>
+                                  <p:childTnLst>
+                                    <p:set>
+                                      <p:cBhvr>
+                                        <p:cTn id="21" dur="1" fill="hold">
+                                          <p:stCondLst>
+                                            <p:cond delay="0"/>
+                                          </p:stCondLst>
+                                        </p:cTn>
+                                        <p:tgtEl>
+                                          <p:spTgt spid="8"/>
+                                        </p:tgtEl>
+                                        <p:attrNameLst>
+                                          <p:attrName>style.visibility</p:attrName>
+                                        </p:attrNameLst>
+                                      </p:cBhvr>
+                                      <p:to>
+                                        <p:strVal val="visible"/>
+                                      </p:to>
+                                    </p:set>
+                                    <p:animEffect transition="in" filter="barn(inVertical)">
+                                      <p:cBhvr>
+                                        <p:cTn id="22" dur="500"/>
+                                        <p:tgtEl>
+                                          <p:spTgt spid="8"/>
+                                        </p:tgtEl>
+                                      </p:cBhvr>
+                                    </p:animEffect>
+                                  </p:childTnLst>
+                                </p:cTn>
+                              </p:par>
+                            </p:childTnLst>
+                          </p:cTn>
+                        </p:par>
+                      </p:childTnLst>
+                    </p:cTn>
+                  </p:par>
+                </p:childTnLst>
+              </p:cTn>
+              <p:prevCondLst>
+                <p:cond evt="onPrev" delay="0">
+                  <p:tgtEl>
+                    <p:sldTgt/>
+                  </p:tgtEl>
+                </p:cond>
+              </p:prevCondLst>
+              <p:nextCondLst>
+                <p:cond evt="onNext" delay="0">
+                  <p:tgtEl>
+                    <p:sldTgt/>
+                  </p:tgtEl>
+                </p:cond>
+              </p:nextCondLst>
+            </p:seq>
+          </p:childTnLst>
+        </p:cTn>
+      </p:par>
+    </p:tnLst>
+    <p:bldLst>
+      <p:bldP spid="3" grpId="0" animBg="1"/>
+      <p:bldP spid="5" grpId="0" animBg="1"/>
+      <p:bldP spid="7" grpId="0" animBg="1"/>
+      <p:bldP spid="8" grpId="0" animBg="1"/>
+    </p:bldLst>
+  </p:timing>
+</p:sld>
+</file>
+
+<file path=ppt/slides/slide15.xml><?xml version="1.0" encoding="utf-8"?>
+<p:sld xmlns:a="http://schemas.openxmlformats.org/drawingml/2006/main" xmlns:r="http://schemas.openxmlformats.org/officeDocument/2006/relationships" xmlns:p="http://schemas.openxmlformats.org/presentationml/2006/main">
+  <p:cSld>
+    <p:spTree>
+      <p:nvGrpSpPr>
+        <p:cNvPr id="1" name=""/>
+        <p:cNvGrpSpPr/>
+        <p:nvPr/>
+      </p:nvGrpSpPr>
+      <p:grpSpPr>
+        <a:xfrm>
+          <a:off x="0" y="0"/>
+          <a:ext cx="0" cy="0"/>
+          <a:chOff x="0" y="0"/>
+          <a:chExt cx="0" cy="0"/>
+        </a:xfrm>
+      </p:grpSpPr>
+    </p:spTree>
+    <p:extLst>
+      <p:ext uri="{BB962C8B-B14F-4D97-AF65-F5344CB8AC3E}">
+        <p14:creationId xmlns:p14="http://schemas.microsoft.com/office/powerpoint/2010/main" val="1779079148"/>
+      </p:ext>
+    </p:extLst>
+  </p:cSld>
+  <p:clrMapOvr>
+    <a:masterClrMapping/>
+  </p:clrMapOvr>
+</p:sld>
+</file>
+
+<file path=ppt/slides/slide16.xml><?xml version="1.0" encoding="utf-8"?>
+<p:sld xmlns:a="http://schemas.openxmlformats.org/drawingml/2006/main" xmlns:r="http://schemas.openxmlformats.org/officeDocument/2006/relationships" xmlns:p="http://schemas.openxmlformats.org/presentationml/2006/main">
+  <p:cSld>
+    <p:spTree>
+      <p:nvGrpSpPr>
+        <p:cNvPr id="1" name=""/>
+        <p:cNvGrpSpPr/>
+        <p:nvPr/>
+      </p:nvGrpSpPr>
+      <p:grpSpPr>
+        <a:xfrm>
+          <a:off x="0" y="0"/>
+          <a:ext cx="0" cy="0"/>
+          <a:chOff x="0" y="0"/>
+          <a:chExt cx="0" cy="0"/>
+        </a:xfrm>
+      </p:grpSpPr>
+      <p:sp>
+        <p:nvSpPr>
+          <p:cNvPr id="6" name="Group selectMeNow1 Seq_1"/>
+          <p:cNvSpPr/>
+          <p:nvPr/>
+        </p:nvSpPr>
+        <p:spPr>
+          <a:xfrm rot="1965194">
+            <a:off x="1533377" y="1406276"/>
+            <a:ext cx="3200400" cy="3792071"/>
+          </a:xfrm>
+          <a:prstGeom prst="roundRect">
+            <a:avLst/>
+          </a:prstGeom>
+          <a:solidFill>
+            <a:schemeClr val="accent2">
+              <a:lumMod val="40000"/>
+              <a:lumOff val="60000"/>
+            </a:schemeClr>
+          </a:solidFill>
+          <a:ln w="203200">
+            <a:solidFill>
+              <a:srgbClr val="92D050"/>
+            </a:solidFill>
+          </a:ln>
+          <a:effectLst>
+            <a:innerShdw blurRad="63500" dist="50800" dir="8100000">
+              <a:prstClr val="black">
+                <a:alpha val="50000"/>
+              </a:prstClr>
+            </a:innerShdw>
+          </a:effectLst>
+        </p:spPr>
+        <p:style>
+          <a:lnRef idx="2">
+            <a:schemeClr val="accent1">
+              <a:shade val="50000"/>
+            </a:schemeClr>
+          </a:lnRef>
+          <a:fillRef idx="1">
+            <a:schemeClr val="accent1"/>
+          </a:fillRef>
+          <a:effectRef idx="0">
+            <a:schemeClr val="accent1"/>
+          </a:effectRef>
+          <a:fontRef idx="minor">
+            <a:schemeClr val="lt1"/>
+          </a:fontRef>
+        </p:style>
+        <p:txBody>
+          <a:bodyPr rtlCol="0" anchor="ctr"/>
+          <a:lstStyle/>
+          <a:p>
+            <a:pPr algn="ctr"/>
+            <a:r>
+              <a:rPr lang="en-US" altLang="zh-CN" sz="6600" dirty="0">
+                <a:solidFill>
+                  <a:srgbClr val="EB7561"/>
+                </a:solidFill>
+                <a:latin typeface="Times New Roman" panose="02020603050405020304" pitchFamily="18" charset="0"/>
+                <a:cs typeface="Times New Roman" panose="02020603050405020304" pitchFamily="18" charset="0"/>
+              </a:rPr>
+              <a:t>TEXT</a:t>
+            </a:r>
+            <a:endParaRPr lang="zh-CN" altLang="en-US" sz="6600" dirty="0">
+              <a:solidFill>
+                <a:srgbClr val="EB7561"/>
+              </a:solidFill>
+              <a:latin typeface="Times New Roman" panose="02020603050405020304" pitchFamily="18" charset="0"/>
+              <a:cs typeface="Times New Roman" panose="02020603050405020304" pitchFamily="18" charset="0"/>
+            </a:endParaRPr>
+          </a:p>
+        </p:txBody>
+      </p:sp>
+      <p:sp>
+        <p:nvSpPr>
+          <p:cNvPr id="9" name="Group selectMeNow1 Seq_2"/>
+          <p:cNvSpPr/>
+          <p:nvPr/>
+        </p:nvSpPr>
+        <p:spPr>
+          <a:xfrm>
+            <a:off x="5867400" y="1143000"/>
+            <a:ext cx="1828800" cy="1371600"/>
+          </a:xfrm>
+          <a:prstGeom prst="roundRect">
+            <a:avLst/>
+          </a:prstGeom>
+          <a:ln/>
+        </p:spPr>
+        <p:style>
+          <a:lnRef idx="3">
+            <a:schemeClr val="lt1"/>
+          </a:lnRef>
+          <a:fillRef idx="1">
+            <a:schemeClr val="accent6"/>
+          </a:fillRef>
+          <a:effectRef idx="1">
+            <a:schemeClr val="accent6"/>
+          </a:effectRef>
+          <a:fontRef idx="minor">
+            <a:schemeClr val="lt1"/>
+          </a:fontRef>
+        </p:style>
+        <p:txBody>
+          <a:bodyPr rtlCol="0" anchor="ctr"/>
+          <a:lstStyle/>
+          <a:p>
+            <a:pPr algn="ctr"/>
+            <a:endParaRPr lang="zh-CN" altLang="en-US"/>
+          </a:p>
+        </p:txBody>
+      </p:sp>
+      <p:sp>
+        <p:nvSpPr>
+          <p:cNvPr id="10" name="Group selectMeNow1 Seq_3"/>
+          <p:cNvSpPr/>
+          <p:nvPr/>
+        </p:nvSpPr>
+        <p:spPr>
+          <a:xfrm>
+            <a:off x="5867400" y="2667000"/>
+            <a:ext cx="1828800" cy="1371600"/>
+          </a:xfrm>
+          <a:prstGeom prst="roundRect">
+            <a:avLst/>
+          </a:prstGeom>
+          <a:ln/>
+        </p:spPr>
+        <p:style>
+          <a:lnRef idx="3">
+            <a:schemeClr val="lt1"/>
+          </a:lnRef>
+          <a:fillRef idx="1">
+            <a:schemeClr val="accent3"/>
+          </a:fillRef>
+          <a:effectRef idx="1">
+            <a:schemeClr val="accent3"/>
+          </a:effectRef>
+          <a:fontRef idx="minor">
+            <a:schemeClr val="lt1"/>
+          </a:fontRef>
+        </p:style>
+        <p:txBody>
+          <a:bodyPr rtlCol="0" anchor="ctr"/>
+          <a:lstStyle/>
+          <a:p>
+            <a:pPr algn="ctr"/>
+            <a:endParaRPr lang="zh-CN" altLang="en-US"/>
+          </a:p>
+        </p:txBody>
+      </p:sp>
+      <p:sp>
+        <p:nvSpPr>
+          <p:cNvPr id="11" name="Group selectMeNow1 Seq_4"/>
+          <p:cNvSpPr/>
+          <p:nvPr/>
+        </p:nvSpPr>
+        <p:spPr>
+          <a:xfrm>
+            <a:off x="5867400" y="4191000"/>
+            <a:ext cx="1828800" cy="1371600"/>
+          </a:xfrm>
+          <a:prstGeom prst="roundRect">
+            <a:avLst/>
+          </a:prstGeom>
+          <a:solidFill>
+            <a:schemeClr val="accent6">
+              <a:alpha val="50000"/>
+            </a:schemeClr>
+          </a:solidFill>
+          <a:ln>
+            <a:noFill/>
+          </a:ln>
+        </p:spPr>
+        <p:style>
+          <a:lnRef idx="0">
+            <a:scrgbClr r="0" g="0" b="0"/>
+          </a:lnRef>
+          <a:fillRef idx="0">
+            <a:scrgbClr r="0" g="0" b="0"/>
+          </a:fillRef>
+          <a:effectRef idx="0">
+            <a:scrgbClr r="0" g="0" b="0"/>
+          </a:effectRef>
+          <a:fontRef idx="minor">
+            <a:schemeClr val="lt1"/>
+          </a:fontRef>
+        </p:style>
+        <p:txBody>
+          <a:bodyPr rtlCol="0" anchor="ctr"/>
+          <a:lstStyle/>
+          <a:p>
+            <a:pPr algn="ctr"/>
+            <a:endParaRPr lang="zh-CN" altLang="en-US"/>
+          </a:p>
+        </p:txBody>
+      </p:sp>
+      <p:sp>
+        <p:nvSpPr>
+          <p:cNvPr id="7" name="copyMe"/>
+          <p:cNvSpPr/>
+          <p:nvPr/>
+        </p:nvSpPr>
+        <p:spPr>
+          <a:xfrm>
+            <a:off x="2438400" y="1206811"/>
+            <a:ext cx="4191000" cy="4191000"/>
+          </a:xfrm>
+          <a:prstGeom prst="heptagon">
+            <a:avLst/>
+          </a:prstGeom>
+        </p:spPr>
+        <p:style>
+          <a:lnRef idx="2">
+            <a:schemeClr val="accent1">
+              <a:shade val="50000"/>
+            </a:schemeClr>
+          </a:lnRef>
+          <a:fillRef idx="1">
+            <a:schemeClr val="accent1"/>
+          </a:fillRef>
+          <a:effectRef idx="0">
+            <a:schemeClr val="accent1"/>
+          </a:effectRef>
+          <a:fontRef idx="minor">
+            <a:schemeClr val="lt1"/>
+          </a:fontRef>
+        </p:style>
+        <p:txBody>
+          <a:bodyPr rtlCol="0" anchor="ctr"/>
+          <a:lstStyle/>
+          <a:p>
+            <a:pPr algn="ctr"/>
+            <a:endParaRPr lang="en-SG"/>
+          </a:p>
+        </p:txBody>
+      </p:sp>
       <p:sp>
         <p:nvSpPr>
           <p:cNvPr id="2" name="Expected"/>
@@ -13016,10 +13039,9 @@
           <a:lstStyle/>
           <a:p>
             <a:r>
-              <a:rPr lang="en-SG" dirty="0" smtClean="0"/>
+              <a:rPr lang="en-SG" dirty="0"/>
               <a:t>Expected slide</a:t>
             </a:r>
-            <a:endParaRPr lang="en-SG" dirty="0"/>
           </a:p>
         </p:txBody>
       </p:sp>
@@ -13354,7 +13376,7 @@
 </p:sld>
 </file>
 
-<file path=ppt/slides/slide16.xml><?xml version="1.0" encoding="utf-8"?>
+<file path=ppt/slides/slide17.xml><?xml version="1.0" encoding="utf-8"?>
 <p:sld xmlns:a="http://schemas.openxmlformats.org/drawingml/2006/main" xmlns:r="http://schemas.openxmlformats.org/officeDocument/2006/relationships" xmlns:p="http://schemas.openxmlformats.org/presentationml/2006/main" show="0">
   <p:cSld name="PPAck201403240026082737">
     <p:spTree>
@@ -13429,21 +13451,6 @@
   <p:clrMapOvr>
     <a:masterClrMapping/>
   </p:clrMapOvr>
-  <mc:AlternateContent xmlns:mc="http://schemas.openxmlformats.org/markup-compatibility/2006" xmlns:p14="http://schemas.microsoft.com/office/powerpoint/2010/main">
-    <mc:Choice Requires="p14">
-      <p:transition spd="slow" p14:dur="2000"/>
-    </mc:Choice>
-    <mc:Fallback xmlns="">
-      <p:transition spd="slow"/>
-    </mc:Fallback>
-  </mc:AlternateContent>
-  <p:timing>
-    <p:tnLst>
-      <p:par>
-        <p:cTn id="1" dur="indefinite" restart="never" nodeType="tmRoot"/>
-      </p:par>
-    </p:tnLst>
-  </p:timing>
 </p:sld>
 </file>
 
@@ -13498,7 +13505,7 @@
           <a:p>
             <a:pPr algn="l"/>
             <a:r>
-              <a:rPr lang="en-US" sz="7200" dirty="0" smtClean="0">
+              <a:rPr lang="en-US" sz="7200" dirty="0">
                 <a:solidFill>
                   <a:schemeClr val="bg1"/>
                 </a:solidFill>
@@ -13521,8 +13528,8 @@
         </p:nvSpPr>
         <p:spPr>
           <a:xfrm>
-            <a:off x="381000" y="2057400"/>
-            <a:ext cx="8229600" cy="3539430"/>
+            <a:off x="381000" y="1905000"/>
+            <a:ext cx="8229600" cy="4832092"/>
           </a:xfrm>
           <a:prstGeom prst="rect">
             <a:avLst/>
@@ -13536,7 +13543,7 @@
           <a:lstStyle/>
           <a:p>
             <a:r>
-              <a:rPr lang="en-US" altLang="zh-CN" sz="2800" dirty="0" smtClean="0">
+              <a:rPr lang="en-US" altLang="zh-CN" sz="2800" dirty="0">
                 <a:solidFill>
                   <a:schemeClr val="bg1"/>
                 </a:solidFill>
@@ -13546,7 +13553,7 @@
           </a:p>
           <a:p>
             <a:r>
-              <a:rPr lang="en-US" altLang="zh-CN" sz="2800" dirty="0" smtClean="0">
+              <a:rPr lang="en-US" altLang="zh-CN" sz="2800" dirty="0">
                 <a:solidFill>
                   <a:schemeClr val="bg1"/>
                 </a:solidFill>
@@ -13556,7 +13563,7 @@
           </a:p>
           <a:p>
             <a:r>
-              <a:rPr lang="en-US" altLang="zh-CN" sz="2800" dirty="0" smtClean="0">
+              <a:rPr lang="en-US" altLang="zh-CN" sz="2800" dirty="0">
                 <a:solidFill>
                   <a:schemeClr val="bg1"/>
                 </a:solidFill>
@@ -13573,44 +13580,29 @@
           </a:p>
           <a:p>
             <a:r>
-              <a:rPr lang="en-US" altLang="zh-CN" sz="2800" dirty="0" smtClean="0">
-                <a:solidFill>
-                  <a:schemeClr val="bg1"/>
-                </a:solidFill>
-              </a:rPr>
-              <a:t>Repeat for testing </a:t>
-            </a:r>
-            <a:r>
               <a:rPr lang="en-US" altLang="zh-CN" sz="2800" dirty="0">
                 <a:solidFill>
                   <a:schemeClr val="bg1"/>
                 </a:solidFill>
               </a:rPr>
-              <a:t>A</a:t>
-            </a:r>
-            <a:r>
-              <a:rPr lang="en-US" altLang="zh-CN" sz="2800" dirty="0" smtClean="0">
-                <a:solidFill>
-                  <a:schemeClr val="bg1"/>
-                </a:solidFill>
-              </a:rPr>
-              <a:t>dd </a:t>
-            </a:r>
+              <a:t>Repeat for testing Add Shapes button on Shapes Lab pane from slides 6 to 8</a:t>
+            </a:r>
+          </a:p>
+          <a:p>
+            <a:endParaRPr lang="en-US" altLang="zh-CN" sz="2800" dirty="0">
+              <a:solidFill>
+                <a:schemeClr val="bg1"/>
+              </a:solidFill>
+            </a:endParaRPr>
+          </a:p>
+          <a:p>
             <a:r>
               <a:rPr lang="en-US" altLang="zh-CN" sz="2800" dirty="0">
                 <a:solidFill>
                   <a:schemeClr val="bg1"/>
                 </a:solidFill>
               </a:rPr>
-              <a:t>S</a:t>
-            </a:r>
-            <a:r>
-              <a:rPr lang="en-US" altLang="zh-CN" sz="2800" dirty="0" smtClean="0">
-                <a:solidFill>
-                  <a:schemeClr val="bg1"/>
-                </a:solidFill>
-              </a:rPr>
-              <a:t>hapes button on Shapes Lab pane from slides 6 to 8</a:t>
+              <a:t>Animations are also expected to be transferred</a:t>
             </a:r>
           </a:p>
           <a:p>
@@ -13622,18 +13614,13 @@
           </a:p>
           <a:p>
             <a:r>
-              <a:rPr lang="en-US" altLang="zh-CN" sz="2800" dirty="0" smtClean="0">
+              <a:rPr lang="en-US" altLang="zh-CN" sz="2800" dirty="0">
                 <a:solidFill>
                   <a:schemeClr val="bg1"/>
                 </a:solidFill>
               </a:rPr>
-              <a:t>Animations are also expected to be transferred</a:t>
-            </a:r>
-            <a:endParaRPr lang="zh-CN" altLang="en-US" sz="2800" dirty="0">
-              <a:solidFill>
-                <a:schemeClr val="bg1"/>
-              </a:solidFill>
-            </a:endParaRPr>
+              <a:t>Tests that error appear when adding placeholders on slide 9</a:t>
+            </a:r>
           </a:p>
         </p:txBody>
       </p:sp>
@@ -13647,13 +13634,6 @@
   <p:clrMapOvr>
     <a:masterClrMapping/>
   </p:clrMapOvr>
-  <p:timing>
-    <p:tnLst>
-      <p:par>
-        <p:cTn id="1" dur="indefinite" restart="never" nodeType="tmRoot"/>
-      </p:par>
-    </p:tnLst>
-  </p:timing>
 </p:sld>
 </file>
 
@@ -13773,7 +13753,7 @@
           <a:p>
             <a:pPr algn="ctr"/>
             <a:r>
-              <a:rPr lang="en-US" altLang="zh-CN" sz="6600" dirty="0" smtClean="0">
+              <a:rPr lang="en-US" altLang="zh-CN" sz="6600" dirty="0">
                 <a:solidFill>
                   <a:srgbClr val="EB7561"/>
                 </a:solidFill>
@@ -14210,13 +14190,6 @@
   <p:clrMapOvr>
     <a:masterClrMapping/>
   </p:clrMapOvr>
-  <p:timing>
-    <p:tnLst>
-      <p:par>
-        <p:cTn id="1" dur="indefinite" restart="never" nodeType="tmRoot"/>
-      </p:par>
-    </p:tnLst>
-  </p:timing>
 </p:sld>
 </file>
 
@@ -14290,7 +14263,7 @@
           <a:p>
             <a:pPr algn="ctr"/>
             <a:r>
-              <a:rPr lang="en-US" altLang="zh-CN" sz="6600" dirty="0" smtClean="0">
+              <a:rPr lang="en-US" altLang="zh-CN" sz="6600" dirty="0">
                 <a:solidFill>
                   <a:srgbClr val="EB7561"/>
                 </a:solidFill>
@@ -14818,7 +14791,7 @@
           <a:p>
             <a:pPr algn="ctr"/>
             <a:r>
-              <a:rPr lang="en-US" altLang="zh-CN" sz="6600" dirty="0" smtClean="0">
+              <a:rPr lang="en-US" altLang="zh-CN" sz="6600" dirty="0">
                 <a:solidFill>
                   <a:srgbClr val="EB7561"/>
                 </a:solidFill>
@@ -15287,13 +15260,6 @@
   <p:clrMapOvr>
     <a:masterClrMapping/>
   </p:clrMapOvr>
-  <p:timing>
-    <p:tnLst>
-      <p:par>
-        <p:cTn id="1" dur="indefinite" restart="never" nodeType="tmRoot"/>
-      </p:par>
-    </p:tnLst>
-  </p:timing>
 </p:sld>
 </file>
 
@@ -15377,7 +15343,7 @@
           <a:p>
             <a:pPr algn="ctr"/>
             <a:r>
-              <a:rPr lang="en-US" altLang="zh-CN" sz="6600" dirty="0" smtClean="0">
+              <a:rPr lang="en-US" altLang="zh-CN" sz="6600" dirty="0">
                 <a:solidFill>
                   <a:srgbClr val="EB7561"/>
                 </a:solidFill>
@@ -15814,6 +15780,14 @@
 <file path=ppt/slides/slide9.xml><?xml version="1.0" encoding="utf-8"?>
 <p:sld xmlns:a="http://schemas.openxmlformats.org/drawingml/2006/main" xmlns:r="http://schemas.openxmlformats.org/officeDocument/2006/relationships" xmlns:p="http://schemas.openxmlformats.org/presentationml/2006/main">
   <p:cSld>
+    <p:bg>
+      <p:bgPr>
+        <a:solidFill>
+          <a:schemeClr val="bg1"/>
+        </a:solidFill>
+        <a:effectLst/>
+      </p:bgPr>
+    </p:bg>
     <p:spTree>
       <p:nvGrpSpPr>
         <p:cNvPr id="1" name=""/>
@@ -15830,7 +15804,13 @@
       </p:grpSpPr>
       <p:sp>
         <p:nvSpPr>
-          <p:cNvPr id="2" name="Title 1"/>
+          <p:cNvPr id="2" name="Placeholder">
+            <a:extLst>
+              <a:ext uri="{FF2B5EF4-FFF2-40B4-BE49-F238E27FC236}">
+                <a16:creationId xmlns:a16="http://schemas.microsoft.com/office/drawing/2014/main" id="{DECD9BCB-1985-4800-9315-97DF8FF441B0}"/>
+              </a:ext>
+            </a:extLst>
+          </p:cNvPr>
           <p:cNvSpPr>
             <a:spLocks noGrp="1"/>
           </p:cNvSpPr>
@@ -15838,176 +15818,25 @@
             <p:ph type="title"/>
           </p:nvPr>
         </p:nvSpPr>
-        <p:spPr>
-          <a:xfrm>
-            <a:off x="381000" y="609600"/>
-            <a:ext cx="8229600" cy="1143000"/>
-          </a:xfrm>
-        </p:spPr>
-        <p:txBody>
-          <a:bodyPr>
-            <a:noAutofit/>
-          </a:bodyPr>
-          <a:lstStyle/>
-          <a:p>
-            <a:pPr algn="l"/>
-            <a:r>
-              <a:rPr lang="en-US" sz="7200" dirty="0" err="1" smtClean="0">
-                <a:solidFill>
-                  <a:schemeClr val="bg1"/>
-                </a:solidFill>
-              </a:rPr>
-              <a:t>IsClipboardRestored</a:t>
-            </a:r>
-            <a:endParaRPr lang="en-SG" sz="7200" dirty="0">
-              <a:solidFill>
-                <a:schemeClr val="bg1"/>
-              </a:solidFill>
-            </a:endParaRPr>
-          </a:p>
-        </p:txBody>
-      </p:sp>
-      <p:sp>
-        <p:nvSpPr>
-          <p:cNvPr id="3" name="TextBox 2"/>
-          <p:cNvSpPr txBox="1"/>
-          <p:nvPr/>
-        </p:nvSpPr>
-        <p:spPr>
-          <a:xfrm>
-            <a:off x="381000" y="2057400"/>
-            <a:ext cx="8229600" cy="3539430"/>
-          </a:xfrm>
-          <a:prstGeom prst="rect">
-            <a:avLst/>
-          </a:prstGeom>
-          <a:noFill/>
-        </p:spPr>
-        <p:txBody>
-          <a:bodyPr wrap="square" rtlCol="0">
-            <a:spAutoFit/>
-          </a:bodyPr>
-          <a:lstStyle/>
-          <a:p>
-            <a:r>
-              <a:rPr lang="en-US" altLang="zh-CN" sz="2800" dirty="0" smtClean="0">
-                <a:solidFill>
-                  <a:schemeClr val="bg1"/>
-                </a:solidFill>
-              </a:rPr>
-              <a:t>Add those shapes in slide 3 to Shapes Lab;</a:t>
-            </a:r>
-          </a:p>
-          <a:p>
-            <a:r>
-              <a:rPr lang="en-US" altLang="zh-CN" sz="2800" dirty="0" smtClean="0">
-                <a:solidFill>
-                  <a:schemeClr val="bg1"/>
-                </a:solidFill>
-              </a:rPr>
-              <a:t>Add added shapes in Shapes Lab to slide 4;</a:t>
-            </a:r>
-          </a:p>
-          <a:p>
-            <a:r>
-              <a:rPr lang="en-US" altLang="zh-CN" sz="2800" dirty="0" smtClean="0">
-                <a:solidFill>
-                  <a:schemeClr val="bg1"/>
-                </a:solidFill>
-              </a:rPr>
-              <a:t>Compare slide 4 and expected slide 5</a:t>
-            </a:r>
-          </a:p>
-          <a:p>
-            <a:endParaRPr lang="en-US" altLang="zh-CN" sz="2800" dirty="0">
-              <a:solidFill>
-                <a:schemeClr val="bg1"/>
-              </a:solidFill>
-            </a:endParaRPr>
-          </a:p>
-          <a:p>
-            <a:r>
-              <a:rPr lang="en-US" altLang="zh-CN" sz="2800" dirty="0" smtClean="0">
-                <a:solidFill>
-                  <a:schemeClr val="bg1"/>
-                </a:solidFill>
-              </a:rPr>
-              <a:t>Repeat for testing </a:t>
-            </a:r>
-            <a:r>
-              <a:rPr lang="en-US" altLang="zh-CN" sz="2800" dirty="0">
-                <a:solidFill>
-                  <a:schemeClr val="bg1"/>
-                </a:solidFill>
-              </a:rPr>
-              <a:t>A</a:t>
-            </a:r>
-            <a:r>
-              <a:rPr lang="en-US" altLang="zh-CN" sz="2800" dirty="0" smtClean="0">
-                <a:solidFill>
-                  <a:schemeClr val="bg1"/>
-                </a:solidFill>
-              </a:rPr>
-              <a:t>dd </a:t>
-            </a:r>
-            <a:r>
-              <a:rPr lang="en-US" altLang="zh-CN" sz="2800" dirty="0">
-                <a:solidFill>
-                  <a:schemeClr val="bg1"/>
-                </a:solidFill>
-              </a:rPr>
-              <a:t>S</a:t>
-            </a:r>
-            <a:r>
-              <a:rPr lang="en-US" altLang="zh-CN" sz="2800" dirty="0" smtClean="0">
-                <a:solidFill>
-                  <a:schemeClr val="bg1"/>
-                </a:solidFill>
-              </a:rPr>
-              <a:t>hapes button on Shapes Lab pane from slides 6 to 8</a:t>
-            </a:r>
-          </a:p>
-          <a:p>
-            <a:endParaRPr lang="en-US" altLang="zh-CN" sz="2800" dirty="0">
-              <a:solidFill>
-                <a:schemeClr val="bg1"/>
-              </a:solidFill>
-            </a:endParaRPr>
-          </a:p>
-          <a:p>
-            <a:r>
-              <a:rPr lang="en-US" altLang="zh-CN" sz="2800" dirty="0" smtClean="0">
-                <a:solidFill>
-                  <a:schemeClr val="bg1"/>
-                </a:solidFill>
-              </a:rPr>
-              <a:t>Animations are also expected to be transferred</a:t>
-            </a:r>
-            <a:endParaRPr lang="zh-CN" altLang="en-US" sz="2800" dirty="0">
-              <a:solidFill>
-                <a:schemeClr val="bg1"/>
-              </a:solidFill>
-            </a:endParaRPr>
+        <p:spPr/>
+        <p:txBody>
+          <a:bodyPr/>
+          <a:lstStyle/>
+          <a:p>
+            <a:endParaRPr lang="en-US" dirty="0"/>
           </a:p>
         </p:txBody>
       </p:sp>
     </p:spTree>
     <p:extLst>
       <p:ext uri="{BB962C8B-B14F-4D97-AF65-F5344CB8AC3E}">
-        <p14:creationId xmlns:p14="http://schemas.microsoft.com/office/powerpoint/2010/main" val="3646993363"/>
+        <p14:creationId xmlns:p14="http://schemas.microsoft.com/office/powerpoint/2010/main" val="606476009"/>
       </p:ext>
     </p:extLst>
   </p:cSld>
   <p:clrMapOvr>
     <a:masterClrMapping/>
   </p:clrMapOvr>
-  <p:timing>
-    <p:tnLst>
-      <p:par>
-        <p:cTn id="1" dur="indefinite" restart="never" nodeType="tmRoot"/>
-      </p:par>
-    </p:tnLst>
-  </p:timing>
 </p:sld>
 </file>
 

</xml_diff>

<commit_message>
#1737 Convert to Picture: Unsupported Object (#1764)
* Add ShapesLabFT for error dialog.

* Add method in MessageBoxUtil.

* Modify CustomShapePane AddShapeFromSelection.

* Fix contradiction in ConvertToPicture ConvertAndSave.

* Fix code mistake in CustomShapePane

* Remove redundant whitespace.
</commit_message>
<xml_diff>
--- a/doc/test/ShapesLab/ShapesLab.pptx
+++ b/doc/test/ShapesLab/ShapesLab.pptx
@@ -7,7 +7,7 @@
     <p:sldMasterId id="2147483672" r:id="rId3"/>
   </p:sldMasterIdLst>
   <p:notesMasterIdLst>
-    <p:notesMasterId r:id="rId20"/>
+    <p:notesMasterId r:id="rId21"/>
   </p:notesMasterIdLst>
   <p:sldIdLst>
     <p:sldId id="287" r:id="rId4"/>
@@ -18,14 +18,15 @@
     <p:sldId id="300" r:id="rId9"/>
     <p:sldId id="301" r:id="rId10"/>
     <p:sldId id="302" r:id="rId11"/>
-    <p:sldId id="303" r:id="rId12"/>
-    <p:sldId id="304" r:id="rId13"/>
-    <p:sldId id="305" r:id="rId14"/>
-    <p:sldId id="306" r:id="rId15"/>
-    <p:sldId id="307" r:id="rId16"/>
-    <p:sldId id="308" r:id="rId17"/>
-    <p:sldId id="309" r:id="rId18"/>
-    <p:sldId id="274" r:id="rId19"/>
+    <p:sldId id="311" r:id="rId12"/>
+    <p:sldId id="303" r:id="rId13"/>
+    <p:sldId id="304" r:id="rId14"/>
+    <p:sldId id="305" r:id="rId15"/>
+    <p:sldId id="306" r:id="rId16"/>
+    <p:sldId id="307" r:id="rId17"/>
+    <p:sldId id="308" r:id="rId18"/>
+    <p:sldId id="309" r:id="rId19"/>
+    <p:sldId id="274" r:id="rId20"/>
   </p:sldIdLst>
   <p:sldSz cx="9144000" cy="6858000" type="screen4x3"/>
   <p:notesSz cx="6858000" cy="9144000"/>
@@ -141,6 +142,7 @@
             <p14:sldId id="300"/>
             <p14:sldId id="301"/>
             <p14:sldId id="302"/>
+            <p14:sldId id="311"/>
             <p14:sldId id="303"/>
             <p14:sldId id="304"/>
             <p14:sldId id="305"/>
@@ -253,7 +255,7 @@
           <a:p>
             <a:fld id="{26004F41-C1A1-4B0D-9EEE-5E3F0E5BC108}" type="datetimeFigureOut">
               <a:rPr lang="en-SG" smtClean="0"/>
-              <a:t>10/4/2018</a:t>
+              <a:t>27/1/2019</a:t>
             </a:fld>
             <a:endParaRPr lang="en-SG"/>
           </a:p>
@@ -317,35 +319,35 @@
           <a:p>
             <a:pPr lvl="0"/>
             <a:r>
-              <a:rPr lang="zh-CN" altLang="en-US" smtClean="0"/>
+              <a:rPr lang="zh-CN" altLang="en-US"/>
               <a:t>单击此处编辑母版文本样式</a:t>
             </a:r>
           </a:p>
           <a:p>
             <a:pPr lvl="1"/>
             <a:r>
-              <a:rPr lang="zh-CN" altLang="en-US" smtClean="0"/>
+              <a:rPr lang="zh-CN" altLang="en-US"/>
               <a:t>第二级</a:t>
             </a:r>
           </a:p>
           <a:p>
             <a:pPr lvl="2"/>
             <a:r>
-              <a:rPr lang="zh-CN" altLang="en-US" smtClean="0"/>
+              <a:rPr lang="zh-CN" altLang="en-US"/>
               <a:t>第三级</a:t>
             </a:r>
           </a:p>
           <a:p>
             <a:pPr lvl="3"/>
             <a:r>
-              <a:rPr lang="zh-CN" altLang="en-US" smtClean="0"/>
+              <a:rPr lang="zh-CN" altLang="en-US"/>
               <a:t>第四级</a:t>
             </a:r>
           </a:p>
           <a:p>
             <a:pPr lvl="4"/>
             <a:r>
-              <a:rPr lang="zh-CN" altLang="en-US" smtClean="0"/>
+              <a:rPr lang="zh-CN" altLang="en-US"/>
               <a:t>第五级</a:t>
             </a:r>
             <a:endParaRPr lang="en-SG"/>
@@ -566,185 +568,184 @@
           <a:lstStyle/>
           <a:p>
             <a:r>
-              <a:rPr lang="en-US" dirty="0" smtClean="0"/>
+              <a:rPr lang="en-US" dirty="0"/>
               <a:t>Do the following from 3 environments:</a:t>
             </a:r>
           </a:p>
           <a:p>
             <a:r>
-              <a:rPr lang="en-US" dirty="0" smtClean="0"/>
+              <a:rPr lang="en-US" dirty="0"/>
               <a:t>1. Entirely new environment</a:t>
             </a:r>
           </a:p>
           <a:p>
             <a:r>
-              <a:rPr lang="en-US" dirty="0" smtClean="0"/>
+              <a:rPr lang="en-US" dirty="0"/>
               <a:t>2. Contains old shape info</a:t>
             </a:r>
           </a:p>
           <a:p>
-            <a:endParaRPr lang="en-US" dirty="0" smtClean="0"/>
-          </a:p>
-          <a:p>
-            <a:r>
-              <a:rPr lang="en-US" dirty="0" smtClean="0"/>
+            <a:endParaRPr lang="en-US" dirty="0"/>
+          </a:p>
+          <a:p>
+            <a:r>
+              <a:rPr lang="en-US" dirty="0"/>
               <a:t>1. Add Category</a:t>
             </a:r>
           </a:p>
           <a:p>
             <a:r>
-              <a:rPr lang="en-US" dirty="0" smtClean="0"/>
+              <a:rPr lang="en-US" dirty="0"/>
               <a:t>	1.1 Add category then add a new shape inside, check the default name, close and open to check</a:t>
             </a:r>
           </a:p>
           <a:p>
             <a:r>
-              <a:rPr lang="en-US" dirty="0" smtClean="0"/>
+              <a:rPr lang="en-US" dirty="0"/>
               <a:t>	1.2 Add category then add a new shape inside, check the default name, set the category as default, close and open to check</a:t>
             </a:r>
           </a:p>
           <a:p>
             <a:r>
-              <a:rPr lang="en-US" dirty="0" smtClean="0"/>
+              <a:rPr lang="en-US" dirty="0"/>
               <a:t>2. Rename Category</a:t>
             </a:r>
           </a:p>
           <a:p>
             <a:r>
-              <a:rPr lang="en-US" dirty="0" smtClean="0"/>
+              <a:rPr lang="en-US" dirty="0"/>
               <a:t>	2.1 Rename to a valid name</a:t>
             </a:r>
           </a:p>
           <a:p>
             <a:r>
-              <a:rPr lang="en-US" dirty="0" smtClean="0"/>
+              <a:rPr lang="en-US" dirty="0"/>
               <a:t>	2.2 Rename to an </a:t>
             </a:r>
             <a:r>
-              <a:rPr lang="en-US" dirty="0" err="1" smtClean="0"/>
+              <a:rPr lang="en-US" dirty="0" err="1"/>
               <a:t>invaid</a:t>
             </a:r>
             <a:r>
-              <a:rPr lang="en-US" dirty="0" smtClean="0"/>
+              <a:rPr lang="en-US" dirty="0"/>
               <a:t> name</a:t>
             </a:r>
           </a:p>
           <a:p>
             <a:r>
-              <a:rPr lang="en-US" dirty="0" smtClean="0"/>
+              <a:rPr lang="en-US" dirty="0"/>
               <a:t>3. Import Category</a:t>
             </a:r>
           </a:p>
           <a:p>
             <a:r>
-              <a:rPr lang="en-US" dirty="0" smtClean="0"/>
+              <a:rPr lang="en-US" dirty="0"/>
               <a:t>	3.1 Import single category with </a:t>
             </a:r>
             <a:r>
-              <a:rPr lang="en-US" dirty="0" err="1" smtClean="0"/>
+              <a:rPr lang="en-US" dirty="0" err="1"/>
               <a:t>namebox</a:t>
             </a:r>
             <a:r>
-              <a:rPr lang="en-US" dirty="0" smtClean="0"/>
+              <a:rPr lang="en-US" dirty="0"/>
               <a:t>, no conflict name</a:t>
             </a:r>
           </a:p>
           <a:p>
             <a:r>
-              <a:rPr lang="en-US" dirty="0" smtClean="0"/>
+              <a:rPr lang="en-US" dirty="0"/>
               <a:t>	3.2 Import multiple categories with </a:t>
             </a:r>
             <a:r>
-              <a:rPr lang="en-US" dirty="0" err="1" smtClean="0"/>
+              <a:rPr lang="en-US" dirty="0" err="1"/>
               <a:t>nameboxes</a:t>
             </a:r>
             <a:r>
-              <a:rPr lang="en-US" dirty="0" smtClean="0"/>
+              <a:rPr lang="en-US" dirty="0"/>
               <a:t>, no </a:t>
             </a:r>
             <a:r>
-              <a:rPr lang="en-US" dirty="0" err="1" smtClean="0"/>
+              <a:rPr lang="en-US" dirty="0" err="1"/>
               <a:t>confilct</a:t>
             </a:r>
             <a:r>
-              <a:rPr lang="en-US" dirty="0" smtClean="0"/>
+              <a:rPr lang="en-US" dirty="0"/>
               <a:t> name</a:t>
             </a:r>
           </a:p>
           <a:p>
             <a:r>
-              <a:rPr lang="en-US" dirty="0" smtClean="0"/>
+              <a:rPr lang="en-US" dirty="0"/>
               <a:t>	3.3 Import single category with </a:t>
             </a:r>
             <a:r>
-              <a:rPr lang="en-US" dirty="0" err="1" smtClean="0"/>
+              <a:rPr lang="en-US" dirty="0" err="1"/>
               <a:t>namebox</a:t>
             </a:r>
             <a:r>
-              <a:rPr lang="en-US" dirty="0" smtClean="0"/>
+              <a:rPr lang="en-US" dirty="0"/>
               <a:t>, conflict with one existed name</a:t>
             </a:r>
           </a:p>
           <a:p>
             <a:r>
-              <a:rPr lang="en-US" dirty="0" smtClean="0"/>
+              <a:rPr lang="en-US" dirty="0"/>
               <a:t>	3.4 Import multiple categories with </a:t>
             </a:r>
             <a:r>
-              <a:rPr lang="en-US" dirty="0" err="1" smtClean="0"/>
+              <a:rPr lang="en-US" dirty="0" err="1"/>
               <a:t>nameboxes</a:t>
             </a:r>
             <a:r>
-              <a:rPr lang="en-US" dirty="0" smtClean="0"/>
+              <a:rPr lang="en-US" dirty="0"/>
               <a:t>, some of the boxes conflict with existed name</a:t>
             </a:r>
           </a:p>
           <a:p>
             <a:r>
-              <a:rPr lang="en-US" dirty="0" smtClean="0"/>
+              <a:rPr lang="en-US" dirty="0"/>
               <a:t>	3.5 Import single category without </a:t>
             </a:r>
             <a:r>
-              <a:rPr lang="en-US" dirty="0" err="1" smtClean="0"/>
+              <a:rPr lang="en-US" dirty="0" err="1"/>
               <a:t>namebox</a:t>
             </a:r>
-            <a:endParaRPr lang="en-US" dirty="0" smtClean="0"/>
-          </a:p>
-          <a:p>
-            <a:r>
-              <a:rPr lang="en-US" dirty="0" smtClean="0"/>
+            <a:endParaRPr lang="en-US" dirty="0"/>
+          </a:p>
+          <a:p>
+            <a:r>
+              <a:rPr lang="en-US" dirty="0"/>
               <a:t>	3.6 Import single category without </a:t>
             </a:r>
             <a:r>
-              <a:rPr lang="en-US" dirty="0" err="1" smtClean="0"/>
+              <a:rPr lang="en-US" dirty="0" err="1"/>
               <a:t>namebox</a:t>
             </a:r>
             <a:r>
-              <a:rPr lang="en-US" dirty="0" smtClean="0"/>
+              <a:rPr lang="en-US" dirty="0"/>
               <a:t>, conflict with exist name</a:t>
             </a:r>
           </a:p>
           <a:p>
             <a:r>
-              <a:rPr lang="en-US" dirty="0" smtClean="0"/>
+              <a:rPr lang="en-US" dirty="0"/>
               <a:t>	3.7 Import multiple categories without </a:t>
             </a:r>
             <a:r>
-              <a:rPr lang="en-US" dirty="0" err="1" smtClean="0"/>
+              <a:rPr lang="en-US" dirty="0" err="1"/>
               <a:t>namebox</a:t>
             </a:r>
-            <a:endParaRPr lang="en-US" dirty="0" smtClean="0"/>
-          </a:p>
-          <a:p>
-            <a:r>
-              <a:rPr lang="en-US" dirty="0" smtClean="0"/>
+            <a:endParaRPr lang="en-US" dirty="0"/>
+          </a:p>
+          <a:p>
+            <a:r>
+              <a:rPr lang="en-US" dirty="0"/>
               <a:t>4. </a:t>
             </a:r>
             <a:r>
-              <a:rPr lang="en-US" smtClean="0"/>
+              <a:rPr lang="en-US"/>
               <a:t>Migrate Category</a:t>
             </a:r>
-            <a:endParaRPr lang="en-US"/>
           </a:p>
         </p:txBody>
       </p:sp>
@@ -829,7 +830,7 @@
           <a:lstStyle/>
           <a:p>
             <a:r>
-              <a:rPr lang="en-US" altLang="zh-CN" dirty="0" smtClean="0"/>
+              <a:rPr lang="en-US" altLang="zh-CN" dirty="0"/>
               <a:t>Expected</a:t>
             </a:r>
             <a:endParaRPr lang="zh-CN" altLang="en-US" dirty="0"/>
@@ -853,7 +854,7 @@
           <a:p>
             <a:fld id="{E96FB07A-B1AD-4238-A6C9-967239C45D18}" type="slidenum">
               <a:rPr lang="en-SG" smtClean="0"/>
-              <a:t>15</a:t>
+              <a:t>16</a:t>
             </a:fld>
             <a:endParaRPr lang="en-SG"/>
           </a:p>
@@ -1001,7 +1002,7 @@
           <a:lstStyle/>
           <a:p>
             <a:r>
-              <a:rPr lang="en-US" altLang="zh-CN" dirty="0" smtClean="0"/>
+              <a:rPr lang="en-US" altLang="zh-CN" dirty="0"/>
               <a:t>Expected</a:t>
             </a:r>
             <a:endParaRPr lang="zh-CN" altLang="en-US" dirty="0"/>
@@ -1173,7 +1174,7 @@
           <a:lstStyle/>
           <a:p>
             <a:r>
-              <a:rPr lang="en-US" altLang="zh-CN" dirty="0" smtClean="0"/>
+              <a:rPr lang="en-US" altLang="zh-CN" dirty="0"/>
               <a:t>Expected</a:t>
             </a:r>
             <a:endParaRPr lang="zh-CN" altLang="en-US" dirty="0"/>
@@ -1261,185 +1262,184 @@
           <a:lstStyle/>
           <a:p>
             <a:r>
-              <a:rPr lang="en-US" dirty="0" smtClean="0"/>
+              <a:rPr lang="en-US" dirty="0"/>
               <a:t>Do the following from 3 environments:</a:t>
             </a:r>
           </a:p>
           <a:p>
             <a:r>
-              <a:rPr lang="en-US" dirty="0" smtClean="0"/>
+              <a:rPr lang="en-US" dirty="0"/>
               <a:t>1. Entirely new environment</a:t>
             </a:r>
           </a:p>
           <a:p>
             <a:r>
-              <a:rPr lang="en-US" dirty="0" smtClean="0"/>
+              <a:rPr lang="en-US" dirty="0"/>
               <a:t>2. Contains old shape info</a:t>
             </a:r>
           </a:p>
           <a:p>
-            <a:endParaRPr lang="en-US" dirty="0" smtClean="0"/>
-          </a:p>
-          <a:p>
-            <a:r>
-              <a:rPr lang="en-US" dirty="0" smtClean="0"/>
+            <a:endParaRPr lang="en-US" dirty="0"/>
+          </a:p>
+          <a:p>
+            <a:r>
+              <a:rPr lang="en-US" dirty="0"/>
               <a:t>1. Add Category</a:t>
             </a:r>
           </a:p>
           <a:p>
             <a:r>
-              <a:rPr lang="en-US" dirty="0" smtClean="0"/>
+              <a:rPr lang="en-US" dirty="0"/>
               <a:t>	1.1 Add category then add a new shape inside, check the default name, close and open to check</a:t>
             </a:r>
           </a:p>
           <a:p>
             <a:r>
-              <a:rPr lang="en-US" dirty="0" smtClean="0"/>
+              <a:rPr lang="en-US" dirty="0"/>
               <a:t>	1.2 Add category then add a new shape inside, check the default name, set the category as default, close and open to check</a:t>
             </a:r>
           </a:p>
           <a:p>
             <a:r>
-              <a:rPr lang="en-US" dirty="0" smtClean="0"/>
+              <a:rPr lang="en-US" dirty="0"/>
               <a:t>2. Rename Category</a:t>
             </a:r>
           </a:p>
           <a:p>
             <a:r>
-              <a:rPr lang="en-US" dirty="0" smtClean="0"/>
+              <a:rPr lang="en-US" dirty="0"/>
               <a:t>	2.1 Rename to a valid name</a:t>
             </a:r>
           </a:p>
           <a:p>
             <a:r>
-              <a:rPr lang="en-US" dirty="0" smtClean="0"/>
+              <a:rPr lang="en-US" dirty="0"/>
               <a:t>	2.2 Rename to an </a:t>
             </a:r>
             <a:r>
-              <a:rPr lang="en-US" dirty="0" err="1" smtClean="0"/>
+              <a:rPr lang="en-US" dirty="0" err="1"/>
               <a:t>invaid</a:t>
             </a:r>
             <a:r>
-              <a:rPr lang="en-US" dirty="0" smtClean="0"/>
+              <a:rPr lang="en-US" dirty="0"/>
               <a:t> name</a:t>
             </a:r>
           </a:p>
           <a:p>
             <a:r>
-              <a:rPr lang="en-US" dirty="0" smtClean="0"/>
+              <a:rPr lang="en-US" dirty="0"/>
               <a:t>3. Import Category</a:t>
             </a:r>
           </a:p>
           <a:p>
             <a:r>
-              <a:rPr lang="en-US" dirty="0" smtClean="0"/>
+              <a:rPr lang="en-US" dirty="0"/>
               <a:t>	3.1 Import single category with </a:t>
             </a:r>
             <a:r>
-              <a:rPr lang="en-US" dirty="0" err="1" smtClean="0"/>
+              <a:rPr lang="en-US" dirty="0" err="1"/>
               <a:t>namebox</a:t>
             </a:r>
             <a:r>
-              <a:rPr lang="en-US" dirty="0" smtClean="0"/>
+              <a:rPr lang="en-US" dirty="0"/>
               <a:t>, no conflict name</a:t>
             </a:r>
           </a:p>
           <a:p>
             <a:r>
-              <a:rPr lang="en-US" dirty="0" smtClean="0"/>
+              <a:rPr lang="en-US" dirty="0"/>
               <a:t>	3.2 Import multiple categories with </a:t>
             </a:r>
             <a:r>
-              <a:rPr lang="en-US" dirty="0" err="1" smtClean="0"/>
+              <a:rPr lang="en-US" dirty="0" err="1"/>
               <a:t>nameboxes</a:t>
             </a:r>
             <a:r>
-              <a:rPr lang="en-US" dirty="0" smtClean="0"/>
+              <a:rPr lang="en-US" dirty="0"/>
               <a:t>, no </a:t>
             </a:r>
             <a:r>
-              <a:rPr lang="en-US" dirty="0" err="1" smtClean="0"/>
+              <a:rPr lang="en-US" dirty="0" err="1"/>
               <a:t>confilct</a:t>
             </a:r>
             <a:r>
-              <a:rPr lang="en-US" dirty="0" smtClean="0"/>
+              <a:rPr lang="en-US" dirty="0"/>
               <a:t> name</a:t>
             </a:r>
           </a:p>
           <a:p>
             <a:r>
-              <a:rPr lang="en-US" dirty="0" smtClean="0"/>
+              <a:rPr lang="en-US" dirty="0"/>
               <a:t>	3.3 Import single category with </a:t>
             </a:r>
             <a:r>
-              <a:rPr lang="en-US" dirty="0" err="1" smtClean="0"/>
+              <a:rPr lang="en-US" dirty="0" err="1"/>
               <a:t>namebox</a:t>
             </a:r>
             <a:r>
-              <a:rPr lang="en-US" dirty="0" smtClean="0"/>
+              <a:rPr lang="en-US" dirty="0"/>
               <a:t>, conflict with one existed name</a:t>
             </a:r>
           </a:p>
           <a:p>
             <a:r>
-              <a:rPr lang="en-US" dirty="0" smtClean="0"/>
+              <a:rPr lang="en-US" dirty="0"/>
               <a:t>	3.4 Import multiple categories with </a:t>
             </a:r>
             <a:r>
-              <a:rPr lang="en-US" dirty="0" err="1" smtClean="0"/>
+              <a:rPr lang="en-US" dirty="0" err="1"/>
               <a:t>nameboxes</a:t>
             </a:r>
             <a:r>
-              <a:rPr lang="en-US" dirty="0" smtClean="0"/>
+              <a:rPr lang="en-US" dirty="0"/>
               <a:t>, some of the boxes conflict with existed name</a:t>
             </a:r>
           </a:p>
           <a:p>
             <a:r>
-              <a:rPr lang="en-US" dirty="0" smtClean="0"/>
+              <a:rPr lang="en-US" dirty="0"/>
               <a:t>	3.5 Import single category without </a:t>
             </a:r>
             <a:r>
-              <a:rPr lang="en-US" dirty="0" err="1" smtClean="0"/>
+              <a:rPr lang="en-US" dirty="0" err="1"/>
               <a:t>namebox</a:t>
             </a:r>
-            <a:endParaRPr lang="en-US" dirty="0" smtClean="0"/>
-          </a:p>
-          <a:p>
-            <a:r>
-              <a:rPr lang="en-US" dirty="0" smtClean="0"/>
+            <a:endParaRPr lang="en-US" dirty="0"/>
+          </a:p>
+          <a:p>
+            <a:r>
+              <a:rPr lang="en-US" dirty="0"/>
               <a:t>	3.6 Import single category without </a:t>
             </a:r>
             <a:r>
-              <a:rPr lang="en-US" dirty="0" err="1" smtClean="0"/>
+              <a:rPr lang="en-US" dirty="0" err="1"/>
               <a:t>namebox</a:t>
             </a:r>
             <a:r>
-              <a:rPr lang="en-US" dirty="0" smtClean="0"/>
+              <a:rPr lang="en-US" dirty="0"/>
               <a:t>, conflict with exist name</a:t>
             </a:r>
           </a:p>
           <a:p>
             <a:r>
-              <a:rPr lang="en-US" dirty="0" smtClean="0"/>
+              <a:rPr lang="en-US" dirty="0"/>
               <a:t>	3.7 Import multiple categories without </a:t>
             </a:r>
             <a:r>
-              <a:rPr lang="en-US" dirty="0" err="1" smtClean="0"/>
+              <a:rPr lang="en-US" dirty="0" err="1"/>
               <a:t>namebox</a:t>
             </a:r>
-            <a:endParaRPr lang="en-US" dirty="0" smtClean="0"/>
-          </a:p>
-          <a:p>
-            <a:r>
-              <a:rPr lang="en-US" dirty="0" smtClean="0"/>
+            <a:endParaRPr lang="en-US" dirty="0"/>
+          </a:p>
+          <a:p>
+            <a:r>
+              <a:rPr lang="en-US" dirty="0"/>
               <a:t>4. </a:t>
             </a:r>
             <a:r>
-              <a:rPr lang="en-US" smtClean="0"/>
+              <a:rPr lang="en-US"/>
               <a:t>Migrate Category</a:t>
             </a:r>
-            <a:endParaRPr lang="en-US"/>
           </a:p>
         </p:txBody>
       </p:sp>
@@ -1460,7 +1460,7 @@
           <a:p>
             <a:fld id="{E96FB07A-B1AD-4238-A6C9-967239C45D18}" type="slidenum">
               <a:rPr lang="en-SG" smtClean="0"/>
-              <a:t>9</a:t>
+              <a:t>10</a:t>
             </a:fld>
             <a:endParaRPr lang="en-SG"/>
           </a:p>
@@ -1544,7 +1544,7 @@
           <a:p>
             <a:fld id="{E96FB07A-B1AD-4238-A6C9-967239C45D18}" type="slidenum">
               <a:rPr lang="en-SG" smtClean="0"/>
-              <a:t>10</a:t>
+              <a:t>11</a:t>
             </a:fld>
             <a:endParaRPr lang="en-SG"/>
           </a:p>
@@ -1608,7 +1608,7 @@
           <a:lstStyle/>
           <a:p>
             <a:r>
-              <a:rPr lang="en-US" altLang="zh-CN" dirty="0" smtClean="0"/>
+              <a:rPr lang="en-US" altLang="zh-CN" dirty="0"/>
               <a:t>Expected</a:t>
             </a:r>
             <a:endParaRPr lang="zh-CN" altLang="en-US" dirty="0"/>
@@ -1632,7 +1632,7 @@
           <a:p>
             <a:fld id="{E96FB07A-B1AD-4238-A6C9-967239C45D18}" type="slidenum">
               <a:rPr lang="en-SG" smtClean="0"/>
-              <a:t>12</a:t>
+              <a:t>13</a:t>
             </a:fld>
             <a:endParaRPr lang="en-SG"/>
           </a:p>
@@ -1716,7 +1716,7 @@
           <a:p>
             <a:fld id="{E96FB07A-B1AD-4238-A6C9-967239C45D18}" type="slidenum">
               <a:rPr lang="en-SG" smtClean="0"/>
-              <a:t>13</a:t>
+              <a:t>14</a:t>
             </a:fld>
             <a:endParaRPr lang="en-SG"/>
           </a:p>
@@ -1773,10 +1773,9 @@
           <a:lstStyle/>
           <a:p>
             <a:r>
-              <a:rPr lang="en-US" smtClean="0"/>
+              <a:rPr lang="en-US"/>
               <a:t>Click to edit Master title style</a:t>
             </a:r>
-            <a:endParaRPr lang="en-US"/>
           </a:p>
         </p:txBody>
       </p:sp>
@@ -1892,10 +1891,9 @@
           </a:lstStyle>
           <a:p>
             <a:r>
-              <a:rPr lang="en-US" smtClean="0"/>
+              <a:rPr lang="en-US"/>
               <a:t>Click to edit Master subtitle style</a:t>
             </a:r>
-            <a:endParaRPr lang="en-US"/>
           </a:p>
         </p:txBody>
       </p:sp>
@@ -1916,7 +1914,7 @@
           <a:p>
             <a:fld id="{699DC775-C286-4358-8C92-D7E584E969B3}" type="datetimeFigureOut">
               <a:rPr lang="en-US" smtClean="0"/>
-              <a:t>4/10/2018</a:t>
+              <a:t>1/27/2019</a:t>
             </a:fld>
             <a:endParaRPr lang="en-US"/>
           </a:p>
@@ -2010,10 +2008,9 @@
           <a:lstStyle/>
           <a:p>
             <a:r>
-              <a:rPr lang="en-US" smtClean="0"/>
+              <a:rPr lang="en-US"/>
               <a:t>Click to edit Master title style</a:t>
             </a:r>
-            <a:endParaRPr lang="en-US"/>
           </a:p>
         </p:txBody>
       </p:sp>
@@ -2034,38 +2031,37 @@
           <a:p>
             <a:pPr lvl="0"/>
             <a:r>
-              <a:rPr lang="en-US" smtClean="0"/>
+              <a:rPr lang="en-US"/>
               <a:t>Click to edit Master text styles</a:t>
             </a:r>
           </a:p>
           <a:p>
             <a:pPr lvl="1"/>
             <a:r>
-              <a:rPr lang="en-US" smtClean="0"/>
+              <a:rPr lang="en-US"/>
               <a:t>Second level</a:t>
             </a:r>
           </a:p>
           <a:p>
             <a:pPr lvl="2"/>
             <a:r>
-              <a:rPr lang="en-US" smtClean="0"/>
+              <a:rPr lang="en-US"/>
               <a:t>Third level</a:t>
             </a:r>
           </a:p>
           <a:p>
             <a:pPr lvl="3"/>
             <a:r>
-              <a:rPr lang="en-US" smtClean="0"/>
+              <a:rPr lang="en-US"/>
               <a:t>Fourth level</a:t>
             </a:r>
           </a:p>
           <a:p>
             <a:pPr lvl="4"/>
             <a:r>
-              <a:rPr lang="en-US" smtClean="0"/>
+              <a:rPr lang="en-US"/>
               <a:t>Fifth level</a:t>
             </a:r>
-            <a:endParaRPr lang="en-US"/>
           </a:p>
         </p:txBody>
       </p:sp>
@@ -2086,7 +2082,7 @@
           <a:p>
             <a:fld id="{699DC775-C286-4358-8C92-D7E584E969B3}" type="datetimeFigureOut">
               <a:rPr lang="en-US" smtClean="0"/>
-              <a:t>4/10/2018</a:t>
+              <a:t>1/27/2019</a:t>
             </a:fld>
             <a:endParaRPr lang="en-US"/>
           </a:p>
@@ -2185,10 +2181,9 @@
           <a:lstStyle/>
           <a:p>
             <a:r>
-              <a:rPr lang="en-US" smtClean="0"/>
+              <a:rPr lang="en-US"/>
               <a:t>Click to edit Master title style</a:t>
             </a:r>
-            <a:endParaRPr lang="en-US"/>
           </a:p>
         </p:txBody>
       </p:sp>
@@ -2214,38 +2209,37 @@
           <a:p>
             <a:pPr lvl="0"/>
             <a:r>
-              <a:rPr lang="en-US" smtClean="0"/>
+              <a:rPr lang="en-US"/>
               <a:t>Click to edit Master text styles</a:t>
             </a:r>
           </a:p>
           <a:p>
             <a:pPr lvl="1"/>
             <a:r>
-              <a:rPr lang="en-US" smtClean="0"/>
+              <a:rPr lang="en-US"/>
               <a:t>Second level</a:t>
             </a:r>
           </a:p>
           <a:p>
             <a:pPr lvl="2"/>
             <a:r>
-              <a:rPr lang="en-US" smtClean="0"/>
+              <a:rPr lang="en-US"/>
               <a:t>Third level</a:t>
             </a:r>
           </a:p>
           <a:p>
             <a:pPr lvl="3"/>
             <a:r>
-              <a:rPr lang="en-US" smtClean="0"/>
+              <a:rPr lang="en-US"/>
               <a:t>Fourth level</a:t>
             </a:r>
           </a:p>
           <a:p>
             <a:pPr lvl="4"/>
             <a:r>
-              <a:rPr lang="en-US" smtClean="0"/>
+              <a:rPr lang="en-US"/>
               <a:t>Fifth level</a:t>
             </a:r>
-            <a:endParaRPr lang="en-US"/>
           </a:p>
         </p:txBody>
       </p:sp>
@@ -2266,7 +2260,7 @@
           <a:p>
             <a:fld id="{699DC775-C286-4358-8C92-D7E584E969B3}" type="datetimeFigureOut">
               <a:rPr lang="en-US" smtClean="0"/>
-              <a:t>4/10/2018</a:t>
+              <a:t>1/27/2019</a:t>
             </a:fld>
             <a:endParaRPr lang="en-US"/>
           </a:p>
@@ -2365,10 +2359,9 @@
           <a:lstStyle/>
           <a:p>
             <a:r>
-              <a:rPr lang="en-US" smtClean="0"/>
+              <a:rPr lang="en-US"/>
               <a:t>Click to edit Master title style</a:t>
             </a:r>
-            <a:endParaRPr lang="en-US"/>
           </a:p>
         </p:txBody>
       </p:sp>
@@ -2484,10 +2477,9 @@
           </a:lstStyle>
           <a:p>
             <a:r>
-              <a:rPr lang="en-US" smtClean="0"/>
+              <a:rPr lang="en-US"/>
               <a:t>Click to edit Master subtitle style</a:t>
             </a:r>
-            <a:endParaRPr lang="en-US"/>
           </a:p>
         </p:txBody>
       </p:sp>
@@ -2508,7 +2500,7 @@
           <a:p>
             <a:fld id="{699DC775-C286-4358-8C92-D7E584E969B3}" type="datetimeFigureOut">
               <a:rPr lang="en-US" smtClean="0"/>
-              <a:t>4/10/2018</a:t>
+              <a:t>1/27/2019</a:t>
             </a:fld>
             <a:endParaRPr lang="en-US"/>
           </a:p>
@@ -2602,10 +2594,9 @@
           <a:lstStyle/>
           <a:p>
             <a:r>
-              <a:rPr lang="en-US" smtClean="0"/>
+              <a:rPr lang="en-US"/>
               <a:t>Click to edit Master title style</a:t>
             </a:r>
-            <a:endParaRPr lang="en-US"/>
           </a:p>
         </p:txBody>
       </p:sp>
@@ -2626,38 +2617,37 @@
           <a:p>
             <a:pPr lvl="0"/>
             <a:r>
-              <a:rPr lang="en-US" smtClean="0"/>
+              <a:rPr lang="en-US"/>
               <a:t>Click to edit Master text styles</a:t>
             </a:r>
           </a:p>
           <a:p>
             <a:pPr lvl="1"/>
             <a:r>
-              <a:rPr lang="en-US" smtClean="0"/>
+              <a:rPr lang="en-US"/>
               <a:t>Second level</a:t>
             </a:r>
           </a:p>
           <a:p>
             <a:pPr lvl="2"/>
             <a:r>
-              <a:rPr lang="en-US" smtClean="0"/>
+              <a:rPr lang="en-US"/>
               <a:t>Third level</a:t>
             </a:r>
           </a:p>
           <a:p>
             <a:pPr lvl="3"/>
             <a:r>
-              <a:rPr lang="en-US" smtClean="0"/>
+              <a:rPr lang="en-US"/>
               <a:t>Fourth level</a:t>
             </a:r>
           </a:p>
           <a:p>
             <a:pPr lvl="4"/>
             <a:r>
-              <a:rPr lang="en-US" smtClean="0"/>
+              <a:rPr lang="en-US"/>
               <a:t>Fifth level</a:t>
             </a:r>
-            <a:endParaRPr lang="en-US"/>
           </a:p>
         </p:txBody>
       </p:sp>
@@ -2678,7 +2668,7 @@
           <a:p>
             <a:fld id="{699DC775-C286-4358-8C92-D7E584E969B3}" type="datetimeFigureOut">
               <a:rPr lang="en-US" smtClean="0"/>
-              <a:t>4/10/2018</a:t>
+              <a:t>1/27/2019</a:t>
             </a:fld>
             <a:endParaRPr lang="en-US"/>
           </a:p>
@@ -2781,10 +2771,9 @@
           </a:lstStyle>
           <a:p>
             <a:r>
-              <a:rPr lang="en-US" smtClean="0"/>
+              <a:rPr lang="en-US"/>
               <a:t>Click to edit Master title style</a:t>
             </a:r>
-            <a:endParaRPr lang="en-US"/>
           </a:p>
         </p:txBody>
       </p:sp>
@@ -2901,7 +2890,7 @@
           <a:p>
             <a:pPr lvl="0"/>
             <a:r>
-              <a:rPr lang="en-US" smtClean="0"/>
+              <a:rPr lang="en-US"/>
               <a:t>Click to edit Master text styles</a:t>
             </a:r>
           </a:p>
@@ -2924,7 +2913,7 @@
           <a:p>
             <a:fld id="{699DC775-C286-4358-8C92-D7E584E969B3}" type="datetimeFigureOut">
               <a:rPr lang="en-US" smtClean="0"/>
-              <a:t>4/10/2018</a:t>
+              <a:t>1/27/2019</a:t>
             </a:fld>
             <a:endParaRPr lang="en-US"/>
           </a:p>
@@ -3018,10 +3007,9 @@
           <a:lstStyle/>
           <a:p>
             <a:r>
-              <a:rPr lang="en-US" smtClean="0"/>
+              <a:rPr lang="en-US"/>
               <a:t>Click to edit Master title style</a:t>
             </a:r>
-            <a:endParaRPr lang="en-US"/>
           </a:p>
         </p:txBody>
       </p:sp>
@@ -3075,38 +3063,37 @@
           <a:p>
             <a:pPr lvl="0"/>
             <a:r>
-              <a:rPr lang="en-US" smtClean="0"/>
+              <a:rPr lang="en-US"/>
               <a:t>Click to edit Master text styles</a:t>
             </a:r>
           </a:p>
           <a:p>
             <a:pPr lvl="1"/>
             <a:r>
-              <a:rPr lang="en-US" smtClean="0"/>
+              <a:rPr lang="en-US"/>
               <a:t>Second level</a:t>
             </a:r>
           </a:p>
           <a:p>
             <a:pPr lvl="2"/>
             <a:r>
-              <a:rPr lang="en-US" smtClean="0"/>
+              <a:rPr lang="en-US"/>
               <a:t>Third level</a:t>
             </a:r>
           </a:p>
           <a:p>
             <a:pPr lvl="3"/>
             <a:r>
-              <a:rPr lang="en-US" smtClean="0"/>
+              <a:rPr lang="en-US"/>
               <a:t>Fourth level</a:t>
             </a:r>
           </a:p>
           <a:p>
             <a:pPr lvl="4"/>
             <a:r>
-              <a:rPr lang="en-US" smtClean="0"/>
+              <a:rPr lang="en-US"/>
               <a:t>Fifth level</a:t>
             </a:r>
-            <a:endParaRPr lang="en-US"/>
           </a:p>
         </p:txBody>
       </p:sp>
@@ -3160,38 +3147,37 @@
           <a:p>
             <a:pPr lvl="0"/>
             <a:r>
-              <a:rPr lang="en-US" smtClean="0"/>
+              <a:rPr lang="en-US"/>
               <a:t>Click to edit Master text styles</a:t>
             </a:r>
           </a:p>
           <a:p>
             <a:pPr lvl="1"/>
             <a:r>
-              <a:rPr lang="en-US" smtClean="0"/>
+              <a:rPr lang="en-US"/>
               <a:t>Second level</a:t>
             </a:r>
           </a:p>
           <a:p>
             <a:pPr lvl="2"/>
             <a:r>
-              <a:rPr lang="en-US" smtClean="0"/>
+              <a:rPr lang="en-US"/>
               <a:t>Third level</a:t>
             </a:r>
           </a:p>
           <a:p>
             <a:pPr lvl="3"/>
             <a:r>
-              <a:rPr lang="en-US" smtClean="0"/>
+              <a:rPr lang="en-US"/>
               <a:t>Fourth level</a:t>
             </a:r>
           </a:p>
           <a:p>
             <a:pPr lvl="4"/>
             <a:r>
-              <a:rPr lang="en-US" smtClean="0"/>
+              <a:rPr lang="en-US"/>
               <a:t>Fifth level</a:t>
             </a:r>
-            <a:endParaRPr lang="en-US"/>
           </a:p>
         </p:txBody>
       </p:sp>
@@ -3212,7 +3198,7 @@
           <a:p>
             <a:fld id="{699DC775-C286-4358-8C92-D7E584E969B3}" type="datetimeFigureOut">
               <a:rPr lang="en-US" smtClean="0"/>
-              <a:t>4/10/2018</a:t>
+              <a:t>1/27/2019</a:t>
             </a:fld>
             <a:endParaRPr lang="en-US"/>
           </a:p>
@@ -3310,10 +3296,9 @@
           </a:lstStyle>
           <a:p>
             <a:r>
-              <a:rPr lang="en-US" smtClean="0"/>
+              <a:rPr lang="en-US"/>
               <a:t>Click to edit Master title style</a:t>
             </a:r>
-            <a:endParaRPr lang="en-US"/>
           </a:p>
         </p:txBody>
       </p:sp>
@@ -3376,7 +3361,7 @@
           <a:p>
             <a:pPr lvl="0"/>
             <a:r>
-              <a:rPr lang="en-US" smtClean="0"/>
+              <a:rPr lang="en-US"/>
               <a:t>Click to edit Master text styles</a:t>
             </a:r>
           </a:p>
@@ -3432,38 +3417,37 @@
           <a:p>
             <a:pPr lvl="0"/>
             <a:r>
-              <a:rPr lang="en-US" smtClean="0"/>
+              <a:rPr lang="en-US"/>
               <a:t>Click to edit Master text styles</a:t>
             </a:r>
           </a:p>
           <a:p>
             <a:pPr lvl="1"/>
             <a:r>
-              <a:rPr lang="en-US" smtClean="0"/>
+              <a:rPr lang="en-US"/>
               <a:t>Second level</a:t>
             </a:r>
           </a:p>
           <a:p>
             <a:pPr lvl="2"/>
             <a:r>
-              <a:rPr lang="en-US" smtClean="0"/>
+              <a:rPr lang="en-US"/>
               <a:t>Third level</a:t>
             </a:r>
           </a:p>
           <a:p>
             <a:pPr lvl="3"/>
             <a:r>
-              <a:rPr lang="en-US" smtClean="0"/>
+              <a:rPr lang="en-US"/>
               <a:t>Fourth level</a:t>
             </a:r>
           </a:p>
           <a:p>
             <a:pPr lvl="4"/>
             <a:r>
-              <a:rPr lang="en-US" smtClean="0"/>
+              <a:rPr lang="en-US"/>
               <a:t>Fifth level</a:t>
             </a:r>
-            <a:endParaRPr lang="en-US"/>
           </a:p>
         </p:txBody>
       </p:sp>
@@ -3526,7 +3510,7 @@
           <a:p>
             <a:pPr lvl="0"/>
             <a:r>
-              <a:rPr lang="en-US" smtClean="0"/>
+              <a:rPr lang="en-US"/>
               <a:t>Click to edit Master text styles</a:t>
             </a:r>
           </a:p>
@@ -3582,38 +3566,37 @@
           <a:p>
             <a:pPr lvl="0"/>
             <a:r>
-              <a:rPr lang="en-US" smtClean="0"/>
+              <a:rPr lang="en-US"/>
               <a:t>Click to edit Master text styles</a:t>
             </a:r>
           </a:p>
           <a:p>
             <a:pPr lvl="1"/>
             <a:r>
-              <a:rPr lang="en-US" smtClean="0"/>
+              <a:rPr lang="en-US"/>
               <a:t>Second level</a:t>
             </a:r>
           </a:p>
           <a:p>
             <a:pPr lvl="2"/>
             <a:r>
-              <a:rPr lang="en-US" smtClean="0"/>
+              <a:rPr lang="en-US"/>
               <a:t>Third level</a:t>
             </a:r>
           </a:p>
           <a:p>
             <a:pPr lvl="3"/>
             <a:r>
-              <a:rPr lang="en-US" smtClean="0"/>
+              <a:rPr lang="en-US"/>
               <a:t>Fourth level</a:t>
             </a:r>
           </a:p>
           <a:p>
             <a:pPr lvl="4"/>
             <a:r>
-              <a:rPr lang="en-US" smtClean="0"/>
+              <a:rPr lang="en-US"/>
               <a:t>Fifth level</a:t>
             </a:r>
-            <a:endParaRPr lang="en-US"/>
           </a:p>
         </p:txBody>
       </p:sp>
@@ -3634,7 +3617,7 @@
           <a:p>
             <a:fld id="{699DC775-C286-4358-8C92-D7E584E969B3}" type="datetimeFigureOut">
               <a:rPr lang="en-US" smtClean="0"/>
-              <a:t>4/10/2018</a:t>
+              <a:t>1/27/2019</a:t>
             </a:fld>
             <a:endParaRPr lang="en-US"/>
           </a:p>
@@ -3728,10 +3711,9 @@
           <a:lstStyle/>
           <a:p>
             <a:r>
-              <a:rPr lang="en-US" smtClean="0"/>
+              <a:rPr lang="en-US"/>
               <a:t>Click to edit Master title style</a:t>
             </a:r>
-            <a:endParaRPr lang="en-US"/>
           </a:p>
         </p:txBody>
       </p:sp>
@@ -3752,7 +3734,7 @@
           <a:p>
             <a:fld id="{699DC775-C286-4358-8C92-D7E584E969B3}" type="datetimeFigureOut">
               <a:rPr lang="en-US" smtClean="0"/>
-              <a:t>4/10/2018</a:t>
+              <a:t>1/27/2019</a:t>
             </a:fld>
             <a:endParaRPr lang="en-US"/>
           </a:p>
@@ -3847,7 +3829,7 @@
           <a:p>
             <a:fld id="{699DC775-C286-4358-8C92-D7E584E969B3}" type="datetimeFigureOut">
               <a:rPr lang="en-US" smtClean="0"/>
-              <a:t>4/10/2018</a:t>
+              <a:t>1/27/2019</a:t>
             </a:fld>
             <a:endParaRPr lang="en-US"/>
           </a:p>
@@ -3950,10 +3932,9 @@
           </a:lstStyle>
           <a:p>
             <a:r>
-              <a:rPr lang="en-US" smtClean="0"/>
+              <a:rPr lang="en-US"/>
               <a:t>Click to edit Master title style</a:t>
             </a:r>
-            <a:endParaRPr lang="en-US"/>
           </a:p>
         </p:txBody>
       </p:sp>
@@ -4007,38 +3988,37 @@
           <a:p>
             <a:pPr lvl="0"/>
             <a:r>
-              <a:rPr lang="en-US" smtClean="0"/>
+              <a:rPr lang="en-US"/>
               <a:t>Click to edit Master text styles</a:t>
             </a:r>
           </a:p>
           <a:p>
             <a:pPr lvl="1"/>
             <a:r>
-              <a:rPr lang="en-US" smtClean="0"/>
+              <a:rPr lang="en-US"/>
               <a:t>Second level</a:t>
             </a:r>
           </a:p>
           <a:p>
             <a:pPr lvl="2"/>
             <a:r>
-              <a:rPr lang="en-US" smtClean="0"/>
+              <a:rPr lang="en-US"/>
               <a:t>Third level</a:t>
             </a:r>
           </a:p>
           <a:p>
             <a:pPr lvl="3"/>
             <a:r>
-              <a:rPr lang="en-US" smtClean="0"/>
+              <a:rPr lang="en-US"/>
               <a:t>Fourth level</a:t>
             </a:r>
           </a:p>
           <a:p>
             <a:pPr lvl="4"/>
             <a:r>
-              <a:rPr lang="en-US" smtClean="0"/>
+              <a:rPr lang="en-US"/>
               <a:t>Fifth level</a:t>
             </a:r>
-            <a:endParaRPr lang="en-US"/>
           </a:p>
         </p:txBody>
       </p:sp>
@@ -4101,7 +4081,7 @@
           <a:p>
             <a:pPr lvl="0"/>
             <a:r>
-              <a:rPr lang="en-US" smtClean="0"/>
+              <a:rPr lang="en-US"/>
               <a:t>Click to edit Master text styles</a:t>
             </a:r>
           </a:p>
@@ -4124,7 +4104,7 @@
           <a:p>
             <a:fld id="{699DC775-C286-4358-8C92-D7E584E969B3}" type="datetimeFigureOut">
               <a:rPr lang="en-US" smtClean="0"/>
-              <a:t>4/10/2018</a:t>
+              <a:t>1/27/2019</a:t>
             </a:fld>
             <a:endParaRPr lang="en-US"/>
           </a:p>
@@ -4218,10 +4198,9 @@
           <a:lstStyle/>
           <a:p>
             <a:r>
-              <a:rPr lang="en-US" smtClean="0"/>
+              <a:rPr lang="en-US"/>
               <a:t>Click to edit Master title style</a:t>
             </a:r>
-            <a:endParaRPr lang="en-US"/>
           </a:p>
         </p:txBody>
       </p:sp>
@@ -4242,38 +4221,37 @@
           <a:p>
             <a:pPr lvl="0"/>
             <a:r>
-              <a:rPr lang="en-US" smtClean="0"/>
+              <a:rPr lang="en-US"/>
               <a:t>Click to edit Master text styles</a:t>
             </a:r>
           </a:p>
           <a:p>
             <a:pPr lvl="1"/>
             <a:r>
-              <a:rPr lang="en-US" smtClean="0"/>
+              <a:rPr lang="en-US"/>
               <a:t>Second level</a:t>
             </a:r>
           </a:p>
           <a:p>
             <a:pPr lvl="2"/>
             <a:r>
-              <a:rPr lang="en-US" smtClean="0"/>
+              <a:rPr lang="en-US"/>
               <a:t>Third level</a:t>
             </a:r>
           </a:p>
           <a:p>
             <a:pPr lvl="3"/>
             <a:r>
-              <a:rPr lang="en-US" smtClean="0"/>
+              <a:rPr lang="en-US"/>
               <a:t>Fourth level</a:t>
             </a:r>
           </a:p>
           <a:p>
             <a:pPr lvl="4"/>
             <a:r>
-              <a:rPr lang="en-US" smtClean="0"/>
+              <a:rPr lang="en-US"/>
               <a:t>Fifth level</a:t>
             </a:r>
-            <a:endParaRPr lang="en-US"/>
           </a:p>
         </p:txBody>
       </p:sp>
@@ -4294,7 +4272,7 @@
           <a:p>
             <a:fld id="{699DC775-C286-4358-8C92-D7E584E969B3}" type="datetimeFigureOut">
               <a:rPr lang="en-US" smtClean="0"/>
-              <a:t>4/10/2018</a:t>
+              <a:t>1/27/2019</a:t>
             </a:fld>
             <a:endParaRPr lang="en-US"/>
           </a:p>
@@ -4397,10 +4375,9 @@
           </a:lstStyle>
           <a:p>
             <a:r>
-              <a:rPr lang="en-US" smtClean="0"/>
+              <a:rPr lang="en-US"/>
               <a:t>Click to edit Master title style</a:t>
             </a:r>
-            <a:endParaRPr lang="en-US"/>
           </a:p>
         </p:txBody>
       </p:sp>
@@ -4524,7 +4501,7 @@
           <a:p>
             <a:pPr lvl="0"/>
             <a:r>
-              <a:rPr lang="en-US" smtClean="0"/>
+              <a:rPr lang="en-US"/>
               <a:t>Click to edit Master text styles</a:t>
             </a:r>
           </a:p>
@@ -4547,7 +4524,7 @@
           <a:p>
             <a:fld id="{699DC775-C286-4358-8C92-D7E584E969B3}" type="datetimeFigureOut">
               <a:rPr lang="en-US" smtClean="0"/>
-              <a:t>4/10/2018</a:t>
+              <a:t>1/27/2019</a:t>
             </a:fld>
             <a:endParaRPr lang="en-US"/>
           </a:p>
@@ -4641,10 +4618,9 @@
           <a:lstStyle/>
           <a:p>
             <a:r>
-              <a:rPr lang="en-US" smtClean="0"/>
+              <a:rPr lang="en-US"/>
               <a:t>Click to edit Master title style</a:t>
             </a:r>
-            <a:endParaRPr lang="en-US"/>
           </a:p>
         </p:txBody>
       </p:sp>
@@ -4665,38 +4641,37 @@
           <a:p>
             <a:pPr lvl="0"/>
             <a:r>
-              <a:rPr lang="en-US" smtClean="0"/>
+              <a:rPr lang="en-US"/>
               <a:t>Click to edit Master text styles</a:t>
             </a:r>
           </a:p>
           <a:p>
             <a:pPr lvl="1"/>
             <a:r>
-              <a:rPr lang="en-US" smtClean="0"/>
+              <a:rPr lang="en-US"/>
               <a:t>Second level</a:t>
             </a:r>
           </a:p>
           <a:p>
             <a:pPr lvl="2"/>
             <a:r>
-              <a:rPr lang="en-US" smtClean="0"/>
+              <a:rPr lang="en-US"/>
               <a:t>Third level</a:t>
             </a:r>
           </a:p>
           <a:p>
             <a:pPr lvl="3"/>
             <a:r>
-              <a:rPr lang="en-US" smtClean="0"/>
+              <a:rPr lang="en-US"/>
               <a:t>Fourth level</a:t>
             </a:r>
           </a:p>
           <a:p>
             <a:pPr lvl="4"/>
             <a:r>
-              <a:rPr lang="en-US" smtClean="0"/>
+              <a:rPr lang="en-US"/>
               <a:t>Fifth level</a:t>
             </a:r>
-            <a:endParaRPr lang="en-US"/>
           </a:p>
         </p:txBody>
       </p:sp>
@@ -4717,7 +4692,7 @@
           <a:p>
             <a:fld id="{699DC775-C286-4358-8C92-D7E584E969B3}" type="datetimeFigureOut">
               <a:rPr lang="en-US" smtClean="0"/>
-              <a:t>4/10/2018</a:t>
+              <a:t>1/27/2019</a:t>
             </a:fld>
             <a:endParaRPr lang="en-US"/>
           </a:p>
@@ -4816,10 +4791,9 @@
           <a:lstStyle/>
           <a:p>
             <a:r>
-              <a:rPr lang="en-US" smtClean="0"/>
+              <a:rPr lang="en-US"/>
               <a:t>Click to edit Master title style</a:t>
             </a:r>
-            <a:endParaRPr lang="en-US"/>
           </a:p>
         </p:txBody>
       </p:sp>
@@ -4845,38 +4819,37 @@
           <a:p>
             <a:pPr lvl="0"/>
             <a:r>
-              <a:rPr lang="en-US" smtClean="0"/>
+              <a:rPr lang="en-US"/>
               <a:t>Click to edit Master text styles</a:t>
             </a:r>
           </a:p>
           <a:p>
             <a:pPr lvl="1"/>
             <a:r>
-              <a:rPr lang="en-US" smtClean="0"/>
+              <a:rPr lang="en-US"/>
               <a:t>Second level</a:t>
             </a:r>
           </a:p>
           <a:p>
             <a:pPr lvl="2"/>
             <a:r>
-              <a:rPr lang="en-US" smtClean="0"/>
+              <a:rPr lang="en-US"/>
               <a:t>Third level</a:t>
             </a:r>
           </a:p>
           <a:p>
             <a:pPr lvl="3"/>
             <a:r>
-              <a:rPr lang="en-US" smtClean="0"/>
+              <a:rPr lang="en-US"/>
               <a:t>Fourth level</a:t>
             </a:r>
           </a:p>
           <a:p>
             <a:pPr lvl="4"/>
             <a:r>
-              <a:rPr lang="en-US" smtClean="0"/>
+              <a:rPr lang="en-US"/>
               <a:t>Fifth level</a:t>
             </a:r>
-            <a:endParaRPr lang="en-US"/>
           </a:p>
         </p:txBody>
       </p:sp>
@@ -4897,7 +4870,7 @@
           <a:p>
             <a:fld id="{699DC775-C286-4358-8C92-D7E584E969B3}" type="datetimeFigureOut">
               <a:rPr lang="en-US" smtClean="0"/>
-              <a:t>4/10/2018</a:t>
+              <a:t>1/27/2019</a:t>
             </a:fld>
             <a:endParaRPr lang="en-US"/>
           </a:p>
@@ -5004,10 +4977,9 @@
           <a:lstStyle/>
           <a:p>
             <a:r>
-              <a:rPr lang="en-US" smtClean="0"/>
+              <a:rPr lang="en-US"/>
               <a:t>Click to edit Master title style</a:t>
             </a:r>
-            <a:endParaRPr lang="en-US"/>
           </a:p>
         </p:txBody>
       </p:sp>
@@ -5123,10 +5095,9 @@
           </a:lstStyle>
           <a:p>
             <a:r>
-              <a:rPr lang="en-US" smtClean="0"/>
+              <a:rPr lang="en-US"/>
               <a:t>Click to edit Master subtitle style</a:t>
             </a:r>
-            <a:endParaRPr lang="en-US"/>
           </a:p>
         </p:txBody>
       </p:sp>
@@ -5147,7 +5118,7 @@
           <a:p>
             <a:fld id="{699DC775-C286-4358-8C92-D7E584E969B3}" type="datetimeFigureOut">
               <a:rPr lang="en-US" smtClean="0"/>
-              <a:t>4/10/2018</a:t>
+              <a:t>1/27/2019</a:t>
             </a:fld>
             <a:endParaRPr lang="en-US"/>
           </a:p>
@@ -5249,10 +5220,9 @@
           <a:lstStyle/>
           <a:p>
             <a:r>
-              <a:rPr lang="en-US" smtClean="0"/>
+              <a:rPr lang="en-US"/>
               <a:t>Click to edit Master title style</a:t>
             </a:r>
-            <a:endParaRPr lang="en-US"/>
           </a:p>
         </p:txBody>
       </p:sp>
@@ -5273,38 +5243,37 @@
           <a:p>
             <a:pPr lvl="0"/>
             <a:r>
-              <a:rPr lang="en-US" smtClean="0"/>
+              <a:rPr lang="en-US"/>
               <a:t>Click to edit Master text styles</a:t>
             </a:r>
           </a:p>
           <a:p>
             <a:pPr lvl="1"/>
             <a:r>
-              <a:rPr lang="en-US" smtClean="0"/>
+              <a:rPr lang="en-US"/>
               <a:t>Second level</a:t>
             </a:r>
           </a:p>
           <a:p>
             <a:pPr lvl="2"/>
             <a:r>
-              <a:rPr lang="en-US" smtClean="0"/>
+              <a:rPr lang="en-US"/>
               <a:t>Third level</a:t>
             </a:r>
           </a:p>
           <a:p>
             <a:pPr lvl="3"/>
             <a:r>
-              <a:rPr lang="en-US" smtClean="0"/>
+              <a:rPr lang="en-US"/>
               <a:t>Fourth level</a:t>
             </a:r>
           </a:p>
           <a:p>
             <a:pPr lvl="4"/>
             <a:r>
-              <a:rPr lang="en-US" smtClean="0"/>
+              <a:rPr lang="en-US"/>
               <a:t>Fifth level</a:t>
             </a:r>
-            <a:endParaRPr lang="en-US"/>
           </a:p>
         </p:txBody>
       </p:sp>
@@ -5325,7 +5294,7 @@
           <a:p>
             <a:fld id="{699DC775-C286-4358-8C92-D7E584E969B3}" type="datetimeFigureOut">
               <a:rPr lang="en-US" smtClean="0"/>
-              <a:t>4/10/2018</a:t>
+              <a:t>1/27/2019</a:t>
             </a:fld>
             <a:endParaRPr lang="en-US"/>
           </a:p>
@@ -5436,10 +5405,9 @@
           </a:lstStyle>
           <a:p>
             <a:r>
-              <a:rPr lang="en-US" smtClean="0"/>
+              <a:rPr lang="en-US"/>
               <a:t>Click to edit Master title style</a:t>
             </a:r>
-            <a:endParaRPr lang="en-US"/>
           </a:p>
         </p:txBody>
       </p:sp>
@@ -5556,7 +5524,7 @@
           <a:p>
             <a:pPr lvl="0"/>
             <a:r>
-              <a:rPr lang="en-US" smtClean="0"/>
+              <a:rPr lang="en-US"/>
               <a:t>Click to edit Master text styles</a:t>
             </a:r>
           </a:p>
@@ -5579,7 +5547,7 @@
           <a:p>
             <a:fld id="{699DC775-C286-4358-8C92-D7E584E969B3}" type="datetimeFigureOut">
               <a:rPr lang="en-US" smtClean="0"/>
-              <a:t>4/10/2018</a:t>
+              <a:t>1/27/2019</a:t>
             </a:fld>
             <a:endParaRPr lang="en-US"/>
           </a:p>
@@ -5681,10 +5649,9 @@
           <a:lstStyle/>
           <a:p>
             <a:r>
-              <a:rPr lang="en-US" smtClean="0"/>
+              <a:rPr lang="en-US"/>
               <a:t>Click to edit Master title style</a:t>
             </a:r>
-            <a:endParaRPr lang="en-US"/>
           </a:p>
         </p:txBody>
       </p:sp>
@@ -5738,38 +5705,37 @@
           <a:p>
             <a:pPr lvl="0"/>
             <a:r>
-              <a:rPr lang="en-US" smtClean="0"/>
+              <a:rPr lang="en-US"/>
               <a:t>Click to edit Master text styles</a:t>
             </a:r>
           </a:p>
           <a:p>
             <a:pPr lvl="1"/>
             <a:r>
-              <a:rPr lang="en-US" smtClean="0"/>
+              <a:rPr lang="en-US"/>
               <a:t>Second level</a:t>
             </a:r>
           </a:p>
           <a:p>
             <a:pPr lvl="2"/>
             <a:r>
-              <a:rPr lang="en-US" smtClean="0"/>
+              <a:rPr lang="en-US"/>
               <a:t>Third level</a:t>
             </a:r>
           </a:p>
           <a:p>
             <a:pPr lvl="3"/>
             <a:r>
-              <a:rPr lang="en-US" smtClean="0"/>
+              <a:rPr lang="en-US"/>
               <a:t>Fourth level</a:t>
             </a:r>
           </a:p>
           <a:p>
             <a:pPr lvl="4"/>
             <a:r>
-              <a:rPr lang="en-US" smtClean="0"/>
+              <a:rPr lang="en-US"/>
               <a:t>Fifth level</a:t>
             </a:r>
-            <a:endParaRPr lang="en-US"/>
           </a:p>
         </p:txBody>
       </p:sp>
@@ -5823,38 +5789,37 @@
           <a:p>
             <a:pPr lvl="0"/>
             <a:r>
-              <a:rPr lang="en-US" smtClean="0"/>
+              <a:rPr lang="en-US"/>
               <a:t>Click to edit Master text styles</a:t>
             </a:r>
           </a:p>
           <a:p>
             <a:pPr lvl="1"/>
             <a:r>
-              <a:rPr lang="en-US" smtClean="0"/>
+              <a:rPr lang="en-US"/>
               <a:t>Second level</a:t>
             </a:r>
           </a:p>
           <a:p>
             <a:pPr lvl="2"/>
             <a:r>
-              <a:rPr lang="en-US" smtClean="0"/>
+              <a:rPr lang="en-US"/>
               <a:t>Third level</a:t>
             </a:r>
           </a:p>
           <a:p>
             <a:pPr lvl="3"/>
             <a:r>
-              <a:rPr lang="en-US" smtClean="0"/>
+              <a:rPr lang="en-US"/>
               <a:t>Fourth level</a:t>
             </a:r>
           </a:p>
           <a:p>
             <a:pPr lvl="4"/>
             <a:r>
-              <a:rPr lang="en-US" smtClean="0"/>
+              <a:rPr lang="en-US"/>
               <a:t>Fifth level</a:t>
             </a:r>
-            <a:endParaRPr lang="en-US"/>
           </a:p>
         </p:txBody>
       </p:sp>
@@ -5875,7 +5840,7 @@
           <a:p>
             <a:fld id="{699DC775-C286-4358-8C92-D7E584E969B3}" type="datetimeFigureOut">
               <a:rPr lang="en-US" smtClean="0"/>
-              <a:t>4/10/2018</a:t>
+              <a:t>1/27/2019</a:t>
             </a:fld>
             <a:endParaRPr lang="en-US"/>
           </a:p>
@@ -5981,10 +5946,9 @@
           </a:lstStyle>
           <a:p>
             <a:r>
-              <a:rPr lang="en-US" smtClean="0"/>
+              <a:rPr lang="en-US"/>
               <a:t>Click to edit Master title style</a:t>
             </a:r>
-            <a:endParaRPr lang="en-US"/>
           </a:p>
         </p:txBody>
       </p:sp>
@@ -6047,7 +6011,7 @@
           <a:p>
             <a:pPr lvl="0"/>
             <a:r>
-              <a:rPr lang="en-US" smtClean="0"/>
+              <a:rPr lang="en-US"/>
               <a:t>Click to edit Master text styles</a:t>
             </a:r>
           </a:p>
@@ -6103,38 +6067,37 @@
           <a:p>
             <a:pPr lvl="0"/>
             <a:r>
-              <a:rPr lang="en-US" smtClean="0"/>
+              <a:rPr lang="en-US"/>
               <a:t>Click to edit Master text styles</a:t>
             </a:r>
           </a:p>
           <a:p>
             <a:pPr lvl="1"/>
             <a:r>
-              <a:rPr lang="en-US" smtClean="0"/>
+              <a:rPr lang="en-US"/>
               <a:t>Second level</a:t>
             </a:r>
           </a:p>
           <a:p>
             <a:pPr lvl="2"/>
             <a:r>
-              <a:rPr lang="en-US" smtClean="0"/>
+              <a:rPr lang="en-US"/>
               <a:t>Third level</a:t>
             </a:r>
           </a:p>
           <a:p>
             <a:pPr lvl="3"/>
             <a:r>
-              <a:rPr lang="en-US" smtClean="0"/>
+              <a:rPr lang="en-US"/>
               <a:t>Fourth level</a:t>
             </a:r>
           </a:p>
           <a:p>
             <a:pPr lvl="4"/>
             <a:r>
-              <a:rPr lang="en-US" smtClean="0"/>
+              <a:rPr lang="en-US"/>
               <a:t>Fifth level</a:t>
             </a:r>
-            <a:endParaRPr lang="en-US"/>
           </a:p>
         </p:txBody>
       </p:sp>
@@ -6197,7 +6160,7 @@
           <a:p>
             <a:pPr lvl="0"/>
             <a:r>
-              <a:rPr lang="en-US" smtClean="0"/>
+              <a:rPr lang="en-US"/>
               <a:t>Click to edit Master text styles</a:t>
             </a:r>
           </a:p>
@@ -6253,38 +6216,37 @@
           <a:p>
             <a:pPr lvl="0"/>
             <a:r>
-              <a:rPr lang="en-US" smtClean="0"/>
+              <a:rPr lang="en-US"/>
               <a:t>Click to edit Master text styles</a:t>
             </a:r>
           </a:p>
           <a:p>
             <a:pPr lvl="1"/>
             <a:r>
-              <a:rPr lang="en-US" smtClean="0"/>
+              <a:rPr lang="en-US"/>
               <a:t>Second level</a:t>
             </a:r>
           </a:p>
           <a:p>
             <a:pPr lvl="2"/>
             <a:r>
-              <a:rPr lang="en-US" smtClean="0"/>
+              <a:rPr lang="en-US"/>
               <a:t>Third level</a:t>
             </a:r>
           </a:p>
           <a:p>
             <a:pPr lvl="3"/>
             <a:r>
-              <a:rPr lang="en-US" smtClean="0"/>
+              <a:rPr lang="en-US"/>
               <a:t>Fourth level</a:t>
             </a:r>
           </a:p>
           <a:p>
             <a:pPr lvl="4"/>
             <a:r>
-              <a:rPr lang="en-US" smtClean="0"/>
+              <a:rPr lang="en-US"/>
               <a:t>Fifth level</a:t>
             </a:r>
-            <a:endParaRPr lang="en-US"/>
           </a:p>
         </p:txBody>
       </p:sp>
@@ -6305,7 +6267,7 @@
           <a:p>
             <a:fld id="{699DC775-C286-4358-8C92-D7E584E969B3}" type="datetimeFigureOut">
               <a:rPr lang="en-US" smtClean="0"/>
-              <a:t>4/10/2018</a:t>
+              <a:t>1/27/2019</a:t>
             </a:fld>
             <a:endParaRPr lang="en-US"/>
           </a:p>
@@ -6407,10 +6369,9 @@
           <a:lstStyle/>
           <a:p>
             <a:r>
-              <a:rPr lang="en-US" smtClean="0"/>
+              <a:rPr lang="en-US"/>
               <a:t>Click to edit Master title style</a:t>
             </a:r>
-            <a:endParaRPr lang="en-US"/>
           </a:p>
         </p:txBody>
       </p:sp>
@@ -6431,7 +6392,7 @@
           <a:p>
             <a:fld id="{699DC775-C286-4358-8C92-D7E584E969B3}" type="datetimeFigureOut">
               <a:rPr lang="en-US" smtClean="0"/>
-              <a:t>4/10/2018</a:t>
+              <a:t>1/27/2019</a:t>
             </a:fld>
             <a:endParaRPr lang="en-US"/>
           </a:p>
@@ -6534,7 +6495,7 @@
           <a:p>
             <a:fld id="{699DC775-C286-4358-8C92-D7E584E969B3}" type="datetimeFigureOut">
               <a:rPr lang="en-US" smtClean="0"/>
-              <a:t>4/10/2018</a:t>
+              <a:t>1/27/2019</a:t>
             </a:fld>
             <a:endParaRPr lang="en-US"/>
           </a:p>
@@ -6637,10 +6598,9 @@
           </a:lstStyle>
           <a:p>
             <a:r>
-              <a:rPr lang="en-US" smtClean="0"/>
+              <a:rPr lang="en-US"/>
               <a:t>Click to edit Master title style</a:t>
             </a:r>
-            <a:endParaRPr lang="en-US"/>
           </a:p>
         </p:txBody>
       </p:sp>
@@ -6757,7 +6717,7 @@
           <a:p>
             <a:pPr lvl="0"/>
             <a:r>
-              <a:rPr lang="en-US" smtClean="0"/>
+              <a:rPr lang="en-US"/>
               <a:t>Click to edit Master text styles</a:t>
             </a:r>
           </a:p>
@@ -6780,7 +6740,7 @@
           <a:p>
             <a:fld id="{699DC775-C286-4358-8C92-D7E584E969B3}" type="datetimeFigureOut">
               <a:rPr lang="en-US" smtClean="0"/>
-              <a:t>4/10/2018</a:t>
+              <a:t>1/27/2019</a:t>
             </a:fld>
             <a:endParaRPr lang="en-US"/>
           </a:p>
@@ -6891,10 +6851,9 @@
           </a:lstStyle>
           <a:p>
             <a:r>
-              <a:rPr lang="en-US" smtClean="0"/>
+              <a:rPr lang="en-US"/>
               <a:t>Click to edit Master title style</a:t>
             </a:r>
-            <a:endParaRPr lang="en-US"/>
           </a:p>
         </p:txBody>
       </p:sp>
@@ -6948,38 +6907,37 @@
           <a:p>
             <a:pPr lvl="0"/>
             <a:r>
-              <a:rPr lang="en-US" smtClean="0"/>
+              <a:rPr lang="en-US"/>
               <a:t>Click to edit Master text styles</a:t>
             </a:r>
           </a:p>
           <a:p>
             <a:pPr lvl="1"/>
             <a:r>
-              <a:rPr lang="en-US" smtClean="0"/>
+              <a:rPr lang="en-US"/>
               <a:t>Second level</a:t>
             </a:r>
           </a:p>
           <a:p>
             <a:pPr lvl="2"/>
             <a:r>
-              <a:rPr lang="en-US" smtClean="0"/>
+              <a:rPr lang="en-US"/>
               <a:t>Third level</a:t>
             </a:r>
           </a:p>
           <a:p>
             <a:pPr lvl="3"/>
             <a:r>
-              <a:rPr lang="en-US" smtClean="0"/>
+              <a:rPr lang="en-US"/>
               <a:t>Fourth level</a:t>
             </a:r>
           </a:p>
           <a:p>
             <a:pPr lvl="4"/>
             <a:r>
-              <a:rPr lang="en-US" smtClean="0"/>
+              <a:rPr lang="en-US"/>
               <a:t>Fifth level</a:t>
             </a:r>
-            <a:endParaRPr lang="en-US"/>
           </a:p>
         </p:txBody>
       </p:sp>
@@ -7042,7 +7000,7 @@
           <a:p>
             <a:pPr lvl="0"/>
             <a:r>
-              <a:rPr lang="en-US" smtClean="0"/>
+              <a:rPr lang="en-US"/>
               <a:t>Click to edit Master text styles</a:t>
             </a:r>
           </a:p>
@@ -7065,7 +7023,7 @@
           <a:p>
             <a:fld id="{699DC775-C286-4358-8C92-D7E584E969B3}" type="datetimeFigureOut">
               <a:rPr lang="en-US" smtClean="0"/>
-              <a:t>4/10/2018</a:t>
+              <a:t>1/27/2019</a:t>
             </a:fld>
             <a:endParaRPr lang="en-US"/>
           </a:p>
@@ -7176,10 +7134,9 @@
           </a:lstStyle>
           <a:p>
             <a:r>
-              <a:rPr lang="en-US" smtClean="0"/>
+              <a:rPr lang="en-US"/>
               <a:t>Click to edit Master title style</a:t>
             </a:r>
-            <a:endParaRPr lang="en-US"/>
           </a:p>
         </p:txBody>
       </p:sp>
@@ -7303,7 +7260,7 @@
           <a:p>
             <a:pPr lvl="0"/>
             <a:r>
-              <a:rPr lang="en-US" smtClean="0"/>
+              <a:rPr lang="en-US"/>
               <a:t>Click to edit Master text styles</a:t>
             </a:r>
           </a:p>
@@ -7326,7 +7283,7 @@
           <a:p>
             <a:fld id="{699DC775-C286-4358-8C92-D7E584E969B3}" type="datetimeFigureOut">
               <a:rPr lang="en-US" smtClean="0"/>
-              <a:t>4/10/2018</a:t>
+              <a:t>1/27/2019</a:t>
             </a:fld>
             <a:endParaRPr lang="en-US"/>
           </a:p>
@@ -7428,10 +7385,9 @@
           <a:lstStyle/>
           <a:p>
             <a:r>
-              <a:rPr lang="en-US" smtClean="0"/>
+              <a:rPr lang="en-US"/>
               <a:t>Click to edit Master title style</a:t>
             </a:r>
-            <a:endParaRPr lang="en-US"/>
           </a:p>
         </p:txBody>
       </p:sp>
@@ -7452,38 +7408,37 @@
           <a:p>
             <a:pPr lvl="0"/>
             <a:r>
-              <a:rPr lang="en-US" smtClean="0"/>
+              <a:rPr lang="en-US"/>
               <a:t>Click to edit Master text styles</a:t>
             </a:r>
           </a:p>
           <a:p>
             <a:pPr lvl="1"/>
             <a:r>
-              <a:rPr lang="en-US" smtClean="0"/>
+              <a:rPr lang="en-US"/>
               <a:t>Second level</a:t>
             </a:r>
           </a:p>
           <a:p>
             <a:pPr lvl="2"/>
             <a:r>
-              <a:rPr lang="en-US" smtClean="0"/>
+              <a:rPr lang="en-US"/>
               <a:t>Third level</a:t>
             </a:r>
           </a:p>
           <a:p>
             <a:pPr lvl="3"/>
             <a:r>
-              <a:rPr lang="en-US" smtClean="0"/>
+              <a:rPr lang="en-US"/>
               <a:t>Fourth level</a:t>
             </a:r>
           </a:p>
           <a:p>
             <a:pPr lvl="4"/>
             <a:r>
-              <a:rPr lang="en-US" smtClean="0"/>
+              <a:rPr lang="en-US"/>
               <a:t>Fifth level</a:t>
             </a:r>
-            <a:endParaRPr lang="en-US"/>
           </a:p>
         </p:txBody>
       </p:sp>
@@ -7504,7 +7459,7 @@
           <a:p>
             <a:fld id="{699DC775-C286-4358-8C92-D7E584E969B3}" type="datetimeFigureOut">
               <a:rPr lang="en-US" smtClean="0"/>
-              <a:t>4/10/2018</a:t>
+              <a:t>1/27/2019</a:t>
             </a:fld>
             <a:endParaRPr lang="en-US"/>
           </a:p>
@@ -7611,10 +7566,9 @@
           <a:lstStyle/>
           <a:p>
             <a:r>
-              <a:rPr lang="en-US" smtClean="0"/>
+              <a:rPr lang="en-US"/>
               <a:t>Click to edit Master title style</a:t>
             </a:r>
-            <a:endParaRPr lang="en-US"/>
           </a:p>
         </p:txBody>
       </p:sp>
@@ -7640,38 +7594,37 @@
           <a:p>
             <a:pPr lvl="0"/>
             <a:r>
-              <a:rPr lang="en-US" smtClean="0"/>
+              <a:rPr lang="en-US"/>
               <a:t>Click to edit Master text styles</a:t>
             </a:r>
           </a:p>
           <a:p>
             <a:pPr lvl="1"/>
             <a:r>
-              <a:rPr lang="en-US" smtClean="0"/>
+              <a:rPr lang="en-US"/>
               <a:t>Second level</a:t>
             </a:r>
           </a:p>
           <a:p>
             <a:pPr lvl="2"/>
             <a:r>
-              <a:rPr lang="en-US" smtClean="0"/>
+              <a:rPr lang="en-US"/>
               <a:t>Third level</a:t>
             </a:r>
           </a:p>
           <a:p>
             <a:pPr lvl="3"/>
             <a:r>
-              <a:rPr lang="en-US" smtClean="0"/>
+              <a:rPr lang="en-US"/>
               <a:t>Fourth level</a:t>
             </a:r>
           </a:p>
           <a:p>
             <a:pPr lvl="4"/>
             <a:r>
-              <a:rPr lang="en-US" smtClean="0"/>
+              <a:rPr lang="en-US"/>
               <a:t>Fifth level</a:t>
             </a:r>
-            <a:endParaRPr lang="en-US"/>
           </a:p>
         </p:txBody>
       </p:sp>
@@ -7692,7 +7645,7 @@
           <a:p>
             <a:fld id="{699DC775-C286-4358-8C92-D7E584E969B3}" type="datetimeFigureOut">
               <a:rPr lang="en-US" smtClean="0"/>
-              <a:t>4/10/2018</a:t>
+              <a:t>1/27/2019</a:t>
             </a:fld>
             <a:endParaRPr lang="en-US"/>
           </a:p>
@@ -7786,10 +7739,9 @@
           <a:lstStyle/>
           <a:p>
             <a:r>
-              <a:rPr lang="en-US" smtClean="0"/>
+              <a:rPr lang="en-US"/>
               <a:t>Click to edit Master title style</a:t>
             </a:r>
-            <a:endParaRPr lang="en-US"/>
           </a:p>
         </p:txBody>
       </p:sp>
@@ -7843,38 +7795,37 @@
           <a:p>
             <a:pPr lvl="0"/>
             <a:r>
-              <a:rPr lang="en-US" smtClean="0"/>
+              <a:rPr lang="en-US"/>
               <a:t>Click to edit Master text styles</a:t>
             </a:r>
           </a:p>
           <a:p>
             <a:pPr lvl="1"/>
             <a:r>
-              <a:rPr lang="en-US" smtClean="0"/>
+              <a:rPr lang="en-US"/>
               <a:t>Second level</a:t>
             </a:r>
           </a:p>
           <a:p>
             <a:pPr lvl="2"/>
             <a:r>
-              <a:rPr lang="en-US" smtClean="0"/>
+              <a:rPr lang="en-US"/>
               <a:t>Third level</a:t>
             </a:r>
           </a:p>
           <a:p>
             <a:pPr lvl="3"/>
             <a:r>
-              <a:rPr lang="en-US" smtClean="0"/>
+              <a:rPr lang="en-US"/>
               <a:t>Fourth level</a:t>
             </a:r>
           </a:p>
           <a:p>
             <a:pPr lvl="4"/>
             <a:r>
-              <a:rPr lang="en-US" smtClean="0"/>
+              <a:rPr lang="en-US"/>
               <a:t>Fifth level</a:t>
             </a:r>
-            <a:endParaRPr lang="en-US"/>
           </a:p>
         </p:txBody>
       </p:sp>
@@ -7928,38 +7879,37 @@
           <a:p>
             <a:pPr lvl="0"/>
             <a:r>
-              <a:rPr lang="en-US" smtClean="0"/>
+              <a:rPr lang="en-US"/>
               <a:t>Click to edit Master text styles</a:t>
             </a:r>
           </a:p>
           <a:p>
             <a:pPr lvl="1"/>
             <a:r>
-              <a:rPr lang="en-US" smtClean="0"/>
+              <a:rPr lang="en-US"/>
               <a:t>Second level</a:t>
             </a:r>
           </a:p>
           <a:p>
             <a:pPr lvl="2"/>
             <a:r>
-              <a:rPr lang="en-US" smtClean="0"/>
+              <a:rPr lang="en-US"/>
               <a:t>Third level</a:t>
             </a:r>
           </a:p>
           <a:p>
             <a:pPr lvl="3"/>
             <a:r>
-              <a:rPr lang="en-US" smtClean="0"/>
+              <a:rPr lang="en-US"/>
               <a:t>Fourth level</a:t>
             </a:r>
           </a:p>
           <a:p>
             <a:pPr lvl="4"/>
             <a:r>
-              <a:rPr lang="en-US" smtClean="0"/>
+              <a:rPr lang="en-US"/>
               <a:t>Fifth level</a:t>
             </a:r>
-            <a:endParaRPr lang="en-US"/>
           </a:p>
         </p:txBody>
       </p:sp>
@@ -7980,7 +7930,7 @@
           <a:p>
             <a:fld id="{699DC775-C286-4358-8C92-D7E584E969B3}" type="datetimeFigureOut">
               <a:rPr lang="en-US" smtClean="0"/>
-              <a:t>4/10/2018</a:t>
+              <a:t>1/27/2019</a:t>
             </a:fld>
             <a:endParaRPr lang="en-US"/>
           </a:p>
@@ -8078,10 +8028,9 @@
           </a:lstStyle>
           <a:p>
             <a:r>
-              <a:rPr lang="en-US" smtClean="0"/>
+              <a:rPr lang="en-US"/>
               <a:t>Click to edit Master title style</a:t>
             </a:r>
-            <a:endParaRPr lang="en-US"/>
           </a:p>
         </p:txBody>
       </p:sp>
@@ -8144,7 +8093,7 @@
           <a:p>
             <a:pPr lvl="0"/>
             <a:r>
-              <a:rPr lang="en-US" smtClean="0"/>
+              <a:rPr lang="en-US"/>
               <a:t>Click to edit Master text styles</a:t>
             </a:r>
           </a:p>
@@ -8200,38 +8149,37 @@
           <a:p>
             <a:pPr lvl="0"/>
             <a:r>
-              <a:rPr lang="en-US" smtClean="0"/>
+              <a:rPr lang="en-US"/>
               <a:t>Click to edit Master text styles</a:t>
             </a:r>
           </a:p>
           <a:p>
             <a:pPr lvl="1"/>
             <a:r>
-              <a:rPr lang="en-US" smtClean="0"/>
+              <a:rPr lang="en-US"/>
               <a:t>Second level</a:t>
             </a:r>
           </a:p>
           <a:p>
             <a:pPr lvl="2"/>
             <a:r>
-              <a:rPr lang="en-US" smtClean="0"/>
+              <a:rPr lang="en-US"/>
               <a:t>Third level</a:t>
             </a:r>
           </a:p>
           <a:p>
             <a:pPr lvl="3"/>
             <a:r>
-              <a:rPr lang="en-US" smtClean="0"/>
+              <a:rPr lang="en-US"/>
               <a:t>Fourth level</a:t>
             </a:r>
           </a:p>
           <a:p>
             <a:pPr lvl="4"/>
             <a:r>
-              <a:rPr lang="en-US" smtClean="0"/>
+              <a:rPr lang="en-US"/>
               <a:t>Fifth level</a:t>
             </a:r>
-            <a:endParaRPr lang="en-US"/>
           </a:p>
         </p:txBody>
       </p:sp>
@@ -8294,7 +8242,7 @@
           <a:p>
             <a:pPr lvl="0"/>
             <a:r>
-              <a:rPr lang="en-US" smtClean="0"/>
+              <a:rPr lang="en-US"/>
               <a:t>Click to edit Master text styles</a:t>
             </a:r>
           </a:p>
@@ -8350,38 +8298,37 @@
           <a:p>
             <a:pPr lvl="0"/>
             <a:r>
-              <a:rPr lang="en-US" smtClean="0"/>
+              <a:rPr lang="en-US"/>
               <a:t>Click to edit Master text styles</a:t>
             </a:r>
           </a:p>
           <a:p>
             <a:pPr lvl="1"/>
             <a:r>
-              <a:rPr lang="en-US" smtClean="0"/>
+              <a:rPr lang="en-US"/>
               <a:t>Second level</a:t>
             </a:r>
           </a:p>
           <a:p>
             <a:pPr lvl="2"/>
             <a:r>
-              <a:rPr lang="en-US" smtClean="0"/>
+              <a:rPr lang="en-US"/>
               <a:t>Third level</a:t>
             </a:r>
           </a:p>
           <a:p>
             <a:pPr lvl="3"/>
             <a:r>
-              <a:rPr lang="en-US" smtClean="0"/>
+              <a:rPr lang="en-US"/>
               <a:t>Fourth level</a:t>
             </a:r>
           </a:p>
           <a:p>
             <a:pPr lvl="4"/>
             <a:r>
-              <a:rPr lang="en-US" smtClean="0"/>
+              <a:rPr lang="en-US"/>
               <a:t>Fifth level</a:t>
             </a:r>
-            <a:endParaRPr lang="en-US"/>
           </a:p>
         </p:txBody>
       </p:sp>
@@ -8402,7 +8349,7 @@
           <a:p>
             <a:fld id="{699DC775-C286-4358-8C92-D7E584E969B3}" type="datetimeFigureOut">
               <a:rPr lang="en-US" smtClean="0"/>
-              <a:t>4/10/2018</a:t>
+              <a:t>1/27/2019</a:t>
             </a:fld>
             <a:endParaRPr lang="en-US"/>
           </a:p>
@@ -8496,10 +8443,9 @@
           <a:lstStyle/>
           <a:p>
             <a:r>
-              <a:rPr lang="en-US" smtClean="0"/>
+              <a:rPr lang="en-US"/>
               <a:t>Click to edit Master title style</a:t>
             </a:r>
-            <a:endParaRPr lang="en-US"/>
           </a:p>
         </p:txBody>
       </p:sp>
@@ -8520,7 +8466,7 @@
           <a:p>
             <a:fld id="{699DC775-C286-4358-8C92-D7E584E969B3}" type="datetimeFigureOut">
               <a:rPr lang="en-US" smtClean="0"/>
-              <a:t>4/10/2018</a:t>
+              <a:t>1/27/2019</a:t>
             </a:fld>
             <a:endParaRPr lang="en-US"/>
           </a:p>
@@ -8615,7 +8561,7 @@
           <a:p>
             <a:fld id="{699DC775-C286-4358-8C92-D7E584E969B3}" type="datetimeFigureOut">
               <a:rPr lang="en-US" smtClean="0"/>
-              <a:t>4/10/2018</a:t>
+              <a:t>1/27/2019</a:t>
             </a:fld>
             <a:endParaRPr lang="en-US"/>
           </a:p>
@@ -8718,10 +8664,9 @@
           </a:lstStyle>
           <a:p>
             <a:r>
-              <a:rPr lang="en-US" smtClean="0"/>
+              <a:rPr lang="en-US"/>
               <a:t>Click to edit Master title style</a:t>
             </a:r>
-            <a:endParaRPr lang="en-US"/>
           </a:p>
         </p:txBody>
       </p:sp>
@@ -8775,38 +8720,37 @@
           <a:p>
             <a:pPr lvl="0"/>
             <a:r>
-              <a:rPr lang="en-US" smtClean="0"/>
+              <a:rPr lang="en-US"/>
               <a:t>Click to edit Master text styles</a:t>
             </a:r>
           </a:p>
           <a:p>
             <a:pPr lvl="1"/>
             <a:r>
-              <a:rPr lang="en-US" smtClean="0"/>
+              <a:rPr lang="en-US"/>
               <a:t>Second level</a:t>
             </a:r>
           </a:p>
           <a:p>
             <a:pPr lvl="2"/>
             <a:r>
-              <a:rPr lang="en-US" smtClean="0"/>
+              <a:rPr lang="en-US"/>
               <a:t>Third level</a:t>
             </a:r>
           </a:p>
           <a:p>
             <a:pPr lvl="3"/>
             <a:r>
-              <a:rPr lang="en-US" smtClean="0"/>
+              <a:rPr lang="en-US"/>
               <a:t>Fourth level</a:t>
             </a:r>
           </a:p>
           <a:p>
             <a:pPr lvl="4"/>
             <a:r>
-              <a:rPr lang="en-US" smtClean="0"/>
+              <a:rPr lang="en-US"/>
               <a:t>Fifth level</a:t>
             </a:r>
-            <a:endParaRPr lang="en-US"/>
           </a:p>
         </p:txBody>
       </p:sp>
@@ -8869,7 +8813,7 @@
           <a:p>
             <a:pPr lvl="0"/>
             <a:r>
-              <a:rPr lang="en-US" smtClean="0"/>
+              <a:rPr lang="en-US"/>
               <a:t>Click to edit Master text styles</a:t>
             </a:r>
           </a:p>
@@ -8892,7 +8836,7 @@
           <a:p>
             <a:fld id="{699DC775-C286-4358-8C92-D7E584E969B3}" type="datetimeFigureOut">
               <a:rPr lang="en-US" smtClean="0"/>
-              <a:t>4/10/2018</a:t>
+              <a:t>1/27/2019</a:t>
             </a:fld>
             <a:endParaRPr lang="en-US"/>
           </a:p>
@@ -8995,10 +8939,9 @@
           </a:lstStyle>
           <a:p>
             <a:r>
-              <a:rPr lang="en-US" smtClean="0"/>
+              <a:rPr lang="en-US"/>
               <a:t>Click to edit Master title style</a:t>
             </a:r>
-            <a:endParaRPr lang="en-US"/>
           </a:p>
         </p:txBody>
       </p:sp>
@@ -9122,7 +9065,7 @@
           <a:p>
             <a:pPr lvl="0"/>
             <a:r>
-              <a:rPr lang="en-US" smtClean="0"/>
+              <a:rPr lang="en-US"/>
               <a:t>Click to edit Master text styles</a:t>
             </a:r>
           </a:p>
@@ -9145,7 +9088,7 @@
           <a:p>
             <a:fld id="{699DC775-C286-4358-8C92-D7E584E969B3}" type="datetimeFigureOut">
               <a:rPr lang="en-US" smtClean="0"/>
-              <a:t>4/10/2018</a:t>
+              <a:t>1/27/2019</a:t>
             </a:fld>
             <a:endParaRPr lang="en-US"/>
           </a:p>
@@ -9254,10 +9197,9 @@
           <a:lstStyle/>
           <a:p>
             <a:r>
-              <a:rPr lang="en-US" smtClean="0"/>
+              <a:rPr lang="en-US"/>
               <a:t>Click to edit Master title style</a:t>
             </a:r>
-            <a:endParaRPr lang="en-US"/>
           </a:p>
         </p:txBody>
       </p:sp>
@@ -9288,38 +9230,37 @@
           <a:p>
             <a:pPr lvl="0"/>
             <a:r>
-              <a:rPr lang="en-US" smtClean="0"/>
+              <a:rPr lang="en-US"/>
               <a:t>Click to edit Master text styles</a:t>
             </a:r>
           </a:p>
           <a:p>
             <a:pPr lvl="1"/>
             <a:r>
-              <a:rPr lang="en-US" smtClean="0"/>
+              <a:rPr lang="en-US"/>
               <a:t>Second level</a:t>
             </a:r>
           </a:p>
           <a:p>
             <a:pPr lvl="2"/>
             <a:r>
-              <a:rPr lang="en-US" smtClean="0"/>
+              <a:rPr lang="en-US"/>
               <a:t>Third level</a:t>
             </a:r>
           </a:p>
           <a:p>
             <a:pPr lvl="3"/>
             <a:r>
-              <a:rPr lang="en-US" smtClean="0"/>
+              <a:rPr lang="en-US"/>
               <a:t>Fourth level</a:t>
             </a:r>
           </a:p>
           <a:p>
             <a:pPr lvl="4"/>
             <a:r>
-              <a:rPr lang="en-US" smtClean="0"/>
+              <a:rPr lang="en-US"/>
               <a:t>Fifth level</a:t>
             </a:r>
-            <a:endParaRPr lang="en-US"/>
           </a:p>
         </p:txBody>
       </p:sp>
@@ -9358,7 +9299,7 @@
           <a:p>
             <a:fld id="{699DC775-C286-4358-8C92-D7E584E969B3}" type="datetimeFigureOut">
               <a:rPr lang="en-US" smtClean="0"/>
-              <a:t>4/10/2018</a:t>
+              <a:t>1/27/2019</a:t>
             </a:fld>
             <a:endParaRPr lang="en-US"/>
           </a:p>
@@ -9769,10 +9710,9 @@
           <a:lstStyle/>
           <a:p>
             <a:r>
-              <a:rPr lang="en-US" smtClean="0"/>
+              <a:rPr lang="en-US"/>
               <a:t>Click to edit Master title style</a:t>
             </a:r>
-            <a:endParaRPr lang="en-US"/>
           </a:p>
         </p:txBody>
       </p:sp>
@@ -9803,38 +9743,37 @@
           <a:p>
             <a:pPr lvl="0"/>
             <a:r>
-              <a:rPr lang="en-US" smtClean="0"/>
+              <a:rPr lang="en-US"/>
               <a:t>Click to edit Master text styles</a:t>
             </a:r>
           </a:p>
           <a:p>
             <a:pPr lvl="1"/>
             <a:r>
-              <a:rPr lang="en-US" smtClean="0"/>
+              <a:rPr lang="en-US"/>
               <a:t>Second level</a:t>
             </a:r>
           </a:p>
           <a:p>
             <a:pPr lvl="2"/>
             <a:r>
-              <a:rPr lang="en-US" smtClean="0"/>
+              <a:rPr lang="en-US"/>
               <a:t>Third level</a:t>
             </a:r>
           </a:p>
           <a:p>
             <a:pPr lvl="3"/>
             <a:r>
-              <a:rPr lang="en-US" smtClean="0"/>
+              <a:rPr lang="en-US"/>
               <a:t>Fourth level</a:t>
             </a:r>
           </a:p>
           <a:p>
             <a:pPr lvl="4"/>
             <a:r>
-              <a:rPr lang="en-US" smtClean="0"/>
+              <a:rPr lang="en-US"/>
               <a:t>Fifth level</a:t>
             </a:r>
-            <a:endParaRPr lang="en-US"/>
           </a:p>
         </p:txBody>
       </p:sp>
@@ -9873,7 +9812,7 @@
           <a:p>
             <a:fld id="{699DC775-C286-4358-8C92-D7E584E969B3}" type="datetimeFigureOut">
               <a:rPr lang="en-US" smtClean="0"/>
-              <a:t>4/10/2018</a:t>
+              <a:t>1/27/2019</a:t>
             </a:fld>
             <a:endParaRPr lang="en-US"/>
           </a:p>
@@ -10282,10 +10221,9 @@
           <a:lstStyle/>
           <a:p>
             <a:r>
-              <a:rPr lang="en-US" dirty="0" smtClean="0"/>
+              <a:rPr lang="en-US" dirty="0"/>
               <a:t>Click to edit Master title style</a:t>
             </a:r>
-            <a:endParaRPr lang="en-US" dirty="0"/>
           </a:p>
         </p:txBody>
       </p:sp>
@@ -10316,38 +10254,37 @@
           <a:p>
             <a:pPr lvl="0"/>
             <a:r>
-              <a:rPr lang="en-US" smtClean="0"/>
+              <a:rPr lang="en-US"/>
               <a:t>Click to edit Master text styles</a:t>
             </a:r>
           </a:p>
           <a:p>
             <a:pPr lvl="1"/>
             <a:r>
-              <a:rPr lang="en-US" smtClean="0"/>
+              <a:rPr lang="en-US"/>
               <a:t>Second level</a:t>
             </a:r>
           </a:p>
           <a:p>
             <a:pPr lvl="2"/>
             <a:r>
-              <a:rPr lang="en-US" smtClean="0"/>
+              <a:rPr lang="en-US"/>
               <a:t>Third level</a:t>
             </a:r>
           </a:p>
           <a:p>
             <a:pPr lvl="3"/>
             <a:r>
-              <a:rPr lang="en-US" smtClean="0"/>
+              <a:rPr lang="en-US"/>
               <a:t>Fourth level</a:t>
             </a:r>
           </a:p>
           <a:p>
             <a:pPr lvl="4"/>
             <a:r>
-              <a:rPr lang="en-US" smtClean="0"/>
+              <a:rPr lang="en-US"/>
               <a:t>Fifth level</a:t>
             </a:r>
-            <a:endParaRPr lang="en-US"/>
           </a:p>
         </p:txBody>
       </p:sp>
@@ -10386,7 +10323,7 @@
           <a:p>
             <a:fld id="{699DC775-C286-4358-8C92-D7E584E969B3}" type="datetimeFigureOut">
               <a:rPr lang="en-US" smtClean="0"/>
-              <a:t>4/10/2018</a:t>
+              <a:t>1/27/2019</a:t>
             </a:fld>
             <a:endParaRPr lang="en-US"/>
           </a:p>
@@ -10779,7 +10716,7 @@
           <a:lstStyle/>
           <a:p>
             <a:r>
-              <a:rPr lang="en-US" sz="5400" b="1" dirty="0" err="1" smtClean="0">
+              <a:rPr lang="en-US" sz="5400" b="1" dirty="0" err="1">
                 <a:solidFill>
                   <a:schemeClr val="accent6">
                     <a:lumMod val="75000"/>
@@ -10789,7 +10726,7 @@
               <a:t>PowerPointLabs</a:t>
             </a:r>
             <a:r>
-              <a:rPr lang="en-US" sz="5400" b="1" dirty="0" smtClean="0">
+              <a:rPr lang="en-US" sz="5400" b="1" dirty="0">
                 <a:solidFill>
                   <a:schemeClr val="accent6">
                     <a:lumMod val="75000"/>
@@ -10827,7 +10764,7 @@
               <a:buNone/>
             </a:pPr>
             <a:r>
-              <a:rPr lang="en-US" b="1" dirty="0" smtClean="0">
+              <a:rPr lang="en-US" b="1" dirty="0">
                 <a:solidFill>
                   <a:srgbClr val="0070C0"/>
                 </a:solidFill>
@@ -10838,34 +10775,21 @@
           <a:p>
             <a:pPr marL="285750" indent="-285750"/>
             <a:r>
-              <a:rPr lang="en-US" b="1" dirty="0" smtClean="0">
-                <a:solidFill>
-                  <a:srgbClr val="0070C0"/>
-                </a:solidFill>
-              </a:rPr>
-              <a:t>DO </a:t>
-            </a:r>
-            <a:r>
               <a:rPr lang="en-US" b="1" dirty="0">
                 <a:solidFill>
                   <a:srgbClr val="0070C0"/>
                 </a:solidFill>
               </a:rPr>
-              <a:t>NOT SAVE </a:t>
-            </a:r>
-            <a:r>
-              <a:rPr lang="en-US" dirty="0" smtClean="0">
+              <a:t>DO NOT SAVE </a:t>
+            </a:r>
+            <a:r>
+              <a:rPr lang="en-US" dirty="0">
                 <a:solidFill>
                   <a:srgbClr val="0070C0"/>
                 </a:solidFill>
               </a:rPr>
               <a:t>these slides after testing. Keep this file in its original form.</a:t>
             </a:r>
-            <a:endParaRPr lang="en-US" dirty="0">
-              <a:solidFill>
-                <a:srgbClr val="0070C0"/>
-              </a:solidFill>
-            </a:endParaRPr>
           </a:p>
           <a:p>
             <a:pPr marL="285750" indent="-285750"/>
@@ -10875,47 +10799,7 @@
                   <a:srgbClr val="0070C0"/>
                 </a:solidFill>
               </a:rPr>
-              <a:t>If </a:t>
-            </a:r>
-            <a:r>
-              <a:rPr lang="en-US" dirty="0" smtClean="0">
-                <a:solidFill>
-                  <a:srgbClr val="0070C0"/>
-                </a:solidFill>
-              </a:rPr>
-              <a:t>your </a:t>
-            </a:r>
-            <a:r>
-              <a:rPr lang="en-US" dirty="0">
-                <a:solidFill>
-                  <a:srgbClr val="0070C0"/>
-                </a:solidFill>
-              </a:rPr>
-              <a:t>result </a:t>
-            </a:r>
-            <a:r>
-              <a:rPr lang="en-US" dirty="0" smtClean="0">
-                <a:solidFill>
-                  <a:srgbClr val="0070C0"/>
-                </a:solidFill>
-              </a:rPr>
-              <a:t>is different from the </a:t>
-            </a:r>
-            <a:r>
-              <a:rPr lang="en-US" dirty="0">
-                <a:solidFill>
-                  <a:srgbClr val="0070C0"/>
-                </a:solidFill>
-              </a:rPr>
-              <a:t>expected output, </a:t>
-            </a:r>
-            <a:r>
-              <a:rPr lang="en-US" dirty="0" smtClean="0">
-                <a:solidFill>
-                  <a:srgbClr val="0070C0"/>
-                </a:solidFill>
-              </a:rPr>
-              <a:t>please submit a bug report (attach slides/screenshots as necessary).</a:t>
+              <a:t>If your result is different from the expected output, please submit a bug report (attach slides/screenshots as necessary).</a:t>
             </a:r>
             <a:endParaRPr lang="en-SG" dirty="0">
               <a:solidFill>
@@ -10938,17 +10822,171 @@
   <p:clrMapOvr>
     <a:masterClrMapping/>
   </p:clrMapOvr>
-  <p:timing>
-    <p:tnLst>
-      <p:par>
-        <p:cTn id="1" dur="indefinite" restart="never" nodeType="tmRoot"/>
-      </p:par>
-    </p:tnLst>
-  </p:timing>
 </p:sld>
 </file>
 
 <file path=ppt/slides/slide10.xml><?xml version="1.0" encoding="utf-8"?>
+<p:sld xmlns:a="http://schemas.openxmlformats.org/drawingml/2006/main" xmlns:r="http://schemas.openxmlformats.org/officeDocument/2006/relationships" xmlns:p="http://schemas.openxmlformats.org/presentationml/2006/main">
+  <p:cSld>
+    <p:spTree>
+      <p:nvGrpSpPr>
+        <p:cNvPr id="1" name=""/>
+        <p:cNvGrpSpPr/>
+        <p:nvPr/>
+      </p:nvGrpSpPr>
+      <p:grpSpPr>
+        <a:xfrm>
+          <a:off x="0" y="0"/>
+          <a:ext cx="0" cy="0"/>
+          <a:chOff x="0" y="0"/>
+          <a:chExt cx="0" cy="0"/>
+        </a:xfrm>
+      </p:grpSpPr>
+      <p:sp>
+        <p:nvSpPr>
+          <p:cNvPr id="2" name="Title 1"/>
+          <p:cNvSpPr>
+            <a:spLocks noGrp="1"/>
+          </p:cNvSpPr>
+          <p:nvPr>
+            <p:ph type="title"/>
+          </p:nvPr>
+        </p:nvSpPr>
+        <p:spPr>
+          <a:xfrm>
+            <a:off x="381000" y="609600"/>
+            <a:ext cx="8229600" cy="1143000"/>
+          </a:xfrm>
+        </p:spPr>
+        <p:txBody>
+          <a:bodyPr>
+            <a:noAutofit/>
+          </a:bodyPr>
+          <a:lstStyle/>
+          <a:p>
+            <a:pPr algn="l"/>
+            <a:r>
+              <a:rPr lang="en-US" sz="7200" dirty="0" err="1">
+                <a:solidFill>
+                  <a:schemeClr val="bg1"/>
+                </a:solidFill>
+              </a:rPr>
+              <a:t>IsClipboardRestored</a:t>
+            </a:r>
+            <a:endParaRPr lang="en-SG" sz="7200" dirty="0">
+              <a:solidFill>
+                <a:schemeClr val="bg1"/>
+              </a:solidFill>
+            </a:endParaRPr>
+          </a:p>
+        </p:txBody>
+      </p:sp>
+      <p:sp>
+        <p:nvSpPr>
+          <p:cNvPr id="3" name="TextBox 2"/>
+          <p:cNvSpPr txBox="1"/>
+          <p:nvPr/>
+        </p:nvSpPr>
+        <p:spPr>
+          <a:xfrm>
+            <a:off x="381000" y="2057400"/>
+            <a:ext cx="8229600" cy="3539430"/>
+          </a:xfrm>
+          <a:prstGeom prst="rect">
+            <a:avLst/>
+          </a:prstGeom>
+          <a:noFill/>
+        </p:spPr>
+        <p:txBody>
+          <a:bodyPr wrap="square" rtlCol="0">
+            <a:spAutoFit/>
+          </a:bodyPr>
+          <a:lstStyle/>
+          <a:p>
+            <a:r>
+              <a:rPr lang="en-US" altLang="zh-CN" sz="2800" dirty="0">
+                <a:solidFill>
+                  <a:schemeClr val="bg1"/>
+                </a:solidFill>
+              </a:rPr>
+              <a:t>Add those shapes in slide 3 to Shapes Lab;</a:t>
+            </a:r>
+          </a:p>
+          <a:p>
+            <a:r>
+              <a:rPr lang="en-US" altLang="zh-CN" sz="2800" dirty="0">
+                <a:solidFill>
+                  <a:schemeClr val="bg1"/>
+                </a:solidFill>
+              </a:rPr>
+              <a:t>Add added shapes in Shapes Lab to slide 4;</a:t>
+            </a:r>
+          </a:p>
+          <a:p>
+            <a:r>
+              <a:rPr lang="en-US" altLang="zh-CN" sz="2800" dirty="0">
+                <a:solidFill>
+                  <a:schemeClr val="bg1"/>
+                </a:solidFill>
+              </a:rPr>
+              <a:t>Compare slide 4 and expected slide 5</a:t>
+            </a:r>
+          </a:p>
+          <a:p>
+            <a:endParaRPr lang="en-US" altLang="zh-CN" sz="2800" dirty="0">
+              <a:solidFill>
+                <a:schemeClr val="bg1"/>
+              </a:solidFill>
+            </a:endParaRPr>
+          </a:p>
+          <a:p>
+            <a:r>
+              <a:rPr lang="en-US" altLang="zh-CN" sz="2800" dirty="0">
+                <a:solidFill>
+                  <a:schemeClr val="bg1"/>
+                </a:solidFill>
+              </a:rPr>
+              <a:t>Repeat for testing Add Shapes button on Shapes Lab pane from slides 6 to 8</a:t>
+            </a:r>
+          </a:p>
+          <a:p>
+            <a:endParaRPr lang="en-US" altLang="zh-CN" sz="2800" dirty="0">
+              <a:solidFill>
+                <a:schemeClr val="bg1"/>
+              </a:solidFill>
+            </a:endParaRPr>
+          </a:p>
+          <a:p>
+            <a:r>
+              <a:rPr lang="en-US" altLang="zh-CN" sz="2800" dirty="0">
+                <a:solidFill>
+                  <a:schemeClr val="bg1"/>
+                </a:solidFill>
+              </a:rPr>
+              <a:t>Animations are also expected to be transferred</a:t>
+            </a:r>
+            <a:endParaRPr lang="zh-CN" altLang="en-US" sz="2800" dirty="0">
+              <a:solidFill>
+                <a:schemeClr val="bg1"/>
+              </a:solidFill>
+            </a:endParaRPr>
+          </a:p>
+        </p:txBody>
+      </p:sp>
+    </p:spTree>
+    <p:extLst>
+      <p:ext uri="{BB962C8B-B14F-4D97-AF65-F5344CB8AC3E}">
+        <p14:creationId xmlns:p14="http://schemas.microsoft.com/office/powerpoint/2010/main" val="3646993363"/>
+      </p:ext>
+    </p:extLst>
+  </p:cSld>
+  <p:clrMapOvr>
+    <a:masterClrMapping/>
+  </p:clrMapOvr>
+</p:sld>
+</file>
+
+<file path=ppt/slides/slide11.xml><?xml version="1.0" encoding="utf-8"?>
 <p:sld xmlns:a="http://schemas.openxmlformats.org/drawingml/2006/main" xmlns:r="http://schemas.openxmlformats.org/officeDocument/2006/relationships" xmlns:p="http://schemas.openxmlformats.org/presentationml/2006/main">
   <p:cSld>
     <p:spTree>
@@ -11010,7 +11048,7 @@
           <a:p>
             <a:pPr algn="ctr"/>
             <a:r>
-              <a:rPr lang="en-US" altLang="zh-CN" sz="6600" dirty="0" smtClean="0">
+              <a:rPr lang="en-US" altLang="zh-CN" sz="6600" dirty="0">
                 <a:solidFill>
                   <a:srgbClr val="EB7561"/>
                 </a:solidFill>
@@ -11498,7 +11536,7 @@
 </p:sld>
 </file>
 
-<file path=ppt/slides/slide11.xml><?xml version="1.0" encoding="utf-8"?>
+<file path=ppt/slides/slide12.xml><?xml version="1.0" encoding="utf-8"?>
 <p:sld xmlns:a="http://schemas.openxmlformats.org/drawingml/2006/main" xmlns:r="http://schemas.openxmlformats.org/officeDocument/2006/relationships" xmlns:p="http://schemas.openxmlformats.org/presentationml/2006/main">
   <p:cSld>
     <p:spTree>
@@ -11525,17 +11563,10 @@
   <p:clrMapOvr>
     <a:masterClrMapping/>
   </p:clrMapOvr>
-  <p:timing>
-    <p:tnLst>
-      <p:par>
-        <p:cTn id="1" dur="indefinite" restart="never" nodeType="tmRoot"/>
-      </p:par>
-    </p:tnLst>
-  </p:timing>
 </p:sld>
 </file>
 
-<file path=ppt/slides/slide12.xml><?xml version="1.0" encoding="utf-8"?>
+<file path=ppt/slides/slide13.xml><?xml version="1.0" encoding="utf-8"?>
 <p:sld xmlns:a="http://schemas.openxmlformats.org/drawingml/2006/main" xmlns:r="http://schemas.openxmlformats.org/officeDocument/2006/relationships" xmlns:p="http://schemas.openxmlformats.org/presentationml/2006/main">
   <p:cSld>
     <p:spTree>
@@ -11597,7 +11628,7 @@
           <a:p>
             <a:pPr algn="ctr"/>
             <a:r>
-              <a:rPr lang="en-US" altLang="zh-CN" sz="6600" dirty="0" smtClean="0">
+              <a:rPr lang="en-US" altLang="zh-CN" sz="6600" dirty="0">
                 <a:solidFill>
                   <a:srgbClr val="EB7561"/>
                 </a:solidFill>
@@ -11857,10 +11888,9 @@
           <a:lstStyle/>
           <a:p>
             <a:r>
-              <a:rPr lang="en-SG" dirty="0" smtClean="0"/>
+              <a:rPr lang="en-SG" dirty="0"/>
               <a:t>Expected slide</a:t>
             </a:r>
-            <a:endParaRPr lang="en-SG" dirty="0"/>
           </a:p>
         </p:txBody>
       </p:sp>
@@ -11868,552 +11898,6 @@
     <p:extLst>
       <p:ext uri="{BB962C8B-B14F-4D97-AF65-F5344CB8AC3E}">
         <p14:creationId xmlns:p14="http://schemas.microsoft.com/office/powerpoint/2010/main" val="2562146180"/>
-      </p:ext>
-    </p:extLst>
-  </p:cSld>
-  <p:clrMapOvr>
-    <a:masterClrMapping/>
-  </p:clrMapOvr>
-  <p:timing>
-    <p:tnLst>
-      <p:par>
-        <p:cTn id="1" dur="indefinite" restart="never" nodeType="tmRoot">
-          <p:childTnLst>
-            <p:seq concurrent="1" nextAc="seek">
-              <p:cTn id="2" dur="indefinite" nodeType="mainSeq">
-                <p:childTnLst>
-                  <p:par>
-                    <p:cTn id="3" fill="hold">
-                      <p:stCondLst>
-                        <p:cond delay="indefinite"/>
-                      </p:stCondLst>
-                      <p:childTnLst>
-                        <p:par>
-                          <p:cTn id="4" fill="hold">
-                            <p:stCondLst>
-                              <p:cond delay="0"/>
-                            </p:stCondLst>
-                            <p:childTnLst>
-                              <p:par>
-                                <p:cTn id="5" presetID="2" presetClass="entr" presetSubtype="4" fill="hold" grpId="0" nodeType="clickEffect">
-                                  <p:stCondLst>
-                                    <p:cond delay="0"/>
-                                  </p:stCondLst>
-                                  <p:childTnLst>
-                                    <p:set>
-                                      <p:cBhvr>
-                                        <p:cTn id="6" dur="1" fill="hold">
-                                          <p:stCondLst>
-                                            <p:cond delay="0"/>
-                                          </p:stCondLst>
-                                        </p:cTn>
-                                        <p:tgtEl>
-                                          <p:spTgt spid="3"/>
-                                        </p:tgtEl>
-                                        <p:attrNameLst>
-                                          <p:attrName>style.visibility</p:attrName>
-                                        </p:attrNameLst>
-                                      </p:cBhvr>
-                                      <p:to>
-                                        <p:strVal val="visible"/>
-                                      </p:to>
-                                    </p:set>
-                                    <p:anim calcmode="lin" valueType="num">
-                                      <p:cBhvr additive="base">
-                                        <p:cTn id="7" dur="500" fill="hold"/>
-                                        <p:tgtEl>
-                                          <p:spTgt spid="3"/>
-                                        </p:tgtEl>
-                                        <p:attrNameLst>
-                                          <p:attrName>ppt_x</p:attrName>
-                                        </p:attrNameLst>
-                                      </p:cBhvr>
-                                      <p:tavLst>
-                                        <p:tav tm="0">
-                                          <p:val>
-                                            <p:strVal val="#ppt_x"/>
-                                          </p:val>
-                                        </p:tav>
-                                        <p:tav tm="100000">
-                                          <p:val>
-                                            <p:strVal val="#ppt_x"/>
-                                          </p:val>
-                                        </p:tav>
-                                      </p:tavLst>
-                                    </p:anim>
-                                    <p:anim calcmode="lin" valueType="num">
-                                      <p:cBhvr additive="base">
-                                        <p:cTn id="8" dur="500" fill="hold"/>
-                                        <p:tgtEl>
-                                          <p:spTgt spid="3"/>
-                                        </p:tgtEl>
-                                        <p:attrNameLst>
-                                          <p:attrName>ppt_y</p:attrName>
-                                        </p:attrNameLst>
-                                      </p:cBhvr>
-                                      <p:tavLst>
-                                        <p:tav tm="0">
-                                          <p:val>
-                                            <p:strVal val="1+#ppt_h/2"/>
-                                          </p:val>
-                                        </p:tav>
-                                        <p:tav tm="100000">
-                                          <p:val>
-                                            <p:strVal val="#ppt_y"/>
-                                          </p:val>
-                                        </p:tav>
-                                      </p:tavLst>
-                                    </p:anim>
-                                  </p:childTnLst>
-                                </p:cTn>
-                              </p:par>
-                            </p:childTnLst>
-                          </p:cTn>
-                        </p:par>
-                      </p:childTnLst>
-                    </p:cTn>
-                  </p:par>
-                  <p:par>
-                    <p:cTn id="9" fill="hold">
-                      <p:stCondLst>
-                        <p:cond delay="indefinite"/>
-                      </p:stCondLst>
-                      <p:childTnLst>
-                        <p:par>
-                          <p:cTn id="10" fill="hold">
-                            <p:stCondLst>
-                              <p:cond delay="0"/>
-                            </p:stCondLst>
-                            <p:childTnLst>
-                              <p:par>
-                                <p:cTn id="11" presetID="1" presetClass="entr" presetSubtype="0" fill="hold" grpId="0" nodeType="clickEffect">
-                                  <p:stCondLst>
-                                    <p:cond delay="0"/>
-                                  </p:stCondLst>
-                                  <p:childTnLst>
-                                    <p:set>
-                                      <p:cBhvr>
-                                        <p:cTn id="12" dur="1" fill="hold">
-                                          <p:stCondLst>
-                                            <p:cond delay="0"/>
-                                          </p:stCondLst>
-                                        </p:cTn>
-                                        <p:tgtEl>
-                                          <p:spTgt spid="5"/>
-                                        </p:tgtEl>
-                                        <p:attrNameLst>
-                                          <p:attrName>style.visibility</p:attrName>
-                                        </p:attrNameLst>
-                                      </p:cBhvr>
-                                      <p:to>
-                                        <p:strVal val="visible"/>
-                                      </p:to>
-                                    </p:set>
-                                  </p:childTnLst>
-                                </p:cTn>
-                              </p:par>
-                            </p:childTnLst>
-                          </p:cTn>
-                        </p:par>
-                      </p:childTnLst>
-                    </p:cTn>
-                  </p:par>
-                  <p:par>
-                    <p:cTn id="13" fill="hold">
-                      <p:stCondLst>
-                        <p:cond delay="indefinite"/>
-                      </p:stCondLst>
-                      <p:childTnLst>
-                        <p:par>
-                          <p:cTn id="14" fill="hold">
-                            <p:stCondLst>
-                              <p:cond delay="0"/>
-                            </p:stCondLst>
-                            <p:childTnLst>
-                              <p:par>
-                                <p:cTn id="15" presetID="10" presetClass="entr" presetSubtype="0" fill="hold" grpId="0" nodeType="clickEffect">
-                                  <p:stCondLst>
-                                    <p:cond delay="0"/>
-                                  </p:stCondLst>
-                                  <p:childTnLst>
-                                    <p:set>
-                                      <p:cBhvr>
-                                        <p:cTn id="16" dur="1" fill="hold">
-                                          <p:stCondLst>
-                                            <p:cond delay="0"/>
-                                          </p:stCondLst>
-                                        </p:cTn>
-                                        <p:tgtEl>
-                                          <p:spTgt spid="7"/>
-                                        </p:tgtEl>
-                                        <p:attrNameLst>
-                                          <p:attrName>style.visibility</p:attrName>
-                                        </p:attrNameLst>
-                                      </p:cBhvr>
-                                      <p:to>
-                                        <p:strVal val="visible"/>
-                                      </p:to>
-                                    </p:set>
-                                    <p:animEffect transition="in" filter="fade">
-                                      <p:cBhvr>
-                                        <p:cTn id="17" dur="500"/>
-                                        <p:tgtEl>
-                                          <p:spTgt spid="7"/>
-                                        </p:tgtEl>
-                                      </p:cBhvr>
-                                    </p:animEffect>
-                                  </p:childTnLst>
-                                </p:cTn>
-                              </p:par>
-                            </p:childTnLst>
-                          </p:cTn>
-                        </p:par>
-                      </p:childTnLst>
-                    </p:cTn>
-                  </p:par>
-                  <p:par>
-                    <p:cTn id="18" fill="hold">
-                      <p:stCondLst>
-                        <p:cond delay="indefinite"/>
-                      </p:stCondLst>
-                      <p:childTnLst>
-                        <p:par>
-                          <p:cTn id="19" fill="hold">
-                            <p:stCondLst>
-                              <p:cond delay="0"/>
-                            </p:stCondLst>
-                            <p:childTnLst>
-                              <p:par>
-                                <p:cTn id="20" presetID="16" presetClass="entr" presetSubtype="21" fill="hold" grpId="0" nodeType="clickEffect">
-                                  <p:stCondLst>
-                                    <p:cond delay="0"/>
-                                  </p:stCondLst>
-                                  <p:childTnLst>
-                                    <p:set>
-                                      <p:cBhvr>
-                                        <p:cTn id="21" dur="1" fill="hold">
-                                          <p:stCondLst>
-                                            <p:cond delay="0"/>
-                                          </p:stCondLst>
-                                        </p:cTn>
-                                        <p:tgtEl>
-                                          <p:spTgt spid="8"/>
-                                        </p:tgtEl>
-                                        <p:attrNameLst>
-                                          <p:attrName>style.visibility</p:attrName>
-                                        </p:attrNameLst>
-                                      </p:cBhvr>
-                                      <p:to>
-                                        <p:strVal val="visible"/>
-                                      </p:to>
-                                    </p:set>
-                                    <p:animEffect transition="in" filter="barn(inVertical)">
-                                      <p:cBhvr>
-                                        <p:cTn id="22" dur="500"/>
-                                        <p:tgtEl>
-                                          <p:spTgt spid="8"/>
-                                        </p:tgtEl>
-                                      </p:cBhvr>
-                                    </p:animEffect>
-                                  </p:childTnLst>
-                                </p:cTn>
-                              </p:par>
-                            </p:childTnLst>
-                          </p:cTn>
-                        </p:par>
-                      </p:childTnLst>
-                    </p:cTn>
-                  </p:par>
-                </p:childTnLst>
-              </p:cTn>
-              <p:prevCondLst>
-                <p:cond evt="onPrev" delay="0">
-                  <p:tgtEl>
-                    <p:sldTgt/>
-                  </p:tgtEl>
-                </p:cond>
-              </p:prevCondLst>
-              <p:nextCondLst>
-                <p:cond evt="onNext" delay="0">
-                  <p:tgtEl>
-                    <p:sldTgt/>
-                  </p:tgtEl>
-                </p:cond>
-              </p:nextCondLst>
-            </p:seq>
-          </p:childTnLst>
-        </p:cTn>
-      </p:par>
-    </p:tnLst>
-    <p:bldLst>
-      <p:bldP spid="3" grpId="0" animBg="1"/>
-      <p:bldP spid="5" grpId="0" animBg="1"/>
-      <p:bldP spid="7" grpId="0" animBg="1"/>
-      <p:bldP spid="8" grpId="0" animBg="1"/>
-    </p:bldLst>
-  </p:timing>
-</p:sld>
-</file>
-
-<file path=ppt/slides/slide13.xml><?xml version="1.0" encoding="utf-8"?>
-<p:sld xmlns:a="http://schemas.openxmlformats.org/drawingml/2006/main" xmlns:r="http://schemas.openxmlformats.org/officeDocument/2006/relationships" xmlns:p="http://schemas.openxmlformats.org/presentationml/2006/main">
-  <p:cSld>
-    <p:spTree>
-      <p:nvGrpSpPr>
-        <p:cNvPr id="1" name=""/>
-        <p:cNvGrpSpPr/>
-        <p:nvPr/>
-      </p:nvGrpSpPr>
-      <p:grpSpPr>
-        <a:xfrm>
-          <a:off x="0" y="0"/>
-          <a:ext cx="0" cy="0"/>
-          <a:chOff x="0" y="0"/>
-          <a:chExt cx="0" cy="0"/>
-        </a:xfrm>
-      </p:grpSpPr>
-      <p:sp>
-        <p:nvSpPr>
-          <p:cNvPr id="3" name="selectMeNow1"/>
-          <p:cNvSpPr/>
-          <p:nvPr/>
-        </p:nvSpPr>
-        <p:spPr>
-          <a:xfrm rot="1965194">
-            <a:off x="1533377" y="1406276"/>
-            <a:ext cx="3200400" cy="3792071"/>
-          </a:xfrm>
-          <a:prstGeom prst="roundRect">
-            <a:avLst/>
-          </a:prstGeom>
-          <a:solidFill>
-            <a:schemeClr val="accent2">
-              <a:lumMod val="40000"/>
-              <a:lumOff val="60000"/>
-            </a:schemeClr>
-          </a:solidFill>
-          <a:ln w="203200">
-            <a:solidFill>
-              <a:srgbClr val="92D050"/>
-            </a:solidFill>
-          </a:ln>
-          <a:effectLst>
-            <a:innerShdw blurRad="63500" dist="50800" dir="8100000">
-              <a:prstClr val="black">
-                <a:alpha val="50000"/>
-              </a:prstClr>
-            </a:innerShdw>
-          </a:effectLst>
-        </p:spPr>
-        <p:style>
-          <a:lnRef idx="2">
-            <a:schemeClr val="accent1">
-              <a:shade val="50000"/>
-            </a:schemeClr>
-          </a:lnRef>
-          <a:fillRef idx="1">
-            <a:schemeClr val="accent1"/>
-          </a:fillRef>
-          <a:effectRef idx="0">
-            <a:schemeClr val="accent1"/>
-          </a:effectRef>
-          <a:fontRef idx="minor">
-            <a:schemeClr val="lt1"/>
-          </a:fontRef>
-        </p:style>
-        <p:txBody>
-          <a:bodyPr rtlCol="0" anchor="ctr"/>
-          <a:lstStyle/>
-          <a:p>
-            <a:pPr algn="ctr"/>
-            <a:r>
-              <a:rPr lang="en-US" altLang="zh-CN" sz="6600" dirty="0" smtClean="0">
-                <a:solidFill>
-                  <a:srgbClr val="EB7561"/>
-                </a:solidFill>
-                <a:latin typeface="Times New Roman" panose="02020603050405020304" pitchFamily="18" charset="0"/>
-                <a:cs typeface="Times New Roman" panose="02020603050405020304" pitchFamily="18" charset="0"/>
-              </a:rPr>
-              <a:t>TEXT</a:t>
-            </a:r>
-            <a:endParaRPr lang="zh-CN" altLang="en-US" sz="6600" dirty="0">
-              <a:solidFill>
-                <a:srgbClr val="EB7561"/>
-              </a:solidFill>
-              <a:latin typeface="Times New Roman" panose="02020603050405020304" pitchFamily="18" charset="0"/>
-              <a:cs typeface="Times New Roman" panose="02020603050405020304" pitchFamily="18" charset="0"/>
-            </a:endParaRPr>
-          </a:p>
-        </p:txBody>
-      </p:sp>
-      <p:sp>
-        <p:nvSpPr>
-          <p:cNvPr id="5" name="selectMeNow2"/>
-          <p:cNvSpPr/>
-          <p:nvPr/>
-        </p:nvSpPr>
-        <p:spPr>
-          <a:xfrm>
-            <a:off x="5867400" y="1143000"/>
-            <a:ext cx="1828800" cy="1371600"/>
-          </a:xfrm>
-          <a:prstGeom prst="roundRect">
-            <a:avLst/>
-          </a:prstGeom>
-          <a:ln/>
-        </p:spPr>
-        <p:style>
-          <a:lnRef idx="3">
-            <a:schemeClr val="lt1"/>
-          </a:lnRef>
-          <a:fillRef idx="1">
-            <a:schemeClr val="accent6"/>
-          </a:fillRef>
-          <a:effectRef idx="1">
-            <a:schemeClr val="accent6"/>
-          </a:effectRef>
-          <a:fontRef idx="minor">
-            <a:schemeClr val="lt1"/>
-          </a:fontRef>
-        </p:style>
-        <p:txBody>
-          <a:bodyPr rtlCol="0" anchor="ctr"/>
-          <a:lstStyle/>
-          <a:p>
-            <a:pPr algn="ctr"/>
-            <a:endParaRPr lang="zh-CN" altLang="en-US"/>
-          </a:p>
-        </p:txBody>
-      </p:sp>
-      <p:sp>
-        <p:nvSpPr>
-          <p:cNvPr id="7" name="selectMeNow3"/>
-          <p:cNvSpPr/>
-          <p:nvPr/>
-        </p:nvSpPr>
-        <p:spPr>
-          <a:xfrm>
-            <a:off x="5867400" y="2667000"/>
-            <a:ext cx="1828800" cy="1371600"/>
-          </a:xfrm>
-          <a:prstGeom prst="roundRect">
-            <a:avLst/>
-          </a:prstGeom>
-          <a:ln/>
-        </p:spPr>
-        <p:style>
-          <a:lnRef idx="3">
-            <a:schemeClr val="lt1"/>
-          </a:lnRef>
-          <a:fillRef idx="1">
-            <a:schemeClr val="accent3"/>
-          </a:fillRef>
-          <a:effectRef idx="1">
-            <a:schemeClr val="accent3"/>
-          </a:effectRef>
-          <a:fontRef idx="minor">
-            <a:schemeClr val="lt1"/>
-          </a:fontRef>
-        </p:style>
-        <p:txBody>
-          <a:bodyPr rtlCol="0" anchor="ctr"/>
-          <a:lstStyle/>
-          <a:p>
-            <a:pPr algn="ctr"/>
-            <a:endParaRPr lang="zh-CN" altLang="en-US"/>
-          </a:p>
-        </p:txBody>
-      </p:sp>
-      <p:sp>
-        <p:nvSpPr>
-          <p:cNvPr id="8" name="selectMeNow4"/>
-          <p:cNvSpPr/>
-          <p:nvPr/>
-        </p:nvSpPr>
-        <p:spPr>
-          <a:xfrm>
-            <a:off x="5867400" y="4191000"/>
-            <a:ext cx="1828800" cy="1371600"/>
-          </a:xfrm>
-          <a:prstGeom prst="roundRect">
-            <a:avLst/>
-          </a:prstGeom>
-          <a:solidFill>
-            <a:schemeClr val="accent6">
-              <a:alpha val="50000"/>
-            </a:schemeClr>
-          </a:solidFill>
-          <a:ln>
-            <a:noFill/>
-          </a:ln>
-        </p:spPr>
-        <p:style>
-          <a:lnRef idx="0">
-            <a:scrgbClr r="0" g="0" b="0"/>
-          </a:lnRef>
-          <a:fillRef idx="0">
-            <a:scrgbClr r="0" g="0" b="0"/>
-          </a:fillRef>
-          <a:effectRef idx="0">
-            <a:scrgbClr r="0" g="0" b="0"/>
-          </a:effectRef>
-          <a:fontRef idx="minor">
-            <a:schemeClr val="lt1"/>
-          </a:fontRef>
-        </p:style>
-        <p:txBody>
-          <a:bodyPr rtlCol="0" anchor="ctr"/>
-          <a:lstStyle/>
-          <a:p>
-            <a:pPr algn="ctr"/>
-            <a:endParaRPr lang="zh-CN" altLang="en-US"/>
-          </a:p>
-        </p:txBody>
-      </p:sp>
-      <p:sp>
-        <p:nvSpPr>
-          <p:cNvPr id="2" name="copyMe"/>
-          <p:cNvSpPr/>
-          <p:nvPr/>
-        </p:nvSpPr>
-        <p:spPr>
-          <a:xfrm>
-            <a:off x="2438400" y="1206811"/>
-            <a:ext cx="4191000" cy="4191000"/>
-          </a:xfrm>
-          <a:prstGeom prst="heptagon">
-            <a:avLst/>
-          </a:prstGeom>
-        </p:spPr>
-        <p:style>
-          <a:lnRef idx="2">
-            <a:schemeClr val="accent1">
-              <a:shade val="50000"/>
-            </a:schemeClr>
-          </a:lnRef>
-          <a:fillRef idx="1">
-            <a:schemeClr val="accent1"/>
-          </a:fillRef>
-          <a:effectRef idx="0">
-            <a:schemeClr val="accent1"/>
-          </a:effectRef>
-          <a:fontRef idx="minor">
-            <a:schemeClr val="lt1"/>
-          </a:fontRef>
-        </p:style>
-        <p:txBody>
-          <a:bodyPr rtlCol="0" anchor="ctr"/>
-          <a:lstStyle/>
-          <a:p>
-            <a:pPr algn="ctr"/>
-            <a:endParaRPr lang="en-SG"/>
-          </a:p>
-        </p:txBody>
-      </p:sp>
-    </p:spTree>
-    <p:extLst>
-      <p:ext uri="{BB962C8B-B14F-4D97-AF65-F5344CB8AC3E}">
-        <p14:creationId xmlns:p14="http://schemas.microsoft.com/office/powerpoint/2010/main" val="2188512437"/>
       </p:ext>
     </p:extLst>
   </p:cSld>
@@ -12718,46 +12202,9 @@
           <a:chExt cx="0" cy="0"/>
         </a:xfrm>
       </p:grpSpPr>
-    </p:spTree>
-    <p:extLst>
-      <p:ext uri="{BB962C8B-B14F-4D97-AF65-F5344CB8AC3E}">
-        <p14:creationId xmlns:p14="http://schemas.microsoft.com/office/powerpoint/2010/main" val="1779079148"/>
-      </p:ext>
-    </p:extLst>
-  </p:cSld>
-  <p:clrMapOvr>
-    <a:masterClrMapping/>
-  </p:clrMapOvr>
-  <p:timing>
-    <p:tnLst>
-      <p:par>
-        <p:cTn id="1" dur="indefinite" restart="never" nodeType="tmRoot"/>
-      </p:par>
-    </p:tnLst>
-  </p:timing>
-</p:sld>
-</file>
-
-<file path=ppt/slides/slide15.xml><?xml version="1.0" encoding="utf-8"?>
-<p:sld xmlns:a="http://schemas.openxmlformats.org/drawingml/2006/main" xmlns:r="http://schemas.openxmlformats.org/officeDocument/2006/relationships" xmlns:p="http://schemas.openxmlformats.org/presentationml/2006/main">
-  <p:cSld>
-    <p:spTree>
-      <p:nvGrpSpPr>
-        <p:cNvPr id="1" name=""/>
-        <p:cNvGrpSpPr/>
-        <p:nvPr/>
-      </p:nvGrpSpPr>
-      <p:grpSpPr>
-        <a:xfrm>
-          <a:off x="0" y="0"/>
-          <a:ext cx="0" cy="0"/>
-          <a:chOff x="0" y="0"/>
-          <a:chExt cx="0" cy="0"/>
-        </a:xfrm>
-      </p:grpSpPr>
-      <p:sp>
-        <p:nvSpPr>
-          <p:cNvPr id="6" name="Group selectMeNow1 Seq_1"/>
+      <p:sp>
+        <p:nvSpPr>
+          <p:cNvPr id="3" name="selectMeNow1"/>
           <p:cNvSpPr/>
           <p:nvPr/>
         </p:nvSpPr>
@@ -12810,7 +12257,7 @@
           <a:p>
             <a:pPr algn="ctr"/>
             <a:r>
-              <a:rPr lang="en-US" altLang="zh-CN" sz="6600" dirty="0" smtClean="0">
+              <a:rPr lang="en-US" altLang="zh-CN" sz="6600" dirty="0">
                 <a:solidFill>
                   <a:srgbClr val="EB7561"/>
                 </a:solidFill>
@@ -12831,7 +12278,7 @@
       </p:sp>
       <p:sp>
         <p:nvSpPr>
-          <p:cNvPr id="9" name="Group selectMeNow1 Seq_2"/>
+          <p:cNvPr id="5" name="selectMeNow2"/>
           <p:cNvSpPr/>
           <p:nvPr/>
         </p:nvSpPr>
@@ -12870,7 +12317,7 @@
       </p:sp>
       <p:sp>
         <p:nvSpPr>
-          <p:cNvPr id="10" name="Group selectMeNow1 Seq_3"/>
+          <p:cNvPr id="7" name="selectMeNow3"/>
           <p:cNvSpPr/>
           <p:nvPr/>
         </p:nvSpPr>
@@ -12909,7 +12356,7 @@
       </p:sp>
       <p:sp>
         <p:nvSpPr>
-          <p:cNvPr id="11" name="Group selectMeNow1 Seq_4"/>
+          <p:cNvPr id="8" name="selectMeNow4"/>
           <p:cNvSpPr/>
           <p:nvPr/>
         </p:nvSpPr>
@@ -12955,7 +12402,7 @@
       </p:sp>
       <p:sp>
         <p:nvSpPr>
-          <p:cNvPr id="7" name="copyMe"/>
+          <p:cNvPr id="2" name="copyMe"/>
           <p:cNvSpPr/>
           <p:nvPr/>
         </p:nvSpPr>
@@ -12993,6 +12440,582 @@
           </a:p>
         </p:txBody>
       </p:sp>
+    </p:spTree>
+    <p:extLst>
+      <p:ext uri="{BB962C8B-B14F-4D97-AF65-F5344CB8AC3E}">
+        <p14:creationId xmlns:p14="http://schemas.microsoft.com/office/powerpoint/2010/main" val="2188512437"/>
+      </p:ext>
+    </p:extLst>
+  </p:cSld>
+  <p:clrMapOvr>
+    <a:masterClrMapping/>
+  </p:clrMapOvr>
+  <p:timing>
+    <p:tnLst>
+      <p:par>
+        <p:cTn id="1" dur="indefinite" restart="never" nodeType="tmRoot">
+          <p:childTnLst>
+            <p:seq concurrent="1" nextAc="seek">
+              <p:cTn id="2" dur="indefinite" nodeType="mainSeq">
+                <p:childTnLst>
+                  <p:par>
+                    <p:cTn id="3" fill="hold">
+                      <p:stCondLst>
+                        <p:cond delay="indefinite"/>
+                      </p:stCondLst>
+                      <p:childTnLst>
+                        <p:par>
+                          <p:cTn id="4" fill="hold">
+                            <p:stCondLst>
+                              <p:cond delay="0"/>
+                            </p:stCondLst>
+                            <p:childTnLst>
+                              <p:par>
+                                <p:cTn id="5" presetID="2" presetClass="entr" presetSubtype="4" fill="hold" grpId="0" nodeType="clickEffect">
+                                  <p:stCondLst>
+                                    <p:cond delay="0"/>
+                                  </p:stCondLst>
+                                  <p:childTnLst>
+                                    <p:set>
+                                      <p:cBhvr>
+                                        <p:cTn id="6" dur="1" fill="hold">
+                                          <p:stCondLst>
+                                            <p:cond delay="0"/>
+                                          </p:stCondLst>
+                                        </p:cTn>
+                                        <p:tgtEl>
+                                          <p:spTgt spid="3"/>
+                                        </p:tgtEl>
+                                        <p:attrNameLst>
+                                          <p:attrName>style.visibility</p:attrName>
+                                        </p:attrNameLst>
+                                      </p:cBhvr>
+                                      <p:to>
+                                        <p:strVal val="visible"/>
+                                      </p:to>
+                                    </p:set>
+                                    <p:anim calcmode="lin" valueType="num">
+                                      <p:cBhvr additive="base">
+                                        <p:cTn id="7" dur="500" fill="hold"/>
+                                        <p:tgtEl>
+                                          <p:spTgt spid="3"/>
+                                        </p:tgtEl>
+                                        <p:attrNameLst>
+                                          <p:attrName>ppt_x</p:attrName>
+                                        </p:attrNameLst>
+                                      </p:cBhvr>
+                                      <p:tavLst>
+                                        <p:tav tm="0">
+                                          <p:val>
+                                            <p:strVal val="#ppt_x"/>
+                                          </p:val>
+                                        </p:tav>
+                                        <p:tav tm="100000">
+                                          <p:val>
+                                            <p:strVal val="#ppt_x"/>
+                                          </p:val>
+                                        </p:tav>
+                                      </p:tavLst>
+                                    </p:anim>
+                                    <p:anim calcmode="lin" valueType="num">
+                                      <p:cBhvr additive="base">
+                                        <p:cTn id="8" dur="500" fill="hold"/>
+                                        <p:tgtEl>
+                                          <p:spTgt spid="3"/>
+                                        </p:tgtEl>
+                                        <p:attrNameLst>
+                                          <p:attrName>ppt_y</p:attrName>
+                                        </p:attrNameLst>
+                                      </p:cBhvr>
+                                      <p:tavLst>
+                                        <p:tav tm="0">
+                                          <p:val>
+                                            <p:strVal val="1+#ppt_h/2"/>
+                                          </p:val>
+                                        </p:tav>
+                                        <p:tav tm="100000">
+                                          <p:val>
+                                            <p:strVal val="#ppt_y"/>
+                                          </p:val>
+                                        </p:tav>
+                                      </p:tavLst>
+                                    </p:anim>
+                                  </p:childTnLst>
+                                </p:cTn>
+                              </p:par>
+                            </p:childTnLst>
+                          </p:cTn>
+                        </p:par>
+                      </p:childTnLst>
+                    </p:cTn>
+                  </p:par>
+                  <p:par>
+                    <p:cTn id="9" fill="hold">
+                      <p:stCondLst>
+                        <p:cond delay="indefinite"/>
+                      </p:stCondLst>
+                      <p:childTnLst>
+                        <p:par>
+                          <p:cTn id="10" fill="hold">
+                            <p:stCondLst>
+                              <p:cond delay="0"/>
+                            </p:stCondLst>
+                            <p:childTnLst>
+                              <p:par>
+                                <p:cTn id="11" presetID="1" presetClass="entr" presetSubtype="0" fill="hold" grpId="0" nodeType="clickEffect">
+                                  <p:stCondLst>
+                                    <p:cond delay="0"/>
+                                  </p:stCondLst>
+                                  <p:childTnLst>
+                                    <p:set>
+                                      <p:cBhvr>
+                                        <p:cTn id="12" dur="1" fill="hold">
+                                          <p:stCondLst>
+                                            <p:cond delay="0"/>
+                                          </p:stCondLst>
+                                        </p:cTn>
+                                        <p:tgtEl>
+                                          <p:spTgt spid="5"/>
+                                        </p:tgtEl>
+                                        <p:attrNameLst>
+                                          <p:attrName>style.visibility</p:attrName>
+                                        </p:attrNameLst>
+                                      </p:cBhvr>
+                                      <p:to>
+                                        <p:strVal val="visible"/>
+                                      </p:to>
+                                    </p:set>
+                                  </p:childTnLst>
+                                </p:cTn>
+                              </p:par>
+                            </p:childTnLst>
+                          </p:cTn>
+                        </p:par>
+                      </p:childTnLst>
+                    </p:cTn>
+                  </p:par>
+                  <p:par>
+                    <p:cTn id="13" fill="hold">
+                      <p:stCondLst>
+                        <p:cond delay="indefinite"/>
+                      </p:stCondLst>
+                      <p:childTnLst>
+                        <p:par>
+                          <p:cTn id="14" fill="hold">
+                            <p:stCondLst>
+                              <p:cond delay="0"/>
+                            </p:stCondLst>
+                            <p:childTnLst>
+                              <p:par>
+                                <p:cTn id="15" presetID="10" presetClass="entr" presetSubtype="0" fill="hold" grpId="0" nodeType="clickEffect">
+                                  <p:stCondLst>
+                                    <p:cond delay="0"/>
+                                  </p:stCondLst>
+                                  <p:childTnLst>
+                                    <p:set>
+                                      <p:cBhvr>
+                                        <p:cTn id="16" dur="1" fill="hold">
+                                          <p:stCondLst>
+                                            <p:cond delay="0"/>
+                                          </p:stCondLst>
+                                        </p:cTn>
+                                        <p:tgtEl>
+                                          <p:spTgt spid="7"/>
+                                        </p:tgtEl>
+                                        <p:attrNameLst>
+                                          <p:attrName>style.visibility</p:attrName>
+                                        </p:attrNameLst>
+                                      </p:cBhvr>
+                                      <p:to>
+                                        <p:strVal val="visible"/>
+                                      </p:to>
+                                    </p:set>
+                                    <p:animEffect transition="in" filter="fade">
+                                      <p:cBhvr>
+                                        <p:cTn id="17" dur="500"/>
+                                        <p:tgtEl>
+                                          <p:spTgt spid="7"/>
+                                        </p:tgtEl>
+                                      </p:cBhvr>
+                                    </p:animEffect>
+                                  </p:childTnLst>
+                                </p:cTn>
+                              </p:par>
+                            </p:childTnLst>
+                          </p:cTn>
+                        </p:par>
+                      </p:childTnLst>
+                    </p:cTn>
+                  </p:par>
+                  <p:par>
+                    <p:cTn id="18" fill="hold">
+                      <p:stCondLst>
+                        <p:cond delay="indefinite"/>
+                      </p:stCondLst>
+                      <p:childTnLst>
+                        <p:par>
+                          <p:cTn id="19" fill="hold">
+                            <p:stCondLst>
+                              <p:cond delay="0"/>
+                            </p:stCondLst>
+                            <p:childTnLst>
+                              <p:par>
+                                <p:cTn id="20" presetID="16" presetClass="entr" presetSubtype="21" fill="hold" grpId="0" nodeType="clickEffect">
+                                  <p:stCondLst>
+                                    <p:cond delay="0"/>
+                                  </p:stCondLst>
+                                  <p:childTnLst>
+                                    <p:set>
+                                      <p:cBhvr>
+                                        <p:cTn id="21" dur="1" fill="hold">
+                                          <p:stCondLst>
+                                            <p:cond delay="0"/>
+                                          </p:stCondLst>
+                                        </p:cTn>
+                                        <p:tgtEl>
+                                          <p:spTgt spid="8"/>
+                                        </p:tgtEl>
+                                        <p:attrNameLst>
+                                          <p:attrName>style.visibility</p:attrName>
+                                        </p:attrNameLst>
+                                      </p:cBhvr>
+                                      <p:to>
+                                        <p:strVal val="visible"/>
+                                      </p:to>
+                                    </p:set>
+                                    <p:animEffect transition="in" filter="barn(inVertical)">
+                                      <p:cBhvr>
+                                        <p:cTn id="22" dur="500"/>
+                                        <p:tgtEl>
+                                          <p:spTgt spid="8"/>
+                                        </p:tgtEl>
+                                      </p:cBhvr>
+                                    </p:animEffect>
+                                  </p:childTnLst>
+                                </p:cTn>
+                              </p:par>
+                            </p:childTnLst>
+                          </p:cTn>
+                        </p:par>
+                      </p:childTnLst>
+                    </p:cTn>
+                  </p:par>
+                </p:childTnLst>
+              </p:cTn>
+              <p:prevCondLst>
+                <p:cond evt="onPrev" delay="0">
+                  <p:tgtEl>
+                    <p:sldTgt/>
+                  </p:tgtEl>
+                </p:cond>
+              </p:prevCondLst>
+              <p:nextCondLst>
+                <p:cond evt="onNext" delay="0">
+                  <p:tgtEl>
+                    <p:sldTgt/>
+                  </p:tgtEl>
+                </p:cond>
+              </p:nextCondLst>
+            </p:seq>
+          </p:childTnLst>
+        </p:cTn>
+      </p:par>
+    </p:tnLst>
+    <p:bldLst>
+      <p:bldP spid="3" grpId="0" animBg="1"/>
+      <p:bldP spid="5" grpId="0" animBg="1"/>
+      <p:bldP spid="7" grpId="0" animBg="1"/>
+      <p:bldP spid="8" grpId="0" animBg="1"/>
+    </p:bldLst>
+  </p:timing>
+</p:sld>
+</file>
+
+<file path=ppt/slides/slide15.xml><?xml version="1.0" encoding="utf-8"?>
+<p:sld xmlns:a="http://schemas.openxmlformats.org/drawingml/2006/main" xmlns:r="http://schemas.openxmlformats.org/officeDocument/2006/relationships" xmlns:p="http://schemas.openxmlformats.org/presentationml/2006/main">
+  <p:cSld>
+    <p:spTree>
+      <p:nvGrpSpPr>
+        <p:cNvPr id="1" name=""/>
+        <p:cNvGrpSpPr/>
+        <p:nvPr/>
+      </p:nvGrpSpPr>
+      <p:grpSpPr>
+        <a:xfrm>
+          <a:off x="0" y="0"/>
+          <a:ext cx="0" cy="0"/>
+          <a:chOff x="0" y="0"/>
+          <a:chExt cx="0" cy="0"/>
+        </a:xfrm>
+      </p:grpSpPr>
+    </p:spTree>
+    <p:extLst>
+      <p:ext uri="{BB962C8B-B14F-4D97-AF65-F5344CB8AC3E}">
+        <p14:creationId xmlns:p14="http://schemas.microsoft.com/office/powerpoint/2010/main" val="1779079148"/>
+      </p:ext>
+    </p:extLst>
+  </p:cSld>
+  <p:clrMapOvr>
+    <a:masterClrMapping/>
+  </p:clrMapOvr>
+</p:sld>
+</file>
+
+<file path=ppt/slides/slide16.xml><?xml version="1.0" encoding="utf-8"?>
+<p:sld xmlns:a="http://schemas.openxmlformats.org/drawingml/2006/main" xmlns:r="http://schemas.openxmlformats.org/officeDocument/2006/relationships" xmlns:p="http://schemas.openxmlformats.org/presentationml/2006/main">
+  <p:cSld>
+    <p:spTree>
+      <p:nvGrpSpPr>
+        <p:cNvPr id="1" name=""/>
+        <p:cNvGrpSpPr/>
+        <p:nvPr/>
+      </p:nvGrpSpPr>
+      <p:grpSpPr>
+        <a:xfrm>
+          <a:off x="0" y="0"/>
+          <a:ext cx="0" cy="0"/>
+          <a:chOff x="0" y="0"/>
+          <a:chExt cx="0" cy="0"/>
+        </a:xfrm>
+      </p:grpSpPr>
+      <p:sp>
+        <p:nvSpPr>
+          <p:cNvPr id="6" name="Group selectMeNow1 Seq_1"/>
+          <p:cNvSpPr/>
+          <p:nvPr/>
+        </p:nvSpPr>
+        <p:spPr>
+          <a:xfrm rot="1965194">
+            <a:off x="1533377" y="1406276"/>
+            <a:ext cx="3200400" cy="3792071"/>
+          </a:xfrm>
+          <a:prstGeom prst="roundRect">
+            <a:avLst/>
+          </a:prstGeom>
+          <a:solidFill>
+            <a:schemeClr val="accent2">
+              <a:lumMod val="40000"/>
+              <a:lumOff val="60000"/>
+            </a:schemeClr>
+          </a:solidFill>
+          <a:ln w="203200">
+            <a:solidFill>
+              <a:srgbClr val="92D050"/>
+            </a:solidFill>
+          </a:ln>
+          <a:effectLst>
+            <a:innerShdw blurRad="63500" dist="50800" dir="8100000">
+              <a:prstClr val="black">
+                <a:alpha val="50000"/>
+              </a:prstClr>
+            </a:innerShdw>
+          </a:effectLst>
+        </p:spPr>
+        <p:style>
+          <a:lnRef idx="2">
+            <a:schemeClr val="accent1">
+              <a:shade val="50000"/>
+            </a:schemeClr>
+          </a:lnRef>
+          <a:fillRef idx="1">
+            <a:schemeClr val="accent1"/>
+          </a:fillRef>
+          <a:effectRef idx="0">
+            <a:schemeClr val="accent1"/>
+          </a:effectRef>
+          <a:fontRef idx="minor">
+            <a:schemeClr val="lt1"/>
+          </a:fontRef>
+        </p:style>
+        <p:txBody>
+          <a:bodyPr rtlCol="0" anchor="ctr"/>
+          <a:lstStyle/>
+          <a:p>
+            <a:pPr algn="ctr"/>
+            <a:r>
+              <a:rPr lang="en-US" altLang="zh-CN" sz="6600" dirty="0">
+                <a:solidFill>
+                  <a:srgbClr val="EB7561"/>
+                </a:solidFill>
+                <a:latin typeface="Times New Roman" panose="02020603050405020304" pitchFamily="18" charset="0"/>
+                <a:cs typeface="Times New Roman" panose="02020603050405020304" pitchFamily="18" charset="0"/>
+              </a:rPr>
+              <a:t>TEXT</a:t>
+            </a:r>
+            <a:endParaRPr lang="zh-CN" altLang="en-US" sz="6600" dirty="0">
+              <a:solidFill>
+                <a:srgbClr val="EB7561"/>
+              </a:solidFill>
+              <a:latin typeface="Times New Roman" panose="02020603050405020304" pitchFamily="18" charset="0"/>
+              <a:cs typeface="Times New Roman" panose="02020603050405020304" pitchFamily="18" charset="0"/>
+            </a:endParaRPr>
+          </a:p>
+        </p:txBody>
+      </p:sp>
+      <p:sp>
+        <p:nvSpPr>
+          <p:cNvPr id="9" name="Group selectMeNow1 Seq_2"/>
+          <p:cNvSpPr/>
+          <p:nvPr/>
+        </p:nvSpPr>
+        <p:spPr>
+          <a:xfrm>
+            <a:off x="5867400" y="1143000"/>
+            <a:ext cx="1828800" cy="1371600"/>
+          </a:xfrm>
+          <a:prstGeom prst="roundRect">
+            <a:avLst/>
+          </a:prstGeom>
+          <a:ln/>
+        </p:spPr>
+        <p:style>
+          <a:lnRef idx="3">
+            <a:schemeClr val="lt1"/>
+          </a:lnRef>
+          <a:fillRef idx="1">
+            <a:schemeClr val="accent6"/>
+          </a:fillRef>
+          <a:effectRef idx="1">
+            <a:schemeClr val="accent6"/>
+          </a:effectRef>
+          <a:fontRef idx="minor">
+            <a:schemeClr val="lt1"/>
+          </a:fontRef>
+        </p:style>
+        <p:txBody>
+          <a:bodyPr rtlCol="0" anchor="ctr"/>
+          <a:lstStyle/>
+          <a:p>
+            <a:pPr algn="ctr"/>
+            <a:endParaRPr lang="zh-CN" altLang="en-US"/>
+          </a:p>
+        </p:txBody>
+      </p:sp>
+      <p:sp>
+        <p:nvSpPr>
+          <p:cNvPr id="10" name="Group selectMeNow1 Seq_3"/>
+          <p:cNvSpPr/>
+          <p:nvPr/>
+        </p:nvSpPr>
+        <p:spPr>
+          <a:xfrm>
+            <a:off x="5867400" y="2667000"/>
+            <a:ext cx="1828800" cy="1371600"/>
+          </a:xfrm>
+          <a:prstGeom prst="roundRect">
+            <a:avLst/>
+          </a:prstGeom>
+          <a:ln/>
+        </p:spPr>
+        <p:style>
+          <a:lnRef idx="3">
+            <a:schemeClr val="lt1"/>
+          </a:lnRef>
+          <a:fillRef idx="1">
+            <a:schemeClr val="accent3"/>
+          </a:fillRef>
+          <a:effectRef idx="1">
+            <a:schemeClr val="accent3"/>
+          </a:effectRef>
+          <a:fontRef idx="minor">
+            <a:schemeClr val="lt1"/>
+          </a:fontRef>
+        </p:style>
+        <p:txBody>
+          <a:bodyPr rtlCol="0" anchor="ctr"/>
+          <a:lstStyle/>
+          <a:p>
+            <a:pPr algn="ctr"/>
+            <a:endParaRPr lang="zh-CN" altLang="en-US"/>
+          </a:p>
+        </p:txBody>
+      </p:sp>
+      <p:sp>
+        <p:nvSpPr>
+          <p:cNvPr id="11" name="Group selectMeNow1 Seq_4"/>
+          <p:cNvSpPr/>
+          <p:nvPr/>
+        </p:nvSpPr>
+        <p:spPr>
+          <a:xfrm>
+            <a:off x="5867400" y="4191000"/>
+            <a:ext cx="1828800" cy="1371600"/>
+          </a:xfrm>
+          <a:prstGeom prst="roundRect">
+            <a:avLst/>
+          </a:prstGeom>
+          <a:solidFill>
+            <a:schemeClr val="accent6">
+              <a:alpha val="50000"/>
+            </a:schemeClr>
+          </a:solidFill>
+          <a:ln>
+            <a:noFill/>
+          </a:ln>
+        </p:spPr>
+        <p:style>
+          <a:lnRef idx="0">
+            <a:scrgbClr r="0" g="0" b="0"/>
+          </a:lnRef>
+          <a:fillRef idx="0">
+            <a:scrgbClr r="0" g="0" b="0"/>
+          </a:fillRef>
+          <a:effectRef idx="0">
+            <a:scrgbClr r="0" g="0" b="0"/>
+          </a:effectRef>
+          <a:fontRef idx="minor">
+            <a:schemeClr val="lt1"/>
+          </a:fontRef>
+        </p:style>
+        <p:txBody>
+          <a:bodyPr rtlCol="0" anchor="ctr"/>
+          <a:lstStyle/>
+          <a:p>
+            <a:pPr algn="ctr"/>
+            <a:endParaRPr lang="zh-CN" altLang="en-US"/>
+          </a:p>
+        </p:txBody>
+      </p:sp>
+      <p:sp>
+        <p:nvSpPr>
+          <p:cNvPr id="7" name="copyMe"/>
+          <p:cNvSpPr/>
+          <p:nvPr/>
+        </p:nvSpPr>
+        <p:spPr>
+          <a:xfrm>
+            <a:off x="2438400" y="1206811"/>
+            <a:ext cx="4191000" cy="4191000"/>
+          </a:xfrm>
+          <a:prstGeom prst="heptagon">
+            <a:avLst/>
+          </a:prstGeom>
+        </p:spPr>
+        <p:style>
+          <a:lnRef idx="2">
+            <a:schemeClr val="accent1">
+              <a:shade val="50000"/>
+            </a:schemeClr>
+          </a:lnRef>
+          <a:fillRef idx="1">
+            <a:schemeClr val="accent1"/>
+          </a:fillRef>
+          <a:effectRef idx="0">
+            <a:schemeClr val="accent1"/>
+          </a:effectRef>
+          <a:fontRef idx="minor">
+            <a:schemeClr val="lt1"/>
+          </a:fontRef>
+        </p:style>
+        <p:txBody>
+          <a:bodyPr rtlCol="0" anchor="ctr"/>
+          <a:lstStyle/>
+          <a:p>
+            <a:pPr algn="ctr"/>
+            <a:endParaRPr lang="en-SG"/>
+          </a:p>
+        </p:txBody>
+      </p:sp>
       <p:sp>
         <p:nvSpPr>
           <p:cNvPr id="2" name="Expected"/>
@@ -13016,10 +13039,9 @@
           <a:lstStyle/>
           <a:p>
             <a:r>
-              <a:rPr lang="en-SG" dirty="0" smtClean="0"/>
+              <a:rPr lang="en-SG" dirty="0"/>
               <a:t>Expected slide</a:t>
             </a:r>
-            <a:endParaRPr lang="en-SG" dirty="0"/>
           </a:p>
         </p:txBody>
       </p:sp>
@@ -13354,7 +13376,7 @@
 </p:sld>
 </file>
 
-<file path=ppt/slides/slide16.xml><?xml version="1.0" encoding="utf-8"?>
+<file path=ppt/slides/slide17.xml><?xml version="1.0" encoding="utf-8"?>
 <p:sld xmlns:a="http://schemas.openxmlformats.org/drawingml/2006/main" xmlns:r="http://schemas.openxmlformats.org/officeDocument/2006/relationships" xmlns:p="http://schemas.openxmlformats.org/presentationml/2006/main" show="0">
   <p:cSld name="PPAck201403240026082737">
     <p:spTree>
@@ -13429,21 +13451,6 @@
   <p:clrMapOvr>
     <a:masterClrMapping/>
   </p:clrMapOvr>
-  <mc:AlternateContent xmlns:mc="http://schemas.openxmlformats.org/markup-compatibility/2006" xmlns:p14="http://schemas.microsoft.com/office/powerpoint/2010/main">
-    <mc:Choice Requires="p14">
-      <p:transition spd="slow" p14:dur="2000"/>
-    </mc:Choice>
-    <mc:Fallback xmlns="">
-      <p:transition spd="slow"/>
-    </mc:Fallback>
-  </mc:AlternateContent>
-  <p:timing>
-    <p:tnLst>
-      <p:par>
-        <p:cTn id="1" dur="indefinite" restart="never" nodeType="tmRoot"/>
-      </p:par>
-    </p:tnLst>
-  </p:timing>
 </p:sld>
 </file>
 
@@ -13498,7 +13505,7 @@
           <a:p>
             <a:pPr algn="l"/>
             <a:r>
-              <a:rPr lang="en-US" sz="7200" dirty="0" smtClean="0">
+              <a:rPr lang="en-US" sz="7200" dirty="0">
                 <a:solidFill>
                   <a:schemeClr val="bg1"/>
                 </a:solidFill>
@@ -13521,8 +13528,8 @@
         </p:nvSpPr>
         <p:spPr>
           <a:xfrm>
-            <a:off x="381000" y="2057400"/>
-            <a:ext cx="8229600" cy="3539430"/>
+            <a:off x="381000" y="1905000"/>
+            <a:ext cx="8229600" cy="4832092"/>
           </a:xfrm>
           <a:prstGeom prst="rect">
             <a:avLst/>
@@ -13536,7 +13543,7 @@
           <a:lstStyle/>
           <a:p>
             <a:r>
-              <a:rPr lang="en-US" altLang="zh-CN" sz="2800" dirty="0" smtClean="0">
+              <a:rPr lang="en-US" altLang="zh-CN" sz="2800" dirty="0">
                 <a:solidFill>
                   <a:schemeClr val="bg1"/>
                 </a:solidFill>
@@ -13546,7 +13553,7 @@
           </a:p>
           <a:p>
             <a:r>
-              <a:rPr lang="en-US" altLang="zh-CN" sz="2800" dirty="0" smtClean="0">
+              <a:rPr lang="en-US" altLang="zh-CN" sz="2800" dirty="0">
                 <a:solidFill>
                   <a:schemeClr val="bg1"/>
                 </a:solidFill>
@@ -13556,7 +13563,7 @@
           </a:p>
           <a:p>
             <a:r>
-              <a:rPr lang="en-US" altLang="zh-CN" sz="2800" dirty="0" smtClean="0">
+              <a:rPr lang="en-US" altLang="zh-CN" sz="2800" dirty="0">
                 <a:solidFill>
                   <a:schemeClr val="bg1"/>
                 </a:solidFill>
@@ -13573,44 +13580,29 @@
           </a:p>
           <a:p>
             <a:r>
-              <a:rPr lang="en-US" altLang="zh-CN" sz="2800" dirty="0" smtClean="0">
-                <a:solidFill>
-                  <a:schemeClr val="bg1"/>
-                </a:solidFill>
-              </a:rPr>
-              <a:t>Repeat for testing </a:t>
-            </a:r>
-            <a:r>
               <a:rPr lang="en-US" altLang="zh-CN" sz="2800" dirty="0">
                 <a:solidFill>
                   <a:schemeClr val="bg1"/>
                 </a:solidFill>
               </a:rPr>
-              <a:t>A</a:t>
-            </a:r>
-            <a:r>
-              <a:rPr lang="en-US" altLang="zh-CN" sz="2800" dirty="0" smtClean="0">
-                <a:solidFill>
-                  <a:schemeClr val="bg1"/>
-                </a:solidFill>
-              </a:rPr>
-              <a:t>dd </a:t>
-            </a:r>
+              <a:t>Repeat for testing Add Shapes button on Shapes Lab pane from slides 6 to 8</a:t>
+            </a:r>
+          </a:p>
+          <a:p>
+            <a:endParaRPr lang="en-US" altLang="zh-CN" sz="2800" dirty="0">
+              <a:solidFill>
+                <a:schemeClr val="bg1"/>
+              </a:solidFill>
+            </a:endParaRPr>
+          </a:p>
+          <a:p>
             <a:r>
               <a:rPr lang="en-US" altLang="zh-CN" sz="2800" dirty="0">
                 <a:solidFill>
                   <a:schemeClr val="bg1"/>
                 </a:solidFill>
               </a:rPr>
-              <a:t>S</a:t>
-            </a:r>
-            <a:r>
-              <a:rPr lang="en-US" altLang="zh-CN" sz="2800" dirty="0" smtClean="0">
-                <a:solidFill>
-                  <a:schemeClr val="bg1"/>
-                </a:solidFill>
-              </a:rPr>
-              <a:t>hapes button on Shapes Lab pane from slides 6 to 8</a:t>
+              <a:t>Animations are also expected to be transferred</a:t>
             </a:r>
           </a:p>
           <a:p>
@@ -13622,18 +13614,13 @@
           </a:p>
           <a:p>
             <a:r>
-              <a:rPr lang="en-US" altLang="zh-CN" sz="2800" dirty="0" smtClean="0">
+              <a:rPr lang="en-US" altLang="zh-CN" sz="2800" dirty="0">
                 <a:solidFill>
                   <a:schemeClr val="bg1"/>
                 </a:solidFill>
               </a:rPr>
-              <a:t>Animations are also expected to be transferred</a:t>
-            </a:r>
-            <a:endParaRPr lang="zh-CN" altLang="en-US" sz="2800" dirty="0">
-              <a:solidFill>
-                <a:schemeClr val="bg1"/>
-              </a:solidFill>
-            </a:endParaRPr>
+              <a:t>Tests that error appear when adding placeholders on slide 9</a:t>
+            </a:r>
           </a:p>
         </p:txBody>
       </p:sp>
@@ -13647,13 +13634,6 @@
   <p:clrMapOvr>
     <a:masterClrMapping/>
   </p:clrMapOvr>
-  <p:timing>
-    <p:tnLst>
-      <p:par>
-        <p:cTn id="1" dur="indefinite" restart="never" nodeType="tmRoot"/>
-      </p:par>
-    </p:tnLst>
-  </p:timing>
 </p:sld>
 </file>
 
@@ -13773,7 +13753,7 @@
           <a:p>
             <a:pPr algn="ctr"/>
             <a:r>
-              <a:rPr lang="en-US" altLang="zh-CN" sz="6600" dirty="0" smtClean="0">
+              <a:rPr lang="en-US" altLang="zh-CN" sz="6600" dirty="0">
                 <a:solidFill>
                   <a:srgbClr val="EB7561"/>
                 </a:solidFill>
@@ -14210,13 +14190,6 @@
   <p:clrMapOvr>
     <a:masterClrMapping/>
   </p:clrMapOvr>
-  <p:timing>
-    <p:tnLst>
-      <p:par>
-        <p:cTn id="1" dur="indefinite" restart="never" nodeType="tmRoot"/>
-      </p:par>
-    </p:tnLst>
-  </p:timing>
 </p:sld>
 </file>
 
@@ -14290,7 +14263,7 @@
           <a:p>
             <a:pPr algn="ctr"/>
             <a:r>
-              <a:rPr lang="en-US" altLang="zh-CN" sz="6600" dirty="0" smtClean="0">
+              <a:rPr lang="en-US" altLang="zh-CN" sz="6600" dirty="0">
                 <a:solidFill>
                   <a:srgbClr val="EB7561"/>
                 </a:solidFill>
@@ -14818,7 +14791,7 @@
           <a:p>
             <a:pPr algn="ctr"/>
             <a:r>
-              <a:rPr lang="en-US" altLang="zh-CN" sz="6600" dirty="0" smtClean="0">
+              <a:rPr lang="en-US" altLang="zh-CN" sz="6600" dirty="0">
                 <a:solidFill>
                   <a:srgbClr val="EB7561"/>
                 </a:solidFill>
@@ -15287,13 +15260,6 @@
   <p:clrMapOvr>
     <a:masterClrMapping/>
   </p:clrMapOvr>
-  <p:timing>
-    <p:tnLst>
-      <p:par>
-        <p:cTn id="1" dur="indefinite" restart="never" nodeType="tmRoot"/>
-      </p:par>
-    </p:tnLst>
-  </p:timing>
 </p:sld>
 </file>
 
@@ -15377,7 +15343,7 @@
           <a:p>
             <a:pPr algn="ctr"/>
             <a:r>
-              <a:rPr lang="en-US" altLang="zh-CN" sz="6600" dirty="0" smtClean="0">
+              <a:rPr lang="en-US" altLang="zh-CN" sz="6600" dirty="0">
                 <a:solidFill>
                   <a:srgbClr val="EB7561"/>
                 </a:solidFill>
@@ -15814,6 +15780,14 @@
 <file path=ppt/slides/slide9.xml><?xml version="1.0" encoding="utf-8"?>
 <p:sld xmlns:a="http://schemas.openxmlformats.org/drawingml/2006/main" xmlns:r="http://schemas.openxmlformats.org/officeDocument/2006/relationships" xmlns:p="http://schemas.openxmlformats.org/presentationml/2006/main">
   <p:cSld>
+    <p:bg>
+      <p:bgPr>
+        <a:solidFill>
+          <a:schemeClr val="bg1"/>
+        </a:solidFill>
+        <a:effectLst/>
+      </p:bgPr>
+    </p:bg>
     <p:spTree>
       <p:nvGrpSpPr>
         <p:cNvPr id="1" name=""/>
@@ -15830,7 +15804,13 @@
       </p:grpSpPr>
       <p:sp>
         <p:nvSpPr>
-          <p:cNvPr id="2" name="Title 1"/>
+          <p:cNvPr id="2" name="Placeholder">
+            <a:extLst>
+              <a:ext uri="{FF2B5EF4-FFF2-40B4-BE49-F238E27FC236}">
+                <a16:creationId xmlns:a16="http://schemas.microsoft.com/office/drawing/2014/main" id="{DECD9BCB-1985-4800-9315-97DF8FF441B0}"/>
+              </a:ext>
+            </a:extLst>
+          </p:cNvPr>
           <p:cNvSpPr>
             <a:spLocks noGrp="1"/>
           </p:cNvSpPr>
@@ -15838,176 +15818,25 @@
             <p:ph type="title"/>
           </p:nvPr>
         </p:nvSpPr>
-        <p:spPr>
-          <a:xfrm>
-            <a:off x="381000" y="609600"/>
-            <a:ext cx="8229600" cy="1143000"/>
-          </a:xfrm>
-        </p:spPr>
-        <p:txBody>
-          <a:bodyPr>
-            <a:noAutofit/>
-          </a:bodyPr>
-          <a:lstStyle/>
-          <a:p>
-            <a:pPr algn="l"/>
-            <a:r>
-              <a:rPr lang="en-US" sz="7200" dirty="0" err="1" smtClean="0">
-                <a:solidFill>
-                  <a:schemeClr val="bg1"/>
-                </a:solidFill>
-              </a:rPr>
-              <a:t>IsClipboardRestored</a:t>
-            </a:r>
-            <a:endParaRPr lang="en-SG" sz="7200" dirty="0">
-              <a:solidFill>
-                <a:schemeClr val="bg1"/>
-              </a:solidFill>
-            </a:endParaRPr>
-          </a:p>
-        </p:txBody>
-      </p:sp>
-      <p:sp>
-        <p:nvSpPr>
-          <p:cNvPr id="3" name="TextBox 2"/>
-          <p:cNvSpPr txBox="1"/>
-          <p:nvPr/>
-        </p:nvSpPr>
-        <p:spPr>
-          <a:xfrm>
-            <a:off x="381000" y="2057400"/>
-            <a:ext cx="8229600" cy="3539430"/>
-          </a:xfrm>
-          <a:prstGeom prst="rect">
-            <a:avLst/>
-          </a:prstGeom>
-          <a:noFill/>
-        </p:spPr>
-        <p:txBody>
-          <a:bodyPr wrap="square" rtlCol="0">
-            <a:spAutoFit/>
-          </a:bodyPr>
-          <a:lstStyle/>
-          <a:p>
-            <a:r>
-              <a:rPr lang="en-US" altLang="zh-CN" sz="2800" dirty="0" smtClean="0">
-                <a:solidFill>
-                  <a:schemeClr val="bg1"/>
-                </a:solidFill>
-              </a:rPr>
-              <a:t>Add those shapes in slide 3 to Shapes Lab;</a:t>
-            </a:r>
-          </a:p>
-          <a:p>
-            <a:r>
-              <a:rPr lang="en-US" altLang="zh-CN" sz="2800" dirty="0" smtClean="0">
-                <a:solidFill>
-                  <a:schemeClr val="bg1"/>
-                </a:solidFill>
-              </a:rPr>
-              <a:t>Add added shapes in Shapes Lab to slide 4;</a:t>
-            </a:r>
-          </a:p>
-          <a:p>
-            <a:r>
-              <a:rPr lang="en-US" altLang="zh-CN" sz="2800" dirty="0" smtClean="0">
-                <a:solidFill>
-                  <a:schemeClr val="bg1"/>
-                </a:solidFill>
-              </a:rPr>
-              <a:t>Compare slide 4 and expected slide 5</a:t>
-            </a:r>
-          </a:p>
-          <a:p>
-            <a:endParaRPr lang="en-US" altLang="zh-CN" sz="2800" dirty="0">
-              <a:solidFill>
-                <a:schemeClr val="bg1"/>
-              </a:solidFill>
-            </a:endParaRPr>
-          </a:p>
-          <a:p>
-            <a:r>
-              <a:rPr lang="en-US" altLang="zh-CN" sz="2800" dirty="0" smtClean="0">
-                <a:solidFill>
-                  <a:schemeClr val="bg1"/>
-                </a:solidFill>
-              </a:rPr>
-              <a:t>Repeat for testing </a:t>
-            </a:r>
-            <a:r>
-              <a:rPr lang="en-US" altLang="zh-CN" sz="2800" dirty="0">
-                <a:solidFill>
-                  <a:schemeClr val="bg1"/>
-                </a:solidFill>
-              </a:rPr>
-              <a:t>A</a:t>
-            </a:r>
-            <a:r>
-              <a:rPr lang="en-US" altLang="zh-CN" sz="2800" dirty="0" smtClean="0">
-                <a:solidFill>
-                  <a:schemeClr val="bg1"/>
-                </a:solidFill>
-              </a:rPr>
-              <a:t>dd </a:t>
-            </a:r>
-            <a:r>
-              <a:rPr lang="en-US" altLang="zh-CN" sz="2800" dirty="0">
-                <a:solidFill>
-                  <a:schemeClr val="bg1"/>
-                </a:solidFill>
-              </a:rPr>
-              <a:t>S</a:t>
-            </a:r>
-            <a:r>
-              <a:rPr lang="en-US" altLang="zh-CN" sz="2800" dirty="0" smtClean="0">
-                <a:solidFill>
-                  <a:schemeClr val="bg1"/>
-                </a:solidFill>
-              </a:rPr>
-              <a:t>hapes button on Shapes Lab pane from slides 6 to 8</a:t>
-            </a:r>
-          </a:p>
-          <a:p>
-            <a:endParaRPr lang="en-US" altLang="zh-CN" sz="2800" dirty="0">
-              <a:solidFill>
-                <a:schemeClr val="bg1"/>
-              </a:solidFill>
-            </a:endParaRPr>
-          </a:p>
-          <a:p>
-            <a:r>
-              <a:rPr lang="en-US" altLang="zh-CN" sz="2800" dirty="0" smtClean="0">
-                <a:solidFill>
-                  <a:schemeClr val="bg1"/>
-                </a:solidFill>
-              </a:rPr>
-              <a:t>Animations are also expected to be transferred</a:t>
-            </a:r>
-            <a:endParaRPr lang="zh-CN" altLang="en-US" sz="2800" dirty="0">
-              <a:solidFill>
-                <a:schemeClr val="bg1"/>
-              </a:solidFill>
-            </a:endParaRPr>
+        <p:spPr/>
+        <p:txBody>
+          <a:bodyPr/>
+          <a:lstStyle/>
+          <a:p>
+            <a:endParaRPr lang="en-US" dirty="0"/>
           </a:p>
         </p:txBody>
       </p:sp>
     </p:spTree>
     <p:extLst>
       <p:ext uri="{BB962C8B-B14F-4D97-AF65-F5344CB8AC3E}">
-        <p14:creationId xmlns:p14="http://schemas.microsoft.com/office/powerpoint/2010/main" val="3646993363"/>
+        <p14:creationId xmlns:p14="http://schemas.microsoft.com/office/powerpoint/2010/main" val="606476009"/>
       </p:ext>
     </p:extLst>
   </p:cSld>
   <p:clrMapOvr>
     <a:masterClrMapping/>
   </p:clrMapOvr>
-  <p:timing>
-    <p:tnLst>
-      <p:par>
-        <p:cTn id="1" dur="indefinite" restart="never" nodeType="tmRoot"/>
-      </p:par>
-    </p:tnLst>
-  </p:timing>
 </p:sld>
 </file>
 

</xml_diff>